<commit_message>
Updated J1 presentation - features and samples descriptions
</commit_message>
<xml_diff>
--- a/con3638.pptx
+++ b/con3638.pptx
@@ -233,7 +233,7 @@
           <a:p>
             <a:fld id="{E99333BE-0D34-4F62-BD6E-2C3B14663373}" type="datetimeFigureOut">
               <a:rPr lang="en-US" smtClean="0"/>
-              <a:t>8/29/13</a:t>
+              <a:t>8/29/2013</a:t>
             </a:fld>
             <a:endParaRPr lang="en-US"/>
           </a:p>
@@ -399,7 +399,7 @@
           <a:p>
             <a:fld id="{4A2D1F94-724F-43BD-B41B-43157E9B4550}" type="datetimeFigureOut">
               <a:rPr lang="en-US" smtClean="0"/>
-              <a:t>8/29/13</a:t>
+              <a:t>8/29/2013</a:t>
             </a:fld>
             <a:endParaRPr lang="en-US"/>
           </a:p>
@@ -945,7 +945,7 @@
   <p:timing>
     <p:tnLst>
       <p:par>
-        <p:cTn xmlns:p14="http://schemas.microsoft.com/office/powerpoint/2010/main" id="1" dur="indefinite" restart="never" nodeType="tmRoot"/>
+        <p:cTn id="1" dur="indefinite" restart="never" nodeType="tmRoot"/>
       </p:par>
     </p:tnLst>
   </p:timing>
@@ -1257,7 +1257,7 @@
   <p:timing>
     <p:tnLst>
       <p:par>
-        <p:cTn xmlns:p14="http://schemas.microsoft.com/office/powerpoint/2010/main" id="1" dur="indefinite" restart="never" nodeType="tmRoot"/>
+        <p:cTn id="1" dur="indefinite" restart="never" nodeType="tmRoot"/>
       </p:par>
     </p:tnLst>
   </p:timing>
@@ -1556,7 +1556,7 @@
   <p:timing>
     <p:tnLst>
       <p:par>
-        <p:cTn xmlns:p14="http://schemas.microsoft.com/office/powerpoint/2010/main" id="1" dur="indefinite" restart="never" nodeType="tmRoot"/>
+        <p:cTn id="1" dur="indefinite" restart="never" nodeType="tmRoot"/>
       </p:par>
     </p:tnLst>
   </p:timing>
@@ -1782,7 +1782,7 @@
   <p:timing>
     <p:tnLst>
       <p:par>
-        <p:cTn xmlns:p14="http://schemas.microsoft.com/office/powerpoint/2010/main" id="1" dur="indefinite" restart="never" nodeType="tmRoot"/>
+        <p:cTn id="1" dur="indefinite" restart="never" nodeType="tmRoot"/>
       </p:par>
     </p:tnLst>
   </p:timing>
@@ -1840,14 +1840,14 @@
             <a:noFill/>
           </a:ln>
           <a:extLst>
-            <a:ext uri="{909E8E84-426E-40dd-AFC4-6F175D3DCCD1}">
+            <a:ext uri="{909E8E84-426E-40DD-AFC4-6F175D3DCCD1}">
               <a14:hiddenFill xmlns:a14="http://schemas.microsoft.com/office/drawing/2010/main">
                 <a:solidFill>
                   <a:srgbClr val="FFFFFF"/>
                 </a:solidFill>
               </a14:hiddenFill>
             </a:ext>
-            <a:ext uri="{91240B29-F687-4f45-9708-019B960494DF}">
+            <a:ext uri="{91240B29-F687-4F45-9708-019B960494DF}">
               <a14:hiddenLine xmlns:a14="http://schemas.microsoft.com/office/drawing/2010/main" w="9525">
                 <a:solidFill>
                   <a:srgbClr val="000000"/>
@@ -1915,7 +1915,7 @@
   <p:timing>
     <p:tnLst>
       <p:par>
-        <p:cTn xmlns:p14="http://schemas.microsoft.com/office/powerpoint/2010/main" id="1" dur="indefinite" restart="never" nodeType="tmRoot"/>
+        <p:cTn id="1" dur="indefinite" restart="never" nodeType="tmRoot"/>
       </p:par>
     </p:tnLst>
   </p:timing>
@@ -1973,14 +1973,14 @@
             <a:noFill/>
           </a:ln>
           <a:extLst>
-            <a:ext uri="{909E8E84-426E-40dd-AFC4-6F175D3DCCD1}">
+            <a:ext uri="{909E8E84-426E-40DD-AFC4-6F175D3DCCD1}">
               <a14:hiddenFill xmlns:a14="http://schemas.microsoft.com/office/drawing/2010/main">
                 <a:solidFill>
                   <a:srgbClr val="FFFFFF"/>
                 </a:solidFill>
               </a14:hiddenFill>
             </a:ext>
-            <a:ext uri="{91240B29-F687-4f45-9708-019B960494DF}">
+            <a:ext uri="{91240B29-F687-4F45-9708-019B960494DF}">
               <a14:hiddenLine xmlns:a14="http://schemas.microsoft.com/office/drawing/2010/main" w="9525">
                 <a:solidFill>
                   <a:srgbClr val="000000"/>
@@ -2027,14 +2027,14 @@
             <a:noFill/>
           </a:ln>
           <a:extLst>
-            <a:ext uri="{909E8E84-426E-40dd-AFC4-6F175D3DCCD1}">
+            <a:ext uri="{909E8E84-426E-40DD-AFC4-6F175D3DCCD1}">
               <a14:hiddenFill xmlns:a14="http://schemas.microsoft.com/office/drawing/2010/main">
                 <a:solidFill>
                   <a:srgbClr val="FFFFFF"/>
                 </a:solidFill>
               </a14:hiddenFill>
             </a:ext>
-            <a:ext uri="{91240B29-F687-4f45-9708-019B960494DF}">
+            <a:ext uri="{91240B29-F687-4F45-9708-019B960494DF}">
               <a14:hiddenLine xmlns:a14="http://schemas.microsoft.com/office/drawing/2010/main" w="9525">
                 <a:solidFill>
                   <a:srgbClr val="000000"/>
@@ -2118,7 +2118,7 @@
   <p:timing>
     <p:tnLst>
       <p:par>
-        <p:cTn xmlns:p14="http://schemas.microsoft.com/office/powerpoint/2010/main" id="1" dur="indefinite" restart="never" nodeType="tmRoot"/>
+        <p:cTn id="1" dur="indefinite" restart="never" nodeType="tmRoot"/>
       </p:par>
     </p:tnLst>
   </p:timing>
@@ -2176,14 +2176,14 @@
             <a:noFill/>
           </a:ln>
           <a:extLst>
-            <a:ext uri="{909E8E84-426E-40dd-AFC4-6F175D3DCCD1}">
+            <a:ext uri="{909E8E84-426E-40DD-AFC4-6F175D3DCCD1}">
               <a14:hiddenFill xmlns:a14="http://schemas.microsoft.com/office/drawing/2010/main">
                 <a:solidFill>
                   <a:srgbClr val="FFFFFF"/>
                 </a:solidFill>
               </a14:hiddenFill>
             </a:ext>
-            <a:ext uri="{91240B29-F687-4f45-9708-019B960494DF}">
+            <a:ext uri="{91240B29-F687-4F45-9708-019B960494DF}">
               <a14:hiddenLine xmlns:a14="http://schemas.microsoft.com/office/drawing/2010/main" w="9525">
                 <a:solidFill>
                   <a:srgbClr val="000000"/>
@@ -2230,14 +2230,14 @@
             <a:noFill/>
           </a:ln>
           <a:extLst>
-            <a:ext uri="{909E8E84-426E-40dd-AFC4-6F175D3DCCD1}">
+            <a:ext uri="{909E8E84-426E-40DD-AFC4-6F175D3DCCD1}">
               <a14:hiddenFill xmlns:a14="http://schemas.microsoft.com/office/drawing/2010/main">
                 <a:solidFill>
                   <a:srgbClr val="FFFFFF"/>
                 </a:solidFill>
               </a14:hiddenFill>
             </a:ext>
-            <a:ext uri="{91240B29-F687-4f45-9708-019B960494DF}">
+            <a:ext uri="{91240B29-F687-4F45-9708-019B960494DF}">
               <a14:hiddenLine xmlns:a14="http://schemas.microsoft.com/office/drawing/2010/main" w="9525">
                 <a:solidFill>
                   <a:srgbClr val="000000"/>
@@ -2385,7 +2385,7 @@
   <p:timing>
     <p:tnLst>
       <p:par>
-        <p:cTn xmlns:p14="http://schemas.microsoft.com/office/powerpoint/2010/main" id="1" dur="indefinite" restart="never" nodeType="tmRoot"/>
+        <p:cTn id="1" dur="indefinite" restart="never" nodeType="tmRoot"/>
       </p:par>
     </p:tnLst>
   </p:timing>
@@ -2443,14 +2443,14 @@
             <a:noFill/>
           </a:ln>
           <a:extLst>
-            <a:ext uri="{909E8E84-426E-40dd-AFC4-6F175D3DCCD1}">
+            <a:ext uri="{909E8E84-426E-40DD-AFC4-6F175D3DCCD1}">
               <a14:hiddenFill xmlns:a14="http://schemas.microsoft.com/office/drawing/2010/main">
                 <a:solidFill>
                   <a:srgbClr val="FFFFFF"/>
                 </a:solidFill>
               </a14:hiddenFill>
             </a:ext>
-            <a:ext uri="{91240B29-F687-4f45-9708-019B960494DF}">
+            <a:ext uri="{91240B29-F687-4F45-9708-019B960494DF}">
               <a14:hiddenLine xmlns:a14="http://schemas.microsoft.com/office/drawing/2010/main" w="9525">
                 <a:solidFill>
                   <a:srgbClr val="000000"/>
@@ -2497,14 +2497,14 @@
             <a:noFill/>
           </a:ln>
           <a:extLst>
-            <a:ext uri="{909E8E84-426E-40dd-AFC4-6F175D3DCCD1}">
+            <a:ext uri="{909E8E84-426E-40DD-AFC4-6F175D3DCCD1}">
               <a14:hiddenFill xmlns:a14="http://schemas.microsoft.com/office/drawing/2010/main">
                 <a:solidFill>
                   <a:srgbClr val="FFFFFF"/>
                 </a:solidFill>
               </a14:hiddenFill>
             </a:ext>
-            <a:ext uri="{91240B29-F687-4f45-9708-019B960494DF}">
+            <a:ext uri="{91240B29-F687-4F45-9708-019B960494DF}">
               <a14:hiddenLine xmlns:a14="http://schemas.microsoft.com/office/drawing/2010/main" w="9525">
                 <a:solidFill>
                   <a:srgbClr val="000000"/>
@@ -2715,7 +2715,7 @@
   <p:timing>
     <p:tnLst>
       <p:par>
-        <p:cTn xmlns:p14="http://schemas.microsoft.com/office/powerpoint/2010/main" id="1" dur="indefinite" restart="never" nodeType="tmRoot"/>
+        <p:cTn id="1" dur="indefinite" restart="never" nodeType="tmRoot"/>
       </p:par>
     </p:tnLst>
   </p:timing>
@@ -2904,7 +2904,7 @@
   <p:timing>
     <p:tnLst>
       <p:par>
-        <p:cTn xmlns:p14="http://schemas.microsoft.com/office/powerpoint/2010/main" id="1" dur="indefinite" restart="never" nodeType="tmRoot"/>
+        <p:cTn id="1" dur="indefinite" restart="never" nodeType="tmRoot"/>
       </p:par>
     </p:tnLst>
   </p:timing>
@@ -3096,7 +3096,7 @@
   <p:timing>
     <p:tnLst>
       <p:par>
-        <p:cTn xmlns:p14="http://schemas.microsoft.com/office/powerpoint/2010/main" id="1" dur="indefinite" restart="never" nodeType="tmRoot"/>
+        <p:cTn id="1" dur="indefinite" restart="never" nodeType="tmRoot"/>
       </p:par>
     </p:tnLst>
   </p:timing>
@@ -3503,7 +3503,7 @@
   <p:timing>
     <p:tnLst>
       <p:par>
-        <p:cTn xmlns:p14="http://schemas.microsoft.com/office/powerpoint/2010/main" id="1" dur="indefinite" restart="never" nodeType="tmRoot">
+        <p:cTn id="1" dur="indefinite" restart="never" nodeType="tmRoot">
           <p:childTnLst>
             <p:seq concurrent="1" nextAc="seek">
               <p:cTn id="2" dur="indefinite" nodeType="mainSeq">
@@ -3635,7 +3635,7 @@
           <p:tmpl lvl="1">
             <p:tnLst>
               <p:par>
-                <p:cTn xmlns:p14="http://schemas.microsoft.com/office/powerpoint/2010/main" presetID="10" presetClass="entr" presetSubtype="0" fill="hold" nodeType="withEffect">
+                <p:cTn presetID="10" presetClass="entr" presetSubtype="0" fill="hold" nodeType="withEffect">
                   <p:stCondLst>
                     <p:cond delay="1000"/>
                   </p:stCondLst>
@@ -3863,7 +3863,7 @@
   <p:timing>
     <p:tnLst>
       <p:par>
-        <p:cTn xmlns:p14="http://schemas.microsoft.com/office/powerpoint/2010/main" id="1" dur="indefinite" restart="never" nodeType="tmRoot"/>
+        <p:cTn id="1" dur="indefinite" restart="never" nodeType="tmRoot"/>
       </p:par>
     </p:tnLst>
   </p:timing>
@@ -4221,7 +4221,7 @@
   <p:timing>
     <p:tnLst>
       <p:par>
-        <p:cTn xmlns:p14="http://schemas.microsoft.com/office/powerpoint/2010/main" id="1" dur="indefinite" restart="never" nodeType="tmRoot">
+        <p:cTn id="1" dur="indefinite" restart="never" nodeType="tmRoot">
           <p:childTnLst>
             <p:seq concurrent="1" nextAc="seek">
               <p:cTn id="2" dur="indefinite" nodeType="mainSeq">
@@ -4353,7 +4353,7 @@
           <p:tmpl lvl="1">
             <p:tnLst>
               <p:par>
-                <p:cTn xmlns:p14="http://schemas.microsoft.com/office/powerpoint/2010/main" presetID="10" presetClass="entr" presetSubtype="0" fill="hold" nodeType="withEffect">
+                <p:cTn presetID="10" presetClass="entr" presetSubtype="0" fill="hold" nodeType="withEffect">
                   <p:stCondLst>
                     <p:cond delay="1000"/>
                   </p:stCondLst>
@@ -4604,7 +4604,7 @@
   <p:timing>
     <p:tnLst>
       <p:par>
-        <p:cTn xmlns:p14="http://schemas.microsoft.com/office/powerpoint/2010/main" id="1" dur="indefinite" restart="never" nodeType="tmRoot"/>
+        <p:cTn id="1" dur="indefinite" restart="never" nodeType="tmRoot"/>
       </p:par>
     </p:tnLst>
   </p:timing>
@@ -4845,7 +4845,7 @@
   <p:timing>
     <p:tnLst>
       <p:par>
-        <p:cTn xmlns:p14="http://schemas.microsoft.com/office/powerpoint/2010/main" id="1" dur="indefinite" restart="never" nodeType="tmRoot"/>
+        <p:cTn id="1" dur="indefinite" restart="never" nodeType="tmRoot"/>
       </p:par>
     </p:tnLst>
   </p:timing>
@@ -5054,7 +5054,7 @@
   <p:timing>
     <p:tnLst>
       <p:par>
-        <p:cTn xmlns:p14="http://schemas.microsoft.com/office/powerpoint/2010/main" id="1" dur="indefinite" restart="never" nodeType="tmRoot"/>
+        <p:cTn id="1" dur="indefinite" restart="never" nodeType="tmRoot"/>
       </p:par>
     </p:tnLst>
   </p:timing>
@@ -5301,7 +5301,7 @@
   <p:timing>
     <p:tnLst>
       <p:par>
-        <p:cTn xmlns:p14="http://schemas.microsoft.com/office/powerpoint/2010/main" id="1" dur="indefinite" restart="never" nodeType="tmRoot"/>
+        <p:cTn id="1" dur="indefinite" restart="never" nodeType="tmRoot"/>
       </p:par>
     </p:tnLst>
   </p:timing>
@@ -5531,7 +5531,7 @@
   <p:timing>
     <p:tnLst>
       <p:par>
-        <p:cTn xmlns:p14="http://schemas.microsoft.com/office/powerpoint/2010/main" id="1" dur="indefinite" restart="never" nodeType="tmRoot"/>
+        <p:cTn id="1" dur="indefinite" restart="never" nodeType="tmRoot"/>
       </p:par>
     </p:tnLst>
   </p:timing>
@@ -5843,7 +5843,7 @@
   <p:timing>
     <p:tnLst>
       <p:par>
-        <p:cTn xmlns:p14="http://schemas.microsoft.com/office/powerpoint/2010/main" id="1" dur="indefinite" restart="never" nodeType="tmRoot"/>
+        <p:cTn id="1" dur="indefinite" restart="never" nodeType="tmRoot"/>
       </p:par>
     </p:tnLst>
   </p:timing>
@@ -6142,7 +6142,7 @@
   <p:timing>
     <p:tnLst>
       <p:par>
-        <p:cTn xmlns:p14="http://schemas.microsoft.com/office/powerpoint/2010/main" id="1" dur="indefinite" restart="never" nodeType="tmRoot"/>
+        <p:cTn id="1" dur="indefinite" restart="never" nodeType="tmRoot"/>
       </p:par>
     </p:tnLst>
   </p:timing>
@@ -6368,7 +6368,7 @@
   <p:timing>
     <p:tnLst>
       <p:par>
-        <p:cTn xmlns:p14="http://schemas.microsoft.com/office/powerpoint/2010/main" id="1" dur="indefinite" restart="never" nodeType="tmRoot"/>
+        <p:cTn id="1" dur="indefinite" restart="never" nodeType="tmRoot"/>
       </p:par>
     </p:tnLst>
   </p:timing>
@@ -6426,14 +6426,14 @@
             <a:noFill/>
           </a:ln>
           <a:extLst>
-            <a:ext uri="{909E8E84-426E-40dd-AFC4-6F175D3DCCD1}">
+            <a:ext uri="{909E8E84-426E-40DD-AFC4-6F175D3DCCD1}">
               <a14:hiddenFill xmlns:a14="http://schemas.microsoft.com/office/drawing/2010/main">
                 <a:solidFill>
                   <a:srgbClr val="FFFFFF"/>
                 </a:solidFill>
               </a14:hiddenFill>
             </a:ext>
-            <a:ext uri="{91240B29-F687-4f45-9708-019B960494DF}">
+            <a:ext uri="{91240B29-F687-4F45-9708-019B960494DF}">
               <a14:hiddenLine xmlns:a14="http://schemas.microsoft.com/office/drawing/2010/main" w="9525">
                 <a:solidFill>
                   <a:srgbClr val="000000"/>
@@ -6501,7 +6501,7 @@
   <p:timing>
     <p:tnLst>
       <p:par>
-        <p:cTn xmlns:p14="http://schemas.microsoft.com/office/powerpoint/2010/main" id="1" dur="indefinite" restart="never" nodeType="tmRoot"/>
+        <p:cTn id="1" dur="indefinite" restart="never" nodeType="tmRoot"/>
       </p:par>
     </p:tnLst>
   </p:timing>
@@ -6908,7 +6908,7 @@
   <p:timing>
     <p:tnLst>
       <p:par>
-        <p:cTn xmlns:p14="http://schemas.microsoft.com/office/powerpoint/2010/main" id="1" dur="indefinite" restart="never" nodeType="tmRoot">
+        <p:cTn id="1" dur="indefinite" restart="never" nodeType="tmRoot">
           <p:childTnLst>
             <p:seq concurrent="1" nextAc="seek">
               <p:cTn id="2" dur="indefinite" nodeType="mainSeq">
@@ -7040,7 +7040,7 @@
           <p:tmpl lvl="1">
             <p:tnLst>
               <p:par>
-                <p:cTn xmlns:p14="http://schemas.microsoft.com/office/powerpoint/2010/main" presetID="10" presetClass="entr" presetSubtype="0" fill="hold" nodeType="withEffect">
+                <p:cTn presetID="10" presetClass="entr" presetSubtype="0" fill="hold" nodeType="withEffect">
                   <p:stCondLst>
                     <p:cond delay="1000"/>
                   </p:stCondLst>
@@ -7134,14 +7134,14 @@
             <a:noFill/>
           </a:ln>
           <a:extLst>
-            <a:ext uri="{909E8E84-426E-40dd-AFC4-6F175D3DCCD1}">
+            <a:ext uri="{909E8E84-426E-40DD-AFC4-6F175D3DCCD1}">
               <a14:hiddenFill xmlns:a14="http://schemas.microsoft.com/office/drawing/2010/main">
                 <a:solidFill>
                   <a:srgbClr val="FFFFFF"/>
                 </a:solidFill>
               </a14:hiddenFill>
             </a:ext>
-            <a:ext uri="{91240B29-F687-4f45-9708-019B960494DF}">
+            <a:ext uri="{91240B29-F687-4F45-9708-019B960494DF}">
               <a14:hiddenLine xmlns:a14="http://schemas.microsoft.com/office/drawing/2010/main" w="9525">
                 <a:solidFill>
                   <a:srgbClr val="000000"/>
@@ -7188,14 +7188,14 @@
             <a:noFill/>
           </a:ln>
           <a:extLst>
-            <a:ext uri="{909E8E84-426E-40dd-AFC4-6F175D3DCCD1}">
+            <a:ext uri="{909E8E84-426E-40DD-AFC4-6F175D3DCCD1}">
               <a14:hiddenFill xmlns:a14="http://schemas.microsoft.com/office/drawing/2010/main">
                 <a:solidFill>
                   <a:srgbClr val="FFFFFF"/>
                 </a:solidFill>
               </a14:hiddenFill>
             </a:ext>
-            <a:ext uri="{91240B29-F687-4f45-9708-019B960494DF}">
+            <a:ext uri="{91240B29-F687-4F45-9708-019B960494DF}">
               <a14:hiddenLine xmlns:a14="http://schemas.microsoft.com/office/drawing/2010/main" w="9525">
                 <a:solidFill>
                   <a:srgbClr val="000000"/>
@@ -7279,7 +7279,7 @@
   <p:timing>
     <p:tnLst>
       <p:par>
-        <p:cTn xmlns:p14="http://schemas.microsoft.com/office/powerpoint/2010/main" id="1" dur="indefinite" restart="never" nodeType="tmRoot"/>
+        <p:cTn id="1" dur="indefinite" restart="never" nodeType="tmRoot"/>
       </p:par>
     </p:tnLst>
   </p:timing>
@@ -7337,14 +7337,14 @@
             <a:noFill/>
           </a:ln>
           <a:extLst>
-            <a:ext uri="{909E8E84-426E-40dd-AFC4-6F175D3DCCD1}">
+            <a:ext uri="{909E8E84-426E-40DD-AFC4-6F175D3DCCD1}">
               <a14:hiddenFill xmlns:a14="http://schemas.microsoft.com/office/drawing/2010/main">
                 <a:solidFill>
                   <a:srgbClr val="FFFFFF"/>
                 </a:solidFill>
               </a14:hiddenFill>
             </a:ext>
-            <a:ext uri="{91240B29-F687-4f45-9708-019B960494DF}">
+            <a:ext uri="{91240B29-F687-4F45-9708-019B960494DF}">
               <a14:hiddenLine xmlns:a14="http://schemas.microsoft.com/office/drawing/2010/main" w="9525">
                 <a:solidFill>
                   <a:srgbClr val="000000"/>
@@ -7391,14 +7391,14 @@
             <a:noFill/>
           </a:ln>
           <a:extLst>
-            <a:ext uri="{909E8E84-426E-40dd-AFC4-6F175D3DCCD1}">
+            <a:ext uri="{909E8E84-426E-40DD-AFC4-6F175D3DCCD1}">
               <a14:hiddenFill xmlns:a14="http://schemas.microsoft.com/office/drawing/2010/main">
                 <a:solidFill>
                   <a:srgbClr val="FFFFFF"/>
                 </a:solidFill>
               </a14:hiddenFill>
             </a:ext>
-            <a:ext uri="{91240B29-F687-4f45-9708-019B960494DF}">
+            <a:ext uri="{91240B29-F687-4F45-9708-019B960494DF}">
               <a14:hiddenLine xmlns:a14="http://schemas.microsoft.com/office/drawing/2010/main" w="9525">
                 <a:solidFill>
                   <a:srgbClr val="000000"/>
@@ -7546,7 +7546,7 @@
   <p:timing>
     <p:tnLst>
       <p:par>
-        <p:cTn xmlns:p14="http://schemas.microsoft.com/office/powerpoint/2010/main" id="1" dur="indefinite" restart="never" nodeType="tmRoot"/>
+        <p:cTn id="1" dur="indefinite" restart="never" nodeType="tmRoot"/>
       </p:par>
     </p:tnLst>
   </p:timing>
@@ -7604,14 +7604,14 @@
             <a:noFill/>
           </a:ln>
           <a:extLst>
-            <a:ext uri="{909E8E84-426E-40dd-AFC4-6F175D3DCCD1}">
+            <a:ext uri="{909E8E84-426E-40DD-AFC4-6F175D3DCCD1}">
               <a14:hiddenFill xmlns:a14="http://schemas.microsoft.com/office/drawing/2010/main">
                 <a:solidFill>
                   <a:srgbClr val="FFFFFF"/>
                 </a:solidFill>
               </a14:hiddenFill>
             </a:ext>
-            <a:ext uri="{91240B29-F687-4f45-9708-019B960494DF}">
+            <a:ext uri="{91240B29-F687-4F45-9708-019B960494DF}">
               <a14:hiddenLine xmlns:a14="http://schemas.microsoft.com/office/drawing/2010/main" w="9525">
                 <a:solidFill>
                   <a:srgbClr val="000000"/>
@@ -7658,14 +7658,14 @@
             <a:noFill/>
           </a:ln>
           <a:extLst>
-            <a:ext uri="{909E8E84-426E-40dd-AFC4-6F175D3DCCD1}">
+            <a:ext uri="{909E8E84-426E-40DD-AFC4-6F175D3DCCD1}">
               <a14:hiddenFill xmlns:a14="http://schemas.microsoft.com/office/drawing/2010/main">
                 <a:solidFill>
                   <a:srgbClr val="FFFFFF"/>
                 </a:solidFill>
               </a14:hiddenFill>
             </a:ext>
-            <a:ext uri="{91240B29-F687-4f45-9708-019B960494DF}">
+            <a:ext uri="{91240B29-F687-4F45-9708-019B960494DF}">
               <a14:hiddenLine xmlns:a14="http://schemas.microsoft.com/office/drawing/2010/main" w="9525">
                 <a:solidFill>
                   <a:srgbClr val="000000"/>
@@ -7876,7 +7876,7 @@
   <p:timing>
     <p:tnLst>
       <p:par>
-        <p:cTn xmlns:p14="http://schemas.microsoft.com/office/powerpoint/2010/main" id="1" dur="indefinite" restart="never" nodeType="tmRoot"/>
+        <p:cTn id="1" dur="indefinite" restart="never" nodeType="tmRoot"/>
       </p:par>
     </p:tnLst>
   </p:timing>
@@ -8234,7 +8234,7 @@
   <p:timing>
     <p:tnLst>
       <p:par>
-        <p:cTn xmlns:p14="http://schemas.microsoft.com/office/powerpoint/2010/main" id="1" dur="indefinite" restart="never" nodeType="tmRoot">
+        <p:cTn id="1" dur="indefinite" restart="never" nodeType="tmRoot">
           <p:childTnLst>
             <p:seq concurrent="1" nextAc="seek">
               <p:cTn id="2" dur="indefinite" nodeType="mainSeq">
@@ -8366,7 +8366,7 @@
           <p:tmpl lvl="1">
             <p:tnLst>
               <p:par>
-                <p:cTn xmlns:p14="http://schemas.microsoft.com/office/powerpoint/2010/main" presetID="10" presetClass="entr" presetSubtype="0" fill="hold" nodeType="withEffect">
+                <p:cTn presetID="10" presetClass="entr" presetSubtype="0" fill="hold" nodeType="withEffect">
                   <p:stCondLst>
                     <p:cond delay="1000"/>
                   </p:stCondLst>
@@ -8617,7 +8617,7 @@
   <p:timing>
     <p:tnLst>
       <p:par>
-        <p:cTn xmlns:p14="http://schemas.microsoft.com/office/powerpoint/2010/main" id="1" dur="indefinite" restart="never" nodeType="tmRoot"/>
+        <p:cTn id="1" dur="indefinite" restart="never" nodeType="tmRoot"/>
       </p:par>
     </p:tnLst>
   </p:timing>
@@ -8858,7 +8858,7 @@
   <p:timing>
     <p:tnLst>
       <p:par>
-        <p:cTn xmlns:p14="http://schemas.microsoft.com/office/powerpoint/2010/main" id="1" dur="indefinite" restart="never" nodeType="tmRoot"/>
+        <p:cTn id="1" dur="indefinite" restart="never" nodeType="tmRoot"/>
       </p:par>
     </p:tnLst>
   </p:timing>
@@ -9067,7 +9067,7 @@
   <p:timing>
     <p:tnLst>
       <p:par>
-        <p:cTn xmlns:p14="http://schemas.microsoft.com/office/powerpoint/2010/main" id="1" dur="indefinite" restart="never" nodeType="tmRoot"/>
+        <p:cTn id="1" dur="indefinite" restart="never" nodeType="tmRoot"/>
       </p:par>
     </p:tnLst>
   </p:timing>
@@ -9314,7 +9314,7 @@
   <p:timing>
     <p:tnLst>
       <p:par>
-        <p:cTn xmlns:p14="http://schemas.microsoft.com/office/powerpoint/2010/main" id="1" dur="indefinite" restart="never" nodeType="tmRoot"/>
+        <p:cTn id="1" dur="indefinite" restart="never" nodeType="tmRoot"/>
       </p:par>
     </p:tnLst>
   </p:timing>
@@ -9544,7 +9544,7 @@
   <p:timing>
     <p:tnLst>
       <p:par>
-        <p:cTn xmlns:p14="http://schemas.microsoft.com/office/powerpoint/2010/main" id="1" dur="indefinite" restart="never" nodeType="tmRoot"/>
+        <p:cTn id="1" dur="indefinite" restart="never" nodeType="tmRoot"/>
       </p:par>
     </p:tnLst>
   </p:timing>
@@ -9727,14 +9727,14 @@
               <a:noFill/>
             </a:ln>
             <a:extLst>
-              <a:ext uri="{909E8E84-426E-40dd-AFC4-6F175D3DCCD1}">
+              <a:ext uri="{909E8E84-426E-40DD-AFC4-6F175D3DCCD1}">
                 <a14:hiddenFill xmlns:a14="http://schemas.microsoft.com/office/drawing/2010/main">
                   <a:solidFill>
                     <a:srgbClr val="FFFFFF"/>
                   </a:solidFill>
                 </a14:hiddenFill>
               </a:ext>
-              <a:ext uri="{91240B29-F687-4f45-9708-019B960494DF}">
+              <a:ext uri="{91240B29-F687-4F45-9708-019B960494DF}">
                 <a14:hiddenLine xmlns:a14="http://schemas.microsoft.com/office/drawing/2010/main" w="9525">
                   <a:solidFill>
                     <a:srgbClr val="000000"/>
@@ -10070,7 +10070,7 @@
             </a:prstGeom>
             <a:noFill/>
             <a:extLst>
-              <a:ext uri="{909E8E84-426E-40dd-AFC4-6F175D3DCCD1}">
+              <a:ext uri="{909E8E84-426E-40DD-AFC4-6F175D3DCCD1}">
                 <a14:hiddenFill xmlns:a14="http://schemas.microsoft.com/office/drawing/2010/main">
                   <a:solidFill>
                     <a:srgbClr val="FFFFFF"/>
@@ -10152,7 +10152,7 @@
   <p:timing>
     <p:tnLst>
       <p:par>
-        <p:cTn xmlns:p14="http://schemas.microsoft.com/office/powerpoint/2010/main" id="1" dur="indefinite" restart="never" nodeType="tmRoot"/>
+        <p:cTn id="1" dur="indefinite" restart="never" nodeType="tmRoot"/>
       </p:par>
     </p:tnLst>
   </p:timing>
@@ -10618,14 +10618,14 @@
               <a:noFill/>
             </a:ln>
             <a:extLst>
-              <a:ext uri="{909E8E84-426E-40dd-AFC4-6F175D3DCCD1}">
+              <a:ext uri="{909E8E84-426E-40DD-AFC4-6F175D3DCCD1}">
                 <a14:hiddenFill xmlns:a14="http://schemas.microsoft.com/office/drawing/2010/main">
                   <a:solidFill>
                     <a:srgbClr val="FFFFFF"/>
                   </a:solidFill>
                 </a14:hiddenFill>
               </a:ext>
-              <a:ext uri="{91240B29-F687-4f45-9708-019B960494DF}">
+              <a:ext uri="{91240B29-F687-4F45-9708-019B960494DF}">
                 <a14:hiddenLine xmlns:a14="http://schemas.microsoft.com/office/drawing/2010/main" w="9525">
                   <a:solidFill>
                     <a:srgbClr val="000000"/>
@@ -10961,7 +10961,7 @@
             </a:prstGeom>
             <a:noFill/>
             <a:extLst>
-              <a:ext uri="{909E8E84-426E-40dd-AFC4-6F175D3DCCD1}">
+              <a:ext uri="{909E8E84-426E-40DD-AFC4-6F175D3DCCD1}">
                 <a14:hiddenFill xmlns:a14="http://schemas.microsoft.com/office/drawing/2010/main">
                   <a:solidFill>
                     <a:srgbClr val="FFFFFF"/>
@@ -11043,7 +11043,7 @@
   <p:timing>
     <p:tnLst>
       <p:par>
-        <p:cTn xmlns:p14="http://schemas.microsoft.com/office/powerpoint/2010/main" id="1" dur="indefinite" restart="never" nodeType="tmRoot"/>
+        <p:cTn id="1" dur="indefinite" restart="never" nodeType="tmRoot"/>
       </p:par>
     </p:tnLst>
   </p:timing>
@@ -11456,7 +11456,7 @@
   <p:timing>
     <p:tnLst>
       <p:par>
-        <p:cTn xmlns:p14="http://schemas.microsoft.com/office/powerpoint/2010/main" id="1" dur="indefinite" restart="never" nodeType="tmRoot"/>
+        <p:cTn id="1" dur="indefinite" restart="never" nodeType="tmRoot"/>
       </p:par>
     </p:tnLst>
   </p:timing>
@@ -11653,7 +11653,7 @@
   <p:timing>
     <p:tnLst>
       <p:par>
-        <p:cTn xmlns:p14="http://schemas.microsoft.com/office/powerpoint/2010/main" id="1" dur="indefinite" restart="never" nodeType="tmRoot"/>
+        <p:cTn id="1" dur="indefinite" restart="never" nodeType="tmRoot"/>
       </p:par>
     </p:tnLst>
   </p:timing>
@@ -11700,7 +11700,27 @@
             </a:r>
             <a:r>
               <a:rPr lang="en-US" dirty="0" smtClean="0"/>
-              <a:t>Resource Libraries Contracts usage, switching them using EL and ManagedBean, changing PrimeFaces layout using the RLCs.</a:t>
+              <a:t>Resource Libraries Contracts usage, switching </a:t>
+            </a:r>
+            <a:r>
+              <a:rPr lang="en-US" dirty="0" smtClean="0"/>
+              <a:t>RLCs </a:t>
+            </a:r>
+            <a:r>
+              <a:rPr lang="en-US" dirty="0" smtClean="0"/>
+              <a:t>dynamically using Expression </a:t>
+            </a:r>
+            <a:r>
+              <a:rPr lang="en-US" dirty="0" smtClean="0"/>
+              <a:t>Language </a:t>
+            </a:r>
+            <a:r>
+              <a:rPr lang="en-US" dirty="0" smtClean="0"/>
+              <a:t>and </a:t>
+            </a:r>
+            <a:r>
+              <a:rPr lang="en-US" dirty="0" smtClean="0"/>
+              <a:t>ManagedBean.</a:t>
             </a:r>
             <a:endParaRPr lang="en-US" dirty="0"/>
           </a:p>
@@ -11809,7 +11829,7 @@
   <p:timing>
     <p:tnLst>
       <p:par>
-        <p:cTn xmlns:p14="http://schemas.microsoft.com/office/powerpoint/2010/main" id="1" dur="indefinite" restart="never" nodeType="tmRoot"/>
+        <p:cTn id="1" dur="indefinite" restart="never" nodeType="tmRoot"/>
       </p:par>
     </p:tnLst>
   </p:timing>
@@ -11881,7 +11901,7 @@
   <p:timing>
     <p:tnLst>
       <p:par>
-        <p:cTn xmlns:p14="http://schemas.microsoft.com/office/powerpoint/2010/main" id="1" dur="indefinite" restart="never" nodeType="tmRoot"/>
+        <p:cTn id="1" dur="indefinite" restart="never" nodeType="tmRoot"/>
       </p:par>
     </p:tnLst>
   </p:timing>
@@ -11999,12 +12019,8 @@
           <a:p>
             <a:pPr lvl="1" fontAlgn="base"/>
             <a:r>
-              <a:rPr lang="en-US" dirty="0" smtClean="0"/>
-              <a:t>Operators (</a:t>
-            </a:r>
-            <a:r>
               <a:rPr lang="en-US" dirty="0"/>
-              <a:t>aligned with Java SE 8</a:t>
+              <a:t>Collection Operations (aligned with Java SE 8</a:t>
             </a:r>
             <a:r>
               <a:rPr lang="en-US" dirty="0" smtClean="0"/>
@@ -12015,7 +12031,7 @@
             <a:pPr lvl="1" fontAlgn="base"/>
             <a:r>
               <a:rPr lang="en-US" dirty="0" smtClean="0"/>
-              <a:t>Lambda</a:t>
+              <a:t>Lambda Expressions</a:t>
             </a:r>
             <a:endParaRPr lang="en-US" dirty="0"/>
           </a:p>
@@ -12069,7 +12085,7 @@
   <p:timing>
     <p:tnLst>
       <p:par>
-        <p:cTn xmlns:p14="http://schemas.microsoft.com/office/powerpoint/2010/main" id="1" dur="indefinite" restart="never" nodeType="tmRoot"/>
+        <p:cTn id="1" dur="indefinite" restart="never" nodeType="tmRoot"/>
       </p:par>
     </p:tnLst>
   </p:timing>
@@ -12112,11 +12128,12 @@
           <a:p>
             <a:r>
               <a:rPr lang="en-US" dirty="0" smtClean="0"/>
-              <a:t>Examples of Expression Language 3.0 features: collections, lambdas, opperators, assignments, imported classes and their usage, defined functions.</a:t>
-            </a:r>
-            <a:endParaRPr lang="en-US" dirty="0"/>
-          </a:p>
-          <a:p>
+              <a:t>Examples of Expression Language 3.0 features: </a:t>
+            </a:r>
+            <a:r>
+              <a:rPr lang="en-US" dirty="0"/>
+              <a:t>standalone EL Processor, opperators, static fields, collections, lambdas and collection operations.</a:t>
+            </a:r>
             <a:endParaRPr lang="en-US" dirty="0" smtClean="0"/>
           </a:p>
           <a:p>
@@ -12221,7 +12238,7 @@
   <p:timing>
     <p:tnLst>
       <p:par>
-        <p:cTn xmlns:p14="http://schemas.microsoft.com/office/powerpoint/2010/main" id="1" dur="indefinite" restart="never" nodeType="tmRoot"/>
+        <p:cTn id="1" dur="indefinite" restart="never" nodeType="tmRoot"/>
       </p:par>
     </p:tnLst>
   </p:timing>
@@ -12296,7 +12313,7 @@
   <p:timing>
     <p:tnLst>
       <p:par>
-        <p:cTn xmlns:p14="http://schemas.microsoft.com/office/powerpoint/2010/main" id="1" dur="indefinite" restart="never" nodeType="tmRoot"/>
+        <p:cTn id="1" dur="indefinite" restart="never" nodeType="tmRoot"/>
       </p:par>
     </p:tnLst>
   </p:timing>
@@ -12474,7 +12491,7 @@
   <p:timing>
     <p:tnLst>
       <p:par>
-        <p:cTn xmlns:p14="http://schemas.microsoft.com/office/powerpoint/2010/main" id="1" dur="indefinite" restart="never" nodeType="tmRoot"/>
+        <p:cTn id="1" dur="indefinite" restart="never" nodeType="tmRoot"/>
       </p:par>
     </p:tnLst>
   </p:timing>
@@ -12517,38 +12534,30 @@
           <a:p>
             <a:r>
               <a:rPr lang="en-US" dirty="0" smtClean="0"/>
-              <a:t>Examples on advanced UI components: </a:t>
+              <a:t>Examples on advanced UI </a:t>
+            </a:r>
+            <a:r>
+              <a:rPr lang="en-US" dirty="0" smtClean="0"/>
+              <a:t>components:</a:t>
             </a:r>
             <a:br>
               <a:rPr lang="en-US" dirty="0" smtClean="0"/>
             </a:br>
             <a:r>
               <a:rPr lang="en-US" dirty="0" smtClean="0"/>
-              <a:t>	</a:t>
-            </a:r>
-            <a:r>
-              <a:rPr lang="en-US" dirty="0" err="1" smtClean="0"/>
               <a:t>DataTable</a:t>
             </a:r>
             <a:r>
               <a:rPr lang="en-US" dirty="0" smtClean="0"/>
-              <a:t>, </a:t>
-            </a:r>
-            <a:r>
-              <a:rPr lang="en-US" dirty="0" err="1" smtClean="0"/>
-              <a:t>Gmap</a:t>
-            </a:r>
-            <a:r>
-              <a:rPr lang="en-US" dirty="0" smtClean="0"/>
-              <a:t>, AutoComplete, </a:t>
-            </a:r>
-            <a:r>
-              <a:rPr lang="en-US" dirty="0" err="1" smtClean="0"/>
-              <a:t>PickList</a:t>
-            </a:r>
-            <a:r>
-              <a:rPr lang="en-US" dirty="0" smtClean="0"/>
-              <a:t> and many others…</a:t>
+              <a:t>, Gmap, AutoComplete, PickList and </a:t>
+            </a:r>
+            <a:r>
+              <a:rPr lang="en-US" dirty="0" smtClean="0"/>
+              <a:t>many others</a:t>
+            </a:r>
+            <a:r>
+              <a:rPr lang="en-US" dirty="0" smtClean="0"/>
+              <a:t>…</a:t>
             </a:r>
           </a:p>
         </p:txBody>
@@ -12665,7 +12674,7 @@
   <p:timing>
     <p:tnLst>
       <p:par>
-        <p:cTn xmlns:p14="http://schemas.microsoft.com/office/powerpoint/2010/main" id="1" dur="indefinite" restart="never" nodeType="tmRoot"/>
+        <p:cTn id="1" dur="indefinite" restart="never" nodeType="tmRoot"/>
       </p:par>
     </p:tnLst>
   </p:timing>
@@ -12748,7 +12757,7 @@
   <p:timing>
     <p:tnLst>
       <p:par>
-        <p:cTn xmlns:p14="http://schemas.microsoft.com/office/powerpoint/2010/main" id="1" dur="indefinite" restart="never" nodeType="tmRoot"/>
+        <p:cTn id="1" dur="indefinite" restart="never" nodeType="tmRoot"/>
       </p:par>
     </p:tnLst>
   </p:timing>
@@ -12896,7 +12905,7 @@
   <p:timing>
     <p:tnLst>
       <p:par>
-        <p:cTn xmlns:p14="http://schemas.microsoft.com/office/powerpoint/2010/main" id="1" dur="indefinite" restart="never" nodeType="tmRoot"/>
+        <p:cTn id="1" dur="indefinite" restart="never" nodeType="tmRoot"/>
       </p:par>
     </p:tnLst>
   </p:timing>
@@ -12986,14 +12995,23 @@
             <a:pPr lvl="1"/>
             <a:r>
               <a:rPr lang="en-US" dirty="0" smtClean="0"/>
-              <a:t>Feature description</a:t>
-            </a:r>
+              <a:t>Feature </a:t>
+            </a:r>
+            <a:r>
+              <a:rPr lang="en-US" dirty="0" smtClean="0"/>
+              <a:t>overview</a:t>
+            </a:r>
+            <a:endParaRPr lang="en-US" dirty="0" smtClean="0"/>
           </a:p>
           <a:p>
             <a:pPr lvl="1"/>
             <a:r>
               <a:rPr lang="en-US" dirty="0" smtClean="0"/>
-              <a:t>Basic and advance samples in action</a:t>
+              <a:t>Samples in </a:t>
+            </a:r>
+            <a:r>
+              <a:rPr lang="en-US" dirty="0" smtClean="0"/>
+              <a:t>action</a:t>
             </a:r>
           </a:p>
         </p:txBody>
@@ -13023,7 +13041,7 @@
   <p:timing>
     <p:tnLst>
       <p:par>
-        <p:cTn xmlns:p14="http://schemas.microsoft.com/office/powerpoint/2010/main" id="1" dur="indefinite" restart="never" nodeType="tmRoot"/>
+        <p:cTn id="1" dur="indefinite" restart="never" nodeType="tmRoot"/>
       </p:par>
     </p:tnLst>
   </p:timing>
@@ -13375,7 +13393,7 @@
   <p:timing>
     <p:tnLst>
       <p:par>
-        <p:cTn xmlns:p14="http://schemas.microsoft.com/office/powerpoint/2010/main" id="1" dur="indefinite" restart="never" nodeType="tmRoot"/>
+        <p:cTn id="1" dur="indefinite" restart="never" nodeType="tmRoot"/>
       </p:par>
     </p:tnLst>
   </p:timing>
@@ -13450,7 +13468,7 @@
   <p:timing>
     <p:tnLst>
       <p:par>
-        <p:cTn xmlns:p14="http://schemas.microsoft.com/office/powerpoint/2010/main" id="1" dur="indefinite" restart="never" nodeType="tmRoot"/>
+        <p:cTn id="1" dur="indefinite" restart="never" nodeType="tmRoot"/>
       </p:par>
     </p:tnLst>
   </p:timing>
@@ -13686,7 +13704,7 @@
   <p:timing>
     <p:tnLst>
       <p:par>
-        <p:cTn xmlns:p14="http://schemas.microsoft.com/office/powerpoint/2010/main" id="1" dur="indefinite" restart="never" nodeType="tmRoot"/>
+        <p:cTn id="1" dur="indefinite" restart="never" nodeType="tmRoot"/>
       </p:par>
     </p:tnLst>
   </p:timing>
@@ -14056,7 +14074,7 @@
   <p:timing>
     <p:tnLst>
       <p:par>
-        <p:cTn xmlns:p14="http://schemas.microsoft.com/office/powerpoint/2010/main" id="1" dur="indefinite" restart="never" nodeType="tmRoot"/>
+        <p:cTn id="1" dur="indefinite" restart="never" nodeType="tmRoot"/>
       </p:par>
     </p:tnLst>
   </p:timing>
@@ -14128,7 +14146,7 @@
   <p:timing>
     <p:tnLst>
       <p:par>
-        <p:cTn xmlns:p14="http://schemas.microsoft.com/office/powerpoint/2010/main" id="1" dur="indefinite" restart="never" nodeType="tmRoot"/>
+        <p:cTn id="1" dur="indefinite" restart="never" nodeType="tmRoot"/>
       </p:par>
     </p:tnLst>
   </p:timing>
@@ -14311,7 +14329,7 @@
   <p:timing>
     <p:tnLst>
       <p:par>
-        <p:cTn xmlns:p14="http://schemas.microsoft.com/office/powerpoint/2010/main" id="1" dur="indefinite" restart="never" nodeType="tmRoot"/>
+        <p:cTn id="1" dur="indefinite" restart="never" nodeType="tmRoot"/>
       </p:par>
     </p:tnLst>
   </p:timing>
@@ -14459,7 +14477,7 @@
   <p:timing>
     <p:tnLst>
       <p:par>
-        <p:cTn xmlns:p14="http://schemas.microsoft.com/office/powerpoint/2010/main" id="1" dur="indefinite" restart="never" nodeType="tmRoot"/>
+        <p:cTn id="1" dur="indefinite" restart="never" nodeType="tmRoot"/>
       </p:par>
     </p:tnLst>
   </p:timing>
@@ -14531,7 +14549,7 @@
   <p:timing>
     <p:tnLst>
       <p:par>
-        <p:cTn xmlns:p14="http://schemas.microsoft.com/office/powerpoint/2010/main" id="1" dur="indefinite" restart="never" nodeType="tmRoot"/>
+        <p:cTn id="1" dur="indefinite" restart="never" nodeType="tmRoot"/>
       </p:par>
     </p:tnLst>
   </p:timing>
@@ -14598,27 +14616,54 @@
               <a:t>Reusable </a:t>
             </a:r>
             <a:r>
+              <a:rPr lang="en-US" dirty="0" smtClean="0"/>
+              <a:t>flow of </a:t>
+            </a:r>
+            <a:r>
+              <a:rPr lang="en-US" dirty="0" smtClean="0"/>
+              <a:t>pages</a:t>
+            </a:r>
+          </a:p>
+          <a:p>
+            <a:pPr fontAlgn="base"/>
+            <a:r>
               <a:rPr lang="en-US" dirty="0"/>
-              <a:t>series of screens </a:t>
-            </a:r>
-            <a:r>
-              <a:rPr lang="en-US" dirty="0" smtClean="0"/>
-              <a:t>– like wizards </a:t>
+              <a:t>Derived from </a:t>
+            </a:r>
+            <a:r>
+              <a:rPr lang="en-US" dirty="0" smtClean="0"/>
+              <a:t>proven technologies</a:t>
+            </a:r>
+            <a:r>
+              <a:rPr lang="en-US" dirty="0"/>
+              <a:t>: </a:t>
+            </a:r>
+            <a:r>
+              <a:rPr lang="en-US" dirty="0" smtClean="0"/>
+              <a:t>SpringWebFlow and </a:t>
+            </a:r>
+            <a:r>
+              <a:rPr lang="en-US" dirty="0"/>
+              <a:t>Oracle </a:t>
+            </a:r>
+            <a:r>
+              <a:rPr lang="en-US" dirty="0" smtClean="0"/>
+              <a:t>ADF</a:t>
             </a:r>
           </a:p>
           <a:p>
             <a:pPr fontAlgn="base"/>
             <a:r>
               <a:rPr lang="en-US" dirty="0" smtClean="0"/>
-              <a:t>Based on similar technologies from SpringWebFlow </a:t>
+              <a:t>@FlowScoped </a:t>
             </a:r>
             <a:r>
               <a:rPr lang="en-US" dirty="0"/>
-              <a:t>and Oracle </a:t>
-            </a:r>
-            <a:r>
-              <a:rPr lang="en-US" dirty="0" smtClean="0"/>
-              <a:t>ADF</a:t>
+              <a:t>CDI bean - </a:t>
+            </a:r>
+            <a:r>
+              <a:rPr lang="en-US" dirty="0"/>
+              <a:t>JSF specification bound with CDI one</a:t>
             </a:r>
             <a:endParaRPr lang="en-US" dirty="0"/>
           </a:p>
@@ -14626,17 +14671,6 @@
             <a:pPr fontAlgn="base"/>
             <a:r>
               <a:rPr lang="en-US" dirty="0" smtClean="0"/>
-              <a:t>@FlowScoped </a:t>
-            </a:r>
-            <a:r>
-              <a:rPr lang="en-US" dirty="0"/>
-              <a:t>CDI bean - JSF bound with CDI</a:t>
-            </a:r>
-          </a:p>
-          <a:p>
-            <a:pPr fontAlgn="base"/>
-            <a:r>
-              <a:rPr lang="en-US" dirty="0" smtClean="0"/>
               <a:t>Definition:</a:t>
             </a:r>
           </a:p>
@@ -14644,14 +14678,23 @@
             <a:pPr lvl="1" fontAlgn="base"/>
             <a:r>
               <a:rPr lang="en-US" dirty="0" smtClean="0"/>
-              <a:t>JSF configuration file</a:t>
-            </a:r>
+              <a:t>JSF configuration </a:t>
+            </a:r>
+            <a:r>
+              <a:rPr lang="en-US" dirty="0" smtClean="0"/>
+              <a:t>file (faces-config)</a:t>
+            </a:r>
+            <a:endParaRPr lang="en-US" dirty="0" smtClean="0"/>
           </a:p>
           <a:p>
             <a:pPr lvl="1" fontAlgn="base"/>
             <a:r>
               <a:rPr lang="en-US" dirty="0" smtClean="0"/>
-              <a:t>@FlowDefinition annotation</a:t>
+              <a:t>@FlowDefinition </a:t>
+            </a:r>
+            <a:r>
+              <a:rPr lang="en-US" dirty="0" smtClean="0"/>
+              <a:t>annotation (java bean)</a:t>
             </a:r>
             <a:endParaRPr lang="en-US" dirty="0"/>
           </a:p>
@@ -14705,7 +14748,7 @@
   <p:timing>
     <p:tnLst>
       <p:par>
-        <p:cTn xmlns:p14="http://schemas.microsoft.com/office/powerpoint/2010/main" id="1" dur="indefinite" restart="never" nodeType="tmRoot"/>
+        <p:cTn id="1" dur="indefinite" restart="never" nodeType="tmRoot"/>
       </p:par>
     </p:tnLst>
   </p:timing>
@@ -14748,8 +14791,25 @@
           <a:p>
             <a:r>
               <a:rPr lang="en-US" dirty="0" smtClean="0"/>
-              <a:t>Sample wizard using all navigation elements of the Faces Flow, flow scope defined variables, Faces Flow wizard as a plugable component.</a:t>
-            </a:r>
+              <a:t>Sample wizard using </a:t>
+            </a:r>
+            <a:r>
+              <a:rPr lang="en-US" dirty="0" smtClean="0"/>
+              <a:t>navigation </a:t>
+            </a:r>
+            <a:r>
+              <a:rPr lang="en-US" dirty="0" smtClean="0"/>
+              <a:t>elements of the Faces Flow, flow scope defined </a:t>
+            </a:r>
+            <a:r>
+              <a:rPr lang="en-US" dirty="0" smtClean="0"/>
+              <a:t>bean</a:t>
+            </a:r>
+            <a:r>
+              <a:rPr lang="en-US" dirty="0"/>
+              <a:t>, Faces Flow component as a plugable library.</a:t>
+            </a:r>
+            <a:endParaRPr lang="en-US" dirty="0" smtClean="0"/>
           </a:p>
           <a:p>
             <a:endParaRPr lang="en-US" dirty="0" smtClean="0"/>
@@ -14860,7 +14920,7 @@
   <p:timing>
     <p:tnLst>
       <p:par>
-        <p:cTn xmlns:p14="http://schemas.microsoft.com/office/powerpoint/2010/main" id="1" dur="indefinite" restart="never" nodeType="tmRoot"/>
+        <p:cTn id="1" dur="indefinite" restart="never" nodeType="tmRoot"/>
       </p:par>
     </p:tnLst>
   </p:timing>
@@ -15054,7 +15114,7 @@
           </a:prstGeom>
           <a:noFill/>
           <a:extLst>
-            <a:ext uri="{909E8E84-426E-40dd-AFC4-6F175D3DCCD1}">
+            <a:ext uri="{909E8E84-426E-40DD-AFC4-6F175D3DCCD1}">
               <a14:hiddenFill xmlns:a14="http://schemas.microsoft.com/office/drawing/2010/main">
                 <a:solidFill>
                   <a:srgbClr val="FFFFFF"/>
@@ -15089,7 +15149,7 @@
   <p:timing>
     <p:tnLst>
       <p:par>
-        <p:cTn xmlns:p14="http://schemas.microsoft.com/office/powerpoint/2010/main" id="1" dur="indefinite" restart="never" nodeType="tmRoot"/>
+        <p:cTn id="1" dur="indefinite" restart="never" nodeType="tmRoot"/>
       </p:par>
     </p:tnLst>
   </p:timing>
@@ -15164,7 +15224,7 @@
   <p:timing>
     <p:tnLst>
       <p:par>
-        <p:cTn xmlns:p14="http://schemas.microsoft.com/office/powerpoint/2010/main" id="1" dur="indefinite" restart="never" nodeType="tmRoot"/>
+        <p:cTn id="1" dur="indefinite" restart="never" nodeType="tmRoot"/>
       </p:par>
     </p:tnLst>
   </p:timing>
@@ -15256,30 +15316,38 @@
           <a:p>
             <a:pPr fontAlgn="base"/>
             <a:r>
-              <a:rPr lang="en-US" dirty="0" smtClean="0"/>
-              <a:t>Configuration option can be change at runtim</a:t>
-            </a:r>
-            <a:endParaRPr lang="en-US" dirty="0"/>
+              <a:rPr lang="en-US" dirty="0"/>
+              <a:t>CDI capable </a:t>
+            </a:r>
+            <a:r>
+              <a:rPr lang="en-US" dirty="0" smtClean="0"/>
+              <a:t>component</a:t>
+            </a:r>
           </a:p>
           <a:p>
             <a:pPr fontAlgn="base"/>
             <a:r>
               <a:rPr lang="en-US" dirty="0" smtClean="0"/>
-              <a:t>CDI capable</a:t>
-            </a:r>
-          </a:p>
-          <a:p>
-            <a:pPr fontAlgn="base"/>
-            <a:r>
-              <a:rPr lang="en-US" dirty="0" smtClean="0"/>
               <a:t>Specifies</a:t>
             </a:r>
+            <a:endParaRPr lang="en-US" dirty="0" smtClean="0"/>
           </a:p>
           <a:p>
             <a:pPr lvl="1" fontAlgn="base"/>
             <a:r>
               <a:rPr lang="en-US" dirty="0" smtClean="0"/>
-              <a:t>Tag name</a:t>
+              <a:t>Create tag flag</a:t>
+            </a:r>
+          </a:p>
+          <a:p>
+            <a:pPr lvl="1" fontAlgn="base"/>
+            <a:r>
+              <a:rPr lang="en-US" dirty="0" smtClean="0"/>
+              <a:t>Tag </a:t>
+            </a:r>
+            <a:r>
+              <a:rPr lang="en-US" dirty="0" smtClean="0"/>
+              <a:t>name</a:t>
             </a:r>
           </a:p>
           <a:p>
@@ -15340,7 +15408,7 @@
   <p:timing>
     <p:tnLst>
       <p:par>
-        <p:cTn xmlns:p14="http://schemas.microsoft.com/office/powerpoint/2010/main" id="1" dur="indefinite" restart="never" nodeType="tmRoot"/>
+        <p:cTn id="1" dur="indefinite" restart="never" nodeType="tmRoot"/>
       </p:par>
     </p:tnLst>
   </p:timing>
@@ -15503,7 +15571,7 @@
   <p:timing>
     <p:tnLst>
       <p:par>
-        <p:cTn xmlns:p14="http://schemas.microsoft.com/office/powerpoint/2010/main" id="1" dur="indefinite" restart="never" nodeType="tmRoot"/>
+        <p:cTn id="1" dur="indefinite" restart="never" nodeType="tmRoot"/>
       </p:par>
     </p:tnLst>
   </p:timing>
@@ -15575,7 +15643,7 @@
   <p:timing>
     <p:tnLst>
       <p:par>
-        <p:cTn xmlns:p14="http://schemas.microsoft.com/office/powerpoint/2010/main" id="1" dur="indefinite" restart="never" nodeType="tmRoot"/>
+        <p:cTn id="1" dur="indefinite" restart="never" nodeType="tmRoot"/>
       </p:par>
     </p:tnLst>
   </p:timing>
@@ -15665,9 +15733,7 @@
             </a:r>
           </a:p>
           <a:p>
-            <a:pPr marL="60325" indent="0" fontAlgn="base">
-              <a:buNone/>
-            </a:pPr>
+            <a:pPr fontAlgn="base"/>
             <a:endParaRPr lang="en-US" dirty="0" smtClean="0"/>
           </a:p>
           <a:p>
@@ -15747,7 +15813,7 @@
   <p:timing>
     <p:tnLst>
       <p:par>
-        <p:cTn xmlns:p14="http://schemas.microsoft.com/office/powerpoint/2010/main" id="1" dur="indefinite" restart="never" nodeType="tmRoot"/>
+        <p:cTn id="1" dur="indefinite" restart="never" nodeType="tmRoot"/>
       </p:par>
     </p:tnLst>
   </p:timing>
@@ -15899,7 +15965,7 @@
   <p:timing>
     <p:tnLst>
       <p:par>
-        <p:cTn xmlns:p14="http://schemas.microsoft.com/office/powerpoint/2010/main" id="1" dur="indefinite" restart="never" nodeType="tmRoot"/>
+        <p:cTn id="1" dur="indefinite" restart="never" nodeType="tmRoot"/>
       </p:par>
     </p:tnLst>
   </p:timing>
@@ -16068,16 +16134,6 @@
               </a:rPr>
               <a:t>written by:</a:t>
             </a:r>
-            <a:r>
-              <a:rPr lang="en-US" sz="2400" dirty="0" smtClean="0">
-                <a:solidFill>
-                  <a:schemeClr val="bg1"/>
-                </a:solidFill>
-                <a:latin typeface="Arial" pitchFamily="34" charset="0"/>
-                <a:cs typeface="Arial" pitchFamily="34" charset="0"/>
-              </a:rPr>
-              <a:t/>
-            </a:r>
             <a:br>
               <a:rPr lang="en-US" sz="2400" dirty="0" smtClean="0">
                 <a:solidFill>
@@ -16134,17 +16190,7 @@
                 <a:latin typeface="Arial" pitchFamily="34" charset="0"/>
                 <a:cs typeface="Arial" pitchFamily="34" charset="0"/>
               </a:rPr>
-              <a:t>   &amp; </a:t>
-            </a:r>
-            <a:r>
-              <a:rPr lang="en-US" sz="2400" dirty="0" smtClean="0">
-                <a:solidFill>
-                  <a:schemeClr val="bg1"/>
-                </a:solidFill>
-                <a:latin typeface="Arial" pitchFamily="34" charset="0"/>
-                <a:cs typeface="Arial" pitchFamily="34" charset="0"/>
-              </a:rPr>
-              <a:t>Yours </a:t>
+              <a:t>   &amp; Yours </a:t>
             </a:r>
             <a:r>
               <a:rPr lang="en-US" sz="2400" dirty="0">
@@ -16250,7 +16296,7 @@
   <p:timing>
     <p:tnLst>
       <p:par>
-        <p:cTn xmlns:p14="http://schemas.microsoft.com/office/powerpoint/2010/main" id="1" dur="indefinite" restart="never" nodeType="tmRoot"/>
+        <p:cTn id="1" dur="indefinite" restart="never" nodeType="tmRoot"/>
       </p:par>
     </p:tnLst>
   </p:timing>
@@ -16315,7 +16361,7 @@
         </p:spPr>
         <p:txBody>
           <a:bodyPr>
-            <a:normAutofit lnSpcReduction="10000"/>
+            <a:normAutofit/>
           </a:bodyPr>
           <a:lstStyle/>
           <a:p>
@@ -16337,17 +16383,7 @@
               </a:rPr>
               <a:t>docs.oracle.com/javaee/7/tutorial/doc/home.htm</a:t>
             </a:r>
-            <a:r>
-              <a:rPr lang="en-US" dirty="0" smtClean="0"/>
-              <a:t/>
-            </a:r>
-            <a:br>
-              <a:rPr lang="en-US" dirty="0" smtClean="0"/>
-            </a:br>
-            <a:r>
-              <a:rPr lang="en-US" dirty="0" smtClean="0"/>
-              <a:t>(link not working?)</a:t>
-            </a:r>
+            <a:endParaRPr lang="en-US" dirty="0" smtClean="0"/>
           </a:p>
           <a:p>
             <a:r>
@@ -16393,18 +16429,15 @@
               <a:rPr lang="en-US" dirty="0">
                 <a:hlinkClick r:id="rId5"/>
               </a:rPr>
-              <a:t>https://netbeans.org/kb/trails/java-</a:t>
+              <a:t>https://</a:t>
             </a:r>
             <a:r>
               <a:rPr lang="en-US" dirty="0" smtClean="0">
                 <a:hlinkClick r:id="rId5"/>
               </a:rPr>
-              <a:t>ee.html</a:t>
-            </a:r>
-            <a:r>
-              <a:rPr lang="en-US" dirty="0" smtClean="0"/>
-              <a:t> (link not working?)</a:t>
-            </a:r>
+              <a:t>netbeans.org/kb/trails/java-ee.html</a:t>
+            </a:r>
+            <a:endParaRPr lang="en-US" dirty="0" smtClean="0"/>
           </a:p>
           <a:p>
             <a:r>
@@ -16458,7 +16491,7 @@
   <p:timing>
     <p:tnLst>
       <p:par>
-        <p:cTn xmlns:p14="http://schemas.microsoft.com/office/powerpoint/2010/main" id="1" dur="indefinite" restart="never" nodeType="tmRoot"/>
+        <p:cTn id="1" dur="indefinite" restart="never" nodeType="tmRoot"/>
       </p:par>
     </p:tnLst>
   </p:timing>
@@ -16594,7 +16627,7 @@
   <p:timing>
     <p:tnLst>
       <p:par>
-        <p:cTn xmlns:p14="http://schemas.microsoft.com/office/powerpoint/2010/main" id="1" dur="indefinite" restart="never" nodeType="tmRoot"/>
+        <p:cTn id="1" dur="indefinite" restart="never" nodeType="tmRoot"/>
       </p:par>
     </p:tnLst>
   </p:timing>
@@ -16806,7 +16839,7 @@
           </a:prstGeom>
           <a:noFill/>
           <a:extLst>
-            <a:ext uri="{909E8E84-426E-40dd-AFC4-6F175D3DCCD1}">
+            <a:ext uri="{909E8E84-426E-40DD-AFC4-6F175D3DCCD1}">
               <a14:hiddenFill xmlns:a14="http://schemas.microsoft.com/office/drawing/2010/main">
                 <a:solidFill>
                   <a:srgbClr val="FFFFFF"/>
@@ -16841,7 +16874,7 @@
   <p:timing>
     <p:tnLst>
       <p:par>
-        <p:cTn xmlns:p14="http://schemas.microsoft.com/office/powerpoint/2010/main" id="1" dur="indefinite" restart="never" nodeType="tmRoot"/>
+        <p:cTn id="1" dur="indefinite" restart="never" nodeType="tmRoot"/>
       </p:par>
     </p:tnLst>
   </p:timing>
@@ -17022,7 +17055,7 @@
           </a:prstGeom>
           <a:noFill/>
           <a:extLst>
-            <a:ext uri="{909E8E84-426E-40dd-AFC4-6F175D3DCCD1}">
+            <a:ext uri="{909E8E84-426E-40DD-AFC4-6F175D3DCCD1}">
               <a14:hiddenFill xmlns:a14="http://schemas.microsoft.com/office/drawing/2010/main">
                 <a:solidFill>
                   <a:srgbClr val="FFFFFF"/>
@@ -17057,7 +17090,7 @@
   <p:timing>
     <p:tnLst>
       <p:par>
-        <p:cTn xmlns:p14="http://schemas.microsoft.com/office/powerpoint/2010/main" id="1" dur="indefinite" restart="never" nodeType="tmRoot"/>
+        <p:cTn id="1" dur="indefinite" restart="never" nodeType="tmRoot"/>
       </p:par>
     </p:tnLst>
   </p:timing>
@@ -17128,7 +17161,7 @@
   <p:timing>
     <p:tnLst>
       <p:par>
-        <p:cTn xmlns:p14="http://schemas.microsoft.com/office/powerpoint/2010/main" id="1" dur="indefinite" restart="never" nodeType="tmRoot"/>
+        <p:cTn id="1" dur="indefinite" restart="never" nodeType="tmRoot"/>
       </p:par>
     </p:tnLst>
   </p:timing>
@@ -17337,7 +17370,7 @@
   <p:timing>
     <p:tnLst>
       <p:par>
-        <p:cTn xmlns:p14="http://schemas.microsoft.com/office/powerpoint/2010/main" id="1" dur="indefinite" restart="never" nodeType="tmRoot"/>
+        <p:cTn id="1" dur="indefinite" restart="never" nodeType="tmRoot"/>
       </p:par>
     </p:tnLst>
   </p:timing>
@@ -17489,7 +17522,7 @@
   <p:timing>
     <p:tnLst>
       <p:par>
-        <p:cTn xmlns:p14="http://schemas.microsoft.com/office/powerpoint/2010/main" id="1" dur="indefinite" restart="never" nodeType="tmRoot"/>
+        <p:cTn id="1" dur="indefinite" restart="never" nodeType="tmRoot"/>
       </p:par>
     </p:tnLst>
   </p:timing>
@@ -17565,7 +17598,7 @@
   <p:timing>
     <p:tnLst>
       <p:par>
-        <p:cTn xmlns:p14="http://schemas.microsoft.com/office/powerpoint/2010/main" id="1" dur="indefinite" restart="never" nodeType="tmRoot"/>
+        <p:cTn id="1" dur="indefinite" restart="never" nodeType="tmRoot"/>
       </p:par>
     </p:tnLst>
   </p:timing>

</xml_diff>

<commit_message>
Few updates around tips Nr.1 and Nr.2 into the presentation
</commit_message>
<xml_diff>
--- a/con3638.pptx
+++ b/con3638.pptx
@@ -233,7 +233,7 @@
           <a:p>
             <a:fld id="{E99333BE-0D34-4F62-BD6E-2C3B14663373}" type="datetimeFigureOut">
               <a:rPr lang="en-US" smtClean="0"/>
-              <a:t>8/29/2013</a:t>
+              <a:t>8/30/2013</a:t>
             </a:fld>
             <a:endParaRPr lang="en-US"/>
           </a:p>
@@ -399,7 +399,7 @@
           <a:p>
             <a:fld id="{4A2D1F94-724F-43BD-B41B-43157E9B4550}" type="datetimeFigureOut">
               <a:rPr lang="en-US" smtClean="0"/>
-              <a:t>8/29/2013</a:t>
+              <a:t>8/30/2013</a:t>
             </a:fld>
             <a:endParaRPr lang="en-US"/>
           </a:p>
@@ -11538,7 +11538,15 @@
             <a:pPr fontAlgn="base"/>
             <a:r>
               <a:rPr lang="en-US" dirty="0" smtClean="0"/>
-              <a:t>Can be bundled into Web Application </a:t>
+              <a:t>Can be bundled </a:t>
+            </a:r>
+            <a:r>
+              <a:rPr lang="en-US" dirty="0" smtClean="0"/>
+              <a:t>directly into </a:t>
+            </a:r>
+            <a:r>
+              <a:rPr lang="en-US" dirty="0" smtClean="0"/>
+              <a:t>Web Application </a:t>
             </a:r>
             <a:r>
               <a:rPr lang="en-US" dirty="0"/>
@@ -11546,7 +11554,7 @@
             </a:r>
             <a:r>
               <a:rPr lang="en-US" dirty="0" smtClean="0"/>
-              <a:t>Java SE </a:t>
+              <a:t>.jar </a:t>
             </a:r>
             <a:r>
               <a:rPr lang="en-US" dirty="0"/>
@@ -11564,16 +11572,9 @@
             <a:pPr lvl="1" fontAlgn="base"/>
             <a:r>
               <a:rPr lang="en-US" dirty="0" smtClean="0"/>
-              <a:t>use </a:t>
-            </a:r>
-            <a:r>
-              <a:rPr lang="en-US" dirty="0"/>
-              <a:t>only </a:t>
-            </a:r>
-            <a:r>
-              <a:rPr lang="en-US" dirty="0" smtClean="0"/>
-              <a:t>one</a:t>
-            </a:r>
+              <a:t>there is only one possibility</a:t>
+            </a:r>
+            <a:endParaRPr lang="en-US" dirty="0" smtClean="0"/>
           </a:p>
           <a:p>
             <a:pPr lvl="1" fontAlgn="base"/>
@@ -11594,12 +11595,9 @@
             <a:pPr lvl="1" fontAlgn="base"/>
             <a:r>
               <a:rPr lang="en-US" dirty="0" smtClean="0"/>
-              <a:t>static </a:t>
-            </a:r>
-            <a:r>
-              <a:rPr lang="en-US" dirty="0"/>
-              <a:t>selection for all views</a:t>
-            </a:r>
+              <a:t>URL based definition within faces-config</a:t>
+            </a:r>
+            <a:endParaRPr lang="en-US" dirty="0"/>
           </a:p>
           <a:p>
             <a:r>
@@ -11700,27 +11698,7 @@
             </a:r>
             <a:r>
               <a:rPr lang="en-US" dirty="0" smtClean="0"/>
-              <a:t>Resource Libraries Contracts usage, switching </a:t>
-            </a:r>
-            <a:r>
-              <a:rPr lang="en-US" dirty="0" smtClean="0"/>
-              <a:t>RLCs </a:t>
-            </a:r>
-            <a:r>
-              <a:rPr lang="en-US" dirty="0" smtClean="0"/>
-              <a:t>dynamically using Expression </a:t>
-            </a:r>
-            <a:r>
-              <a:rPr lang="en-US" dirty="0" smtClean="0"/>
-              <a:t>Language </a:t>
-            </a:r>
-            <a:r>
-              <a:rPr lang="en-US" dirty="0" smtClean="0"/>
-              <a:t>and </a:t>
-            </a:r>
-            <a:r>
-              <a:rPr lang="en-US" dirty="0" smtClean="0"/>
-              <a:t>ManagedBean.</a:t>
+              <a:t>Resource Libraries Contracts usage, switching RLCs dynamically using Expression Language and ManagedBean.</a:t>
             </a:r>
             <a:endParaRPr lang="en-US" dirty="0"/>
           </a:p>
@@ -12534,30 +12512,14 @@
           <a:p>
             <a:r>
               <a:rPr lang="en-US" dirty="0" smtClean="0"/>
-              <a:t>Examples on advanced UI </a:t>
-            </a:r>
-            <a:r>
-              <a:rPr lang="en-US" dirty="0" smtClean="0"/>
-              <a:t>components:</a:t>
+              <a:t>Examples on advanced UI components:</a:t>
             </a:r>
             <a:br>
               <a:rPr lang="en-US" dirty="0" smtClean="0"/>
             </a:br>
             <a:r>
               <a:rPr lang="en-US" dirty="0" smtClean="0"/>
-              <a:t>DataTable</a:t>
-            </a:r>
-            <a:r>
-              <a:rPr lang="en-US" dirty="0" smtClean="0"/>
-              <a:t>, Gmap, AutoComplete, PickList and </a:t>
-            </a:r>
-            <a:r>
-              <a:rPr lang="en-US" dirty="0" smtClean="0"/>
-              <a:t>many others</a:t>
-            </a:r>
-            <a:r>
-              <a:rPr lang="en-US" dirty="0" smtClean="0"/>
-              <a:t>…</a:t>
+              <a:t>DataTable, Gmap, AutoComplete, PickList and many others…</a:t>
             </a:r>
           </a:p>
         </p:txBody>
@@ -12995,23 +12957,14 @@
             <a:pPr lvl="1"/>
             <a:r>
               <a:rPr lang="en-US" dirty="0" smtClean="0"/>
-              <a:t>Feature </a:t>
-            </a:r>
-            <a:r>
-              <a:rPr lang="en-US" dirty="0" smtClean="0"/>
-              <a:t>overview</a:t>
-            </a:r>
-            <a:endParaRPr lang="en-US" dirty="0" smtClean="0"/>
+              <a:t>Feature overview</a:t>
+            </a:r>
           </a:p>
           <a:p>
             <a:pPr lvl="1"/>
             <a:r>
               <a:rPr lang="en-US" dirty="0" smtClean="0"/>
-              <a:t>Samples in </a:t>
-            </a:r>
-            <a:r>
-              <a:rPr lang="en-US" dirty="0" smtClean="0"/>
-              <a:t>action</a:t>
+              <a:t>Samples in action</a:t>
             </a:r>
           </a:p>
         </p:txBody>
@@ -14613,15 +14566,7 @@
             <a:pPr fontAlgn="base"/>
             <a:r>
               <a:rPr lang="en-US" dirty="0" smtClean="0"/>
-              <a:t>Reusable </a:t>
-            </a:r>
-            <a:r>
-              <a:rPr lang="en-US" dirty="0" smtClean="0"/>
-              <a:t>flow of </a:t>
-            </a:r>
-            <a:r>
-              <a:rPr lang="en-US" dirty="0" smtClean="0"/>
-              <a:t>pages</a:t>
+              <a:t>Reusable flow of pages</a:t>
             </a:r>
           </a:p>
           <a:p>
@@ -14659,13 +14604,8 @@
             </a:r>
             <a:r>
               <a:rPr lang="en-US" dirty="0"/>
-              <a:t>CDI bean - </a:t>
-            </a:r>
-            <a:r>
-              <a:rPr lang="en-US" dirty="0"/>
-              <a:t>JSF specification bound with CDI one</a:t>
-            </a:r>
-            <a:endParaRPr lang="en-US" dirty="0"/>
+              <a:t>CDI bean - JSF specification bound with CDI one</a:t>
+            </a:r>
           </a:p>
           <a:p>
             <a:pPr fontAlgn="base"/>
@@ -14678,23 +14618,14 @@
             <a:pPr lvl="1" fontAlgn="base"/>
             <a:r>
               <a:rPr lang="en-US" dirty="0" smtClean="0"/>
-              <a:t>JSF configuration </a:t>
-            </a:r>
-            <a:r>
-              <a:rPr lang="en-US" dirty="0" smtClean="0"/>
-              <a:t>file (faces-config)</a:t>
-            </a:r>
-            <a:endParaRPr lang="en-US" dirty="0" smtClean="0"/>
+              <a:t>JSF configuration file (faces-config)</a:t>
+            </a:r>
           </a:p>
           <a:p>
             <a:pPr lvl="1" fontAlgn="base"/>
             <a:r>
               <a:rPr lang="en-US" dirty="0" smtClean="0"/>
-              <a:t>@FlowDefinition </a:t>
-            </a:r>
-            <a:r>
-              <a:rPr lang="en-US" dirty="0" smtClean="0"/>
-              <a:t>annotation (java bean)</a:t>
+              <a:t>@FlowDefinition annotation (java bean)</a:t>
             </a:r>
             <a:endParaRPr lang="en-US" dirty="0"/>
           </a:p>
@@ -14791,19 +14722,7 @@
           <a:p>
             <a:r>
               <a:rPr lang="en-US" dirty="0" smtClean="0"/>
-              <a:t>Sample wizard using </a:t>
-            </a:r>
-            <a:r>
-              <a:rPr lang="en-US" dirty="0" smtClean="0"/>
-              <a:t>navigation </a:t>
-            </a:r>
-            <a:r>
-              <a:rPr lang="en-US" dirty="0" smtClean="0"/>
-              <a:t>elements of the Faces Flow, flow scope defined </a:t>
-            </a:r>
-            <a:r>
-              <a:rPr lang="en-US" dirty="0" smtClean="0"/>
-              <a:t>bean</a:t>
+              <a:t>Sample wizard using navigation elements of the Faces Flow, flow scope defined bean</a:t>
             </a:r>
             <a:r>
               <a:rPr lang="en-US" dirty="0"/>
@@ -15330,7 +15249,6 @@
               <a:rPr lang="en-US" dirty="0" smtClean="0"/>
               <a:t>Specifies</a:t>
             </a:r>
-            <a:endParaRPr lang="en-US" dirty="0" smtClean="0"/>
           </a:p>
           <a:p>
             <a:pPr lvl="1" fontAlgn="base"/>
@@ -15343,11 +15261,7 @@
             <a:pPr lvl="1" fontAlgn="base"/>
             <a:r>
               <a:rPr lang="en-US" dirty="0" smtClean="0"/>
-              <a:t>Tag </a:t>
-            </a:r>
-            <a:r>
-              <a:rPr lang="en-US" dirty="0" smtClean="0"/>
-              <a:t>name</a:t>
+              <a:t>Tag name</a:t>
             </a:r>
           </a:p>
           <a:p>
@@ -17231,60 +17145,61 @@
               <a:t>ew </a:t>
             </a:r>
             <a:r>
+              <a:rPr lang="en-US" dirty="0" smtClean="0"/>
+              <a:t>namespaces</a:t>
+            </a:r>
+          </a:p>
+          <a:p>
+            <a:pPr lvl="1"/>
+            <a:r>
               <a:rPr lang="en-US" dirty="0"/>
-              <a:t>namespaces and id </a:t>
-            </a:r>
-            <a:r>
-              <a:rPr lang="en-US" dirty="0" smtClean="0"/>
-              <a:t>attributes </a:t>
-            </a:r>
-            <a:r>
-              <a:rPr lang="en-US" dirty="0"/>
-              <a:t>to all </a:t>
-            </a:r>
-            <a:r>
-              <a:rPr lang="en-US" dirty="0" smtClean="0"/>
-              <a:t>elements</a:t>
-            </a:r>
+              <a:t>passthrough </a:t>
+            </a:r>
+            <a:r>
+              <a:rPr lang="en-US" dirty="0" smtClean="0"/>
+              <a:t>elements: </a:t>
+            </a:r>
+            <a:r>
+              <a:rPr lang="en-US" dirty="0" smtClean="0">
+                <a:hlinkClick r:id="rId2"/>
+              </a:rPr>
+              <a:t>http</a:t>
+            </a:r>
+            <a:r>
+              <a:rPr lang="en-US" dirty="0">
+                <a:hlinkClick r:id="rId2"/>
+              </a:rPr>
+              <a:t>://</a:t>
+            </a:r>
+            <a:r>
+              <a:rPr lang="en-US" dirty="0" smtClean="0">
+                <a:hlinkClick r:id="rId2"/>
+              </a:rPr>
+              <a:t>xmlns.jcp.org/jsf</a:t>
+            </a:r>
+            <a:r>
+              <a:rPr lang="en-US" dirty="0" smtClean="0"/>
+              <a:t> (TagDecorator)</a:t>
+            </a:r>
+            <a:endParaRPr lang="en-US" dirty="0"/>
           </a:p>
           <a:p>
             <a:pPr lvl="1"/>
             <a:r>
               <a:rPr lang="en-US" dirty="0" smtClean="0"/>
-              <a:t>http</a:t>
-            </a:r>
-            <a:r>
-              <a:rPr lang="en-US" dirty="0"/>
-              <a:t>://xmlns.jcp.org/jsf - </a:t>
-            </a:r>
-            <a:r>
-              <a:rPr lang="en-US" dirty="0" smtClean="0"/>
-              <a:t>passthrough elements</a:t>
-            </a:r>
-            <a:endParaRPr lang="en-US" dirty="0"/>
-          </a:p>
-          <a:p>
-            <a:pPr lvl="1"/>
-            <a:r>
-              <a:rPr lang="en-US" dirty="0" smtClean="0"/>
-              <a:t>http</a:t>
-            </a:r>
-            <a:r>
-              <a:rPr lang="en-US" dirty="0"/>
-              <a:t>://xmlns.jcp.org/jsf/passthrough </a:t>
-            </a:r>
-            <a:r>
-              <a:rPr lang="en-US" dirty="0" smtClean="0"/>
-              <a:t>- </a:t>
-            </a:r>
-            <a:r>
-              <a:rPr lang="en-US" dirty="0"/>
-              <a:t>passthrough</a:t>
-            </a:r>
-            <a:r>
-              <a:rPr lang="en-US" dirty="0" smtClean="0"/>
-              <a:t> attributes</a:t>
-            </a:r>
+              <a:t>passthrough attributes: </a:t>
+            </a:r>
+            <a:r>
+              <a:rPr lang="en-US" dirty="0" smtClean="0">
+                <a:hlinkClick r:id="rId3"/>
+              </a:rPr>
+              <a:t>http://xmlns.jcp.org/jsf/passthrough</a:t>
+            </a:r>
+            <a:r>
+              <a:rPr lang="en-US" dirty="0" smtClean="0"/>
+              <a:t> (RenderKit)</a:t>
+            </a:r>
+            <a:endParaRPr lang="en-US" dirty="0" smtClean="0"/>
           </a:p>
           <a:p>
             <a:pPr marL="403225" lvl="1" indent="0">
@@ -17407,13 +17322,45 @@
         <p:spPr/>
         <p:txBody>
           <a:bodyPr>
-            <a:normAutofit/>
+            <a:normAutofit fontScale="92500" lnSpcReduction="10000"/>
           </a:bodyPr>
           <a:lstStyle/>
           <a:p>
             <a:r>
               <a:rPr lang="en-US" dirty="0" smtClean="0"/>
-              <a:t>Form with usage of HTML friendly markup, validation by Bean Validation API, passthrough attributes, usage of JavaScript framework on JSF component.</a:t>
+              <a:t>Form with usage of HTML friendly </a:t>
+            </a:r>
+            <a:r>
+              <a:rPr lang="en-US" dirty="0" smtClean="0"/>
+              <a:t>markup: </a:t>
+            </a:r>
+            <a:r>
+              <a:rPr lang="en-US" dirty="0" smtClean="0"/>
+              <a:t>validation by Bean Validation </a:t>
+            </a:r>
+            <a:r>
+              <a:rPr lang="en-US" dirty="0" smtClean="0"/>
+              <a:t>API with localized messages, custom Bean Validation annotation, </a:t>
+            </a:r>
+            <a:r>
+              <a:rPr lang="en-US" dirty="0" smtClean="0"/>
+              <a:t>passthrough </a:t>
+            </a:r>
+            <a:r>
+              <a:rPr lang="en-US" dirty="0" smtClean="0"/>
+              <a:t>attributes and elements, </a:t>
+            </a:r>
+            <a:r>
+              <a:rPr lang="en-US" dirty="0" smtClean="0"/>
+              <a:t>usage of </a:t>
+            </a:r>
+            <a:r>
+              <a:rPr lang="en-US" dirty="0" smtClean="0"/>
+              <a:t>jQuery plugin on </a:t>
+            </a:r>
+            <a:r>
+              <a:rPr lang="en-US" dirty="0" smtClean="0"/>
+              <a:t>JSF component.</a:t>
             </a:r>
             <a:endParaRPr lang="en-US" dirty="0"/>
           </a:p>

</xml_diff>

<commit_message>
Updated text of tips Nr. 1, 2, 3
</commit_message>
<xml_diff>
--- a/con3638.pptx
+++ b/con3638.pptx
@@ -233,7 +233,7 @@
           <a:p>
             <a:fld id="{E99333BE-0D34-4F62-BD6E-2C3B14663373}" type="datetimeFigureOut">
               <a:rPr lang="en-US" smtClean="0"/>
-              <a:t>8/30/2013</a:t>
+              <a:t>9/2/2013</a:t>
             </a:fld>
             <a:endParaRPr lang="en-US"/>
           </a:p>
@@ -399,7 +399,7 @@
           <a:p>
             <a:fld id="{4A2D1F94-724F-43BD-B41B-43157E9B4550}" type="datetimeFigureOut">
               <a:rPr lang="en-US" smtClean="0"/>
-              <a:t>8/30/2013</a:t>
+              <a:t>9/2/2013</a:t>
             </a:fld>
             <a:endParaRPr lang="en-US"/>
           </a:p>
@@ -11519,34 +11519,31 @@
           <a:p>
             <a:pPr fontAlgn="base"/>
             <a:r>
+              <a:rPr lang="en-US" dirty="0" smtClean="0"/>
+              <a:t>Theme definitions across one or more web applications</a:t>
+            </a:r>
+            <a:endParaRPr lang="en-US" dirty="0" smtClean="0"/>
+          </a:p>
+          <a:p>
+            <a:pPr fontAlgn="base"/>
+            <a:r>
+              <a:rPr lang="en-US" dirty="0" smtClean="0"/>
+              <a:t>Libraries </a:t>
+            </a:r>
+            <a:r>
               <a:rPr lang="en-US" dirty="0"/>
-              <a:t>Libraries consisting of templates, insertion points, resources</a:t>
+              <a:t>consisting of templates, insertion points, resources</a:t>
             </a:r>
           </a:p>
           <a:p>
             <a:pPr fontAlgn="base"/>
             <a:r>
               <a:rPr lang="en-US" dirty="0" smtClean="0"/>
-              <a:t>Library </a:t>
-            </a:r>
-            <a:r>
-              <a:rPr lang="en-US" dirty="0"/>
-              <a:t>name translated into resources store (ResourceResolver)</a:t>
-            </a:r>
-          </a:p>
-          <a:p>
-            <a:pPr fontAlgn="base"/>
-            <a:r>
-              <a:rPr lang="en-US" dirty="0" smtClean="0"/>
-              <a:t>Can be bundled </a:t>
-            </a:r>
-            <a:r>
-              <a:rPr lang="en-US" dirty="0" smtClean="0"/>
-              <a:t>directly into </a:t>
-            </a:r>
-            <a:r>
-              <a:rPr lang="en-US" dirty="0" smtClean="0"/>
-              <a:t>Web Application </a:t>
+              <a:t>Can </a:t>
+            </a:r>
+            <a:r>
+              <a:rPr lang="en-US" dirty="0" smtClean="0"/>
+              <a:t>be bundled directly into Web Application </a:t>
             </a:r>
             <a:r>
               <a:rPr lang="en-US" dirty="0"/>
@@ -11572,7 +11569,11 @@
             <a:pPr lvl="1" fontAlgn="base"/>
             <a:r>
               <a:rPr lang="en-US" dirty="0" smtClean="0"/>
-              <a:t>there is only one possibility</a:t>
+              <a:t>there is only one </a:t>
+            </a:r>
+            <a:r>
+              <a:rPr lang="en-US" dirty="0" smtClean="0"/>
+              <a:t>option</a:t>
             </a:r>
             <a:endParaRPr lang="en-US" dirty="0" smtClean="0"/>
           </a:p>
@@ -11954,11 +11955,7 @@
             <a:pPr fontAlgn="base"/>
             <a:r>
               <a:rPr lang="en-US" dirty="0" smtClean="0"/>
-              <a:t>Deferred </a:t>
-            </a:r>
-            <a:r>
-              <a:rPr lang="en-US" dirty="0" smtClean="0"/>
-              <a:t>or immediate </a:t>
+              <a:t>Deferred or immediate </a:t>
             </a:r>
             <a:r>
               <a:rPr lang="en-US" dirty="0"/>
@@ -11979,7 +11976,6 @@
               <a:rPr lang="en-US" dirty="0" smtClean="0"/>
               <a:t>methods</a:t>
             </a:r>
-            <a:endParaRPr lang="en-US" dirty="0" smtClean="0"/>
           </a:p>
           <a:p>
             <a:pPr fontAlgn="base"/>
@@ -11994,7 +11990,6 @@
               <a:rPr lang="en-US" dirty="0" smtClean="0"/>
               <a:t>Standalone ELProcessor </a:t>
             </a:r>
-            <a:endParaRPr lang="en-US" dirty="0" smtClean="0"/>
           </a:p>
           <a:p>
             <a:pPr lvl="1" fontAlgn="base"/>
@@ -12123,7 +12118,15 @@
             </a:r>
             <a:r>
               <a:rPr lang="en-US" dirty="0"/>
-              <a:t>standalone EL Processor, opperators, static fields, collections, lambdas and collection operations.</a:t>
+              <a:t>standalone EL Processor, </a:t>
+            </a:r>
+            <a:r>
+              <a:rPr lang="en-US" dirty="0" smtClean="0"/>
+              <a:t>operators</a:t>
+            </a:r>
+            <a:r>
+              <a:rPr lang="en-US" dirty="0"/>
+              <a:t>, static fields, collections, lambdas and collection operations.</a:t>
             </a:r>
             <a:endParaRPr lang="en-US" dirty="0" smtClean="0"/>
           </a:p>
@@ -14943,7 +14946,15 @@
             </a:pPr>
             <a:r>
               <a:rPr lang="en-US" sz="2000" cap="none" dirty="0" smtClean="0"/>
-              <a:t>JavaServer Faces 2.2 big features:</a:t>
+              <a:t>JavaServer Faces 2.2 big </a:t>
+            </a:r>
+            <a:r>
+              <a:rPr lang="en-US" sz="2000" cap="none" dirty="0" smtClean="0"/>
+              <a:t>ticket features</a:t>
+            </a:r>
+            <a:r>
+              <a:rPr lang="en-US" sz="2000" cap="none" dirty="0" smtClean="0"/>
+              <a:t>:</a:t>
             </a:r>
           </a:p>
           <a:p>
@@ -16881,34 +16892,62 @@
           <a:p>
             <a:pPr marL="917575" lvl="1" indent="-285750"/>
             <a:r>
+              <a:rPr lang="en-US" dirty="0" smtClean="0"/>
+              <a:t>Java SE </a:t>
+            </a:r>
+            <a:r>
               <a:rPr lang="en-US" dirty="0"/>
-              <a:t>JDK 7, Java EE </a:t>
+              <a:t>7, Java EE </a:t>
             </a:r>
             <a:r>
               <a:rPr lang="en-US" dirty="0" smtClean="0"/>
               <a:t>7 and </a:t>
             </a:r>
             <a:r>
-              <a:rPr lang="en-US" dirty="0"/>
-              <a:t>JavaFX </a:t>
-            </a:r>
-            <a:r>
-              <a:rPr lang="en-US" dirty="0" smtClean="0"/>
-              <a:t>2</a:t>
-            </a:r>
+              <a:rPr lang="en-US" dirty="0" smtClean="0"/>
+              <a:t>JavaFX</a:t>
+            </a:r>
+            <a:endParaRPr lang="en-US" dirty="0" smtClean="0"/>
           </a:p>
           <a:p>
             <a:pPr marL="917575" lvl="1" indent="-285750"/>
             <a:r>
               <a:rPr lang="en-US" cap="none" dirty="0" smtClean="0"/>
-              <a:t>HTML5 development, CSS preprocessors, JavaSciprt frameworks, PhoneGap</a:t>
-            </a:r>
+              <a:t>HTML(5) client side development,</a:t>
+            </a:r>
+            <a:br>
+              <a:rPr lang="en-US" cap="none" dirty="0" smtClean="0"/>
+            </a:br>
+            <a:r>
+              <a:rPr lang="en-US" cap="none" dirty="0" smtClean="0"/>
+              <a:t>CSS </a:t>
+            </a:r>
+            <a:r>
+              <a:rPr lang="en-US" cap="none" dirty="0" smtClean="0"/>
+              <a:t>preprocessors, JavaSciprt </a:t>
+            </a:r>
+            <a:r>
+              <a:rPr lang="en-US" cap="none" dirty="0" smtClean="0"/>
+              <a:t>frameworks</a:t>
+            </a:r>
+            <a:endParaRPr lang="en-US" cap="none" dirty="0" smtClean="0"/>
           </a:p>
           <a:p>
             <a:pPr marL="917575" lvl="1" indent="-285750"/>
             <a:r>
               <a:rPr lang="en-US" dirty="0" smtClean="0"/>
-              <a:t>VCS improvements, PHP 5.4 and the newest PHP frameworks</a:t>
+              <a:t>Cordova, VCS improvements</a:t>
+            </a:r>
+          </a:p>
+          <a:p>
+            <a:pPr marL="917575" lvl="1" indent="-285750"/>
+            <a:r>
+              <a:rPr lang="en-US" dirty="0" smtClean="0"/>
+              <a:t>PHP </a:t>
+            </a:r>
+            <a:r>
+              <a:rPr lang="en-US" dirty="0" smtClean="0"/>
+              <a:t>5.4 and the newest PHP frameworks</a:t>
             </a:r>
             <a:endParaRPr lang="en-US" cap="none" dirty="0" smtClean="0"/>
           </a:p>
@@ -17155,11 +17194,7 @@
             </a:r>
             <a:r>
               <a:rPr lang="en-US" dirty="0" smtClean="0"/>
-              <a:t>ew </a:t>
-            </a:r>
-            <a:r>
-              <a:rPr lang="en-US" dirty="0" smtClean="0"/>
-              <a:t>namespaces</a:t>
+              <a:t>ew namespaces</a:t>
             </a:r>
           </a:p>
           <a:p>
@@ -17212,7 +17247,6 @@
               <a:rPr lang="en-US" dirty="0" smtClean="0"/>
               <a:t> (RenderKit)</a:t>
             </a:r>
-            <a:endParaRPr lang="en-US" dirty="0" smtClean="0"/>
           </a:p>
           <a:p>
             <a:pPr marL="403225" lvl="1" indent="0">
@@ -17230,17 +17264,6 @@
             <a:pPr lvl="1"/>
             <a:r>
               <a:rPr lang="en-US" dirty="0" smtClean="0"/>
-              <a:t>JSF UI components / JavaScript components / both </a:t>
-            </a:r>
-            <a:r>
-              <a:rPr lang="en-US" dirty="0"/>
-              <a:t>at once</a:t>
-            </a:r>
-          </a:p>
-          <a:p>
-            <a:pPr lvl="1"/>
-            <a:r>
-              <a:rPr lang="en-US" dirty="0" smtClean="0"/>
               <a:t>Write </a:t>
             </a:r>
             <a:r>
@@ -17251,6 +17274,36 @@
               <a:rPr lang="en-US" dirty="0" smtClean="0"/>
               <a:t>JSF</a:t>
             </a:r>
+          </a:p>
+          <a:p>
+            <a:pPr lvl="1"/>
+            <a:r>
+              <a:rPr lang="en-US" dirty="0" smtClean="0"/>
+              <a:t>Control over rendered Facelet</a:t>
+            </a:r>
+          </a:p>
+          <a:p>
+            <a:pPr lvl="1"/>
+            <a:r>
+              <a:rPr lang="en-US" dirty="0" smtClean="0"/>
+              <a:t>JSF components </a:t>
+            </a:r>
+            <a:r>
+              <a:rPr lang="en-US" dirty="0"/>
+              <a:t>/ JavaScript components / </a:t>
+            </a:r>
+            <a:r>
+              <a:rPr lang="en-US" dirty="0" smtClean="0"/>
+              <a:t>arbitrary </a:t>
+            </a:r>
+            <a:r>
+              <a:rPr lang="en-US" dirty="0"/>
+              <a:t>mixing</a:t>
+            </a:r>
+          </a:p>
+          <a:p>
+            <a:pPr lvl="1"/>
+            <a:endParaRPr lang="en-US" dirty="0" smtClean="0"/>
           </a:p>
         </p:txBody>
       </p:sp>
@@ -17341,39 +17394,7 @@
           <a:p>
             <a:r>
               <a:rPr lang="en-US" dirty="0" smtClean="0"/>
-              <a:t>Form with usage of HTML friendly </a:t>
-            </a:r>
-            <a:r>
-              <a:rPr lang="en-US" dirty="0" smtClean="0"/>
-              <a:t>markup: </a:t>
-            </a:r>
-            <a:r>
-              <a:rPr lang="en-US" dirty="0" smtClean="0"/>
-              <a:t>validation by Bean Validation </a:t>
-            </a:r>
-            <a:r>
-              <a:rPr lang="en-US" dirty="0" smtClean="0"/>
-              <a:t>API with localized messages, custom Bean Validation annotation, </a:t>
-            </a:r>
-            <a:r>
-              <a:rPr lang="en-US" dirty="0" smtClean="0"/>
-              <a:t>passthrough </a:t>
-            </a:r>
-            <a:r>
-              <a:rPr lang="en-US" dirty="0" smtClean="0"/>
-              <a:t>attributes and elements, </a:t>
-            </a:r>
-            <a:r>
-              <a:rPr lang="en-US" dirty="0" smtClean="0"/>
-              <a:t>usage of </a:t>
-            </a:r>
-            <a:r>
-              <a:rPr lang="en-US" dirty="0" smtClean="0"/>
-              <a:t>jQuery plugin on </a:t>
-            </a:r>
-            <a:r>
-              <a:rPr lang="en-US" dirty="0" smtClean="0"/>
-              <a:t>JSF component.</a:t>
+              <a:t>Form with usage of HTML friendly markup: validation by Bean Validation API with localized messages, custom Bean Validation annotation, passthrough attributes and elements, usage of jQuery plugin on JSF component.</a:t>
             </a:r>
             <a:endParaRPr lang="en-US" dirty="0"/>
           </a:p>

</xml_diff>

<commit_message>
Updated tip Nr.7 in the presentation
</commit_message>
<xml_diff>
--- a/con3638.pptx
+++ b/con3638.pptx
@@ -233,7 +233,7 @@
           <a:p>
             <a:fld id="{E99333BE-0D34-4F62-BD6E-2C3B14663373}" type="datetimeFigureOut">
               <a:rPr lang="en-US" smtClean="0"/>
-              <a:t>9/2/2013</a:t>
+              <a:t>9/3/2013</a:t>
             </a:fld>
             <a:endParaRPr lang="en-US"/>
           </a:p>
@@ -399,7 +399,7 @@
           <a:p>
             <a:fld id="{4A2D1F94-724F-43BD-B41B-43157E9B4550}" type="datetimeFigureOut">
               <a:rPr lang="en-US" smtClean="0"/>
-              <a:t>9/2/2013</a:t>
+              <a:t>9/3/2013</a:t>
             </a:fld>
             <a:endParaRPr lang="en-US"/>
           </a:p>
@@ -11522,7 +11522,6 @@
               <a:rPr lang="en-US" dirty="0" smtClean="0"/>
               <a:t>Theme definitions across one or more web applications</a:t>
             </a:r>
-            <a:endParaRPr lang="en-US" dirty="0" smtClean="0"/>
           </a:p>
           <a:p>
             <a:pPr fontAlgn="base"/>
@@ -11539,11 +11538,7 @@
             <a:pPr fontAlgn="base"/>
             <a:r>
               <a:rPr lang="en-US" dirty="0" smtClean="0"/>
-              <a:t>Can </a:t>
-            </a:r>
-            <a:r>
-              <a:rPr lang="en-US" dirty="0" smtClean="0"/>
-              <a:t>be bundled directly into Web Application </a:t>
+              <a:t>Can be bundled directly into Web Application </a:t>
             </a:r>
             <a:r>
               <a:rPr lang="en-US" dirty="0"/>
@@ -11569,13 +11564,8 @@
             <a:pPr lvl="1" fontAlgn="base"/>
             <a:r>
               <a:rPr lang="en-US" dirty="0" smtClean="0"/>
-              <a:t>there is only one </a:t>
-            </a:r>
-            <a:r>
-              <a:rPr lang="en-US" dirty="0" smtClean="0"/>
-              <a:t>option</a:t>
-            </a:r>
-            <a:endParaRPr lang="en-US" dirty="0" smtClean="0"/>
+              <a:t>there is only one option</a:t>
+            </a:r>
           </a:p>
           <a:p>
             <a:pPr lvl="1" fontAlgn="base"/>
@@ -14582,8 +14572,20 @@
             <a:pPr fontAlgn="base"/>
             <a:r>
               <a:rPr lang="en-US" dirty="0" smtClean="0"/>
-              <a:t>Reusable flow of pages</a:t>
-            </a:r>
+              <a:t>Reusable </a:t>
+            </a:r>
+            <a:r>
+              <a:rPr lang="en-US" dirty="0" smtClean="0"/>
+              <a:t>collection of screens with defined entry and exit points</a:t>
+            </a:r>
+          </a:p>
+          <a:p>
+            <a:pPr fontAlgn="base"/>
+            <a:r>
+              <a:rPr lang="en-US" dirty="0" smtClean="0"/>
+              <a:t>Nodes like switchNode, finalizer, methodCall etc.</a:t>
+            </a:r>
+            <a:endParaRPr lang="en-US" dirty="0" smtClean="0"/>
           </a:p>
           <a:p>
             <a:pPr fontAlgn="base"/>
@@ -14601,27 +14603,25 @@
             </a:r>
             <a:r>
               <a:rPr lang="en-US" dirty="0" smtClean="0"/>
-              <a:t>SpringWebFlow and </a:t>
+              <a:t>Spring WebFlow, ADF Task Flow</a:t>
+            </a:r>
+            <a:endParaRPr lang="en-US" dirty="0" smtClean="0"/>
+          </a:p>
+          <a:p>
+            <a:pPr fontAlgn="base"/>
+            <a:r>
+              <a:rPr lang="en-US" dirty="0" smtClean="0"/>
+              <a:t>JSF </a:t>
             </a:r>
             <a:r>
               <a:rPr lang="en-US" dirty="0"/>
-              <a:t>Oracle </a:t>
-            </a:r>
-            <a:r>
-              <a:rPr lang="en-US" dirty="0" smtClean="0"/>
-              <a:t>ADF</a:t>
-            </a:r>
-          </a:p>
-          <a:p>
-            <a:pPr fontAlgn="base"/>
-            <a:r>
-              <a:rPr lang="en-US" dirty="0" smtClean="0"/>
-              <a:t>@FlowScoped </a:t>
+              <a:t>specification bound with CDI </a:t>
             </a:r>
             <a:r>
               <a:rPr lang="en-US" dirty="0"/>
-              <a:t>CDI bean - JSF specification bound with CDI one</a:t>
-            </a:r>
+              <a:t> - @FlowScoped CDI scope</a:t>
+            </a:r>
+            <a:endParaRPr lang="en-US" dirty="0"/>
           </a:p>
           <a:p>
             <a:pPr fontAlgn="base"/>
@@ -14946,15 +14946,7 @@
             </a:pPr>
             <a:r>
               <a:rPr lang="en-US" sz="2000" cap="none" dirty="0" smtClean="0"/>
-              <a:t>JavaServer Faces 2.2 big </a:t>
-            </a:r>
-            <a:r>
-              <a:rPr lang="en-US" sz="2000" cap="none" dirty="0" smtClean="0"/>
-              <a:t>ticket features</a:t>
-            </a:r>
-            <a:r>
-              <a:rPr lang="en-US" sz="2000" cap="none" dirty="0" smtClean="0"/>
-              <a:t>:</a:t>
+              <a:t>JavaServer Faces 2.2 big ticket features:</a:t>
             </a:r>
           </a:p>
           <a:p>
@@ -15133,12 +15125,17 @@
           <a:p>
             <a:r>
               <a:rPr lang="en-US" dirty="0" smtClean="0"/>
-              <a:t>Annotation based UI </a:t>
-            </a:r>
-            <a:r>
-              <a:rPr lang="en-US" dirty="0"/>
-              <a:t>components definition</a:t>
-            </a:r>
+              <a:t>Annotation </a:t>
+            </a:r>
+            <a:r>
+              <a:rPr lang="en-US" dirty="0" smtClean="0"/>
+              <a:t>based component </a:t>
+            </a:r>
+            <a:r>
+              <a:rPr lang="en-US" dirty="0" smtClean="0"/>
+              <a:t>registration</a:t>
+            </a:r>
+            <a:endParaRPr lang="en-US" dirty="0"/>
           </a:p>
         </p:txBody>
       </p:sp>
@@ -15208,8 +15205,9 @@
           <a:p>
             <a:r>
               <a:rPr lang="en-US" dirty="0"/>
-              <a:t>Annotation based UI components definition</a:t>
-            </a:r>
+              <a:t>Annotation based component registration</a:t>
+            </a:r>
+            <a:endParaRPr lang="en-US" dirty="0"/>
           </a:p>
         </p:txBody>
       </p:sp>
@@ -15479,8 +15477,9 @@
           <a:p>
             <a:r>
               <a:rPr lang="en-US" dirty="0"/>
-              <a:t>Annotation based UI components definition</a:t>
-            </a:r>
+              <a:t>Annotation based component registration</a:t>
+            </a:r>
+            <a:endParaRPr lang="en-US" dirty="0"/>
           </a:p>
         </p:txBody>
       </p:sp>
@@ -16901,13 +16900,8 @@
             </a:r>
             <a:r>
               <a:rPr lang="en-US" dirty="0" smtClean="0"/>
-              <a:t>7 and </a:t>
-            </a:r>
-            <a:r>
-              <a:rPr lang="en-US" dirty="0" smtClean="0"/>
-              <a:t>JavaFX</a:t>
-            </a:r>
-            <a:endParaRPr lang="en-US" dirty="0" smtClean="0"/>
+              <a:t>7 and JavaFX</a:t>
+            </a:r>
           </a:p>
           <a:p>
             <a:pPr marL="917575" lvl="1" indent="-285750"/>
@@ -16920,17 +16914,8 @@
             </a:br>
             <a:r>
               <a:rPr lang="en-US" cap="none" dirty="0" smtClean="0"/>
-              <a:t>CSS </a:t>
-            </a:r>
-            <a:r>
-              <a:rPr lang="en-US" cap="none" dirty="0" smtClean="0"/>
-              <a:t>preprocessors, JavaSciprt </a:t>
-            </a:r>
-            <a:r>
-              <a:rPr lang="en-US" cap="none" dirty="0" smtClean="0"/>
-              <a:t>frameworks</a:t>
-            </a:r>
-            <a:endParaRPr lang="en-US" cap="none" dirty="0" smtClean="0"/>
+              <a:t>CSS preprocessors, JavaSciprt frameworks</a:t>
+            </a:r>
           </a:p>
           <a:p>
             <a:pPr marL="917575" lvl="1" indent="-285750"/>
@@ -16943,11 +16928,7 @@
             <a:pPr marL="917575" lvl="1" indent="-285750"/>
             <a:r>
               <a:rPr lang="en-US" dirty="0" smtClean="0"/>
-              <a:t>PHP </a:t>
-            </a:r>
-            <a:r>
-              <a:rPr lang="en-US" dirty="0" smtClean="0"/>
-              <a:t>5.4 and the newest PHP frameworks</a:t>
+              <a:t>PHP 5.4 and the newest PHP frameworks</a:t>
             </a:r>
             <a:endParaRPr lang="en-US" cap="none" dirty="0" smtClean="0"/>
           </a:p>

</xml_diff>

<commit_message>
Updated J1 presentation according to the latest slides definition
</commit_message>
<xml_diff>
--- a/con3638.pptx
+++ b/con3638.pptx
@@ -6,50 +6,52 @@
     <p:sldMasterId id="2147483766" r:id="rId2"/>
   </p:sldMasterIdLst>
   <p:notesMasterIdLst>
-    <p:notesMasterId r:id="rId41"/>
+    <p:notesMasterId r:id="rId43"/>
   </p:notesMasterIdLst>
   <p:handoutMasterIdLst>
-    <p:handoutMasterId r:id="rId42"/>
+    <p:handoutMasterId r:id="rId44"/>
   </p:handoutMasterIdLst>
   <p:sldIdLst>
-    <p:sldId id="576" r:id="rId3"/>
-    <p:sldId id="578" r:id="rId4"/>
-    <p:sldId id="579" r:id="rId5"/>
-    <p:sldId id="580" r:id="rId6"/>
-    <p:sldId id="581" r:id="rId7"/>
-    <p:sldId id="582" r:id="rId8"/>
-    <p:sldId id="583" r:id="rId9"/>
-    <p:sldId id="602" r:id="rId10"/>
-    <p:sldId id="584" r:id="rId11"/>
-    <p:sldId id="593" r:id="rId12"/>
-    <p:sldId id="592" r:id="rId13"/>
-    <p:sldId id="585" r:id="rId14"/>
-    <p:sldId id="599" r:id="rId15"/>
-    <p:sldId id="595" r:id="rId16"/>
-    <p:sldId id="616" r:id="rId17"/>
-    <p:sldId id="613" r:id="rId18"/>
-    <p:sldId id="614" r:id="rId19"/>
-    <p:sldId id="586" r:id="rId20"/>
-    <p:sldId id="594" r:id="rId21"/>
-    <p:sldId id="596" r:id="rId22"/>
-    <p:sldId id="603" r:id="rId23"/>
-    <p:sldId id="604" r:id="rId24"/>
-    <p:sldId id="605" r:id="rId25"/>
-    <p:sldId id="587" r:id="rId26"/>
-    <p:sldId id="597" r:id="rId27"/>
-    <p:sldId id="598" r:id="rId28"/>
-    <p:sldId id="588" r:id="rId29"/>
-    <p:sldId id="600" r:id="rId30"/>
-    <p:sldId id="601" r:id="rId31"/>
-    <p:sldId id="589" r:id="rId32"/>
-    <p:sldId id="606" r:id="rId33"/>
-    <p:sldId id="607" r:id="rId34"/>
-    <p:sldId id="590" r:id="rId35"/>
-    <p:sldId id="608" r:id="rId36"/>
-    <p:sldId id="609" r:id="rId37"/>
-    <p:sldId id="615" r:id="rId38"/>
-    <p:sldId id="612" r:id="rId39"/>
-    <p:sldId id="577" r:id="rId40"/>
+    <p:sldId id="618" r:id="rId3"/>
+    <p:sldId id="576" r:id="rId4"/>
+    <p:sldId id="617" r:id="rId5"/>
+    <p:sldId id="578" r:id="rId6"/>
+    <p:sldId id="579" r:id="rId7"/>
+    <p:sldId id="580" r:id="rId8"/>
+    <p:sldId id="581" r:id="rId9"/>
+    <p:sldId id="582" r:id="rId10"/>
+    <p:sldId id="583" r:id="rId11"/>
+    <p:sldId id="602" r:id="rId12"/>
+    <p:sldId id="584" r:id="rId13"/>
+    <p:sldId id="593" r:id="rId14"/>
+    <p:sldId id="592" r:id="rId15"/>
+    <p:sldId id="585" r:id="rId16"/>
+    <p:sldId id="599" r:id="rId17"/>
+    <p:sldId id="595" r:id="rId18"/>
+    <p:sldId id="616" r:id="rId19"/>
+    <p:sldId id="613" r:id="rId20"/>
+    <p:sldId id="614" r:id="rId21"/>
+    <p:sldId id="586" r:id="rId22"/>
+    <p:sldId id="594" r:id="rId23"/>
+    <p:sldId id="596" r:id="rId24"/>
+    <p:sldId id="603" r:id="rId25"/>
+    <p:sldId id="604" r:id="rId26"/>
+    <p:sldId id="605" r:id="rId27"/>
+    <p:sldId id="587" r:id="rId28"/>
+    <p:sldId id="597" r:id="rId29"/>
+    <p:sldId id="598" r:id="rId30"/>
+    <p:sldId id="588" r:id="rId31"/>
+    <p:sldId id="600" r:id="rId32"/>
+    <p:sldId id="601" r:id="rId33"/>
+    <p:sldId id="589" r:id="rId34"/>
+    <p:sldId id="606" r:id="rId35"/>
+    <p:sldId id="607" r:id="rId36"/>
+    <p:sldId id="590" r:id="rId37"/>
+    <p:sldId id="608" r:id="rId38"/>
+    <p:sldId id="609" r:id="rId39"/>
+    <p:sldId id="615" r:id="rId40"/>
+    <p:sldId id="612" r:id="rId41"/>
+    <p:sldId id="577" r:id="rId42"/>
   </p:sldIdLst>
   <p:sldSz cx="9144000" cy="5143500" type="screen16x9"/>
   <p:notesSz cx="9144000" cy="6858000"/>
@@ -233,7 +235,7 @@
           <a:p>
             <a:fld id="{E99333BE-0D34-4F62-BD6E-2C3B14663373}" type="datetimeFigureOut">
               <a:rPr lang="en-US" smtClean="0"/>
-              <a:t>9/3/13</a:t>
+              <a:t>9/4/2013</a:t>
             </a:fld>
             <a:endParaRPr lang="en-US"/>
           </a:p>
@@ -399,7 +401,7 @@
           <a:p>
             <a:fld id="{4A2D1F94-724F-43BD-B41B-43157E9B4550}" type="datetimeFigureOut">
               <a:rPr lang="en-US" smtClean="0"/>
-              <a:t>9/3/13</a:t>
+              <a:t>9/4/2013</a:t>
             </a:fld>
             <a:endParaRPr lang="en-US"/>
           </a:p>
@@ -732,6 +734,91 @@
           <a:lstStyle/>
           <a:p>
             <a:fld id="{36E82501-53DA-4152-84B0-51135B15EEA8}" type="slidenum">
+              <a:rPr lang="en-US" smtClean="0"/>
+              <a:pPr/>
+              <a:t>1</a:t>
+            </a:fld>
+            <a:endParaRPr lang="en-US"/>
+          </a:p>
+        </p:txBody>
+      </p:sp>
+    </p:spTree>
+    <p:extLst>
+      <p:ext uri="{BB962C8B-B14F-4D97-AF65-F5344CB8AC3E}">
+        <p14:creationId xmlns:p14="http://schemas.microsoft.com/office/powerpoint/2010/main" val="2014489554"/>
+      </p:ext>
+    </p:extLst>
+  </p:cSld>
+  <p:clrMapOvr>
+    <a:masterClrMapping/>
+  </p:clrMapOvr>
+</p:notes>
+</file>
+
+<file path=ppt/notesSlides/notesSlide2.xml><?xml version="1.0" encoding="utf-8"?>
+<p:notes xmlns:a="http://schemas.openxmlformats.org/drawingml/2006/main" xmlns:r="http://schemas.openxmlformats.org/officeDocument/2006/relationships" xmlns:p="http://schemas.openxmlformats.org/presentationml/2006/main">
+  <p:cSld>
+    <p:spTree>
+      <p:nvGrpSpPr>
+        <p:cNvPr id="1" name=""/>
+        <p:cNvGrpSpPr/>
+        <p:nvPr/>
+      </p:nvGrpSpPr>
+      <p:grpSpPr>
+        <a:xfrm>
+          <a:off x="0" y="0"/>
+          <a:ext cx="0" cy="0"/>
+          <a:chOff x="0" y="0"/>
+          <a:chExt cx="0" cy="0"/>
+        </a:xfrm>
+      </p:grpSpPr>
+      <p:sp>
+        <p:nvSpPr>
+          <p:cNvPr id="2" name="Slide Image Placeholder 1"/>
+          <p:cNvSpPr>
+            <a:spLocks noGrp="1" noRot="1" noChangeAspect="1"/>
+          </p:cNvSpPr>
+          <p:nvPr>
+            <p:ph type="sldImg"/>
+          </p:nvPr>
+        </p:nvSpPr>
+        <p:spPr/>
+      </p:sp>
+      <p:sp>
+        <p:nvSpPr>
+          <p:cNvPr id="3" name="Notes Placeholder 2"/>
+          <p:cNvSpPr>
+            <a:spLocks noGrp="1"/>
+          </p:cNvSpPr>
+          <p:nvPr>
+            <p:ph type="body" idx="1"/>
+          </p:nvPr>
+        </p:nvSpPr>
+        <p:spPr/>
+        <p:txBody>
+          <a:bodyPr/>
+          <a:lstStyle/>
+          <a:p>
+            <a:endParaRPr lang="en-US" dirty="0"/>
+          </a:p>
+        </p:txBody>
+      </p:sp>
+      <p:sp>
+        <p:nvSpPr>
+          <p:cNvPr id="4" name="Slide Number Placeholder 3"/>
+          <p:cNvSpPr>
+            <a:spLocks noGrp="1"/>
+          </p:cNvSpPr>
+          <p:nvPr>
+            <p:ph type="sldNum" sz="quarter" idx="10"/>
+          </p:nvPr>
+        </p:nvSpPr>
+        <p:spPr/>
+        <p:txBody>
+          <a:bodyPr/>
+          <a:lstStyle/>
+          <a:p>
+            <a:fld id="{36E82501-53DA-4152-84B0-51135B15EEA8}" type="slidenum">
               <a:rPr lang="en-US" smtClean="0">
                 <a:solidFill>
                   <a:prstClr val="black"/>
@@ -739,7 +826,7 @@
                 <a:latin typeface="Calibri"/>
               </a:rPr>
               <a:pPr/>
-              <a:t>1</a:t>
+              <a:t>2</a:t>
             </a:fld>
             <a:endParaRPr lang="en-US">
               <a:solidFill>
@@ -945,7 +1032,7 @@
   <p:timing>
     <p:tnLst>
       <p:par>
-        <p:cTn xmlns:p14="http://schemas.microsoft.com/office/powerpoint/2010/main" id="1" dur="indefinite" restart="never" nodeType="tmRoot"/>
+        <p:cTn id="1" dur="indefinite" restart="never" nodeType="tmRoot"/>
       </p:par>
     </p:tnLst>
   </p:timing>
@@ -1257,7 +1344,7 @@
   <p:timing>
     <p:tnLst>
       <p:par>
-        <p:cTn xmlns:p14="http://schemas.microsoft.com/office/powerpoint/2010/main" id="1" dur="indefinite" restart="never" nodeType="tmRoot"/>
+        <p:cTn id="1" dur="indefinite" restart="never" nodeType="tmRoot"/>
       </p:par>
     </p:tnLst>
   </p:timing>
@@ -1556,7 +1643,7 @@
   <p:timing>
     <p:tnLst>
       <p:par>
-        <p:cTn xmlns:p14="http://schemas.microsoft.com/office/powerpoint/2010/main" id="1" dur="indefinite" restart="never" nodeType="tmRoot"/>
+        <p:cTn id="1" dur="indefinite" restart="never" nodeType="tmRoot"/>
       </p:par>
     </p:tnLst>
   </p:timing>
@@ -1782,7 +1869,7 @@
   <p:timing>
     <p:tnLst>
       <p:par>
-        <p:cTn xmlns:p14="http://schemas.microsoft.com/office/powerpoint/2010/main" id="1" dur="indefinite" restart="never" nodeType="tmRoot"/>
+        <p:cTn id="1" dur="indefinite" restart="never" nodeType="tmRoot"/>
       </p:par>
     </p:tnLst>
   </p:timing>
@@ -1840,14 +1927,14 @@
             <a:noFill/>
           </a:ln>
           <a:extLst>
-            <a:ext uri="{909E8E84-426E-40dd-AFC4-6F175D3DCCD1}">
+            <a:ext uri="{909E8E84-426E-40DD-AFC4-6F175D3DCCD1}">
               <a14:hiddenFill xmlns:a14="http://schemas.microsoft.com/office/drawing/2010/main">
                 <a:solidFill>
                   <a:srgbClr val="FFFFFF"/>
                 </a:solidFill>
               </a14:hiddenFill>
             </a:ext>
-            <a:ext uri="{91240B29-F687-4f45-9708-019B960494DF}">
+            <a:ext uri="{91240B29-F687-4F45-9708-019B960494DF}">
               <a14:hiddenLine xmlns:a14="http://schemas.microsoft.com/office/drawing/2010/main" w="9525">
                 <a:solidFill>
                   <a:srgbClr val="000000"/>
@@ -1915,7 +2002,7 @@
   <p:timing>
     <p:tnLst>
       <p:par>
-        <p:cTn xmlns:p14="http://schemas.microsoft.com/office/powerpoint/2010/main" id="1" dur="indefinite" restart="never" nodeType="tmRoot"/>
+        <p:cTn id="1" dur="indefinite" restart="never" nodeType="tmRoot"/>
       </p:par>
     </p:tnLst>
   </p:timing>
@@ -1973,14 +2060,14 @@
             <a:noFill/>
           </a:ln>
           <a:extLst>
-            <a:ext uri="{909E8E84-426E-40dd-AFC4-6F175D3DCCD1}">
+            <a:ext uri="{909E8E84-426E-40DD-AFC4-6F175D3DCCD1}">
               <a14:hiddenFill xmlns:a14="http://schemas.microsoft.com/office/drawing/2010/main">
                 <a:solidFill>
                   <a:srgbClr val="FFFFFF"/>
                 </a:solidFill>
               </a14:hiddenFill>
             </a:ext>
-            <a:ext uri="{91240B29-F687-4f45-9708-019B960494DF}">
+            <a:ext uri="{91240B29-F687-4F45-9708-019B960494DF}">
               <a14:hiddenLine xmlns:a14="http://schemas.microsoft.com/office/drawing/2010/main" w="9525">
                 <a:solidFill>
                   <a:srgbClr val="000000"/>
@@ -2027,14 +2114,14 @@
             <a:noFill/>
           </a:ln>
           <a:extLst>
-            <a:ext uri="{909E8E84-426E-40dd-AFC4-6F175D3DCCD1}">
+            <a:ext uri="{909E8E84-426E-40DD-AFC4-6F175D3DCCD1}">
               <a14:hiddenFill xmlns:a14="http://schemas.microsoft.com/office/drawing/2010/main">
                 <a:solidFill>
                   <a:srgbClr val="FFFFFF"/>
                 </a:solidFill>
               </a14:hiddenFill>
             </a:ext>
-            <a:ext uri="{91240B29-F687-4f45-9708-019B960494DF}">
+            <a:ext uri="{91240B29-F687-4F45-9708-019B960494DF}">
               <a14:hiddenLine xmlns:a14="http://schemas.microsoft.com/office/drawing/2010/main" w="9525">
                 <a:solidFill>
                   <a:srgbClr val="000000"/>
@@ -2118,7 +2205,7 @@
   <p:timing>
     <p:tnLst>
       <p:par>
-        <p:cTn xmlns:p14="http://schemas.microsoft.com/office/powerpoint/2010/main" id="1" dur="indefinite" restart="never" nodeType="tmRoot"/>
+        <p:cTn id="1" dur="indefinite" restart="never" nodeType="tmRoot"/>
       </p:par>
     </p:tnLst>
   </p:timing>
@@ -2176,14 +2263,14 @@
             <a:noFill/>
           </a:ln>
           <a:extLst>
-            <a:ext uri="{909E8E84-426E-40dd-AFC4-6F175D3DCCD1}">
+            <a:ext uri="{909E8E84-426E-40DD-AFC4-6F175D3DCCD1}">
               <a14:hiddenFill xmlns:a14="http://schemas.microsoft.com/office/drawing/2010/main">
                 <a:solidFill>
                   <a:srgbClr val="FFFFFF"/>
                 </a:solidFill>
               </a14:hiddenFill>
             </a:ext>
-            <a:ext uri="{91240B29-F687-4f45-9708-019B960494DF}">
+            <a:ext uri="{91240B29-F687-4F45-9708-019B960494DF}">
               <a14:hiddenLine xmlns:a14="http://schemas.microsoft.com/office/drawing/2010/main" w="9525">
                 <a:solidFill>
                   <a:srgbClr val="000000"/>
@@ -2230,14 +2317,14 @@
             <a:noFill/>
           </a:ln>
           <a:extLst>
-            <a:ext uri="{909E8E84-426E-40dd-AFC4-6F175D3DCCD1}">
+            <a:ext uri="{909E8E84-426E-40DD-AFC4-6F175D3DCCD1}">
               <a14:hiddenFill xmlns:a14="http://schemas.microsoft.com/office/drawing/2010/main">
                 <a:solidFill>
                   <a:srgbClr val="FFFFFF"/>
                 </a:solidFill>
               </a14:hiddenFill>
             </a:ext>
-            <a:ext uri="{91240B29-F687-4f45-9708-019B960494DF}">
+            <a:ext uri="{91240B29-F687-4F45-9708-019B960494DF}">
               <a14:hiddenLine xmlns:a14="http://schemas.microsoft.com/office/drawing/2010/main" w="9525">
                 <a:solidFill>
                   <a:srgbClr val="000000"/>
@@ -2385,7 +2472,7 @@
   <p:timing>
     <p:tnLst>
       <p:par>
-        <p:cTn xmlns:p14="http://schemas.microsoft.com/office/powerpoint/2010/main" id="1" dur="indefinite" restart="never" nodeType="tmRoot"/>
+        <p:cTn id="1" dur="indefinite" restart="never" nodeType="tmRoot"/>
       </p:par>
     </p:tnLst>
   </p:timing>
@@ -2443,14 +2530,14 @@
             <a:noFill/>
           </a:ln>
           <a:extLst>
-            <a:ext uri="{909E8E84-426E-40dd-AFC4-6F175D3DCCD1}">
+            <a:ext uri="{909E8E84-426E-40DD-AFC4-6F175D3DCCD1}">
               <a14:hiddenFill xmlns:a14="http://schemas.microsoft.com/office/drawing/2010/main">
                 <a:solidFill>
                   <a:srgbClr val="FFFFFF"/>
                 </a:solidFill>
               </a14:hiddenFill>
             </a:ext>
-            <a:ext uri="{91240B29-F687-4f45-9708-019B960494DF}">
+            <a:ext uri="{91240B29-F687-4F45-9708-019B960494DF}">
               <a14:hiddenLine xmlns:a14="http://schemas.microsoft.com/office/drawing/2010/main" w="9525">
                 <a:solidFill>
                   <a:srgbClr val="000000"/>
@@ -2497,14 +2584,14 @@
             <a:noFill/>
           </a:ln>
           <a:extLst>
-            <a:ext uri="{909E8E84-426E-40dd-AFC4-6F175D3DCCD1}">
+            <a:ext uri="{909E8E84-426E-40DD-AFC4-6F175D3DCCD1}">
               <a14:hiddenFill xmlns:a14="http://schemas.microsoft.com/office/drawing/2010/main">
                 <a:solidFill>
                   <a:srgbClr val="FFFFFF"/>
                 </a:solidFill>
               </a14:hiddenFill>
             </a:ext>
-            <a:ext uri="{91240B29-F687-4f45-9708-019B960494DF}">
+            <a:ext uri="{91240B29-F687-4F45-9708-019B960494DF}">
               <a14:hiddenLine xmlns:a14="http://schemas.microsoft.com/office/drawing/2010/main" w="9525">
                 <a:solidFill>
                   <a:srgbClr val="000000"/>
@@ -2715,7 +2802,7 @@
   <p:timing>
     <p:tnLst>
       <p:par>
-        <p:cTn xmlns:p14="http://schemas.microsoft.com/office/powerpoint/2010/main" id="1" dur="indefinite" restart="never" nodeType="tmRoot"/>
+        <p:cTn id="1" dur="indefinite" restart="never" nodeType="tmRoot"/>
       </p:par>
     </p:tnLst>
   </p:timing>
@@ -2904,7 +2991,7 @@
   <p:timing>
     <p:tnLst>
       <p:par>
-        <p:cTn xmlns:p14="http://schemas.microsoft.com/office/powerpoint/2010/main" id="1" dur="indefinite" restart="never" nodeType="tmRoot"/>
+        <p:cTn id="1" dur="indefinite" restart="never" nodeType="tmRoot"/>
       </p:par>
     </p:tnLst>
   </p:timing>
@@ -3096,7 +3183,7 @@
   <p:timing>
     <p:tnLst>
       <p:par>
-        <p:cTn xmlns:p14="http://schemas.microsoft.com/office/powerpoint/2010/main" id="1" dur="indefinite" restart="never" nodeType="tmRoot"/>
+        <p:cTn id="1" dur="indefinite" restart="never" nodeType="tmRoot"/>
       </p:par>
     </p:tnLst>
   </p:timing>
@@ -3503,7 +3590,7 @@
   <p:timing>
     <p:tnLst>
       <p:par>
-        <p:cTn xmlns:p14="http://schemas.microsoft.com/office/powerpoint/2010/main" id="1" dur="indefinite" restart="never" nodeType="tmRoot">
+        <p:cTn id="1" dur="indefinite" restart="never" nodeType="tmRoot">
           <p:childTnLst>
             <p:seq concurrent="1" nextAc="seek">
               <p:cTn id="2" dur="indefinite" nodeType="mainSeq">
@@ -3635,7 +3722,7 @@
           <p:tmpl lvl="1">
             <p:tnLst>
               <p:par>
-                <p:cTn xmlns:p14="http://schemas.microsoft.com/office/powerpoint/2010/main" presetID="10" presetClass="entr" presetSubtype="0" fill="hold" nodeType="withEffect">
+                <p:cTn presetID="10" presetClass="entr" presetSubtype="0" fill="hold" nodeType="withEffect">
                   <p:stCondLst>
                     <p:cond delay="1000"/>
                   </p:stCondLst>
@@ -3863,7 +3950,7 @@
   <p:timing>
     <p:tnLst>
       <p:par>
-        <p:cTn xmlns:p14="http://schemas.microsoft.com/office/powerpoint/2010/main" id="1" dur="indefinite" restart="never" nodeType="tmRoot"/>
+        <p:cTn id="1" dur="indefinite" restart="never" nodeType="tmRoot"/>
       </p:par>
     </p:tnLst>
   </p:timing>
@@ -4221,7 +4308,7 @@
   <p:timing>
     <p:tnLst>
       <p:par>
-        <p:cTn xmlns:p14="http://schemas.microsoft.com/office/powerpoint/2010/main" id="1" dur="indefinite" restart="never" nodeType="tmRoot">
+        <p:cTn id="1" dur="indefinite" restart="never" nodeType="tmRoot">
           <p:childTnLst>
             <p:seq concurrent="1" nextAc="seek">
               <p:cTn id="2" dur="indefinite" nodeType="mainSeq">
@@ -4353,7 +4440,7 @@
           <p:tmpl lvl="1">
             <p:tnLst>
               <p:par>
-                <p:cTn xmlns:p14="http://schemas.microsoft.com/office/powerpoint/2010/main" presetID="10" presetClass="entr" presetSubtype="0" fill="hold" nodeType="withEffect">
+                <p:cTn presetID="10" presetClass="entr" presetSubtype="0" fill="hold" nodeType="withEffect">
                   <p:stCondLst>
                     <p:cond delay="1000"/>
                   </p:stCondLst>
@@ -4604,7 +4691,7 @@
   <p:timing>
     <p:tnLst>
       <p:par>
-        <p:cTn xmlns:p14="http://schemas.microsoft.com/office/powerpoint/2010/main" id="1" dur="indefinite" restart="never" nodeType="tmRoot"/>
+        <p:cTn id="1" dur="indefinite" restart="never" nodeType="tmRoot"/>
       </p:par>
     </p:tnLst>
   </p:timing>
@@ -4845,7 +4932,7 @@
   <p:timing>
     <p:tnLst>
       <p:par>
-        <p:cTn xmlns:p14="http://schemas.microsoft.com/office/powerpoint/2010/main" id="1" dur="indefinite" restart="never" nodeType="tmRoot"/>
+        <p:cTn id="1" dur="indefinite" restart="never" nodeType="tmRoot"/>
       </p:par>
     </p:tnLst>
   </p:timing>
@@ -5054,7 +5141,7 @@
   <p:timing>
     <p:tnLst>
       <p:par>
-        <p:cTn xmlns:p14="http://schemas.microsoft.com/office/powerpoint/2010/main" id="1" dur="indefinite" restart="never" nodeType="tmRoot"/>
+        <p:cTn id="1" dur="indefinite" restart="never" nodeType="tmRoot"/>
       </p:par>
     </p:tnLst>
   </p:timing>
@@ -5301,7 +5388,7 @@
   <p:timing>
     <p:tnLst>
       <p:par>
-        <p:cTn xmlns:p14="http://schemas.microsoft.com/office/powerpoint/2010/main" id="1" dur="indefinite" restart="never" nodeType="tmRoot"/>
+        <p:cTn id="1" dur="indefinite" restart="never" nodeType="tmRoot"/>
       </p:par>
     </p:tnLst>
   </p:timing>
@@ -5531,7 +5618,7 @@
   <p:timing>
     <p:tnLst>
       <p:par>
-        <p:cTn xmlns:p14="http://schemas.microsoft.com/office/powerpoint/2010/main" id="1" dur="indefinite" restart="never" nodeType="tmRoot"/>
+        <p:cTn id="1" dur="indefinite" restart="never" nodeType="tmRoot"/>
       </p:par>
     </p:tnLst>
   </p:timing>
@@ -5843,7 +5930,7 @@
   <p:timing>
     <p:tnLst>
       <p:par>
-        <p:cTn xmlns:p14="http://schemas.microsoft.com/office/powerpoint/2010/main" id="1" dur="indefinite" restart="never" nodeType="tmRoot"/>
+        <p:cTn id="1" dur="indefinite" restart="never" nodeType="tmRoot"/>
       </p:par>
     </p:tnLst>
   </p:timing>
@@ -6142,7 +6229,7 @@
   <p:timing>
     <p:tnLst>
       <p:par>
-        <p:cTn xmlns:p14="http://schemas.microsoft.com/office/powerpoint/2010/main" id="1" dur="indefinite" restart="never" nodeType="tmRoot"/>
+        <p:cTn id="1" dur="indefinite" restart="never" nodeType="tmRoot"/>
       </p:par>
     </p:tnLst>
   </p:timing>
@@ -6368,7 +6455,7 @@
   <p:timing>
     <p:tnLst>
       <p:par>
-        <p:cTn xmlns:p14="http://schemas.microsoft.com/office/powerpoint/2010/main" id="1" dur="indefinite" restart="never" nodeType="tmRoot"/>
+        <p:cTn id="1" dur="indefinite" restart="never" nodeType="tmRoot"/>
       </p:par>
     </p:tnLst>
   </p:timing>
@@ -6426,14 +6513,14 @@
             <a:noFill/>
           </a:ln>
           <a:extLst>
-            <a:ext uri="{909E8E84-426E-40dd-AFC4-6F175D3DCCD1}">
+            <a:ext uri="{909E8E84-426E-40DD-AFC4-6F175D3DCCD1}">
               <a14:hiddenFill xmlns:a14="http://schemas.microsoft.com/office/drawing/2010/main">
                 <a:solidFill>
                   <a:srgbClr val="FFFFFF"/>
                 </a:solidFill>
               </a14:hiddenFill>
             </a:ext>
-            <a:ext uri="{91240B29-F687-4f45-9708-019B960494DF}">
+            <a:ext uri="{91240B29-F687-4F45-9708-019B960494DF}">
               <a14:hiddenLine xmlns:a14="http://schemas.microsoft.com/office/drawing/2010/main" w="9525">
                 <a:solidFill>
                   <a:srgbClr val="000000"/>
@@ -6501,7 +6588,7 @@
   <p:timing>
     <p:tnLst>
       <p:par>
-        <p:cTn xmlns:p14="http://schemas.microsoft.com/office/powerpoint/2010/main" id="1" dur="indefinite" restart="never" nodeType="tmRoot"/>
+        <p:cTn id="1" dur="indefinite" restart="never" nodeType="tmRoot"/>
       </p:par>
     </p:tnLst>
   </p:timing>
@@ -6908,7 +6995,7 @@
   <p:timing>
     <p:tnLst>
       <p:par>
-        <p:cTn xmlns:p14="http://schemas.microsoft.com/office/powerpoint/2010/main" id="1" dur="indefinite" restart="never" nodeType="tmRoot">
+        <p:cTn id="1" dur="indefinite" restart="never" nodeType="tmRoot">
           <p:childTnLst>
             <p:seq concurrent="1" nextAc="seek">
               <p:cTn id="2" dur="indefinite" nodeType="mainSeq">
@@ -7040,7 +7127,7 @@
           <p:tmpl lvl="1">
             <p:tnLst>
               <p:par>
-                <p:cTn xmlns:p14="http://schemas.microsoft.com/office/powerpoint/2010/main" presetID="10" presetClass="entr" presetSubtype="0" fill="hold" nodeType="withEffect">
+                <p:cTn presetID="10" presetClass="entr" presetSubtype="0" fill="hold" nodeType="withEffect">
                   <p:stCondLst>
                     <p:cond delay="1000"/>
                   </p:stCondLst>
@@ -7134,14 +7221,14 @@
             <a:noFill/>
           </a:ln>
           <a:extLst>
-            <a:ext uri="{909E8E84-426E-40dd-AFC4-6F175D3DCCD1}">
+            <a:ext uri="{909E8E84-426E-40DD-AFC4-6F175D3DCCD1}">
               <a14:hiddenFill xmlns:a14="http://schemas.microsoft.com/office/drawing/2010/main">
                 <a:solidFill>
                   <a:srgbClr val="FFFFFF"/>
                 </a:solidFill>
               </a14:hiddenFill>
             </a:ext>
-            <a:ext uri="{91240B29-F687-4f45-9708-019B960494DF}">
+            <a:ext uri="{91240B29-F687-4F45-9708-019B960494DF}">
               <a14:hiddenLine xmlns:a14="http://schemas.microsoft.com/office/drawing/2010/main" w="9525">
                 <a:solidFill>
                   <a:srgbClr val="000000"/>
@@ -7188,14 +7275,14 @@
             <a:noFill/>
           </a:ln>
           <a:extLst>
-            <a:ext uri="{909E8E84-426E-40dd-AFC4-6F175D3DCCD1}">
+            <a:ext uri="{909E8E84-426E-40DD-AFC4-6F175D3DCCD1}">
               <a14:hiddenFill xmlns:a14="http://schemas.microsoft.com/office/drawing/2010/main">
                 <a:solidFill>
                   <a:srgbClr val="FFFFFF"/>
                 </a:solidFill>
               </a14:hiddenFill>
             </a:ext>
-            <a:ext uri="{91240B29-F687-4f45-9708-019B960494DF}">
+            <a:ext uri="{91240B29-F687-4F45-9708-019B960494DF}">
               <a14:hiddenLine xmlns:a14="http://schemas.microsoft.com/office/drawing/2010/main" w="9525">
                 <a:solidFill>
                   <a:srgbClr val="000000"/>
@@ -7279,7 +7366,7 @@
   <p:timing>
     <p:tnLst>
       <p:par>
-        <p:cTn xmlns:p14="http://schemas.microsoft.com/office/powerpoint/2010/main" id="1" dur="indefinite" restart="never" nodeType="tmRoot"/>
+        <p:cTn id="1" dur="indefinite" restart="never" nodeType="tmRoot"/>
       </p:par>
     </p:tnLst>
   </p:timing>
@@ -7337,14 +7424,14 @@
             <a:noFill/>
           </a:ln>
           <a:extLst>
-            <a:ext uri="{909E8E84-426E-40dd-AFC4-6F175D3DCCD1}">
+            <a:ext uri="{909E8E84-426E-40DD-AFC4-6F175D3DCCD1}">
               <a14:hiddenFill xmlns:a14="http://schemas.microsoft.com/office/drawing/2010/main">
                 <a:solidFill>
                   <a:srgbClr val="FFFFFF"/>
                 </a:solidFill>
               </a14:hiddenFill>
             </a:ext>
-            <a:ext uri="{91240B29-F687-4f45-9708-019B960494DF}">
+            <a:ext uri="{91240B29-F687-4F45-9708-019B960494DF}">
               <a14:hiddenLine xmlns:a14="http://schemas.microsoft.com/office/drawing/2010/main" w="9525">
                 <a:solidFill>
                   <a:srgbClr val="000000"/>
@@ -7391,14 +7478,14 @@
             <a:noFill/>
           </a:ln>
           <a:extLst>
-            <a:ext uri="{909E8E84-426E-40dd-AFC4-6F175D3DCCD1}">
+            <a:ext uri="{909E8E84-426E-40DD-AFC4-6F175D3DCCD1}">
               <a14:hiddenFill xmlns:a14="http://schemas.microsoft.com/office/drawing/2010/main">
                 <a:solidFill>
                   <a:srgbClr val="FFFFFF"/>
                 </a:solidFill>
               </a14:hiddenFill>
             </a:ext>
-            <a:ext uri="{91240B29-F687-4f45-9708-019B960494DF}">
+            <a:ext uri="{91240B29-F687-4F45-9708-019B960494DF}">
               <a14:hiddenLine xmlns:a14="http://schemas.microsoft.com/office/drawing/2010/main" w="9525">
                 <a:solidFill>
                   <a:srgbClr val="000000"/>
@@ -7546,7 +7633,7 @@
   <p:timing>
     <p:tnLst>
       <p:par>
-        <p:cTn xmlns:p14="http://schemas.microsoft.com/office/powerpoint/2010/main" id="1" dur="indefinite" restart="never" nodeType="tmRoot"/>
+        <p:cTn id="1" dur="indefinite" restart="never" nodeType="tmRoot"/>
       </p:par>
     </p:tnLst>
   </p:timing>
@@ -7604,14 +7691,14 @@
             <a:noFill/>
           </a:ln>
           <a:extLst>
-            <a:ext uri="{909E8E84-426E-40dd-AFC4-6F175D3DCCD1}">
+            <a:ext uri="{909E8E84-426E-40DD-AFC4-6F175D3DCCD1}">
               <a14:hiddenFill xmlns:a14="http://schemas.microsoft.com/office/drawing/2010/main">
                 <a:solidFill>
                   <a:srgbClr val="FFFFFF"/>
                 </a:solidFill>
               </a14:hiddenFill>
             </a:ext>
-            <a:ext uri="{91240B29-F687-4f45-9708-019B960494DF}">
+            <a:ext uri="{91240B29-F687-4F45-9708-019B960494DF}">
               <a14:hiddenLine xmlns:a14="http://schemas.microsoft.com/office/drawing/2010/main" w="9525">
                 <a:solidFill>
                   <a:srgbClr val="000000"/>
@@ -7658,14 +7745,14 @@
             <a:noFill/>
           </a:ln>
           <a:extLst>
-            <a:ext uri="{909E8E84-426E-40dd-AFC4-6F175D3DCCD1}">
+            <a:ext uri="{909E8E84-426E-40DD-AFC4-6F175D3DCCD1}">
               <a14:hiddenFill xmlns:a14="http://schemas.microsoft.com/office/drawing/2010/main">
                 <a:solidFill>
                   <a:srgbClr val="FFFFFF"/>
                 </a:solidFill>
               </a14:hiddenFill>
             </a:ext>
-            <a:ext uri="{91240B29-F687-4f45-9708-019B960494DF}">
+            <a:ext uri="{91240B29-F687-4F45-9708-019B960494DF}">
               <a14:hiddenLine xmlns:a14="http://schemas.microsoft.com/office/drawing/2010/main" w="9525">
                 <a:solidFill>
                   <a:srgbClr val="000000"/>
@@ -7876,7 +7963,7 @@
   <p:timing>
     <p:tnLst>
       <p:par>
-        <p:cTn xmlns:p14="http://schemas.microsoft.com/office/powerpoint/2010/main" id="1" dur="indefinite" restart="never" nodeType="tmRoot"/>
+        <p:cTn id="1" dur="indefinite" restart="never" nodeType="tmRoot"/>
       </p:par>
     </p:tnLst>
   </p:timing>
@@ -8234,7 +8321,7 @@
   <p:timing>
     <p:tnLst>
       <p:par>
-        <p:cTn xmlns:p14="http://schemas.microsoft.com/office/powerpoint/2010/main" id="1" dur="indefinite" restart="never" nodeType="tmRoot">
+        <p:cTn id="1" dur="indefinite" restart="never" nodeType="tmRoot">
           <p:childTnLst>
             <p:seq concurrent="1" nextAc="seek">
               <p:cTn id="2" dur="indefinite" nodeType="mainSeq">
@@ -8366,7 +8453,7 @@
           <p:tmpl lvl="1">
             <p:tnLst>
               <p:par>
-                <p:cTn xmlns:p14="http://schemas.microsoft.com/office/powerpoint/2010/main" presetID="10" presetClass="entr" presetSubtype="0" fill="hold" nodeType="withEffect">
+                <p:cTn presetID="10" presetClass="entr" presetSubtype="0" fill="hold" nodeType="withEffect">
                   <p:stCondLst>
                     <p:cond delay="1000"/>
                   </p:stCondLst>
@@ -8617,7 +8704,7 @@
   <p:timing>
     <p:tnLst>
       <p:par>
-        <p:cTn xmlns:p14="http://schemas.microsoft.com/office/powerpoint/2010/main" id="1" dur="indefinite" restart="never" nodeType="tmRoot"/>
+        <p:cTn id="1" dur="indefinite" restart="never" nodeType="tmRoot"/>
       </p:par>
     </p:tnLst>
   </p:timing>
@@ -8858,7 +8945,7 @@
   <p:timing>
     <p:tnLst>
       <p:par>
-        <p:cTn xmlns:p14="http://schemas.microsoft.com/office/powerpoint/2010/main" id="1" dur="indefinite" restart="never" nodeType="tmRoot"/>
+        <p:cTn id="1" dur="indefinite" restart="never" nodeType="tmRoot"/>
       </p:par>
     </p:tnLst>
   </p:timing>
@@ -9067,7 +9154,7 @@
   <p:timing>
     <p:tnLst>
       <p:par>
-        <p:cTn xmlns:p14="http://schemas.microsoft.com/office/powerpoint/2010/main" id="1" dur="indefinite" restart="never" nodeType="tmRoot"/>
+        <p:cTn id="1" dur="indefinite" restart="never" nodeType="tmRoot"/>
       </p:par>
     </p:tnLst>
   </p:timing>
@@ -9314,7 +9401,7 @@
   <p:timing>
     <p:tnLst>
       <p:par>
-        <p:cTn xmlns:p14="http://schemas.microsoft.com/office/powerpoint/2010/main" id="1" dur="indefinite" restart="never" nodeType="tmRoot"/>
+        <p:cTn id="1" dur="indefinite" restart="never" nodeType="tmRoot"/>
       </p:par>
     </p:tnLst>
   </p:timing>
@@ -9544,7 +9631,7 @@
   <p:timing>
     <p:tnLst>
       <p:par>
-        <p:cTn xmlns:p14="http://schemas.microsoft.com/office/powerpoint/2010/main" id="1" dur="indefinite" restart="never" nodeType="tmRoot"/>
+        <p:cTn id="1" dur="indefinite" restart="never" nodeType="tmRoot"/>
       </p:par>
     </p:tnLst>
   </p:timing>
@@ -9727,14 +9814,14 @@
               <a:noFill/>
             </a:ln>
             <a:extLst>
-              <a:ext uri="{909E8E84-426E-40dd-AFC4-6F175D3DCCD1}">
+              <a:ext uri="{909E8E84-426E-40DD-AFC4-6F175D3DCCD1}">
                 <a14:hiddenFill xmlns:a14="http://schemas.microsoft.com/office/drawing/2010/main">
                   <a:solidFill>
                     <a:srgbClr val="FFFFFF"/>
                   </a:solidFill>
                 </a14:hiddenFill>
               </a:ext>
-              <a:ext uri="{91240B29-F687-4f45-9708-019B960494DF}">
+              <a:ext uri="{91240B29-F687-4F45-9708-019B960494DF}">
                 <a14:hiddenLine xmlns:a14="http://schemas.microsoft.com/office/drawing/2010/main" w="9525">
                   <a:solidFill>
                     <a:srgbClr val="000000"/>
@@ -10070,7 +10157,7 @@
             </a:prstGeom>
             <a:noFill/>
             <a:extLst>
-              <a:ext uri="{909E8E84-426E-40dd-AFC4-6F175D3DCCD1}">
+              <a:ext uri="{909E8E84-426E-40DD-AFC4-6F175D3DCCD1}">
                 <a14:hiddenFill xmlns:a14="http://schemas.microsoft.com/office/drawing/2010/main">
                   <a:solidFill>
                     <a:srgbClr val="FFFFFF"/>
@@ -10152,7 +10239,7 @@
   <p:timing>
     <p:tnLst>
       <p:par>
-        <p:cTn xmlns:p14="http://schemas.microsoft.com/office/powerpoint/2010/main" id="1" dur="indefinite" restart="never" nodeType="tmRoot"/>
+        <p:cTn id="1" dur="indefinite" restart="never" nodeType="tmRoot"/>
       </p:par>
     </p:tnLst>
   </p:timing>
@@ -10618,14 +10705,14 @@
               <a:noFill/>
             </a:ln>
             <a:extLst>
-              <a:ext uri="{909E8E84-426E-40dd-AFC4-6F175D3DCCD1}">
+              <a:ext uri="{909E8E84-426E-40DD-AFC4-6F175D3DCCD1}">
                 <a14:hiddenFill xmlns:a14="http://schemas.microsoft.com/office/drawing/2010/main">
                   <a:solidFill>
                     <a:srgbClr val="FFFFFF"/>
                   </a:solidFill>
                 </a14:hiddenFill>
               </a:ext>
-              <a:ext uri="{91240B29-F687-4f45-9708-019B960494DF}">
+              <a:ext uri="{91240B29-F687-4F45-9708-019B960494DF}">
                 <a14:hiddenLine xmlns:a14="http://schemas.microsoft.com/office/drawing/2010/main" w="9525">
                   <a:solidFill>
                     <a:srgbClr val="000000"/>
@@ -10961,7 +11048,7 @@
             </a:prstGeom>
             <a:noFill/>
             <a:extLst>
-              <a:ext uri="{909E8E84-426E-40dd-AFC4-6F175D3DCCD1}">
+              <a:ext uri="{909E8E84-426E-40DD-AFC4-6F175D3DCCD1}">
                 <a14:hiddenFill xmlns:a14="http://schemas.microsoft.com/office/drawing/2010/main">
                   <a:solidFill>
                     <a:srgbClr val="FFFFFF"/>
@@ -11043,7 +11130,7 @@
   <p:timing>
     <p:tnLst>
       <p:par>
-        <p:cTn xmlns:p14="http://schemas.microsoft.com/office/powerpoint/2010/main" id="1" dur="indefinite" restart="never" nodeType="tmRoot"/>
+        <p:cTn id="1" dur="indefinite" restart="never" nodeType="tmRoot"/>
       </p:par>
     </p:tnLst>
   </p:timing>
@@ -11350,91 +11437,10 @@
           <a:chExt cx="0" cy="0"/>
         </a:xfrm>
       </p:grpSpPr>
-      <p:sp>
-        <p:nvSpPr>
-          <p:cNvPr id="7" name="Title 6"/>
-          <p:cNvSpPr>
-            <a:spLocks noGrp="1"/>
-          </p:cNvSpPr>
-          <p:nvPr>
-            <p:ph type="title"/>
-          </p:nvPr>
-        </p:nvSpPr>
-        <p:spPr>
-          <a:xfrm>
-            <a:off x="386634" y="1583267"/>
-            <a:ext cx="5385112" cy="1230657"/>
-          </a:xfrm>
-        </p:spPr>
-        <p:txBody>
-          <a:bodyPr/>
-          <a:lstStyle/>
-          <a:p>
-            <a:r>
-              <a:rPr lang="en-US" sz="2400" b="0" dirty="0"/>
-              <a:t>10 Tips for Java EE 7 with PrimeFaces</a:t>
-            </a:r>
-            <a:endParaRPr lang="en-US" sz="2400" dirty="0"/>
-          </a:p>
-        </p:txBody>
-      </p:sp>
-      <p:sp>
-        <p:nvSpPr>
-          <p:cNvPr id="8" name="Text Placeholder 7"/>
-          <p:cNvSpPr>
-            <a:spLocks noGrp="1"/>
-          </p:cNvSpPr>
-          <p:nvPr>
-            <p:ph type="body" sz="quarter" idx="13"/>
-          </p:nvPr>
-        </p:nvSpPr>
-        <p:spPr>
-          <a:xfrm>
-            <a:off x="411939" y="2914276"/>
-            <a:ext cx="5027083" cy="1048124"/>
-          </a:xfrm>
-        </p:spPr>
-        <p:txBody>
-          <a:bodyPr/>
-          <a:lstStyle/>
-          <a:p>
-            <a:r>
-              <a:rPr lang="en-US" dirty="0" smtClean="0"/>
-              <a:t>Mert Çalışkan		&amp;		Martin </a:t>
-            </a:r>
-            <a:r>
-              <a:rPr lang="en-US" dirty="0" err="1" smtClean="0"/>
-              <a:t>Fousek</a:t>
-            </a:r>
-            <a:endParaRPr lang="en-US" dirty="0"/>
-          </a:p>
-          <a:p>
-            <a:r>
-              <a:rPr lang="en-US" sz="1600" dirty="0" smtClean="0"/>
-              <a:t>Software Architect    		Software Developer</a:t>
-            </a:r>
-          </a:p>
-          <a:p>
-            <a:r>
-              <a:rPr lang="en-US" sz="1600" dirty="0" smtClean="0"/>
-              <a:t>		 at T2 </a:t>
-            </a:r>
-            <a:r>
-              <a:rPr lang="en-US" sz="1600" dirty="0" err="1" smtClean="0"/>
-              <a:t>Yazılım</a:t>
-            </a:r>
-            <a:r>
-              <a:rPr lang="en-US" sz="1600" dirty="0" smtClean="0"/>
-              <a:t> Ltd.			at Oracle, NetBeans</a:t>
-            </a:r>
-            <a:endParaRPr lang="en-US" sz="1600" dirty="0"/>
-          </a:p>
-        </p:txBody>
-      </p:sp>
     </p:spTree>
     <p:extLst>
       <p:ext uri="{BB962C8B-B14F-4D97-AF65-F5344CB8AC3E}">
-        <p14:creationId xmlns:p14="http://schemas.microsoft.com/office/powerpoint/2010/main" val="782494894"/>
+        <p14:creationId xmlns:p14="http://schemas.microsoft.com/office/powerpoint/2010/main" val="437896463"/>
       </p:ext>
     </p:extLst>
   </p:cSld>
@@ -11456,7 +11462,7 @@
   <p:timing>
     <p:tnLst>
       <p:par>
-        <p:cTn xmlns:p14="http://schemas.microsoft.com/office/powerpoint/2010/main" id="1" dur="indefinite" restart="never" nodeType="tmRoot"/>
+        <p:cTn id="1" dur="indefinite" restart="never" nodeType="tmRoot"/>
       </p:par>
     </p:tnLst>
   </p:timing>
@@ -11464,6 +11470,242 @@
 </file>
 
 <file path=ppt/slides/slide10.xml><?xml version="1.0" encoding="utf-8"?>
+<p:sld xmlns:a="http://schemas.openxmlformats.org/drawingml/2006/main" xmlns:r="http://schemas.openxmlformats.org/officeDocument/2006/relationships" xmlns:p="http://schemas.openxmlformats.org/presentationml/2006/main">
+  <p:cSld>
+    <p:spTree>
+      <p:nvGrpSpPr>
+        <p:cNvPr id="1" name=""/>
+        <p:cNvGrpSpPr/>
+        <p:nvPr/>
+      </p:nvGrpSpPr>
+      <p:grpSpPr>
+        <a:xfrm>
+          <a:off x="0" y="0"/>
+          <a:ext cx="0" cy="0"/>
+          <a:chOff x="0" y="0"/>
+          <a:chExt cx="0" cy="0"/>
+        </a:xfrm>
+      </p:grpSpPr>
+      <p:sp>
+        <p:nvSpPr>
+          <p:cNvPr id="35" name="Content Placeholder 34"/>
+          <p:cNvSpPr>
+            <a:spLocks noGrp="1"/>
+          </p:cNvSpPr>
+          <p:nvPr>
+            <p:ph type="body" sz="quarter" idx="11"/>
+          </p:nvPr>
+        </p:nvSpPr>
+        <p:spPr/>
+        <p:txBody>
+          <a:bodyPr>
+            <a:normAutofit fontScale="92500" lnSpcReduction="10000"/>
+          </a:bodyPr>
+          <a:lstStyle/>
+          <a:p>
+            <a:r>
+              <a:rPr lang="en-US" dirty="0" smtClean="0"/>
+              <a:t>Form with usage of HTML friendly markup: validation by Bean Validation API with localized messages, custom Bean Validation annotation, passthrough attributes and elements, usage of jQuery plugin </a:t>
+            </a:r>
+            <a:r>
+              <a:rPr lang="en-US" dirty="0" smtClean="0"/>
+              <a:t>at JSF </a:t>
+            </a:r>
+            <a:r>
+              <a:rPr lang="en-US" dirty="0" smtClean="0"/>
+              <a:t>component.</a:t>
+            </a:r>
+            <a:endParaRPr lang="en-US" dirty="0"/>
+          </a:p>
+          <a:p>
+            <a:endParaRPr lang="en-US" dirty="0" smtClean="0"/>
+          </a:p>
+          <a:p>
+            <a:endParaRPr lang="en-US" dirty="0" smtClean="0"/>
+          </a:p>
+        </p:txBody>
+      </p:sp>
+      <p:sp>
+        <p:nvSpPr>
+          <p:cNvPr id="2" name="Text Placeholder 1"/>
+          <p:cNvSpPr>
+            <a:spLocks noGrp="1"/>
+          </p:cNvSpPr>
+          <p:nvPr>
+            <p:ph type="body" sz="quarter" idx="16"/>
+          </p:nvPr>
+        </p:nvSpPr>
+        <p:spPr/>
+        <p:txBody>
+          <a:bodyPr/>
+          <a:lstStyle/>
+          <a:p>
+            <a:r>
+              <a:rPr lang="en-US" dirty="0" smtClean="0"/>
+              <a:t>01-HtmlFriendlyMarkup</a:t>
+            </a:r>
+            <a:endParaRPr lang="en-US" dirty="0"/>
+          </a:p>
+        </p:txBody>
+      </p:sp>
+      <p:sp>
+        <p:nvSpPr>
+          <p:cNvPr id="3" name="Text Placeholder 2"/>
+          <p:cNvSpPr>
+            <a:spLocks noGrp="1"/>
+          </p:cNvSpPr>
+          <p:nvPr>
+            <p:ph type="body" sz="quarter" idx="17"/>
+          </p:nvPr>
+        </p:nvSpPr>
+        <p:spPr/>
+        <p:txBody>
+          <a:bodyPr/>
+          <a:lstStyle/>
+          <a:p>
+            <a:r>
+              <a:rPr lang="en-US" dirty="0"/>
+              <a:t>https://github.com/marfous/j1demo-pf</a:t>
+            </a:r>
+          </a:p>
+        </p:txBody>
+      </p:sp>
+      <p:sp>
+        <p:nvSpPr>
+          <p:cNvPr id="25" name="Title 24"/>
+          <p:cNvSpPr>
+            <a:spLocks noGrp="1"/>
+          </p:cNvSpPr>
+          <p:nvPr>
+            <p:ph type="title" idx="4294967295"/>
+          </p:nvPr>
+        </p:nvSpPr>
+        <p:spPr>
+          <a:xfrm>
+            <a:off x="914400" y="246063"/>
+            <a:ext cx="8229600" cy="768350"/>
+          </a:xfrm>
+        </p:spPr>
+        <p:txBody>
+          <a:bodyPr/>
+          <a:lstStyle/>
+          <a:p>
+            <a:r>
+              <a:rPr lang="en-US" dirty="0"/>
+              <a:t>HTML(5) Friendly Markup</a:t>
+            </a:r>
+          </a:p>
+        </p:txBody>
+      </p:sp>
+    </p:spTree>
+    <p:extLst>
+      <p:ext uri="{BB962C8B-B14F-4D97-AF65-F5344CB8AC3E}">
+        <p14:creationId xmlns:p14="http://schemas.microsoft.com/office/powerpoint/2010/main" val="3210850429"/>
+      </p:ext>
+    </p:extLst>
+  </p:cSld>
+  <p:clrMapOvr>
+    <a:masterClrMapping/>
+  </p:clrMapOvr>
+  <mc:AlternateContent xmlns:mc="http://schemas.openxmlformats.org/markup-compatibility/2006" xmlns:p14="http://schemas.microsoft.com/office/powerpoint/2010/main">
+    <mc:Choice Requires="p14">
+      <p:transition spd="med" p14:dur="700">
+        <p:fade/>
+      </p:transition>
+    </mc:Choice>
+    <mc:Fallback xmlns="">
+      <p:transition spd="med">
+        <p:fade/>
+      </p:transition>
+    </mc:Fallback>
+  </mc:AlternateContent>
+  <p:timing>
+    <p:tnLst>
+      <p:par>
+        <p:cTn id="1" dur="indefinite" restart="never" nodeType="tmRoot"/>
+      </p:par>
+    </p:tnLst>
+  </p:timing>
+</p:sld>
+</file>
+
+<file path=ppt/slides/slide11.xml><?xml version="1.0" encoding="utf-8"?>
+<p:sld xmlns:a="http://schemas.openxmlformats.org/drawingml/2006/main" xmlns:r="http://schemas.openxmlformats.org/officeDocument/2006/relationships" xmlns:p="http://schemas.openxmlformats.org/presentationml/2006/main">
+  <p:cSld>
+    <p:spTree>
+      <p:nvGrpSpPr>
+        <p:cNvPr id="1" name=""/>
+        <p:cNvGrpSpPr/>
+        <p:nvPr/>
+      </p:nvGrpSpPr>
+      <p:grpSpPr>
+        <a:xfrm>
+          <a:off x="0" y="0"/>
+          <a:ext cx="0" cy="0"/>
+          <a:chOff x="0" y="0"/>
+          <a:chExt cx="0" cy="0"/>
+        </a:xfrm>
+      </p:grpSpPr>
+      <p:sp>
+        <p:nvSpPr>
+          <p:cNvPr id="5" name="Title 4"/>
+          <p:cNvSpPr>
+            <a:spLocks noGrp="1"/>
+          </p:cNvSpPr>
+          <p:nvPr>
+            <p:ph type="title"/>
+          </p:nvPr>
+        </p:nvSpPr>
+        <p:spPr/>
+        <p:txBody>
+          <a:bodyPr/>
+          <a:lstStyle/>
+          <a:p>
+            <a:r>
+              <a:rPr lang="en-US" dirty="0"/>
+              <a:t>Resource Libraries </a:t>
+            </a:r>
+            <a:r>
+              <a:rPr lang="en-US" dirty="0" smtClean="0"/>
+              <a:t>Contracts</a:t>
+            </a:r>
+            <a:endParaRPr lang="en-US" dirty="0"/>
+          </a:p>
+        </p:txBody>
+      </p:sp>
+    </p:spTree>
+    <p:extLst>
+      <p:ext uri="{BB962C8B-B14F-4D97-AF65-F5344CB8AC3E}">
+        <p14:creationId xmlns:p14="http://schemas.microsoft.com/office/powerpoint/2010/main" val="1029177638"/>
+      </p:ext>
+    </p:extLst>
+  </p:cSld>
+  <p:clrMapOvr>
+    <a:masterClrMapping/>
+  </p:clrMapOvr>
+  <mc:AlternateContent xmlns:mc="http://schemas.openxmlformats.org/markup-compatibility/2006" xmlns:p14="http://schemas.microsoft.com/office/powerpoint/2010/main">
+    <mc:Choice Requires="p14">
+      <p:transition spd="med" p14:dur="700">
+        <p:fade/>
+      </p:transition>
+    </mc:Choice>
+    <mc:Fallback xmlns="">
+      <p:transition spd="med">
+        <p:fade/>
+      </p:transition>
+    </mc:Fallback>
+  </mc:AlternateContent>
+  <p:timing>
+    <p:tnLst>
+      <p:par>
+        <p:cTn id="1" dur="indefinite" restart="never" nodeType="tmRoot"/>
+      </p:par>
+    </p:tnLst>
+  </p:timing>
+</p:sld>
+</file>
+
+<file path=ppt/slides/slide12.xml><?xml version="1.0" encoding="utf-8"?>
 <p:sld xmlns:a="http://schemas.openxmlformats.org/drawingml/2006/main" xmlns:r="http://schemas.openxmlformats.org/officeDocument/2006/relationships" xmlns:p="http://schemas.openxmlformats.org/presentationml/2006/main">
   <p:cSld>
     <p:spTree>
@@ -11642,14 +11884,14 @@
   <p:timing>
     <p:tnLst>
       <p:par>
-        <p:cTn xmlns:p14="http://schemas.microsoft.com/office/powerpoint/2010/main" id="1" dur="indefinite" restart="never" nodeType="tmRoot"/>
+        <p:cTn id="1" dur="indefinite" restart="never" nodeType="tmRoot"/>
       </p:par>
     </p:tnLst>
   </p:timing>
 </p:sld>
 </file>
 
-<file path=ppt/slides/slide11.xml><?xml version="1.0" encoding="utf-8"?>
+<file path=ppt/slides/slide13.xml><?xml version="1.0" encoding="utf-8"?>
 <p:sld xmlns:a="http://schemas.openxmlformats.org/drawingml/2006/main" xmlns:r="http://schemas.openxmlformats.org/officeDocument/2006/relationships" xmlns:p="http://schemas.openxmlformats.org/presentationml/2006/main">
   <p:cSld>
     <p:spTree>
@@ -11798,14 +12040,14 @@
   <p:timing>
     <p:tnLst>
       <p:par>
-        <p:cTn xmlns:p14="http://schemas.microsoft.com/office/powerpoint/2010/main" id="1" dur="indefinite" restart="never" nodeType="tmRoot"/>
+        <p:cTn id="1" dur="indefinite" restart="never" nodeType="tmRoot"/>
       </p:par>
     </p:tnLst>
   </p:timing>
 </p:sld>
 </file>
 
-<file path=ppt/slides/slide12.xml><?xml version="1.0" encoding="utf-8"?>
+<file path=ppt/slides/slide14.xml><?xml version="1.0" encoding="utf-8"?>
 <p:sld xmlns:a="http://schemas.openxmlformats.org/drawingml/2006/main" xmlns:r="http://schemas.openxmlformats.org/officeDocument/2006/relationships" xmlns:p="http://schemas.openxmlformats.org/presentationml/2006/main">
   <p:cSld>
     <p:spTree>
@@ -11870,14 +12112,14 @@
   <p:timing>
     <p:tnLst>
       <p:par>
-        <p:cTn xmlns:p14="http://schemas.microsoft.com/office/powerpoint/2010/main" id="1" dur="indefinite" restart="never" nodeType="tmRoot"/>
+        <p:cTn id="1" dur="indefinite" restart="never" nodeType="tmRoot"/>
       </p:par>
     </p:tnLst>
   </p:timing>
 </p:sld>
 </file>
 
-<file path=ppt/slides/slide13.xml><?xml version="1.0" encoding="utf-8"?>
+<file path=ppt/slides/slide15.xml><?xml version="1.0" encoding="utf-8"?>
 <p:sld xmlns:a="http://schemas.openxmlformats.org/drawingml/2006/main" xmlns:r="http://schemas.openxmlformats.org/officeDocument/2006/relationships" xmlns:p="http://schemas.openxmlformats.org/presentationml/2006/main">
   <p:cSld>
     <p:spTree>
@@ -12061,14 +12303,14 @@
   <p:timing>
     <p:tnLst>
       <p:par>
-        <p:cTn xmlns:p14="http://schemas.microsoft.com/office/powerpoint/2010/main" id="1" dur="indefinite" restart="never" nodeType="tmRoot"/>
+        <p:cTn id="1" dur="indefinite" restart="never" nodeType="tmRoot"/>
       </p:par>
     </p:tnLst>
   </p:timing>
 </p:sld>
 </file>
 
-<file path=ppt/slides/slide14.xml><?xml version="1.0" encoding="utf-8"?>
+<file path=ppt/slides/slide16.xml><?xml version="1.0" encoding="utf-8"?>
 <p:sld xmlns:a="http://schemas.openxmlformats.org/drawingml/2006/main" xmlns:r="http://schemas.openxmlformats.org/officeDocument/2006/relationships" xmlns:p="http://schemas.openxmlformats.org/presentationml/2006/main">
   <p:cSld>
     <p:spTree>
@@ -12222,14 +12464,14 @@
   <p:timing>
     <p:tnLst>
       <p:par>
-        <p:cTn xmlns:p14="http://schemas.microsoft.com/office/powerpoint/2010/main" id="1" dur="indefinite" restart="never" nodeType="tmRoot"/>
+        <p:cTn id="1" dur="indefinite" restart="never" nodeType="tmRoot"/>
       </p:par>
     </p:tnLst>
   </p:timing>
 </p:sld>
 </file>
 
-<file path=ppt/slides/slide15.xml><?xml version="1.0" encoding="utf-8"?>
+<file path=ppt/slides/slide17.xml><?xml version="1.0" encoding="utf-8"?>
 <p:sld xmlns:a="http://schemas.openxmlformats.org/drawingml/2006/main" xmlns:r="http://schemas.openxmlformats.org/officeDocument/2006/relationships" xmlns:p="http://schemas.openxmlformats.org/presentationml/2006/main">
   <p:cSld>
     <p:spTree>
@@ -12297,14 +12539,14 @@
   <p:timing>
     <p:tnLst>
       <p:par>
-        <p:cTn xmlns:p14="http://schemas.microsoft.com/office/powerpoint/2010/main" id="1" dur="indefinite" restart="never" nodeType="tmRoot"/>
+        <p:cTn id="1" dur="indefinite" restart="never" nodeType="tmRoot"/>
       </p:par>
     </p:tnLst>
   </p:timing>
 </p:sld>
 </file>
 
-<file path=ppt/slides/slide16.xml><?xml version="1.0" encoding="utf-8"?>
+<file path=ppt/slides/slide18.xml><?xml version="1.0" encoding="utf-8"?>
 <p:sld xmlns:a="http://schemas.openxmlformats.org/drawingml/2006/main" xmlns:r="http://schemas.openxmlformats.org/officeDocument/2006/relationships" xmlns:p="http://schemas.openxmlformats.org/presentationml/2006/main">
   <p:cSld>
     <p:spTree>
@@ -12398,11 +12640,7 @@
             <a:pPr fontAlgn="base"/>
             <a:r>
               <a:rPr lang="en-US" dirty="0" smtClean="0"/>
-              <a:t>Enterprise theming w/ Theme </a:t>
-            </a:r>
-            <a:r>
-              <a:rPr lang="en-US" dirty="0" smtClean="0"/>
-              <a:t>Roller</a:t>
+              <a:t>Enterprise theming w/ Theme Roller</a:t>
             </a:r>
           </a:p>
           <a:p>
@@ -12456,7 +12694,6 @@
               <a:rPr lang="en-US" dirty="0" smtClean="0"/>
               <a:t>Loading and many more features</a:t>
             </a:r>
-            <a:endParaRPr lang="en-US" dirty="0" smtClean="0"/>
           </a:p>
           <a:p>
             <a:pPr fontAlgn="base"/>
@@ -12532,14 +12769,14 @@
   <p:timing>
     <p:tnLst>
       <p:par>
-        <p:cTn xmlns:p14="http://schemas.microsoft.com/office/powerpoint/2010/main" id="1" dur="indefinite" restart="never" nodeType="tmRoot"/>
+        <p:cTn id="1" dur="indefinite" restart="never" nodeType="tmRoot"/>
       </p:par>
     </p:tnLst>
   </p:timing>
 </p:sld>
 </file>
 
-<file path=ppt/slides/slide17.xml><?xml version="1.0" encoding="utf-8"?>
+<file path=ppt/slides/slide19.xml><?xml version="1.0" encoding="utf-8"?>
 <p:sld xmlns:a="http://schemas.openxmlformats.org/drawingml/2006/main" xmlns:r="http://schemas.openxmlformats.org/officeDocument/2006/relationships" xmlns:p="http://schemas.openxmlformats.org/presentationml/2006/main">
   <p:cSld>
     <p:spTree>
@@ -12594,17 +12831,8 @@
             </a:r>
             <a:r>
               <a:rPr lang="en-US" dirty="0" smtClean="0"/>
-              <a:t>, AutoComplete</a:t>
-            </a:r>
-            <a:r>
-              <a:rPr lang="en-US" dirty="0" smtClean="0"/>
-              <a:t>, </a:t>
-            </a:r>
-            <a:r>
-              <a:rPr lang="en-US" dirty="0" smtClean="0"/>
-              <a:t>Client Side Validation, Tree Drag and Drop, The Dialog Framework and others.</a:t>
-            </a:r>
-            <a:endParaRPr lang="en-US" dirty="0" smtClean="0"/>
+              <a:t>, AutoComplete, Client Side Validation, Tree Drag and Drop, The Dialog Framework and others.</a:t>
+            </a:r>
           </a:p>
         </p:txBody>
       </p:sp>
@@ -12720,14 +12948,144 @@
   <p:timing>
     <p:tnLst>
       <p:par>
-        <p:cTn xmlns:p14="http://schemas.microsoft.com/office/powerpoint/2010/main" id="1" dur="indefinite" restart="never" nodeType="tmRoot"/>
+        <p:cTn id="1" dur="indefinite" restart="never" nodeType="tmRoot"/>
       </p:par>
     </p:tnLst>
   </p:timing>
 </p:sld>
 </file>
 
-<file path=ppt/slides/slide18.xml><?xml version="1.0" encoding="utf-8"?>
+<file path=ppt/slides/slide2.xml><?xml version="1.0" encoding="utf-8"?>
+<p:sld xmlns:a="http://schemas.openxmlformats.org/drawingml/2006/main" xmlns:r="http://schemas.openxmlformats.org/officeDocument/2006/relationships" xmlns:p="http://schemas.openxmlformats.org/presentationml/2006/main">
+  <p:cSld>
+    <p:spTree>
+      <p:nvGrpSpPr>
+        <p:cNvPr id="1" name=""/>
+        <p:cNvGrpSpPr/>
+        <p:nvPr/>
+      </p:nvGrpSpPr>
+      <p:grpSpPr>
+        <a:xfrm>
+          <a:off x="0" y="0"/>
+          <a:ext cx="0" cy="0"/>
+          <a:chOff x="0" y="0"/>
+          <a:chExt cx="0" cy="0"/>
+        </a:xfrm>
+      </p:grpSpPr>
+      <p:sp>
+        <p:nvSpPr>
+          <p:cNvPr id="7" name="Title 6"/>
+          <p:cNvSpPr>
+            <a:spLocks noGrp="1"/>
+          </p:cNvSpPr>
+          <p:nvPr>
+            <p:ph type="title"/>
+          </p:nvPr>
+        </p:nvSpPr>
+        <p:spPr>
+          <a:xfrm>
+            <a:off x="386634" y="1583267"/>
+            <a:ext cx="5385112" cy="1230657"/>
+          </a:xfrm>
+        </p:spPr>
+        <p:txBody>
+          <a:bodyPr/>
+          <a:lstStyle/>
+          <a:p>
+            <a:r>
+              <a:rPr lang="en-US" sz="2400" b="0" dirty="0"/>
+              <a:t>10 Tips for Java EE 7 with PrimeFaces</a:t>
+            </a:r>
+            <a:endParaRPr lang="en-US" sz="2400" dirty="0"/>
+          </a:p>
+        </p:txBody>
+      </p:sp>
+      <p:sp>
+        <p:nvSpPr>
+          <p:cNvPr id="8" name="Text Placeholder 7"/>
+          <p:cNvSpPr>
+            <a:spLocks noGrp="1"/>
+          </p:cNvSpPr>
+          <p:nvPr>
+            <p:ph type="body" sz="quarter" idx="13"/>
+          </p:nvPr>
+        </p:nvSpPr>
+        <p:spPr>
+          <a:xfrm>
+            <a:off x="411939" y="2914276"/>
+            <a:ext cx="5027083" cy="1048124"/>
+          </a:xfrm>
+        </p:spPr>
+        <p:txBody>
+          <a:bodyPr/>
+          <a:lstStyle/>
+          <a:p>
+            <a:r>
+              <a:rPr lang="en-US" dirty="0" smtClean="0"/>
+              <a:t>Mert Çalışkan		&amp;		Martin </a:t>
+            </a:r>
+            <a:r>
+              <a:rPr lang="en-US" dirty="0" err="1" smtClean="0"/>
+              <a:t>Fousek</a:t>
+            </a:r>
+            <a:endParaRPr lang="en-US" dirty="0"/>
+          </a:p>
+          <a:p>
+            <a:r>
+              <a:rPr lang="en-US" sz="1600" dirty="0" smtClean="0"/>
+              <a:t>Software Architect    		Software Developer</a:t>
+            </a:r>
+          </a:p>
+          <a:p>
+            <a:r>
+              <a:rPr lang="en-US" sz="1600" dirty="0" smtClean="0"/>
+              <a:t>		 at T2 </a:t>
+            </a:r>
+            <a:r>
+              <a:rPr lang="en-US" sz="1600" dirty="0" err="1" smtClean="0"/>
+              <a:t>Yazılım</a:t>
+            </a:r>
+            <a:r>
+              <a:rPr lang="en-US" sz="1600" dirty="0" smtClean="0"/>
+              <a:t> Ltd.			at Oracle, NetBeans</a:t>
+            </a:r>
+            <a:endParaRPr lang="en-US" sz="1600" dirty="0"/>
+          </a:p>
+        </p:txBody>
+      </p:sp>
+    </p:spTree>
+    <p:extLst>
+      <p:ext uri="{BB962C8B-B14F-4D97-AF65-F5344CB8AC3E}">
+        <p14:creationId xmlns:p14="http://schemas.microsoft.com/office/powerpoint/2010/main" val="782494894"/>
+      </p:ext>
+    </p:extLst>
+  </p:cSld>
+  <p:clrMapOvr>
+    <a:masterClrMapping/>
+  </p:clrMapOvr>
+  <mc:AlternateContent xmlns:mc="http://schemas.openxmlformats.org/markup-compatibility/2006" xmlns:p14="http://schemas.microsoft.com/office/powerpoint/2010/main">
+    <mc:Choice Requires="p14">
+      <p:transition spd="med" p14:dur="700">
+        <p:fade/>
+      </p:transition>
+    </mc:Choice>
+    <mc:Fallback xmlns="">
+      <p:transition spd="med">
+        <p:fade/>
+      </p:transition>
+    </mc:Fallback>
+  </mc:AlternateContent>
+  <p:timing>
+    <p:tnLst>
+      <p:par>
+        <p:cTn id="1" dur="indefinite" restart="never" nodeType="tmRoot"/>
+      </p:par>
+    </p:tnLst>
+  </p:timing>
+</p:sld>
+</file>
+
+<file path=ppt/slides/slide20.xml><?xml version="1.0" encoding="utf-8"?>
 <p:sld xmlns:a="http://schemas.openxmlformats.org/drawingml/2006/main" xmlns:r="http://schemas.openxmlformats.org/officeDocument/2006/relationships" xmlns:p="http://schemas.openxmlformats.org/presentationml/2006/main">
   <p:cSld>
     <p:spTree>
@@ -12803,14 +13161,14 @@
   <p:timing>
     <p:tnLst>
       <p:par>
-        <p:cTn xmlns:p14="http://schemas.microsoft.com/office/powerpoint/2010/main" id="1" dur="indefinite" restart="never" nodeType="tmRoot"/>
+        <p:cTn id="1" dur="indefinite" restart="never" nodeType="tmRoot"/>
       </p:par>
     </p:tnLst>
   </p:timing>
 </p:sld>
 </file>
 
-<file path=ppt/slides/slide19.xml><?xml version="1.0" encoding="utf-8"?>
+<file path=ppt/slides/slide21.xml><?xml version="1.0" encoding="utf-8"?>
 <p:sld xmlns:a="http://schemas.openxmlformats.org/drawingml/2006/main" xmlns:r="http://schemas.openxmlformats.org/officeDocument/2006/relationships" xmlns:p="http://schemas.openxmlformats.org/presentationml/2006/main">
   <p:cSld>
     <p:spTree>
@@ -12951,141 +13309,14 @@
   <p:timing>
     <p:tnLst>
       <p:par>
-        <p:cTn xmlns:p14="http://schemas.microsoft.com/office/powerpoint/2010/main" id="1" dur="indefinite" restart="never" nodeType="tmRoot"/>
+        <p:cTn id="1" dur="indefinite" restart="never" nodeType="tmRoot"/>
       </p:par>
     </p:tnLst>
   </p:timing>
 </p:sld>
 </file>
 
-<file path=ppt/slides/slide2.xml><?xml version="1.0" encoding="utf-8"?>
-<p:sld xmlns:a="http://schemas.openxmlformats.org/drawingml/2006/main" xmlns:r="http://schemas.openxmlformats.org/officeDocument/2006/relationships" xmlns:p="http://schemas.openxmlformats.org/presentationml/2006/main">
-  <p:cSld>
-    <p:spTree>
-      <p:nvGrpSpPr>
-        <p:cNvPr id="1" name=""/>
-        <p:cNvGrpSpPr/>
-        <p:nvPr/>
-      </p:nvGrpSpPr>
-      <p:grpSpPr>
-        <a:xfrm>
-          <a:off x="0" y="0"/>
-          <a:ext cx="0" cy="0"/>
-          <a:chOff x="0" y="0"/>
-          <a:chExt cx="0" cy="0"/>
-        </a:xfrm>
-      </p:grpSpPr>
-      <p:sp>
-        <p:nvSpPr>
-          <p:cNvPr id="11" name="Title 10"/>
-          <p:cNvSpPr>
-            <a:spLocks noGrp="1"/>
-          </p:cNvSpPr>
-          <p:nvPr>
-            <p:ph type="title"/>
-          </p:nvPr>
-        </p:nvSpPr>
-        <p:spPr/>
-        <p:txBody>
-          <a:bodyPr/>
-          <a:lstStyle/>
-          <a:p>
-            <a:r>
-              <a:rPr lang="en-US" dirty="0" smtClean="0"/>
-              <a:t>Agenda</a:t>
-            </a:r>
-            <a:endParaRPr lang="en-US" dirty="0"/>
-          </a:p>
-        </p:txBody>
-      </p:sp>
-      <p:sp>
-        <p:nvSpPr>
-          <p:cNvPr id="12" name="Text Placeholder 11"/>
-          <p:cNvSpPr>
-            <a:spLocks noGrp="1"/>
-          </p:cNvSpPr>
-          <p:nvPr>
-            <p:ph type="body" sz="quarter" idx="13"/>
-          </p:nvPr>
-        </p:nvSpPr>
-        <p:spPr/>
-        <p:txBody>
-          <a:bodyPr/>
-          <a:lstStyle/>
-          <a:p>
-            <a:r>
-              <a:rPr lang="en-US" dirty="0" smtClean="0"/>
-              <a:t>Introduction</a:t>
-            </a:r>
-          </a:p>
-          <a:p>
-            <a:pPr lvl="1"/>
-            <a:r>
-              <a:rPr lang="en-US" dirty="0" smtClean="0"/>
-              <a:t>Java EE 7 &amp; JavaServer Faces 2.2, PrimeFaces, NetBeans IDE</a:t>
-            </a:r>
-          </a:p>
-          <a:p>
-            <a:pPr marL="403225" lvl="1" indent="0">
-              <a:buNone/>
-            </a:pPr>
-            <a:endParaRPr lang="en-US" dirty="0" smtClean="0"/>
-          </a:p>
-          <a:p>
-            <a:r>
-              <a:rPr lang="en-US" dirty="0" smtClean="0"/>
-              <a:t>Tour through 10 features of the JSF and PF </a:t>
-            </a:r>
-          </a:p>
-          <a:p>
-            <a:pPr lvl="1"/>
-            <a:r>
-              <a:rPr lang="en-US" dirty="0" smtClean="0"/>
-              <a:t>Feature overview</a:t>
-            </a:r>
-          </a:p>
-          <a:p>
-            <a:pPr lvl="1"/>
-            <a:r>
-              <a:rPr lang="en-US" dirty="0" smtClean="0"/>
-              <a:t>Samples in action</a:t>
-            </a:r>
-          </a:p>
-        </p:txBody>
-      </p:sp>
-    </p:spTree>
-    <p:extLst>
-      <p:ext uri="{BB962C8B-B14F-4D97-AF65-F5344CB8AC3E}">
-        <p14:creationId xmlns:p14="http://schemas.microsoft.com/office/powerpoint/2010/main" val="1886183616"/>
-      </p:ext>
-    </p:extLst>
-  </p:cSld>
-  <p:clrMapOvr>
-    <a:masterClrMapping/>
-  </p:clrMapOvr>
-  <mc:AlternateContent xmlns:mc="http://schemas.openxmlformats.org/markup-compatibility/2006" xmlns:p14="http://schemas.microsoft.com/office/powerpoint/2010/main">
-    <mc:Choice Requires="p14">
-      <p:transition spd="med" p14:dur="700">
-        <p:fade/>
-      </p:transition>
-    </mc:Choice>
-    <mc:Fallback xmlns="">
-      <p:transition spd="med">
-        <p:fade/>
-      </p:transition>
-    </mc:Fallback>
-  </mc:AlternateContent>
-  <p:timing>
-    <p:tnLst>
-      <p:par>
-        <p:cTn xmlns:p14="http://schemas.microsoft.com/office/powerpoint/2010/main" id="1" dur="indefinite" restart="never" nodeType="tmRoot"/>
-      </p:par>
-    </p:tnLst>
-  </p:timing>
-</p:sld>
-</file>
-
-<file path=ppt/slides/slide20.xml><?xml version="1.0" encoding="utf-8"?>
+<file path=ppt/slides/slide22.xml><?xml version="1.0" encoding="utf-8"?>
 <p:sld xmlns:a="http://schemas.openxmlformats.org/drawingml/2006/main" xmlns:r="http://schemas.openxmlformats.org/officeDocument/2006/relationships" xmlns:p="http://schemas.openxmlformats.org/presentationml/2006/main">
   <p:cSld>
     <p:spTree>
@@ -13430,14 +13661,14 @@
   <p:timing>
     <p:tnLst>
       <p:par>
-        <p:cTn xmlns:p14="http://schemas.microsoft.com/office/powerpoint/2010/main" id="1" dur="indefinite" restart="never" nodeType="tmRoot"/>
+        <p:cTn id="1" dur="indefinite" restart="never" nodeType="tmRoot"/>
       </p:par>
     </p:tnLst>
   </p:timing>
 </p:sld>
 </file>
 
-<file path=ppt/slides/slide21.xml><?xml version="1.0" encoding="utf-8"?>
+<file path=ppt/slides/slide23.xml><?xml version="1.0" encoding="utf-8"?>
 <p:sld xmlns:a="http://schemas.openxmlformats.org/drawingml/2006/main" xmlns:r="http://schemas.openxmlformats.org/officeDocument/2006/relationships" xmlns:p="http://schemas.openxmlformats.org/presentationml/2006/main">
   <p:cSld>
     <p:spTree>
@@ -13505,14 +13736,14 @@
   <p:timing>
     <p:tnLst>
       <p:par>
-        <p:cTn xmlns:p14="http://schemas.microsoft.com/office/powerpoint/2010/main" id="1" dur="indefinite" restart="never" nodeType="tmRoot"/>
+        <p:cTn id="1" dur="indefinite" restart="never" nodeType="tmRoot"/>
       </p:par>
     </p:tnLst>
   </p:timing>
 </p:sld>
 </file>
 
-<file path=ppt/slides/slide22.xml><?xml version="1.0" encoding="utf-8"?>
+<file path=ppt/slides/slide24.xml><?xml version="1.0" encoding="utf-8"?>
 <p:sld xmlns:a="http://schemas.openxmlformats.org/drawingml/2006/main" xmlns:r="http://schemas.openxmlformats.org/officeDocument/2006/relationships" xmlns:p="http://schemas.openxmlformats.org/presentationml/2006/main">
   <p:cSld>
     <p:spTree>
@@ -13741,14 +13972,14 @@
   <p:timing>
     <p:tnLst>
       <p:par>
-        <p:cTn xmlns:p14="http://schemas.microsoft.com/office/powerpoint/2010/main" id="1" dur="indefinite" restart="never" nodeType="tmRoot"/>
+        <p:cTn id="1" dur="indefinite" restart="never" nodeType="tmRoot"/>
       </p:par>
     </p:tnLst>
   </p:timing>
 </p:sld>
 </file>
 
-<file path=ppt/slides/slide23.xml><?xml version="1.0" encoding="utf-8"?>
+<file path=ppt/slides/slide25.xml><?xml version="1.0" encoding="utf-8"?>
 <p:sld xmlns:a="http://schemas.openxmlformats.org/drawingml/2006/main" xmlns:r="http://schemas.openxmlformats.org/officeDocument/2006/relationships" xmlns:p="http://schemas.openxmlformats.org/presentationml/2006/main">
   <p:cSld>
     <p:spTree>
@@ -14111,14 +14342,14 @@
   <p:timing>
     <p:tnLst>
       <p:par>
-        <p:cTn xmlns:p14="http://schemas.microsoft.com/office/powerpoint/2010/main" id="1" dur="indefinite" restart="never" nodeType="tmRoot"/>
+        <p:cTn id="1" dur="indefinite" restart="never" nodeType="tmRoot"/>
       </p:par>
     </p:tnLst>
   </p:timing>
 </p:sld>
 </file>
 
-<file path=ppt/slides/slide24.xml><?xml version="1.0" encoding="utf-8"?>
+<file path=ppt/slides/slide26.xml><?xml version="1.0" encoding="utf-8"?>
 <p:sld xmlns:a="http://schemas.openxmlformats.org/drawingml/2006/main" xmlns:r="http://schemas.openxmlformats.org/officeDocument/2006/relationships" xmlns:p="http://schemas.openxmlformats.org/presentationml/2006/main">
   <p:cSld>
     <p:spTree>
@@ -14183,14 +14414,14 @@
   <p:timing>
     <p:tnLst>
       <p:par>
-        <p:cTn xmlns:p14="http://schemas.microsoft.com/office/powerpoint/2010/main" id="1" dur="indefinite" restart="never" nodeType="tmRoot"/>
+        <p:cTn id="1" dur="indefinite" restart="never" nodeType="tmRoot"/>
       </p:par>
     </p:tnLst>
   </p:timing>
 </p:sld>
 </file>
 
-<file path=ppt/slides/slide25.xml><?xml version="1.0" encoding="utf-8"?>
+<file path=ppt/slides/slide27.xml><?xml version="1.0" encoding="utf-8"?>
 <p:sld xmlns:a="http://schemas.openxmlformats.org/drawingml/2006/main" xmlns:r="http://schemas.openxmlformats.org/officeDocument/2006/relationships" xmlns:p="http://schemas.openxmlformats.org/presentationml/2006/main">
   <p:cSld>
     <p:spTree>
@@ -14366,14 +14597,14 @@
   <p:timing>
     <p:tnLst>
       <p:par>
-        <p:cTn xmlns:p14="http://schemas.microsoft.com/office/powerpoint/2010/main" id="1" dur="indefinite" restart="never" nodeType="tmRoot"/>
+        <p:cTn id="1" dur="indefinite" restart="never" nodeType="tmRoot"/>
       </p:par>
     </p:tnLst>
   </p:timing>
 </p:sld>
 </file>
 
-<file path=ppt/slides/slide26.xml><?xml version="1.0" encoding="utf-8"?>
+<file path=ppt/slides/slide28.xml><?xml version="1.0" encoding="utf-8"?>
 <p:sld xmlns:a="http://schemas.openxmlformats.org/drawingml/2006/main" xmlns:r="http://schemas.openxmlformats.org/officeDocument/2006/relationships" xmlns:p="http://schemas.openxmlformats.org/presentationml/2006/main">
   <p:cSld>
     <p:spTree>
@@ -14514,14 +14745,14 @@
   <p:timing>
     <p:tnLst>
       <p:par>
-        <p:cTn xmlns:p14="http://schemas.microsoft.com/office/powerpoint/2010/main" id="1" dur="indefinite" restart="never" nodeType="tmRoot"/>
+        <p:cTn id="1" dur="indefinite" restart="never" nodeType="tmRoot"/>
       </p:par>
     </p:tnLst>
   </p:timing>
 </p:sld>
 </file>
 
-<file path=ppt/slides/slide27.xml><?xml version="1.0" encoding="utf-8"?>
+<file path=ppt/slides/slide29.xml><?xml version="1.0" encoding="utf-8"?>
 <p:sld xmlns:a="http://schemas.openxmlformats.org/drawingml/2006/main" xmlns:r="http://schemas.openxmlformats.org/officeDocument/2006/relationships" xmlns:p="http://schemas.openxmlformats.org/presentationml/2006/main">
   <p:cSld>
     <p:spTree>
@@ -14586,14 +14817,208 @@
   <p:timing>
     <p:tnLst>
       <p:par>
-        <p:cTn xmlns:p14="http://schemas.microsoft.com/office/powerpoint/2010/main" id="1" dur="indefinite" restart="never" nodeType="tmRoot"/>
+        <p:cTn id="1" dur="indefinite" restart="never" nodeType="tmRoot"/>
       </p:par>
     </p:tnLst>
   </p:timing>
 </p:sld>
 </file>
 
-<file path=ppt/slides/slide28.xml><?xml version="1.0" encoding="utf-8"?>
+<file path=ppt/slides/slide3.xml><?xml version="1.0" encoding="utf-8"?>
+<p:sld xmlns:a="http://schemas.openxmlformats.org/drawingml/2006/main" xmlns:r="http://schemas.openxmlformats.org/officeDocument/2006/relationships" xmlns:p="http://schemas.openxmlformats.org/presentationml/2006/main">
+  <p:cSld>
+    <p:spTree>
+      <p:nvGrpSpPr>
+        <p:cNvPr id="1" name=""/>
+        <p:cNvGrpSpPr/>
+        <p:nvPr/>
+      </p:nvGrpSpPr>
+      <p:grpSpPr>
+        <a:xfrm>
+          <a:off x="0" y="0"/>
+          <a:ext cx="0" cy="0"/>
+          <a:chOff x="0" y="0"/>
+          <a:chExt cx="0" cy="0"/>
+        </a:xfrm>
+      </p:grpSpPr>
+      <p:sp>
+        <p:nvSpPr>
+          <p:cNvPr id="2" name="Content Placeholder 1"/>
+          <p:cNvSpPr>
+            <a:spLocks noGrp="1"/>
+          </p:cNvSpPr>
+          <p:nvPr>
+            <p:ph idx="1"/>
+          </p:nvPr>
+        </p:nvSpPr>
+        <p:spPr>
+          <a:xfrm>
+            <a:off x="804346" y="1201839"/>
+            <a:ext cx="6400801" cy="2929889"/>
+          </a:xfrm>
+        </p:spPr>
+        <p:txBody>
+          <a:bodyPr/>
+          <a:lstStyle/>
+          <a:p>
+            <a:pPr marL="0" indent="0">
+              <a:buNone/>
+            </a:pPr>
+            <a:r>
+              <a:rPr lang="en-US" dirty="0">
+                <a:ea typeface="ヒラギノ角ゴ Pro W3"/>
+                <a:cs typeface="ヒラギノ角ゴ Pro W3"/>
+              </a:rPr>
+              <a:t>The following is intended to outline our general product direction. </a:t>
+            </a:r>
+            <a:r>
+              <a:rPr lang="en-US" dirty="0" smtClean="0">
+                <a:ea typeface="ヒラギノ角ゴ Pro W3"/>
+                <a:cs typeface="ヒラギノ角ゴ Pro W3"/>
+              </a:rPr>
+              <a:t>It </a:t>
+            </a:r>
+            <a:r>
+              <a:rPr lang="en-US" dirty="0">
+                <a:ea typeface="ヒラギノ角ゴ Pro W3"/>
+                <a:cs typeface="ヒラギノ角ゴ Pro W3"/>
+              </a:rPr>
+              <a:t>is intended </a:t>
+            </a:r>
+            <a:r>
+              <a:rPr lang="en-US" dirty="0" smtClean="0">
+                <a:ea typeface="ヒラギノ角ゴ Pro W3"/>
+                <a:cs typeface="ヒラギノ角ゴ Pro W3"/>
+              </a:rPr>
+              <a:t/>
+            </a:r>
+            <a:br>
+              <a:rPr lang="en-US" dirty="0" smtClean="0">
+                <a:ea typeface="ヒラギノ角ゴ Pro W3"/>
+                <a:cs typeface="ヒラギノ角ゴ Pro W3"/>
+              </a:rPr>
+            </a:br>
+            <a:r>
+              <a:rPr lang="en-US" dirty="0" smtClean="0">
+                <a:ea typeface="ヒラギノ角ゴ Pro W3"/>
+                <a:cs typeface="ヒラギノ角ゴ Pro W3"/>
+              </a:rPr>
+              <a:t>for </a:t>
+            </a:r>
+            <a:r>
+              <a:rPr lang="en-US" dirty="0">
+                <a:ea typeface="ヒラギノ角ゴ Pro W3"/>
+                <a:cs typeface="ヒラギノ角ゴ Pro W3"/>
+              </a:rPr>
+              <a:t>information purposes only, and may not be incorporated into any contract. </a:t>
+            </a:r>
+            <a:r>
+              <a:rPr lang="en-US" dirty="0" smtClean="0">
+                <a:ea typeface="ヒラギノ角ゴ Pro W3"/>
+                <a:cs typeface="ヒラギノ角ゴ Pro W3"/>
+              </a:rPr>
+              <a:t/>
+            </a:r>
+            <a:br>
+              <a:rPr lang="en-US" dirty="0" smtClean="0">
+                <a:ea typeface="ヒラギノ角ゴ Pro W3"/>
+                <a:cs typeface="ヒラギノ角ゴ Pro W3"/>
+              </a:rPr>
+            </a:br>
+            <a:r>
+              <a:rPr lang="en-US" dirty="0" smtClean="0">
+                <a:ea typeface="ヒラギノ角ゴ Pro W3"/>
+                <a:cs typeface="ヒラギノ角ゴ Pro W3"/>
+              </a:rPr>
+              <a:t>It </a:t>
+            </a:r>
+            <a:r>
+              <a:rPr lang="en-US" dirty="0">
+                <a:ea typeface="ヒラギノ角ゴ Pro W3"/>
+                <a:cs typeface="ヒラギノ角ゴ Pro W3"/>
+              </a:rPr>
+              <a:t>is not a commitment to deliver any material, code, </a:t>
+            </a:r>
+            <a:r>
+              <a:rPr lang="en-US" dirty="0" smtClean="0">
+                <a:ea typeface="ヒラギノ角ゴ Pro W3"/>
+                <a:cs typeface="ヒラギノ角ゴ Pro W3"/>
+              </a:rPr>
+              <a:t>or </a:t>
+            </a:r>
+            <a:r>
+              <a:rPr lang="en-US" dirty="0">
+                <a:ea typeface="ヒラギノ角ゴ Pro W3"/>
+                <a:cs typeface="ヒラギノ角ゴ Pro W3"/>
+              </a:rPr>
+              <a:t>functionality, and should not be relied upon in making purchasing decisions. The development, release, and timing of any features or functionality described for Oracle</a:t>
+            </a:r>
+            <a:r>
+              <a:rPr lang="ja-JP" altLang="en-US" dirty="0">
+                <a:ea typeface="ヒラギノ角ゴ Pro W3"/>
+                <a:cs typeface="ヒラギノ角ゴ Pro W3"/>
+              </a:rPr>
+              <a:t>’</a:t>
+            </a:r>
+            <a:r>
+              <a:rPr lang="en-US" altLang="ja-JP" dirty="0">
+                <a:ea typeface="ヒラギノ角ゴ Pro W3"/>
+                <a:cs typeface="ヒラギノ角ゴ Pro W3"/>
+              </a:rPr>
+              <a:t>s products remains at the sole discretion of Oracle.</a:t>
+            </a:r>
+            <a:endParaRPr lang="en-US" dirty="0">
+              <a:ea typeface="ヒラギノ角ゴ Pro W3"/>
+              <a:cs typeface="ヒラギノ角ゴ Pro W3"/>
+            </a:endParaRPr>
+          </a:p>
+          <a:p>
+            <a:pPr marL="0" indent="0">
+              <a:buNone/>
+            </a:pPr>
+            <a:endParaRPr lang="en-US" dirty="0"/>
+          </a:p>
+          <a:p>
+            <a:pPr marL="60325" indent="0">
+              <a:buNone/>
+            </a:pPr>
+            <a:endParaRPr lang="en-US" dirty="0"/>
+          </a:p>
+        </p:txBody>
+      </p:sp>
+    </p:spTree>
+    <p:extLst>
+      <p:ext uri="{BB962C8B-B14F-4D97-AF65-F5344CB8AC3E}">
+        <p14:creationId xmlns:p14="http://schemas.microsoft.com/office/powerpoint/2010/main" val="62634420"/>
+      </p:ext>
+    </p:extLst>
+  </p:cSld>
+  <p:clrMapOvr>
+    <a:masterClrMapping/>
+  </p:clrMapOvr>
+  <mc:AlternateContent xmlns:mc="http://schemas.openxmlformats.org/markup-compatibility/2006" xmlns:p14="http://schemas.microsoft.com/office/powerpoint/2010/main">
+    <mc:Choice Requires="p14">
+      <p:transition spd="med" p14:dur="700">
+        <p:fade/>
+      </p:transition>
+    </mc:Choice>
+    <mc:Fallback xmlns="">
+      <p:transition spd="med">
+        <p:fade/>
+      </p:transition>
+    </mc:Fallback>
+  </mc:AlternateContent>
+  <p:timing>
+    <p:tnLst>
+      <p:par>
+        <p:cTn id="1" dur="indefinite" restart="never" nodeType="tmRoot"/>
+      </p:par>
+    </p:tnLst>
+  </p:timing>
+</p:sld>
+</file>
+
+<file path=ppt/slides/slide30.xml><?xml version="1.0" encoding="utf-8"?>
 <p:sld xmlns:a="http://schemas.openxmlformats.org/drawingml/2006/main" xmlns:r="http://schemas.openxmlformats.org/officeDocument/2006/relationships" xmlns:p="http://schemas.openxmlformats.org/presentationml/2006/main">
   <p:cSld>
     <p:spTree>
@@ -14762,14 +15187,14 @@
   <p:timing>
     <p:tnLst>
       <p:par>
-        <p:cTn xmlns:p14="http://schemas.microsoft.com/office/powerpoint/2010/main" id="1" dur="indefinite" restart="never" nodeType="tmRoot"/>
+        <p:cTn id="1" dur="indefinite" restart="never" nodeType="tmRoot"/>
       </p:par>
     </p:tnLst>
   </p:timing>
 </p:sld>
 </file>
 
-<file path=ppt/slides/slide29.xml><?xml version="1.0" encoding="utf-8"?>
+<file path=ppt/slides/slide31.xml><?xml version="1.0" encoding="utf-8"?>
 <p:sld xmlns:a="http://schemas.openxmlformats.org/drawingml/2006/main" xmlns:r="http://schemas.openxmlformats.org/officeDocument/2006/relationships" xmlns:p="http://schemas.openxmlformats.org/presentationml/2006/main">
   <p:cSld>
     <p:spTree>
@@ -14922,243 +15347,14 @@
   <p:timing>
     <p:tnLst>
       <p:par>
-        <p:cTn xmlns:p14="http://schemas.microsoft.com/office/powerpoint/2010/main" id="1" dur="indefinite" restart="never" nodeType="tmRoot"/>
+        <p:cTn id="1" dur="indefinite" restart="never" nodeType="tmRoot"/>
       </p:par>
     </p:tnLst>
   </p:timing>
 </p:sld>
 </file>
 
-<file path=ppt/slides/slide3.xml><?xml version="1.0" encoding="utf-8"?>
-<p:sld xmlns:a="http://schemas.openxmlformats.org/drawingml/2006/main" xmlns:r="http://schemas.openxmlformats.org/officeDocument/2006/relationships" xmlns:p="http://schemas.openxmlformats.org/presentationml/2006/main">
-  <p:cSld>
-    <p:spTree>
-      <p:nvGrpSpPr>
-        <p:cNvPr id="1" name=""/>
-        <p:cNvGrpSpPr/>
-        <p:nvPr/>
-      </p:nvGrpSpPr>
-      <p:grpSpPr>
-        <a:xfrm>
-          <a:off x="0" y="0"/>
-          <a:ext cx="0" cy="0"/>
-          <a:chOff x="0" y="0"/>
-          <a:chExt cx="0" cy="0"/>
-        </a:xfrm>
-      </p:grpSpPr>
-      <p:sp>
-        <p:nvSpPr>
-          <p:cNvPr id="17" name="Text Placeholder 16"/>
-          <p:cNvSpPr>
-            <a:spLocks noGrp="1"/>
-          </p:cNvSpPr>
-          <p:nvPr>
-            <p:ph type="body" sz="quarter" idx="11"/>
-          </p:nvPr>
-        </p:nvSpPr>
-        <p:spPr>
-          <a:xfrm>
-            <a:off x="3443821" y="1404881"/>
-            <a:ext cx="5369979" cy="2523657"/>
-          </a:xfrm>
-        </p:spPr>
-        <p:txBody>
-          <a:bodyPr/>
-          <a:lstStyle/>
-          <a:p>
-            <a:pPr marL="342900" indent="-342900">
-              <a:buFont typeface="Wingdings" pitchFamily="2" charset="2"/>
-              <a:buChar char="§"/>
-            </a:pPr>
-            <a:r>
-              <a:rPr lang="en-US" sz="2000" cap="none" dirty="0" smtClean="0"/>
-              <a:t>Java EE 7 – 14 JSRs and 9 MRs, themes:</a:t>
-            </a:r>
-          </a:p>
-          <a:p>
-            <a:pPr marL="917575" lvl="1" indent="-285750"/>
-            <a:r>
-              <a:rPr lang="en-US" sz="1400" dirty="0" smtClean="0"/>
-              <a:t>HTML5</a:t>
-            </a:r>
-          </a:p>
-          <a:p>
-            <a:pPr marL="917575" lvl="1" indent="-285750"/>
-            <a:r>
-              <a:rPr lang="en-US" sz="1400" dirty="0" smtClean="0"/>
-              <a:t>Developer </a:t>
-            </a:r>
-            <a:r>
-              <a:rPr lang="en-US" sz="1400" dirty="0"/>
-              <a:t>productivity</a:t>
-            </a:r>
-            <a:endParaRPr lang="en-US" sz="1400" dirty="0" smtClean="0"/>
-          </a:p>
-          <a:p>
-            <a:pPr marL="917575" lvl="1" indent="-285750"/>
-            <a:r>
-              <a:rPr lang="en-US" sz="1400" dirty="0" smtClean="0"/>
-              <a:t>Enterprise </a:t>
-            </a:r>
-            <a:r>
-              <a:rPr lang="en-US" sz="1400" dirty="0"/>
-              <a:t>demands</a:t>
-            </a:r>
-            <a:endParaRPr lang="en-US" sz="1400" cap="none" dirty="0" smtClean="0"/>
-          </a:p>
-          <a:p>
-            <a:pPr marL="342900" indent="-342900">
-              <a:buFont typeface="Wingdings" pitchFamily="2" charset="2"/>
-              <a:buChar char="§"/>
-            </a:pPr>
-            <a:r>
-              <a:rPr lang="en-US" sz="2000" cap="none" dirty="0" smtClean="0"/>
-              <a:t>JavaServer Faces 2.2 big ticket features:</a:t>
-            </a:r>
-          </a:p>
-          <a:p>
-            <a:pPr marL="917575" lvl="1" indent="-285750"/>
-            <a:r>
-              <a:rPr lang="en-US" sz="1400" dirty="0" smtClean="0"/>
-              <a:t>HTML5 </a:t>
-            </a:r>
-            <a:r>
-              <a:rPr lang="en-US" sz="1400" dirty="0"/>
-              <a:t>F</a:t>
-            </a:r>
-            <a:r>
-              <a:rPr lang="en-US" sz="1400" dirty="0" smtClean="0"/>
-              <a:t>riendly Markup</a:t>
-            </a:r>
-            <a:endParaRPr lang="en-US" sz="1400" dirty="0"/>
-          </a:p>
-          <a:p>
-            <a:pPr marL="917575" lvl="1" indent="-285750"/>
-            <a:r>
-              <a:rPr lang="en-US" sz="1400" dirty="0" smtClean="0"/>
-              <a:t>Faces Flow</a:t>
-            </a:r>
-          </a:p>
-          <a:p>
-            <a:pPr marL="917575" lvl="1" indent="-285750"/>
-            <a:r>
-              <a:rPr lang="en-US" sz="1400" dirty="0"/>
-              <a:t>Resource Library </a:t>
-            </a:r>
-            <a:r>
-              <a:rPr lang="en-US" sz="1400" dirty="0" smtClean="0"/>
-              <a:t>Contract</a:t>
-            </a:r>
-          </a:p>
-          <a:p>
-            <a:pPr marL="917575" lvl="1" indent="-285750">
-              <a:buFont typeface="Wingdings" pitchFamily="2" charset="2"/>
-              <a:buChar char="§"/>
-            </a:pPr>
-            <a:endParaRPr lang="en-US" sz="1400" cap="none" dirty="0" smtClean="0"/>
-          </a:p>
-          <a:p>
-            <a:pPr marL="917575" lvl="1" indent="-285750">
-              <a:buFont typeface="Wingdings" pitchFamily="2" charset="2"/>
-              <a:buChar char="§"/>
-            </a:pPr>
-            <a:endParaRPr lang="en-US" sz="1400" cap="none" dirty="0"/>
-          </a:p>
-        </p:txBody>
-      </p:sp>
-      <p:sp>
-        <p:nvSpPr>
-          <p:cNvPr id="16" name="Title 15"/>
-          <p:cNvSpPr>
-            <a:spLocks noGrp="1"/>
-          </p:cNvSpPr>
-          <p:nvPr>
-            <p:ph type="title"/>
-          </p:nvPr>
-        </p:nvSpPr>
-        <p:spPr/>
-        <p:txBody>
-          <a:bodyPr/>
-          <a:lstStyle/>
-          <a:p>
-            <a:r>
-              <a:rPr lang="en-US" dirty="0" smtClean="0"/>
-              <a:t>Java EE 7 &amp; JavaServer Faces 2.2</a:t>
-            </a:r>
-            <a:endParaRPr lang="en-US" dirty="0"/>
-          </a:p>
-        </p:txBody>
-      </p:sp>
-      <p:pic>
-        <p:nvPicPr>
-          <p:cNvPr id="24" name="Picture 8" descr="http://entwicklertagebuch.com/blog/wp-content/uploads/2013/01/20110510-jsf-logo.png"/>
-          <p:cNvPicPr>
-            <a:picLocks noGrp="1" noChangeAspect="1" noChangeArrowheads="1"/>
-          </p:cNvPicPr>
-          <p:nvPr>
-            <p:ph type="pic" sz="quarter" idx="13"/>
-          </p:nvPr>
-        </p:nvPicPr>
-        <p:blipFill rotWithShape="1">
-          <a:blip r:embed="rId2" cstate="print">
-            <a:extLst>
-              <a:ext uri="{28A0092B-C50C-407E-A947-70E740481C1C}">
-                <a14:useLocalDpi xmlns:a14="http://schemas.microsoft.com/office/drawing/2010/main" val="0"/>
-              </a:ext>
-            </a:extLst>
-          </a:blip>
-          <a:srcRect t="-66461" b="-66461"/>
-          <a:stretch/>
-        </p:blipFill>
-        <p:spPr bwMode="auto">
-          <a:prstGeom prst="rect">
-            <a:avLst/>
-          </a:prstGeom>
-          <a:noFill/>
-          <a:extLst>
-            <a:ext uri="{909E8E84-426E-40dd-AFC4-6F175D3DCCD1}">
-              <a14:hiddenFill xmlns:a14="http://schemas.microsoft.com/office/drawing/2010/main">
-                <a:solidFill>
-                  <a:srgbClr val="FFFFFF"/>
-                </a:solidFill>
-              </a14:hiddenFill>
-            </a:ext>
-          </a:extLst>
-        </p:spPr>
-      </p:pic>
-    </p:spTree>
-    <p:extLst>
-      <p:ext uri="{BB962C8B-B14F-4D97-AF65-F5344CB8AC3E}">
-        <p14:creationId xmlns:p14="http://schemas.microsoft.com/office/powerpoint/2010/main" val="180701055"/>
-      </p:ext>
-    </p:extLst>
-  </p:cSld>
-  <p:clrMapOvr>
-    <a:masterClrMapping/>
-  </p:clrMapOvr>
-  <mc:AlternateContent xmlns:mc="http://schemas.openxmlformats.org/markup-compatibility/2006" xmlns:p14="http://schemas.microsoft.com/office/powerpoint/2010/main">
-    <mc:Choice Requires="p14">
-      <p:transition spd="med" p14:dur="700">
-        <p:fade/>
-      </p:transition>
-    </mc:Choice>
-    <mc:Fallback xmlns="">
-      <p:transition spd="med">
-        <p:fade/>
-      </p:transition>
-    </mc:Fallback>
-  </mc:AlternateContent>
-  <p:timing>
-    <p:tnLst>
-      <p:par>
-        <p:cTn xmlns:p14="http://schemas.microsoft.com/office/powerpoint/2010/main" id="1" dur="indefinite" restart="never" nodeType="tmRoot"/>
-      </p:par>
-    </p:tnLst>
-  </p:timing>
-</p:sld>
-</file>
-
-<file path=ppt/slides/slide30.xml><?xml version="1.0" encoding="utf-8"?>
+<file path=ppt/slides/slide32.xml><?xml version="1.0" encoding="utf-8"?>
 <p:sld xmlns:a="http://schemas.openxmlformats.org/drawingml/2006/main" xmlns:r="http://schemas.openxmlformats.org/officeDocument/2006/relationships" xmlns:p="http://schemas.openxmlformats.org/presentationml/2006/main">
   <p:cSld>
     <p:spTree>
@@ -15223,14 +15419,14 @@
   <p:timing>
     <p:tnLst>
       <p:par>
-        <p:cTn xmlns:p14="http://schemas.microsoft.com/office/powerpoint/2010/main" id="1" dur="indefinite" restart="never" nodeType="tmRoot"/>
+        <p:cTn id="1" dur="indefinite" restart="never" nodeType="tmRoot"/>
       </p:par>
     </p:tnLst>
   </p:timing>
 </p:sld>
 </file>
 
-<file path=ppt/slides/slide31.xml><?xml version="1.0" encoding="utf-8"?>
+<file path=ppt/slides/slide33.xml><?xml version="1.0" encoding="utf-8"?>
 <p:sld xmlns:a="http://schemas.openxmlformats.org/drawingml/2006/main" xmlns:r="http://schemas.openxmlformats.org/officeDocument/2006/relationships" xmlns:p="http://schemas.openxmlformats.org/presentationml/2006/main">
   <p:cSld>
     <p:spTree>
@@ -15305,11 +15501,11 @@
             </a:r>
             <a:r>
               <a:rPr lang="en-US" dirty="0"/>
-              <a:t>needs for a tag </a:t>
-            </a:r>
-            <a:r>
-              <a:rPr lang="en-US" dirty="0" smtClean="0"/>
-              <a:t>handler class and tag library</a:t>
+              <a:t>needs for </a:t>
+            </a:r>
+            <a:r>
+              <a:rPr lang="en-US" dirty="0" smtClean="0"/>
+              <a:t>the *taglib.tld metadata</a:t>
             </a:r>
           </a:p>
           <a:p>
@@ -15402,14 +15598,14 @@
   <p:timing>
     <p:tnLst>
       <p:par>
-        <p:cTn xmlns:p14="http://schemas.microsoft.com/office/powerpoint/2010/main" id="1" dur="indefinite" restart="never" nodeType="tmRoot"/>
+        <p:cTn id="1" dur="indefinite" restart="never" nodeType="tmRoot"/>
       </p:par>
     </p:tnLst>
   </p:timing>
 </p:sld>
 </file>
 
-<file path=ppt/slides/slide32.xml><?xml version="1.0" encoding="utf-8"?>
+<file path=ppt/slides/slide34.xml><?xml version="1.0" encoding="utf-8"?>
 <p:sld xmlns:a="http://schemas.openxmlformats.org/drawingml/2006/main" xmlns:r="http://schemas.openxmlformats.org/officeDocument/2006/relationships" xmlns:p="http://schemas.openxmlformats.org/presentationml/2006/main">
   <p:cSld>
     <p:spTree>
@@ -15565,14 +15761,14 @@
   <p:timing>
     <p:tnLst>
       <p:par>
-        <p:cTn xmlns:p14="http://schemas.microsoft.com/office/powerpoint/2010/main" id="1" dur="indefinite" restart="never" nodeType="tmRoot"/>
+        <p:cTn id="1" dur="indefinite" restart="never" nodeType="tmRoot"/>
       </p:par>
     </p:tnLst>
   </p:timing>
 </p:sld>
 </file>
 
-<file path=ppt/slides/slide33.xml><?xml version="1.0" encoding="utf-8"?>
+<file path=ppt/slides/slide35.xml><?xml version="1.0" encoding="utf-8"?>
 <p:sld xmlns:a="http://schemas.openxmlformats.org/drawingml/2006/main" xmlns:r="http://schemas.openxmlformats.org/officeDocument/2006/relationships" xmlns:p="http://schemas.openxmlformats.org/presentationml/2006/main">
   <p:cSld>
     <p:spTree>
@@ -15637,14 +15833,14 @@
   <p:timing>
     <p:tnLst>
       <p:par>
-        <p:cTn xmlns:p14="http://schemas.microsoft.com/office/powerpoint/2010/main" id="1" dur="indefinite" restart="never" nodeType="tmRoot"/>
+        <p:cTn id="1" dur="indefinite" restart="never" nodeType="tmRoot"/>
       </p:par>
     </p:tnLst>
   </p:timing>
 </p:sld>
 </file>
 
-<file path=ppt/slides/slide34.xml><?xml version="1.0" encoding="utf-8"?>
+<file path=ppt/slides/slide36.xml><?xml version="1.0" encoding="utf-8"?>
 <p:sld xmlns:a="http://schemas.openxmlformats.org/drawingml/2006/main" xmlns:r="http://schemas.openxmlformats.org/officeDocument/2006/relationships" xmlns:p="http://schemas.openxmlformats.org/presentationml/2006/main">
   <p:cSld>
     <p:spTree>
@@ -15807,14 +16003,14 @@
   <p:timing>
     <p:tnLst>
       <p:par>
-        <p:cTn xmlns:p14="http://schemas.microsoft.com/office/powerpoint/2010/main" id="1" dur="indefinite" restart="never" nodeType="tmRoot"/>
+        <p:cTn id="1" dur="indefinite" restart="never" nodeType="tmRoot"/>
       </p:par>
     </p:tnLst>
   </p:timing>
 </p:sld>
 </file>
 
-<file path=ppt/slides/slide35.xml><?xml version="1.0" encoding="utf-8"?>
+<file path=ppt/slides/slide37.xml><?xml version="1.0" encoding="utf-8"?>
 <p:sld xmlns:a="http://schemas.openxmlformats.org/drawingml/2006/main" xmlns:r="http://schemas.openxmlformats.org/officeDocument/2006/relationships" xmlns:p="http://schemas.openxmlformats.org/presentationml/2006/main">
   <p:cSld>
     <p:spTree>
@@ -15959,14 +16155,14 @@
   <p:timing>
     <p:tnLst>
       <p:par>
-        <p:cTn xmlns:p14="http://schemas.microsoft.com/office/powerpoint/2010/main" id="1" dur="indefinite" restart="never" nodeType="tmRoot"/>
+        <p:cTn id="1" dur="indefinite" restart="never" nodeType="tmRoot"/>
       </p:par>
     </p:tnLst>
   </p:timing>
 </p:sld>
 </file>
 
-<file path=ppt/slides/slide36.xml><?xml version="1.0" encoding="utf-8"?>
+<file path=ppt/slides/slide38.xml><?xml version="1.0" encoding="utf-8"?>
 <p:sld xmlns:a="http://schemas.openxmlformats.org/drawingml/2006/main" xmlns:r="http://schemas.openxmlformats.org/officeDocument/2006/relationships" xmlns:p="http://schemas.openxmlformats.org/presentationml/2006/main">
   <p:cSld>
     <p:spTree>
@@ -16290,14 +16486,14 @@
   <p:timing>
     <p:tnLst>
       <p:par>
-        <p:cTn xmlns:p14="http://schemas.microsoft.com/office/powerpoint/2010/main" id="1" dur="indefinite" restart="never" nodeType="tmRoot"/>
+        <p:cTn id="1" dur="indefinite" restart="never" nodeType="tmRoot"/>
       </p:par>
     </p:tnLst>
   </p:timing>
 </p:sld>
 </file>
 
-<file path=ppt/slides/slide37.xml><?xml version="1.0" encoding="utf-8"?>
+<file path=ppt/slides/slide39.xml><?xml version="1.0" encoding="utf-8"?>
 <p:sld xmlns:a="http://schemas.openxmlformats.org/drawingml/2006/main" xmlns:r="http://schemas.openxmlformats.org/officeDocument/2006/relationships" xmlns:p="http://schemas.openxmlformats.org/presentationml/2006/main">
   <p:cSld>
     <p:spTree>
@@ -16485,14 +16681,141 @@
   <p:timing>
     <p:tnLst>
       <p:par>
-        <p:cTn xmlns:p14="http://schemas.microsoft.com/office/powerpoint/2010/main" id="1" dur="indefinite" restart="never" nodeType="tmRoot"/>
+        <p:cTn id="1" dur="indefinite" restart="never" nodeType="tmRoot"/>
       </p:par>
     </p:tnLst>
   </p:timing>
 </p:sld>
 </file>
 
-<file path=ppt/slides/slide38.xml><?xml version="1.0" encoding="utf-8"?>
+<file path=ppt/slides/slide4.xml><?xml version="1.0" encoding="utf-8"?>
+<p:sld xmlns:a="http://schemas.openxmlformats.org/drawingml/2006/main" xmlns:r="http://schemas.openxmlformats.org/officeDocument/2006/relationships" xmlns:p="http://schemas.openxmlformats.org/presentationml/2006/main">
+  <p:cSld>
+    <p:spTree>
+      <p:nvGrpSpPr>
+        <p:cNvPr id="1" name=""/>
+        <p:cNvGrpSpPr/>
+        <p:nvPr/>
+      </p:nvGrpSpPr>
+      <p:grpSpPr>
+        <a:xfrm>
+          <a:off x="0" y="0"/>
+          <a:ext cx="0" cy="0"/>
+          <a:chOff x="0" y="0"/>
+          <a:chExt cx="0" cy="0"/>
+        </a:xfrm>
+      </p:grpSpPr>
+      <p:sp>
+        <p:nvSpPr>
+          <p:cNvPr id="11" name="Title 10"/>
+          <p:cNvSpPr>
+            <a:spLocks noGrp="1"/>
+          </p:cNvSpPr>
+          <p:nvPr>
+            <p:ph type="title"/>
+          </p:nvPr>
+        </p:nvSpPr>
+        <p:spPr/>
+        <p:txBody>
+          <a:bodyPr/>
+          <a:lstStyle/>
+          <a:p>
+            <a:r>
+              <a:rPr lang="en-US" dirty="0" smtClean="0"/>
+              <a:t>Agenda</a:t>
+            </a:r>
+            <a:endParaRPr lang="en-US" dirty="0"/>
+          </a:p>
+        </p:txBody>
+      </p:sp>
+      <p:sp>
+        <p:nvSpPr>
+          <p:cNvPr id="12" name="Text Placeholder 11"/>
+          <p:cNvSpPr>
+            <a:spLocks noGrp="1"/>
+          </p:cNvSpPr>
+          <p:nvPr>
+            <p:ph type="body" sz="quarter" idx="13"/>
+          </p:nvPr>
+        </p:nvSpPr>
+        <p:spPr/>
+        <p:txBody>
+          <a:bodyPr/>
+          <a:lstStyle/>
+          <a:p>
+            <a:r>
+              <a:rPr lang="en-US" dirty="0" smtClean="0"/>
+              <a:t>Introduction</a:t>
+            </a:r>
+          </a:p>
+          <a:p>
+            <a:pPr lvl="1"/>
+            <a:r>
+              <a:rPr lang="en-US" dirty="0" smtClean="0"/>
+              <a:t>Java EE 7 &amp; JavaServer Faces 2.2, PrimeFaces, NetBeans IDE</a:t>
+            </a:r>
+          </a:p>
+          <a:p>
+            <a:pPr marL="403225" lvl="1" indent="0">
+              <a:buNone/>
+            </a:pPr>
+            <a:endParaRPr lang="en-US" dirty="0" smtClean="0"/>
+          </a:p>
+          <a:p>
+            <a:r>
+              <a:rPr lang="en-US" dirty="0" smtClean="0"/>
+              <a:t>Tour through 10 features of the JSF and PF </a:t>
+            </a:r>
+          </a:p>
+          <a:p>
+            <a:pPr lvl="1"/>
+            <a:r>
+              <a:rPr lang="en-US" dirty="0" smtClean="0"/>
+              <a:t>Feature overview</a:t>
+            </a:r>
+          </a:p>
+          <a:p>
+            <a:pPr lvl="1"/>
+            <a:r>
+              <a:rPr lang="en-US" dirty="0" smtClean="0"/>
+              <a:t>Samples in action</a:t>
+            </a:r>
+          </a:p>
+        </p:txBody>
+      </p:sp>
+    </p:spTree>
+    <p:extLst>
+      <p:ext uri="{BB962C8B-B14F-4D97-AF65-F5344CB8AC3E}">
+        <p14:creationId xmlns:p14="http://schemas.microsoft.com/office/powerpoint/2010/main" val="1886183616"/>
+      </p:ext>
+    </p:extLst>
+  </p:cSld>
+  <p:clrMapOvr>
+    <a:masterClrMapping/>
+  </p:clrMapOvr>
+  <mc:AlternateContent xmlns:mc="http://schemas.openxmlformats.org/markup-compatibility/2006" xmlns:p14="http://schemas.microsoft.com/office/powerpoint/2010/main">
+    <mc:Choice Requires="p14">
+      <p:transition spd="med" p14:dur="700">
+        <p:fade/>
+      </p:transition>
+    </mc:Choice>
+    <mc:Fallback xmlns="">
+      <p:transition spd="med">
+        <p:fade/>
+      </p:transition>
+    </mc:Fallback>
+  </mc:AlternateContent>
+  <p:timing>
+    <p:tnLst>
+      <p:par>
+        <p:cTn id="1" dur="indefinite" restart="never" nodeType="tmRoot"/>
+      </p:par>
+    </p:tnLst>
+  </p:timing>
+</p:sld>
+</file>
+
+<file path=ppt/slides/slide40.xml><?xml version="1.0" encoding="utf-8"?>
 <p:sld xmlns:a="http://schemas.openxmlformats.org/drawingml/2006/main" xmlns:r="http://schemas.openxmlformats.org/officeDocument/2006/relationships" xmlns:p="http://schemas.openxmlformats.org/presentationml/2006/main">
   <p:cSld>
     <p:spTree>
@@ -16621,14 +16944,14 @@
   <p:timing>
     <p:tnLst>
       <p:par>
-        <p:cTn xmlns:p14="http://schemas.microsoft.com/office/powerpoint/2010/main" id="1" dur="indefinite" restart="never" nodeType="tmRoot"/>
+        <p:cTn id="1" dur="indefinite" restart="never" nodeType="tmRoot"/>
       </p:par>
     </p:tnLst>
   </p:timing>
 </p:sld>
 </file>
 
-<file path=ppt/slides/slide4.xml><?xml version="1.0" encoding="utf-8"?>
+<file path=ppt/slides/slide5.xml><?xml version="1.0" encoding="utf-8"?>
 <p:sld xmlns:a="http://schemas.openxmlformats.org/drawingml/2006/main" xmlns:r="http://schemas.openxmlformats.org/officeDocument/2006/relationships" xmlns:p="http://schemas.openxmlformats.org/presentationml/2006/main">
   <p:cSld>
     <p:spTree>
@@ -16658,7 +16981,7 @@
         <p:spPr>
           <a:xfrm>
             <a:off x="3443821" y="1404881"/>
-            <a:ext cx="5630202" cy="2523657"/>
+            <a:ext cx="5369979" cy="2523657"/>
           </a:xfrm>
         </p:spPr>
         <p:txBody>
@@ -16671,35 +16994,39 @@
             </a:pPr>
             <a:r>
               <a:rPr lang="en-US" sz="2000" cap="none" dirty="0" smtClean="0"/>
-              <a:t>Open Source </a:t>
-            </a:r>
-            <a:r>
-              <a:rPr lang="en-US" sz="2000" cap="none" dirty="0"/>
-              <a:t>C</a:t>
-            </a:r>
-            <a:r>
-              <a:rPr lang="en-US" sz="2000" cap="none" dirty="0" smtClean="0"/>
-              <a:t>omponent </a:t>
-            </a:r>
-            <a:r>
-              <a:rPr lang="en-US" sz="2000" cap="none" dirty="0"/>
-              <a:t>L</a:t>
-            </a:r>
-            <a:r>
-              <a:rPr lang="en-US" sz="2000" cap="none" dirty="0" smtClean="0"/>
-              <a:t>ibrary for JSF 2.x</a:t>
-            </a:r>
-            <a:br>
-              <a:rPr lang="en-US" sz="2000" cap="none" dirty="0" smtClean="0"/>
-            </a:br>
-            <a:r>
-              <a:rPr lang="en-US" sz="2000" cap="none" dirty="0" smtClean="0"/>
-              <a:t>			</a:t>
-            </a:r>
-            <a:r>
-              <a:rPr lang="en-US" sz="1400" cap="none" dirty="0" smtClean="0"/>
-              <a:t>JSF 2.2 is supported with PF version 4.x</a:t>
-            </a:r>
+              <a:t>Java EE 7 – 14 JSRs and 9 MRs, themes:</a:t>
+            </a:r>
+          </a:p>
+          <a:p>
+            <a:pPr marL="917575" lvl="1" indent="-285750"/>
+            <a:r>
+              <a:rPr lang="en-US" sz="1400" dirty="0" smtClean="0"/>
+              <a:t>HTML5</a:t>
+            </a:r>
+          </a:p>
+          <a:p>
+            <a:pPr marL="917575" lvl="1" indent="-285750"/>
+            <a:r>
+              <a:rPr lang="en-US" sz="1400" dirty="0" smtClean="0"/>
+              <a:t>Developer </a:t>
+            </a:r>
+            <a:r>
+              <a:rPr lang="en-US" sz="1400" dirty="0"/>
+              <a:t>productivity</a:t>
+            </a:r>
+            <a:endParaRPr lang="en-US" sz="1400" dirty="0" smtClean="0"/>
+          </a:p>
+          <a:p>
+            <a:pPr marL="917575" lvl="1" indent="-285750"/>
+            <a:r>
+              <a:rPr lang="en-US" sz="1400" dirty="0" smtClean="0"/>
+              <a:t>Enterprise </a:t>
+            </a:r>
+            <a:r>
+              <a:rPr lang="en-US" sz="1400" dirty="0"/>
+              <a:t>demands</a:t>
+            </a:r>
+            <a:endParaRPr lang="en-US" sz="1400" cap="none" dirty="0" smtClean="0"/>
           </a:p>
           <a:p>
             <a:pPr marL="342900" indent="-342900">
@@ -16708,18 +17035,187 @@
             </a:pPr>
             <a:r>
               <a:rPr lang="en-US" sz="2000" cap="none" dirty="0" smtClean="0"/>
-              <a:t>Very Lightweight w/ Zero </a:t>
-            </a:r>
-            <a:r>
-              <a:rPr lang="en-US" sz="2000" cap="none" dirty="0"/>
-              <a:t>C</a:t>
-            </a:r>
-            <a:r>
-              <a:rPr lang="en-US" sz="2000" cap="none" dirty="0" smtClean="0"/>
-              <a:t>onfiguration</a:t>
-            </a:r>
-            <a:endParaRPr lang="en-US" sz="2000" cap="none" dirty="0"/>
-          </a:p>
+              <a:t>JavaServer Faces 2.2 big ticket features:</a:t>
+            </a:r>
+          </a:p>
+          <a:p>
+            <a:pPr marL="917575" lvl="1" indent="-285750"/>
+            <a:r>
+              <a:rPr lang="en-US" sz="1400" dirty="0" smtClean="0"/>
+              <a:t>HTML(5) </a:t>
+            </a:r>
+            <a:r>
+              <a:rPr lang="en-US" sz="1400" dirty="0"/>
+              <a:t>F</a:t>
+            </a:r>
+            <a:r>
+              <a:rPr lang="en-US" sz="1400" dirty="0" smtClean="0"/>
+              <a:t>riendly Markup</a:t>
+            </a:r>
+            <a:endParaRPr lang="en-US" sz="1400" dirty="0"/>
+          </a:p>
+          <a:p>
+            <a:pPr marL="917575" lvl="1" indent="-285750"/>
+            <a:r>
+              <a:rPr lang="en-US" sz="1400" dirty="0" smtClean="0"/>
+              <a:t>Faces Flow</a:t>
+            </a:r>
+          </a:p>
+          <a:p>
+            <a:pPr marL="917575" lvl="1" indent="-285750"/>
+            <a:r>
+              <a:rPr lang="en-US" sz="1400" dirty="0"/>
+              <a:t>Resource Library </a:t>
+            </a:r>
+            <a:r>
+              <a:rPr lang="en-US" sz="1400" dirty="0" smtClean="0"/>
+              <a:t>Contract</a:t>
+            </a:r>
+          </a:p>
+          <a:p>
+            <a:pPr marL="917575" lvl="1" indent="-285750">
+              <a:buFont typeface="Wingdings" pitchFamily="2" charset="2"/>
+              <a:buChar char="§"/>
+            </a:pPr>
+            <a:endParaRPr lang="en-US" sz="1400" cap="none" dirty="0" smtClean="0"/>
+          </a:p>
+          <a:p>
+            <a:pPr marL="917575" lvl="1" indent="-285750">
+              <a:buFont typeface="Wingdings" pitchFamily="2" charset="2"/>
+              <a:buChar char="§"/>
+            </a:pPr>
+            <a:endParaRPr lang="en-US" sz="1400" cap="none" dirty="0"/>
+          </a:p>
+        </p:txBody>
+      </p:sp>
+      <p:sp>
+        <p:nvSpPr>
+          <p:cNvPr id="16" name="Title 15"/>
+          <p:cNvSpPr>
+            <a:spLocks noGrp="1"/>
+          </p:cNvSpPr>
+          <p:nvPr>
+            <p:ph type="title"/>
+          </p:nvPr>
+        </p:nvSpPr>
+        <p:spPr/>
+        <p:txBody>
+          <a:bodyPr/>
+          <a:lstStyle/>
+          <a:p>
+            <a:r>
+              <a:rPr lang="en-US" dirty="0" smtClean="0"/>
+              <a:t>Java EE 7 &amp; JavaServer Faces 2.2</a:t>
+            </a:r>
+            <a:endParaRPr lang="en-US" dirty="0"/>
+          </a:p>
+        </p:txBody>
+      </p:sp>
+      <p:pic>
+        <p:nvPicPr>
+          <p:cNvPr id="24" name="Picture 8" descr="http://entwicklertagebuch.com/blog/wp-content/uploads/2013/01/20110510-jsf-logo.png"/>
+          <p:cNvPicPr>
+            <a:picLocks noGrp="1" noChangeAspect="1" noChangeArrowheads="1"/>
+          </p:cNvPicPr>
+          <p:nvPr>
+            <p:ph type="pic" sz="quarter" idx="13"/>
+          </p:nvPr>
+        </p:nvPicPr>
+        <p:blipFill rotWithShape="1">
+          <a:blip r:embed="rId2" cstate="print">
+            <a:extLst>
+              <a:ext uri="{28A0092B-C50C-407E-A947-70E740481C1C}">
+                <a14:useLocalDpi xmlns:a14="http://schemas.microsoft.com/office/drawing/2010/main" val="0"/>
+              </a:ext>
+            </a:extLst>
+          </a:blip>
+          <a:srcRect t="-66461" b="-66461"/>
+          <a:stretch/>
+        </p:blipFill>
+        <p:spPr bwMode="auto">
+          <a:prstGeom prst="rect">
+            <a:avLst/>
+          </a:prstGeom>
+          <a:noFill/>
+          <a:extLst>
+            <a:ext uri="{909E8E84-426E-40DD-AFC4-6F175D3DCCD1}">
+              <a14:hiddenFill xmlns:a14="http://schemas.microsoft.com/office/drawing/2010/main">
+                <a:solidFill>
+                  <a:srgbClr val="FFFFFF"/>
+                </a:solidFill>
+              </a14:hiddenFill>
+            </a:ext>
+          </a:extLst>
+        </p:spPr>
+      </p:pic>
+    </p:spTree>
+    <p:extLst>
+      <p:ext uri="{BB962C8B-B14F-4D97-AF65-F5344CB8AC3E}">
+        <p14:creationId xmlns:p14="http://schemas.microsoft.com/office/powerpoint/2010/main" val="180701055"/>
+      </p:ext>
+    </p:extLst>
+  </p:cSld>
+  <p:clrMapOvr>
+    <a:masterClrMapping/>
+  </p:clrMapOvr>
+  <mc:AlternateContent xmlns:mc="http://schemas.openxmlformats.org/markup-compatibility/2006" xmlns:p14="http://schemas.microsoft.com/office/powerpoint/2010/main">
+    <mc:Choice Requires="p14">
+      <p:transition spd="med" p14:dur="700">
+        <p:fade/>
+      </p:transition>
+    </mc:Choice>
+    <mc:Fallback xmlns="">
+      <p:transition spd="med">
+        <p:fade/>
+      </p:transition>
+    </mc:Fallback>
+  </mc:AlternateContent>
+  <p:timing>
+    <p:tnLst>
+      <p:par>
+        <p:cTn id="1" dur="indefinite" restart="never" nodeType="tmRoot"/>
+      </p:par>
+    </p:tnLst>
+  </p:timing>
+</p:sld>
+</file>
+
+<file path=ppt/slides/slide6.xml><?xml version="1.0" encoding="utf-8"?>
+<p:sld xmlns:a="http://schemas.openxmlformats.org/drawingml/2006/main" xmlns:r="http://schemas.openxmlformats.org/officeDocument/2006/relationships" xmlns:p="http://schemas.openxmlformats.org/presentationml/2006/main">
+  <p:cSld>
+    <p:spTree>
+      <p:nvGrpSpPr>
+        <p:cNvPr id="1" name=""/>
+        <p:cNvGrpSpPr/>
+        <p:nvPr/>
+      </p:nvGrpSpPr>
+      <p:grpSpPr>
+        <a:xfrm>
+          <a:off x="0" y="0"/>
+          <a:ext cx="0" cy="0"/>
+          <a:chOff x="0" y="0"/>
+          <a:chExt cx="0" cy="0"/>
+        </a:xfrm>
+      </p:grpSpPr>
+      <p:sp>
+        <p:nvSpPr>
+          <p:cNvPr id="17" name="Text Placeholder 16"/>
+          <p:cNvSpPr>
+            <a:spLocks noGrp="1"/>
+          </p:cNvSpPr>
+          <p:nvPr>
+            <p:ph type="body" sz="quarter" idx="11"/>
+          </p:nvPr>
+        </p:nvSpPr>
+        <p:spPr>
+          <a:xfrm>
+            <a:off x="3443821" y="1404881"/>
+            <a:ext cx="5630202" cy="2523657"/>
+          </a:xfrm>
+        </p:spPr>
+        <p:txBody>
+          <a:bodyPr/>
+          <a:lstStyle/>
           <a:p>
             <a:pPr marL="342900" indent="-342900">
               <a:buFont typeface="Wingdings" pitchFamily="2" charset="2"/>
@@ -16727,15 +17223,34 @@
             </a:pPr>
             <a:r>
               <a:rPr lang="en-US" sz="2000" cap="none" dirty="0" smtClean="0"/>
-              <a:t>Plenty </a:t>
+              <a:t>Open Source </a:t>
             </a:r>
             <a:r>
               <a:rPr lang="en-US" sz="2000" cap="none" dirty="0"/>
-              <a:t>of examples in S</a:t>
+              <a:t>C</a:t>
             </a:r>
             <a:r>
               <a:rPr lang="en-US" sz="2000" cap="none" dirty="0" smtClean="0"/>
-              <a:t>howcase, extensive theming, provides mobile components</a:t>
+              <a:t>omponent </a:t>
+            </a:r>
+            <a:r>
+              <a:rPr lang="en-US" sz="2000" cap="none" dirty="0"/>
+              <a:t>L</a:t>
+            </a:r>
+            <a:r>
+              <a:rPr lang="en-US" sz="2000" cap="none" dirty="0" smtClean="0"/>
+              <a:t>ibrary for JSF 2.x</a:t>
+            </a:r>
+            <a:br>
+              <a:rPr lang="en-US" sz="2000" cap="none" dirty="0" smtClean="0"/>
+            </a:br>
+            <a:r>
+              <a:rPr lang="en-US" sz="2000" cap="none" dirty="0" smtClean="0"/>
+              <a:t>			</a:t>
+            </a:r>
+            <a:r>
+              <a:rPr lang="en-US" sz="1400" cap="none" dirty="0" smtClean="0"/>
+              <a:t>JSF 2.2 is supported with PF version 4.x</a:t>
             </a:r>
           </a:p>
           <a:p>
@@ -16745,7 +17260,52 @@
             </a:pPr>
             <a:r>
               <a:rPr lang="en-US" sz="2000" cap="none" dirty="0" smtClean="0"/>
-              <a:t>Well documented, user guides, books &amp; etc.</a:t>
+              <a:t>Very Lightweight w/ Zero </a:t>
+            </a:r>
+            <a:r>
+              <a:rPr lang="en-US" sz="2000" cap="none" dirty="0"/>
+              <a:t>C</a:t>
+            </a:r>
+            <a:r>
+              <a:rPr lang="en-US" sz="2000" cap="none" dirty="0" smtClean="0"/>
+              <a:t>onfiguration</a:t>
+            </a:r>
+            <a:endParaRPr lang="en-US" sz="2000" cap="none" dirty="0"/>
+          </a:p>
+          <a:p>
+            <a:pPr marL="342900" indent="-342900">
+              <a:buFont typeface="Wingdings" pitchFamily="2" charset="2"/>
+              <a:buChar char="§"/>
+            </a:pPr>
+            <a:r>
+              <a:rPr lang="en-US" sz="2000" cap="none" dirty="0" smtClean="0"/>
+              <a:t>Plenty </a:t>
+            </a:r>
+            <a:r>
+              <a:rPr lang="en-US" sz="2000" cap="none" dirty="0"/>
+              <a:t>of examples in S</a:t>
+            </a:r>
+            <a:r>
+              <a:rPr lang="en-US" sz="2000" cap="none" dirty="0" smtClean="0"/>
+              <a:t>howcase, extensive theming, provides mobile components</a:t>
+            </a:r>
+          </a:p>
+          <a:p>
+            <a:pPr marL="342900" indent="-342900">
+              <a:buFont typeface="Wingdings" pitchFamily="2" charset="2"/>
+              <a:buChar char="§"/>
+            </a:pPr>
+            <a:r>
+              <a:rPr lang="en-US" sz="2000" cap="none" dirty="0" smtClean="0"/>
+              <a:t>Well documented, user guides, </a:t>
+            </a:r>
+            <a:r>
+              <a:rPr lang="en-US" sz="2000" cap="none" dirty="0" smtClean="0"/>
+              <a:t>books &amp; </a:t>
+            </a:r>
+            <a:r>
+              <a:rPr lang="en-US" sz="2000" cap="none" dirty="0" smtClean="0"/>
+              <a:t>etc.</a:t>
             </a:r>
             <a:endParaRPr lang="en-US" sz="2000" cap="none" dirty="0"/>
           </a:p>
@@ -16833,7 +17393,7 @@
           </a:prstGeom>
           <a:noFill/>
           <a:extLst>
-            <a:ext uri="{909E8E84-426E-40dd-AFC4-6F175D3DCCD1}">
+            <a:ext uri="{909E8E84-426E-40DD-AFC4-6F175D3DCCD1}">
               <a14:hiddenFill xmlns:a14="http://schemas.microsoft.com/office/drawing/2010/main">
                 <a:solidFill>
                   <a:srgbClr val="FFFFFF"/>
@@ -16868,14 +17428,14 @@
   <p:timing>
     <p:tnLst>
       <p:par>
-        <p:cTn xmlns:p14="http://schemas.microsoft.com/office/powerpoint/2010/main" id="1" dur="indefinite" restart="never" nodeType="tmRoot"/>
+        <p:cTn id="1" dur="indefinite" restart="never" nodeType="tmRoot"/>
       </p:par>
     </p:tnLst>
   </p:timing>
 </p:sld>
 </file>
 
-<file path=ppt/slides/slide5.xml><?xml version="1.0" encoding="utf-8"?>
+<file path=ppt/slides/slide7.xml><?xml version="1.0" encoding="utf-8"?>
 <p:sld xmlns:a="http://schemas.openxmlformats.org/drawingml/2006/main" xmlns:r="http://schemas.openxmlformats.org/officeDocument/2006/relationships" xmlns:p="http://schemas.openxmlformats.org/presentationml/2006/main">
   <p:cSld>
     <p:spTree>
@@ -16978,8 +17538,13 @@
             <a:pPr marL="917575" lvl="1" indent="-285750"/>
             <a:r>
               <a:rPr lang="en-US" dirty="0" smtClean="0"/>
-              <a:t>Cordova, VCS improvements</a:t>
-            </a:r>
+              <a:t>Cordova, </a:t>
+            </a:r>
+            <a:r>
+              <a:rPr lang="en-US" dirty="0" smtClean="0"/>
+              <a:t>FindBugs, VCS improvements</a:t>
+            </a:r>
+            <a:endParaRPr lang="en-US" dirty="0" smtClean="0"/>
           </a:p>
           <a:p>
             <a:pPr marL="917575" lvl="1" indent="-285750"/>
@@ -17059,7 +17624,7 @@
           </a:prstGeom>
           <a:noFill/>
           <a:extLst>
-            <a:ext uri="{909E8E84-426E-40dd-AFC4-6F175D3DCCD1}">
+            <a:ext uri="{909E8E84-426E-40DD-AFC4-6F175D3DCCD1}">
               <a14:hiddenFill xmlns:a14="http://schemas.microsoft.com/office/drawing/2010/main">
                 <a:solidFill>
                   <a:srgbClr val="FFFFFF"/>
@@ -17094,14 +17659,14 @@
   <p:timing>
     <p:tnLst>
       <p:par>
-        <p:cTn xmlns:p14="http://schemas.microsoft.com/office/powerpoint/2010/main" id="1" dur="indefinite" restart="never" nodeType="tmRoot"/>
+        <p:cTn id="1" dur="indefinite" restart="never" nodeType="tmRoot"/>
       </p:par>
     </p:tnLst>
   </p:timing>
 </p:sld>
 </file>
 
-<file path=ppt/slides/slide6.xml><?xml version="1.0" encoding="utf-8"?>
+<file path=ppt/slides/slide8.xml><?xml version="1.0" encoding="utf-8"?>
 <p:sld xmlns:a="http://schemas.openxmlformats.org/drawingml/2006/main" xmlns:r="http://schemas.openxmlformats.org/officeDocument/2006/relationships" xmlns:p="http://schemas.openxmlformats.org/presentationml/2006/main">
   <p:cSld>
     <p:spTree>
@@ -17165,14 +17730,14 @@
   <p:timing>
     <p:tnLst>
       <p:par>
-        <p:cTn xmlns:p14="http://schemas.microsoft.com/office/powerpoint/2010/main" id="1" dur="indefinite" restart="never" nodeType="tmRoot"/>
+        <p:cTn id="1" dur="indefinite" restart="never" nodeType="tmRoot"/>
       </p:par>
     </p:tnLst>
   </p:timing>
 </p:sld>
 </file>
 
-<file path=ppt/slides/slide7.xml><?xml version="1.0" encoding="utf-8"?>
+<file path=ppt/slides/slide9.xml><?xml version="1.0" encoding="utf-8"?>
 <p:sld xmlns:a="http://schemas.openxmlformats.org/drawingml/2006/main" xmlns:r="http://schemas.openxmlformats.org/officeDocument/2006/relationships" xmlns:p="http://schemas.openxmlformats.org/presentationml/2006/main">
   <p:cSld>
     <p:spTree>
@@ -17302,23 +17867,17 @@
             <a:pPr lvl="1"/>
             <a:r>
               <a:rPr lang="en-US" dirty="0" smtClean="0"/>
-              <a:t>Write </a:t>
-            </a:r>
-            <a:r>
-              <a:rPr lang="en-US" dirty="0"/>
-              <a:t>and style pure HTML with benefits of </a:t>
-            </a:r>
-            <a:r>
-              <a:rPr lang="en-US" dirty="0" smtClean="0"/>
-              <a:t>JSF</a:t>
-            </a:r>
-          </a:p>
-          <a:p>
-            <a:pPr lvl="1"/>
-            <a:r>
-              <a:rPr lang="en-US" dirty="0" smtClean="0"/>
-              <a:t>Control over rendered Facelet</a:t>
-            </a:r>
+              <a:t>Getting control </a:t>
+            </a:r>
+            <a:r>
+              <a:rPr lang="en-US" dirty="0" smtClean="0"/>
+              <a:t>over rendered </a:t>
+            </a:r>
+            <a:r>
+              <a:rPr lang="en-US" dirty="0" smtClean="0"/>
+              <a:t>Facelets</a:t>
+            </a:r>
+            <a:endParaRPr lang="en-US" dirty="0" smtClean="0"/>
           </a:p>
           <a:p>
             <a:pPr lvl="1"/>
@@ -17341,7 +17900,15 @@
           </a:p>
           <a:p>
             <a:pPr lvl="1"/>
-            <a:endParaRPr lang="en-US" dirty="0" smtClean="0"/>
+            <a:r>
+              <a:rPr lang="en-US" dirty="0"/>
+              <a:t>Write and style pure HTML with benefits of </a:t>
+            </a:r>
+            <a:r>
+              <a:rPr lang="en-US" dirty="0" smtClean="0"/>
+              <a:t>JSF</a:t>
+            </a:r>
+            <a:endParaRPr lang="en-US" dirty="0"/>
           </a:p>
         </p:txBody>
       </p:sp>
@@ -17389,235 +17956,7 @@
   <p:timing>
     <p:tnLst>
       <p:par>
-        <p:cTn xmlns:p14="http://schemas.microsoft.com/office/powerpoint/2010/main" id="1" dur="indefinite" restart="never" nodeType="tmRoot"/>
-      </p:par>
-    </p:tnLst>
-  </p:timing>
-</p:sld>
-</file>
-
-<file path=ppt/slides/slide8.xml><?xml version="1.0" encoding="utf-8"?>
-<p:sld xmlns:a="http://schemas.openxmlformats.org/drawingml/2006/main" xmlns:r="http://schemas.openxmlformats.org/officeDocument/2006/relationships" xmlns:p="http://schemas.openxmlformats.org/presentationml/2006/main">
-  <p:cSld>
-    <p:spTree>
-      <p:nvGrpSpPr>
-        <p:cNvPr id="1" name=""/>
-        <p:cNvGrpSpPr/>
-        <p:nvPr/>
-      </p:nvGrpSpPr>
-      <p:grpSpPr>
-        <a:xfrm>
-          <a:off x="0" y="0"/>
-          <a:ext cx="0" cy="0"/>
-          <a:chOff x="0" y="0"/>
-          <a:chExt cx="0" cy="0"/>
-        </a:xfrm>
-      </p:grpSpPr>
-      <p:sp>
-        <p:nvSpPr>
-          <p:cNvPr id="35" name="Content Placeholder 34"/>
-          <p:cNvSpPr>
-            <a:spLocks noGrp="1"/>
-          </p:cNvSpPr>
-          <p:nvPr>
-            <p:ph type="body" sz="quarter" idx="11"/>
-          </p:nvPr>
-        </p:nvSpPr>
-        <p:spPr/>
-        <p:txBody>
-          <a:bodyPr>
-            <a:normAutofit fontScale="92500" lnSpcReduction="10000"/>
-          </a:bodyPr>
-          <a:lstStyle/>
-          <a:p>
-            <a:r>
-              <a:rPr lang="en-US" dirty="0" smtClean="0"/>
-              <a:t>Form with usage of HTML friendly markup: validation by Bean Validation API with localized messages, custom Bean Validation annotation, passthrough attributes and elements, usage of jQuery plugin on JSF component.</a:t>
-            </a:r>
-            <a:endParaRPr lang="en-US" dirty="0"/>
-          </a:p>
-          <a:p>
-            <a:endParaRPr lang="en-US" dirty="0" smtClean="0"/>
-          </a:p>
-          <a:p>
-            <a:endParaRPr lang="en-US" dirty="0" smtClean="0"/>
-          </a:p>
-        </p:txBody>
-      </p:sp>
-      <p:sp>
-        <p:nvSpPr>
-          <p:cNvPr id="2" name="Text Placeholder 1"/>
-          <p:cNvSpPr>
-            <a:spLocks noGrp="1"/>
-          </p:cNvSpPr>
-          <p:nvPr>
-            <p:ph type="body" sz="quarter" idx="16"/>
-          </p:nvPr>
-        </p:nvSpPr>
-        <p:spPr/>
-        <p:txBody>
-          <a:bodyPr/>
-          <a:lstStyle/>
-          <a:p>
-            <a:r>
-              <a:rPr lang="en-US" dirty="0" smtClean="0"/>
-              <a:t>01-HtmlFriendlyMarkup</a:t>
-            </a:r>
-            <a:endParaRPr lang="en-US" dirty="0"/>
-          </a:p>
-        </p:txBody>
-      </p:sp>
-      <p:sp>
-        <p:nvSpPr>
-          <p:cNvPr id="3" name="Text Placeholder 2"/>
-          <p:cNvSpPr>
-            <a:spLocks noGrp="1"/>
-          </p:cNvSpPr>
-          <p:nvPr>
-            <p:ph type="body" sz="quarter" idx="17"/>
-          </p:nvPr>
-        </p:nvSpPr>
-        <p:spPr/>
-        <p:txBody>
-          <a:bodyPr/>
-          <a:lstStyle/>
-          <a:p>
-            <a:r>
-              <a:rPr lang="en-US" dirty="0"/>
-              <a:t>https://github.com/marfous/j1demo-pf</a:t>
-            </a:r>
-          </a:p>
-        </p:txBody>
-      </p:sp>
-      <p:sp>
-        <p:nvSpPr>
-          <p:cNvPr id="25" name="Title 24"/>
-          <p:cNvSpPr>
-            <a:spLocks noGrp="1"/>
-          </p:cNvSpPr>
-          <p:nvPr>
-            <p:ph type="title" idx="4294967295"/>
-          </p:nvPr>
-        </p:nvSpPr>
-        <p:spPr>
-          <a:xfrm>
-            <a:off x="914400" y="246063"/>
-            <a:ext cx="8229600" cy="768350"/>
-          </a:xfrm>
-        </p:spPr>
-        <p:txBody>
-          <a:bodyPr/>
-          <a:lstStyle/>
-          <a:p>
-            <a:r>
-              <a:rPr lang="en-US" dirty="0"/>
-              <a:t>HTML(5) Friendly Markup</a:t>
-            </a:r>
-          </a:p>
-        </p:txBody>
-      </p:sp>
-    </p:spTree>
-    <p:extLst>
-      <p:ext uri="{BB962C8B-B14F-4D97-AF65-F5344CB8AC3E}">
-        <p14:creationId xmlns:p14="http://schemas.microsoft.com/office/powerpoint/2010/main" val="3210850429"/>
-      </p:ext>
-    </p:extLst>
-  </p:cSld>
-  <p:clrMapOvr>
-    <a:masterClrMapping/>
-  </p:clrMapOvr>
-  <mc:AlternateContent xmlns:mc="http://schemas.openxmlformats.org/markup-compatibility/2006" xmlns:p14="http://schemas.microsoft.com/office/powerpoint/2010/main">
-    <mc:Choice Requires="p14">
-      <p:transition spd="med" p14:dur="700">
-        <p:fade/>
-      </p:transition>
-    </mc:Choice>
-    <mc:Fallback xmlns="">
-      <p:transition spd="med">
-        <p:fade/>
-      </p:transition>
-    </mc:Fallback>
-  </mc:AlternateContent>
-  <p:timing>
-    <p:tnLst>
-      <p:par>
-        <p:cTn xmlns:p14="http://schemas.microsoft.com/office/powerpoint/2010/main" id="1" dur="indefinite" restart="never" nodeType="tmRoot"/>
-      </p:par>
-    </p:tnLst>
-  </p:timing>
-</p:sld>
-</file>
-
-<file path=ppt/slides/slide9.xml><?xml version="1.0" encoding="utf-8"?>
-<p:sld xmlns:a="http://schemas.openxmlformats.org/drawingml/2006/main" xmlns:r="http://schemas.openxmlformats.org/officeDocument/2006/relationships" xmlns:p="http://schemas.openxmlformats.org/presentationml/2006/main">
-  <p:cSld>
-    <p:spTree>
-      <p:nvGrpSpPr>
-        <p:cNvPr id="1" name=""/>
-        <p:cNvGrpSpPr/>
-        <p:nvPr/>
-      </p:nvGrpSpPr>
-      <p:grpSpPr>
-        <a:xfrm>
-          <a:off x="0" y="0"/>
-          <a:ext cx="0" cy="0"/>
-          <a:chOff x="0" y="0"/>
-          <a:chExt cx="0" cy="0"/>
-        </a:xfrm>
-      </p:grpSpPr>
-      <p:sp>
-        <p:nvSpPr>
-          <p:cNvPr id="5" name="Title 4"/>
-          <p:cNvSpPr>
-            <a:spLocks noGrp="1"/>
-          </p:cNvSpPr>
-          <p:nvPr>
-            <p:ph type="title"/>
-          </p:nvPr>
-        </p:nvSpPr>
-        <p:spPr/>
-        <p:txBody>
-          <a:bodyPr/>
-          <a:lstStyle/>
-          <a:p>
-            <a:r>
-              <a:rPr lang="en-US" dirty="0"/>
-              <a:t>Resource Libraries </a:t>
-            </a:r>
-            <a:r>
-              <a:rPr lang="en-US" dirty="0" smtClean="0"/>
-              <a:t>Contracts</a:t>
-            </a:r>
-            <a:endParaRPr lang="en-US" dirty="0"/>
-          </a:p>
-        </p:txBody>
-      </p:sp>
-    </p:spTree>
-    <p:extLst>
-      <p:ext uri="{BB962C8B-B14F-4D97-AF65-F5344CB8AC3E}">
-        <p14:creationId xmlns:p14="http://schemas.microsoft.com/office/powerpoint/2010/main" val="1029177638"/>
-      </p:ext>
-    </p:extLst>
-  </p:cSld>
-  <p:clrMapOvr>
-    <a:masterClrMapping/>
-  </p:clrMapOvr>
-  <mc:AlternateContent xmlns:mc="http://schemas.openxmlformats.org/markup-compatibility/2006" xmlns:p14="http://schemas.microsoft.com/office/powerpoint/2010/main">
-    <mc:Choice Requires="p14">
-      <p:transition spd="med" p14:dur="700">
-        <p:fade/>
-      </p:transition>
-    </mc:Choice>
-    <mc:Fallback xmlns="">
-      <p:transition spd="med">
-        <p:fade/>
-      </p:transition>
-    </mc:Fallback>
-  </mc:AlternateContent>
-  <p:timing>
-    <p:tnLst>
-      <p:par>
-        <p:cTn xmlns:p14="http://schemas.microsoft.com/office/powerpoint/2010/main" id="1" dur="indefinite" restart="never" nodeType="tmRoot"/>
+        <p:cTn id="1" dur="indefinite" restart="never" nodeType="tmRoot"/>
       </p:par>
     </p:tnLst>
   </p:timing>

</xml_diff>

<commit_message>
04 and 05 are on its way some corrections on the slidedeck
</commit_message>
<xml_diff>
--- a/con3638.pptx
+++ b/con3638.pptx
@@ -6,10 +6,10 @@
     <p:sldMasterId id="2147483766" r:id="rId2"/>
   </p:sldMasterIdLst>
   <p:notesMasterIdLst>
-    <p:notesMasterId r:id="rId43"/>
+    <p:notesMasterId r:id="rId44"/>
   </p:notesMasterIdLst>
   <p:handoutMasterIdLst>
-    <p:handoutMasterId r:id="rId44"/>
+    <p:handoutMasterId r:id="rId45"/>
   </p:handoutMasterIdLst>
   <p:sldIdLst>
     <p:sldId id="618" r:id="rId3"/>
@@ -19,39 +19,40 @@
     <p:sldId id="579" r:id="rId7"/>
     <p:sldId id="580" r:id="rId8"/>
     <p:sldId id="581" r:id="rId9"/>
-    <p:sldId id="582" r:id="rId10"/>
-    <p:sldId id="583" r:id="rId11"/>
-    <p:sldId id="602" r:id="rId12"/>
-    <p:sldId id="584" r:id="rId13"/>
-    <p:sldId id="593" r:id="rId14"/>
-    <p:sldId id="592" r:id="rId15"/>
-    <p:sldId id="585" r:id="rId16"/>
-    <p:sldId id="599" r:id="rId17"/>
-    <p:sldId id="595" r:id="rId18"/>
-    <p:sldId id="616" r:id="rId19"/>
-    <p:sldId id="613" r:id="rId20"/>
-    <p:sldId id="614" r:id="rId21"/>
-    <p:sldId id="586" r:id="rId22"/>
-    <p:sldId id="594" r:id="rId23"/>
-    <p:sldId id="596" r:id="rId24"/>
-    <p:sldId id="603" r:id="rId25"/>
-    <p:sldId id="604" r:id="rId26"/>
-    <p:sldId id="605" r:id="rId27"/>
-    <p:sldId id="587" r:id="rId28"/>
-    <p:sldId id="597" r:id="rId29"/>
-    <p:sldId id="598" r:id="rId30"/>
-    <p:sldId id="588" r:id="rId31"/>
-    <p:sldId id="600" r:id="rId32"/>
-    <p:sldId id="601" r:id="rId33"/>
-    <p:sldId id="589" r:id="rId34"/>
-    <p:sldId id="606" r:id="rId35"/>
-    <p:sldId id="607" r:id="rId36"/>
-    <p:sldId id="590" r:id="rId37"/>
-    <p:sldId id="608" r:id="rId38"/>
-    <p:sldId id="609" r:id="rId39"/>
-    <p:sldId id="615" r:id="rId40"/>
-    <p:sldId id="612" r:id="rId41"/>
-    <p:sldId id="577" r:id="rId42"/>
+    <p:sldId id="619" r:id="rId10"/>
+    <p:sldId id="582" r:id="rId11"/>
+    <p:sldId id="583" r:id="rId12"/>
+    <p:sldId id="602" r:id="rId13"/>
+    <p:sldId id="584" r:id="rId14"/>
+    <p:sldId id="593" r:id="rId15"/>
+    <p:sldId id="592" r:id="rId16"/>
+    <p:sldId id="585" r:id="rId17"/>
+    <p:sldId id="599" r:id="rId18"/>
+    <p:sldId id="595" r:id="rId19"/>
+    <p:sldId id="616" r:id="rId20"/>
+    <p:sldId id="613" r:id="rId21"/>
+    <p:sldId id="614" r:id="rId22"/>
+    <p:sldId id="586" r:id="rId23"/>
+    <p:sldId id="594" r:id="rId24"/>
+    <p:sldId id="596" r:id="rId25"/>
+    <p:sldId id="603" r:id="rId26"/>
+    <p:sldId id="604" r:id="rId27"/>
+    <p:sldId id="605" r:id="rId28"/>
+    <p:sldId id="587" r:id="rId29"/>
+    <p:sldId id="597" r:id="rId30"/>
+    <p:sldId id="598" r:id="rId31"/>
+    <p:sldId id="588" r:id="rId32"/>
+    <p:sldId id="600" r:id="rId33"/>
+    <p:sldId id="601" r:id="rId34"/>
+    <p:sldId id="589" r:id="rId35"/>
+    <p:sldId id="606" r:id="rId36"/>
+    <p:sldId id="607" r:id="rId37"/>
+    <p:sldId id="590" r:id="rId38"/>
+    <p:sldId id="608" r:id="rId39"/>
+    <p:sldId id="609" r:id="rId40"/>
+    <p:sldId id="615" r:id="rId41"/>
+    <p:sldId id="612" r:id="rId42"/>
+    <p:sldId id="577" r:id="rId43"/>
   </p:sldIdLst>
   <p:sldSz cx="9144000" cy="5143500" type="screen16x9"/>
   <p:notesSz cx="9144000" cy="6858000"/>
@@ -235,7 +236,7 @@
           <a:p>
             <a:fld id="{E99333BE-0D34-4F62-BD6E-2C3B14663373}" type="datetimeFigureOut">
               <a:rPr lang="en-US" smtClean="0"/>
-              <a:t>9/4/2013</a:t>
+              <a:t>9/7/13</a:t>
             </a:fld>
             <a:endParaRPr lang="en-US"/>
           </a:p>
@@ -401,7 +402,7 @@
           <a:p>
             <a:fld id="{4A2D1F94-724F-43BD-B41B-43157E9B4550}" type="datetimeFigureOut">
               <a:rPr lang="en-US" smtClean="0"/>
-              <a:t>9/4/2013</a:t>
+              <a:t>9/7/13</a:t>
             </a:fld>
             <a:endParaRPr lang="en-US"/>
           </a:p>
@@ -1032,7 +1033,7 @@
   <p:timing>
     <p:tnLst>
       <p:par>
-        <p:cTn id="1" dur="indefinite" restart="never" nodeType="tmRoot"/>
+        <p:cTn xmlns:p14="http://schemas.microsoft.com/office/powerpoint/2010/main" id="1" dur="indefinite" restart="never" nodeType="tmRoot"/>
       </p:par>
     </p:tnLst>
   </p:timing>
@@ -1344,7 +1345,7 @@
   <p:timing>
     <p:tnLst>
       <p:par>
-        <p:cTn id="1" dur="indefinite" restart="never" nodeType="tmRoot"/>
+        <p:cTn xmlns:p14="http://schemas.microsoft.com/office/powerpoint/2010/main" id="1" dur="indefinite" restart="never" nodeType="tmRoot"/>
       </p:par>
     </p:tnLst>
   </p:timing>
@@ -1643,7 +1644,7 @@
   <p:timing>
     <p:tnLst>
       <p:par>
-        <p:cTn id="1" dur="indefinite" restart="never" nodeType="tmRoot"/>
+        <p:cTn xmlns:p14="http://schemas.microsoft.com/office/powerpoint/2010/main" id="1" dur="indefinite" restart="never" nodeType="tmRoot"/>
       </p:par>
     </p:tnLst>
   </p:timing>
@@ -1869,7 +1870,7 @@
   <p:timing>
     <p:tnLst>
       <p:par>
-        <p:cTn id="1" dur="indefinite" restart="never" nodeType="tmRoot"/>
+        <p:cTn xmlns:p14="http://schemas.microsoft.com/office/powerpoint/2010/main" id="1" dur="indefinite" restart="never" nodeType="tmRoot"/>
       </p:par>
     </p:tnLst>
   </p:timing>
@@ -1927,14 +1928,14 @@
             <a:noFill/>
           </a:ln>
           <a:extLst>
-            <a:ext uri="{909E8E84-426E-40DD-AFC4-6F175D3DCCD1}">
+            <a:ext uri="{909E8E84-426E-40dd-AFC4-6F175D3DCCD1}">
               <a14:hiddenFill xmlns:a14="http://schemas.microsoft.com/office/drawing/2010/main">
                 <a:solidFill>
                   <a:srgbClr val="FFFFFF"/>
                 </a:solidFill>
               </a14:hiddenFill>
             </a:ext>
-            <a:ext uri="{91240B29-F687-4F45-9708-019B960494DF}">
+            <a:ext uri="{91240B29-F687-4f45-9708-019B960494DF}">
               <a14:hiddenLine xmlns:a14="http://schemas.microsoft.com/office/drawing/2010/main" w="9525">
                 <a:solidFill>
                   <a:srgbClr val="000000"/>
@@ -2002,7 +2003,7 @@
   <p:timing>
     <p:tnLst>
       <p:par>
-        <p:cTn id="1" dur="indefinite" restart="never" nodeType="tmRoot"/>
+        <p:cTn xmlns:p14="http://schemas.microsoft.com/office/powerpoint/2010/main" id="1" dur="indefinite" restart="never" nodeType="tmRoot"/>
       </p:par>
     </p:tnLst>
   </p:timing>
@@ -2060,14 +2061,14 @@
             <a:noFill/>
           </a:ln>
           <a:extLst>
-            <a:ext uri="{909E8E84-426E-40DD-AFC4-6F175D3DCCD1}">
+            <a:ext uri="{909E8E84-426E-40dd-AFC4-6F175D3DCCD1}">
               <a14:hiddenFill xmlns:a14="http://schemas.microsoft.com/office/drawing/2010/main">
                 <a:solidFill>
                   <a:srgbClr val="FFFFFF"/>
                 </a:solidFill>
               </a14:hiddenFill>
             </a:ext>
-            <a:ext uri="{91240B29-F687-4F45-9708-019B960494DF}">
+            <a:ext uri="{91240B29-F687-4f45-9708-019B960494DF}">
               <a14:hiddenLine xmlns:a14="http://schemas.microsoft.com/office/drawing/2010/main" w="9525">
                 <a:solidFill>
                   <a:srgbClr val="000000"/>
@@ -2114,14 +2115,14 @@
             <a:noFill/>
           </a:ln>
           <a:extLst>
-            <a:ext uri="{909E8E84-426E-40DD-AFC4-6F175D3DCCD1}">
+            <a:ext uri="{909E8E84-426E-40dd-AFC4-6F175D3DCCD1}">
               <a14:hiddenFill xmlns:a14="http://schemas.microsoft.com/office/drawing/2010/main">
                 <a:solidFill>
                   <a:srgbClr val="FFFFFF"/>
                 </a:solidFill>
               </a14:hiddenFill>
             </a:ext>
-            <a:ext uri="{91240B29-F687-4F45-9708-019B960494DF}">
+            <a:ext uri="{91240B29-F687-4f45-9708-019B960494DF}">
               <a14:hiddenLine xmlns:a14="http://schemas.microsoft.com/office/drawing/2010/main" w="9525">
                 <a:solidFill>
                   <a:srgbClr val="000000"/>
@@ -2205,7 +2206,7 @@
   <p:timing>
     <p:tnLst>
       <p:par>
-        <p:cTn id="1" dur="indefinite" restart="never" nodeType="tmRoot"/>
+        <p:cTn xmlns:p14="http://schemas.microsoft.com/office/powerpoint/2010/main" id="1" dur="indefinite" restart="never" nodeType="tmRoot"/>
       </p:par>
     </p:tnLst>
   </p:timing>
@@ -2263,14 +2264,14 @@
             <a:noFill/>
           </a:ln>
           <a:extLst>
-            <a:ext uri="{909E8E84-426E-40DD-AFC4-6F175D3DCCD1}">
+            <a:ext uri="{909E8E84-426E-40dd-AFC4-6F175D3DCCD1}">
               <a14:hiddenFill xmlns:a14="http://schemas.microsoft.com/office/drawing/2010/main">
                 <a:solidFill>
                   <a:srgbClr val="FFFFFF"/>
                 </a:solidFill>
               </a14:hiddenFill>
             </a:ext>
-            <a:ext uri="{91240B29-F687-4F45-9708-019B960494DF}">
+            <a:ext uri="{91240B29-F687-4f45-9708-019B960494DF}">
               <a14:hiddenLine xmlns:a14="http://schemas.microsoft.com/office/drawing/2010/main" w="9525">
                 <a:solidFill>
                   <a:srgbClr val="000000"/>
@@ -2317,14 +2318,14 @@
             <a:noFill/>
           </a:ln>
           <a:extLst>
-            <a:ext uri="{909E8E84-426E-40DD-AFC4-6F175D3DCCD1}">
+            <a:ext uri="{909E8E84-426E-40dd-AFC4-6F175D3DCCD1}">
               <a14:hiddenFill xmlns:a14="http://schemas.microsoft.com/office/drawing/2010/main">
                 <a:solidFill>
                   <a:srgbClr val="FFFFFF"/>
                 </a:solidFill>
               </a14:hiddenFill>
             </a:ext>
-            <a:ext uri="{91240B29-F687-4F45-9708-019B960494DF}">
+            <a:ext uri="{91240B29-F687-4f45-9708-019B960494DF}">
               <a14:hiddenLine xmlns:a14="http://schemas.microsoft.com/office/drawing/2010/main" w="9525">
                 <a:solidFill>
                   <a:srgbClr val="000000"/>
@@ -2472,7 +2473,7 @@
   <p:timing>
     <p:tnLst>
       <p:par>
-        <p:cTn id="1" dur="indefinite" restart="never" nodeType="tmRoot"/>
+        <p:cTn xmlns:p14="http://schemas.microsoft.com/office/powerpoint/2010/main" id="1" dur="indefinite" restart="never" nodeType="tmRoot"/>
       </p:par>
     </p:tnLst>
   </p:timing>
@@ -2530,14 +2531,14 @@
             <a:noFill/>
           </a:ln>
           <a:extLst>
-            <a:ext uri="{909E8E84-426E-40DD-AFC4-6F175D3DCCD1}">
+            <a:ext uri="{909E8E84-426E-40dd-AFC4-6F175D3DCCD1}">
               <a14:hiddenFill xmlns:a14="http://schemas.microsoft.com/office/drawing/2010/main">
                 <a:solidFill>
                   <a:srgbClr val="FFFFFF"/>
                 </a:solidFill>
               </a14:hiddenFill>
             </a:ext>
-            <a:ext uri="{91240B29-F687-4F45-9708-019B960494DF}">
+            <a:ext uri="{91240B29-F687-4f45-9708-019B960494DF}">
               <a14:hiddenLine xmlns:a14="http://schemas.microsoft.com/office/drawing/2010/main" w="9525">
                 <a:solidFill>
                   <a:srgbClr val="000000"/>
@@ -2584,14 +2585,14 @@
             <a:noFill/>
           </a:ln>
           <a:extLst>
-            <a:ext uri="{909E8E84-426E-40DD-AFC4-6F175D3DCCD1}">
+            <a:ext uri="{909E8E84-426E-40dd-AFC4-6F175D3DCCD1}">
               <a14:hiddenFill xmlns:a14="http://schemas.microsoft.com/office/drawing/2010/main">
                 <a:solidFill>
                   <a:srgbClr val="FFFFFF"/>
                 </a:solidFill>
               </a14:hiddenFill>
             </a:ext>
-            <a:ext uri="{91240B29-F687-4F45-9708-019B960494DF}">
+            <a:ext uri="{91240B29-F687-4f45-9708-019B960494DF}">
               <a14:hiddenLine xmlns:a14="http://schemas.microsoft.com/office/drawing/2010/main" w="9525">
                 <a:solidFill>
                   <a:srgbClr val="000000"/>
@@ -2802,7 +2803,7 @@
   <p:timing>
     <p:tnLst>
       <p:par>
-        <p:cTn id="1" dur="indefinite" restart="never" nodeType="tmRoot"/>
+        <p:cTn xmlns:p14="http://schemas.microsoft.com/office/powerpoint/2010/main" id="1" dur="indefinite" restart="never" nodeType="tmRoot"/>
       </p:par>
     </p:tnLst>
   </p:timing>
@@ -2991,7 +2992,7 @@
   <p:timing>
     <p:tnLst>
       <p:par>
-        <p:cTn id="1" dur="indefinite" restart="never" nodeType="tmRoot"/>
+        <p:cTn xmlns:p14="http://schemas.microsoft.com/office/powerpoint/2010/main" id="1" dur="indefinite" restart="never" nodeType="tmRoot"/>
       </p:par>
     </p:tnLst>
   </p:timing>
@@ -3183,7 +3184,7 @@
   <p:timing>
     <p:tnLst>
       <p:par>
-        <p:cTn id="1" dur="indefinite" restart="never" nodeType="tmRoot"/>
+        <p:cTn xmlns:p14="http://schemas.microsoft.com/office/powerpoint/2010/main" id="1" dur="indefinite" restart="never" nodeType="tmRoot"/>
       </p:par>
     </p:tnLst>
   </p:timing>
@@ -3590,7 +3591,7 @@
   <p:timing>
     <p:tnLst>
       <p:par>
-        <p:cTn id="1" dur="indefinite" restart="never" nodeType="tmRoot">
+        <p:cTn xmlns:p14="http://schemas.microsoft.com/office/powerpoint/2010/main" id="1" dur="indefinite" restart="never" nodeType="tmRoot">
           <p:childTnLst>
             <p:seq concurrent="1" nextAc="seek">
               <p:cTn id="2" dur="indefinite" nodeType="mainSeq">
@@ -3722,7 +3723,7 @@
           <p:tmpl lvl="1">
             <p:tnLst>
               <p:par>
-                <p:cTn presetID="10" presetClass="entr" presetSubtype="0" fill="hold" nodeType="withEffect">
+                <p:cTn xmlns:p14="http://schemas.microsoft.com/office/powerpoint/2010/main" presetID="10" presetClass="entr" presetSubtype="0" fill="hold" nodeType="withEffect">
                   <p:stCondLst>
                     <p:cond delay="1000"/>
                   </p:stCondLst>
@@ -3950,7 +3951,7 @@
   <p:timing>
     <p:tnLst>
       <p:par>
-        <p:cTn id="1" dur="indefinite" restart="never" nodeType="tmRoot"/>
+        <p:cTn xmlns:p14="http://schemas.microsoft.com/office/powerpoint/2010/main" id="1" dur="indefinite" restart="never" nodeType="tmRoot"/>
       </p:par>
     </p:tnLst>
   </p:timing>
@@ -4308,7 +4309,7 @@
   <p:timing>
     <p:tnLst>
       <p:par>
-        <p:cTn id="1" dur="indefinite" restart="never" nodeType="tmRoot">
+        <p:cTn xmlns:p14="http://schemas.microsoft.com/office/powerpoint/2010/main" id="1" dur="indefinite" restart="never" nodeType="tmRoot">
           <p:childTnLst>
             <p:seq concurrent="1" nextAc="seek">
               <p:cTn id="2" dur="indefinite" nodeType="mainSeq">
@@ -4440,7 +4441,7 @@
           <p:tmpl lvl="1">
             <p:tnLst>
               <p:par>
-                <p:cTn presetID="10" presetClass="entr" presetSubtype="0" fill="hold" nodeType="withEffect">
+                <p:cTn xmlns:p14="http://schemas.microsoft.com/office/powerpoint/2010/main" presetID="10" presetClass="entr" presetSubtype="0" fill="hold" nodeType="withEffect">
                   <p:stCondLst>
                     <p:cond delay="1000"/>
                   </p:stCondLst>
@@ -4691,7 +4692,7 @@
   <p:timing>
     <p:tnLst>
       <p:par>
-        <p:cTn id="1" dur="indefinite" restart="never" nodeType="tmRoot"/>
+        <p:cTn xmlns:p14="http://schemas.microsoft.com/office/powerpoint/2010/main" id="1" dur="indefinite" restart="never" nodeType="tmRoot"/>
       </p:par>
     </p:tnLst>
   </p:timing>
@@ -4932,7 +4933,7 @@
   <p:timing>
     <p:tnLst>
       <p:par>
-        <p:cTn id="1" dur="indefinite" restart="never" nodeType="tmRoot"/>
+        <p:cTn xmlns:p14="http://schemas.microsoft.com/office/powerpoint/2010/main" id="1" dur="indefinite" restart="never" nodeType="tmRoot"/>
       </p:par>
     </p:tnLst>
   </p:timing>
@@ -5141,7 +5142,7 @@
   <p:timing>
     <p:tnLst>
       <p:par>
-        <p:cTn id="1" dur="indefinite" restart="never" nodeType="tmRoot"/>
+        <p:cTn xmlns:p14="http://schemas.microsoft.com/office/powerpoint/2010/main" id="1" dur="indefinite" restart="never" nodeType="tmRoot"/>
       </p:par>
     </p:tnLst>
   </p:timing>
@@ -5388,7 +5389,7 @@
   <p:timing>
     <p:tnLst>
       <p:par>
-        <p:cTn id="1" dur="indefinite" restart="never" nodeType="tmRoot"/>
+        <p:cTn xmlns:p14="http://schemas.microsoft.com/office/powerpoint/2010/main" id="1" dur="indefinite" restart="never" nodeType="tmRoot"/>
       </p:par>
     </p:tnLst>
   </p:timing>
@@ -5618,7 +5619,7 @@
   <p:timing>
     <p:tnLst>
       <p:par>
-        <p:cTn id="1" dur="indefinite" restart="never" nodeType="tmRoot"/>
+        <p:cTn xmlns:p14="http://schemas.microsoft.com/office/powerpoint/2010/main" id="1" dur="indefinite" restart="never" nodeType="tmRoot"/>
       </p:par>
     </p:tnLst>
   </p:timing>
@@ -5930,7 +5931,7 @@
   <p:timing>
     <p:tnLst>
       <p:par>
-        <p:cTn id="1" dur="indefinite" restart="never" nodeType="tmRoot"/>
+        <p:cTn xmlns:p14="http://schemas.microsoft.com/office/powerpoint/2010/main" id="1" dur="indefinite" restart="never" nodeType="tmRoot"/>
       </p:par>
     </p:tnLst>
   </p:timing>
@@ -6229,7 +6230,7 @@
   <p:timing>
     <p:tnLst>
       <p:par>
-        <p:cTn id="1" dur="indefinite" restart="never" nodeType="tmRoot"/>
+        <p:cTn xmlns:p14="http://schemas.microsoft.com/office/powerpoint/2010/main" id="1" dur="indefinite" restart="never" nodeType="tmRoot"/>
       </p:par>
     </p:tnLst>
   </p:timing>
@@ -6455,7 +6456,7 @@
   <p:timing>
     <p:tnLst>
       <p:par>
-        <p:cTn id="1" dur="indefinite" restart="never" nodeType="tmRoot"/>
+        <p:cTn xmlns:p14="http://schemas.microsoft.com/office/powerpoint/2010/main" id="1" dur="indefinite" restart="never" nodeType="tmRoot"/>
       </p:par>
     </p:tnLst>
   </p:timing>
@@ -6513,14 +6514,14 @@
             <a:noFill/>
           </a:ln>
           <a:extLst>
-            <a:ext uri="{909E8E84-426E-40DD-AFC4-6F175D3DCCD1}">
+            <a:ext uri="{909E8E84-426E-40dd-AFC4-6F175D3DCCD1}">
               <a14:hiddenFill xmlns:a14="http://schemas.microsoft.com/office/drawing/2010/main">
                 <a:solidFill>
                   <a:srgbClr val="FFFFFF"/>
                 </a:solidFill>
               </a14:hiddenFill>
             </a:ext>
-            <a:ext uri="{91240B29-F687-4F45-9708-019B960494DF}">
+            <a:ext uri="{91240B29-F687-4f45-9708-019B960494DF}">
               <a14:hiddenLine xmlns:a14="http://schemas.microsoft.com/office/drawing/2010/main" w="9525">
                 <a:solidFill>
                   <a:srgbClr val="000000"/>
@@ -6588,7 +6589,7 @@
   <p:timing>
     <p:tnLst>
       <p:par>
-        <p:cTn id="1" dur="indefinite" restart="never" nodeType="tmRoot"/>
+        <p:cTn xmlns:p14="http://schemas.microsoft.com/office/powerpoint/2010/main" id="1" dur="indefinite" restart="never" nodeType="tmRoot"/>
       </p:par>
     </p:tnLst>
   </p:timing>
@@ -6995,7 +6996,7 @@
   <p:timing>
     <p:tnLst>
       <p:par>
-        <p:cTn id="1" dur="indefinite" restart="never" nodeType="tmRoot">
+        <p:cTn xmlns:p14="http://schemas.microsoft.com/office/powerpoint/2010/main" id="1" dur="indefinite" restart="never" nodeType="tmRoot">
           <p:childTnLst>
             <p:seq concurrent="1" nextAc="seek">
               <p:cTn id="2" dur="indefinite" nodeType="mainSeq">
@@ -7127,7 +7128,7 @@
           <p:tmpl lvl="1">
             <p:tnLst>
               <p:par>
-                <p:cTn presetID="10" presetClass="entr" presetSubtype="0" fill="hold" nodeType="withEffect">
+                <p:cTn xmlns:p14="http://schemas.microsoft.com/office/powerpoint/2010/main" presetID="10" presetClass="entr" presetSubtype="0" fill="hold" nodeType="withEffect">
                   <p:stCondLst>
                     <p:cond delay="1000"/>
                   </p:stCondLst>
@@ -7221,14 +7222,14 @@
             <a:noFill/>
           </a:ln>
           <a:extLst>
-            <a:ext uri="{909E8E84-426E-40DD-AFC4-6F175D3DCCD1}">
+            <a:ext uri="{909E8E84-426E-40dd-AFC4-6F175D3DCCD1}">
               <a14:hiddenFill xmlns:a14="http://schemas.microsoft.com/office/drawing/2010/main">
                 <a:solidFill>
                   <a:srgbClr val="FFFFFF"/>
                 </a:solidFill>
               </a14:hiddenFill>
             </a:ext>
-            <a:ext uri="{91240B29-F687-4F45-9708-019B960494DF}">
+            <a:ext uri="{91240B29-F687-4f45-9708-019B960494DF}">
               <a14:hiddenLine xmlns:a14="http://schemas.microsoft.com/office/drawing/2010/main" w="9525">
                 <a:solidFill>
                   <a:srgbClr val="000000"/>
@@ -7275,14 +7276,14 @@
             <a:noFill/>
           </a:ln>
           <a:extLst>
-            <a:ext uri="{909E8E84-426E-40DD-AFC4-6F175D3DCCD1}">
+            <a:ext uri="{909E8E84-426E-40dd-AFC4-6F175D3DCCD1}">
               <a14:hiddenFill xmlns:a14="http://schemas.microsoft.com/office/drawing/2010/main">
                 <a:solidFill>
                   <a:srgbClr val="FFFFFF"/>
                 </a:solidFill>
               </a14:hiddenFill>
             </a:ext>
-            <a:ext uri="{91240B29-F687-4F45-9708-019B960494DF}">
+            <a:ext uri="{91240B29-F687-4f45-9708-019B960494DF}">
               <a14:hiddenLine xmlns:a14="http://schemas.microsoft.com/office/drawing/2010/main" w="9525">
                 <a:solidFill>
                   <a:srgbClr val="000000"/>
@@ -7366,7 +7367,7 @@
   <p:timing>
     <p:tnLst>
       <p:par>
-        <p:cTn id="1" dur="indefinite" restart="never" nodeType="tmRoot"/>
+        <p:cTn xmlns:p14="http://schemas.microsoft.com/office/powerpoint/2010/main" id="1" dur="indefinite" restart="never" nodeType="tmRoot"/>
       </p:par>
     </p:tnLst>
   </p:timing>
@@ -7424,14 +7425,14 @@
             <a:noFill/>
           </a:ln>
           <a:extLst>
-            <a:ext uri="{909E8E84-426E-40DD-AFC4-6F175D3DCCD1}">
+            <a:ext uri="{909E8E84-426E-40dd-AFC4-6F175D3DCCD1}">
               <a14:hiddenFill xmlns:a14="http://schemas.microsoft.com/office/drawing/2010/main">
                 <a:solidFill>
                   <a:srgbClr val="FFFFFF"/>
                 </a:solidFill>
               </a14:hiddenFill>
             </a:ext>
-            <a:ext uri="{91240B29-F687-4F45-9708-019B960494DF}">
+            <a:ext uri="{91240B29-F687-4f45-9708-019B960494DF}">
               <a14:hiddenLine xmlns:a14="http://schemas.microsoft.com/office/drawing/2010/main" w="9525">
                 <a:solidFill>
                   <a:srgbClr val="000000"/>
@@ -7478,14 +7479,14 @@
             <a:noFill/>
           </a:ln>
           <a:extLst>
-            <a:ext uri="{909E8E84-426E-40DD-AFC4-6F175D3DCCD1}">
+            <a:ext uri="{909E8E84-426E-40dd-AFC4-6F175D3DCCD1}">
               <a14:hiddenFill xmlns:a14="http://schemas.microsoft.com/office/drawing/2010/main">
                 <a:solidFill>
                   <a:srgbClr val="FFFFFF"/>
                 </a:solidFill>
               </a14:hiddenFill>
             </a:ext>
-            <a:ext uri="{91240B29-F687-4F45-9708-019B960494DF}">
+            <a:ext uri="{91240B29-F687-4f45-9708-019B960494DF}">
               <a14:hiddenLine xmlns:a14="http://schemas.microsoft.com/office/drawing/2010/main" w="9525">
                 <a:solidFill>
                   <a:srgbClr val="000000"/>
@@ -7633,7 +7634,7 @@
   <p:timing>
     <p:tnLst>
       <p:par>
-        <p:cTn id="1" dur="indefinite" restart="never" nodeType="tmRoot"/>
+        <p:cTn xmlns:p14="http://schemas.microsoft.com/office/powerpoint/2010/main" id="1" dur="indefinite" restart="never" nodeType="tmRoot"/>
       </p:par>
     </p:tnLst>
   </p:timing>
@@ -7691,14 +7692,14 @@
             <a:noFill/>
           </a:ln>
           <a:extLst>
-            <a:ext uri="{909E8E84-426E-40DD-AFC4-6F175D3DCCD1}">
+            <a:ext uri="{909E8E84-426E-40dd-AFC4-6F175D3DCCD1}">
               <a14:hiddenFill xmlns:a14="http://schemas.microsoft.com/office/drawing/2010/main">
                 <a:solidFill>
                   <a:srgbClr val="FFFFFF"/>
                 </a:solidFill>
               </a14:hiddenFill>
             </a:ext>
-            <a:ext uri="{91240B29-F687-4F45-9708-019B960494DF}">
+            <a:ext uri="{91240B29-F687-4f45-9708-019B960494DF}">
               <a14:hiddenLine xmlns:a14="http://schemas.microsoft.com/office/drawing/2010/main" w="9525">
                 <a:solidFill>
                   <a:srgbClr val="000000"/>
@@ -7745,14 +7746,14 @@
             <a:noFill/>
           </a:ln>
           <a:extLst>
-            <a:ext uri="{909E8E84-426E-40DD-AFC4-6F175D3DCCD1}">
+            <a:ext uri="{909E8E84-426E-40dd-AFC4-6F175D3DCCD1}">
               <a14:hiddenFill xmlns:a14="http://schemas.microsoft.com/office/drawing/2010/main">
                 <a:solidFill>
                   <a:srgbClr val="FFFFFF"/>
                 </a:solidFill>
               </a14:hiddenFill>
             </a:ext>
-            <a:ext uri="{91240B29-F687-4F45-9708-019B960494DF}">
+            <a:ext uri="{91240B29-F687-4f45-9708-019B960494DF}">
               <a14:hiddenLine xmlns:a14="http://schemas.microsoft.com/office/drawing/2010/main" w="9525">
                 <a:solidFill>
                   <a:srgbClr val="000000"/>
@@ -7963,7 +7964,7 @@
   <p:timing>
     <p:tnLst>
       <p:par>
-        <p:cTn id="1" dur="indefinite" restart="never" nodeType="tmRoot"/>
+        <p:cTn xmlns:p14="http://schemas.microsoft.com/office/powerpoint/2010/main" id="1" dur="indefinite" restart="never" nodeType="tmRoot"/>
       </p:par>
     </p:tnLst>
   </p:timing>
@@ -8321,7 +8322,7 @@
   <p:timing>
     <p:tnLst>
       <p:par>
-        <p:cTn id="1" dur="indefinite" restart="never" nodeType="tmRoot">
+        <p:cTn xmlns:p14="http://schemas.microsoft.com/office/powerpoint/2010/main" id="1" dur="indefinite" restart="never" nodeType="tmRoot">
           <p:childTnLst>
             <p:seq concurrent="1" nextAc="seek">
               <p:cTn id="2" dur="indefinite" nodeType="mainSeq">
@@ -8453,7 +8454,7 @@
           <p:tmpl lvl="1">
             <p:tnLst>
               <p:par>
-                <p:cTn presetID="10" presetClass="entr" presetSubtype="0" fill="hold" nodeType="withEffect">
+                <p:cTn xmlns:p14="http://schemas.microsoft.com/office/powerpoint/2010/main" presetID="10" presetClass="entr" presetSubtype="0" fill="hold" nodeType="withEffect">
                   <p:stCondLst>
                     <p:cond delay="1000"/>
                   </p:stCondLst>
@@ -8704,7 +8705,7 @@
   <p:timing>
     <p:tnLst>
       <p:par>
-        <p:cTn id="1" dur="indefinite" restart="never" nodeType="tmRoot"/>
+        <p:cTn xmlns:p14="http://schemas.microsoft.com/office/powerpoint/2010/main" id="1" dur="indefinite" restart="never" nodeType="tmRoot"/>
       </p:par>
     </p:tnLst>
   </p:timing>
@@ -8945,7 +8946,7 @@
   <p:timing>
     <p:tnLst>
       <p:par>
-        <p:cTn id="1" dur="indefinite" restart="never" nodeType="tmRoot"/>
+        <p:cTn xmlns:p14="http://schemas.microsoft.com/office/powerpoint/2010/main" id="1" dur="indefinite" restart="never" nodeType="tmRoot"/>
       </p:par>
     </p:tnLst>
   </p:timing>
@@ -9154,7 +9155,7 @@
   <p:timing>
     <p:tnLst>
       <p:par>
-        <p:cTn id="1" dur="indefinite" restart="never" nodeType="tmRoot"/>
+        <p:cTn xmlns:p14="http://schemas.microsoft.com/office/powerpoint/2010/main" id="1" dur="indefinite" restart="never" nodeType="tmRoot"/>
       </p:par>
     </p:tnLst>
   </p:timing>
@@ -9401,7 +9402,7 @@
   <p:timing>
     <p:tnLst>
       <p:par>
-        <p:cTn id="1" dur="indefinite" restart="never" nodeType="tmRoot"/>
+        <p:cTn xmlns:p14="http://schemas.microsoft.com/office/powerpoint/2010/main" id="1" dur="indefinite" restart="never" nodeType="tmRoot"/>
       </p:par>
     </p:tnLst>
   </p:timing>
@@ -9631,7 +9632,7 @@
   <p:timing>
     <p:tnLst>
       <p:par>
-        <p:cTn id="1" dur="indefinite" restart="never" nodeType="tmRoot"/>
+        <p:cTn xmlns:p14="http://schemas.microsoft.com/office/powerpoint/2010/main" id="1" dur="indefinite" restart="never" nodeType="tmRoot"/>
       </p:par>
     </p:tnLst>
   </p:timing>
@@ -9814,14 +9815,14 @@
               <a:noFill/>
             </a:ln>
             <a:extLst>
-              <a:ext uri="{909E8E84-426E-40DD-AFC4-6F175D3DCCD1}">
+              <a:ext uri="{909E8E84-426E-40dd-AFC4-6F175D3DCCD1}">
                 <a14:hiddenFill xmlns:a14="http://schemas.microsoft.com/office/drawing/2010/main">
                   <a:solidFill>
                     <a:srgbClr val="FFFFFF"/>
                   </a:solidFill>
                 </a14:hiddenFill>
               </a:ext>
-              <a:ext uri="{91240B29-F687-4F45-9708-019B960494DF}">
+              <a:ext uri="{91240B29-F687-4f45-9708-019B960494DF}">
                 <a14:hiddenLine xmlns:a14="http://schemas.microsoft.com/office/drawing/2010/main" w="9525">
                   <a:solidFill>
                     <a:srgbClr val="000000"/>
@@ -10157,7 +10158,7 @@
             </a:prstGeom>
             <a:noFill/>
             <a:extLst>
-              <a:ext uri="{909E8E84-426E-40DD-AFC4-6F175D3DCCD1}">
+              <a:ext uri="{909E8E84-426E-40dd-AFC4-6F175D3DCCD1}">
                 <a14:hiddenFill xmlns:a14="http://schemas.microsoft.com/office/drawing/2010/main">
                   <a:solidFill>
                     <a:srgbClr val="FFFFFF"/>
@@ -10239,7 +10240,7 @@
   <p:timing>
     <p:tnLst>
       <p:par>
-        <p:cTn id="1" dur="indefinite" restart="never" nodeType="tmRoot"/>
+        <p:cTn xmlns:p14="http://schemas.microsoft.com/office/powerpoint/2010/main" id="1" dur="indefinite" restart="never" nodeType="tmRoot"/>
       </p:par>
     </p:tnLst>
   </p:timing>
@@ -10705,14 +10706,14 @@
               <a:noFill/>
             </a:ln>
             <a:extLst>
-              <a:ext uri="{909E8E84-426E-40DD-AFC4-6F175D3DCCD1}">
+              <a:ext uri="{909E8E84-426E-40dd-AFC4-6F175D3DCCD1}">
                 <a14:hiddenFill xmlns:a14="http://schemas.microsoft.com/office/drawing/2010/main">
                   <a:solidFill>
                     <a:srgbClr val="FFFFFF"/>
                   </a:solidFill>
                 </a14:hiddenFill>
               </a:ext>
-              <a:ext uri="{91240B29-F687-4F45-9708-019B960494DF}">
+              <a:ext uri="{91240B29-F687-4f45-9708-019B960494DF}">
                 <a14:hiddenLine xmlns:a14="http://schemas.microsoft.com/office/drawing/2010/main" w="9525">
                   <a:solidFill>
                     <a:srgbClr val="000000"/>
@@ -11048,7 +11049,7 @@
             </a:prstGeom>
             <a:noFill/>
             <a:extLst>
-              <a:ext uri="{909E8E84-426E-40DD-AFC4-6F175D3DCCD1}">
+              <a:ext uri="{909E8E84-426E-40dd-AFC4-6F175D3DCCD1}">
                 <a14:hiddenFill xmlns:a14="http://schemas.microsoft.com/office/drawing/2010/main">
                   <a:solidFill>
                     <a:srgbClr val="FFFFFF"/>
@@ -11130,7 +11131,7 @@
   <p:timing>
     <p:tnLst>
       <p:par>
-        <p:cTn id="1" dur="indefinite" restart="never" nodeType="tmRoot"/>
+        <p:cTn xmlns:p14="http://schemas.microsoft.com/office/powerpoint/2010/main" id="1" dur="indefinite" restart="never" nodeType="tmRoot"/>
       </p:par>
     </p:tnLst>
   </p:timing>
@@ -11462,7 +11463,7 @@
   <p:timing>
     <p:tnLst>
       <p:par>
-        <p:cTn id="1" dur="indefinite" restart="never" nodeType="tmRoot"/>
+        <p:cTn xmlns:p14="http://schemas.microsoft.com/office/powerpoint/2010/main" id="1" dur="indefinite" restart="never" nodeType="tmRoot"/>
       </p:par>
     </p:tnLst>
   </p:timing>
@@ -11488,6 +11489,223 @@
       </p:grpSpPr>
       <p:sp>
         <p:nvSpPr>
+          <p:cNvPr id="25" name="Title 24"/>
+          <p:cNvSpPr>
+            <a:spLocks noGrp="1"/>
+          </p:cNvSpPr>
+          <p:nvPr>
+            <p:ph type="title"/>
+          </p:nvPr>
+        </p:nvSpPr>
+        <p:spPr/>
+        <p:txBody>
+          <a:bodyPr/>
+          <a:lstStyle/>
+          <a:p>
+            <a:r>
+              <a:rPr lang="en-US" dirty="0"/>
+              <a:t>HTML(5) Friendly Markup</a:t>
+            </a:r>
+          </a:p>
+        </p:txBody>
+      </p:sp>
+      <p:sp>
+        <p:nvSpPr>
+          <p:cNvPr id="35" name="Content Placeholder 34"/>
+          <p:cNvSpPr>
+            <a:spLocks noGrp="1"/>
+          </p:cNvSpPr>
+          <p:nvPr>
+            <p:ph sz="quarter" idx="12"/>
+          </p:nvPr>
+        </p:nvSpPr>
+        <p:spPr/>
+        <p:txBody>
+          <a:bodyPr/>
+          <a:lstStyle/>
+          <a:p>
+            <a:r>
+              <a:rPr lang="en-US" dirty="0"/>
+              <a:t>N</a:t>
+            </a:r>
+            <a:r>
+              <a:rPr lang="en-US" dirty="0" smtClean="0"/>
+              <a:t>ew namespaces</a:t>
+            </a:r>
+          </a:p>
+          <a:p>
+            <a:pPr lvl="1"/>
+            <a:r>
+              <a:rPr lang="en-US" dirty="0"/>
+              <a:t>passthrough </a:t>
+            </a:r>
+            <a:r>
+              <a:rPr lang="en-US" dirty="0" smtClean="0"/>
+              <a:t>elements: </a:t>
+            </a:r>
+            <a:r>
+              <a:rPr lang="en-US" dirty="0" smtClean="0">
+                <a:hlinkClick r:id="rId2"/>
+              </a:rPr>
+              <a:t>http</a:t>
+            </a:r>
+            <a:r>
+              <a:rPr lang="en-US" dirty="0">
+                <a:hlinkClick r:id="rId2"/>
+              </a:rPr>
+              <a:t>://</a:t>
+            </a:r>
+            <a:r>
+              <a:rPr lang="en-US" dirty="0" smtClean="0">
+                <a:hlinkClick r:id="rId2"/>
+              </a:rPr>
+              <a:t>xmlns.jcp.org/jsf</a:t>
+            </a:r>
+            <a:r>
+              <a:rPr lang="en-US" dirty="0" smtClean="0"/>
+              <a:t> (TagDecorator)</a:t>
+            </a:r>
+            <a:endParaRPr lang="en-US" dirty="0"/>
+          </a:p>
+          <a:p>
+            <a:pPr lvl="1"/>
+            <a:r>
+              <a:rPr lang="en-US" dirty="0" smtClean="0"/>
+              <a:t>passthrough attributes: </a:t>
+            </a:r>
+            <a:r>
+              <a:rPr lang="en-US" dirty="0" smtClean="0">
+                <a:hlinkClick r:id="rId3"/>
+              </a:rPr>
+              <a:t>http://xmlns.jcp.org/jsf/passthrough</a:t>
+            </a:r>
+            <a:r>
+              <a:rPr lang="en-US" dirty="0" smtClean="0"/>
+              <a:t> (RenderKit)</a:t>
+            </a:r>
+          </a:p>
+          <a:p>
+            <a:pPr marL="403225" lvl="1" indent="0">
+              <a:buNone/>
+            </a:pPr>
+            <a:endParaRPr lang="en-US" dirty="0"/>
+          </a:p>
+          <a:p>
+            <a:r>
+              <a:rPr lang="en-US" dirty="0" smtClean="0"/>
+              <a:t>Advantages</a:t>
+            </a:r>
+          </a:p>
+          <a:p>
+            <a:pPr lvl="1"/>
+            <a:r>
+              <a:rPr lang="en-US" dirty="0" smtClean="0"/>
+              <a:t>Getting control over rendered Facelets</a:t>
+            </a:r>
+          </a:p>
+          <a:p>
+            <a:pPr lvl="1"/>
+            <a:r>
+              <a:rPr lang="en-US" dirty="0" smtClean="0"/>
+              <a:t>JSF components </a:t>
+            </a:r>
+            <a:r>
+              <a:rPr lang="en-US" dirty="0"/>
+              <a:t>/ JavaScript components / </a:t>
+            </a:r>
+            <a:r>
+              <a:rPr lang="en-US" dirty="0" smtClean="0"/>
+              <a:t>arbitrary </a:t>
+            </a:r>
+            <a:r>
+              <a:rPr lang="en-US" dirty="0"/>
+              <a:t>mixing</a:t>
+            </a:r>
+          </a:p>
+          <a:p>
+            <a:pPr lvl="1"/>
+            <a:r>
+              <a:rPr lang="en-US" dirty="0"/>
+              <a:t>Write and style pure HTML with benefits of </a:t>
+            </a:r>
+            <a:r>
+              <a:rPr lang="en-US" dirty="0" smtClean="0"/>
+              <a:t>JSF</a:t>
+            </a:r>
+            <a:endParaRPr lang="en-US" dirty="0"/>
+          </a:p>
+        </p:txBody>
+      </p:sp>
+      <p:sp>
+        <p:nvSpPr>
+          <p:cNvPr id="36" name="Text Placeholder 35"/>
+          <p:cNvSpPr>
+            <a:spLocks noGrp="1"/>
+          </p:cNvSpPr>
+          <p:nvPr>
+            <p:ph type="body" sz="quarter" idx="13"/>
+          </p:nvPr>
+        </p:nvSpPr>
+        <p:spPr/>
+        <p:txBody>
+          <a:bodyPr/>
+          <a:lstStyle/>
+          <a:p>
+            <a:endParaRPr lang="en-US"/>
+          </a:p>
+        </p:txBody>
+      </p:sp>
+    </p:spTree>
+    <p:extLst>
+      <p:ext uri="{BB962C8B-B14F-4D97-AF65-F5344CB8AC3E}">
+        <p14:creationId xmlns:p14="http://schemas.microsoft.com/office/powerpoint/2010/main" val="1406830298"/>
+      </p:ext>
+    </p:extLst>
+  </p:cSld>
+  <p:clrMapOvr>
+    <a:masterClrMapping/>
+  </p:clrMapOvr>
+  <mc:AlternateContent xmlns:mc="http://schemas.openxmlformats.org/markup-compatibility/2006" xmlns:p14="http://schemas.microsoft.com/office/powerpoint/2010/main">
+    <mc:Choice Requires="p14">
+      <p:transition spd="med" p14:dur="700">
+        <p:fade/>
+      </p:transition>
+    </mc:Choice>
+    <mc:Fallback xmlns="">
+      <p:transition spd="med">
+        <p:fade/>
+      </p:transition>
+    </mc:Fallback>
+  </mc:AlternateContent>
+  <p:timing>
+    <p:tnLst>
+      <p:par>
+        <p:cTn xmlns:p14="http://schemas.microsoft.com/office/powerpoint/2010/main" id="1" dur="indefinite" restart="never" nodeType="tmRoot"/>
+      </p:par>
+    </p:tnLst>
+  </p:timing>
+</p:sld>
+</file>
+
+<file path=ppt/slides/slide11.xml><?xml version="1.0" encoding="utf-8"?>
+<p:sld xmlns:a="http://schemas.openxmlformats.org/drawingml/2006/main" xmlns:r="http://schemas.openxmlformats.org/officeDocument/2006/relationships" xmlns:p="http://schemas.openxmlformats.org/presentationml/2006/main">
+  <p:cSld>
+    <p:spTree>
+      <p:nvGrpSpPr>
+        <p:cNvPr id="1" name=""/>
+        <p:cNvGrpSpPr/>
+        <p:nvPr/>
+      </p:nvGrpSpPr>
+      <p:grpSpPr>
+        <a:xfrm>
+          <a:off x="0" y="0"/>
+          <a:ext cx="0" cy="0"/>
+          <a:chOff x="0" y="0"/>
+          <a:chExt cx="0" cy="0"/>
+        </a:xfrm>
+      </p:grpSpPr>
+      <p:sp>
+        <p:nvSpPr>
           <p:cNvPr id="35" name="Content Placeholder 34"/>
           <p:cNvSpPr>
             <a:spLocks noGrp="1"/>
@@ -11505,15 +11723,7 @@
           <a:p>
             <a:r>
               <a:rPr lang="en-US" dirty="0" smtClean="0"/>
-              <a:t>Form with usage of HTML friendly markup: validation by Bean Validation API with localized messages, custom Bean Validation annotation, passthrough attributes and elements, usage of jQuery plugin </a:t>
-            </a:r>
-            <a:r>
-              <a:rPr lang="en-US" dirty="0" smtClean="0"/>
-              <a:t>at JSF </a:t>
-            </a:r>
-            <a:r>
-              <a:rPr lang="en-US" dirty="0" smtClean="0"/>
-              <a:t>component.</a:t>
+              <a:t>Form with usage of HTML friendly markup: validation by Bean Validation API with localized messages, custom Bean Validation annotation, passthrough attributes and elements, usage of jQuery plugin at JSF component.</a:t>
             </a:r>
             <a:endParaRPr lang="en-US" dirty="0"/>
           </a:p>
@@ -11622,14 +11832,14 @@
   <p:timing>
     <p:tnLst>
       <p:par>
-        <p:cTn id="1" dur="indefinite" restart="never" nodeType="tmRoot"/>
+        <p:cTn xmlns:p14="http://schemas.microsoft.com/office/powerpoint/2010/main" id="1" dur="indefinite" restart="never" nodeType="tmRoot"/>
       </p:par>
     </p:tnLst>
   </p:timing>
 </p:sld>
 </file>
 
-<file path=ppt/slides/slide11.xml><?xml version="1.0" encoding="utf-8"?>
+<file path=ppt/slides/slide12.xml><?xml version="1.0" encoding="utf-8"?>
 <p:sld xmlns:a="http://schemas.openxmlformats.org/drawingml/2006/main" xmlns:r="http://schemas.openxmlformats.org/officeDocument/2006/relationships" xmlns:p="http://schemas.openxmlformats.org/presentationml/2006/main">
   <p:cSld>
     <p:spTree>
@@ -11698,14 +11908,14 @@
   <p:timing>
     <p:tnLst>
       <p:par>
-        <p:cTn id="1" dur="indefinite" restart="never" nodeType="tmRoot"/>
+        <p:cTn xmlns:p14="http://schemas.microsoft.com/office/powerpoint/2010/main" id="1" dur="indefinite" restart="never" nodeType="tmRoot"/>
       </p:par>
     </p:tnLst>
   </p:timing>
 </p:sld>
 </file>
 
-<file path=ppt/slides/slide12.xml><?xml version="1.0" encoding="utf-8"?>
+<file path=ppt/slides/slide13.xml><?xml version="1.0" encoding="utf-8"?>
 <p:sld xmlns:a="http://schemas.openxmlformats.org/drawingml/2006/main" xmlns:r="http://schemas.openxmlformats.org/officeDocument/2006/relationships" xmlns:p="http://schemas.openxmlformats.org/presentationml/2006/main">
   <p:cSld>
     <p:spTree>
@@ -11837,7 +12047,6 @@
               <a:rPr lang="en-US" dirty="0" smtClean="0"/>
               <a:t>Multi-templating</a:t>
             </a:r>
-            <a:endParaRPr lang="en-US" dirty="0" smtClean="0"/>
           </a:p>
         </p:txBody>
       </p:sp>
@@ -11885,14 +12094,14 @@
   <p:timing>
     <p:tnLst>
       <p:par>
-        <p:cTn id="1" dur="indefinite" restart="never" nodeType="tmRoot"/>
+        <p:cTn xmlns:p14="http://schemas.microsoft.com/office/powerpoint/2010/main" id="1" dur="indefinite" restart="never" nodeType="tmRoot"/>
       </p:par>
     </p:tnLst>
   </p:timing>
 </p:sld>
 </file>
 
-<file path=ppt/slides/slide13.xml><?xml version="1.0" encoding="utf-8"?>
+<file path=ppt/slides/slide14.xml><?xml version="1.0" encoding="utf-8"?>
 <p:sld xmlns:a="http://schemas.openxmlformats.org/drawingml/2006/main" xmlns:r="http://schemas.openxmlformats.org/officeDocument/2006/relationships" xmlns:p="http://schemas.openxmlformats.org/presentationml/2006/main">
   <p:cSld>
     <p:spTree>
@@ -12041,14 +12250,14 @@
   <p:timing>
     <p:tnLst>
       <p:par>
-        <p:cTn id="1" dur="indefinite" restart="never" nodeType="tmRoot"/>
+        <p:cTn xmlns:p14="http://schemas.microsoft.com/office/powerpoint/2010/main" id="1" dur="indefinite" restart="never" nodeType="tmRoot"/>
       </p:par>
     </p:tnLst>
   </p:timing>
 </p:sld>
 </file>
 
-<file path=ppt/slides/slide14.xml><?xml version="1.0" encoding="utf-8"?>
+<file path=ppt/slides/slide15.xml><?xml version="1.0" encoding="utf-8"?>
 <p:sld xmlns:a="http://schemas.openxmlformats.org/drawingml/2006/main" xmlns:r="http://schemas.openxmlformats.org/officeDocument/2006/relationships" xmlns:p="http://schemas.openxmlformats.org/presentationml/2006/main">
   <p:cSld>
     <p:spTree>
@@ -12113,14 +12322,14 @@
   <p:timing>
     <p:tnLst>
       <p:par>
-        <p:cTn id="1" dur="indefinite" restart="never" nodeType="tmRoot"/>
+        <p:cTn xmlns:p14="http://schemas.microsoft.com/office/powerpoint/2010/main" id="1" dur="indefinite" restart="never" nodeType="tmRoot"/>
       </p:par>
     </p:tnLst>
   </p:timing>
 </p:sld>
 </file>
 
-<file path=ppt/slides/slide15.xml><?xml version="1.0" encoding="utf-8"?>
+<file path=ppt/slides/slide16.xml><?xml version="1.0" encoding="utf-8"?>
 <p:sld xmlns:a="http://schemas.openxmlformats.org/drawingml/2006/main" xmlns:r="http://schemas.openxmlformats.org/officeDocument/2006/relationships" xmlns:p="http://schemas.openxmlformats.org/presentationml/2006/main">
   <p:cSld>
     <p:spTree>
@@ -12223,7 +12432,6 @@
               <a:rPr lang="en-US" dirty="0" smtClean="0"/>
               <a:t>Standalone ELProcessor </a:t>
             </a:r>
-            <a:endParaRPr lang="en-US" dirty="0" smtClean="0"/>
           </a:p>
           <a:p>
             <a:pPr lvl="1" fontAlgn="base"/>
@@ -12312,14 +12520,14 @@
   <p:timing>
     <p:tnLst>
       <p:par>
-        <p:cTn id="1" dur="indefinite" restart="never" nodeType="tmRoot"/>
+        <p:cTn xmlns:p14="http://schemas.microsoft.com/office/powerpoint/2010/main" id="1" dur="indefinite" restart="never" nodeType="tmRoot"/>
       </p:par>
     </p:tnLst>
   </p:timing>
 </p:sld>
 </file>
 
-<file path=ppt/slides/slide16.xml><?xml version="1.0" encoding="utf-8"?>
+<file path=ppt/slides/slide17.xml><?xml version="1.0" encoding="utf-8"?>
 <p:sld xmlns:a="http://schemas.openxmlformats.org/drawingml/2006/main" xmlns:r="http://schemas.openxmlformats.org/officeDocument/2006/relationships" xmlns:p="http://schemas.openxmlformats.org/presentationml/2006/main">
   <p:cSld>
     <p:spTree>
@@ -12473,14 +12681,14 @@
   <p:timing>
     <p:tnLst>
       <p:par>
-        <p:cTn id="1" dur="indefinite" restart="never" nodeType="tmRoot"/>
+        <p:cTn xmlns:p14="http://schemas.microsoft.com/office/powerpoint/2010/main" id="1" dur="indefinite" restart="never" nodeType="tmRoot"/>
       </p:par>
     </p:tnLst>
   </p:timing>
 </p:sld>
 </file>
 
-<file path=ppt/slides/slide17.xml><?xml version="1.0" encoding="utf-8"?>
+<file path=ppt/slides/slide18.xml><?xml version="1.0" encoding="utf-8"?>
 <p:sld xmlns:a="http://schemas.openxmlformats.org/drawingml/2006/main" xmlns:r="http://schemas.openxmlformats.org/officeDocument/2006/relationships" xmlns:p="http://schemas.openxmlformats.org/presentationml/2006/main">
   <p:cSld>
     <p:spTree>
@@ -12548,14 +12756,14 @@
   <p:timing>
     <p:tnLst>
       <p:par>
-        <p:cTn id="1" dur="indefinite" restart="never" nodeType="tmRoot"/>
+        <p:cTn xmlns:p14="http://schemas.microsoft.com/office/powerpoint/2010/main" id="1" dur="indefinite" restart="never" nodeType="tmRoot"/>
       </p:par>
     </p:tnLst>
   </p:timing>
 </p:sld>
 </file>
 
-<file path=ppt/slides/slide18.xml><?xml version="1.0" encoding="utf-8"?>
+<file path=ppt/slides/slide19.xml><?xml version="1.0" encoding="utf-8"?>
 <p:sld xmlns:a="http://schemas.openxmlformats.org/drawingml/2006/main" xmlns:r="http://schemas.openxmlformats.org/officeDocument/2006/relationships" xmlns:p="http://schemas.openxmlformats.org/presentationml/2006/main">
   <p:cSld>
     <p:spTree>
@@ -12604,7 +12812,12 @@
             <p:ph sz="quarter" idx="12"/>
           </p:nvPr>
         </p:nvSpPr>
-        <p:spPr/>
+        <p:spPr>
+          <a:xfrm>
+            <a:off x="796742" y="1331987"/>
+            <a:ext cx="8229600" cy="3466457"/>
+          </a:xfrm>
+        </p:spPr>
         <p:txBody>
           <a:bodyPr/>
           <a:lstStyle/>
@@ -12649,29 +12862,36 @@
             <a:pPr fontAlgn="base"/>
             <a:r>
               <a:rPr lang="en-US" dirty="0" smtClean="0"/>
-              <a:t>Enterprise theming w/ Theme Roller</a:t>
+              <a:t>Enterprise theming w/ Theme </a:t>
+            </a:r>
+            <a:r>
+              <a:rPr lang="en-US" dirty="0" smtClean="0"/>
+              <a:t>Roller</a:t>
+            </a:r>
+            <a:br>
+              <a:rPr lang="en-US" dirty="0" smtClean="0"/>
+            </a:br>
+            <a:r>
+              <a:rPr lang="en-US" dirty="0" smtClean="0"/>
+              <a:t>With 4.0 – Sentinel, </a:t>
+            </a:r>
+            <a:br>
+              <a:rPr lang="en-US" dirty="0" smtClean="0"/>
+            </a:br>
+            <a:r>
+              <a:rPr lang="en-US" dirty="0" smtClean="0"/>
+              <a:t>     We’re introducing cool stuff like,</a:t>
             </a:r>
           </a:p>
           <a:p>
             <a:pPr lvl="1" fontAlgn="base"/>
             <a:r>
+              <a:rPr lang="en-US" dirty="0" smtClean="0"/>
+              <a:t>Client </a:t>
+            </a:r>
+            <a:r>
               <a:rPr lang="en-US" dirty="0"/>
-              <a:t>With </a:t>
-            </a:r>
-            <a:r>
-              <a:rPr lang="en-US" dirty="0" smtClean="0"/>
-              <a:t>4.0 – Sentinel, We’re </a:t>
-            </a:r>
-            <a:r>
-              <a:rPr lang="en-US" dirty="0"/>
-              <a:t>introducing cool stuff like,</a:t>
-            </a:r>
-          </a:p>
-          <a:p>
-            <a:pPr lvl="1" fontAlgn="base"/>
-            <a:r>
-              <a:rPr lang="en-US" dirty="0"/>
-              <a:t>Client Side Validation</a:t>
+              <a:t>Side Validation</a:t>
             </a:r>
           </a:p>
           <a:p>
@@ -12745,7 +12965,7 @@
         </p:blipFill>
         <p:spPr>
           <a:xfrm>
-            <a:off x="3467515" y="2278948"/>
+            <a:off x="3497934" y="2066022"/>
             <a:ext cx="1570825" cy="386303"/>
           </a:xfrm>
           <a:prstGeom prst="rect">
@@ -12778,14 +12998,144 @@
   <p:timing>
     <p:tnLst>
       <p:par>
-        <p:cTn id="1" dur="indefinite" restart="never" nodeType="tmRoot"/>
+        <p:cTn xmlns:p14="http://schemas.microsoft.com/office/powerpoint/2010/main" id="1" dur="indefinite" restart="never" nodeType="tmRoot"/>
       </p:par>
     </p:tnLst>
   </p:timing>
 </p:sld>
 </file>
 
-<file path=ppt/slides/slide19.xml><?xml version="1.0" encoding="utf-8"?>
+<file path=ppt/slides/slide2.xml><?xml version="1.0" encoding="utf-8"?>
+<p:sld xmlns:a="http://schemas.openxmlformats.org/drawingml/2006/main" xmlns:r="http://schemas.openxmlformats.org/officeDocument/2006/relationships" xmlns:p="http://schemas.openxmlformats.org/presentationml/2006/main">
+  <p:cSld>
+    <p:spTree>
+      <p:nvGrpSpPr>
+        <p:cNvPr id="1" name=""/>
+        <p:cNvGrpSpPr/>
+        <p:nvPr/>
+      </p:nvGrpSpPr>
+      <p:grpSpPr>
+        <a:xfrm>
+          <a:off x="0" y="0"/>
+          <a:ext cx="0" cy="0"/>
+          <a:chOff x="0" y="0"/>
+          <a:chExt cx="0" cy="0"/>
+        </a:xfrm>
+      </p:grpSpPr>
+      <p:sp>
+        <p:nvSpPr>
+          <p:cNvPr id="7" name="Title 6"/>
+          <p:cNvSpPr>
+            <a:spLocks noGrp="1"/>
+          </p:cNvSpPr>
+          <p:nvPr>
+            <p:ph type="title"/>
+          </p:nvPr>
+        </p:nvSpPr>
+        <p:spPr>
+          <a:xfrm>
+            <a:off x="386634" y="1583267"/>
+            <a:ext cx="5385112" cy="1230657"/>
+          </a:xfrm>
+        </p:spPr>
+        <p:txBody>
+          <a:bodyPr/>
+          <a:lstStyle/>
+          <a:p>
+            <a:r>
+              <a:rPr lang="en-US" sz="2400" b="0" dirty="0"/>
+              <a:t>10 Tips for Java EE 7 with PrimeFaces</a:t>
+            </a:r>
+            <a:endParaRPr lang="en-US" sz="2400" dirty="0"/>
+          </a:p>
+        </p:txBody>
+      </p:sp>
+      <p:sp>
+        <p:nvSpPr>
+          <p:cNvPr id="8" name="Text Placeholder 7"/>
+          <p:cNvSpPr>
+            <a:spLocks noGrp="1"/>
+          </p:cNvSpPr>
+          <p:nvPr>
+            <p:ph type="body" sz="quarter" idx="13"/>
+          </p:nvPr>
+        </p:nvSpPr>
+        <p:spPr>
+          <a:xfrm>
+            <a:off x="411939" y="2914276"/>
+            <a:ext cx="5027083" cy="1048124"/>
+          </a:xfrm>
+        </p:spPr>
+        <p:txBody>
+          <a:bodyPr/>
+          <a:lstStyle/>
+          <a:p>
+            <a:r>
+              <a:rPr lang="en-US" dirty="0" smtClean="0"/>
+              <a:t>Mert Çalışkan		&amp;		Martin </a:t>
+            </a:r>
+            <a:r>
+              <a:rPr lang="en-US" dirty="0" err="1" smtClean="0"/>
+              <a:t>Fousek</a:t>
+            </a:r>
+            <a:endParaRPr lang="en-US" dirty="0"/>
+          </a:p>
+          <a:p>
+            <a:r>
+              <a:rPr lang="en-US" sz="1600" dirty="0" smtClean="0"/>
+              <a:t>Software Architect    		Software Developer</a:t>
+            </a:r>
+          </a:p>
+          <a:p>
+            <a:r>
+              <a:rPr lang="en-US" sz="1600" dirty="0" smtClean="0"/>
+              <a:t>		 at T2 </a:t>
+            </a:r>
+            <a:r>
+              <a:rPr lang="en-US" sz="1600" dirty="0" err="1" smtClean="0"/>
+              <a:t>Yazılım</a:t>
+            </a:r>
+            <a:r>
+              <a:rPr lang="en-US" sz="1600" dirty="0" smtClean="0"/>
+              <a:t> Ltd.			at Oracle, NetBeans</a:t>
+            </a:r>
+            <a:endParaRPr lang="en-US" sz="1600" dirty="0"/>
+          </a:p>
+        </p:txBody>
+      </p:sp>
+    </p:spTree>
+    <p:extLst>
+      <p:ext uri="{BB962C8B-B14F-4D97-AF65-F5344CB8AC3E}">
+        <p14:creationId xmlns:p14="http://schemas.microsoft.com/office/powerpoint/2010/main" val="782494894"/>
+      </p:ext>
+    </p:extLst>
+  </p:cSld>
+  <p:clrMapOvr>
+    <a:masterClrMapping/>
+  </p:clrMapOvr>
+  <mc:AlternateContent xmlns:mc="http://schemas.openxmlformats.org/markup-compatibility/2006" xmlns:p14="http://schemas.microsoft.com/office/powerpoint/2010/main">
+    <mc:Choice Requires="p14">
+      <p:transition spd="med" p14:dur="700">
+        <p:fade/>
+      </p:transition>
+    </mc:Choice>
+    <mc:Fallback xmlns="">
+      <p:transition spd="med">
+        <p:fade/>
+      </p:transition>
+    </mc:Fallback>
+  </mc:AlternateContent>
+  <p:timing>
+    <p:tnLst>
+      <p:par>
+        <p:cTn xmlns:p14="http://schemas.microsoft.com/office/powerpoint/2010/main" id="1" dur="indefinite" restart="never" nodeType="tmRoot"/>
+      </p:par>
+    </p:tnLst>
+  </p:timing>
+</p:sld>
+</file>
+
+<file path=ppt/slides/slide20.xml><?xml version="1.0" encoding="utf-8"?>
 <p:sld xmlns:a="http://schemas.openxmlformats.org/drawingml/2006/main" xmlns:r="http://schemas.openxmlformats.org/officeDocument/2006/relationships" xmlns:p="http://schemas.openxmlformats.org/presentationml/2006/main">
   <p:cSld>
     <p:spTree>
@@ -12957,144 +13307,14 @@
   <p:timing>
     <p:tnLst>
       <p:par>
-        <p:cTn id="1" dur="indefinite" restart="never" nodeType="tmRoot"/>
+        <p:cTn xmlns:p14="http://schemas.microsoft.com/office/powerpoint/2010/main" id="1" dur="indefinite" restart="never" nodeType="tmRoot"/>
       </p:par>
     </p:tnLst>
   </p:timing>
 </p:sld>
 </file>
 
-<file path=ppt/slides/slide2.xml><?xml version="1.0" encoding="utf-8"?>
-<p:sld xmlns:a="http://schemas.openxmlformats.org/drawingml/2006/main" xmlns:r="http://schemas.openxmlformats.org/officeDocument/2006/relationships" xmlns:p="http://schemas.openxmlformats.org/presentationml/2006/main">
-  <p:cSld>
-    <p:spTree>
-      <p:nvGrpSpPr>
-        <p:cNvPr id="1" name=""/>
-        <p:cNvGrpSpPr/>
-        <p:nvPr/>
-      </p:nvGrpSpPr>
-      <p:grpSpPr>
-        <a:xfrm>
-          <a:off x="0" y="0"/>
-          <a:ext cx="0" cy="0"/>
-          <a:chOff x="0" y="0"/>
-          <a:chExt cx="0" cy="0"/>
-        </a:xfrm>
-      </p:grpSpPr>
-      <p:sp>
-        <p:nvSpPr>
-          <p:cNvPr id="7" name="Title 6"/>
-          <p:cNvSpPr>
-            <a:spLocks noGrp="1"/>
-          </p:cNvSpPr>
-          <p:nvPr>
-            <p:ph type="title"/>
-          </p:nvPr>
-        </p:nvSpPr>
-        <p:spPr>
-          <a:xfrm>
-            <a:off x="386634" y="1583267"/>
-            <a:ext cx="5385112" cy="1230657"/>
-          </a:xfrm>
-        </p:spPr>
-        <p:txBody>
-          <a:bodyPr/>
-          <a:lstStyle/>
-          <a:p>
-            <a:r>
-              <a:rPr lang="en-US" sz="2400" b="0" dirty="0"/>
-              <a:t>10 Tips for Java EE 7 with PrimeFaces</a:t>
-            </a:r>
-            <a:endParaRPr lang="en-US" sz="2400" dirty="0"/>
-          </a:p>
-        </p:txBody>
-      </p:sp>
-      <p:sp>
-        <p:nvSpPr>
-          <p:cNvPr id="8" name="Text Placeholder 7"/>
-          <p:cNvSpPr>
-            <a:spLocks noGrp="1"/>
-          </p:cNvSpPr>
-          <p:nvPr>
-            <p:ph type="body" sz="quarter" idx="13"/>
-          </p:nvPr>
-        </p:nvSpPr>
-        <p:spPr>
-          <a:xfrm>
-            <a:off x="411939" y="2914276"/>
-            <a:ext cx="5027083" cy="1048124"/>
-          </a:xfrm>
-        </p:spPr>
-        <p:txBody>
-          <a:bodyPr/>
-          <a:lstStyle/>
-          <a:p>
-            <a:r>
-              <a:rPr lang="en-US" dirty="0" smtClean="0"/>
-              <a:t>Mert Çalışkan		&amp;		Martin </a:t>
-            </a:r>
-            <a:r>
-              <a:rPr lang="en-US" dirty="0" err="1" smtClean="0"/>
-              <a:t>Fousek</a:t>
-            </a:r>
-            <a:endParaRPr lang="en-US" dirty="0"/>
-          </a:p>
-          <a:p>
-            <a:r>
-              <a:rPr lang="en-US" sz="1600" dirty="0" smtClean="0"/>
-              <a:t>Software Architect    		Software Developer</a:t>
-            </a:r>
-          </a:p>
-          <a:p>
-            <a:r>
-              <a:rPr lang="en-US" sz="1600" dirty="0" smtClean="0"/>
-              <a:t>		 at T2 </a:t>
-            </a:r>
-            <a:r>
-              <a:rPr lang="en-US" sz="1600" dirty="0" err="1" smtClean="0"/>
-              <a:t>Yazılım</a:t>
-            </a:r>
-            <a:r>
-              <a:rPr lang="en-US" sz="1600" dirty="0" smtClean="0"/>
-              <a:t> Ltd.			at Oracle, NetBeans</a:t>
-            </a:r>
-            <a:endParaRPr lang="en-US" sz="1600" dirty="0"/>
-          </a:p>
-        </p:txBody>
-      </p:sp>
-    </p:spTree>
-    <p:extLst>
-      <p:ext uri="{BB962C8B-B14F-4D97-AF65-F5344CB8AC3E}">
-        <p14:creationId xmlns:p14="http://schemas.microsoft.com/office/powerpoint/2010/main" val="782494894"/>
-      </p:ext>
-    </p:extLst>
-  </p:cSld>
-  <p:clrMapOvr>
-    <a:masterClrMapping/>
-  </p:clrMapOvr>
-  <mc:AlternateContent xmlns:mc="http://schemas.openxmlformats.org/markup-compatibility/2006" xmlns:p14="http://schemas.microsoft.com/office/powerpoint/2010/main">
-    <mc:Choice Requires="p14">
-      <p:transition spd="med" p14:dur="700">
-        <p:fade/>
-      </p:transition>
-    </mc:Choice>
-    <mc:Fallback xmlns="">
-      <p:transition spd="med">
-        <p:fade/>
-      </p:transition>
-    </mc:Fallback>
-  </mc:AlternateContent>
-  <p:timing>
-    <p:tnLst>
-      <p:par>
-        <p:cTn id="1" dur="indefinite" restart="never" nodeType="tmRoot"/>
-      </p:par>
-    </p:tnLst>
-  </p:timing>
-</p:sld>
-</file>
-
-<file path=ppt/slides/slide20.xml><?xml version="1.0" encoding="utf-8"?>
+<file path=ppt/slides/slide21.xml><?xml version="1.0" encoding="utf-8"?>
 <p:sld xmlns:a="http://schemas.openxmlformats.org/drawingml/2006/main" xmlns:r="http://schemas.openxmlformats.org/officeDocument/2006/relationships" xmlns:p="http://schemas.openxmlformats.org/presentationml/2006/main">
   <p:cSld>
     <p:spTree>
@@ -13170,14 +13390,14 @@
   <p:timing>
     <p:tnLst>
       <p:par>
-        <p:cTn id="1" dur="indefinite" restart="never" nodeType="tmRoot"/>
+        <p:cTn xmlns:p14="http://schemas.microsoft.com/office/powerpoint/2010/main" id="1" dur="indefinite" restart="never" nodeType="tmRoot"/>
       </p:par>
     </p:tnLst>
   </p:timing>
 </p:sld>
 </file>
 
-<file path=ppt/slides/slide21.xml><?xml version="1.0" encoding="utf-8"?>
+<file path=ppt/slides/slide22.xml><?xml version="1.0" encoding="utf-8"?>
 <p:sld xmlns:a="http://schemas.openxmlformats.org/drawingml/2006/main" xmlns:r="http://schemas.openxmlformats.org/officeDocument/2006/relationships" xmlns:p="http://schemas.openxmlformats.org/presentationml/2006/main">
   <p:cSld>
     <p:spTree>
@@ -13234,15 +13454,80 @@
             <a:pPr fontAlgn="base"/>
             <a:r>
               <a:rPr lang="en-US" dirty="0" smtClean="0"/>
-              <a:t>Powered w/ ThemeRoller CSS Framework</a:t>
+              <a:t>Powered w/ ThemeRoller CSS </a:t>
+            </a:r>
+            <a:r>
+              <a:rPr lang="en-US" dirty="0" smtClean="0"/>
+              <a:t>Framework</a:t>
+            </a:r>
+            <a:br>
+              <a:rPr lang="en-US" dirty="0" smtClean="0"/>
+            </a:br>
+            <a:r>
+              <a:rPr lang="en-US" dirty="0"/>
+              <a:t>	Skinning </a:t>
+            </a:r>
+            <a:r>
+              <a:rPr lang="en-US" dirty="0" smtClean="0"/>
+              <a:t>and </a:t>
+            </a:r>
+            <a:r>
+              <a:rPr lang="en-US" dirty="0"/>
+              <a:t>Structural </a:t>
+            </a:r>
+            <a:r>
+              <a:rPr lang="en-US" dirty="0" smtClean="0"/>
+              <a:t>CSS architecture</a:t>
             </a:r>
           </a:p>
           <a:p>
             <a:pPr fontAlgn="base"/>
             <a:r>
               <a:rPr lang="en-US" dirty="0" smtClean="0"/>
-              <a:t>~40 themes available by only adding JAR dependency</a:t>
-            </a:r>
+              <a:t>ThemeRoller </a:t>
+            </a:r>
+            <a:r>
+              <a:rPr lang="en-US" dirty="0"/>
+              <a:t>provides visual editor to create new </a:t>
+            </a:r>
+            <a:r>
+              <a:rPr lang="en-US" dirty="0" smtClean="0"/>
+              <a:t>themes</a:t>
+            </a:r>
+            <a:endParaRPr lang="en-US" dirty="0" smtClean="0"/>
+          </a:p>
+          <a:p>
+            <a:pPr fontAlgn="base"/>
+            <a:r>
+              <a:rPr lang="en-US" dirty="0" smtClean="0"/>
+              <a:t>~40 themes available by only adding JAR </a:t>
+            </a:r>
+            <a:r>
+              <a:rPr lang="en-US" dirty="0" smtClean="0"/>
+              <a:t>dependency</a:t>
+            </a:r>
+          </a:p>
+          <a:p>
+            <a:pPr fontAlgn="base"/>
+            <a:r>
+              <a:rPr lang="en-US" dirty="0" smtClean="0"/>
+              <a:t>Advanced themes are also available</a:t>
+            </a:r>
+          </a:p>
+          <a:p>
+            <a:pPr lvl="1" fontAlgn="base"/>
+            <a:r>
+              <a:rPr lang="en-US" dirty="0" smtClean="0"/>
+              <a:t>Twitter Bootstrap Theme</a:t>
+            </a:r>
+          </a:p>
+          <a:p>
+            <a:pPr lvl="1" fontAlgn="base"/>
+            <a:r>
+              <a:rPr lang="en-US" dirty="0" smtClean="0"/>
+              <a:t>Metro UI Theme ($$)</a:t>
+            </a:r>
+            <a:endParaRPr lang="en-US" dirty="0" smtClean="0"/>
           </a:p>
           <a:p>
             <a:pPr fontAlgn="base"/>
@@ -13263,14 +13548,6 @@
               <a:t>web.xml</a:t>
             </a:r>
             <a:endParaRPr lang="en-US" dirty="0" smtClean="0"/>
-          </a:p>
-          <a:p>
-            <a:pPr fontAlgn="base"/>
-            <a:r>
-              <a:rPr lang="en-US" dirty="0" smtClean="0"/>
-              <a:t>ThemeRoller provides visual editor to create new themes</a:t>
-            </a:r>
-            <a:endParaRPr lang="en-US" dirty="0"/>
           </a:p>
         </p:txBody>
       </p:sp>
@@ -13318,14 +13595,14 @@
   <p:timing>
     <p:tnLst>
       <p:par>
-        <p:cTn id="1" dur="indefinite" restart="never" nodeType="tmRoot"/>
+        <p:cTn xmlns:p14="http://schemas.microsoft.com/office/powerpoint/2010/main" id="1" dur="indefinite" restart="never" nodeType="tmRoot"/>
       </p:par>
     </p:tnLst>
   </p:timing>
 </p:sld>
 </file>
 
-<file path=ppt/slides/slide22.xml><?xml version="1.0" encoding="utf-8"?>
+<file path=ppt/slides/slide23.xml><?xml version="1.0" encoding="utf-8"?>
 <p:sld xmlns:a="http://schemas.openxmlformats.org/drawingml/2006/main" xmlns:r="http://schemas.openxmlformats.org/officeDocument/2006/relationships" xmlns:p="http://schemas.openxmlformats.org/presentationml/2006/main">
   <p:cSld>
     <p:spTree>
@@ -13361,16 +13638,18 @@
           <a:p>
             <a:r>
               <a:rPr lang="en-US" dirty="0" smtClean="0"/>
-              <a:t>Theme variations on UI Components</a:t>
-            </a:r>
-          </a:p>
-          <a:p>
-            <a:r>
-              <a:rPr lang="en-US" dirty="0" smtClean="0"/>
-              <a:t>Custom theme creation w/ online Roller tool</a:t>
-            </a:r>
-          </a:p>
-          <a:p>
+              <a:t>Theme </a:t>
+            </a:r>
+            <a:r>
+              <a:rPr lang="en-US" dirty="0" smtClean="0"/>
+              <a:t>variations on UI Components</a:t>
+            </a:r>
+          </a:p>
+          <a:p>
+            <a:r>
+              <a:rPr lang="en-US" dirty="0" smtClean="0"/>
+              <a:t>Configuration of theme infrastructure</a:t>
+            </a:r>
             <a:endParaRPr lang="en-US" dirty="0" smtClean="0"/>
           </a:p>
         </p:txBody>
@@ -13670,14 +13949,14 @@
   <p:timing>
     <p:tnLst>
       <p:par>
-        <p:cTn id="1" dur="indefinite" restart="never" nodeType="tmRoot"/>
+        <p:cTn xmlns:p14="http://schemas.microsoft.com/office/powerpoint/2010/main" id="1" dur="indefinite" restart="never" nodeType="tmRoot"/>
       </p:par>
     </p:tnLst>
   </p:timing>
 </p:sld>
 </file>
 
-<file path=ppt/slides/slide23.xml><?xml version="1.0" encoding="utf-8"?>
+<file path=ppt/slides/slide24.xml><?xml version="1.0" encoding="utf-8"?>
 <p:sld xmlns:a="http://schemas.openxmlformats.org/drawingml/2006/main" xmlns:r="http://schemas.openxmlformats.org/officeDocument/2006/relationships" xmlns:p="http://schemas.openxmlformats.org/presentationml/2006/main">
   <p:cSld>
     <p:spTree>
@@ -13745,14 +14024,14 @@
   <p:timing>
     <p:tnLst>
       <p:par>
-        <p:cTn id="1" dur="indefinite" restart="never" nodeType="tmRoot"/>
+        <p:cTn xmlns:p14="http://schemas.microsoft.com/office/powerpoint/2010/main" id="1" dur="indefinite" restart="never" nodeType="tmRoot"/>
       </p:par>
     </p:tnLst>
   </p:timing>
 </p:sld>
 </file>
 
-<file path=ppt/slides/slide24.xml><?xml version="1.0" encoding="utf-8"?>
+<file path=ppt/slides/slide25.xml><?xml version="1.0" encoding="utf-8"?>
 <p:sld xmlns:a="http://schemas.openxmlformats.org/drawingml/2006/main" xmlns:r="http://schemas.openxmlformats.org/officeDocument/2006/relationships" xmlns:p="http://schemas.openxmlformats.org/presentationml/2006/main">
   <p:cSld>
     <p:spTree>
@@ -13981,14 +14260,14 @@
   <p:timing>
     <p:tnLst>
       <p:par>
-        <p:cTn id="1" dur="indefinite" restart="never" nodeType="tmRoot"/>
+        <p:cTn xmlns:p14="http://schemas.microsoft.com/office/powerpoint/2010/main" id="1" dur="indefinite" restart="never" nodeType="tmRoot"/>
       </p:par>
     </p:tnLst>
   </p:timing>
 </p:sld>
 </file>
 
-<file path=ppt/slides/slide25.xml><?xml version="1.0" encoding="utf-8"?>
+<file path=ppt/slides/slide26.xml><?xml version="1.0" encoding="utf-8"?>
 <p:sld xmlns:a="http://schemas.openxmlformats.org/drawingml/2006/main" xmlns:r="http://schemas.openxmlformats.org/officeDocument/2006/relationships" xmlns:p="http://schemas.openxmlformats.org/presentationml/2006/main">
   <p:cSld>
     <p:spTree>
@@ -14018,7 +14297,7 @@
         <p:spPr/>
         <p:txBody>
           <a:bodyPr>
-            <a:normAutofit fontScale="85000" lnSpcReduction="20000"/>
+            <a:normAutofit/>
           </a:bodyPr>
           <a:lstStyle/>
           <a:p>
@@ -14028,8 +14307,33 @@
             </a:r>
             <a:r>
               <a:rPr lang="en-US" dirty="0" smtClean="0"/>
-              <a:t> Chat Demo</a:t>
-            </a:r>
+              <a:t> </a:t>
+            </a:r>
+            <a:r>
+              <a:rPr lang="en-US" dirty="0" err="1" smtClean="0"/>
+              <a:t>Checkin</a:t>
+            </a:r>
+            <a:r>
+              <a:rPr lang="en-US" dirty="0" smtClean="0"/>
+              <a:t> </a:t>
+            </a:r>
+            <a:r>
+              <a:rPr lang="en-US" dirty="0"/>
+              <a:t>Demo w/ </a:t>
+            </a:r>
+            <a:r>
+              <a:rPr lang="en-US" dirty="0" err="1"/>
+              <a:t>PrimeMobile</a:t>
+            </a:r>
+            <a:r>
+              <a:rPr lang="en-US" dirty="0"/>
+              <a:t> in </a:t>
+            </a:r>
+            <a:r>
+              <a:rPr lang="en-US" dirty="0" smtClean="0"/>
+              <a:t>Action</a:t>
+            </a:r>
+            <a:endParaRPr lang="en-US" dirty="0" smtClean="0"/>
           </a:p>
           <a:p>
             <a:r>
@@ -14038,20 +14342,12 @@
             </a:r>
             <a:r>
               <a:rPr lang="en-US" dirty="0" smtClean="0"/>
-              <a:t> integrated with REST Services</a:t>
-            </a:r>
-          </a:p>
-          <a:p>
-            <a:r>
-              <a:rPr lang="en-US" dirty="0" err="1" smtClean="0"/>
-              <a:t>PrimeMobile</a:t>
-            </a:r>
-            <a:r>
-              <a:rPr lang="en-US" dirty="0" smtClean="0"/>
-              <a:t> in Action on mobile device simulators</a:t>
-            </a:r>
-          </a:p>
-          <a:p>
+              <a:t> integrated with REST </a:t>
+            </a:r>
+            <a:r>
+              <a:rPr lang="en-US" dirty="0" smtClean="0"/>
+              <a:t>Services</a:t>
+            </a:r>
             <a:endParaRPr lang="en-US" dirty="0" smtClean="0"/>
           </a:p>
         </p:txBody>
@@ -14351,14 +14647,14 @@
   <p:timing>
     <p:tnLst>
       <p:par>
-        <p:cTn id="1" dur="indefinite" restart="never" nodeType="tmRoot"/>
+        <p:cTn xmlns:p14="http://schemas.microsoft.com/office/powerpoint/2010/main" id="1" dur="indefinite" restart="never" nodeType="tmRoot"/>
       </p:par>
     </p:tnLst>
   </p:timing>
 </p:sld>
 </file>
 
-<file path=ppt/slides/slide26.xml><?xml version="1.0" encoding="utf-8"?>
+<file path=ppt/slides/slide27.xml><?xml version="1.0" encoding="utf-8"?>
 <p:sld xmlns:a="http://schemas.openxmlformats.org/drawingml/2006/main" xmlns:r="http://schemas.openxmlformats.org/officeDocument/2006/relationships" xmlns:p="http://schemas.openxmlformats.org/presentationml/2006/main">
   <p:cSld>
     <p:spTree>
@@ -14423,14 +14719,14 @@
   <p:timing>
     <p:tnLst>
       <p:par>
-        <p:cTn id="1" dur="indefinite" restart="never" nodeType="tmRoot"/>
+        <p:cTn xmlns:p14="http://schemas.microsoft.com/office/powerpoint/2010/main" id="1" dur="indefinite" restart="never" nodeType="tmRoot"/>
       </p:par>
     </p:tnLst>
   </p:timing>
 </p:sld>
 </file>
 
-<file path=ppt/slides/slide27.xml><?xml version="1.0" encoding="utf-8"?>
+<file path=ppt/slides/slide28.xml><?xml version="1.0" encoding="utf-8"?>
 <p:sld xmlns:a="http://schemas.openxmlformats.org/drawingml/2006/main" xmlns:r="http://schemas.openxmlformats.org/officeDocument/2006/relationships" xmlns:p="http://schemas.openxmlformats.org/presentationml/2006/main">
   <p:cSld>
     <p:spTree>
@@ -14606,14 +14902,14 @@
   <p:timing>
     <p:tnLst>
       <p:par>
-        <p:cTn id="1" dur="indefinite" restart="never" nodeType="tmRoot"/>
+        <p:cTn xmlns:p14="http://schemas.microsoft.com/office/powerpoint/2010/main" id="1" dur="indefinite" restart="never" nodeType="tmRoot"/>
       </p:par>
     </p:tnLst>
   </p:timing>
 </p:sld>
 </file>
 
-<file path=ppt/slides/slide28.xml><?xml version="1.0" encoding="utf-8"?>
+<file path=ppt/slides/slide29.xml><?xml version="1.0" encoding="utf-8"?>
 <p:sld xmlns:a="http://schemas.openxmlformats.org/drawingml/2006/main" xmlns:r="http://schemas.openxmlformats.org/officeDocument/2006/relationships" xmlns:p="http://schemas.openxmlformats.org/presentationml/2006/main">
   <p:cSld>
     <p:spTree>
@@ -14754,14 +15050,208 @@
   <p:timing>
     <p:tnLst>
       <p:par>
-        <p:cTn id="1" dur="indefinite" restart="never" nodeType="tmRoot"/>
+        <p:cTn xmlns:p14="http://schemas.microsoft.com/office/powerpoint/2010/main" id="1" dur="indefinite" restart="never" nodeType="tmRoot"/>
       </p:par>
     </p:tnLst>
   </p:timing>
 </p:sld>
 </file>
 
-<file path=ppt/slides/slide29.xml><?xml version="1.0" encoding="utf-8"?>
+<file path=ppt/slides/slide3.xml><?xml version="1.0" encoding="utf-8"?>
+<p:sld xmlns:a="http://schemas.openxmlformats.org/drawingml/2006/main" xmlns:r="http://schemas.openxmlformats.org/officeDocument/2006/relationships" xmlns:p="http://schemas.openxmlformats.org/presentationml/2006/main">
+  <p:cSld>
+    <p:spTree>
+      <p:nvGrpSpPr>
+        <p:cNvPr id="1" name=""/>
+        <p:cNvGrpSpPr/>
+        <p:nvPr/>
+      </p:nvGrpSpPr>
+      <p:grpSpPr>
+        <a:xfrm>
+          <a:off x="0" y="0"/>
+          <a:ext cx="0" cy="0"/>
+          <a:chOff x="0" y="0"/>
+          <a:chExt cx="0" cy="0"/>
+        </a:xfrm>
+      </p:grpSpPr>
+      <p:sp>
+        <p:nvSpPr>
+          <p:cNvPr id="2" name="Content Placeholder 1"/>
+          <p:cNvSpPr>
+            <a:spLocks noGrp="1"/>
+          </p:cNvSpPr>
+          <p:nvPr>
+            <p:ph idx="1"/>
+          </p:nvPr>
+        </p:nvSpPr>
+        <p:spPr>
+          <a:xfrm>
+            <a:off x="804346" y="1201839"/>
+            <a:ext cx="6400801" cy="2929889"/>
+          </a:xfrm>
+        </p:spPr>
+        <p:txBody>
+          <a:bodyPr/>
+          <a:lstStyle/>
+          <a:p>
+            <a:pPr marL="0" indent="0">
+              <a:buNone/>
+            </a:pPr>
+            <a:r>
+              <a:rPr lang="en-US" dirty="0">
+                <a:ea typeface="ヒラギノ角ゴ Pro W3"/>
+                <a:cs typeface="ヒラギノ角ゴ Pro W3"/>
+              </a:rPr>
+              <a:t>The following is intended to outline our general product direction. </a:t>
+            </a:r>
+            <a:r>
+              <a:rPr lang="en-US" dirty="0" smtClean="0">
+                <a:ea typeface="ヒラギノ角ゴ Pro W3"/>
+                <a:cs typeface="ヒラギノ角ゴ Pro W3"/>
+              </a:rPr>
+              <a:t>It </a:t>
+            </a:r>
+            <a:r>
+              <a:rPr lang="en-US" dirty="0">
+                <a:ea typeface="ヒラギノ角ゴ Pro W3"/>
+                <a:cs typeface="ヒラギノ角ゴ Pro W3"/>
+              </a:rPr>
+              <a:t>is intended </a:t>
+            </a:r>
+            <a:r>
+              <a:rPr lang="en-US" dirty="0" smtClean="0">
+                <a:ea typeface="ヒラギノ角ゴ Pro W3"/>
+                <a:cs typeface="ヒラギノ角ゴ Pro W3"/>
+              </a:rPr>
+              <a:t/>
+            </a:r>
+            <a:br>
+              <a:rPr lang="en-US" dirty="0" smtClean="0">
+                <a:ea typeface="ヒラギノ角ゴ Pro W3"/>
+                <a:cs typeface="ヒラギノ角ゴ Pro W3"/>
+              </a:rPr>
+            </a:br>
+            <a:r>
+              <a:rPr lang="en-US" dirty="0" smtClean="0">
+                <a:ea typeface="ヒラギノ角ゴ Pro W3"/>
+                <a:cs typeface="ヒラギノ角ゴ Pro W3"/>
+              </a:rPr>
+              <a:t>for </a:t>
+            </a:r>
+            <a:r>
+              <a:rPr lang="en-US" dirty="0">
+                <a:ea typeface="ヒラギノ角ゴ Pro W3"/>
+                <a:cs typeface="ヒラギノ角ゴ Pro W3"/>
+              </a:rPr>
+              <a:t>information purposes only, and may not be incorporated into any contract. </a:t>
+            </a:r>
+            <a:r>
+              <a:rPr lang="en-US" dirty="0" smtClean="0">
+                <a:ea typeface="ヒラギノ角ゴ Pro W3"/>
+                <a:cs typeface="ヒラギノ角ゴ Pro W3"/>
+              </a:rPr>
+              <a:t/>
+            </a:r>
+            <a:br>
+              <a:rPr lang="en-US" dirty="0" smtClean="0">
+                <a:ea typeface="ヒラギノ角ゴ Pro W3"/>
+                <a:cs typeface="ヒラギノ角ゴ Pro W3"/>
+              </a:rPr>
+            </a:br>
+            <a:r>
+              <a:rPr lang="en-US" dirty="0" smtClean="0">
+                <a:ea typeface="ヒラギノ角ゴ Pro W3"/>
+                <a:cs typeface="ヒラギノ角ゴ Pro W3"/>
+              </a:rPr>
+              <a:t>It </a:t>
+            </a:r>
+            <a:r>
+              <a:rPr lang="en-US" dirty="0">
+                <a:ea typeface="ヒラギノ角ゴ Pro W3"/>
+                <a:cs typeface="ヒラギノ角ゴ Pro W3"/>
+              </a:rPr>
+              <a:t>is not a commitment to deliver any material, code, </a:t>
+            </a:r>
+            <a:r>
+              <a:rPr lang="en-US" dirty="0" smtClean="0">
+                <a:ea typeface="ヒラギノ角ゴ Pro W3"/>
+                <a:cs typeface="ヒラギノ角ゴ Pro W3"/>
+              </a:rPr>
+              <a:t>or </a:t>
+            </a:r>
+            <a:r>
+              <a:rPr lang="en-US" dirty="0">
+                <a:ea typeface="ヒラギノ角ゴ Pro W3"/>
+                <a:cs typeface="ヒラギノ角ゴ Pro W3"/>
+              </a:rPr>
+              <a:t>functionality, and should not be relied upon in making purchasing decisions. The development, release, and timing of any features or functionality described for Oracle</a:t>
+            </a:r>
+            <a:r>
+              <a:rPr lang="ja-JP" altLang="en-US" dirty="0">
+                <a:ea typeface="ヒラギノ角ゴ Pro W3"/>
+                <a:cs typeface="ヒラギノ角ゴ Pro W3"/>
+              </a:rPr>
+              <a:t>’</a:t>
+            </a:r>
+            <a:r>
+              <a:rPr lang="en-US" altLang="ja-JP" dirty="0">
+                <a:ea typeface="ヒラギノ角ゴ Pro W3"/>
+                <a:cs typeface="ヒラギノ角ゴ Pro W3"/>
+              </a:rPr>
+              <a:t>s products remains at the sole discretion of Oracle.</a:t>
+            </a:r>
+            <a:endParaRPr lang="en-US" dirty="0">
+              <a:ea typeface="ヒラギノ角ゴ Pro W3"/>
+              <a:cs typeface="ヒラギノ角ゴ Pro W3"/>
+            </a:endParaRPr>
+          </a:p>
+          <a:p>
+            <a:pPr marL="0" indent="0">
+              <a:buNone/>
+            </a:pPr>
+            <a:endParaRPr lang="en-US" dirty="0"/>
+          </a:p>
+          <a:p>
+            <a:pPr marL="60325" indent="0">
+              <a:buNone/>
+            </a:pPr>
+            <a:endParaRPr lang="en-US" dirty="0"/>
+          </a:p>
+        </p:txBody>
+      </p:sp>
+    </p:spTree>
+    <p:extLst>
+      <p:ext uri="{BB962C8B-B14F-4D97-AF65-F5344CB8AC3E}">
+        <p14:creationId xmlns:p14="http://schemas.microsoft.com/office/powerpoint/2010/main" val="62634420"/>
+      </p:ext>
+    </p:extLst>
+  </p:cSld>
+  <p:clrMapOvr>
+    <a:masterClrMapping/>
+  </p:clrMapOvr>
+  <mc:AlternateContent xmlns:mc="http://schemas.openxmlformats.org/markup-compatibility/2006" xmlns:p14="http://schemas.microsoft.com/office/powerpoint/2010/main">
+    <mc:Choice Requires="p14">
+      <p:transition spd="med" p14:dur="700">
+        <p:fade/>
+      </p:transition>
+    </mc:Choice>
+    <mc:Fallback xmlns="">
+      <p:transition spd="med">
+        <p:fade/>
+      </p:transition>
+    </mc:Fallback>
+  </mc:AlternateContent>
+  <p:timing>
+    <p:tnLst>
+      <p:par>
+        <p:cTn xmlns:p14="http://schemas.microsoft.com/office/powerpoint/2010/main" id="1" dur="indefinite" restart="never" nodeType="tmRoot"/>
+      </p:par>
+    </p:tnLst>
+  </p:timing>
+</p:sld>
+</file>
+
+<file path=ppt/slides/slide30.xml><?xml version="1.0" encoding="utf-8"?>
 <p:sld xmlns:a="http://schemas.openxmlformats.org/drawingml/2006/main" xmlns:r="http://schemas.openxmlformats.org/officeDocument/2006/relationships" xmlns:p="http://schemas.openxmlformats.org/presentationml/2006/main">
   <p:cSld>
     <p:spTree>
@@ -14826,208 +15316,14 @@
   <p:timing>
     <p:tnLst>
       <p:par>
-        <p:cTn id="1" dur="indefinite" restart="never" nodeType="tmRoot"/>
+        <p:cTn xmlns:p14="http://schemas.microsoft.com/office/powerpoint/2010/main" id="1" dur="indefinite" restart="never" nodeType="tmRoot"/>
       </p:par>
     </p:tnLst>
   </p:timing>
 </p:sld>
 </file>
 
-<file path=ppt/slides/slide3.xml><?xml version="1.0" encoding="utf-8"?>
-<p:sld xmlns:a="http://schemas.openxmlformats.org/drawingml/2006/main" xmlns:r="http://schemas.openxmlformats.org/officeDocument/2006/relationships" xmlns:p="http://schemas.openxmlformats.org/presentationml/2006/main">
-  <p:cSld>
-    <p:spTree>
-      <p:nvGrpSpPr>
-        <p:cNvPr id="1" name=""/>
-        <p:cNvGrpSpPr/>
-        <p:nvPr/>
-      </p:nvGrpSpPr>
-      <p:grpSpPr>
-        <a:xfrm>
-          <a:off x="0" y="0"/>
-          <a:ext cx="0" cy="0"/>
-          <a:chOff x="0" y="0"/>
-          <a:chExt cx="0" cy="0"/>
-        </a:xfrm>
-      </p:grpSpPr>
-      <p:sp>
-        <p:nvSpPr>
-          <p:cNvPr id="2" name="Content Placeholder 1"/>
-          <p:cNvSpPr>
-            <a:spLocks noGrp="1"/>
-          </p:cNvSpPr>
-          <p:nvPr>
-            <p:ph idx="1"/>
-          </p:nvPr>
-        </p:nvSpPr>
-        <p:spPr>
-          <a:xfrm>
-            <a:off x="804346" y="1201839"/>
-            <a:ext cx="6400801" cy="2929889"/>
-          </a:xfrm>
-        </p:spPr>
-        <p:txBody>
-          <a:bodyPr/>
-          <a:lstStyle/>
-          <a:p>
-            <a:pPr marL="0" indent="0">
-              <a:buNone/>
-            </a:pPr>
-            <a:r>
-              <a:rPr lang="en-US" dirty="0">
-                <a:ea typeface="ヒラギノ角ゴ Pro W3"/>
-                <a:cs typeface="ヒラギノ角ゴ Pro W3"/>
-              </a:rPr>
-              <a:t>The following is intended to outline our general product direction. </a:t>
-            </a:r>
-            <a:r>
-              <a:rPr lang="en-US" dirty="0" smtClean="0">
-                <a:ea typeface="ヒラギノ角ゴ Pro W3"/>
-                <a:cs typeface="ヒラギノ角ゴ Pro W3"/>
-              </a:rPr>
-              <a:t>It </a:t>
-            </a:r>
-            <a:r>
-              <a:rPr lang="en-US" dirty="0">
-                <a:ea typeface="ヒラギノ角ゴ Pro W3"/>
-                <a:cs typeface="ヒラギノ角ゴ Pro W3"/>
-              </a:rPr>
-              <a:t>is intended </a:t>
-            </a:r>
-            <a:r>
-              <a:rPr lang="en-US" dirty="0" smtClean="0">
-                <a:ea typeface="ヒラギノ角ゴ Pro W3"/>
-                <a:cs typeface="ヒラギノ角ゴ Pro W3"/>
-              </a:rPr>
-              <a:t/>
-            </a:r>
-            <a:br>
-              <a:rPr lang="en-US" dirty="0" smtClean="0">
-                <a:ea typeface="ヒラギノ角ゴ Pro W3"/>
-                <a:cs typeface="ヒラギノ角ゴ Pro W3"/>
-              </a:rPr>
-            </a:br>
-            <a:r>
-              <a:rPr lang="en-US" dirty="0" smtClean="0">
-                <a:ea typeface="ヒラギノ角ゴ Pro W3"/>
-                <a:cs typeface="ヒラギノ角ゴ Pro W3"/>
-              </a:rPr>
-              <a:t>for </a:t>
-            </a:r>
-            <a:r>
-              <a:rPr lang="en-US" dirty="0">
-                <a:ea typeface="ヒラギノ角ゴ Pro W3"/>
-                <a:cs typeface="ヒラギノ角ゴ Pro W3"/>
-              </a:rPr>
-              <a:t>information purposes only, and may not be incorporated into any contract. </a:t>
-            </a:r>
-            <a:r>
-              <a:rPr lang="en-US" dirty="0" smtClean="0">
-                <a:ea typeface="ヒラギノ角ゴ Pro W3"/>
-                <a:cs typeface="ヒラギノ角ゴ Pro W3"/>
-              </a:rPr>
-              <a:t/>
-            </a:r>
-            <a:br>
-              <a:rPr lang="en-US" dirty="0" smtClean="0">
-                <a:ea typeface="ヒラギノ角ゴ Pro W3"/>
-                <a:cs typeface="ヒラギノ角ゴ Pro W3"/>
-              </a:rPr>
-            </a:br>
-            <a:r>
-              <a:rPr lang="en-US" dirty="0" smtClean="0">
-                <a:ea typeface="ヒラギノ角ゴ Pro W3"/>
-                <a:cs typeface="ヒラギノ角ゴ Pro W3"/>
-              </a:rPr>
-              <a:t>It </a:t>
-            </a:r>
-            <a:r>
-              <a:rPr lang="en-US" dirty="0">
-                <a:ea typeface="ヒラギノ角ゴ Pro W3"/>
-                <a:cs typeface="ヒラギノ角ゴ Pro W3"/>
-              </a:rPr>
-              <a:t>is not a commitment to deliver any material, code, </a:t>
-            </a:r>
-            <a:r>
-              <a:rPr lang="en-US" dirty="0" smtClean="0">
-                <a:ea typeface="ヒラギノ角ゴ Pro W3"/>
-                <a:cs typeface="ヒラギノ角ゴ Pro W3"/>
-              </a:rPr>
-              <a:t>or </a:t>
-            </a:r>
-            <a:r>
-              <a:rPr lang="en-US" dirty="0">
-                <a:ea typeface="ヒラギノ角ゴ Pro W3"/>
-                <a:cs typeface="ヒラギノ角ゴ Pro W3"/>
-              </a:rPr>
-              <a:t>functionality, and should not be relied upon in making purchasing decisions. The development, release, and timing of any features or functionality described for Oracle</a:t>
-            </a:r>
-            <a:r>
-              <a:rPr lang="ja-JP" altLang="en-US" dirty="0">
-                <a:ea typeface="ヒラギノ角ゴ Pro W3"/>
-                <a:cs typeface="ヒラギノ角ゴ Pro W3"/>
-              </a:rPr>
-              <a:t>’</a:t>
-            </a:r>
-            <a:r>
-              <a:rPr lang="en-US" altLang="ja-JP" dirty="0">
-                <a:ea typeface="ヒラギノ角ゴ Pro W3"/>
-                <a:cs typeface="ヒラギノ角ゴ Pro W3"/>
-              </a:rPr>
-              <a:t>s products remains at the sole discretion of Oracle.</a:t>
-            </a:r>
-            <a:endParaRPr lang="en-US" dirty="0">
-              <a:ea typeface="ヒラギノ角ゴ Pro W3"/>
-              <a:cs typeface="ヒラギノ角ゴ Pro W3"/>
-            </a:endParaRPr>
-          </a:p>
-          <a:p>
-            <a:pPr marL="0" indent="0">
-              <a:buNone/>
-            </a:pPr>
-            <a:endParaRPr lang="en-US" dirty="0"/>
-          </a:p>
-          <a:p>
-            <a:pPr marL="60325" indent="0">
-              <a:buNone/>
-            </a:pPr>
-            <a:endParaRPr lang="en-US" dirty="0"/>
-          </a:p>
-        </p:txBody>
-      </p:sp>
-    </p:spTree>
-    <p:extLst>
-      <p:ext uri="{BB962C8B-B14F-4D97-AF65-F5344CB8AC3E}">
-        <p14:creationId xmlns:p14="http://schemas.microsoft.com/office/powerpoint/2010/main" val="62634420"/>
-      </p:ext>
-    </p:extLst>
-  </p:cSld>
-  <p:clrMapOvr>
-    <a:masterClrMapping/>
-  </p:clrMapOvr>
-  <mc:AlternateContent xmlns:mc="http://schemas.openxmlformats.org/markup-compatibility/2006" xmlns:p14="http://schemas.microsoft.com/office/powerpoint/2010/main">
-    <mc:Choice Requires="p14">
-      <p:transition spd="med" p14:dur="700">
-        <p:fade/>
-      </p:transition>
-    </mc:Choice>
-    <mc:Fallback xmlns="">
-      <p:transition spd="med">
-        <p:fade/>
-      </p:transition>
-    </mc:Fallback>
-  </mc:AlternateContent>
-  <p:timing>
-    <p:tnLst>
-      <p:par>
-        <p:cTn id="1" dur="indefinite" restart="never" nodeType="tmRoot"/>
-      </p:par>
-    </p:tnLst>
-  </p:timing>
-</p:sld>
-</file>
-
-<file path=ppt/slides/slide30.xml><?xml version="1.0" encoding="utf-8"?>
+<file path=ppt/slides/slide31.xml><?xml version="1.0" encoding="utf-8"?>
 <p:sld xmlns:a="http://schemas.openxmlformats.org/drawingml/2006/main" xmlns:r="http://schemas.openxmlformats.org/officeDocument/2006/relationships" xmlns:p="http://schemas.openxmlformats.org/presentationml/2006/main">
   <p:cSld>
     <p:spTree>
@@ -15196,14 +15492,14 @@
   <p:timing>
     <p:tnLst>
       <p:par>
-        <p:cTn id="1" dur="indefinite" restart="never" nodeType="tmRoot"/>
+        <p:cTn xmlns:p14="http://schemas.microsoft.com/office/powerpoint/2010/main" id="1" dur="indefinite" restart="never" nodeType="tmRoot"/>
       </p:par>
     </p:tnLst>
   </p:timing>
 </p:sld>
 </file>
 
-<file path=ppt/slides/slide31.xml><?xml version="1.0" encoding="utf-8"?>
+<file path=ppt/slides/slide32.xml><?xml version="1.0" encoding="utf-8"?>
 <p:sld xmlns:a="http://schemas.openxmlformats.org/drawingml/2006/main" xmlns:r="http://schemas.openxmlformats.org/officeDocument/2006/relationships" xmlns:p="http://schemas.openxmlformats.org/presentationml/2006/main">
   <p:cSld>
     <p:spTree>
@@ -15356,14 +15652,14 @@
   <p:timing>
     <p:tnLst>
       <p:par>
-        <p:cTn id="1" dur="indefinite" restart="never" nodeType="tmRoot"/>
+        <p:cTn xmlns:p14="http://schemas.microsoft.com/office/powerpoint/2010/main" id="1" dur="indefinite" restart="never" nodeType="tmRoot"/>
       </p:par>
     </p:tnLst>
   </p:timing>
 </p:sld>
 </file>
 
-<file path=ppt/slides/slide32.xml><?xml version="1.0" encoding="utf-8"?>
+<file path=ppt/slides/slide33.xml><?xml version="1.0" encoding="utf-8"?>
 <p:sld xmlns:a="http://schemas.openxmlformats.org/drawingml/2006/main" xmlns:r="http://schemas.openxmlformats.org/officeDocument/2006/relationships" xmlns:p="http://schemas.openxmlformats.org/presentationml/2006/main">
   <p:cSld>
     <p:spTree>
@@ -15428,14 +15724,14 @@
   <p:timing>
     <p:tnLst>
       <p:par>
-        <p:cTn id="1" dur="indefinite" restart="never" nodeType="tmRoot"/>
+        <p:cTn xmlns:p14="http://schemas.microsoft.com/office/powerpoint/2010/main" id="1" dur="indefinite" restart="never" nodeType="tmRoot"/>
       </p:par>
     </p:tnLst>
   </p:timing>
 </p:sld>
 </file>
 
-<file path=ppt/slides/slide33.xml><?xml version="1.0" encoding="utf-8"?>
+<file path=ppt/slides/slide34.xml><?xml version="1.0" encoding="utf-8"?>
 <p:sld xmlns:a="http://schemas.openxmlformats.org/drawingml/2006/main" xmlns:r="http://schemas.openxmlformats.org/officeDocument/2006/relationships" xmlns:p="http://schemas.openxmlformats.org/presentationml/2006/main">
   <p:cSld>
     <p:spTree>
@@ -15612,14 +15908,14 @@
   <p:timing>
     <p:tnLst>
       <p:par>
-        <p:cTn id="1" dur="indefinite" restart="never" nodeType="tmRoot"/>
+        <p:cTn xmlns:p14="http://schemas.microsoft.com/office/powerpoint/2010/main" id="1" dur="indefinite" restart="never" nodeType="tmRoot"/>
       </p:par>
     </p:tnLst>
   </p:timing>
 </p:sld>
 </file>
 
-<file path=ppt/slides/slide34.xml><?xml version="1.0" encoding="utf-8"?>
+<file path=ppt/slides/slide35.xml><?xml version="1.0" encoding="utf-8"?>
 <p:sld xmlns:a="http://schemas.openxmlformats.org/drawingml/2006/main" xmlns:r="http://schemas.openxmlformats.org/officeDocument/2006/relationships" xmlns:p="http://schemas.openxmlformats.org/presentationml/2006/main">
   <p:cSld>
     <p:spTree>
@@ -15775,14 +16071,14 @@
   <p:timing>
     <p:tnLst>
       <p:par>
-        <p:cTn id="1" dur="indefinite" restart="never" nodeType="tmRoot"/>
+        <p:cTn xmlns:p14="http://schemas.microsoft.com/office/powerpoint/2010/main" id="1" dur="indefinite" restart="never" nodeType="tmRoot"/>
       </p:par>
     </p:tnLst>
   </p:timing>
 </p:sld>
 </file>
 
-<file path=ppt/slides/slide35.xml><?xml version="1.0" encoding="utf-8"?>
+<file path=ppt/slides/slide36.xml><?xml version="1.0" encoding="utf-8"?>
 <p:sld xmlns:a="http://schemas.openxmlformats.org/drawingml/2006/main" xmlns:r="http://schemas.openxmlformats.org/officeDocument/2006/relationships" xmlns:p="http://schemas.openxmlformats.org/presentationml/2006/main">
   <p:cSld>
     <p:spTree>
@@ -15847,14 +16143,14 @@
   <p:timing>
     <p:tnLst>
       <p:par>
-        <p:cTn id="1" dur="indefinite" restart="never" nodeType="tmRoot"/>
+        <p:cTn xmlns:p14="http://schemas.microsoft.com/office/powerpoint/2010/main" id="1" dur="indefinite" restart="never" nodeType="tmRoot"/>
       </p:par>
     </p:tnLst>
   </p:timing>
 </p:sld>
 </file>
 
-<file path=ppt/slides/slide36.xml><?xml version="1.0" encoding="utf-8"?>
+<file path=ppt/slides/slide37.xml><?xml version="1.0" encoding="utf-8"?>
 <p:sld xmlns:a="http://schemas.openxmlformats.org/drawingml/2006/main" xmlns:r="http://schemas.openxmlformats.org/officeDocument/2006/relationships" xmlns:p="http://schemas.openxmlformats.org/presentationml/2006/main">
   <p:cSld>
     <p:spTree>
@@ -16017,14 +16313,14 @@
   <p:timing>
     <p:tnLst>
       <p:par>
-        <p:cTn id="1" dur="indefinite" restart="never" nodeType="tmRoot"/>
+        <p:cTn xmlns:p14="http://schemas.microsoft.com/office/powerpoint/2010/main" id="1" dur="indefinite" restart="never" nodeType="tmRoot"/>
       </p:par>
     </p:tnLst>
   </p:timing>
 </p:sld>
 </file>
 
-<file path=ppt/slides/slide37.xml><?xml version="1.0" encoding="utf-8"?>
+<file path=ppt/slides/slide38.xml><?xml version="1.0" encoding="utf-8"?>
 <p:sld xmlns:a="http://schemas.openxmlformats.org/drawingml/2006/main" xmlns:r="http://schemas.openxmlformats.org/officeDocument/2006/relationships" xmlns:p="http://schemas.openxmlformats.org/presentationml/2006/main">
   <p:cSld>
     <p:spTree>
@@ -16060,7 +16356,15 @@
           <a:p>
             <a:r>
               <a:rPr lang="en-US" dirty="0" smtClean="0"/>
-              <a:t>File Upload of the standard JSF 2.2 and PrimeFaces library in action, setup of the type and size limit.</a:t>
+              <a:t>File Upload of the standard JSF 2.2 and PrimeFaces library in action, </a:t>
+            </a:r>
+            <a:r>
+              <a:rPr lang="en-US" dirty="0" smtClean="0"/>
+              <a:t>with validation of type </a:t>
+            </a:r>
+            <a:r>
+              <a:rPr lang="en-US" dirty="0" smtClean="0"/>
+              <a:t>and size limit.</a:t>
             </a:r>
           </a:p>
         </p:txBody>
@@ -16169,14 +16473,14 @@
   <p:timing>
     <p:tnLst>
       <p:par>
-        <p:cTn id="1" dur="indefinite" restart="never" nodeType="tmRoot"/>
+        <p:cTn xmlns:p14="http://schemas.microsoft.com/office/powerpoint/2010/main" id="1" dur="indefinite" restart="never" nodeType="tmRoot"/>
       </p:par>
     </p:tnLst>
   </p:timing>
 </p:sld>
 </file>
 
-<file path=ppt/slides/slide38.xml><?xml version="1.0" encoding="utf-8"?>
+<file path=ppt/slides/slide39.xml><?xml version="1.0" encoding="utf-8"?>
 <p:sld xmlns:a="http://schemas.openxmlformats.org/drawingml/2006/main" xmlns:r="http://schemas.openxmlformats.org/officeDocument/2006/relationships" xmlns:p="http://schemas.openxmlformats.org/presentationml/2006/main">
   <p:cSld>
     <p:spTree>
@@ -16500,14 +16804,141 @@
   <p:timing>
     <p:tnLst>
       <p:par>
-        <p:cTn id="1" dur="indefinite" restart="never" nodeType="tmRoot"/>
+        <p:cTn xmlns:p14="http://schemas.microsoft.com/office/powerpoint/2010/main" id="1" dur="indefinite" restart="never" nodeType="tmRoot"/>
       </p:par>
     </p:tnLst>
   </p:timing>
 </p:sld>
 </file>
 
-<file path=ppt/slides/slide39.xml><?xml version="1.0" encoding="utf-8"?>
+<file path=ppt/slides/slide4.xml><?xml version="1.0" encoding="utf-8"?>
+<p:sld xmlns:a="http://schemas.openxmlformats.org/drawingml/2006/main" xmlns:r="http://schemas.openxmlformats.org/officeDocument/2006/relationships" xmlns:p="http://schemas.openxmlformats.org/presentationml/2006/main">
+  <p:cSld>
+    <p:spTree>
+      <p:nvGrpSpPr>
+        <p:cNvPr id="1" name=""/>
+        <p:cNvGrpSpPr/>
+        <p:nvPr/>
+      </p:nvGrpSpPr>
+      <p:grpSpPr>
+        <a:xfrm>
+          <a:off x="0" y="0"/>
+          <a:ext cx="0" cy="0"/>
+          <a:chOff x="0" y="0"/>
+          <a:chExt cx="0" cy="0"/>
+        </a:xfrm>
+      </p:grpSpPr>
+      <p:sp>
+        <p:nvSpPr>
+          <p:cNvPr id="11" name="Title 10"/>
+          <p:cNvSpPr>
+            <a:spLocks noGrp="1"/>
+          </p:cNvSpPr>
+          <p:nvPr>
+            <p:ph type="title"/>
+          </p:nvPr>
+        </p:nvSpPr>
+        <p:spPr/>
+        <p:txBody>
+          <a:bodyPr/>
+          <a:lstStyle/>
+          <a:p>
+            <a:r>
+              <a:rPr lang="en-US" dirty="0" smtClean="0"/>
+              <a:t>Agenda</a:t>
+            </a:r>
+            <a:endParaRPr lang="en-US" dirty="0"/>
+          </a:p>
+        </p:txBody>
+      </p:sp>
+      <p:sp>
+        <p:nvSpPr>
+          <p:cNvPr id="12" name="Text Placeholder 11"/>
+          <p:cNvSpPr>
+            <a:spLocks noGrp="1"/>
+          </p:cNvSpPr>
+          <p:nvPr>
+            <p:ph type="body" sz="quarter" idx="13"/>
+          </p:nvPr>
+        </p:nvSpPr>
+        <p:spPr/>
+        <p:txBody>
+          <a:bodyPr/>
+          <a:lstStyle/>
+          <a:p>
+            <a:r>
+              <a:rPr lang="en-US" dirty="0" smtClean="0"/>
+              <a:t>Introduction</a:t>
+            </a:r>
+          </a:p>
+          <a:p>
+            <a:pPr lvl="1"/>
+            <a:r>
+              <a:rPr lang="en-US" dirty="0" smtClean="0"/>
+              <a:t>Java EE 7 &amp; JavaServer Faces 2.2, PrimeFaces, NetBeans IDE</a:t>
+            </a:r>
+          </a:p>
+          <a:p>
+            <a:pPr marL="403225" lvl="1" indent="0">
+              <a:buNone/>
+            </a:pPr>
+            <a:endParaRPr lang="en-US" dirty="0" smtClean="0"/>
+          </a:p>
+          <a:p>
+            <a:r>
+              <a:rPr lang="en-US" dirty="0" smtClean="0"/>
+              <a:t>Tour through 10 features of the JSF and PF </a:t>
+            </a:r>
+          </a:p>
+          <a:p>
+            <a:pPr lvl="1"/>
+            <a:r>
+              <a:rPr lang="en-US" dirty="0" smtClean="0"/>
+              <a:t>Feature overview</a:t>
+            </a:r>
+          </a:p>
+          <a:p>
+            <a:pPr lvl="1"/>
+            <a:r>
+              <a:rPr lang="en-US" dirty="0" smtClean="0"/>
+              <a:t>Samples in action</a:t>
+            </a:r>
+          </a:p>
+        </p:txBody>
+      </p:sp>
+    </p:spTree>
+    <p:extLst>
+      <p:ext uri="{BB962C8B-B14F-4D97-AF65-F5344CB8AC3E}">
+        <p14:creationId xmlns:p14="http://schemas.microsoft.com/office/powerpoint/2010/main" val="1886183616"/>
+      </p:ext>
+    </p:extLst>
+  </p:cSld>
+  <p:clrMapOvr>
+    <a:masterClrMapping/>
+  </p:clrMapOvr>
+  <mc:AlternateContent xmlns:mc="http://schemas.openxmlformats.org/markup-compatibility/2006" xmlns:p14="http://schemas.microsoft.com/office/powerpoint/2010/main">
+    <mc:Choice Requires="p14">
+      <p:transition spd="med" p14:dur="700">
+        <p:fade/>
+      </p:transition>
+    </mc:Choice>
+    <mc:Fallback xmlns="">
+      <p:transition spd="med">
+        <p:fade/>
+      </p:transition>
+    </mc:Fallback>
+  </mc:AlternateContent>
+  <p:timing>
+    <p:tnLst>
+      <p:par>
+        <p:cTn xmlns:p14="http://schemas.microsoft.com/office/powerpoint/2010/main" id="1" dur="indefinite" restart="never" nodeType="tmRoot"/>
+      </p:par>
+    </p:tnLst>
+  </p:timing>
+</p:sld>
+</file>
+
+<file path=ppt/slides/slide40.xml><?xml version="1.0" encoding="utf-8"?>
 <p:sld xmlns:a="http://schemas.openxmlformats.org/drawingml/2006/main" xmlns:r="http://schemas.openxmlformats.org/officeDocument/2006/relationships" xmlns:p="http://schemas.openxmlformats.org/presentationml/2006/main">
   <p:cSld>
     <p:spTree>
@@ -16695,141 +17126,14 @@
   <p:timing>
     <p:tnLst>
       <p:par>
-        <p:cTn id="1" dur="indefinite" restart="never" nodeType="tmRoot"/>
+        <p:cTn xmlns:p14="http://schemas.microsoft.com/office/powerpoint/2010/main" id="1" dur="indefinite" restart="never" nodeType="tmRoot"/>
       </p:par>
     </p:tnLst>
   </p:timing>
 </p:sld>
 </file>
 
-<file path=ppt/slides/slide4.xml><?xml version="1.0" encoding="utf-8"?>
-<p:sld xmlns:a="http://schemas.openxmlformats.org/drawingml/2006/main" xmlns:r="http://schemas.openxmlformats.org/officeDocument/2006/relationships" xmlns:p="http://schemas.openxmlformats.org/presentationml/2006/main">
-  <p:cSld>
-    <p:spTree>
-      <p:nvGrpSpPr>
-        <p:cNvPr id="1" name=""/>
-        <p:cNvGrpSpPr/>
-        <p:nvPr/>
-      </p:nvGrpSpPr>
-      <p:grpSpPr>
-        <a:xfrm>
-          <a:off x="0" y="0"/>
-          <a:ext cx="0" cy="0"/>
-          <a:chOff x="0" y="0"/>
-          <a:chExt cx="0" cy="0"/>
-        </a:xfrm>
-      </p:grpSpPr>
-      <p:sp>
-        <p:nvSpPr>
-          <p:cNvPr id="11" name="Title 10"/>
-          <p:cNvSpPr>
-            <a:spLocks noGrp="1"/>
-          </p:cNvSpPr>
-          <p:nvPr>
-            <p:ph type="title"/>
-          </p:nvPr>
-        </p:nvSpPr>
-        <p:spPr/>
-        <p:txBody>
-          <a:bodyPr/>
-          <a:lstStyle/>
-          <a:p>
-            <a:r>
-              <a:rPr lang="en-US" dirty="0" smtClean="0"/>
-              <a:t>Agenda</a:t>
-            </a:r>
-            <a:endParaRPr lang="en-US" dirty="0"/>
-          </a:p>
-        </p:txBody>
-      </p:sp>
-      <p:sp>
-        <p:nvSpPr>
-          <p:cNvPr id="12" name="Text Placeholder 11"/>
-          <p:cNvSpPr>
-            <a:spLocks noGrp="1"/>
-          </p:cNvSpPr>
-          <p:nvPr>
-            <p:ph type="body" sz="quarter" idx="13"/>
-          </p:nvPr>
-        </p:nvSpPr>
-        <p:spPr/>
-        <p:txBody>
-          <a:bodyPr/>
-          <a:lstStyle/>
-          <a:p>
-            <a:r>
-              <a:rPr lang="en-US" dirty="0" smtClean="0"/>
-              <a:t>Introduction</a:t>
-            </a:r>
-          </a:p>
-          <a:p>
-            <a:pPr lvl="1"/>
-            <a:r>
-              <a:rPr lang="en-US" dirty="0" smtClean="0"/>
-              <a:t>Java EE 7 &amp; JavaServer Faces 2.2, PrimeFaces, NetBeans IDE</a:t>
-            </a:r>
-          </a:p>
-          <a:p>
-            <a:pPr marL="403225" lvl="1" indent="0">
-              <a:buNone/>
-            </a:pPr>
-            <a:endParaRPr lang="en-US" dirty="0" smtClean="0"/>
-          </a:p>
-          <a:p>
-            <a:r>
-              <a:rPr lang="en-US" dirty="0" smtClean="0"/>
-              <a:t>Tour through 10 features of the JSF and PF </a:t>
-            </a:r>
-          </a:p>
-          <a:p>
-            <a:pPr lvl="1"/>
-            <a:r>
-              <a:rPr lang="en-US" dirty="0" smtClean="0"/>
-              <a:t>Feature overview</a:t>
-            </a:r>
-          </a:p>
-          <a:p>
-            <a:pPr lvl="1"/>
-            <a:r>
-              <a:rPr lang="en-US" dirty="0" smtClean="0"/>
-              <a:t>Samples in action</a:t>
-            </a:r>
-          </a:p>
-        </p:txBody>
-      </p:sp>
-    </p:spTree>
-    <p:extLst>
-      <p:ext uri="{BB962C8B-B14F-4D97-AF65-F5344CB8AC3E}">
-        <p14:creationId xmlns:p14="http://schemas.microsoft.com/office/powerpoint/2010/main" val="1886183616"/>
-      </p:ext>
-    </p:extLst>
-  </p:cSld>
-  <p:clrMapOvr>
-    <a:masterClrMapping/>
-  </p:clrMapOvr>
-  <mc:AlternateContent xmlns:mc="http://schemas.openxmlformats.org/markup-compatibility/2006" xmlns:p14="http://schemas.microsoft.com/office/powerpoint/2010/main">
-    <mc:Choice Requires="p14">
-      <p:transition spd="med" p14:dur="700">
-        <p:fade/>
-      </p:transition>
-    </mc:Choice>
-    <mc:Fallback xmlns="">
-      <p:transition spd="med">
-        <p:fade/>
-      </p:transition>
-    </mc:Fallback>
-  </mc:AlternateContent>
-  <p:timing>
-    <p:tnLst>
-      <p:par>
-        <p:cTn id="1" dur="indefinite" restart="never" nodeType="tmRoot"/>
-      </p:par>
-    </p:tnLst>
-  </p:timing>
-</p:sld>
-</file>
-
-<file path=ppt/slides/slide40.xml><?xml version="1.0" encoding="utf-8"?>
+<file path=ppt/slides/slide41.xml><?xml version="1.0" encoding="utf-8"?>
 <p:sld xmlns:a="http://schemas.openxmlformats.org/drawingml/2006/main" xmlns:r="http://schemas.openxmlformats.org/officeDocument/2006/relationships" xmlns:p="http://schemas.openxmlformats.org/presentationml/2006/main">
   <p:cSld>
     <p:spTree>
@@ -16958,7 +17262,7 @@
   <p:timing>
     <p:tnLst>
       <p:par>
-        <p:cTn id="1" dur="indefinite" restart="never" nodeType="tmRoot"/>
+        <p:cTn xmlns:p14="http://schemas.microsoft.com/office/powerpoint/2010/main" id="1" dur="indefinite" restart="never" nodeType="tmRoot"/>
       </p:par>
     </p:tnLst>
   </p:timing>
@@ -17152,7 +17456,7 @@
           </a:prstGeom>
           <a:noFill/>
           <a:extLst>
-            <a:ext uri="{909E8E84-426E-40DD-AFC4-6F175D3DCCD1}">
+            <a:ext uri="{909E8E84-426E-40dd-AFC4-6F175D3DCCD1}">
               <a14:hiddenFill xmlns:a14="http://schemas.microsoft.com/office/drawing/2010/main">
                 <a:solidFill>
                   <a:srgbClr val="FFFFFF"/>
@@ -17187,7 +17491,7 @@
   <p:timing>
     <p:tnLst>
       <p:par>
-        <p:cTn id="1" dur="indefinite" restart="never" nodeType="tmRoot"/>
+        <p:cTn xmlns:p14="http://schemas.microsoft.com/office/powerpoint/2010/main" id="1" dur="indefinite" restart="never" nodeType="tmRoot"/>
       </p:par>
     </p:tnLst>
   </p:timing>
@@ -17311,15 +17615,7 @@
             </a:pPr>
             <a:r>
               <a:rPr lang="en-US" sz="2000" cap="none" dirty="0" smtClean="0"/>
-              <a:t>Well documented, user guides, </a:t>
-            </a:r>
-            <a:r>
-              <a:rPr lang="en-US" sz="2000" cap="none" dirty="0" smtClean="0"/>
-              <a:t>books &amp; </a:t>
-            </a:r>
-            <a:r>
-              <a:rPr lang="en-US" sz="2000" cap="none" dirty="0" smtClean="0"/>
-              <a:t>etc.</a:t>
+              <a:t>Well documented, user guides, books &amp; etc.</a:t>
             </a:r>
             <a:endParaRPr lang="en-US" sz="2000" cap="none" dirty="0"/>
           </a:p>
@@ -17407,7 +17703,7 @@
           </a:prstGeom>
           <a:noFill/>
           <a:extLst>
-            <a:ext uri="{909E8E84-426E-40DD-AFC4-6F175D3DCCD1}">
+            <a:ext uri="{909E8E84-426E-40dd-AFC4-6F175D3DCCD1}">
               <a14:hiddenFill xmlns:a14="http://schemas.microsoft.com/office/drawing/2010/main">
                 <a:solidFill>
                   <a:srgbClr val="FFFFFF"/>
@@ -17442,7 +17738,7 @@
   <p:timing>
     <p:tnLst>
       <p:par>
-        <p:cTn id="1" dur="indefinite" restart="never" nodeType="tmRoot"/>
+        <p:cTn xmlns:p14="http://schemas.microsoft.com/office/powerpoint/2010/main" id="1" dur="indefinite" restart="never" nodeType="tmRoot"/>
       </p:par>
     </p:tnLst>
   </p:timing>
@@ -17552,13 +17848,8 @@
             <a:pPr marL="917575" lvl="1" indent="-285750"/>
             <a:r>
               <a:rPr lang="en-US" dirty="0" smtClean="0"/>
-              <a:t>Cordova, </a:t>
-            </a:r>
-            <a:r>
-              <a:rPr lang="en-US" dirty="0" smtClean="0"/>
-              <a:t>FindBugs, VCS improvements</a:t>
-            </a:r>
-            <a:endParaRPr lang="en-US" dirty="0" smtClean="0"/>
+              <a:t>Cordova, FindBugs, VCS improvements</a:t>
+            </a:r>
           </a:p>
           <a:p>
             <a:pPr marL="917575" lvl="1" indent="-285750"/>
@@ -17638,7 +17929,7 @@
           </a:prstGeom>
           <a:noFill/>
           <a:extLst>
-            <a:ext uri="{909E8E84-426E-40DD-AFC4-6F175D3DCCD1}">
+            <a:ext uri="{909E8E84-426E-40dd-AFC4-6F175D3DCCD1}">
               <a14:hiddenFill xmlns:a14="http://schemas.microsoft.com/office/drawing/2010/main">
                 <a:solidFill>
                   <a:srgbClr val="FFFFFF"/>
@@ -17673,7 +17964,7 @@
   <p:timing>
     <p:tnLst>
       <p:par>
-        <p:cTn id="1" dur="indefinite" restart="never" nodeType="tmRoot"/>
+        <p:cTn xmlns:p14="http://schemas.microsoft.com/office/powerpoint/2010/main" id="1" dur="indefinite" restart="never" nodeType="tmRoot"/>
       </p:par>
     </p:tnLst>
   </p:timing>
@@ -17681,6 +17972,207 @@
 </file>
 
 <file path=ppt/slides/slide8.xml><?xml version="1.0" encoding="utf-8"?>
+<p:sld xmlns:a="http://schemas.openxmlformats.org/drawingml/2006/main" xmlns:r="http://schemas.openxmlformats.org/officeDocument/2006/relationships" xmlns:p="http://schemas.openxmlformats.org/presentationml/2006/main">
+  <p:cSld>
+    <p:spTree>
+      <p:nvGrpSpPr>
+        <p:cNvPr id="1" name=""/>
+        <p:cNvGrpSpPr/>
+        <p:nvPr/>
+      </p:nvGrpSpPr>
+      <p:grpSpPr>
+        <a:xfrm>
+          <a:off x="0" y="0"/>
+          <a:ext cx="0" cy="0"/>
+          <a:chOff x="0" y="0"/>
+          <a:chExt cx="0" cy="0"/>
+        </a:xfrm>
+      </p:grpSpPr>
+      <p:sp>
+        <p:nvSpPr>
+          <p:cNvPr id="17" name="Text Placeholder 16"/>
+          <p:cNvSpPr>
+            <a:spLocks noGrp="1"/>
+          </p:cNvSpPr>
+          <p:nvPr>
+            <p:ph type="body" sz="quarter" idx="11"/>
+          </p:nvPr>
+        </p:nvSpPr>
+        <p:spPr>
+          <a:xfrm>
+            <a:off x="3134669" y="1212717"/>
+            <a:ext cx="5855800" cy="2797646"/>
+          </a:xfrm>
+        </p:spPr>
+        <p:txBody>
+          <a:bodyPr/>
+          <a:lstStyle/>
+          <a:p>
+            <a:pPr marL="342900" indent="-342900">
+              <a:buFont typeface="Wingdings" pitchFamily="2" charset="2"/>
+              <a:buChar char="§"/>
+            </a:pPr>
+            <a:r>
+              <a:rPr lang="en-US" sz="2000" cap="none" dirty="0" smtClean="0"/>
+              <a:t>We have created sample codes to demonstrate the tips. </a:t>
+            </a:r>
+          </a:p>
+          <a:p>
+            <a:pPr marL="342900" indent="-342900">
+              <a:buFont typeface="Wingdings" pitchFamily="2" charset="2"/>
+              <a:buChar char="§"/>
+            </a:pPr>
+            <a:r>
+              <a:rPr lang="en-US" sz="2000" cap="none" dirty="0" smtClean="0"/>
+              <a:t>They are available @</a:t>
+            </a:r>
+            <a:br>
+              <a:rPr lang="en-US" sz="2000" cap="none" dirty="0" smtClean="0"/>
+            </a:br>
+            <a:r>
+              <a:rPr lang="en-US" sz="2000" cap="none" dirty="0" smtClean="0"/>
+              <a:t>   </a:t>
+            </a:r>
+            <a:r>
+              <a:rPr lang="en-US" sz="2000" cap="none" dirty="0" smtClean="0">
+                <a:hlinkClick r:id="rId2"/>
+              </a:rPr>
+              <a:t>https</a:t>
+            </a:r>
+            <a:r>
+              <a:rPr lang="en-US" sz="2000" cap="none" dirty="0">
+                <a:hlinkClick r:id="rId2"/>
+              </a:rPr>
+              <a:t>://github.com/marfous/j1demo-</a:t>
+            </a:r>
+            <a:r>
+              <a:rPr lang="en-US" sz="2000" cap="none" dirty="0" smtClean="0">
+                <a:hlinkClick r:id="rId2"/>
+              </a:rPr>
+              <a:t>pf</a:t>
+            </a:r>
+            <a:endParaRPr lang="en-US" sz="2000" cap="none" dirty="0" smtClean="0"/>
+          </a:p>
+          <a:p>
+            <a:pPr marL="342900" indent="-342900">
+              <a:buFont typeface="Wingdings" pitchFamily="2" charset="2"/>
+              <a:buChar char="§"/>
+            </a:pPr>
+            <a:r>
+              <a:rPr lang="en-US" sz="2000" cap="none" dirty="0" err="1" smtClean="0"/>
+              <a:t>Mavenized</a:t>
+            </a:r>
+            <a:r>
+              <a:rPr lang="en-US" sz="2000" cap="none" dirty="0" smtClean="0"/>
+              <a:t> projects created by JavaEE7 archetype</a:t>
+            </a:r>
+            <a:endParaRPr lang="en-US" sz="2000" cap="none" dirty="0"/>
+          </a:p>
+        </p:txBody>
+      </p:sp>
+      <p:sp>
+        <p:nvSpPr>
+          <p:cNvPr id="16" name="Title 15"/>
+          <p:cNvSpPr>
+            <a:spLocks noGrp="1"/>
+          </p:cNvSpPr>
+          <p:nvPr>
+            <p:ph type="title"/>
+          </p:nvPr>
+        </p:nvSpPr>
+        <p:spPr/>
+        <p:txBody>
+          <a:bodyPr/>
+          <a:lstStyle/>
+          <a:p>
+            <a:r>
+              <a:rPr lang="en-US" dirty="0" smtClean="0"/>
+              <a:t>Sample Codes</a:t>
+            </a:r>
+            <a:endParaRPr lang="en-US" dirty="0"/>
+          </a:p>
+        </p:txBody>
+      </p:sp>
+      <p:sp>
+        <p:nvSpPr>
+          <p:cNvPr id="2" name="TextBox 1"/>
+          <p:cNvSpPr txBox="1"/>
+          <p:nvPr/>
+        </p:nvSpPr>
+        <p:spPr>
+          <a:xfrm>
+            <a:off x="2570473" y="714824"/>
+            <a:ext cx="184666" cy="400110"/>
+          </a:xfrm>
+          <a:prstGeom prst="rect">
+            <a:avLst/>
+          </a:prstGeom>
+          <a:noFill/>
+        </p:spPr>
+        <p:txBody>
+          <a:bodyPr wrap="none" rtlCol="0">
+            <a:spAutoFit/>
+          </a:bodyPr>
+          <a:lstStyle/>
+          <a:p>
+            <a:endParaRPr lang="en-US" sz="2000" dirty="0" err="1" smtClean="0">
+              <a:solidFill>
+                <a:schemeClr val="tx2"/>
+              </a:solidFill>
+            </a:endParaRPr>
+          </a:p>
+        </p:txBody>
+      </p:sp>
+      <p:pic>
+        <p:nvPicPr>
+          <p:cNvPr id="6" name="Picture Placeholder 5"/>
+          <p:cNvPicPr>
+            <a:picLocks noGrp="1" noChangeAspect="1"/>
+          </p:cNvPicPr>
+          <p:nvPr>
+            <p:ph type="pic" sz="quarter" idx="13"/>
+          </p:nvPr>
+        </p:nvPicPr>
+        <p:blipFill rotWithShape="1">
+          <a:blip r:embed="rId3"/>
+          <a:srcRect l="-6685" t="-155853" r="-6737" b="-176112"/>
+          <a:stretch/>
+        </p:blipFill>
+        <p:spPr/>
+      </p:pic>
+    </p:spTree>
+    <p:extLst>
+      <p:ext uri="{BB962C8B-B14F-4D97-AF65-F5344CB8AC3E}">
+        <p14:creationId xmlns:p14="http://schemas.microsoft.com/office/powerpoint/2010/main" val="2655389882"/>
+      </p:ext>
+    </p:extLst>
+  </p:cSld>
+  <p:clrMapOvr>
+    <a:masterClrMapping/>
+  </p:clrMapOvr>
+  <mc:AlternateContent xmlns:mc="http://schemas.openxmlformats.org/markup-compatibility/2006" xmlns:p14="http://schemas.microsoft.com/office/powerpoint/2010/main">
+    <mc:Choice Requires="p14">
+      <p:transition spd="med" p14:dur="700">
+        <p:fade/>
+      </p:transition>
+    </mc:Choice>
+    <mc:Fallback xmlns="">
+      <p:transition spd="med">
+        <p:fade/>
+      </p:transition>
+    </mc:Fallback>
+  </mc:AlternateContent>
+  <p:timing>
+    <p:tnLst>
+      <p:par>
+        <p:cTn xmlns:p14="http://schemas.microsoft.com/office/powerpoint/2010/main" id="1" dur="indefinite" restart="never" nodeType="tmRoot"/>
+      </p:par>
+    </p:tnLst>
+  </p:timing>
+</p:sld>
+</file>
+
+<file path=ppt/slides/slide9.xml><?xml version="1.0" encoding="utf-8"?>
 <p:sld xmlns:a="http://schemas.openxmlformats.org/drawingml/2006/main" xmlns:r="http://schemas.openxmlformats.org/officeDocument/2006/relationships" xmlns:p="http://schemas.openxmlformats.org/presentationml/2006/main">
   <p:cSld>
     <p:spTree>
@@ -17744,233 +18236,7 @@
   <p:timing>
     <p:tnLst>
       <p:par>
-        <p:cTn id="1" dur="indefinite" restart="never" nodeType="tmRoot"/>
-      </p:par>
-    </p:tnLst>
-  </p:timing>
-</p:sld>
-</file>
-
-<file path=ppt/slides/slide9.xml><?xml version="1.0" encoding="utf-8"?>
-<p:sld xmlns:a="http://schemas.openxmlformats.org/drawingml/2006/main" xmlns:r="http://schemas.openxmlformats.org/officeDocument/2006/relationships" xmlns:p="http://schemas.openxmlformats.org/presentationml/2006/main">
-  <p:cSld>
-    <p:spTree>
-      <p:nvGrpSpPr>
-        <p:cNvPr id="1" name=""/>
-        <p:cNvGrpSpPr/>
-        <p:nvPr/>
-      </p:nvGrpSpPr>
-      <p:grpSpPr>
-        <a:xfrm>
-          <a:off x="0" y="0"/>
-          <a:ext cx="0" cy="0"/>
-          <a:chOff x="0" y="0"/>
-          <a:chExt cx="0" cy="0"/>
-        </a:xfrm>
-      </p:grpSpPr>
-      <p:sp>
-        <p:nvSpPr>
-          <p:cNvPr id="25" name="Title 24"/>
-          <p:cNvSpPr>
-            <a:spLocks noGrp="1"/>
-          </p:cNvSpPr>
-          <p:nvPr>
-            <p:ph type="title"/>
-          </p:nvPr>
-        </p:nvSpPr>
-        <p:spPr/>
-        <p:txBody>
-          <a:bodyPr/>
-          <a:lstStyle/>
-          <a:p>
-            <a:r>
-              <a:rPr lang="en-US" dirty="0"/>
-              <a:t>HTML(5) Friendly Markup</a:t>
-            </a:r>
-          </a:p>
-        </p:txBody>
-      </p:sp>
-      <p:sp>
-        <p:nvSpPr>
-          <p:cNvPr id="35" name="Content Placeholder 34"/>
-          <p:cNvSpPr>
-            <a:spLocks noGrp="1"/>
-          </p:cNvSpPr>
-          <p:nvPr>
-            <p:ph sz="quarter" idx="12"/>
-          </p:nvPr>
-        </p:nvSpPr>
-        <p:spPr/>
-        <p:txBody>
-          <a:bodyPr/>
-          <a:lstStyle/>
-          <a:p>
-            <a:r>
-              <a:rPr lang="en-US" dirty="0"/>
-              <a:t>N</a:t>
-            </a:r>
-            <a:r>
-              <a:rPr lang="en-US" dirty="0" smtClean="0"/>
-              <a:t>ew namespaces</a:t>
-            </a:r>
-          </a:p>
-          <a:p>
-            <a:pPr lvl="1"/>
-            <a:r>
-              <a:rPr lang="en-US" dirty="0"/>
-              <a:t>passthrough </a:t>
-            </a:r>
-            <a:r>
-              <a:rPr lang="en-US" dirty="0" smtClean="0"/>
-              <a:t>elements: </a:t>
-            </a:r>
-            <a:r>
-              <a:rPr lang="en-US" dirty="0" smtClean="0">
-                <a:hlinkClick r:id="rId2"/>
-              </a:rPr>
-              <a:t>http</a:t>
-            </a:r>
-            <a:r>
-              <a:rPr lang="en-US" dirty="0">
-                <a:hlinkClick r:id="rId2"/>
-              </a:rPr>
-              <a:t>://</a:t>
-            </a:r>
-            <a:r>
-              <a:rPr lang="en-US" dirty="0" smtClean="0">
-                <a:hlinkClick r:id="rId2"/>
-              </a:rPr>
-              <a:t>xmlns.jcp.org/jsf</a:t>
-            </a:r>
-            <a:r>
-              <a:rPr lang="en-US" dirty="0" smtClean="0"/>
-              <a:t> (TagDecorator)</a:t>
-            </a:r>
-            <a:endParaRPr lang="en-US" dirty="0"/>
-          </a:p>
-          <a:p>
-            <a:pPr lvl="1"/>
-            <a:r>
-              <a:rPr lang="en-US" dirty="0" smtClean="0"/>
-              <a:t>passthrough attributes: </a:t>
-            </a:r>
-            <a:r>
-              <a:rPr lang="en-US" dirty="0" smtClean="0">
-                <a:hlinkClick r:id="rId3"/>
-              </a:rPr>
-              <a:t>http://xmlns.jcp.org/jsf/passthrough</a:t>
-            </a:r>
-            <a:r>
-              <a:rPr lang="en-US" dirty="0" smtClean="0"/>
-              <a:t> (RenderKit)</a:t>
-            </a:r>
-          </a:p>
-          <a:p>
-            <a:pPr marL="403225" lvl="1" indent="0">
-              <a:buNone/>
-            </a:pPr>
-            <a:endParaRPr lang="en-US" dirty="0"/>
-          </a:p>
-          <a:p>
-            <a:r>
-              <a:rPr lang="en-US" dirty="0" smtClean="0"/>
-              <a:t>Advantages</a:t>
-            </a:r>
-          </a:p>
-          <a:p>
-            <a:pPr lvl="1"/>
-            <a:r>
-              <a:rPr lang="en-US" dirty="0" smtClean="0"/>
-              <a:t>Getting control </a:t>
-            </a:r>
-            <a:r>
-              <a:rPr lang="en-US" dirty="0" smtClean="0"/>
-              <a:t>over rendered </a:t>
-            </a:r>
-            <a:r>
-              <a:rPr lang="en-US" dirty="0" smtClean="0"/>
-              <a:t>Facelets</a:t>
-            </a:r>
-            <a:endParaRPr lang="en-US" dirty="0" smtClean="0"/>
-          </a:p>
-          <a:p>
-            <a:pPr lvl="1"/>
-            <a:r>
-              <a:rPr lang="en-US" dirty="0" smtClean="0"/>
-              <a:t>JSF components </a:t>
-            </a:r>
-            <a:r>
-              <a:rPr lang="en-US" dirty="0"/>
-              <a:t>/ JavaScript components / </a:t>
-            </a:r>
-            <a:r>
-              <a:rPr lang="en-US" dirty="0" smtClean="0"/>
-              <a:t>arbitrary </a:t>
-            </a:r>
-            <a:r>
-              <a:rPr lang="en-US" dirty="0"/>
-              <a:t>mixing</a:t>
-            </a:r>
-          </a:p>
-          <a:p>
-            <a:pPr lvl="1"/>
-            <a:r>
-              <a:rPr lang="en-US" dirty="0"/>
-              <a:t>Write and style pure HTML with benefits of </a:t>
-            </a:r>
-            <a:r>
-              <a:rPr lang="en-US" dirty="0" smtClean="0"/>
-              <a:t>JSF</a:t>
-            </a:r>
-            <a:endParaRPr lang="en-US" dirty="0"/>
-          </a:p>
-        </p:txBody>
-      </p:sp>
-      <p:sp>
-        <p:nvSpPr>
-          <p:cNvPr id="36" name="Text Placeholder 35"/>
-          <p:cNvSpPr>
-            <a:spLocks noGrp="1"/>
-          </p:cNvSpPr>
-          <p:nvPr>
-            <p:ph type="body" sz="quarter" idx="13"/>
-          </p:nvPr>
-        </p:nvSpPr>
-        <p:spPr/>
-        <p:txBody>
-          <a:bodyPr/>
-          <a:lstStyle/>
-          <a:p>
-            <a:endParaRPr lang="en-US"/>
-          </a:p>
-        </p:txBody>
-      </p:sp>
-    </p:spTree>
-    <p:extLst>
-      <p:ext uri="{BB962C8B-B14F-4D97-AF65-F5344CB8AC3E}">
-        <p14:creationId xmlns:p14="http://schemas.microsoft.com/office/powerpoint/2010/main" val="1406830298"/>
-      </p:ext>
-    </p:extLst>
-  </p:cSld>
-  <p:clrMapOvr>
-    <a:masterClrMapping/>
-  </p:clrMapOvr>
-  <mc:AlternateContent xmlns:mc="http://schemas.openxmlformats.org/markup-compatibility/2006" xmlns:p14="http://schemas.microsoft.com/office/powerpoint/2010/main">
-    <mc:Choice Requires="p14">
-      <p:transition spd="med" p14:dur="700">
-        <p:fade/>
-      </p:transition>
-    </mc:Choice>
-    <mc:Fallback xmlns="">
-      <p:transition spd="med">
-        <p:fade/>
-      </p:transition>
-    </mc:Fallback>
-  </mc:AlternateContent>
-  <p:timing>
-    <p:tnLst>
-      <p:par>
-        <p:cTn id="1" dur="indefinite" restart="never" nodeType="tmRoot"/>
+        <p:cTn xmlns:p14="http://schemas.microsoft.com/office/powerpoint/2010/main" id="1" dur="indefinite" restart="never" nodeType="tmRoot"/>
       </p:par>
     </p:tnLst>
   </p:timing>

</xml_diff>

<commit_message>
adding comments on slides
</commit_message>
<xml_diff>
--- a/con3638.pptx
+++ b/con3638.pptx
@@ -236,7 +236,7 @@
           <a:p>
             <a:fld id="{E99333BE-0D34-4F62-BD6E-2C3B14663373}" type="datetimeFigureOut">
               <a:rPr lang="en-US" smtClean="0"/>
-              <a:t>9/10/2013</a:t>
+              <a:t>9/10/13</a:t>
             </a:fld>
             <a:endParaRPr lang="en-US"/>
           </a:p>
@@ -402,7 +402,7 @@
           <a:p>
             <a:fld id="{4A2D1F94-724F-43BD-B41B-43157E9B4550}" type="datetimeFigureOut">
               <a:rPr lang="en-US" smtClean="0"/>
-              <a:t>9/10/2013</a:t>
+              <a:t>9/10/13</a:t>
             </a:fld>
             <a:endParaRPr lang="en-US"/>
           </a:p>
@@ -851,6 +851,196 @@
 </p:notes>
 </file>
 
+<file path=ppt/notesSlides/notesSlide3.xml><?xml version="1.0" encoding="utf-8"?>
+<p:notes xmlns:a="http://schemas.openxmlformats.org/drawingml/2006/main" xmlns:r="http://schemas.openxmlformats.org/officeDocument/2006/relationships" xmlns:p="http://schemas.openxmlformats.org/presentationml/2006/main">
+  <p:cSld>
+    <p:spTree>
+      <p:nvGrpSpPr>
+        <p:cNvPr id="1" name=""/>
+        <p:cNvGrpSpPr/>
+        <p:nvPr/>
+      </p:nvGrpSpPr>
+      <p:grpSpPr>
+        <a:xfrm>
+          <a:off x="0" y="0"/>
+          <a:ext cx="0" cy="0"/>
+          <a:chOff x="0" y="0"/>
+          <a:chExt cx="0" cy="0"/>
+        </a:xfrm>
+      </p:grpSpPr>
+      <p:sp>
+        <p:nvSpPr>
+          <p:cNvPr id="2" name="Slide Image Placeholder 1"/>
+          <p:cNvSpPr>
+            <a:spLocks noGrp="1" noRot="1" noChangeAspect="1"/>
+          </p:cNvSpPr>
+          <p:nvPr>
+            <p:ph type="sldImg"/>
+          </p:nvPr>
+        </p:nvSpPr>
+        <p:spPr/>
+      </p:sp>
+      <p:sp>
+        <p:nvSpPr>
+          <p:cNvPr id="3" name="Notes Placeholder 2"/>
+          <p:cNvSpPr>
+            <a:spLocks noGrp="1"/>
+          </p:cNvSpPr>
+          <p:nvPr>
+            <p:ph type="body" idx="1"/>
+          </p:nvPr>
+        </p:nvSpPr>
+        <p:spPr/>
+        <p:txBody>
+          <a:bodyPr/>
+          <a:lstStyle/>
+          <a:p>
+            <a:r>
+              <a:rPr lang="en-US" dirty="0" smtClean="0"/>
+              <a:t>PrimeFaces bundles</a:t>
+            </a:r>
+            <a:r>
+              <a:rPr lang="en-US" baseline="0" dirty="0" smtClean="0"/>
+              <a:t> over 100 JSF components that provide a rich UI experience with </a:t>
+            </a:r>
+            <a:r>
+              <a:rPr lang="en-US" baseline="0" dirty="0" err="1" smtClean="0"/>
+              <a:t>ajaxified</a:t>
+            </a:r>
+            <a:r>
+              <a:rPr lang="en-US" baseline="0" dirty="0" smtClean="0"/>
+              <a:t> architecture. It employs the JSF 2.0 standardized AJAX APIs on the server side and for the client side it uses </a:t>
+            </a:r>
+            <a:r>
+              <a:rPr lang="en-US" baseline="0" dirty="0" err="1" smtClean="0"/>
+              <a:t>jQuery</a:t>
+            </a:r>
+            <a:r>
+              <a:rPr lang="en-US" baseline="0" dirty="0" smtClean="0"/>
+              <a:t> for its </a:t>
+            </a:r>
+            <a:r>
+              <a:rPr lang="en-US" baseline="0" dirty="0" err="1" smtClean="0"/>
+              <a:t>javascript</a:t>
+            </a:r>
+            <a:r>
+              <a:rPr lang="en-US" baseline="0" dirty="0" smtClean="0"/>
+              <a:t> architecture. </a:t>
+            </a:r>
+          </a:p>
+          <a:p>
+            <a:r>
+              <a:rPr lang="en-US" baseline="0" dirty="0" smtClean="0"/>
+              <a:t>You can find nearly all the components that you might need to develop a web application, from a complex </a:t>
+            </a:r>
+            <a:r>
+              <a:rPr lang="en-US" baseline="0" dirty="0" err="1" smtClean="0"/>
+              <a:t>datatable</a:t>
+            </a:r>
+            <a:r>
+              <a:rPr lang="en-US" baseline="0" dirty="0" smtClean="0"/>
+              <a:t> to autocomplete, </a:t>
+            </a:r>
+            <a:r>
+              <a:rPr lang="en-US" baseline="0" dirty="0" err="1" smtClean="0"/>
+              <a:t>picklist</a:t>
+            </a:r>
+            <a:r>
+              <a:rPr lang="en-US" baseline="0" dirty="0" smtClean="0"/>
+              <a:t> and many others. The themes for all the components are managed in a centralized way with the help of the theme roller so structural and skinning CSS can be easily applied across the components. And With 4.0 release, codenamed sentinel, we are bringing some awesome features to the community like built-in client side validation infrastructure, which is compatible with the server side implementation, that exactly does what JSF do on the server side. The validation metadata is being held in HTML5 attributes. We are doing partial processing on the client side with </a:t>
+            </a:r>
+            <a:r>
+              <a:rPr lang="en-US" baseline="0" dirty="0" err="1" smtClean="0"/>
+              <a:t>javascript</a:t>
+            </a:r>
+            <a:r>
+              <a:rPr lang="en-US" baseline="0" dirty="0" smtClean="0"/>
+              <a:t> like JSF does on partial processing on the Ajax calls. We provide i18n for the validation messages. We provide the infrastructure to implement a custom client side validation mechanism. We also provide infrastructure to enable the client side validation on custom </a:t>
+            </a:r>
+            <a:r>
+              <a:rPr lang="en-US" baseline="0" dirty="0" err="1" smtClean="0"/>
+              <a:t>javascript</a:t>
+            </a:r>
+            <a:r>
+              <a:rPr lang="en-US" baseline="0" dirty="0" smtClean="0"/>
+              <a:t> events like </a:t>
+            </a:r>
+            <a:r>
+              <a:rPr lang="en-US" baseline="0" dirty="0" err="1" smtClean="0"/>
+              <a:t>keyup</a:t>
+            </a:r>
+            <a:r>
+              <a:rPr lang="en-US" baseline="0" dirty="0" smtClean="0"/>
+              <a:t>, blur and etc. All this can be enabled with a context parameter and I’ll show that in the demo. One of the coolest side to mention about is this validation mechanism also supports bean validation specification out of the box. So as you annotate your domain model with annotations like @Min @Max or @</a:t>
+            </a:r>
+            <a:r>
+              <a:rPr lang="en-US" baseline="0" dirty="0" err="1" smtClean="0"/>
+              <a:t>NotNull</a:t>
+            </a:r>
+            <a:r>
+              <a:rPr lang="en-US" baseline="0" dirty="0" smtClean="0"/>
+              <a:t> you will get the validation mechanism working on the client side instantly. The other feature that we’re bringing to the community with 4.0 is the Dialog Framework which enables to open an external </a:t>
+            </a:r>
+            <a:r>
+              <a:rPr lang="en-US" baseline="0" dirty="0" err="1" smtClean="0"/>
+              <a:t>xhtml</a:t>
+            </a:r>
+            <a:r>
+              <a:rPr lang="en-US" baseline="0" dirty="0" smtClean="0"/>
+              <a:t> page that gets generated dynamically at runtime. The same could be done via </a:t>
+            </a:r>
+            <a:r>
+              <a:rPr lang="en-US" baseline="0" dirty="0" err="1" smtClean="0"/>
+              <a:t>p:dialog</a:t>
+            </a:r>
+            <a:r>
+              <a:rPr lang="en-US" baseline="0" dirty="0" smtClean="0"/>
+              <a:t> component also but within dialog framework the pages gets created and destroyed programmatically at runtime. I’ll show a sample and ways to enable the dialog framework infrastructure with configuration. With PrimeFaces 4.0 we also provided drag drop ability between tree components which is a very cool feature in my opinion. Of course implementing this was not that easy. We also bundled many other cool features like deferred loading, sticky headers, new search expressions, the new file upload scrollable tabs </a:t>
+            </a:r>
+            <a:r>
+              <a:rPr lang="en-US" baseline="0" smtClean="0"/>
+              <a:t>and etc.</a:t>
+            </a:r>
+            <a:endParaRPr lang="en-US" dirty="0"/>
+          </a:p>
+        </p:txBody>
+      </p:sp>
+      <p:sp>
+        <p:nvSpPr>
+          <p:cNvPr id="4" name="Slide Number Placeholder 3"/>
+          <p:cNvSpPr>
+            <a:spLocks noGrp="1"/>
+          </p:cNvSpPr>
+          <p:nvPr>
+            <p:ph type="sldNum" sz="quarter" idx="10"/>
+          </p:nvPr>
+        </p:nvSpPr>
+        <p:spPr/>
+        <p:txBody>
+          <a:bodyPr/>
+          <a:lstStyle/>
+          <a:p>
+            <a:fld id="{36E82501-53DA-4152-84B0-51135B15EEA8}" type="slidenum">
+              <a:rPr lang="en-US" smtClean="0"/>
+              <a:t>19</a:t>
+            </a:fld>
+            <a:endParaRPr lang="en-US"/>
+          </a:p>
+        </p:txBody>
+      </p:sp>
+    </p:spTree>
+    <p:extLst>
+      <p:ext uri="{BB962C8B-B14F-4D97-AF65-F5344CB8AC3E}">
+        <p14:creationId xmlns:p14="http://schemas.microsoft.com/office/powerpoint/2010/main" val="2873911702"/>
+      </p:ext>
+    </p:extLst>
+  </p:cSld>
+  <p:clrMapOvr>
+    <a:masterClrMapping/>
+  </p:clrMapOvr>
+</p:notes>
+</file>
+
 <file path=ppt/slideLayouts/slideLayout1.xml><?xml version="1.0" encoding="utf-8"?>
 <p:sldLayout xmlns:a="http://schemas.openxmlformats.org/drawingml/2006/main" xmlns:r="http://schemas.openxmlformats.org/officeDocument/2006/relationships" xmlns:p="http://schemas.openxmlformats.org/presentationml/2006/main" preserve="1" userDrawn="1">
   <p:cSld name="New Template_Content 2 Line Title">
@@ -1033,7 +1223,7 @@
   <p:timing>
     <p:tnLst>
       <p:par>
-        <p:cTn id="1" dur="indefinite" restart="never" nodeType="tmRoot"/>
+        <p:cTn xmlns:p14="http://schemas.microsoft.com/office/powerpoint/2010/main" id="1" dur="indefinite" restart="never" nodeType="tmRoot"/>
       </p:par>
     </p:tnLst>
   </p:timing>
@@ -1345,7 +1535,7 @@
   <p:timing>
     <p:tnLst>
       <p:par>
-        <p:cTn id="1" dur="indefinite" restart="never" nodeType="tmRoot"/>
+        <p:cTn xmlns:p14="http://schemas.microsoft.com/office/powerpoint/2010/main" id="1" dur="indefinite" restart="never" nodeType="tmRoot"/>
       </p:par>
     </p:tnLst>
   </p:timing>
@@ -1644,7 +1834,7 @@
   <p:timing>
     <p:tnLst>
       <p:par>
-        <p:cTn id="1" dur="indefinite" restart="never" nodeType="tmRoot"/>
+        <p:cTn xmlns:p14="http://schemas.microsoft.com/office/powerpoint/2010/main" id="1" dur="indefinite" restart="never" nodeType="tmRoot"/>
       </p:par>
     </p:tnLst>
   </p:timing>
@@ -1870,7 +2060,7 @@
   <p:timing>
     <p:tnLst>
       <p:par>
-        <p:cTn id="1" dur="indefinite" restart="never" nodeType="tmRoot"/>
+        <p:cTn xmlns:p14="http://schemas.microsoft.com/office/powerpoint/2010/main" id="1" dur="indefinite" restart="never" nodeType="tmRoot"/>
       </p:par>
     </p:tnLst>
   </p:timing>
@@ -1928,14 +2118,14 @@
             <a:noFill/>
           </a:ln>
           <a:extLst>
-            <a:ext uri="{909E8E84-426E-40DD-AFC4-6F175D3DCCD1}">
+            <a:ext uri="{909E8E84-426E-40dd-AFC4-6F175D3DCCD1}">
               <a14:hiddenFill xmlns:a14="http://schemas.microsoft.com/office/drawing/2010/main">
                 <a:solidFill>
                   <a:srgbClr val="FFFFFF"/>
                 </a:solidFill>
               </a14:hiddenFill>
             </a:ext>
-            <a:ext uri="{91240B29-F687-4F45-9708-019B960494DF}">
+            <a:ext uri="{91240B29-F687-4f45-9708-019B960494DF}">
               <a14:hiddenLine xmlns:a14="http://schemas.microsoft.com/office/drawing/2010/main" w="9525">
                 <a:solidFill>
                   <a:srgbClr val="000000"/>
@@ -2003,7 +2193,7 @@
   <p:timing>
     <p:tnLst>
       <p:par>
-        <p:cTn id="1" dur="indefinite" restart="never" nodeType="tmRoot"/>
+        <p:cTn xmlns:p14="http://schemas.microsoft.com/office/powerpoint/2010/main" id="1" dur="indefinite" restart="never" nodeType="tmRoot"/>
       </p:par>
     </p:tnLst>
   </p:timing>
@@ -2061,14 +2251,14 @@
             <a:noFill/>
           </a:ln>
           <a:extLst>
-            <a:ext uri="{909E8E84-426E-40DD-AFC4-6F175D3DCCD1}">
+            <a:ext uri="{909E8E84-426E-40dd-AFC4-6F175D3DCCD1}">
               <a14:hiddenFill xmlns:a14="http://schemas.microsoft.com/office/drawing/2010/main">
                 <a:solidFill>
                   <a:srgbClr val="FFFFFF"/>
                 </a:solidFill>
               </a14:hiddenFill>
             </a:ext>
-            <a:ext uri="{91240B29-F687-4F45-9708-019B960494DF}">
+            <a:ext uri="{91240B29-F687-4f45-9708-019B960494DF}">
               <a14:hiddenLine xmlns:a14="http://schemas.microsoft.com/office/drawing/2010/main" w="9525">
                 <a:solidFill>
                   <a:srgbClr val="000000"/>
@@ -2115,14 +2305,14 @@
             <a:noFill/>
           </a:ln>
           <a:extLst>
-            <a:ext uri="{909E8E84-426E-40DD-AFC4-6F175D3DCCD1}">
+            <a:ext uri="{909E8E84-426E-40dd-AFC4-6F175D3DCCD1}">
               <a14:hiddenFill xmlns:a14="http://schemas.microsoft.com/office/drawing/2010/main">
                 <a:solidFill>
                   <a:srgbClr val="FFFFFF"/>
                 </a:solidFill>
               </a14:hiddenFill>
             </a:ext>
-            <a:ext uri="{91240B29-F687-4F45-9708-019B960494DF}">
+            <a:ext uri="{91240B29-F687-4f45-9708-019B960494DF}">
               <a14:hiddenLine xmlns:a14="http://schemas.microsoft.com/office/drawing/2010/main" w="9525">
                 <a:solidFill>
                   <a:srgbClr val="000000"/>
@@ -2206,7 +2396,7 @@
   <p:timing>
     <p:tnLst>
       <p:par>
-        <p:cTn id="1" dur="indefinite" restart="never" nodeType="tmRoot"/>
+        <p:cTn xmlns:p14="http://schemas.microsoft.com/office/powerpoint/2010/main" id="1" dur="indefinite" restart="never" nodeType="tmRoot"/>
       </p:par>
     </p:tnLst>
   </p:timing>
@@ -2264,14 +2454,14 @@
             <a:noFill/>
           </a:ln>
           <a:extLst>
-            <a:ext uri="{909E8E84-426E-40DD-AFC4-6F175D3DCCD1}">
+            <a:ext uri="{909E8E84-426E-40dd-AFC4-6F175D3DCCD1}">
               <a14:hiddenFill xmlns:a14="http://schemas.microsoft.com/office/drawing/2010/main">
                 <a:solidFill>
                   <a:srgbClr val="FFFFFF"/>
                 </a:solidFill>
               </a14:hiddenFill>
             </a:ext>
-            <a:ext uri="{91240B29-F687-4F45-9708-019B960494DF}">
+            <a:ext uri="{91240B29-F687-4f45-9708-019B960494DF}">
               <a14:hiddenLine xmlns:a14="http://schemas.microsoft.com/office/drawing/2010/main" w="9525">
                 <a:solidFill>
                   <a:srgbClr val="000000"/>
@@ -2318,14 +2508,14 @@
             <a:noFill/>
           </a:ln>
           <a:extLst>
-            <a:ext uri="{909E8E84-426E-40DD-AFC4-6F175D3DCCD1}">
+            <a:ext uri="{909E8E84-426E-40dd-AFC4-6F175D3DCCD1}">
               <a14:hiddenFill xmlns:a14="http://schemas.microsoft.com/office/drawing/2010/main">
                 <a:solidFill>
                   <a:srgbClr val="FFFFFF"/>
                 </a:solidFill>
               </a14:hiddenFill>
             </a:ext>
-            <a:ext uri="{91240B29-F687-4F45-9708-019B960494DF}">
+            <a:ext uri="{91240B29-F687-4f45-9708-019B960494DF}">
               <a14:hiddenLine xmlns:a14="http://schemas.microsoft.com/office/drawing/2010/main" w="9525">
                 <a:solidFill>
                   <a:srgbClr val="000000"/>
@@ -2473,7 +2663,7 @@
   <p:timing>
     <p:tnLst>
       <p:par>
-        <p:cTn id="1" dur="indefinite" restart="never" nodeType="tmRoot"/>
+        <p:cTn xmlns:p14="http://schemas.microsoft.com/office/powerpoint/2010/main" id="1" dur="indefinite" restart="never" nodeType="tmRoot"/>
       </p:par>
     </p:tnLst>
   </p:timing>
@@ -2531,14 +2721,14 @@
             <a:noFill/>
           </a:ln>
           <a:extLst>
-            <a:ext uri="{909E8E84-426E-40DD-AFC4-6F175D3DCCD1}">
+            <a:ext uri="{909E8E84-426E-40dd-AFC4-6F175D3DCCD1}">
               <a14:hiddenFill xmlns:a14="http://schemas.microsoft.com/office/drawing/2010/main">
                 <a:solidFill>
                   <a:srgbClr val="FFFFFF"/>
                 </a:solidFill>
               </a14:hiddenFill>
             </a:ext>
-            <a:ext uri="{91240B29-F687-4F45-9708-019B960494DF}">
+            <a:ext uri="{91240B29-F687-4f45-9708-019B960494DF}">
               <a14:hiddenLine xmlns:a14="http://schemas.microsoft.com/office/drawing/2010/main" w="9525">
                 <a:solidFill>
                   <a:srgbClr val="000000"/>
@@ -2585,14 +2775,14 @@
             <a:noFill/>
           </a:ln>
           <a:extLst>
-            <a:ext uri="{909E8E84-426E-40DD-AFC4-6F175D3DCCD1}">
+            <a:ext uri="{909E8E84-426E-40dd-AFC4-6F175D3DCCD1}">
               <a14:hiddenFill xmlns:a14="http://schemas.microsoft.com/office/drawing/2010/main">
                 <a:solidFill>
                   <a:srgbClr val="FFFFFF"/>
                 </a:solidFill>
               </a14:hiddenFill>
             </a:ext>
-            <a:ext uri="{91240B29-F687-4F45-9708-019B960494DF}">
+            <a:ext uri="{91240B29-F687-4f45-9708-019B960494DF}">
               <a14:hiddenLine xmlns:a14="http://schemas.microsoft.com/office/drawing/2010/main" w="9525">
                 <a:solidFill>
                   <a:srgbClr val="000000"/>
@@ -2803,7 +2993,7 @@
   <p:timing>
     <p:tnLst>
       <p:par>
-        <p:cTn id="1" dur="indefinite" restart="never" nodeType="tmRoot"/>
+        <p:cTn xmlns:p14="http://schemas.microsoft.com/office/powerpoint/2010/main" id="1" dur="indefinite" restart="never" nodeType="tmRoot"/>
       </p:par>
     </p:tnLst>
   </p:timing>
@@ -2992,7 +3182,7 @@
   <p:timing>
     <p:tnLst>
       <p:par>
-        <p:cTn id="1" dur="indefinite" restart="never" nodeType="tmRoot"/>
+        <p:cTn xmlns:p14="http://schemas.microsoft.com/office/powerpoint/2010/main" id="1" dur="indefinite" restart="never" nodeType="tmRoot"/>
       </p:par>
     </p:tnLst>
   </p:timing>
@@ -3184,7 +3374,7 @@
   <p:timing>
     <p:tnLst>
       <p:par>
-        <p:cTn id="1" dur="indefinite" restart="never" nodeType="tmRoot"/>
+        <p:cTn xmlns:p14="http://schemas.microsoft.com/office/powerpoint/2010/main" id="1" dur="indefinite" restart="never" nodeType="tmRoot"/>
       </p:par>
     </p:tnLst>
   </p:timing>
@@ -3591,7 +3781,7 @@
   <p:timing>
     <p:tnLst>
       <p:par>
-        <p:cTn id="1" dur="indefinite" restart="never" nodeType="tmRoot">
+        <p:cTn xmlns:p14="http://schemas.microsoft.com/office/powerpoint/2010/main" id="1" dur="indefinite" restart="never" nodeType="tmRoot">
           <p:childTnLst>
             <p:seq concurrent="1" nextAc="seek">
               <p:cTn id="2" dur="indefinite" nodeType="mainSeq">
@@ -3723,7 +3913,7 @@
           <p:tmpl lvl="1">
             <p:tnLst>
               <p:par>
-                <p:cTn presetID="10" presetClass="entr" presetSubtype="0" fill="hold" nodeType="withEffect">
+                <p:cTn xmlns:p14="http://schemas.microsoft.com/office/powerpoint/2010/main" presetID="10" presetClass="entr" presetSubtype="0" fill="hold" nodeType="withEffect">
                   <p:stCondLst>
                     <p:cond delay="1000"/>
                   </p:stCondLst>
@@ -3951,7 +4141,7 @@
   <p:timing>
     <p:tnLst>
       <p:par>
-        <p:cTn id="1" dur="indefinite" restart="never" nodeType="tmRoot"/>
+        <p:cTn xmlns:p14="http://schemas.microsoft.com/office/powerpoint/2010/main" id="1" dur="indefinite" restart="never" nodeType="tmRoot"/>
       </p:par>
     </p:tnLst>
   </p:timing>
@@ -4309,7 +4499,7 @@
   <p:timing>
     <p:tnLst>
       <p:par>
-        <p:cTn id="1" dur="indefinite" restart="never" nodeType="tmRoot">
+        <p:cTn xmlns:p14="http://schemas.microsoft.com/office/powerpoint/2010/main" id="1" dur="indefinite" restart="never" nodeType="tmRoot">
           <p:childTnLst>
             <p:seq concurrent="1" nextAc="seek">
               <p:cTn id="2" dur="indefinite" nodeType="mainSeq">
@@ -4441,7 +4631,7 @@
           <p:tmpl lvl="1">
             <p:tnLst>
               <p:par>
-                <p:cTn presetID="10" presetClass="entr" presetSubtype="0" fill="hold" nodeType="withEffect">
+                <p:cTn xmlns:p14="http://schemas.microsoft.com/office/powerpoint/2010/main" presetID="10" presetClass="entr" presetSubtype="0" fill="hold" nodeType="withEffect">
                   <p:stCondLst>
                     <p:cond delay="1000"/>
                   </p:stCondLst>
@@ -4692,7 +4882,7 @@
   <p:timing>
     <p:tnLst>
       <p:par>
-        <p:cTn id="1" dur="indefinite" restart="never" nodeType="tmRoot"/>
+        <p:cTn xmlns:p14="http://schemas.microsoft.com/office/powerpoint/2010/main" id="1" dur="indefinite" restart="never" nodeType="tmRoot"/>
       </p:par>
     </p:tnLst>
   </p:timing>
@@ -4933,7 +5123,7 @@
   <p:timing>
     <p:tnLst>
       <p:par>
-        <p:cTn id="1" dur="indefinite" restart="never" nodeType="tmRoot"/>
+        <p:cTn xmlns:p14="http://schemas.microsoft.com/office/powerpoint/2010/main" id="1" dur="indefinite" restart="never" nodeType="tmRoot"/>
       </p:par>
     </p:tnLst>
   </p:timing>
@@ -5142,7 +5332,7 @@
   <p:timing>
     <p:tnLst>
       <p:par>
-        <p:cTn id="1" dur="indefinite" restart="never" nodeType="tmRoot"/>
+        <p:cTn xmlns:p14="http://schemas.microsoft.com/office/powerpoint/2010/main" id="1" dur="indefinite" restart="never" nodeType="tmRoot"/>
       </p:par>
     </p:tnLst>
   </p:timing>
@@ -5389,7 +5579,7 @@
   <p:timing>
     <p:tnLst>
       <p:par>
-        <p:cTn id="1" dur="indefinite" restart="never" nodeType="tmRoot"/>
+        <p:cTn xmlns:p14="http://schemas.microsoft.com/office/powerpoint/2010/main" id="1" dur="indefinite" restart="never" nodeType="tmRoot"/>
       </p:par>
     </p:tnLst>
   </p:timing>
@@ -5619,7 +5809,7 @@
   <p:timing>
     <p:tnLst>
       <p:par>
-        <p:cTn id="1" dur="indefinite" restart="never" nodeType="tmRoot"/>
+        <p:cTn xmlns:p14="http://schemas.microsoft.com/office/powerpoint/2010/main" id="1" dur="indefinite" restart="never" nodeType="tmRoot"/>
       </p:par>
     </p:tnLst>
   </p:timing>
@@ -5931,7 +6121,7 @@
   <p:timing>
     <p:tnLst>
       <p:par>
-        <p:cTn id="1" dur="indefinite" restart="never" nodeType="tmRoot"/>
+        <p:cTn xmlns:p14="http://schemas.microsoft.com/office/powerpoint/2010/main" id="1" dur="indefinite" restart="never" nodeType="tmRoot"/>
       </p:par>
     </p:tnLst>
   </p:timing>
@@ -6230,7 +6420,7 @@
   <p:timing>
     <p:tnLst>
       <p:par>
-        <p:cTn id="1" dur="indefinite" restart="never" nodeType="tmRoot"/>
+        <p:cTn xmlns:p14="http://schemas.microsoft.com/office/powerpoint/2010/main" id="1" dur="indefinite" restart="never" nodeType="tmRoot"/>
       </p:par>
     </p:tnLst>
   </p:timing>
@@ -6456,7 +6646,7 @@
   <p:timing>
     <p:tnLst>
       <p:par>
-        <p:cTn id="1" dur="indefinite" restart="never" nodeType="tmRoot"/>
+        <p:cTn xmlns:p14="http://schemas.microsoft.com/office/powerpoint/2010/main" id="1" dur="indefinite" restart="never" nodeType="tmRoot"/>
       </p:par>
     </p:tnLst>
   </p:timing>
@@ -6514,14 +6704,14 @@
             <a:noFill/>
           </a:ln>
           <a:extLst>
-            <a:ext uri="{909E8E84-426E-40DD-AFC4-6F175D3DCCD1}">
+            <a:ext uri="{909E8E84-426E-40dd-AFC4-6F175D3DCCD1}">
               <a14:hiddenFill xmlns:a14="http://schemas.microsoft.com/office/drawing/2010/main">
                 <a:solidFill>
                   <a:srgbClr val="FFFFFF"/>
                 </a:solidFill>
               </a14:hiddenFill>
             </a:ext>
-            <a:ext uri="{91240B29-F687-4F45-9708-019B960494DF}">
+            <a:ext uri="{91240B29-F687-4f45-9708-019B960494DF}">
               <a14:hiddenLine xmlns:a14="http://schemas.microsoft.com/office/drawing/2010/main" w="9525">
                 <a:solidFill>
                   <a:srgbClr val="000000"/>
@@ -6589,7 +6779,7 @@
   <p:timing>
     <p:tnLst>
       <p:par>
-        <p:cTn id="1" dur="indefinite" restart="never" nodeType="tmRoot"/>
+        <p:cTn xmlns:p14="http://schemas.microsoft.com/office/powerpoint/2010/main" id="1" dur="indefinite" restart="never" nodeType="tmRoot"/>
       </p:par>
     </p:tnLst>
   </p:timing>
@@ -6996,7 +7186,7 @@
   <p:timing>
     <p:tnLst>
       <p:par>
-        <p:cTn id="1" dur="indefinite" restart="never" nodeType="tmRoot">
+        <p:cTn xmlns:p14="http://schemas.microsoft.com/office/powerpoint/2010/main" id="1" dur="indefinite" restart="never" nodeType="tmRoot">
           <p:childTnLst>
             <p:seq concurrent="1" nextAc="seek">
               <p:cTn id="2" dur="indefinite" nodeType="mainSeq">
@@ -7128,7 +7318,7 @@
           <p:tmpl lvl="1">
             <p:tnLst>
               <p:par>
-                <p:cTn presetID="10" presetClass="entr" presetSubtype="0" fill="hold" nodeType="withEffect">
+                <p:cTn xmlns:p14="http://schemas.microsoft.com/office/powerpoint/2010/main" presetID="10" presetClass="entr" presetSubtype="0" fill="hold" nodeType="withEffect">
                   <p:stCondLst>
                     <p:cond delay="1000"/>
                   </p:stCondLst>
@@ -7222,14 +7412,14 @@
             <a:noFill/>
           </a:ln>
           <a:extLst>
-            <a:ext uri="{909E8E84-426E-40DD-AFC4-6F175D3DCCD1}">
+            <a:ext uri="{909E8E84-426E-40dd-AFC4-6F175D3DCCD1}">
               <a14:hiddenFill xmlns:a14="http://schemas.microsoft.com/office/drawing/2010/main">
                 <a:solidFill>
                   <a:srgbClr val="FFFFFF"/>
                 </a:solidFill>
               </a14:hiddenFill>
             </a:ext>
-            <a:ext uri="{91240B29-F687-4F45-9708-019B960494DF}">
+            <a:ext uri="{91240B29-F687-4f45-9708-019B960494DF}">
               <a14:hiddenLine xmlns:a14="http://schemas.microsoft.com/office/drawing/2010/main" w="9525">
                 <a:solidFill>
                   <a:srgbClr val="000000"/>
@@ -7276,14 +7466,14 @@
             <a:noFill/>
           </a:ln>
           <a:extLst>
-            <a:ext uri="{909E8E84-426E-40DD-AFC4-6F175D3DCCD1}">
+            <a:ext uri="{909E8E84-426E-40dd-AFC4-6F175D3DCCD1}">
               <a14:hiddenFill xmlns:a14="http://schemas.microsoft.com/office/drawing/2010/main">
                 <a:solidFill>
                   <a:srgbClr val="FFFFFF"/>
                 </a:solidFill>
               </a14:hiddenFill>
             </a:ext>
-            <a:ext uri="{91240B29-F687-4F45-9708-019B960494DF}">
+            <a:ext uri="{91240B29-F687-4f45-9708-019B960494DF}">
               <a14:hiddenLine xmlns:a14="http://schemas.microsoft.com/office/drawing/2010/main" w="9525">
                 <a:solidFill>
                   <a:srgbClr val="000000"/>
@@ -7367,7 +7557,7 @@
   <p:timing>
     <p:tnLst>
       <p:par>
-        <p:cTn id="1" dur="indefinite" restart="never" nodeType="tmRoot"/>
+        <p:cTn xmlns:p14="http://schemas.microsoft.com/office/powerpoint/2010/main" id="1" dur="indefinite" restart="never" nodeType="tmRoot"/>
       </p:par>
     </p:tnLst>
   </p:timing>
@@ -7425,14 +7615,14 @@
             <a:noFill/>
           </a:ln>
           <a:extLst>
-            <a:ext uri="{909E8E84-426E-40DD-AFC4-6F175D3DCCD1}">
+            <a:ext uri="{909E8E84-426E-40dd-AFC4-6F175D3DCCD1}">
               <a14:hiddenFill xmlns:a14="http://schemas.microsoft.com/office/drawing/2010/main">
                 <a:solidFill>
                   <a:srgbClr val="FFFFFF"/>
                 </a:solidFill>
               </a14:hiddenFill>
             </a:ext>
-            <a:ext uri="{91240B29-F687-4F45-9708-019B960494DF}">
+            <a:ext uri="{91240B29-F687-4f45-9708-019B960494DF}">
               <a14:hiddenLine xmlns:a14="http://schemas.microsoft.com/office/drawing/2010/main" w="9525">
                 <a:solidFill>
                   <a:srgbClr val="000000"/>
@@ -7479,14 +7669,14 @@
             <a:noFill/>
           </a:ln>
           <a:extLst>
-            <a:ext uri="{909E8E84-426E-40DD-AFC4-6F175D3DCCD1}">
+            <a:ext uri="{909E8E84-426E-40dd-AFC4-6F175D3DCCD1}">
               <a14:hiddenFill xmlns:a14="http://schemas.microsoft.com/office/drawing/2010/main">
                 <a:solidFill>
                   <a:srgbClr val="FFFFFF"/>
                 </a:solidFill>
               </a14:hiddenFill>
             </a:ext>
-            <a:ext uri="{91240B29-F687-4F45-9708-019B960494DF}">
+            <a:ext uri="{91240B29-F687-4f45-9708-019B960494DF}">
               <a14:hiddenLine xmlns:a14="http://schemas.microsoft.com/office/drawing/2010/main" w="9525">
                 <a:solidFill>
                   <a:srgbClr val="000000"/>
@@ -7634,7 +7824,7 @@
   <p:timing>
     <p:tnLst>
       <p:par>
-        <p:cTn id="1" dur="indefinite" restart="never" nodeType="tmRoot"/>
+        <p:cTn xmlns:p14="http://schemas.microsoft.com/office/powerpoint/2010/main" id="1" dur="indefinite" restart="never" nodeType="tmRoot"/>
       </p:par>
     </p:tnLst>
   </p:timing>
@@ -7692,14 +7882,14 @@
             <a:noFill/>
           </a:ln>
           <a:extLst>
-            <a:ext uri="{909E8E84-426E-40DD-AFC4-6F175D3DCCD1}">
+            <a:ext uri="{909E8E84-426E-40dd-AFC4-6F175D3DCCD1}">
               <a14:hiddenFill xmlns:a14="http://schemas.microsoft.com/office/drawing/2010/main">
                 <a:solidFill>
                   <a:srgbClr val="FFFFFF"/>
                 </a:solidFill>
               </a14:hiddenFill>
             </a:ext>
-            <a:ext uri="{91240B29-F687-4F45-9708-019B960494DF}">
+            <a:ext uri="{91240B29-F687-4f45-9708-019B960494DF}">
               <a14:hiddenLine xmlns:a14="http://schemas.microsoft.com/office/drawing/2010/main" w="9525">
                 <a:solidFill>
                   <a:srgbClr val="000000"/>
@@ -7746,14 +7936,14 @@
             <a:noFill/>
           </a:ln>
           <a:extLst>
-            <a:ext uri="{909E8E84-426E-40DD-AFC4-6F175D3DCCD1}">
+            <a:ext uri="{909E8E84-426E-40dd-AFC4-6F175D3DCCD1}">
               <a14:hiddenFill xmlns:a14="http://schemas.microsoft.com/office/drawing/2010/main">
                 <a:solidFill>
                   <a:srgbClr val="FFFFFF"/>
                 </a:solidFill>
               </a14:hiddenFill>
             </a:ext>
-            <a:ext uri="{91240B29-F687-4F45-9708-019B960494DF}">
+            <a:ext uri="{91240B29-F687-4f45-9708-019B960494DF}">
               <a14:hiddenLine xmlns:a14="http://schemas.microsoft.com/office/drawing/2010/main" w="9525">
                 <a:solidFill>
                   <a:srgbClr val="000000"/>
@@ -7964,7 +8154,7 @@
   <p:timing>
     <p:tnLst>
       <p:par>
-        <p:cTn id="1" dur="indefinite" restart="never" nodeType="tmRoot"/>
+        <p:cTn xmlns:p14="http://schemas.microsoft.com/office/powerpoint/2010/main" id="1" dur="indefinite" restart="never" nodeType="tmRoot"/>
       </p:par>
     </p:tnLst>
   </p:timing>
@@ -8322,7 +8512,7 @@
   <p:timing>
     <p:tnLst>
       <p:par>
-        <p:cTn id="1" dur="indefinite" restart="never" nodeType="tmRoot">
+        <p:cTn xmlns:p14="http://schemas.microsoft.com/office/powerpoint/2010/main" id="1" dur="indefinite" restart="never" nodeType="tmRoot">
           <p:childTnLst>
             <p:seq concurrent="1" nextAc="seek">
               <p:cTn id="2" dur="indefinite" nodeType="mainSeq">
@@ -8454,7 +8644,7 @@
           <p:tmpl lvl="1">
             <p:tnLst>
               <p:par>
-                <p:cTn presetID="10" presetClass="entr" presetSubtype="0" fill="hold" nodeType="withEffect">
+                <p:cTn xmlns:p14="http://schemas.microsoft.com/office/powerpoint/2010/main" presetID="10" presetClass="entr" presetSubtype="0" fill="hold" nodeType="withEffect">
                   <p:stCondLst>
                     <p:cond delay="1000"/>
                   </p:stCondLst>
@@ -8705,7 +8895,7 @@
   <p:timing>
     <p:tnLst>
       <p:par>
-        <p:cTn id="1" dur="indefinite" restart="never" nodeType="tmRoot"/>
+        <p:cTn xmlns:p14="http://schemas.microsoft.com/office/powerpoint/2010/main" id="1" dur="indefinite" restart="never" nodeType="tmRoot"/>
       </p:par>
     </p:tnLst>
   </p:timing>
@@ -8946,7 +9136,7 @@
   <p:timing>
     <p:tnLst>
       <p:par>
-        <p:cTn id="1" dur="indefinite" restart="never" nodeType="tmRoot"/>
+        <p:cTn xmlns:p14="http://schemas.microsoft.com/office/powerpoint/2010/main" id="1" dur="indefinite" restart="never" nodeType="tmRoot"/>
       </p:par>
     </p:tnLst>
   </p:timing>
@@ -9155,7 +9345,7 @@
   <p:timing>
     <p:tnLst>
       <p:par>
-        <p:cTn id="1" dur="indefinite" restart="never" nodeType="tmRoot"/>
+        <p:cTn xmlns:p14="http://schemas.microsoft.com/office/powerpoint/2010/main" id="1" dur="indefinite" restart="never" nodeType="tmRoot"/>
       </p:par>
     </p:tnLst>
   </p:timing>
@@ -9402,7 +9592,7 @@
   <p:timing>
     <p:tnLst>
       <p:par>
-        <p:cTn id="1" dur="indefinite" restart="never" nodeType="tmRoot"/>
+        <p:cTn xmlns:p14="http://schemas.microsoft.com/office/powerpoint/2010/main" id="1" dur="indefinite" restart="never" nodeType="tmRoot"/>
       </p:par>
     </p:tnLst>
   </p:timing>
@@ -9632,7 +9822,7 @@
   <p:timing>
     <p:tnLst>
       <p:par>
-        <p:cTn id="1" dur="indefinite" restart="never" nodeType="tmRoot"/>
+        <p:cTn xmlns:p14="http://schemas.microsoft.com/office/powerpoint/2010/main" id="1" dur="indefinite" restart="never" nodeType="tmRoot"/>
       </p:par>
     </p:tnLst>
   </p:timing>
@@ -9815,14 +10005,14 @@
               <a:noFill/>
             </a:ln>
             <a:extLst>
-              <a:ext uri="{909E8E84-426E-40DD-AFC4-6F175D3DCCD1}">
+              <a:ext uri="{909E8E84-426E-40dd-AFC4-6F175D3DCCD1}">
                 <a14:hiddenFill xmlns:a14="http://schemas.microsoft.com/office/drawing/2010/main">
                   <a:solidFill>
                     <a:srgbClr val="FFFFFF"/>
                   </a:solidFill>
                 </a14:hiddenFill>
               </a:ext>
-              <a:ext uri="{91240B29-F687-4F45-9708-019B960494DF}">
+              <a:ext uri="{91240B29-F687-4f45-9708-019B960494DF}">
                 <a14:hiddenLine xmlns:a14="http://schemas.microsoft.com/office/drawing/2010/main" w="9525">
                   <a:solidFill>
                     <a:srgbClr val="000000"/>
@@ -10158,7 +10348,7 @@
             </a:prstGeom>
             <a:noFill/>
             <a:extLst>
-              <a:ext uri="{909E8E84-426E-40DD-AFC4-6F175D3DCCD1}">
+              <a:ext uri="{909E8E84-426E-40dd-AFC4-6F175D3DCCD1}">
                 <a14:hiddenFill xmlns:a14="http://schemas.microsoft.com/office/drawing/2010/main">
                   <a:solidFill>
                     <a:srgbClr val="FFFFFF"/>
@@ -10240,7 +10430,7 @@
   <p:timing>
     <p:tnLst>
       <p:par>
-        <p:cTn id="1" dur="indefinite" restart="never" nodeType="tmRoot"/>
+        <p:cTn xmlns:p14="http://schemas.microsoft.com/office/powerpoint/2010/main" id="1" dur="indefinite" restart="never" nodeType="tmRoot"/>
       </p:par>
     </p:tnLst>
   </p:timing>
@@ -10706,14 +10896,14 @@
               <a:noFill/>
             </a:ln>
             <a:extLst>
-              <a:ext uri="{909E8E84-426E-40DD-AFC4-6F175D3DCCD1}">
+              <a:ext uri="{909E8E84-426E-40dd-AFC4-6F175D3DCCD1}">
                 <a14:hiddenFill xmlns:a14="http://schemas.microsoft.com/office/drawing/2010/main">
                   <a:solidFill>
                     <a:srgbClr val="FFFFFF"/>
                   </a:solidFill>
                 </a14:hiddenFill>
               </a:ext>
-              <a:ext uri="{91240B29-F687-4F45-9708-019B960494DF}">
+              <a:ext uri="{91240B29-F687-4f45-9708-019B960494DF}">
                 <a14:hiddenLine xmlns:a14="http://schemas.microsoft.com/office/drawing/2010/main" w="9525">
                   <a:solidFill>
                     <a:srgbClr val="000000"/>
@@ -11049,7 +11239,7 @@
             </a:prstGeom>
             <a:noFill/>
             <a:extLst>
-              <a:ext uri="{909E8E84-426E-40DD-AFC4-6F175D3DCCD1}">
+              <a:ext uri="{909E8E84-426E-40dd-AFC4-6F175D3DCCD1}">
                 <a14:hiddenFill xmlns:a14="http://schemas.microsoft.com/office/drawing/2010/main">
                   <a:solidFill>
                     <a:srgbClr val="FFFFFF"/>
@@ -11131,7 +11321,7 @@
   <p:timing>
     <p:tnLst>
       <p:par>
-        <p:cTn id="1" dur="indefinite" restart="never" nodeType="tmRoot"/>
+        <p:cTn xmlns:p14="http://schemas.microsoft.com/office/powerpoint/2010/main" id="1" dur="indefinite" restart="never" nodeType="tmRoot"/>
       </p:par>
     </p:tnLst>
   </p:timing>
@@ -11463,7 +11653,7 @@
   <p:timing>
     <p:tnLst>
       <p:par>
-        <p:cTn id="1" dur="indefinite" restart="never" nodeType="tmRoot"/>
+        <p:cTn xmlns:p14="http://schemas.microsoft.com/office/powerpoint/2010/main" id="1" dur="indefinite" restart="never" nodeType="tmRoot"/>
       </p:par>
     </p:tnLst>
   </p:timing>
@@ -11688,7 +11878,7 @@
   <p:timing>
     <p:tnLst>
       <p:par>
-        <p:cTn id="1" dur="indefinite" restart="never" nodeType="tmRoot"/>
+        <p:cTn xmlns:p14="http://schemas.microsoft.com/office/powerpoint/2010/main" id="1" dur="indefinite" restart="never" nodeType="tmRoot"/>
       </p:par>
     </p:tnLst>
   </p:timing>
@@ -11840,7 +12030,7 @@
   <p:timing>
     <p:tnLst>
       <p:par>
-        <p:cTn id="1" dur="indefinite" restart="never" nodeType="tmRoot"/>
+        <p:cTn xmlns:p14="http://schemas.microsoft.com/office/powerpoint/2010/main" id="1" dur="indefinite" restart="never" nodeType="tmRoot"/>
       </p:par>
     </p:tnLst>
   </p:timing>
@@ -11916,7 +12106,7 @@
   <p:timing>
     <p:tnLst>
       <p:par>
-        <p:cTn id="1" dur="indefinite" restart="never" nodeType="tmRoot"/>
+        <p:cTn xmlns:p14="http://schemas.microsoft.com/office/powerpoint/2010/main" id="1" dur="indefinite" restart="never" nodeType="tmRoot"/>
       </p:par>
     </p:tnLst>
   </p:timing>
@@ -12017,13 +12207,8 @@
             <a:pPr fontAlgn="base"/>
             <a:r>
               <a:rPr lang="en-US" dirty="0" smtClean="0"/>
-              <a:t>How to choose the used </a:t>
-            </a:r>
-            <a:r>
-              <a:rPr lang="en-US" dirty="0" smtClean="0"/>
-              <a:t>one:</a:t>
-            </a:r>
-            <a:endParaRPr lang="en-US" dirty="0" smtClean="0"/>
+              <a:t>How to choose the used one:</a:t>
+            </a:r>
           </a:p>
           <a:p>
             <a:pPr lvl="1" fontAlgn="base"/>
@@ -12107,7 +12292,7 @@
   <p:timing>
     <p:tnLst>
       <p:par>
-        <p:cTn id="1" dur="indefinite" restart="never" nodeType="tmRoot"/>
+        <p:cTn xmlns:p14="http://schemas.microsoft.com/office/powerpoint/2010/main" id="1" dur="indefinite" restart="never" nodeType="tmRoot"/>
       </p:par>
     </p:tnLst>
   </p:timing>
@@ -12263,7 +12448,7 @@
   <p:timing>
     <p:tnLst>
       <p:par>
-        <p:cTn id="1" dur="indefinite" restart="never" nodeType="tmRoot"/>
+        <p:cTn xmlns:p14="http://schemas.microsoft.com/office/powerpoint/2010/main" id="1" dur="indefinite" restart="never" nodeType="tmRoot"/>
       </p:par>
     </p:tnLst>
   </p:timing>
@@ -12335,7 +12520,7 @@
   <p:timing>
     <p:tnLst>
       <p:par>
-        <p:cTn id="1" dur="indefinite" restart="never" nodeType="tmRoot"/>
+        <p:cTn xmlns:p14="http://schemas.microsoft.com/office/powerpoint/2010/main" id="1" dur="indefinite" restart="never" nodeType="tmRoot"/>
       </p:par>
     </p:tnLst>
   </p:timing>
@@ -12450,17 +12635,8 @@
             <a:pPr lvl="1" fontAlgn="base"/>
             <a:r>
               <a:rPr lang="en-US" dirty="0" smtClean="0"/>
-              <a:t>Concatenation</a:t>
-            </a:r>
-            <a:r>
-              <a:rPr lang="en-US" dirty="0" smtClean="0"/>
-              <a:t>, semicolon and assignments </a:t>
-            </a:r>
-            <a:r>
-              <a:rPr lang="en-US" dirty="0" smtClean="0"/>
-              <a:t>operators</a:t>
-            </a:r>
-            <a:endParaRPr lang="en-US" dirty="0" smtClean="0"/>
+              <a:t>Concatenation, semicolon and assignments operators</a:t>
+            </a:r>
           </a:p>
           <a:p>
             <a:pPr lvl="1" fontAlgn="base"/>
@@ -12549,7 +12725,7 @@
   <p:timing>
     <p:tnLst>
       <p:par>
-        <p:cTn id="1" dur="indefinite" restart="never" nodeType="tmRoot"/>
+        <p:cTn xmlns:p14="http://schemas.microsoft.com/office/powerpoint/2010/main" id="1" dur="indefinite" restart="never" nodeType="tmRoot"/>
       </p:par>
     </p:tnLst>
   </p:timing>
@@ -12710,7 +12886,7 @@
   <p:timing>
     <p:tnLst>
       <p:par>
-        <p:cTn id="1" dur="indefinite" restart="never" nodeType="tmRoot"/>
+        <p:cTn xmlns:p14="http://schemas.microsoft.com/office/powerpoint/2010/main" id="1" dur="indefinite" restart="never" nodeType="tmRoot"/>
       </p:par>
     </p:tnLst>
   </p:timing>
@@ -12785,7 +12961,7 @@
   <p:timing>
     <p:tnLst>
       <p:par>
-        <p:cTn id="1" dur="indefinite" restart="never" nodeType="tmRoot"/>
+        <p:cTn xmlns:p14="http://schemas.microsoft.com/office/powerpoint/2010/main" id="1" dur="indefinite" restart="never" nodeType="tmRoot"/>
       </p:par>
     </p:tnLst>
   </p:timing>
@@ -12898,14 +13074,15 @@
             </a:br>
             <a:r>
               <a:rPr lang="en-US" dirty="0" smtClean="0"/>
-              <a:t>With 4.0 – Sentinel, </a:t>
-            </a:r>
-            <a:br>
-              <a:rPr lang="en-US" dirty="0" smtClean="0"/>
-            </a:br>
-            <a:r>
-              <a:rPr lang="en-US" dirty="0" smtClean="0"/>
-              <a:t>     We’re introducing cool stuff like,</a:t>
+              <a:t>With 4.0 – Sentinel</a:t>
+            </a:r>
+            <a:r>
+              <a:rPr lang="en-US" dirty="0"/>
+              <a:t> </a:t>
+            </a:r>
+            <a:r>
+              <a:rPr lang="en-US" dirty="0" smtClean="0"/>
+              <a:t>We’re introducing cool stuff like,</a:t>
             </a:r>
           </a:p>
           <a:p>
@@ -12946,7 +13123,7 @@
             </a:r>
             <a:r>
               <a:rPr lang="en-US" dirty="0" smtClean="0"/>
-              <a:t>Loading and many more features</a:t>
+              <a:t>Loading and many more…</a:t>
             </a:r>
           </a:p>
           <a:p>
@@ -12983,7 +13160,7 @@
           <p:nvPr/>
         </p:nvPicPr>
         <p:blipFill>
-          <a:blip r:embed="rId2"/>
+          <a:blip r:embed="rId3"/>
           <a:stretch>
             <a:fillRect/>
           </a:stretch>
@@ -13023,7 +13200,7 @@
   <p:timing>
     <p:tnLst>
       <p:par>
-        <p:cTn id="1" dur="indefinite" restart="never" nodeType="tmRoot"/>
+        <p:cTn xmlns:p14="http://schemas.microsoft.com/office/powerpoint/2010/main" id="1" dur="indefinite" restart="never" nodeType="tmRoot"/>
       </p:par>
     </p:tnLst>
   </p:timing>
@@ -13153,7 +13330,7 @@
   <p:timing>
     <p:tnLst>
       <p:par>
-        <p:cTn id="1" dur="indefinite" restart="never" nodeType="tmRoot"/>
+        <p:cTn xmlns:p14="http://schemas.microsoft.com/office/powerpoint/2010/main" id="1" dur="indefinite" restart="never" nodeType="tmRoot"/>
       </p:par>
     </p:tnLst>
   </p:timing>
@@ -13332,7 +13509,7 @@
   <p:timing>
     <p:tnLst>
       <p:par>
-        <p:cTn id="1" dur="indefinite" restart="never" nodeType="tmRoot"/>
+        <p:cTn xmlns:p14="http://schemas.microsoft.com/office/powerpoint/2010/main" id="1" dur="indefinite" restart="never" nodeType="tmRoot"/>
       </p:par>
     </p:tnLst>
   </p:timing>
@@ -13415,7 +13592,7 @@
   <p:timing>
     <p:tnLst>
       <p:par>
-        <p:cTn id="1" dur="indefinite" restart="never" nodeType="tmRoot"/>
+        <p:cTn xmlns:p14="http://schemas.microsoft.com/office/powerpoint/2010/main" id="1" dur="indefinite" restart="never" nodeType="tmRoot"/>
       </p:par>
     </p:tnLst>
   </p:timing>
@@ -13610,7 +13787,7 @@
   <p:timing>
     <p:tnLst>
       <p:par>
-        <p:cTn id="1" dur="indefinite" restart="never" nodeType="tmRoot"/>
+        <p:cTn xmlns:p14="http://schemas.microsoft.com/office/powerpoint/2010/main" id="1" dur="indefinite" restart="never" nodeType="tmRoot"/>
       </p:par>
     </p:tnLst>
   </p:timing>
@@ -13959,7 +14136,7 @@
   <p:timing>
     <p:tnLst>
       <p:par>
-        <p:cTn id="1" dur="indefinite" restart="never" nodeType="tmRoot"/>
+        <p:cTn xmlns:p14="http://schemas.microsoft.com/office/powerpoint/2010/main" id="1" dur="indefinite" restart="never" nodeType="tmRoot"/>
       </p:par>
     </p:tnLst>
   </p:timing>
@@ -14034,7 +14211,7 @@
   <p:timing>
     <p:tnLst>
       <p:par>
-        <p:cTn id="1" dur="indefinite" restart="never" nodeType="tmRoot"/>
+        <p:cTn xmlns:p14="http://schemas.microsoft.com/office/powerpoint/2010/main" id="1" dur="indefinite" restart="never" nodeType="tmRoot"/>
       </p:par>
     </p:tnLst>
   </p:timing>
@@ -14164,7 +14341,7 @@
             </a:r>
             <a:r>
               <a:rPr lang="en-US" dirty="0" smtClean="0"/>
-              <a:t>and many others (~30 components)</a:t>
+              <a:t>and many others (~35 components)</a:t>
             </a:r>
           </a:p>
           <a:p>
@@ -14270,7 +14447,7 @@
   <p:timing>
     <p:tnLst>
       <p:par>
-        <p:cTn id="1" dur="indefinite" restart="never" nodeType="tmRoot"/>
+        <p:cTn xmlns:p14="http://schemas.microsoft.com/office/powerpoint/2010/main" id="1" dur="indefinite" restart="never" nodeType="tmRoot"/>
       </p:par>
     </p:tnLst>
   </p:timing>
@@ -14651,7 +14828,7 @@
   <p:timing>
     <p:tnLst>
       <p:par>
-        <p:cTn id="1" dur="indefinite" restart="never" nodeType="tmRoot"/>
+        <p:cTn xmlns:p14="http://schemas.microsoft.com/office/powerpoint/2010/main" id="1" dur="indefinite" restart="never" nodeType="tmRoot"/>
       </p:par>
     </p:tnLst>
   </p:timing>
@@ -14723,7 +14900,7 @@
   <p:timing>
     <p:tnLst>
       <p:par>
-        <p:cTn id="1" dur="indefinite" restart="never" nodeType="tmRoot"/>
+        <p:cTn xmlns:p14="http://schemas.microsoft.com/office/powerpoint/2010/main" id="1" dur="indefinite" restart="never" nodeType="tmRoot"/>
       </p:par>
     </p:tnLst>
   </p:timing>
@@ -14802,11 +14979,7 @@
             </a:r>
             <a:r>
               <a:rPr lang="en-US" dirty="0" smtClean="0"/>
-              <a:t>vanilla </a:t>
-            </a:r>
-            <a:r>
-              <a:rPr lang="en-US" dirty="0" smtClean="0"/>
-              <a:t>Facelets</a:t>
+              <a:t>vanilla Facelets</a:t>
             </a:r>
           </a:p>
           <a:p>
@@ -14910,7 +15083,7 @@
   <p:timing>
     <p:tnLst>
       <p:par>
-        <p:cTn id="1" dur="indefinite" restart="never" nodeType="tmRoot"/>
+        <p:cTn xmlns:p14="http://schemas.microsoft.com/office/powerpoint/2010/main" id="1" dur="indefinite" restart="never" nodeType="tmRoot"/>
       </p:par>
     </p:tnLst>
   </p:timing>
@@ -15058,7 +15231,7 @@
   <p:timing>
     <p:tnLst>
       <p:par>
-        <p:cTn id="1" dur="indefinite" restart="never" nodeType="tmRoot"/>
+        <p:cTn xmlns:p14="http://schemas.microsoft.com/office/powerpoint/2010/main" id="1" dur="indefinite" restart="never" nodeType="tmRoot"/>
       </p:par>
     </p:tnLst>
   </p:timing>
@@ -15252,7 +15425,7 @@
   <p:timing>
     <p:tnLst>
       <p:par>
-        <p:cTn id="1" dur="indefinite" restart="never" nodeType="tmRoot"/>
+        <p:cTn xmlns:p14="http://schemas.microsoft.com/office/powerpoint/2010/main" id="1" dur="indefinite" restart="never" nodeType="tmRoot"/>
       </p:par>
     </p:tnLst>
   </p:timing>
@@ -15324,7 +15497,7 @@
   <p:timing>
     <p:tnLst>
       <p:par>
-        <p:cTn id="1" dur="indefinite" restart="never" nodeType="tmRoot"/>
+        <p:cTn xmlns:p14="http://schemas.microsoft.com/office/powerpoint/2010/main" id="1" dur="indefinite" restart="never" nodeType="tmRoot"/>
       </p:par>
     </p:tnLst>
   </p:timing>
@@ -15421,11 +15594,7 @@
             <a:pPr fontAlgn="base"/>
             <a:r>
               <a:rPr lang="en-US" dirty="0" smtClean="0"/>
-              <a:t>JSF </a:t>
-            </a:r>
-            <a:r>
-              <a:rPr lang="en-US" dirty="0" smtClean="0"/>
-              <a:t>bound </a:t>
+              <a:t>JSF bound </a:t>
             </a:r>
             <a:r>
               <a:rPr lang="en-US" dirty="0"/>
@@ -15505,7 +15674,7 @@
   <p:timing>
     <p:tnLst>
       <p:par>
-        <p:cTn id="1" dur="indefinite" restart="never" nodeType="tmRoot"/>
+        <p:cTn xmlns:p14="http://schemas.microsoft.com/office/powerpoint/2010/main" id="1" dur="indefinite" restart="never" nodeType="tmRoot"/>
       </p:par>
     </p:tnLst>
   </p:timing>
@@ -15665,7 +15834,7 @@
   <p:timing>
     <p:tnLst>
       <p:par>
-        <p:cTn id="1" dur="indefinite" restart="never" nodeType="tmRoot"/>
+        <p:cTn xmlns:p14="http://schemas.microsoft.com/office/powerpoint/2010/main" id="1" dur="indefinite" restart="never" nodeType="tmRoot"/>
       </p:par>
     </p:tnLst>
   </p:timing>
@@ -15737,7 +15906,7 @@
   <p:timing>
     <p:tnLst>
       <p:par>
-        <p:cTn id="1" dur="indefinite" restart="never" nodeType="tmRoot"/>
+        <p:cTn xmlns:p14="http://schemas.microsoft.com/office/powerpoint/2010/main" id="1" dur="indefinite" restart="never" nodeType="tmRoot"/>
       </p:par>
     </p:tnLst>
   </p:timing>
@@ -15801,15 +15970,7 @@
             <a:pPr fontAlgn="base"/>
             <a:r>
               <a:rPr lang="en-US" dirty="0" smtClean="0"/>
-              <a:t>Improved </a:t>
-            </a:r>
-            <a:r>
-              <a:rPr lang="en-US" dirty="0" smtClean="0"/>
-              <a:t>FacesComponent </a:t>
-            </a:r>
-            <a:r>
-              <a:rPr lang="en-US" dirty="0" smtClean="0"/>
-              <a:t>interface</a:t>
+              <a:t>Improved FacesComponent interface</a:t>
             </a:r>
           </a:p>
           <a:p>
@@ -16013,7 +16174,7 @@
   <p:timing>
     <p:tnLst>
       <p:par>
-        <p:cTn id="1" dur="indefinite" restart="never" nodeType="tmRoot"/>
+        <p:cTn xmlns:p14="http://schemas.microsoft.com/office/powerpoint/2010/main" id="1" dur="indefinite" restart="never" nodeType="tmRoot"/>
       </p:par>
     </p:tnLst>
   </p:timing>
@@ -16176,7 +16337,7 @@
   <p:timing>
     <p:tnLst>
       <p:par>
-        <p:cTn id="1" dur="indefinite" restart="never" nodeType="tmRoot"/>
+        <p:cTn xmlns:p14="http://schemas.microsoft.com/office/powerpoint/2010/main" id="1" dur="indefinite" restart="never" nodeType="tmRoot"/>
       </p:par>
     </p:tnLst>
   </p:timing>
@@ -16248,7 +16409,7 @@
   <p:timing>
     <p:tnLst>
       <p:par>
-        <p:cTn id="1" dur="indefinite" restart="never" nodeType="tmRoot"/>
+        <p:cTn xmlns:p14="http://schemas.microsoft.com/office/powerpoint/2010/main" id="1" dur="indefinite" restart="never" nodeType="tmRoot"/>
       </p:par>
     </p:tnLst>
   </p:timing>
@@ -16418,7 +16579,7 @@
   <p:timing>
     <p:tnLst>
       <p:par>
-        <p:cTn id="1" dur="indefinite" restart="never" nodeType="tmRoot"/>
+        <p:cTn xmlns:p14="http://schemas.microsoft.com/office/powerpoint/2010/main" id="1" dur="indefinite" restart="never" nodeType="tmRoot"/>
       </p:par>
     </p:tnLst>
   </p:timing>
@@ -16570,7 +16731,7 @@
   <p:timing>
     <p:tnLst>
       <p:par>
-        <p:cTn id="1" dur="indefinite" restart="never" nodeType="tmRoot"/>
+        <p:cTn xmlns:p14="http://schemas.microsoft.com/office/powerpoint/2010/main" id="1" dur="indefinite" restart="never" nodeType="tmRoot"/>
       </p:par>
     </p:tnLst>
   </p:timing>
@@ -16901,7 +17062,7 @@
   <p:timing>
     <p:tnLst>
       <p:par>
-        <p:cTn id="1" dur="indefinite" restart="never" nodeType="tmRoot"/>
+        <p:cTn xmlns:p14="http://schemas.microsoft.com/office/powerpoint/2010/main" id="1" dur="indefinite" restart="never" nodeType="tmRoot"/>
       </p:par>
     </p:tnLst>
   </p:timing>
@@ -17028,7 +17189,7 @@
   <p:timing>
     <p:tnLst>
       <p:par>
-        <p:cTn id="1" dur="indefinite" restart="never" nodeType="tmRoot"/>
+        <p:cTn xmlns:p14="http://schemas.microsoft.com/office/powerpoint/2010/main" id="1" dur="indefinite" restart="never" nodeType="tmRoot"/>
       </p:par>
     </p:tnLst>
   </p:timing>
@@ -17223,7 +17384,7 @@
   <p:timing>
     <p:tnLst>
       <p:par>
-        <p:cTn id="1" dur="indefinite" restart="never" nodeType="tmRoot"/>
+        <p:cTn xmlns:p14="http://schemas.microsoft.com/office/powerpoint/2010/main" id="1" dur="indefinite" restart="never" nodeType="tmRoot"/>
       </p:par>
     </p:tnLst>
   </p:timing>
@@ -17359,7 +17520,7 @@
   <p:timing>
     <p:tnLst>
       <p:par>
-        <p:cTn id="1" dur="indefinite" restart="never" nodeType="tmRoot"/>
+        <p:cTn xmlns:p14="http://schemas.microsoft.com/office/powerpoint/2010/main" id="1" dur="indefinite" restart="never" nodeType="tmRoot"/>
       </p:par>
     </p:tnLst>
   </p:timing>
@@ -17553,7 +17714,7 @@
           </a:prstGeom>
           <a:noFill/>
           <a:extLst>
-            <a:ext uri="{909E8E84-426E-40DD-AFC4-6F175D3DCCD1}">
+            <a:ext uri="{909E8E84-426E-40dd-AFC4-6F175D3DCCD1}">
               <a14:hiddenFill xmlns:a14="http://schemas.microsoft.com/office/drawing/2010/main">
                 <a:solidFill>
                   <a:srgbClr val="FFFFFF"/>
@@ -17588,7 +17749,7 @@
   <p:timing>
     <p:tnLst>
       <p:par>
-        <p:cTn id="1" dur="indefinite" restart="never" nodeType="tmRoot"/>
+        <p:cTn xmlns:p14="http://schemas.microsoft.com/office/powerpoint/2010/main" id="1" dur="indefinite" restart="never" nodeType="tmRoot"/>
       </p:par>
     </p:tnLst>
   </p:timing>
@@ -17800,7 +17961,7 @@
           </a:prstGeom>
           <a:noFill/>
           <a:extLst>
-            <a:ext uri="{909E8E84-426E-40DD-AFC4-6F175D3DCCD1}">
+            <a:ext uri="{909E8E84-426E-40dd-AFC4-6F175D3DCCD1}">
               <a14:hiddenFill xmlns:a14="http://schemas.microsoft.com/office/drawing/2010/main">
                 <a:solidFill>
                   <a:srgbClr val="FFFFFF"/>
@@ -17835,7 +17996,7 @@
   <p:timing>
     <p:tnLst>
       <p:par>
-        <p:cTn id="1" dur="indefinite" restart="never" nodeType="tmRoot"/>
+        <p:cTn xmlns:p14="http://schemas.microsoft.com/office/powerpoint/2010/main" id="1" dur="indefinite" restart="never" nodeType="tmRoot"/>
       </p:par>
     </p:tnLst>
   </p:timing>
@@ -18026,7 +18187,7 @@
           </a:prstGeom>
           <a:noFill/>
           <a:extLst>
-            <a:ext uri="{909E8E84-426E-40DD-AFC4-6F175D3DCCD1}">
+            <a:ext uri="{909E8E84-426E-40dd-AFC4-6F175D3DCCD1}">
               <a14:hiddenFill xmlns:a14="http://schemas.microsoft.com/office/drawing/2010/main">
                 <a:solidFill>
                   <a:srgbClr val="FFFFFF"/>
@@ -18061,7 +18222,7 @@
   <p:timing>
     <p:tnLst>
       <p:par>
-        <p:cTn id="1" dur="indefinite" restart="never" nodeType="tmRoot"/>
+        <p:cTn xmlns:p14="http://schemas.microsoft.com/office/powerpoint/2010/main" id="1" dur="indefinite" restart="never" nodeType="tmRoot"/>
       </p:par>
     </p:tnLst>
   </p:timing>
@@ -18111,17 +18272,8 @@
             </a:pPr>
             <a:r>
               <a:rPr lang="en-US" sz="2000" cap="none" dirty="0" smtClean="0"/>
-              <a:t>Sample </a:t>
-            </a:r>
-            <a:r>
-              <a:rPr lang="en-US" sz="2000" cap="none" dirty="0" smtClean="0"/>
-              <a:t>codes to demonstrate the </a:t>
-            </a:r>
-            <a:r>
-              <a:rPr lang="en-US" sz="2000" cap="none" dirty="0" smtClean="0"/>
-              <a:t>tips</a:t>
-            </a:r>
-            <a:endParaRPr lang="en-US" sz="2000" cap="none" dirty="0" smtClean="0"/>
+              <a:t>Sample codes to demonstrate the tips</a:t>
+            </a:r>
           </a:p>
           <a:p>
             <a:pPr marL="342900" indent="-342900">
@@ -18161,11 +18313,6 @@
               </a:rPr>
               <a:t>github.com/marfous/j1demo-pf</a:t>
             </a:r>
-            <a:endParaRPr lang="en-US" sz="3200" cap="none" dirty="0" smtClean="0">
-              <a:solidFill>
-                <a:srgbClr val="5382A1"/>
-              </a:solidFill>
-            </a:endParaRPr>
           </a:p>
           <a:p>
             <a:pPr marL="342900" indent="-342900">
@@ -18271,7 +18418,7 @@
   <p:timing>
     <p:tnLst>
       <p:par>
-        <p:cTn id="1" dur="indefinite" restart="never" nodeType="tmRoot"/>
+        <p:cTn xmlns:p14="http://schemas.microsoft.com/office/powerpoint/2010/main" id="1" dur="indefinite" restart="never" nodeType="tmRoot"/>
       </p:par>
     </p:tnLst>
   </p:timing>
@@ -18342,7 +18489,7 @@
   <p:timing>
     <p:tnLst>
       <p:par>
-        <p:cTn id="1" dur="indefinite" restart="never" nodeType="tmRoot"/>
+        <p:cTn xmlns:p14="http://schemas.microsoft.com/office/powerpoint/2010/main" id="1" dur="indefinite" restart="never" nodeType="tmRoot"/>
       </p:par>
     </p:tnLst>
   </p:timing>

</xml_diff>

<commit_message>
Tiny changes in the presentation
</commit_message>
<xml_diff>
--- a/con3638.pptx
+++ b/con3638.pptx
@@ -236,7 +236,7 @@
           <a:p>
             <a:fld id="{E99333BE-0D34-4F62-BD6E-2C3B14663373}" type="datetimeFigureOut">
               <a:rPr lang="en-US" smtClean="0"/>
-              <a:t>9/12/13</a:t>
+              <a:t>9/12/2013</a:t>
             </a:fld>
             <a:endParaRPr lang="en-US"/>
           </a:p>
@@ -402,7 +402,7 @@
           <a:p>
             <a:fld id="{4A2D1F94-724F-43BD-B41B-43157E9B4550}" type="datetimeFigureOut">
               <a:rPr lang="en-US" smtClean="0"/>
-              <a:t>9/12/13</a:t>
+              <a:t>9/12/2013</a:t>
             </a:fld>
             <a:endParaRPr lang="en-US"/>
           </a:p>
@@ -895,14 +895,6 @@
           <a:bodyPr/>
           <a:lstStyle/>
           <a:p>
-            <a:r>
-              <a:rPr lang="en-US" dirty="0" smtClean="0"/>
-              <a:t>PrimeFaces is the</a:t>
-            </a:r>
-            <a:r>
-              <a:rPr lang="en-US" baseline="0" dirty="0" smtClean="0"/>
-              <a:t> </a:t>
-            </a:r>
             <a:endParaRPr lang="en-US" dirty="0"/>
           </a:p>
         </p:txBody>
@@ -987,112 +979,6 @@
           <a:bodyPr/>
           <a:lstStyle/>
           <a:p>
-            <a:r>
-              <a:rPr lang="en-US" dirty="0" smtClean="0"/>
-              <a:t>PrimeFaces bundles</a:t>
-            </a:r>
-            <a:r>
-              <a:rPr lang="en-US" baseline="0" dirty="0" smtClean="0"/>
-              <a:t> over 100 JSF components that provide a rich UI experience with </a:t>
-            </a:r>
-            <a:r>
-              <a:rPr lang="en-US" baseline="0" dirty="0" err="1" smtClean="0"/>
-              <a:t>ajaxified</a:t>
-            </a:r>
-            <a:r>
-              <a:rPr lang="en-US" baseline="0" dirty="0" smtClean="0"/>
-              <a:t> architecture. It employs the JSF 2.0 standardized AJAX APIs on the server side and for the client side it uses </a:t>
-            </a:r>
-            <a:r>
-              <a:rPr lang="en-US" baseline="0" dirty="0" err="1" smtClean="0"/>
-              <a:t>jQuery</a:t>
-            </a:r>
-            <a:r>
-              <a:rPr lang="en-US" baseline="0" dirty="0" smtClean="0"/>
-              <a:t> for its </a:t>
-            </a:r>
-            <a:r>
-              <a:rPr lang="en-US" baseline="0" dirty="0" err="1" smtClean="0"/>
-              <a:t>javascript</a:t>
-            </a:r>
-            <a:r>
-              <a:rPr lang="en-US" baseline="0" dirty="0" smtClean="0"/>
-              <a:t> architecture. </a:t>
-            </a:r>
-          </a:p>
-          <a:p>
-            <a:r>
-              <a:rPr lang="en-US" baseline="0" dirty="0" smtClean="0"/>
-              <a:t>You can find nearly all the components that you might need to develop a web application, from a complex </a:t>
-            </a:r>
-            <a:r>
-              <a:rPr lang="en-US" baseline="0" dirty="0" err="1" smtClean="0"/>
-              <a:t>datatable</a:t>
-            </a:r>
-            <a:r>
-              <a:rPr lang="en-US" baseline="0" dirty="0" smtClean="0"/>
-              <a:t> to autocomplete, </a:t>
-            </a:r>
-            <a:r>
-              <a:rPr lang="en-US" baseline="0" dirty="0" err="1" smtClean="0"/>
-              <a:t>picklist</a:t>
-            </a:r>
-            <a:r>
-              <a:rPr lang="en-US" baseline="0" dirty="0" smtClean="0"/>
-              <a:t> and many others. The themes for all the components are managed in a centralized way with the help of the theme roller so structural and skinning CSS can be easily applied across the components. And With 4.0 release, codenamed sentinel, we are bringing some awesome features to the community like built-in client side validation infrastructure, which is compatible with the server side implementation, that exactly does what JSF do on the server side. The validation metadata is being held in HTML5 attributes. We are doing partial processing on the client side with </a:t>
-            </a:r>
-            <a:r>
-              <a:rPr lang="en-US" baseline="0" dirty="0" err="1" smtClean="0"/>
-              <a:t>javascript</a:t>
-            </a:r>
-            <a:r>
-              <a:rPr lang="en-US" baseline="0" dirty="0" smtClean="0"/>
-              <a:t> like JSF does on partial processing on the Ajax calls. We provide i18n for the validation messages. We provide the infrastructure to implement a custom client side validation mechanism. We also provide infrastructure to enable the client side validation on custom </a:t>
-            </a:r>
-            <a:r>
-              <a:rPr lang="en-US" baseline="0" dirty="0" err="1" smtClean="0"/>
-              <a:t>javascript</a:t>
-            </a:r>
-            <a:r>
-              <a:rPr lang="en-US" baseline="0" dirty="0" smtClean="0"/>
-              <a:t> events like </a:t>
-            </a:r>
-            <a:r>
-              <a:rPr lang="en-US" baseline="0" dirty="0" err="1" smtClean="0"/>
-              <a:t>keyup</a:t>
-            </a:r>
-            <a:r>
-              <a:rPr lang="en-US" baseline="0" dirty="0" smtClean="0"/>
-              <a:t>, blur and etc. All this can be enabled with a context parameter and I’ll show that in the demo. One of the coolest side to mention about is this validation mechanism also supports bean validation specification out of the box. So as you annotate your domain model with annotations like @Min @Max or @</a:t>
-            </a:r>
-            <a:r>
-              <a:rPr lang="en-US" baseline="0" dirty="0" err="1" smtClean="0"/>
-              <a:t>NotNull</a:t>
-            </a:r>
-            <a:r>
-              <a:rPr lang="en-US" baseline="0" dirty="0" smtClean="0"/>
-              <a:t> you will get the validation mechanism working on the client side instantly. The other feature that we’re bringing to the community with 4.0 is the Dialog Framework which enables to open an external </a:t>
-            </a:r>
-            <a:r>
-              <a:rPr lang="en-US" baseline="0" dirty="0" err="1" smtClean="0"/>
-              <a:t>xhtml</a:t>
-            </a:r>
-            <a:r>
-              <a:rPr lang="en-US" baseline="0" dirty="0" smtClean="0"/>
-              <a:t> page that gets generated dynamically at runtime. The same could be done via </a:t>
-            </a:r>
-            <a:r>
-              <a:rPr lang="en-US" baseline="0" dirty="0" err="1" smtClean="0"/>
-              <a:t>p:dialog</a:t>
-            </a:r>
-            <a:r>
-              <a:rPr lang="en-US" baseline="0" dirty="0" smtClean="0"/>
-              <a:t> component also but within dialog framework the pages gets created and destroyed programmatically at runtime. I’ll show a sample and ways to enable the dialog framework infrastructure with configuration. With PrimeFaces 4.0 we also provided drag drop ability between tree components which is a very cool feature in my opinion. Of course implementing this was not that easy. We also bundled many other cool features like deferred loading, sticky headers, new search expressions, the new file upload scrollable tabs </a:t>
-            </a:r>
-            <a:r>
-              <a:rPr lang="en-US" baseline="0" smtClean="0"/>
-              <a:t>and etc.</a:t>
-            </a:r>
             <a:endParaRPr lang="en-US" dirty="0"/>
           </a:p>
         </p:txBody>
@@ -1315,7 +1201,7 @@
   <p:timing>
     <p:tnLst>
       <p:par>
-        <p:cTn xmlns:p14="http://schemas.microsoft.com/office/powerpoint/2010/main" id="1" dur="indefinite" restart="never" nodeType="tmRoot"/>
+        <p:cTn id="1" dur="indefinite" restart="never" nodeType="tmRoot"/>
       </p:par>
     </p:tnLst>
   </p:timing>
@@ -1627,7 +1513,7 @@
   <p:timing>
     <p:tnLst>
       <p:par>
-        <p:cTn xmlns:p14="http://schemas.microsoft.com/office/powerpoint/2010/main" id="1" dur="indefinite" restart="never" nodeType="tmRoot"/>
+        <p:cTn id="1" dur="indefinite" restart="never" nodeType="tmRoot"/>
       </p:par>
     </p:tnLst>
   </p:timing>
@@ -1926,7 +1812,7 @@
   <p:timing>
     <p:tnLst>
       <p:par>
-        <p:cTn xmlns:p14="http://schemas.microsoft.com/office/powerpoint/2010/main" id="1" dur="indefinite" restart="never" nodeType="tmRoot"/>
+        <p:cTn id="1" dur="indefinite" restart="never" nodeType="tmRoot"/>
       </p:par>
     </p:tnLst>
   </p:timing>
@@ -2152,7 +2038,7 @@
   <p:timing>
     <p:tnLst>
       <p:par>
-        <p:cTn xmlns:p14="http://schemas.microsoft.com/office/powerpoint/2010/main" id="1" dur="indefinite" restart="never" nodeType="tmRoot"/>
+        <p:cTn id="1" dur="indefinite" restart="never" nodeType="tmRoot"/>
       </p:par>
     </p:tnLst>
   </p:timing>
@@ -2210,14 +2096,14 @@
             <a:noFill/>
           </a:ln>
           <a:extLst>
-            <a:ext uri="{909E8E84-426E-40dd-AFC4-6F175D3DCCD1}">
+            <a:ext uri="{909E8E84-426E-40DD-AFC4-6F175D3DCCD1}">
               <a14:hiddenFill xmlns:a14="http://schemas.microsoft.com/office/drawing/2010/main">
                 <a:solidFill>
                   <a:srgbClr val="FFFFFF"/>
                 </a:solidFill>
               </a14:hiddenFill>
             </a:ext>
-            <a:ext uri="{91240B29-F687-4f45-9708-019B960494DF}">
+            <a:ext uri="{91240B29-F687-4F45-9708-019B960494DF}">
               <a14:hiddenLine xmlns:a14="http://schemas.microsoft.com/office/drawing/2010/main" w="9525">
                 <a:solidFill>
                   <a:srgbClr val="000000"/>
@@ -2285,7 +2171,7 @@
   <p:timing>
     <p:tnLst>
       <p:par>
-        <p:cTn xmlns:p14="http://schemas.microsoft.com/office/powerpoint/2010/main" id="1" dur="indefinite" restart="never" nodeType="tmRoot"/>
+        <p:cTn id="1" dur="indefinite" restart="never" nodeType="tmRoot"/>
       </p:par>
     </p:tnLst>
   </p:timing>
@@ -2343,14 +2229,14 @@
             <a:noFill/>
           </a:ln>
           <a:extLst>
-            <a:ext uri="{909E8E84-426E-40dd-AFC4-6F175D3DCCD1}">
+            <a:ext uri="{909E8E84-426E-40DD-AFC4-6F175D3DCCD1}">
               <a14:hiddenFill xmlns:a14="http://schemas.microsoft.com/office/drawing/2010/main">
                 <a:solidFill>
                   <a:srgbClr val="FFFFFF"/>
                 </a:solidFill>
               </a14:hiddenFill>
             </a:ext>
-            <a:ext uri="{91240B29-F687-4f45-9708-019B960494DF}">
+            <a:ext uri="{91240B29-F687-4F45-9708-019B960494DF}">
               <a14:hiddenLine xmlns:a14="http://schemas.microsoft.com/office/drawing/2010/main" w="9525">
                 <a:solidFill>
                   <a:srgbClr val="000000"/>
@@ -2397,14 +2283,14 @@
             <a:noFill/>
           </a:ln>
           <a:extLst>
-            <a:ext uri="{909E8E84-426E-40dd-AFC4-6F175D3DCCD1}">
+            <a:ext uri="{909E8E84-426E-40DD-AFC4-6F175D3DCCD1}">
               <a14:hiddenFill xmlns:a14="http://schemas.microsoft.com/office/drawing/2010/main">
                 <a:solidFill>
                   <a:srgbClr val="FFFFFF"/>
                 </a:solidFill>
               </a14:hiddenFill>
             </a:ext>
-            <a:ext uri="{91240B29-F687-4f45-9708-019B960494DF}">
+            <a:ext uri="{91240B29-F687-4F45-9708-019B960494DF}">
               <a14:hiddenLine xmlns:a14="http://schemas.microsoft.com/office/drawing/2010/main" w="9525">
                 <a:solidFill>
                   <a:srgbClr val="000000"/>
@@ -2488,7 +2374,7 @@
   <p:timing>
     <p:tnLst>
       <p:par>
-        <p:cTn xmlns:p14="http://schemas.microsoft.com/office/powerpoint/2010/main" id="1" dur="indefinite" restart="never" nodeType="tmRoot"/>
+        <p:cTn id="1" dur="indefinite" restart="never" nodeType="tmRoot"/>
       </p:par>
     </p:tnLst>
   </p:timing>
@@ -2546,14 +2432,14 @@
             <a:noFill/>
           </a:ln>
           <a:extLst>
-            <a:ext uri="{909E8E84-426E-40dd-AFC4-6F175D3DCCD1}">
+            <a:ext uri="{909E8E84-426E-40DD-AFC4-6F175D3DCCD1}">
               <a14:hiddenFill xmlns:a14="http://schemas.microsoft.com/office/drawing/2010/main">
                 <a:solidFill>
                   <a:srgbClr val="FFFFFF"/>
                 </a:solidFill>
               </a14:hiddenFill>
             </a:ext>
-            <a:ext uri="{91240B29-F687-4f45-9708-019B960494DF}">
+            <a:ext uri="{91240B29-F687-4F45-9708-019B960494DF}">
               <a14:hiddenLine xmlns:a14="http://schemas.microsoft.com/office/drawing/2010/main" w="9525">
                 <a:solidFill>
                   <a:srgbClr val="000000"/>
@@ -2600,14 +2486,14 @@
             <a:noFill/>
           </a:ln>
           <a:extLst>
-            <a:ext uri="{909E8E84-426E-40dd-AFC4-6F175D3DCCD1}">
+            <a:ext uri="{909E8E84-426E-40DD-AFC4-6F175D3DCCD1}">
               <a14:hiddenFill xmlns:a14="http://schemas.microsoft.com/office/drawing/2010/main">
                 <a:solidFill>
                   <a:srgbClr val="FFFFFF"/>
                 </a:solidFill>
               </a14:hiddenFill>
             </a:ext>
-            <a:ext uri="{91240B29-F687-4f45-9708-019B960494DF}">
+            <a:ext uri="{91240B29-F687-4F45-9708-019B960494DF}">
               <a14:hiddenLine xmlns:a14="http://schemas.microsoft.com/office/drawing/2010/main" w="9525">
                 <a:solidFill>
                   <a:srgbClr val="000000"/>
@@ -2755,7 +2641,7 @@
   <p:timing>
     <p:tnLst>
       <p:par>
-        <p:cTn xmlns:p14="http://schemas.microsoft.com/office/powerpoint/2010/main" id="1" dur="indefinite" restart="never" nodeType="tmRoot"/>
+        <p:cTn id="1" dur="indefinite" restart="never" nodeType="tmRoot"/>
       </p:par>
     </p:tnLst>
   </p:timing>
@@ -2813,14 +2699,14 @@
             <a:noFill/>
           </a:ln>
           <a:extLst>
-            <a:ext uri="{909E8E84-426E-40dd-AFC4-6F175D3DCCD1}">
+            <a:ext uri="{909E8E84-426E-40DD-AFC4-6F175D3DCCD1}">
               <a14:hiddenFill xmlns:a14="http://schemas.microsoft.com/office/drawing/2010/main">
                 <a:solidFill>
                   <a:srgbClr val="FFFFFF"/>
                 </a:solidFill>
               </a14:hiddenFill>
             </a:ext>
-            <a:ext uri="{91240B29-F687-4f45-9708-019B960494DF}">
+            <a:ext uri="{91240B29-F687-4F45-9708-019B960494DF}">
               <a14:hiddenLine xmlns:a14="http://schemas.microsoft.com/office/drawing/2010/main" w="9525">
                 <a:solidFill>
                   <a:srgbClr val="000000"/>
@@ -2867,14 +2753,14 @@
             <a:noFill/>
           </a:ln>
           <a:extLst>
-            <a:ext uri="{909E8E84-426E-40dd-AFC4-6F175D3DCCD1}">
+            <a:ext uri="{909E8E84-426E-40DD-AFC4-6F175D3DCCD1}">
               <a14:hiddenFill xmlns:a14="http://schemas.microsoft.com/office/drawing/2010/main">
                 <a:solidFill>
                   <a:srgbClr val="FFFFFF"/>
                 </a:solidFill>
               </a14:hiddenFill>
             </a:ext>
-            <a:ext uri="{91240B29-F687-4f45-9708-019B960494DF}">
+            <a:ext uri="{91240B29-F687-4F45-9708-019B960494DF}">
               <a14:hiddenLine xmlns:a14="http://schemas.microsoft.com/office/drawing/2010/main" w="9525">
                 <a:solidFill>
                   <a:srgbClr val="000000"/>
@@ -3085,7 +2971,7 @@
   <p:timing>
     <p:tnLst>
       <p:par>
-        <p:cTn xmlns:p14="http://schemas.microsoft.com/office/powerpoint/2010/main" id="1" dur="indefinite" restart="never" nodeType="tmRoot"/>
+        <p:cTn id="1" dur="indefinite" restart="never" nodeType="tmRoot"/>
       </p:par>
     </p:tnLst>
   </p:timing>
@@ -3274,7 +3160,7 @@
   <p:timing>
     <p:tnLst>
       <p:par>
-        <p:cTn xmlns:p14="http://schemas.microsoft.com/office/powerpoint/2010/main" id="1" dur="indefinite" restart="never" nodeType="tmRoot"/>
+        <p:cTn id="1" dur="indefinite" restart="never" nodeType="tmRoot"/>
       </p:par>
     </p:tnLst>
   </p:timing>
@@ -3466,7 +3352,7 @@
   <p:timing>
     <p:tnLst>
       <p:par>
-        <p:cTn xmlns:p14="http://schemas.microsoft.com/office/powerpoint/2010/main" id="1" dur="indefinite" restart="never" nodeType="tmRoot"/>
+        <p:cTn id="1" dur="indefinite" restart="never" nodeType="tmRoot"/>
       </p:par>
     </p:tnLst>
   </p:timing>
@@ -3873,7 +3759,7 @@
   <p:timing>
     <p:tnLst>
       <p:par>
-        <p:cTn xmlns:p14="http://schemas.microsoft.com/office/powerpoint/2010/main" id="1" dur="indefinite" restart="never" nodeType="tmRoot">
+        <p:cTn id="1" dur="indefinite" restart="never" nodeType="tmRoot">
           <p:childTnLst>
             <p:seq concurrent="1" nextAc="seek">
               <p:cTn id="2" dur="indefinite" nodeType="mainSeq">
@@ -4005,7 +3891,7 @@
           <p:tmpl lvl="1">
             <p:tnLst>
               <p:par>
-                <p:cTn xmlns:p14="http://schemas.microsoft.com/office/powerpoint/2010/main" presetID="10" presetClass="entr" presetSubtype="0" fill="hold" nodeType="withEffect">
+                <p:cTn presetID="10" presetClass="entr" presetSubtype="0" fill="hold" nodeType="withEffect">
                   <p:stCondLst>
                     <p:cond delay="1000"/>
                   </p:stCondLst>
@@ -4233,7 +4119,7 @@
   <p:timing>
     <p:tnLst>
       <p:par>
-        <p:cTn xmlns:p14="http://schemas.microsoft.com/office/powerpoint/2010/main" id="1" dur="indefinite" restart="never" nodeType="tmRoot"/>
+        <p:cTn id="1" dur="indefinite" restart="never" nodeType="tmRoot"/>
       </p:par>
     </p:tnLst>
   </p:timing>
@@ -4591,7 +4477,7 @@
   <p:timing>
     <p:tnLst>
       <p:par>
-        <p:cTn xmlns:p14="http://schemas.microsoft.com/office/powerpoint/2010/main" id="1" dur="indefinite" restart="never" nodeType="tmRoot">
+        <p:cTn id="1" dur="indefinite" restart="never" nodeType="tmRoot">
           <p:childTnLst>
             <p:seq concurrent="1" nextAc="seek">
               <p:cTn id="2" dur="indefinite" nodeType="mainSeq">
@@ -4723,7 +4609,7 @@
           <p:tmpl lvl="1">
             <p:tnLst>
               <p:par>
-                <p:cTn xmlns:p14="http://schemas.microsoft.com/office/powerpoint/2010/main" presetID="10" presetClass="entr" presetSubtype="0" fill="hold" nodeType="withEffect">
+                <p:cTn presetID="10" presetClass="entr" presetSubtype="0" fill="hold" nodeType="withEffect">
                   <p:stCondLst>
                     <p:cond delay="1000"/>
                   </p:stCondLst>
@@ -4974,7 +4860,7 @@
   <p:timing>
     <p:tnLst>
       <p:par>
-        <p:cTn xmlns:p14="http://schemas.microsoft.com/office/powerpoint/2010/main" id="1" dur="indefinite" restart="never" nodeType="tmRoot"/>
+        <p:cTn id="1" dur="indefinite" restart="never" nodeType="tmRoot"/>
       </p:par>
     </p:tnLst>
   </p:timing>
@@ -5215,7 +5101,7 @@
   <p:timing>
     <p:tnLst>
       <p:par>
-        <p:cTn xmlns:p14="http://schemas.microsoft.com/office/powerpoint/2010/main" id="1" dur="indefinite" restart="never" nodeType="tmRoot"/>
+        <p:cTn id="1" dur="indefinite" restart="never" nodeType="tmRoot"/>
       </p:par>
     </p:tnLst>
   </p:timing>
@@ -5424,7 +5310,7 @@
   <p:timing>
     <p:tnLst>
       <p:par>
-        <p:cTn xmlns:p14="http://schemas.microsoft.com/office/powerpoint/2010/main" id="1" dur="indefinite" restart="never" nodeType="tmRoot"/>
+        <p:cTn id="1" dur="indefinite" restart="never" nodeType="tmRoot"/>
       </p:par>
     </p:tnLst>
   </p:timing>
@@ -5671,7 +5557,7 @@
   <p:timing>
     <p:tnLst>
       <p:par>
-        <p:cTn xmlns:p14="http://schemas.microsoft.com/office/powerpoint/2010/main" id="1" dur="indefinite" restart="never" nodeType="tmRoot"/>
+        <p:cTn id="1" dur="indefinite" restart="never" nodeType="tmRoot"/>
       </p:par>
     </p:tnLst>
   </p:timing>
@@ -5901,7 +5787,7 @@
   <p:timing>
     <p:tnLst>
       <p:par>
-        <p:cTn xmlns:p14="http://schemas.microsoft.com/office/powerpoint/2010/main" id="1" dur="indefinite" restart="never" nodeType="tmRoot"/>
+        <p:cTn id="1" dur="indefinite" restart="never" nodeType="tmRoot"/>
       </p:par>
     </p:tnLst>
   </p:timing>
@@ -6213,7 +6099,7 @@
   <p:timing>
     <p:tnLst>
       <p:par>
-        <p:cTn xmlns:p14="http://schemas.microsoft.com/office/powerpoint/2010/main" id="1" dur="indefinite" restart="never" nodeType="tmRoot"/>
+        <p:cTn id="1" dur="indefinite" restart="never" nodeType="tmRoot"/>
       </p:par>
     </p:tnLst>
   </p:timing>
@@ -6512,7 +6398,7 @@
   <p:timing>
     <p:tnLst>
       <p:par>
-        <p:cTn xmlns:p14="http://schemas.microsoft.com/office/powerpoint/2010/main" id="1" dur="indefinite" restart="never" nodeType="tmRoot"/>
+        <p:cTn id="1" dur="indefinite" restart="never" nodeType="tmRoot"/>
       </p:par>
     </p:tnLst>
   </p:timing>
@@ -6738,7 +6624,7 @@
   <p:timing>
     <p:tnLst>
       <p:par>
-        <p:cTn xmlns:p14="http://schemas.microsoft.com/office/powerpoint/2010/main" id="1" dur="indefinite" restart="never" nodeType="tmRoot"/>
+        <p:cTn id="1" dur="indefinite" restart="never" nodeType="tmRoot"/>
       </p:par>
     </p:tnLst>
   </p:timing>
@@ -6796,14 +6682,14 @@
             <a:noFill/>
           </a:ln>
           <a:extLst>
-            <a:ext uri="{909E8E84-426E-40dd-AFC4-6F175D3DCCD1}">
+            <a:ext uri="{909E8E84-426E-40DD-AFC4-6F175D3DCCD1}">
               <a14:hiddenFill xmlns:a14="http://schemas.microsoft.com/office/drawing/2010/main">
                 <a:solidFill>
                   <a:srgbClr val="FFFFFF"/>
                 </a:solidFill>
               </a14:hiddenFill>
             </a:ext>
-            <a:ext uri="{91240B29-F687-4f45-9708-019B960494DF}">
+            <a:ext uri="{91240B29-F687-4F45-9708-019B960494DF}">
               <a14:hiddenLine xmlns:a14="http://schemas.microsoft.com/office/drawing/2010/main" w="9525">
                 <a:solidFill>
                   <a:srgbClr val="000000"/>
@@ -6871,7 +6757,7 @@
   <p:timing>
     <p:tnLst>
       <p:par>
-        <p:cTn xmlns:p14="http://schemas.microsoft.com/office/powerpoint/2010/main" id="1" dur="indefinite" restart="never" nodeType="tmRoot"/>
+        <p:cTn id="1" dur="indefinite" restart="never" nodeType="tmRoot"/>
       </p:par>
     </p:tnLst>
   </p:timing>
@@ -7278,7 +7164,7 @@
   <p:timing>
     <p:tnLst>
       <p:par>
-        <p:cTn xmlns:p14="http://schemas.microsoft.com/office/powerpoint/2010/main" id="1" dur="indefinite" restart="never" nodeType="tmRoot">
+        <p:cTn id="1" dur="indefinite" restart="never" nodeType="tmRoot">
           <p:childTnLst>
             <p:seq concurrent="1" nextAc="seek">
               <p:cTn id="2" dur="indefinite" nodeType="mainSeq">
@@ -7410,7 +7296,7 @@
           <p:tmpl lvl="1">
             <p:tnLst>
               <p:par>
-                <p:cTn xmlns:p14="http://schemas.microsoft.com/office/powerpoint/2010/main" presetID="10" presetClass="entr" presetSubtype="0" fill="hold" nodeType="withEffect">
+                <p:cTn presetID="10" presetClass="entr" presetSubtype="0" fill="hold" nodeType="withEffect">
                   <p:stCondLst>
                     <p:cond delay="1000"/>
                   </p:stCondLst>
@@ -7504,14 +7390,14 @@
             <a:noFill/>
           </a:ln>
           <a:extLst>
-            <a:ext uri="{909E8E84-426E-40dd-AFC4-6F175D3DCCD1}">
+            <a:ext uri="{909E8E84-426E-40DD-AFC4-6F175D3DCCD1}">
               <a14:hiddenFill xmlns:a14="http://schemas.microsoft.com/office/drawing/2010/main">
                 <a:solidFill>
                   <a:srgbClr val="FFFFFF"/>
                 </a:solidFill>
               </a14:hiddenFill>
             </a:ext>
-            <a:ext uri="{91240B29-F687-4f45-9708-019B960494DF}">
+            <a:ext uri="{91240B29-F687-4F45-9708-019B960494DF}">
               <a14:hiddenLine xmlns:a14="http://schemas.microsoft.com/office/drawing/2010/main" w="9525">
                 <a:solidFill>
                   <a:srgbClr val="000000"/>
@@ -7558,14 +7444,14 @@
             <a:noFill/>
           </a:ln>
           <a:extLst>
-            <a:ext uri="{909E8E84-426E-40dd-AFC4-6F175D3DCCD1}">
+            <a:ext uri="{909E8E84-426E-40DD-AFC4-6F175D3DCCD1}">
               <a14:hiddenFill xmlns:a14="http://schemas.microsoft.com/office/drawing/2010/main">
                 <a:solidFill>
                   <a:srgbClr val="FFFFFF"/>
                 </a:solidFill>
               </a14:hiddenFill>
             </a:ext>
-            <a:ext uri="{91240B29-F687-4f45-9708-019B960494DF}">
+            <a:ext uri="{91240B29-F687-4F45-9708-019B960494DF}">
               <a14:hiddenLine xmlns:a14="http://schemas.microsoft.com/office/drawing/2010/main" w="9525">
                 <a:solidFill>
                   <a:srgbClr val="000000"/>
@@ -7649,7 +7535,7 @@
   <p:timing>
     <p:tnLst>
       <p:par>
-        <p:cTn xmlns:p14="http://schemas.microsoft.com/office/powerpoint/2010/main" id="1" dur="indefinite" restart="never" nodeType="tmRoot"/>
+        <p:cTn id="1" dur="indefinite" restart="never" nodeType="tmRoot"/>
       </p:par>
     </p:tnLst>
   </p:timing>
@@ -7707,14 +7593,14 @@
             <a:noFill/>
           </a:ln>
           <a:extLst>
-            <a:ext uri="{909E8E84-426E-40dd-AFC4-6F175D3DCCD1}">
+            <a:ext uri="{909E8E84-426E-40DD-AFC4-6F175D3DCCD1}">
               <a14:hiddenFill xmlns:a14="http://schemas.microsoft.com/office/drawing/2010/main">
                 <a:solidFill>
                   <a:srgbClr val="FFFFFF"/>
                 </a:solidFill>
               </a14:hiddenFill>
             </a:ext>
-            <a:ext uri="{91240B29-F687-4f45-9708-019B960494DF}">
+            <a:ext uri="{91240B29-F687-4F45-9708-019B960494DF}">
               <a14:hiddenLine xmlns:a14="http://schemas.microsoft.com/office/drawing/2010/main" w="9525">
                 <a:solidFill>
                   <a:srgbClr val="000000"/>
@@ -7761,14 +7647,14 @@
             <a:noFill/>
           </a:ln>
           <a:extLst>
-            <a:ext uri="{909E8E84-426E-40dd-AFC4-6F175D3DCCD1}">
+            <a:ext uri="{909E8E84-426E-40DD-AFC4-6F175D3DCCD1}">
               <a14:hiddenFill xmlns:a14="http://schemas.microsoft.com/office/drawing/2010/main">
                 <a:solidFill>
                   <a:srgbClr val="FFFFFF"/>
                 </a:solidFill>
               </a14:hiddenFill>
             </a:ext>
-            <a:ext uri="{91240B29-F687-4f45-9708-019B960494DF}">
+            <a:ext uri="{91240B29-F687-4F45-9708-019B960494DF}">
               <a14:hiddenLine xmlns:a14="http://schemas.microsoft.com/office/drawing/2010/main" w="9525">
                 <a:solidFill>
                   <a:srgbClr val="000000"/>
@@ -7916,7 +7802,7 @@
   <p:timing>
     <p:tnLst>
       <p:par>
-        <p:cTn xmlns:p14="http://schemas.microsoft.com/office/powerpoint/2010/main" id="1" dur="indefinite" restart="never" nodeType="tmRoot"/>
+        <p:cTn id="1" dur="indefinite" restart="never" nodeType="tmRoot"/>
       </p:par>
     </p:tnLst>
   </p:timing>
@@ -7974,14 +7860,14 @@
             <a:noFill/>
           </a:ln>
           <a:extLst>
-            <a:ext uri="{909E8E84-426E-40dd-AFC4-6F175D3DCCD1}">
+            <a:ext uri="{909E8E84-426E-40DD-AFC4-6F175D3DCCD1}">
               <a14:hiddenFill xmlns:a14="http://schemas.microsoft.com/office/drawing/2010/main">
                 <a:solidFill>
                   <a:srgbClr val="FFFFFF"/>
                 </a:solidFill>
               </a14:hiddenFill>
             </a:ext>
-            <a:ext uri="{91240B29-F687-4f45-9708-019B960494DF}">
+            <a:ext uri="{91240B29-F687-4F45-9708-019B960494DF}">
               <a14:hiddenLine xmlns:a14="http://schemas.microsoft.com/office/drawing/2010/main" w="9525">
                 <a:solidFill>
                   <a:srgbClr val="000000"/>
@@ -8028,14 +7914,14 @@
             <a:noFill/>
           </a:ln>
           <a:extLst>
-            <a:ext uri="{909E8E84-426E-40dd-AFC4-6F175D3DCCD1}">
+            <a:ext uri="{909E8E84-426E-40DD-AFC4-6F175D3DCCD1}">
               <a14:hiddenFill xmlns:a14="http://schemas.microsoft.com/office/drawing/2010/main">
                 <a:solidFill>
                   <a:srgbClr val="FFFFFF"/>
                 </a:solidFill>
               </a14:hiddenFill>
             </a:ext>
-            <a:ext uri="{91240B29-F687-4f45-9708-019B960494DF}">
+            <a:ext uri="{91240B29-F687-4F45-9708-019B960494DF}">
               <a14:hiddenLine xmlns:a14="http://schemas.microsoft.com/office/drawing/2010/main" w="9525">
                 <a:solidFill>
                   <a:srgbClr val="000000"/>
@@ -8246,7 +8132,7 @@
   <p:timing>
     <p:tnLst>
       <p:par>
-        <p:cTn xmlns:p14="http://schemas.microsoft.com/office/powerpoint/2010/main" id="1" dur="indefinite" restart="never" nodeType="tmRoot"/>
+        <p:cTn id="1" dur="indefinite" restart="never" nodeType="tmRoot"/>
       </p:par>
     </p:tnLst>
   </p:timing>
@@ -8604,7 +8490,7 @@
   <p:timing>
     <p:tnLst>
       <p:par>
-        <p:cTn xmlns:p14="http://schemas.microsoft.com/office/powerpoint/2010/main" id="1" dur="indefinite" restart="never" nodeType="tmRoot">
+        <p:cTn id="1" dur="indefinite" restart="never" nodeType="tmRoot">
           <p:childTnLst>
             <p:seq concurrent="1" nextAc="seek">
               <p:cTn id="2" dur="indefinite" nodeType="mainSeq">
@@ -8736,7 +8622,7 @@
           <p:tmpl lvl="1">
             <p:tnLst>
               <p:par>
-                <p:cTn xmlns:p14="http://schemas.microsoft.com/office/powerpoint/2010/main" presetID="10" presetClass="entr" presetSubtype="0" fill="hold" nodeType="withEffect">
+                <p:cTn presetID="10" presetClass="entr" presetSubtype="0" fill="hold" nodeType="withEffect">
                   <p:stCondLst>
                     <p:cond delay="1000"/>
                   </p:stCondLst>
@@ -8987,7 +8873,7 @@
   <p:timing>
     <p:tnLst>
       <p:par>
-        <p:cTn xmlns:p14="http://schemas.microsoft.com/office/powerpoint/2010/main" id="1" dur="indefinite" restart="never" nodeType="tmRoot"/>
+        <p:cTn id="1" dur="indefinite" restart="never" nodeType="tmRoot"/>
       </p:par>
     </p:tnLst>
   </p:timing>
@@ -9228,7 +9114,7 @@
   <p:timing>
     <p:tnLst>
       <p:par>
-        <p:cTn xmlns:p14="http://schemas.microsoft.com/office/powerpoint/2010/main" id="1" dur="indefinite" restart="never" nodeType="tmRoot"/>
+        <p:cTn id="1" dur="indefinite" restart="never" nodeType="tmRoot"/>
       </p:par>
     </p:tnLst>
   </p:timing>
@@ -9437,7 +9323,7 @@
   <p:timing>
     <p:tnLst>
       <p:par>
-        <p:cTn xmlns:p14="http://schemas.microsoft.com/office/powerpoint/2010/main" id="1" dur="indefinite" restart="never" nodeType="tmRoot"/>
+        <p:cTn id="1" dur="indefinite" restart="never" nodeType="tmRoot"/>
       </p:par>
     </p:tnLst>
   </p:timing>
@@ -9684,7 +9570,7 @@
   <p:timing>
     <p:tnLst>
       <p:par>
-        <p:cTn xmlns:p14="http://schemas.microsoft.com/office/powerpoint/2010/main" id="1" dur="indefinite" restart="never" nodeType="tmRoot"/>
+        <p:cTn id="1" dur="indefinite" restart="never" nodeType="tmRoot"/>
       </p:par>
     </p:tnLst>
   </p:timing>
@@ -9914,7 +9800,7 @@
   <p:timing>
     <p:tnLst>
       <p:par>
-        <p:cTn xmlns:p14="http://schemas.microsoft.com/office/powerpoint/2010/main" id="1" dur="indefinite" restart="never" nodeType="tmRoot"/>
+        <p:cTn id="1" dur="indefinite" restart="never" nodeType="tmRoot"/>
       </p:par>
     </p:tnLst>
   </p:timing>
@@ -10097,14 +9983,14 @@
               <a:noFill/>
             </a:ln>
             <a:extLst>
-              <a:ext uri="{909E8E84-426E-40dd-AFC4-6F175D3DCCD1}">
+              <a:ext uri="{909E8E84-426E-40DD-AFC4-6F175D3DCCD1}">
                 <a14:hiddenFill xmlns:a14="http://schemas.microsoft.com/office/drawing/2010/main">
                   <a:solidFill>
                     <a:srgbClr val="FFFFFF"/>
                   </a:solidFill>
                 </a14:hiddenFill>
               </a:ext>
-              <a:ext uri="{91240B29-F687-4f45-9708-019B960494DF}">
+              <a:ext uri="{91240B29-F687-4F45-9708-019B960494DF}">
                 <a14:hiddenLine xmlns:a14="http://schemas.microsoft.com/office/drawing/2010/main" w="9525">
                   <a:solidFill>
                     <a:srgbClr val="000000"/>
@@ -10440,7 +10326,7 @@
             </a:prstGeom>
             <a:noFill/>
             <a:extLst>
-              <a:ext uri="{909E8E84-426E-40dd-AFC4-6F175D3DCCD1}">
+              <a:ext uri="{909E8E84-426E-40DD-AFC4-6F175D3DCCD1}">
                 <a14:hiddenFill xmlns:a14="http://schemas.microsoft.com/office/drawing/2010/main">
                   <a:solidFill>
                     <a:srgbClr val="FFFFFF"/>
@@ -10522,7 +10408,7 @@
   <p:timing>
     <p:tnLst>
       <p:par>
-        <p:cTn xmlns:p14="http://schemas.microsoft.com/office/powerpoint/2010/main" id="1" dur="indefinite" restart="never" nodeType="tmRoot"/>
+        <p:cTn id="1" dur="indefinite" restart="never" nodeType="tmRoot"/>
       </p:par>
     </p:tnLst>
   </p:timing>
@@ -10988,14 +10874,14 @@
               <a:noFill/>
             </a:ln>
             <a:extLst>
-              <a:ext uri="{909E8E84-426E-40dd-AFC4-6F175D3DCCD1}">
+              <a:ext uri="{909E8E84-426E-40DD-AFC4-6F175D3DCCD1}">
                 <a14:hiddenFill xmlns:a14="http://schemas.microsoft.com/office/drawing/2010/main">
                   <a:solidFill>
                     <a:srgbClr val="FFFFFF"/>
                   </a:solidFill>
                 </a14:hiddenFill>
               </a:ext>
-              <a:ext uri="{91240B29-F687-4f45-9708-019B960494DF}">
+              <a:ext uri="{91240B29-F687-4F45-9708-019B960494DF}">
                 <a14:hiddenLine xmlns:a14="http://schemas.microsoft.com/office/drawing/2010/main" w="9525">
                   <a:solidFill>
                     <a:srgbClr val="000000"/>
@@ -11331,7 +11217,7 @@
             </a:prstGeom>
             <a:noFill/>
             <a:extLst>
-              <a:ext uri="{909E8E84-426E-40dd-AFC4-6F175D3DCCD1}">
+              <a:ext uri="{909E8E84-426E-40DD-AFC4-6F175D3DCCD1}">
                 <a14:hiddenFill xmlns:a14="http://schemas.microsoft.com/office/drawing/2010/main">
                   <a:solidFill>
                     <a:srgbClr val="FFFFFF"/>
@@ -11413,7 +11299,7 @@
   <p:timing>
     <p:tnLst>
       <p:par>
-        <p:cTn xmlns:p14="http://schemas.microsoft.com/office/powerpoint/2010/main" id="1" dur="indefinite" restart="never" nodeType="tmRoot"/>
+        <p:cTn id="1" dur="indefinite" restart="never" nodeType="tmRoot"/>
       </p:par>
     </p:tnLst>
   </p:timing>
@@ -11745,7 +11631,7 @@
   <p:timing>
     <p:tnLst>
       <p:par>
-        <p:cTn xmlns:p14="http://schemas.microsoft.com/office/powerpoint/2010/main" id="1" dur="indefinite" restart="never" nodeType="tmRoot"/>
+        <p:cTn id="1" dur="indefinite" restart="never" nodeType="tmRoot"/>
       </p:par>
     </p:tnLst>
   </p:timing>
@@ -11970,7 +11856,7 @@
   <p:timing>
     <p:tnLst>
       <p:par>
-        <p:cTn xmlns:p14="http://schemas.microsoft.com/office/powerpoint/2010/main" id="1" dur="indefinite" restart="never" nodeType="tmRoot"/>
+        <p:cTn id="1" dur="indefinite" restart="never" nodeType="tmRoot"/>
       </p:par>
     </p:tnLst>
   </p:timing>
@@ -12122,7 +12008,7 @@
   <p:timing>
     <p:tnLst>
       <p:par>
-        <p:cTn xmlns:p14="http://schemas.microsoft.com/office/powerpoint/2010/main" id="1" dur="indefinite" restart="never" nodeType="tmRoot"/>
+        <p:cTn id="1" dur="indefinite" restart="never" nodeType="tmRoot"/>
       </p:par>
     </p:tnLst>
   </p:timing>
@@ -12198,7 +12084,7 @@
   <p:timing>
     <p:tnLst>
       <p:par>
-        <p:cTn xmlns:p14="http://schemas.microsoft.com/office/powerpoint/2010/main" id="1" dur="indefinite" restart="never" nodeType="tmRoot"/>
+        <p:cTn id="1" dur="indefinite" restart="never" nodeType="tmRoot"/>
       </p:par>
     </p:tnLst>
   </p:timing>
@@ -12384,7 +12270,7 @@
   <p:timing>
     <p:tnLst>
       <p:par>
-        <p:cTn xmlns:p14="http://schemas.microsoft.com/office/powerpoint/2010/main" id="1" dur="indefinite" restart="never" nodeType="tmRoot"/>
+        <p:cTn id="1" dur="indefinite" restart="never" nodeType="tmRoot"/>
       </p:par>
     </p:tnLst>
   </p:timing>
@@ -12540,7 +12426,7 @@
   <p:timing>
     <p:tnLst>
       <p:par>
-        <p:cTn xmlns:p14="http://schemas.microsoft.com/office/powerpoint/2010/main" id="1" dur="indefinite" restart="never" nodeType="tmRoot"/>
+        <p:cTn id="1" dur="indefinite" restart="never" nodeType="tmRoot"/>
       </p:par>
     </p:tnLst>
   </p:timing>
@@ -12612,7 +12498,7 @@
   <p:timing>
     <p:tnLst>
       <p:par>
-        <p:cTn xmlns:p14="http://schemas.microsoft.com/office/powerpoint/2010/main" id="1" dur="indefinite" restart="never" nodeType="tmRoot"/>
+        <p:cTn id="1" dur="indefinite" restart="never" nodeType="tmRoot"/>
       </p:par>
     </p:tnLst>
   </p:timing>
@@ -12817,7 +12703,7 @@
   <p:timing>
     <p:tnLst>
       <p:par>
-        <p:cTn xmlns:p14="http://schemas.microsoft.com/office/powerpoint/2010/main" id="1" dur="indefinite" restart="never" nodeType="tmRoot"/>
+        <p:cTn id="1" dur="indefinite" restart="never" nodeType="tmRoot"/>
       </p:par>
     </p:tnLst>
   </p:timing>
@@ -12978,7 +12864,7 @@
   <p:timing>
     <p:tnLst>
       <p:par>
-        <p:cTn xmlns:p14="http://schemas.microsoft.com/office/powerpoint/2010/main" id="1" dur="indefinite" restart="never" nodeType="tmRoot"/>
+        <p:cTn id="1" dur="indefinite" restart="never" nodeType="tmRoot"/>
       </p:par>
     </p:tnLst>
   </p:timing>
@@ -13053,7 +12939,7 @@
   <p:timing>
     <p:tnLst>
       <p:par>
-        <p:cTn xmlns:p14="http://schemas.microsoft.com/office/powerpoint/2010/main" id="1" dur="indefinite" restart="never" nodeType="tmRoot"/>
+        <p:cTn id="1" dur="indefinite" restart="never" nodeType="tmRoot"/>
       </p:par>
     </p:tnLst>
   </p:timing>
@@ -13292,7 +13178,7 @@
   <p:timing>
     <p:tnLst>
       <p:par>
-        <p:cTn xmlns:p14="http://schemas.microsoft.com/office/powerpoint/2010/main" id="1" dur="indefinite" restart="never" nodeType="tmRoot"/>
+        <p:cTn id="1" dur="indefinite" restart="never" nodeType="tmRoot"/>
       </p:par>
     </p:tnLst>
   </p:timing>
@@ -13422,7 +13308,7 @@
   <p:timing>
     <p:tnLst>
       <p:par>
-        <p:cTn xmlns:p14="http://schemas.microsoft.com/office/powerpoint/2010/main" id="1" dur="indefinite" restart="never" nodeType="tmRoot"/>
+        <p:cTn id="1" dur="indefinite" restart="never" nodeType="tmRoot"/>
       </p:par>
     </p:tnLst>
   </p:timing>
@@ -13601,7 +13487,7 @@
   <p:timing>
     <p:tnLst>
       <p:par>
-        <p:cTn xmlns:p14="http://schemas.microsoft.com/office/powerpoint/2010/main" id="1" dur="indefinite" restart="never" nodeType="tmRoot"/>
+        <p:cTn id="1" dur="indefinite" restart="never" nodeType="tmRoot"/>
       </p:par>
     </p:tnLst>
   </p:timing>
@@ -13684,7 +13570,7 @@
   <p:timing>
     <p:tnLst>
       <p:par>
-        <p:cTn xmlns:p14="http://schemas.microsoft.com/office/powerpoint/2010/main" id="1" dur="indefinite" restart="never" nodeType="tmRoot"/>
+        <p:cTn id="1" dur="indefinite" restart="never" nodeType="tmRoot"/>
       </p:par>
     </p:tnLst>
   </p:timing>
@@ -13752,23 +13638,11 @@
             </a:r>
             <a:r>
               <a:rPr lang="en-US" dirty="0" err="1" smtClean="0"/>
-              <a:t>jQuery</a:t>
-            </a:r>
-            <a:r>
-              <a:rPr lang="en-US" dirty="0" err="1" smtClean="0"/>
-              <a:t>UI</a:t>
-            </a:r>
-            <a:r>
-              <a:rPr lang="en-US" dirty="0" smtClean="0"/>
-              <a:t> and </a:t>
-            </a:r>
-            <a:r>
-              <a:rPr lang="en-US" dirty="0" smtClean="0"/>
-              <a:t>ThemeRoller </a:t>
-            </a:r>
-            <a:r>
-              <a:rPr lang="en-US" dirty="0" smtClean="0"/>
-              <a:t>CSS Framework</a:t>
+              <a:t>jQueryUI</a:t>
+            </a:r>
+            <a:r>
+              <a:rPr lang="en-US" dirty="0" smtClean="0"/>
+              <a:t> and ThemeRoller CSS Framework</a:t>
             </a:r>
             <a:br>
               <a:rPr lang="en-US" dirty="0" smtClean="0"/>
@@ -13899,7 +13773,7 @@
   <p:timing>
     <p:tnLst>
       <p:par>
-        <p:cTn xmlns:p14="http://schemas.microsoft.com/office/powerpoint/2010/main" id="1" dur="indefinite" restart="never" nodeType="tmRoot"/>
+        <p:cTn id="1" dur="indefinite" restart="never" nodeType="tmRoot"/>
       </p:par>
     </p:tnLst>
   </p:timing>
@@ -14248,7 +14122,7 @@
   <p:timing>
     <p:tnLst>
       <p:par>
-        <p:cTn xmlns:p14="http://schemas.microsoft.com/office/powerpoint/2010/main" id="1" dur="indefinite" restart="never" nodeType="tmRoot"/>
+        <p:cTn id="1" dur="indefinite" restart="never" nodeType="tmRoot"/>
       </p:par>
     </p:tnLst>
   </p:timing>
@@ -14323,7 +14197,7 @@
   <p:timing>
     <p:tnLst>
       <p:par>
-        <p:cTn xmlns:p14="http://schemas.microsoft.com/office/powerpoint/2010/main" id="1" dur="indefinite" restart="never" nodeType="tmRoot"/>
+        <p:cTn id="1" dur="indefinite" restart="never" nodeType="tmRoot"/>
       </p:par>
     </p:tnLst>
   </p:timing>
@@ -14559,7 +14433,7 @@
   <p:timing>
     <p:tnLst>
       <p:par>
-        <p:cTn xmlns:p14="http://schemas.microsoft.com/office/powerpoint/2010/main" id="1" dur="indefinite" restart="never" nodeType="tmRoot"/>
+        <p:cTn id="1" dur="indefinite" restart="never" nodeType="tmRoot"/>
       </p:par>
     </p:tnLst>
   </p:timing>
@@ -14940,7 +14814,7 @@
   <p:timing>
     <p:tnLst>
       <p:par>
-        <p:cTn xmlns:p14="http://schemas.microsoft.com/office/powerpoint/2010/main" id="1" dur="indefinite" restart="never" nodeType="tmRoot"/>
+        <p:cTn id="1" dur="indefinite" restart="never" nodeType="tmRoot"/>
       </p:par>
     </p:tnLst>
   </p:timing>
@@ -15012,7 +14886,7 @@
   <p:timing>
     <p:tnLst>
       <p:par>
-        <p:cTn xmlns:p14="http://schemas.microsoft.com/office/powerpoint/2010/main" id="1" dur="indefinite" restart="never" nodeType="tmRoot"/>
+        <p:cTn id="1" dur="indefinite" restart="never" nodeType="tmRoot"/>
       </p:par>
     </p:tnLst>
   </p:timing>
@@ -15083,7 +14957,7 @@
             <a:pPr lvl="1" fontAlgn="base"/>
             <a:r>
               <a:rPr lang="en-US" dirty="0" smtClean="0"/>
-              <a:t>Standard distribution: </a:t>
+              <a:t>NetBeans IDE: </a:t>
             </a:r>
             <a:r>
               <a:rPr lang="en-US" dirty="0"/>
@@ -15097,8 +14971,16 @@
           <a:p>
             <a:pPr lvl="1" fontAlgn="base"/>
             <a:r>
-              <a:rPr lang="en-US" dirty="0" smtClean="0"/>
-              <a:t>Nbpfcrudgen plugin: </a:t>
+              <a:rPr lang="en-US" dirty="0"/>
+              <a:t>n</a:t>
+            </a:r>
+            <a:r>
+              <a:rPr lang="en-US" dirty="0" smtClean="0"/>
+              <a:t>bpfcrudgen </a:t>
+            </a:r>
+            <a:r>
+              <a:rPr lang="en-US" dirty="0" smtClean="0"/>
+              <a:t>plugin: </a:t>
             </a:r>
             <a:r>
               <a:rPr lang="en-US" dirty="0"/>
@@ -15108,21 +14990,27 @@
               <a:rPr lang="en-US" dirty="0" smtClean="0"/>
               <a:t>PrimeFaces</a:t>
             </a:r>
+            <a:endParaRPr lang="en-US" dirty="0" smtClean="0"/>
           </a:p>
           <a:p>
             <a:pPr fontAlgn="base"/>
             <a:r>
               <a:rPr lang="en-US" dirty="0" smtClean="0"/>
-              <a:t>Since NetBeans 7.3.1 </a:t>
+              <a:t>Last feature – NetBeans </a:t>
+            </a:r>
+            <a:r>
+              <a:rPr lang="en-US" dirty="0" smtClean="0"/>
+              <a:t>7.3.1 </a:t>
+            </a:r>
+            <a:r>
+              <a:rPr lang="en-US" dirty="0" smtClean="0"/>
+              <a:t>generates </a:t>
             </a:r>
             <a:r>
               <a:rPr lang="en-US" dirty="0"/>
-              <a:t>leverages </a:t>
-            </a:r>
-            <a:r>
-              <a:rPr lang="en-US" dirty="0" smtClean="0"/>
-              <a:t>Context and Dependency Injection</a:t>
-            </a:r>
+              <a:t>CDI artifacts</a:t>
+            </a:r>
+            <a:endParaRPr lang="en-US" dirty="0" smtClean="0"/>
           </a:p>
           <a:p>
             <a:pPr fontAlgn="base"/>
@@ -15142,7 +15030,15 @@
             <a:pPr lvl="1" fontAlgn="base"/>
             <a:r>
               <a:rPr lang="en-US" dirty="0" smtClean="0"/>
-              <a:t>Generate JSF skeleton from entities</a:t>
+              <a:t>Generate JSF </a:t>
+            </a:r>
+            <a:r>
+              <a:rPr lang="en-US" dirty="0" smtClean="0"/>
+              <a:t>pages </a:t>
+            </a:r>
+            <a:r>
+              <a:rPr lang="en-US" dirty="0" smtClean="0"/>
+              <a:t>from entities</a:t>
             </a:r>
           </a:p>
           <a:p>
@@ -15195,7 +15091,7 @@
   <p:timing>
     <p:tnLst>
       <p:par>
-        <p:cTn xmlns:p14="http://schemas.microsoft.com/office/powerpoint/2010/main" id="1" dur="indefinite" restart="never" nodeType="tmRoot"/>
+        <p:cTn id="1" dur="indefinite" restart="never" nodeType="tmRoot"/>
       </p:par>
     </p:tnLst>
   </p:timing>
@@ -15343,7 +15239,7 @@
   <p:timing>
     <p:tnLst>
       <p:par>
-        <p:cTn xmlns:p14="http://schemas.microsoft.com/office/powerpoint/2010/main" id="1" dur="indefinite" restart="never" nodeType="tmRoot"/>
+        <p:cTn id="1" dur="indefinite" restart="never" nodeType="tmRoot"/>
       </p:par>
     </p:tnLst>
   </p:timing>
@@ -15537,7 +15433,7 @@
   <p:timing>
     <p:tnLst>
       <p:par>
-        <p:cTn xmlns:p14="http://schemas.microsoft.com/office/powerpoint/2010/main" id="1" dur="indefinite" restart="never" nodeType="tmRoot"/>
+        <p:cTn id="1" dur="indefinite" restart="never" nodeType="tmRoot"/>
       </p:par>
     </p:tnLst>
   </p:timing>
@@ -15609,7 +15505,7 @@
   <p:timing>
     <p:tnLst>
       <p:par>
-        <p:cTn xmlns:p14="http://schemas.microsoft.com/office/powerpoint/2010/main" id="1" dur="indefinite" restart="never" nodeType="tmRoot"/>
+        <p:cTn id="1" dur="indefinite" restart="never" nodeType="tmRoot"/>
       </p:par>
     </p:tnLst>
   </p:timing>
@@ -15786,7 +15682,7 @@
   <p:timing>
     <p:tnLst>
       <p:par>
-        <p:cTn xmlns:p14="http://schemas.microsoft.com/office/powerpoint/2010/main" id="1" dur="indefinite" restart="never" nodeType="tmRoot"/>
+        <p:cTn id="1" dur="indefinite" restart="never" nodeType="tmRoot"/>
       </p:par>
     </p:tnLst>
   </p:timing>
@@ -15946,7 +15842,7 @@
   <p:timing>
     <p:tnLst>
       <p:par>
-        <p:cTn xmlns:p14="http://schemas.microsoft.com/office/powerpoint/2010/main" id="1" dur="indefinite" restart="never" nodeType="tmRoot"/>
+        <p:cTn id="1" dur="indefinite" restart="never" nodeType="tmRoot"/>
       </p:par>
     </p:tnLst>
   </p:timing>
@@ -16018,7 +15914,7 @@
   <p:timing>
     <p:tnLst>
       <p:par>
-        <p:cTn xmlns:p14="http://schemas.microsoft.com/office/powerpoint/2010/main" id="1" dur="indefinite" restart="never" nodeType="tmRoot"/>
+        <p:cTn id="1" dur="indefinite" restart="never" nodeType="tmRoot"/>
       </p:par>
     </p:tnLst>
   </p:timing>
@@ -16286,7 +16182,7 @@
   <p:timing>
     <p:tnLst>
       <p:par>
-        <p:cTn xmlns:p14="http://schemas.microsoft.com/office/powerpoint/2010/main" id="1" dur="indefinite" restart="never" nodeType="tmRoot"/>
+        <p:cTn id="1" dur="indefinite" restart="never" nodeType="tmRoot"/>
       </p:par>
     </p:tnLst>
   </p:timing>
@@ -16449,7 +16345,7 @@
   <p:timing>
     <p:tnLst>
       <p:par>
-        <p:cTn xmlns:p14="http://schemas.microsoft.com/office/powerpoint/2010/main" id="1" dur="indefinite" restart="never" nodeType="tmRoot"/>
+        <p:cTn id="1" dur="indefinite" restart="never" nodeType="tmRoot"/>
       </p:par>
     </p:tnLst>
   </p:timing>
@@ -16521,7 +16417,7 @@
   <p:timing>
     <p:tnLst>
       <p:par>
-        <p:cTn xmlns:p14="http://schemas.microsoft.com/office/powerpoint/2010/main" id="1" dur="indefinite" restart="never" nodeType="tmRoot"/>
+        <p:cTn id="1" dur="indefinite" restart="never" nodeType="tmRoot"/>
       </p:par>
     </p:tnLst>
   </p:timing>
@@ -16691,7 +16587,7 @@
   <p:timing>
     <p:tnLst>
       <p:par>
-        <p:cTn xmlns:p14="http://schemas.microsoft.com/office/powerpoint/2010/main" id="1" dur="indefinite" restart="never" nodeType="tmRoot"/>
+        <p:cTn id="1" dur="indefinite" restart="never" nodeType="tmRoot"/>
       </p:par>
     </p:tnLst>
   </p:timing>
@@ -16843,7 +16739,7 @@
   <p:timing>
     <p:tnLst>
       <p:par>
-        <p:cTn xmlns:p14="http://schemas.microsoft.com/office/powerpoint/2010/main" id="1" dur="indefinite" restart="never" nodeType="tmRoot"/>
+        <p:cTn id="1" dur="indefinite" restart="never" nodeType="tmRoot"/>
       </p:par>
     </p:tnLst>
   </p:timing>
@@ -17174,7 +17070,7 @@
   <p:timing>
     <p:tnLst>
       <p:par>
-        <p:cTn xmlns:p14="http://schemas.microsoft.com/office/powerpoint/2010/main" id="1" dur="indefinite" restart="never" nodeType="tmRoot"/>
+        <p:cTn id="1" dur="indefinite" restart="never" nodeType="tmRoot"/>
       </p:par>
     </p:tnLst>
   </p:timing>
@@ -17301,7 +17197,7 @@
   <p:timing>
     <p:tnLst>
       <p:par>
-        <p:cTn xmlns:p14="http://schemas.microsoft.com/office/powerpoint/2010/main" id="1" dur="indefinite" restart="never" nodeType="tmRoot"/>
+        <p:cTn id="1" dur="indefinite" restart="never" nodeType="tmRoot"/>
       </p:par>
     </p:tnLst>
   </p:timing>
@@ -17496,7 +17392,7 @@
   <p:timing>
     <p:tnLst>
       <p:par>
-        <p:cTn xmlns:p14="http://schemas.microsoft.com/office/powerpoint/2010/main" id="1" dur="indefinite" restart="never" nodeType="tmRoot"/>
+        <p:cTn id="1" dur="indefinite" restart="never" nodeType="tmRoot"/>
       </p:par>
     </p:tnLst>
   </p:timing>
@@ -17632,7 +17528,7 @@
   <p:timing>
     <p:tnLst>
       <p:par>
-        <p:cTn xmlns:p14="http://schemas.microsoft.com/office/powerpoint/2010/main" id="1" dur="indefinite" restart="never" nodeType="tmRoot"/>
+        <p:cTn id="1" dur="indefinite" restart="never" nodeType="tmRoot"/>
       </p:par>
     </p:tnLst>
   </p:timing>
@@ -17826,7 +17722,7 @@
           </a:prstGeom>
           <a:noFill/>
           <a:extLst>
-            <a:ext uri="{909E8E84-426E-40dd-AFC4-6F175D3DCCD1}">
+            <a:ext uri="{909E8E84-426E-40DD-AFC4-6F175D3DCCD1}">
               <a14:hiddenFill xmlns:a14="http://schemas.microsoft.com/office/drawing/2010/main">
                 <a:solidFill>
                   <a:srgbClr val="FFFFFF"/>
@@ -17861,7 +17757,7 @@
   <p:timing>
     <p:tnLst>
       <p:par>
-        <p:cTn xmlns:p14="http://schemas.microsoft.com/office/powerpoint/2010/main" id="1" dur="indefinite" restart="never" nodeType="tmRoot"/>
+        <p:cTn id="1" dur="indefinite" restart="never" nodeType="tmRoot"/>
       </p:par>
     </p:tnLst>
   </p:timing>
@@ -18073,7 +17969,7 @@
           </a:prstGeom>
           <a:noFill/>
           <a:extLst>
-            <a:ext uri="{909E8E84-426E-40dd-AFC4-6F175D3DCCD1}">
+            <a:ext uri="{909E8E84-426E-40DD-AFC4-6F175D3DCCD1}">
               <a14:hiddenFill xmlns:a14="http://schemas.microsoft.com/office/drawing/2010/main">
                 <a:solidFill>
                   <a:srgbClr val="FFFFFF"/>
@@ -18108,7 +18004,7 @@
   <p:timing>
     <p:tnLst>
       <p:par>
-        <p:cTn xmlns:p14="http://schemas.microsoft.com/office/powerpoint/2010/main" id="1" dur="indefinite" restart="never" nodeType="tmRoot"/>
+        <p:cTn id="1" dur="indefinite" restart="never" nodeType="tmRoot"/>
       </p:par>
     </p:tnLst>
   </p:timing>
@@ -18299,7 +18195,7 @@
           </a:prstGeom>
           <a:noFill/>
           <a:extLst>
-            <a:ext uri="{909E8E84-426E-40dd-AFC4-6F175D3DCCD1}">
+            <a:ext uri="{909E8E84-426E-40DD-AFC4-6F175D3DCCD1}">
               <a14:hiddenFill xmlns:a14="http://schemas.microsoft.com/office/drawing/2010/main">
                 <a:solidFill>
                   <a:srgbClr val="FFFFFF"/>
@@ -18334,7 +18230,7 @@
   <p:timing>
     <p:tnLst>
       <p:par>
-        <p:cTn xmlns:p14="http://schemas.microsoft.com/office/powerpoint/2010/main" id="1" dur="indefinite" restart="never" nodeType="tmRoot"/>
+        <p:cTn id="1" dur="indefinite" restart="never" nodeType="tmRoot"/>
       </p:par>
     </p:tnLst>
   </p:timing>
@@ -18530,7 +18426,7 @@
   <p:timing>
     <p:tnLst>
       <p:par>
-        <p:cTn xmlns:p14="http://schemas.microsoft.com/office/powerpoint/2010/main" id="1" dur="indefinite" restart="never" nodeType="tmRoot"/>
+        <p:cTn id="1" dur="indefinite" restart="never" nodeType="tmRoot"/>
       </p:par>
     </p:tnLst>
   </p:timing>
@@ -18601,7 +18497,7 @@
   <p:timing>
     <p:tnLst>
       <p:par>
-        <p:cTn xmlns:p14="http://schemas.microsoft.com/office/powerpoint/2010/main" id="1" dur="indefinite" restart="never" nodeType="tmRoot"/>
+        <p:cTn id="1" dur="indefinite" restart="never" nodeType="tmRoot"/>
       </p:par>
     </p:tnLst>
   </p:timing>

</xml_diff>

<commit_message>
Restored accidentally removed notes from slides
</commit_message>
<xml_diff>
--- a/con3638.pptx
+++ b/con3638.pptx
@@ -236,7 +236,7 @@
           <a:p>
             <a:fld id="{E99333BE-0D34-4F62-BD6E-2C3B14663373}" type="datetimeFigureOut">
               <a:rPr lang="en-US" smtClean="0"/>
-              <a:t>9/12/2013</a:t>
+              <a:t>9/13/2013</a:t>
             </a:fld>
             <a:endParaRPr lang="en-US"/>
           </a:p>
@@ -402,7 +402,7 @@
           <a:p>
             <a:fld id="{4A2D1F94-724F-43BD-B41B-43157E9B4550}" type="datetimeFigureOut">
               <a:rPr lang="en-US" smtClean="0"/>
-              <a:t>9/12/2013</a:t>
+              <a:t>9/13/2013</a:t>
             </a:fld>
             <a:endParaRPr lang="en-US"/>
           </a:p>
@@ -978,6 +978,23 @@
         <p:txBody>
           <a:bodyPr/>
           <a:lstStyle/>
+          <a:p>
+            <a:r>
+              <a:rPr lang="en-US" dirty="0" smtClean="0"/>
+              <a:t>PrimeFaces bundles</a:t>
+            </a:r>
+            <a:r>
+              <a:rPr lang="en-US" baseline="0" dirty="0" smtClean="0"/>
+              <a:t> over 100 JSF components that provide a rich UI experience with ajaxified architecture. It employs the JSF 2.0 standardized AJAX APIs on the server side and for the client side it uses jQuery for its javascript architecture. </a:t>
+            </a:r>
+          </a:p>
+          <a:p>
+            <a:r>
+              <a:rPr lang="en-US" baseline="0" dirty="0" smtClean="0"/>
+              <a:t>You can find nearly all the components that you might need to develop a web application, from a complex datatable to autocomplete, picklist and many others. The themes for all the components are managed in a centralized way with the help of the theme roller so structural and skinning CSS can be easily applied across the components. And With 4.0 release, codenamed sentinel, we are bringing some awesome features to the community like built-in client side validation infrastructure, which is compatible with the server side implementation, that exactly does what JSF do on the server side. The validation metadata is being held in HTML5 attributes. We are doing partial processing on the client side with javascript like JSF does on partial processing on the Ajax calls. We provide i18n for the validation messages. We provide the infrastructure to implement a custom client side validation mechanism. We also provide infrastructure to enable the client side validation on custom javascript events like keyup, blur and etc. All this can be enabled with a context parameter and I’ll show that in the demo. One of the coolest side to mention about is this validation mechanism also supports bean validation specification out of the box. So as you annotate your domain model with annotations like @Min @Max or @NotNull you will get the validation mechanism working on the client side instantly. The other feature that we’re bringing to the community with 4.0 is the Dialog Framework which enables to open an external xhtml page that gets generated dynamically at runtime. The same could be done via p:dialog component also but within dialog framework the pages gets created and destroyed programmatically at runtime. I’ll show a sample and ways to enable the dialog framework infrastructure with configuration. With PrimeFaces 4.0 we also provided drag drop ability between tree components which is a very cool feature in my opinion. Of course implementing this was not that easy. We also bundled many other cool features like deferred loading, sticky headers, new search expressions, the new file upload scrollable tabs and etc.</a:t>
+            </a:r>
+            <a:endParaRPr lang="en-US" dirty="0" smtClean="0"/>
+          </a:p>
           <a:p>
             <a:endParaRPr lang="en-US" dirty="0"/>
           </a:p>
@@ -14976,11 +14993,7 @@
             </a:r>
             <a:r>
               <a:rPr lang="en-US" dirty="0" smtClean="0"/>
-              <a:t>bpfcrudgen </a:t>
-            </a:r>
-            <a:r>
-              <a:rPr lang="en-US" dirty="0" smtClean="0"/>
-              <a:t>plugin: </a:t>
+              <a:t>bpfcrudgen plugin: </a:t>
             </a:r>
             <a:r>
               <a:rPr lang="en-US" dirty="0"/>
@@ -14990,21 +15003,12 @@
               <a:rPr lang="en-US" dirty="0" smtClean="0"/>
               <a:t>PrimeFaces</a:t>
             </a:r>
-            <a:endParaRPr lang="en-US" dirty="0" smtClean="0"/>
           </a:p>
           <a:p>
             <a:pPr fontAlgn="base"/>
             <a:r>
               <a:rPr lang="en-US" dirty="0" smtClean="0"/>
-              <a:t>Last feature – NetBeans </a:t>
-            </a:r>
-            <a:r>
-              <a:rPr lang="en-US" dirty="0" smtClean="0"/>
-              <a:t>7.3.1 </a:t>
-            </a:r>
-            <a:r>
-              <a:rPr lang="en-US" dirty="0" smtClean="0"/>
-              <a:t>generates </a:t>
+              <a:t>Last feature – NetBeans 7.3.1 generates </a:t>
             </a:r>
             <a:r>
               <a:rPr lang="en-US" dirty="0"/>
@@ -15030,15 +15034,7 @@
             <a:pPr lvl="1" fontAlgn="base"/>
             <a:r>
               <a:rPr lang="en-US" dirty="0" smtClean="0"/>
-              <a:t>Generate JSF </a:t>
-            </a:r>
-            <a:r>
-              <a:rPr lang="en-US" dirty="0" smtClean="0"/>
-              <a:t>pages </a:t>
-            </a:r>
-            <a:r>
-              <a:rPr lang="en-US" dirty="0" smtClean="0"/>
-              <a:t>from entities</a:t>
+              <a:t>Generate JSF pages from entities</a:t>
             </a:r>
           </a:p>
           <a:p>

</xml_diff>

<commit_message>
Incorporated initial notes into slides
</commit_message>
<xml_diff>
--- a/con3638.pptx
+++ b/con3638.pptx
@@ -756,6 +756,1329 @@
 </p:notes>
 </file>
 
+<file path=ppt/notesSlides/notesSlide10.xml><?xml version="1.0" encoding="utf-8"?>
+<p:notes xmlns:a="http://schemas.openxmlformats.org/drawingml/2006/main" xmlns:r="http://schemas.openxmlformats.org/officeDocument/2006/relationships" xmlns:p="http://schemas.openxmlformats.org/presentationml/2006/main">
+  <p:cSld>
+    <p:spTree>
+      <p:nvGrpSpPr>
+        <p:cNvPr id="1" name=""/>
+        <p:cNvGrpSpPr/>
+        <p:nvPr/>
+      </p:nvGrpSpPr>
+      <p:grpSpPr>
+        <a:xfrm>
+          <a:off x="0" y="0"/>
+          <a:ext cx="0" cy="0"/>
+          <a:chOff x="0" y="0"/>
+          <a:chExt cx="0" cy="0"/>
+        </a:xfrm>
+      </p:grpSpPr>
+      <p:sp>
+        <p:nvSpPr>
+          <p:cNvPr id="2" name="Slide Image Placeholder 1"/>
+          <p:cNvSpPr>
+            <a:spLocks noGrp="1" noRot="1" noChangeAspect="1"/>
+          </p:cNvSpPr>
+          <p:nvPr>
+            <p:ph type="sldImg"/>
+          </p:nvPr>
+        </p:nvSpPr>
+        <p:spPr/>
+      </p:sp>
+      <p:sp>
+        <p:nvSpPr>
+          <p:cNvPr id="3" name="Notes Placeholder 2"/>
+          <p:cNvSpPr>
+            <a:spLocks noGrp="1"/>
+          </p:cNvSpPr>
+          <p:nvPr>
+            <p:ph type="body" idx="1"/>
+          </p:nvPr>
+        </p:nvSpPr>
+        <p:spPr/>
+        <p:txBody>
+          <a:bodyPr/>
+          <a:lstStyle/>
+          <a:p>
+            <a:r>
+              <a:rPr lang="en-US" dirty="0" smtClean="0"/>
+              <a:t>PrimeFaces bundles</a:t>
+            </a:r>
+            <a:r>
+              <a:rPr lang="en-US" baseline="0" dirty="0" smtClean="0"/>
+              <a:t> over 100 JSF components that provide a rich UI experience with ajaxified architecture. It employs the JSF 2.0 standardized AJAX APIs on the server side and for the client side it uses jQuery for its javascript architecture. </a:t>
+            </a:r>
+          </a:p>
+          <a:p>
+            <a:r>
+              <a:rPr lang="en-US" baseline="0" dirty="0" smtClean="0"/>
+              <a:t>You can find nearly all the components that you might need to develop a web application, from a complex datatable to autocomplete, picklist and many others. The themes for all the components are managed in a centralized way with the help of the theme roller so structural and skinning CSS can be easily applied across the components. And With 4.0 release, codenamed sentinel, we are bringing some awesome features to the community like built-in client side validation infrastructure, which is compatible with the server side implementation, that exactly does what JSF do on the server side. The validation metadata is being held in HTML5 attributes. We are doing partial processing on the client side with javascript like JSF does on partial processing on the Ajax calls. We provide i18n for the validation messages. We provide the infrastructure to implement a custom client side validation mechanism. We also provide infrastructure to enable the client side validation on custom javascript events like keyup, blur and etc. All this can be enabled with a context parameter and I’ll show that in the demo. One of the coolest side to mention about is this validation mechanism also supports bean validation specification out of the box. So as you annotate your domain model with annotations like @Min @Max or @NotNull you will get the validation mechanism working on the client side instantly. The other feature that we’re bringing to the community with 4.0 is the Dialog Framework which enables to open an external xhtml page that gets generated dynamically at runtime. The same could be done via p:dialog component also but within dialog framework the pages gets created and destroyed programmatically at runtime. I’ll show a sample and ways to enable the dialog framework infrastructure with configuration. With PrimeFaces 4.0 we also provided drag drop ability between tree components which is a very cool feature in my opinion. Of course implementing this was not that easy. We also bundled many other cool features like deferred loading, sticky headers, new search expressions, the new file upload scrollable tabs and etc.</a:t>
+            </a:r>
+            <a:endParaRPr lang="en-US" dirty="0" smtClean="0"/>
+          </a:p>
+          <a:p>
+            <a:endParaRPr lang="en-US" dirty="0"/>
+          </a:p>
+        </p:txBody>
+      </p:sp>
+      <p:sp>
+        <p:nvSpPr>
+          <p:cNvPr id="4" name="Slide Number Placeholder 3"/>
+          <p:cNvSpPr>
+            <a:spLocks noGrp="1"/>
+          </p:cNvSpPr>
+          <p:nvPr>
+            <p:ph type="sldNum" sz="quarter" idx="10"/>
+          </p:nvPr>
+        </p:nvSpPr>
+        <p:spPr/>
+        <p:txBody>
+          <a:bodyPr/>
+          <a:lstStyle/>
+          <a:p>
+            <a:fld id="{36E82501-53DA-4152-84B0-51135B15EEA8}" type="slidenum">
+              <a:rPr lang="en-US" smtClean="0"/>
+              <a:t>19</a:t>
+            </a:fld>
+            <a:endParaRPr lang="en-US"/>
+          </a:p>
+        </p:txBody>
+      </p:sp>
+    </p:spTree>
+    <p:extLst>
+      <p:ext uri="{BB962C8B-B14F-4D97-AF65-F5344CB8AC3E}">
+        <p14:creationId xmlns:p14="http://schemas.microsoft.com/office/powerpoint/2010/main" val="2873911702"/>
+      </p:ext>
+    </p:extLst>
+  </p:cSld>
+  <p:clrMapOvr>
+    <a:masterClrMapping/>
+  </p:clrMapOvr>
+</p:notes>
+</file>
+
+<file path=ppt/notesSlides/notesSlide11.xml><?xml version="1.0" encoding="utf-8"?>
+<p:notes xmlns:a="http://schemas.openxmlformats.org/drawingml/2006/main" xmlns:r="http://schemas.openxmlformats.org/officeDocument/2006/relationships" xmlns:p="http://schemas.openxmlformats.org/presentationml/2006/main">
+  <p:cSld>
+    <p:spTree>
+      <p:nvGrpSpPr>
+        <p:cNvPr id="1" name=""/>
+        <p:cNvGrpSpPr/>
+        <p:nvPr/>
+      </p:nvGrpSpPr>
+      <p:grpSpPr>
+        <a:xfrm>
+          <a:off x="0" y="0"/>
+          <a:ext cx="0" cy="0"/>
+          <a:chOff x="0" y="0"/>
+          <a:chExt cx="0" cy="0"/>
+        </a:xfrm>
+      </p:grpSpPr>
+      <p:sp>
+        <p:nvSpPr>
+          <p:cNvPr id="2" name="Slide Image Placeholder 1"/>
+          <p:cNvSpPr>
+            <a:spLocks noGrp="1" noRot="1" noChangeAspect="1"/>
+          </p:cNvSpPr>
+          <p:nvPr>
+            <p:ph type="sldImg"/>
+          </p:nvPr>
+        </p:nvSpPr>
+        <p:spPr/>
+      </p:sp>
+      <p:sp>
+        <p:nvSpPr>
+          <p:cNvPr id="3" name="Notes Placeholder 2"/>
+          <p:cNvSpPr>
+            <a:spLocks noGrp="1"/>
+          </p:cNvSpPr>
+          <p:nvPr>
+            <p:ph type="body" idx="1"/>
+          </p:nvPr>
+        </p:nvSpPr>
+        <p:spPr/>
+        <p:txBody>
+          <a:bodyPr/>
+          <a:lstStyle/>
+          <a:p>
+            <a:r>
+              <a:rPr lang="en-US" sz="1200" kern="1200" dirty="0" smtClean="0">
+                <a:solidFill>
+                  <a:schemeClr val="tx1"/>
+                </a:solidFill>
+                <a:latin typeface="+mn-lt"/>
+                <a:ea typeface="+mn-ea"/>
+                <a:cs typeface="+mn-cs"/>
+              </a:rPr>
+              <a:t>Long time ago, the initial idea for this feature was to generate scaffolding of an application from database to illustrate how to use Java EE technologies together.</a:t>
+            </a:r>
+            <a:r>
+              <a:rPr lang="en-US" sz="1200" kern="1200" baseline="0" dirty="0" smtClean="0">
+                <a:solidFill>
+                  <a:schemeClr val="tx1"/>
+                </a:solidFill>
+                <a:latin typeface="+mn-lt"/>
+                <a:ea typeface="+mn-ea"/>
+                <a:cs typeface="+mn-cs"/>
+              </a:rPr>
+              <a:t> </a:t>
+            </a:r>
+            <a:r>
+              <a:rPr lang="en-US" sz="1200" kern="1200" dirty="0" smtClean="0">
+                <a:solidFill>
+                  <a:schemeClr val="tx1"/>
+                </a:solidFill>
+                <a:latin typeface="+mn-lt"/>
+                <a:ea typeface="+mn-ea"/>
+                <a:cs typeface="+mn-cs"/>
+              </a:rPr>
+              <a:t>This feature was periodically improved. Now, of course, you can generate Facelets, but also customize templates to be generated and lastly it came with generation of the CDI artifacts if</a:t>
+            </a:r>
+            <a:r>
+              <a:rPr lang="en-US" sz="1200" kern="1200" baseline="0" dirty="0" smtClean="0">
+                <a:solidFill>
+                  <a:schemeClr val="tx1"/>
+                </a:solidFill>
+                <a:latin typeface="+mn-lt"/>
+                <a:ea typeface="+mn-ea"/>
+                <a:cs typeface="+mn-cs"/>
+              </a:rPr>
+              <a:t> suitable</a:t>
+            </a:r>
+            <a:r>
+              <a:rPr lang="en-US" sz="1200" kern="1200" dirty="0" smtClean="0">
+                <a:solidFill>
+                  <a:schemeClr val="tx1"/>
+                </a:solidFill>
+                <a:latin typeface="+mn-lt"/>
+                <a:ea typeface="+mn-ea"/>
+                <a:cs typeface="+mn-cs"/>
+              </a:rPr>
+              <a:t>. Into next version of the IDE there are plans for generation</a:t>
+            </a:r>
+            <a:r>
+              <a:rPr lang="en-US" sz="1200" kern="1200" baseline="0" dirty="0" smtClean="0">
+                <a:solidFill>
+                  <a:schemeClr val="tx1"/>
+                </a:solidFill>
+                <a:latin typeface="+mn-lt"/>
+                <a:ea typeface="+mn-ea"/>
+                <a:cs typeface="+mn-cs"/>
+              </a:rPr>
+              <a:t> of </a:t>
+            </a:r>
+            <a:r>
+              <a:rPr lang="en-US" sz="1200" kern="1200" dirty="0" smtClean="0">
+                <a:solidFill>
+                  <a:schemeClr val="tx1"/>
+                </a:solidFill>
+                <a:latin typeface="+mn-lt"/>
+                <a:ea typeface="+mn-ea"/>
+                <a:cs typeface="+mn-cs"/>
+              </a:rPr>
+              <a:t>PrimeFaces templates directly.</a:t>
+            </a:r>
+          </a:p>
+          <a:p>
+            <a:endParaRPr lang="en-US" dirty="0"/>
+          </a:p>
+        </p:txBody>
+      </p:sp>
+      <p:sp>
+        <p:nvSpPr>
+          <p:cNvPr id="4" name="Slide Number Placeholder 3"/>
+          <p:cNvSpPr>
+            <a:spLocks noGrp="1"/>
+          </p:cNvSpPr>
+          <p:nvPr>
+            <p:ph type="sldNum" sz="quarter" idx="10"/>
+          </p:nvPr>
+        </p:nvSpPr>
+        <p:spPr/>
+        <p:txBody>
+          <a:bodyPr/>
+          <a:lstStyle/>
+          <a:p>
+            <a:fld id="{36E82501-53DA-4152-84B0-51135B15EEA8}" type="slidenum">
+              <a:rPr lang="en-US" smtClean="0"/>
+              <a:t>28</a:t>
+            </a:fld>
+            <a:endParaRPr lang="en-US"/>
+          </a:p>
+        </p:txBody>
+      </p:sp>
+    </p:spTree>
+    <p:extLst>
+      <p:ext uri="{BB962C8B-B14F-4D97-AF65-F5344CB8AC3E}">
+        <p14:creationId xmlns:p14="http://schemas.microsoft.com/office/powerpoint/2010/main" val="1456231099"/>
+      </p:ext>
+    </p:extLst>
+  </p:cSld>
+  <p:clrMapOvr>
+    <a:masterClrMapping/>
+  </p:clrMapOvr>
+</p:notes>
+</file>
+
+<file path=ppt/notesSlides/notesSlide12.xml><?xml version="1.0" encoding="utf-8"?>
+<p:notes xmlns:a="http://schemas.openxmlformats.org/drawingml/2006/main" xmlns:r="http://schemas.openxmlformats.org/officeDocument/2006/relationships" xmlns:p="http://schemas.openxmlformats.org/presentationml/2006/main">
+  <p:cSld>
+    <p:spTree>
+      <p:nvGrpSpPr>
+        <p:cNvPr id="1" name=""/>
+        <p:cNvGrpSpPr/>
+        <p:nvPr/>
+      </p:nvGrpSpPr>
+      <p:grpSpPr>
+        <a:xfrm>
+          <a:off x="0" y="0"/>
+          <a:ext cx="0" cy="0"/>
+          <a:chOff x="0" y="0"/>
+          <a:chExt cx="0" cy="0"/>
+        </a:xfrm>
+      </p:grpSpPr>
+      <p:sp>
+        <p:nvSpPr>
+          <p:cNvPr id="2" name="Slide Image Placeholder 1"/>
+          <p:cNvSpPr>
+            <a:spLocks noGrp="1" noRot="1" noChangeAspect="1"/>
+          </p:cNvSpPr>
+          <p:nvPr>
+            <p:ph type="sldImg"/>
+          </p:nvPr>
+        </p:nvSpPr>
+        <p:spPr/>
+      </p:sp>
+      <p:sp>
+        <p:nvSpPr>
+          <p:cNvPr id="3" name="Notes Placeholder 2"/>
+          <p:cNvSpPr>
+            <a:spLocks noGrp="1"/>
+          </p:cNvSpPr>
+          <p:nvPr>
+            <p:ph type="body" idx="1"/>
+          </p:nvPr>
+        </p:nvSpPr>
+        <p:spPr/>
+        <p:txBody>
+          <a:bodyPr/>
+          <a:lstStyle/>
+          <a:p>
+            <a:r>
+              <a:rPr lang="en-US" sz="1200" kern="1200" dirty="0" smtClean="0">
+                <a:solidFill>
+                  <a:schemeClr val="tx1"/>
+                </a:solidFill>
+                <a:latin typeface="+mn-lt"/>
+                <a:ea typeface="+mn-ea"/>
+                <a:cs typeface="+mn-cs"/>
+              </a:rPr>
+              <a:t>I</a:t>
+            </a:r>
+            <a:r>
+              <a:rPr lang="en-US" sz="1200" kern="1200" baseline="0" dirty="0" smtClean="0">
+                <a:solidFill>
+                  <a:schemeClr val="tx1"/>
+                </a:solidFill>
+                <a:latin typeface="+mn-lt"/>
+                <a:ea typeface="+mn-ea"/>
+                <a:cs typeface="+mn-cs"/>
+              </a:rPr>
+              <a:t> w</a:t>
+            </a:r>
+            <a:r>
+              <a:rPr lang="en-US" sz="1200" kern="1200" dirty="0" smtClean="0">
+                <a:solidFill>
+                  <a:schemeClr val="tx1"/>
+                </a:solidFill>
+                <a:latin typeface="+mn-lt"/>
+                <a:ea typeface="+mn-ea"/>
+                <a:cs typeface="+mn-cs"/>
+              </a:rPr>
+              <a:t>ill show you that even in the current</a:t>
+            </a:r>
+            <a:r>
+              <a:rPr lang="en-US" sz="1200" kern="1200" baseline="0" dirty="0" smtClean="0">
+                <a:solidFill>
+                  <a:schemeClr val="tx1"/>
+                </a:solidFill>
+                <a:latin typeface="+mn-lt"/>
+                <a:ea typeface="+mn-ea"/>
+                <a:cs typeface="+mn-cs"/>
+              </a:rPr>
+              <a:t> version of NetBeans you </a:t>
+            </a:r>
+            <a:r>
+              <a:rPr lang="en-US" sz="1200" kern="1200" dirty="0" smtClean="0">
+                <a:solidFill>
+                  <a:schemeClr val="tx1"/>
+                </a:solidFill>
+                <a:latin typeface="+mn-lt"/>
+                <a:ea typeface="+mn-ea"/>
+                <a:cs typeface="+mn-cs"/>
+              </a:rPr>
+              <a:t>could generate PrimeFaces CRUD application using the 3rd party plugin available on</a:t>
+            </a:r>
+            <a:r>
+              <a:rPr lang="en-US" sz="1200" kern="1200" baseline="0" dirty="0" smtClean="0">
+                <a:solidFill>
+                  <a:schemeClr val="tx1"/>
+                </a:solidFill>
+                <a:latin typeface="+mn-lt"/>
+                <a:ea typeface="+mn-ea"/>
+                <a:cs typeface="+mn-cs"/>
+              </a:rPr>
+              <a:t> the GitHub from Kay Wrobel</a:t>
+            </a:r>
+            <a:r>
+              <a:rPr lang="en-US" sz="1200" kern="1200" dirty="0" smtClean="0">
+                <a:solidFill>
+                  <a:schemeClr val="tx1"/>
+                </a:solidFill>
+                <a:latin typeface="+mn-lt"/>
+                <a:ea typeface="+mn-ea"/>
+                <a:cs typeface="+mn-cs"/>
+              </a:rPr>
+              <a:t>.</a:t>
+            </a:r>
+          </a:p>
+          <a:p>
+            <a:endParaRPr lang="en-US" sz="1200" kern="1200" dirty="0" smtClean="0">
+              <a:solidFill>
+                <a:schemeClr val="tx1"/>
+              </a:solidFill>
+              <a:latin typeface="+mn-lt"/>
+              <a:ea typeface="+mn-ea"/>
+              <a:cs typeface="+mn-cs"/>
+            </a:endParaRPr>
+          </a:p>
+          <a:p>
+            <a:r>
+              <a:rPr lang="en-US" sz="1200" kern="1200" dirty="0" smtClean="0">
+                <a:solidFill>
+                  <a:schemeClr val="tx1"/>
+                </a:solidFill>
+                <a:latin typeface="+mn-lt"/>
+                <a:ea typeface="+mn-ea"/>
+                <a:cs typeface="+mn-cs"/>
+              </a:rPr>
+              <a:t>I already</a:t>
+            </a:r>
+            <a:r>
+              <a:rPr lang="en-US" sz="1200" kern="1200" baseline="0" dirty="0" smtClean="0">
+                <a:solidFill>
+                  <a:schemeClr val="tx1"/>
+                </a:solidFill>
+                <a:latin typeface="+mn-lt"/>
+                <a:ea typeface="+mn-ea"/>
+                <a:cs typeface="+mn-cs"/>
+              </a:rPr>
+              <a:t> installed that plugin. Now, I’ll create web project with setup of Java EE 7, JSF 2.2 and PrimeFaces. Into that project and I’m going to generate Entity Classes from Database. If you need only entities you are done or also you can generate controller layer of the application using Session beans for entity classes or vanilla JSFs using JSF pages wizard. We are going to create PrimeFaces application. I’ll keep defaults and generate all sources. We will deploy that project on the GlassFish 4 and we can try out our skeleton for the application. Of course now it would come time for updates in templates or application logic to customize that to your needs.</a:t>
+            </a:r>
+            <a:endParaRPr lang="en-US" dirty="0"/>
+          </a:p>
+        </p:txBody>
+      </p:sp>
+      <p:sp>
+        <p:nvSpPr>
+          <p:cNvPr id="4" name="Slide Number Placeholder 3"/>
+          <p:cNvSpPr>
+            <a:spLocks noGrp="1"/>
+          </p:cNvSpPr>
+          <p:nvPr>
+            <p:ph type="sldNum" sz="quarter" idx="10"/>
+          </p:nvPr>
+        </p:nvSpPr>
+        <p:spPr/>
+        <p:txBody>
+          <a:bodyPr/>
+          <a:lstStyle/>
+          <a:p>
+            <a:fld id="{36E82501-53DA-4152-84B0-51135B15EEA8}" type="slidenum">
+              <a:rPr lang="en-US" smtClean="0"/>
+              <a:t>29</a:t>
+            </a:fld>
+            <a:endParaRPr lang="en-US"/>
+          </a:p>
+        </p:txBody>
+      </p:sp>
+    </p:spTree>
+    <p:extLst>
+      <p:ext uri="{BB962C8B-B14F-4D97-AF65-F5344CB8AC3E}">
+        <p14:creationId xmlns:p14="http://schemas.microsoft.com/office/powerpoint/2010/main" val="2267876327"/>
+      </p:ext>
+    </p:extLst>
+  </p:cSld>
+  <p:clrMapOvr>
+    <a:masterClrMapping/>
+  </p:clrMapOvr>
+</p:notes>
+</file>
+
+<file path=ppt/notesSlides/notesSlide13.xml><?xml version="1.0" encoding="utf-8"?>
+<p:notes xmlns:a="http://schemas.openxmlformats.org/drawingml/2006/main" xmlns:r="http://schemas.openxmlformats.org/officeDocument/2006/relationships" xmlns:p="http://schemas.openxmlformats.org/presentationml/2006/main">
+  <p:cSld>
+    <p:spTree>
+      <p:nvGrpSpPr>
+        <p:cNvPr id="1" name=""/>
+        <p:cNvGrpSpPr/>
+        <p:nvPr/>
+      </p:nvGrpSpPr>
+      <p:grpSpPr>
+        <a:xfrm>
+          <a:off x="0" y="0"/>
+          <a:ext cx="0" cy="0"/>
+          <a:chOff x="0" y="0"/>
+          <a:chExt cx="0" cy="0"/>
+        </a:xfrm>
+      </p:grpSpPr>
+      <p:sp>
+        <p:nvSpPr>
+          <p:cNvPr id="2" name="Slide Image Placeholder 1"/>
+          <p:cNvSpPr>
+            <a:spLocks noGrp="1" noRot="1" noChangeAspect="1"/>
+          </p:cNvSpPr>
+          <p:nvPr>
+            <p:ph type="sldImg"/>
+          </p:nvPr>
+        </p:nvSpPr>
+        <p:spPr/>
+      </p:sp>
+      <p:sp>
+        <p:nvSpPr>
+          <p:cNvPr id="3" name="Notes Placeholder 2"/>
+          <p:cNvSpPr>
+            <a:spLocks noGrp="1"/>
+          </p:cNvSpPr>
+          <p:nvPr>
+            <p:ph type="body" idx="1"/>
+          </p:nvPr>
+        </p:nvSpPr>
+        <p:spPr/>
+        <p:txBody>
+          <a:bodyPr/>
+          <a:lstStyle/>
+          <a:p>
+            <a:r>
+              <a:rPr lang="en-US" sz="1200" kern="1200" dirty="0" smtClean="0">
+                <a:solidFill>
+                  <a:schemeClr val="tx1"/>
+                </a:solidFill>
+                <a:latin typeface="+mn-lt"/>
+                <a:ea typeface="+mn-ea"/>
+                <a:cs typeface="+mn-cs"/>
+              </a:rPr>
+              <a:t>As it's described on the slides. We are speaking about series of screen with one start point and one or more return nodes.</a:t>
+            </a:r>
+            <a:r>
+              <a:rPr lang="en-US" sz="1200" kern="1200" baseline="0" dirty="0" smtClean="0">
+                <a:solidFill>
+                  <a:schemeClr val="tx1"/>
+                </a:solidFill>
+                <a:latin typeface="+mn-lt"/>
+                <a:ea typeface="+mn-ea"/>
+                <a:cs typeface="+mn-cs"/>
+              </a:rPr>
+              <a:t> But o</a:t>
+            </a:r>
+            <a:r>
+              <a:rPr lang="en-US" sz="1200" kern="1200" dirty="0" smtClean="0">
+                <a:solidFill>
+                  <a:schemeClr val="tx1"/>
+                </a:solidFill>
+                <a:latin typeface="+mn-lt"/>
+                <a:ea typeface="+mn-ea"/>
+                <a:cs typeface="+mn-cs"/>
+              </a:rPr>
+              <a:t>f course it can much more than just navigation through screens. You can specify to call method at specific action or when the flow starts or finishes. You can even call another flow defined in your app and set parameters to be shared.</a:t>
+            </a:r>
+          </a:p>
+          <a:p>
+            <a:endParaRPr lang="en-US" sz="1200" kern="1200" dirty="0" smtClean="0">
+              <a:solidFill>
+                <a:schemeClr val="tx1"/>
+              </a:solidFill>
+              <a:latin typeface="+mn-lt"/>
+              <a:ea typeface="+mn-ea"/>
+              <a:cs typeface="+mn-cs"/>
+            </a:endParaRPr>
+          </a:p>
+          <a:p>
+            <a:r>
+              <a:rPr lang="en-US" sz="1200" kern="1200" dirty="0" smtClean="0">
+                <a:solidFill>
+                  <a:schemeClr val="tx1"/>
+                </a:solidFill>
+                <a:latin typeface="+mn-lt"/>
+                <a:ea typeface="+mn-ea"/>
+                <a:cs typeface="+mn-cs"/>
+              </a:rPr>
+              <a:t>BTW, this is one of the places JSF 2.2 where is JSF bound with the CDI specification. The API introduces new annotation @FlowScoped which is CDI scope that defines scope within the specified flow. When you leave any flow relevant</a:t>
+            </a:r>
+            <a:r>
+              <a:rPr lang="en-US" sz="1200" kern="1200" baseline="0" dirty="0" smtClean="0">
+                <a:solidFill>
+                  <a:schemeClr val="tx1"/>
+                </a:solidFill>
+                <a:latin typeface="+mn-lt"/>
+                <a:ea typeface="+mn-ea"/>
+                <a:cs typeface="+mn-cs"/>
+              </a:rPr>
+              <a:t> </a:t>
+            </a:r>
+            <a:r>
+              <a:rPr lang="en-US" sz="1200" kern="1200" dirty="0" smtClean="0">
+                <a:solidFill>
+                  <a:schemeClr val="tx1"/>
+                </a:solidFill>
+                <a:latin typeface="+mn-lt"/>
+                <a:ea typeface="+mn-ea"/>
+                <a:cs typeface="+mn-cs"/>
+              </a:rPr>
+              <a:t>annotated beans are disintegrated.</a:t>
+            </a:r>
+          </a:p>
+          <a:p>
+            <a:endParaRPr lang="en-US" sz="1200" kern="1200" dirty="0" smtClean="0">
+              <a:solidFill>
+                <a:schemeClr val="tx1"/>
+              </a:solidFill>
+              <a:latin typeface="+mn-lt"/>
+              <a:ea typeface="+mn-ea"/>
+              <a:cs typeface="+mn-cs"/>
+            </a:endParaRPr>
+          </a:p>
+          <a:p>
+            <a:r>
+              <a:rPr lang="en-US" sz="1200" kern="1200" dirty="0" smtClean="0">
+                <a:solidFill>
+                  <a:schemeClr val="tx1"/>
+                </a:solidFill>
+                <a:latin typeface="+mn-lt"/>
+                <a:ea typeface="+mn-ea"/>
+                <a:cs typeface="+mn-cs"/>
+              </a:rPr>
+              <a:t>Setup of these flows you can do inside the JSF configuration files or you can also build the flow using FlowBuilder object within annotatted Java method.</a:t>
+            </a:r>
+            <a:endParaRPr lang="en-US" dirty="0"/>
+          </a:p>
+        </p:txBody>
+      </p:sp>
+      <p:sp>
+        <p:nvSpPr>
+          <p:cNvPr id="4" name="Slide Number Placeholder 3"/>
+          <p:cNvSpPr>
+            <a:spLocks noGrp="1"/>
+          </p:cNvSpPr>
+          <p:nvPr>
+            <p:ph type="sldNum" sz="quarter" idx="10"/>
+          </p:nvPr>
+        </p:nvSpPr>
+        <p:spPr/>
+        <p:txBody>
+          <a:bodyPr/>
+          <a:lstStyle/>
+          <a:p>
+            <a:fld id="{36E82501-53DA-4152-84B0-51135B15EEA8}" type="slidenum">
+              <a:rPr lang="en-US" smtClean="0"/>
+              <a:t>31</a:t>
+            </a:fld>
+            <a:endParaRPr lang="en-US"/>
+          </a:p>
+        </p:txBody>
+      </p:sp>
+    </p:spTree>
+    <p:extLst>
+      <p:ext uri="{BB962C8B-B14F-4D97-AF65-F5344CB8AC3E}">
+        <p14:creationId xmlns:p14="http://schemas.microsoft.com/office/powerpoint/2010/main" val="1097235293"/>
+      </p:ext>
+    </p:extLst>
+  </p:cSld>
+  <p:clrMapOvr>
+    <a:masterClrMapping/>
+  </p:clrMapOvr>
+</p:notes>
+</file>
+
+<file path=ppt/notesSlides/notesSlide14.xml><?xml version="1.0" encoding="utf-8"?>
+<p:notes xmlns:a="http://schemas.openxmlformats.org/drawingml/2006/main" xmlns:r="http://schemas.openxmlformats.org/officeDocument/2006/relationships" xmlns:p="http://schemas.openxmlformats.org/presentationml/2006/main">
+  <p:cSld>
+    <p:spTree>
+      <p:nvGrpSpPr>
+        <p:cNvPr id="1" name=""/>
+        <p:cNvGrpSpPr/>
+        <p:nvPr/>
+      </p:nvGrpSpPr>
+      <p:grpSpPr>
+        <a:xfrm>
+          <a:off x="0" y="0"/>
+          <a:ext cx="0" cy="0"/>
+          <a:chOff x="0" y="0"/>
+          <a:chExt cx="0" cy="0"/>
+        </a:xfrm>
+      </p:grpSpPr>
+      <p:sp>
+        <p:nvSpPr>
+          <p:cNvPr id="2" name="Slide Image Placeholder 1"/>
+          <p:cNvSpPr>
+            <a:spLocks noGrp="1" noRot="1" noChangeAspect="1"/>
+          </p:cNvSpPr>
+          <p:nvPr>
+            <p:ph type="sldImg"/>
+          </p:nvPr>
+        </p:nvSpPr>
+        <p:spPr/>
+      </p:sp>
+      <p:sp>
+        <p:nvSpPr>
+          <p:cNvPr id="3" name="Notes Placeholder 2"/>
+          <p:cNvSpPr>
+            <a:spLocks noGrp="1"/>
+          </p:cNvSpPr>
+          <p:nvPr>
+            <p:ph type="body" idx="1"/>
+          </p:nvPr>
+        </p:nvSpPr>
+        <p:spPr/>
+        <p:txBody>
+          <a:bodyPr/>
+          <a:lstStyle/>
+          <a:p>
+            <a:r>
+              <a:rPr lang="en-US" sz="1200" kern="1200" dirty="0" smtClean="0">
+                <a:solidFill>
+                  <a:schemeClr val="tx1"/>
+                </a:solidFill>
+                <a:latin typeface="+mn-lt"/>
+                <a:ea typeface="+mn-ea"/>
+                <a:cs typeface="+mn-cs"/>
+              </a:rPr>
+              <a:t>Here we will show usage of several navigation elements, bean limited to the flow scope and also Faces Flow bundled as a library inside .JAR file.</a:t>
+            </a:r>
+          </a:p>
+          <a:p>
+            <a:endParaRPr lang="en-US" sz="1200" kern="1200" dirty="0" smtClean="0">
+              <a:solidFill>
+                <a:schemeClr val="tx1"/>
+              </a:solidFill>
+              <a:latin typeface="+mn-lt"/>
+              <a:ea typeface="+mn-ea"/>
+              <a:cs typeface="+mn-cs"/>
+            </a:endParaRPr>
+          </a:p>
+          <a:p>
+            <a:r>
+              <a:rPr lang="en-US" sz="1200" kern="1200" dirty="0" smtClean="0">
+                <a:solidFill>
+                  <a:schemeClr val="tx1"/>
+                </a:solidFill>
+                <a:latin typeface="+mn-lt"/>
+                <a:ea typeface="+mn-ea"/>
+                <a:cs typeface="+mn-cs"/>
+              </a:rPr>
+              <a:t>Let's go to the CredentialsFlow class which produces</a:t>
+            </a:r>
+            <a:r>
+              <a:rPr lang="en-US" sz="1200" kern="1200" baseline="0" dirty="0" smtClean="0">
+                <a:solidFill>
+                  <a:schemeClr val="tx1"/>
+                </a:solidFill>
+                <a:latin typeface="+mn-lt"/>
+                <a:ea typeface="+mn-ea"/>
+                <a:cs typeface="+mn-cs"/>
+              </a:rPr>
+              <a:t> f</a:t>
+            </a:r>
+            <a:r>
+              <a:rPr lang="en-US" sz="1200" kern="1200" dirty="0" smtClean="0">
+                <a:solidFill>
+                  <a:schemeClr val="tx1"/>
+                </a:solidFill>
+                <a:latin typeface="+mn-lt"/>
+                <a:ea typeface="+mn-ea"/>
+                <a:cs typeface="+mn-cs"/>
+              </a:rPr>
+              <a:t>low definition. Here is set the flow's ID, return node which ends the flow lifecycle, standard view nodes which serves as a common</a:t>
+            </a:r>
+            <a:r>
+              <a:rPr lang="en-US" sz="1200" kern="1200" baseline="0" dirty="0" smtClean="0">
+                <a:solidFill>
+                  <a:schemeClr val="tx1"/>
+                </a:solidFill>
+                <a:latin typeface="+mn-lt"/>
+                <a:ea typeface="+mn-ea"/>
+                <a:cs typeface="+mn-cs"/>
+              </a:rPr>
+              <a:t> screen</a:t>
+            </a:r>
+            <a:r>
+              <a:rPr lang="en-US" sz="1200" kern="1200" dirty="0" smtClean="0">
+                <a:solidFill>
+                  <a:schemeClr val="tx1"/>
+                </a:solidFill>
+                <a:latin typeface="+mn-lt"/>
+                <a:ea typeface="+mn-ea"/>
+                <a:cs typeface="+mn-cs"/>
+              </a:rPr>
+              <a:t>, method call called on action restore which invokes this expression, finalizer called when leaving this flow</a:t>
+            </a:r>
+            <a:r>
+              <a:rPr lang="en-US" sz="1200" kern="1200" baseline="0" dirty="0" smtClean="0">
+                <a:solidFill>
+                  <a:schemeClr val="tx1"/>
+                </a:solidFill>
+                <a:latin typeface="+mn-lt"/>
+                <a:ea typeface="+mn-ea"/>
+                <a:cs typeface="+mn-cs"/>
+              </a:rPr>
+              <a:t> and</a:t>
+            </a:r>
+            <a:r>
+              <a:rPr lang="en-US" sz="1200" kern="1200" dirty="0" smtClean="0">
+                <a:solidFill>
+                  <a:schemeClr val="tx1"/>
+                </a:solidFill>
+                <a:latin typeface="+mn-lt"/>
+                <a:ea typeface="+mn-ea"/>
+                <a:cs typeface="+mn-cs"/>
+              </a:rPr>
+              <a:t> another flow call and parameters to be shared. FYI,</a:t>
+            </a:r>
+            <a:r>
+              <a:rPr lang="en-US" sz="1200" kern="1200" baseline="0" dirty="0" smtClean="0">
+                <a:solidFill>
+                  <a:schemeClr val="tx1"/>
+                </a:solidFill>
+                <a:latin typeface="+mn-lt"/>
+                <a:ea typeface="+mn-ea"/>
+                <a:cs typeface="+mn-cs"/>
+              </a:rPr>
+              <a:t> for simplification t</a:t>
+            </a:r>
+            <a:r>
+              <a:rPr lang="en-US" sz="1200" kern="1200" dirty="0" smtClean="0">
+                <a:solidFill>
+                  <a:schemeClr val="tx1"/>
+                </a:solidFill>
+                <a:latin typeface="+mn-lt"/>
+                <a:ea typeface="+mn-ea"/>
+                <a:cs typeface="+mn-cs"/>
+              </a:rPr>
+              <a:t>here exists also rules how to setup parts of the flow implicitly by templates naming.</a:t>
+            </a:r>
+          </a:p>
+          <a:p>
+            <a:endParaRPr lang="en-US" sz="1200" kern="1200" dirty="0" smtClean="0">
+              <a:solidFill>
+                <a:schemeClr val="tx1"/>
+              </a:solidFill>
+              <a:latin typeface="+mn-lt"/>
+              <a:ea typeface="+mn-ea"/>
+              <a:cs typeface="+mn-cs"/>
+            </a:endParaRPr>
+          </a:p>
+          <a:p>
+            <a:r>
+              <a:rPr lang="en-US" sz="1200" kern="1200" dirty="0" smtClean="0">
+                <a:solidFill>
+                  <a:schemeClr val="tx1"/>
+                </a:solidFill>
+                <a:latin typeface="+mn-lt"/>
+                <a:ea typeface="+mn-ea"/>
+                <a:cs typeface="+mn-cs"/>
+              </a:rPr>
+              <a:t>Now when I start the flow first screen appears. I can choose avatar which takes me to the second flow and passes parameter - my name</a:t>
+            </a:r>
+            <a:r>
+              <a:rPr lang="en-US" sz="1200" kern="1200" baseline="0" dirty="0" smtClean="0">
+                <a:solidFill>
+                  <a:schemeClr val="tx1"/>
+                </a:solidFill>
+                <a:latin typeface="+mn-lt"/>
+                <a:ea typeface="+mn-ea"/>
+                <a:cs typeface="+mn-cs"/>
+              </a:rPr>
+              <a:t> - </a:t>
+            </a:r>
+            <a:r>
+              <a:rPr lang="en-US" sz="1200" kern="1200" dirty="0" smtClean="0">
+                <a:solidFill>
+                  <a:schemeClr val="tx1"/>
+                </a:solidFill>
+                <a:latin typeface="+mn-lt"/>
+                <a:ea typeface="+mn-ea"/>
+                <a:cs typeface="+mn-cs"/>
+              </a:rPr>
+              <a:t>there. Now I'll setup avatar and send the information back to the flow Nr.1. Here I'll finish the wizard and check the registration summary. The button could invoke save to database and navigates me back to the index page. My PersonBean which stores values of the flow was FlowScoped. You can see that all informations are gone. Fortunately my finalizer method stored data into SessionScoped StorageBean and I can invoke restore of that information using the methodCall node. As you can see power of this feature is pretty impressive and it makes good sense to incorporate that into your application.</a:t>
+            </a:r>
+          </a:p>
+          <a:p>
+            <a:endParaRPr lang="en-US" sz="1200" kern="1200" dirty="0" smtClean="0">
+              <a:solidFill>
+                <a:schemeClr val="tx1"/>
+              </a:solidFill>
+              <a:latin typeface="+mn-lt"/>
+              <a:ea typeface="+mn-ea"/>
+              <a:cs typeface="+mn-cs"/>
+            </a:endParaRPr>
+          </a:p>
+          <a:p>
+            <a:r>
+              <a:rPr lang="en-US" sz="1200" kern="1200" dirty="0" smtClean="0">
+                <a:solidFill>
+                  <a:schemeClr val="tx1"/>
+                </a:solidFill>
+                <a:latin typeface="+mn-lt"/>
+                <a:ea typeface="+mn-ea"/>
+                <a:cs typeface="+mn-cs"/>
+              </a:rPr>
+              <a:t>I forgot to mention that the second flow was bundled as a library so I'm able prepare components to be reusable from any application.</a:t>
+            </a:r>
+            <a:endParaRPr lang="en-US" sz="1200" kern="1200" dirty="0" smtClean="0">
+              <a:solidFill>
+                <a:schemeClr val="tx1"/>
+              </a:solidFill>
+              <a:latin typeface="+mn-lt"/>
+              <a:ea typeface="+mn-ea"/>
+              <a:cs typeface="+mn-cs"/>
+            </a:endParaRPr>
+          </a:p>
+        </p:txBody>
+      </p:sp>
+      <p:sp>
+        <p:nvSpPr>
+          <p:cNvPr id="4" name="Slide Number Placeholder 3"/>
+          <p:cNvSpPr>
+            <a:spLocks noGrp="1"/>
+          </p:cNvSpPr>
+          <p:nvPr>
+            <p:ph type="sldNum" sz="quarter" idx="10"/>
+          </p:nvPr>
+        </p:nvSpPr>
+        <p:spPr/>
+        <p:txBody>
+          <a:bodyPr/>
+          <a:lstStyle/>
+          <a:p>
+            <a:fld id="{36E82501-53DA-4152-84B0-51135B15EEA8}" type="slidenum">
+              <a:rPr lang="en-US" smtClean="0"/>
+              <a:t>32</a:t>
+            </a:fld>
+            <a:endParaRPr lang="en-US"/>
+          </a:p>
+        </p:txBody>
+      </p:sp>
+    </p:spTree>
+    <p:extLst>
+      <p:ext uri="{BB962C8B-B14F-4D97-AF65-F5344CB8AC3E}">
+        <p14:creationId xmlns:p14="http://schemas.microsoft.com/office/powerpoint/2010/main" val="1251836"/>
+      </p:ext>
+    </p:extLst>
+  </p:cSld>
+  <p:clrMapOvr>
+    <a:masterClrMapping/>
+  </p:clrMapOvr>
+</p:notes>
+</file>
+
+<file path=ppt/notesSlides/notesSlide15.xml><?xml version="1.0" encoding="utf-8"?>
+<p:notes xmlns:a="http://schemas.openxmlformats.org/drawingml/2006/main" xmlns:r="http://schemas.openxmlformats.org/officeDocument/2006/relationships" xmlns:p="http://schemas.openxmlformats.org/presentationml/2006/main">
+  <p:cSld>
+    <p:spTree>
+      <p:nvGrpSpPr>
+        <p:cNvPr id="1" name=""/>
+        <p:cNvGrpSpPr/>
+        <p:nvPr/>
+      </p:nvGrpSpPr>
+      <p:grpSpPr>
+        <a:xfrm>
+          <a:off x="0" y="0"/>
+          <a:ext cx="0" cy="0"/>
+          <a:chOff x="0" y="0"/>
+          <a:chExt cx="0" cy="0"/>
+        </a:xfrm>
+      </p:grpSpPr>
+      <p:sp>
+        <p:nvSpPr>
+          <p:cNvPr id="2" name="Slide Image Placeholder 1"/>
+          <p:cNvSpPr>
+            <a:spLocks noGrp="1" noRot="1" noChangeAspect="1"/>
+          </p:cNvSpPr>
+          <p:nvPr>
+            <p:ph type="sldImg"/>
+          </p:nvPr>
+        </p:nvSpPr>
+        <p:spPr/>
+      </p:sp>
+      <p:sp>
+        <p:nvSpPr>
+          <p:cNvPr id="3" name="Notes Placeholder 2"/>
+          <p:cNvSpPr>
+            <a:spLocks noGrp="1"/>
+          </p:cNvSpPr>
+          <p:nvPr>
+            <p:ph type="body" idx="1"/>
+          </p:nvPr>
+        </p:nvSpPr>
+        <p:spPr/>
+        <p:txBody>
+          <a:bodyPr/>
+          <a:lstStyle/>
+          <a:p>
+            <a:r>
+              <a:rPr lang="en-US" sz="1200" kern="1200" dirty="0" smtClean="0">
+                <a:solidFill>
+                  <a:schemeClr val="tx1"/>
+                </a:solidFill>
+                <a:latin typeface="+mn-lt"/>
+                <a:ea typeface="+mn-ea"/>
+                <a:cs typeface="+mn-cs"/>
+              </a:rPr>
+              <a:t>Custom components were always big feature of the JSF framework since your simple element is able to create complex source and functionality. Let's see how this can be done with the latest specification. The</a:t>
+            </a:r>
+            <a:r>
+              <a:rPr lang="en-US" sz="1200" kern="1200" baseline="0" dirty="0" smtClean="0">
+                <a:solidFill>
+                  <a:schemeClr val="tx1"/>
+                </a:solidFill>
+                <a:latin typeface="+mn-lt"/>
+                <a:ea typeface="+mn-ea"/>
+                <a:cs typeface="+mn-cs"/>
+              </a:rPr>
+              <a:t> simplified registration </a:t>
+            </a:r>
+            <a:r>
+              <a:rPr lang="en-US" sz="1200" kern="1200" dirty="0" smtClean="0">
+                <a:solidFill>
+                  <a:schemeClr val="tx1"/>
+                </a:solidFill>
+                <a:latin typeface="+mn-lt"/>
+                <a:ea typeface="+mn-ea"/>
+                <a:cs typeface="+mn-cs"/>
+              </a:rPr>
+              <a:t>is based on the improved FacesComponent interface. You are able specify tag name, namespace or the flag saying create the tag handler which will process this tag in runtime. And the flag is the only parameter which needs to be set to use that component within your facelets. Rest of arguments can be defined implicitly - it can</a:t>
+            </a:r>
+            <a:r>
+              <a:rPr lang="en-US" sz="1200" kern="1200" baseline="0" dirty="0" smtClean="0">
+                <a:solidFill>
+                  <a:schemeClr val="tx1"/>
+                </a:solidFill>
+                <a:latin typeface="+mn-lt"/>
+                <a:ea typeface="+mn-ea"/>
+                <a:cs typeface="+mn-cs"/>
+              </a:rPr>
+              <a:t> </a:t>
+            </a:r>
+            <a:r>
+              <a:rPr lang="en-US" sz="1200" kern="1200" dirty="0" smtClean="0">
+                <a:solidFill>
+                  <a:schemeClr val="tx1"/>
+                </a:solidFill>
+                <a:latin typeface="+mn-lt"/>
+                <a:ea typeface="+mn-ea"/>
+                <a:cs typeface="+mn-cs"/>
+              </a:rPr>
+              <a:t>use default namespace or component name derived from the class name then.</a:t>
+            </a:r>
+          </a:p>
+          <a:p>
+            <a:endParaRPr lang="en-US" sz="1200" kern="1200" dirty="0" smtClean="0">
+              <a:solidFill>
+                <a:schemeClr val="tx1"/>
+              </a:solidFill>
+              <a:latin typeface="+mn-lt"/>
+              <a:ea typeface="+mn-ea"/>
+              <a:cs typeface="+mn-cs"/>
+            </a:endParaRPr>
+          </a:p>
+          <a:p>
+            <a:r>
+              <a:rPr lang="en-US" sz="1200" kern="1200" dirty="0" smtClean="0">
+                <a:solidFill>
+                  <a:schemeClr val="tx1"/>
+                </a:solidFill>
+                <a:latin typeface="+mn-lt"/>
+                <a:ea typeface="+mn-ea"/>
+                <a:cs typeface="+mn-cs"/>
+              </a:rPr>
+              <a:t>This means that it removes the last additional requirement for the component registration. You don't need any tag library definition file to register your component, you will define it simply using the createTag argument in the annotation. </a:t>
+            </a:r>
+          </a:p>
+          <a:p>
+            <a:endParaRPr lang="en-US" dirty="0"/>
+          </a:p>
+        </p:txBody>
+      </p:sp>
+      <p:sp>
+        <p:nvSpPr>
+          <p:cNvPr id="4" name="Slide Number Placeholder 3"/>
+          <p:cNvSpPr>
+            <a:spLocks noGrp="1"/>
+          </p:cNvSpPr>
+          <p:nvPr>
+            <p:ph type="sldNum" sz="quarter" idx="10"/>
+          </p:nvPr>
+        </p:nvSpPr>
+        <p:spPr/>
+        <p:txBody>
+          <a:bodyPr/>
+          <a:lstStyle/>
+          <a:p>
+            <a:fld id="{36E82501-53DA-4152-84B0-51135B15EEA8}" type="slidenum">
+              <a:rPr lang="en-US" smtClean="0"/>
+              <a:t>34</a:t>
+            </a:fld>
+            <a:endParaRPr lang="en-US"/>
+          </a:p>
+        </p:txBody>
+      </p:sp>
+    </p:spTree>
+    <p:extLst>
+      <p:ext uri="{BB962C8B-B14F-4D97-AF65-F5344CB8AC3E}">
+        <p14:creationId xmlns:p14="http://schemas.microsoft.com/office/powerpoint/2010/main" val="2462195857"/>
+      </p:ext>
+    </p:extLst>
+  </p:cSld>
+  <p:clrMapOvr>
+    <a:masterClrMapping/>
+  </p:clrMapOvr>
+</p:notes>
+</file>
+
+<file path=ppt/notesSlides/notesSlide16.xml><?xml version="1.0" encoding="utf-8"?>
+<p:notes xmlns:a="http://schemas.openxmlformats.org/drawingml/2006/main" xmlns:r="http://schemas.openxmlformats.org/officeDocument/2006/relationships" xmlns:p="http://schemas.openxmlformats.org/presentationml/2006/main">
+  <p:cSld>
+    <p:spTree>
+      <p:nvGrpSpPr>
+        <p:cNvPr id="1" name=""/>
+        <p:cNvGrpSpPr/>
+        <p:nvPr/>
+      </p:nvGrpSpPr>
+      <p:grpSpPr>
+        <a:xfrm>
+          <a:off x="0" y="0"/>
+          <a:ext cx="0" cy="0"/>
+          <a:chOff x="0" y="0"/>
+          <a:chExt cx="0" cy="0"/>
+        </a:xfrm>
+      </p:grpSpPr>
+      <p:sp>
+        <p:nvSpPr>
+          <p:cNvPr id="2" name="Slide Image Placeholder 1"/>
+          <p:cNvSpPr>
+            <a:spLocks noGrp="1" noRot="1" noChangeAspect="1"/>
+          </p:cNvSpPr>
+          <p:nvPr>
+            <p:ph type="sldImg"/>
+          </p:nvPr>
+        </p:nvSpPr>
+        <p:spPr/>
+      </p:sp>
+      <p:sp>
+        <p:nvSpPr>
+          <p:cNvPr id="3" name="Notes Placeholder 2"/>
+          <p:cNvSpPr>
+            <a:spLocks noGrp="1"/>
+          </p:cNvSpPr>
+          <p:nvPr>
+            <p:ph type="body" idx="1"/>
+          </p:nvPr>
+        </p:nvSpPr>
+        <p:spPr/>
+        <p:txBody>
+          <a:bodyPr/>
+          <a:lstStyle/>
+          <a:p>
+            <a:r>
+              <a:rPr lang="en-US" sz="1200" kern="1200" dirty="0" smtClean="0">
+                <a:solidFill>
+                  <a:schemeClr val="tx1"/>
+                </a:solidFill>
+                <a:latin typeface="+mn-lt"/>
+                <a:ea typeface="+mn-ea"/>
+                <a:cs typeface="+mn-cs"/>
+              </a:rPr>
+              <a:t>Let's show annotation based components within the project and inside external library .jar. Also I will show you that FacesComponents became CDI capable which proves that the JSF is moving closer to the CDI.</a:t>
+            </a:r>
+          </a:p>
+          <a:p>
+            <a:endParaRPr lang="en-US" sz="1200" kern="1200" dirty="0" smtClean="0">
+              <a:solidFill>
+                <a:schemeClr val="tx1"/>
+              </a:solidFill>
+              <a:latin typeface="+mn-lt"/>
+              <a:ea typeface="+mn-ea"/>
+              <a:cs typeface="+mn-cs"/>
+            </a:endParaRPr>
+          </a:p>
+          <a:p>
+            <a:r>
+              <a:rPr lang="en-US" sz="1200" kern="1200" dirty="0" smtClean="0">
+                <a:solidFill>
+                  <a:schemeClr val="tx1"/>
+                </a:solidFill>
+                <a:latin typeface="+mn-lt"/>
+                <a:ea typeface="+mn-ea"/>
+                <a:cs typeface="+mn-cs"/>
+              </a:rPr>
+              <a:t>We have index page which uses PrimeFaces clock component, my custom Clock component created within the web application and the same component bundled as a library. This local component is registered inside the default component namespace and uses implicit</a:t>
+            </a:r>
+            <a:r>
+              <a:rPr lang="en-US" sz="1200" kern="1200" baseline="0" dirty="0" smtClean="0">
+                <a:solidFill>
+                  <a:schemeClr val="tx1"/>
+                </a:solidFill>
+                <a:latin typeface="+mn-lt"/>
+                <a:ea typeface="+mn-ea"/>
+                <a:cs typeface="+mn-cs"/>
+              </a:rPr>
+              <a:t> naming</a:t>
+            </a:r>
+            <a:r>
+              <a:rPr lang="en-US" sz="1200" kern="1200" dirty="0" smtClean="0">
+                <a:solidFill>
+                  <a:schemeClr val="tx1"/>
+                </a:solidFill>
+                <a:latin typeface="+mn-lt"/>
+                <a:ea typeface="+mn-ea"/>
+                <a:cs typeface="+mn-cs"/>
+              </a:rPr>
+              <a:t>. It</a:t>
+            </a:r>
+            <a:r>
+              <a:rPr lang="en-US" sz="1200" kern="1200" baseline="0" dirty="0" smtClean="0">
+                <a:solidFill>
+                  <a:schemeClr val="tx1"/>
+                </a:solidFill>
+                <a:latin typeface="+mn-lt"/>
+                <a:ea typeface="+mn-ea"/>
+                <a:cs typeface="+mn-cs"/>
+              </a:rPr>
+              <a:t> means this is </a:t>
+            </a:r>
+            <a:r>
+              <a:rPr lang="en-US" sz="1200" kern="1200" dirty="0" smtClean="0">
+                <a:solidFill>
+                  <a:schemeClr val="tx1"/>
+                </a:solidFill>
+                <a:latin typeface="+mn-lt"/>
+                <a:ea typeface="+mn-ea"/>
+                <a:cs typeface="+mn-cs"/>
+              </a:rPr>
+              <a:t>the simplest possible Faces component registration. Tip for long winter evenings, try to create similar component using JSF 1.2.</a:t>
+            </a:r>
+            <a:endParaRPr lang="en-US" sz="1200" kern="1200" baseline="0" dirty="0" smtClean="0">
+              <a:solidFill>
+                <a:schemeClr val="tx1"/>
+              </a:solidFill>
+              <a:latin typeface="+mn-lt"/>
+              <a:ea typeface="+mn-ea"/>
+              <a:cs typeface="+mn-cs"/>
+            </a:endParaRPr>
+          </a:p>
+          <a:p>
+            <a:endParaRPr lang="en-US" sz="1200" kern="1200" baseline="0" dirty="0" smtClean="0">
+              <a:solidFill>
+                <a:schemeClr val="tx1"/>
+              </a:solidFill>
+              <a:latin typeface="+mn-lt"/>
+              <a:ea typeface="+mn-ea"/>
+              <a:cs typeface="+mn-cs"/>
+            </a:endParaRPr>
+          </a:p>
+          <a:p>
+            <a:r>
+              <a:rPr lang="en-US" sz="1200" kern="1200" dirty="0" smtClean="0">
+                <a:solidFill>
+                  <a:schemeClr val="tx1"/>
+                </a:solidFill>
+                <a:latin typeface="+mn-lt"/>
+                <a:ea typeface="+mn-ea"/>
+                <a:cs typeface="+mn-cs"/>
+              </a:rPr>
+              <a:t>The external component is placed inside the Java SE project. It uses explicit naming and namespace definition. The second difference is the injected utility class</a:t>
+            </a:r>
+            <a:r>
+              <a:rPr lang="en-US" sz="1200" kern="1200" baseline="0" dirty="0" smtClean="0">
+                <a:solidFill>
+                  <a:schemeClr val="tx1"/>
+                </a:solidFill>
+                <a:latin typeface="+mn-lt"/>
+                <a:ea typeface="+mn-ea"/>
+                <a:cs typeface="+mn-cs"/>
+              </a:rPr>
+              <a:t> which helps build source rendered by component.</a:t>
+            </a:r>
+            <a:endParaRPr lang="en-US" sz="1200" kern="1200" dirty="0" smtClean="0">
+              <a:solidFill>
+                <a:schemeClr val="tx1"/>
+              </a:solidFill>
+              <a:latin typeface="+mn-lt"/>
+              <a:ea typeface="+mn-ea"/>
+              <a:cs typeface="+mn-cs"/>
+            </a:endParaRPr>
+          </a:p>
+          <a:p>
+            <a:endParaRPr lang="en-US" sz="1200" kern="1200" dirty="0" smtClean="0">
+              <a:solidFill>
+                <a:schemeClr val="tx1"/>
+              </a:solidFill>
+              <a:latin typeface="+mn-lt"/>
+              <a:ea typeface="+mn-ea"/>
+              <a:cs typeface="+mn-cs"/>
+            </a:endParaRPr>
+          </a:p>
+          <a:p>
+            <a:r>
+              <a:rPr lang="en-US" sz="1200" kern="1200" dirty="0" smtClean="0">
+                <a:solidFill>
+                  <a:schemeClr val="tx1"/>
+                </a:solidFill>
+                <a:latin typeface="+mn-lt"/>
+                <a:ea typeface="+mn-ea"/>
+                <a:cs typeface="+mn-cs"/>
+              </a:rPr>
+              <a:t>Let's start the project, you will see that everything work smoothly.</a:t>
+            </a:r>
+          </a:p>
+        </p:txBody>
+      </p:sp>
+      <p:sp>
+        <p:nvSpPr>
+          <p:cNvPr id="4" name="Slide Number Placeholder 3"/>
+          <p:cNvSpPr>
+            <a:spLocks noGrp="1"/>
+          </p:cNvSpPr>
+          <p:nvPr>
+            <p:ph type="sldNum" sz="quarter" idx="10"/>
+          </p:nvPr>
+        </p:nvSpPr>
+        <p:spPr/>
+        <p:txBody>
+          <a:bodyPr/>
+          <a:lstStyle/>
+          <a:p>
+            <a:fld id="{36E82501-53DA-4152-84B0-51135B15EEA8}" type="slidenum">
+              <a:rPr lang="en-US" smtClean="0"/>
+              <a:t>35</a:t>
+            </a:fld>
+            <a:endParaRPr lang="en-US"/>
+          </a:p>
+        </p:txBody>
+      </p:sp>
+    </p:spTree>
+    <p:extLst>
+      <p:ext uri="{BB962C8B-B14F-4D97-AF65-F5344CB8AC3E}">
+        <p14:creationId xmlns:p14="http://schemas.microsoft.com/office/powerpoint/2010/main" val="2614701264"/>
+      </p:ext>
+    </p:extLst>
+  </p:cSld>
+  <p:clrMapOvr>
+    <a:masterClrMapping/>
+  </p:clrMapOvr>
+</p:notes>
+</file>
+
 <file path=ppt/notesSlides/notesSlide2.xml><?xml version="1.0" encoding="utf-8"?>
 <p:notes xmlns:a="http://schemas.openxmlformats.org/drawingml/2006/main" xmlns:r="http://schemas.openxmlformats.org/officeDocument/2006/relationships" xmlns:p="http://schemas.openxmlformats.org/presentationml/2006/main">
   <p:cSld>
@@ -980,22 +2303,311 @@
           <a:lstStyle/>
           <a:p>
             <a:r>
-              <a:rPr lang="en-US" dirty="0" smtClean="0"/>
-              <a:t>PrimeFaces bundles</a:t>
-            </a:r>
-            <a:r>
-              <a:rPr lang="en-US" baseline="0" dirty="0" smtClean="0"/>
-              <a:t> over 100 JSF components that provide a rich UI experience with ajaxified architecture. It employs the JSF 2.0 standardized AJAX APIs on the server side and for the client side it uses jQuery for its javascript architecture. </a:t>
-            </a:r>
-          </a:p>
-          <a:p>
-            <a:r>
-              <a:rPr lang="en-US" baseline="0" dirty="0" smtClean="0"/>
-              <a:t>You can find nearly all the components that you might need to develop a web application, from a complex datatable to autocomplete, picklist and many others. The themes for all the components are managed in a centralized way with the help of the theme roller so structural and skinning CSS can be easily applied across the components. And With 4.0 release, codenamed sentinel, we are bringing some awesome features to the community like built-in client side validation infrastructure, which is compatible with the server side implementation, that exactly does what JSF do on the server side. The validation metadata is being held in HTML5 attributes. We are doing partial processing on the client side with javascript like JSF does on partial processing on the Ajax calls. We provide i18n for the validation messages. We provide the infrastructure to implement a custom client side validation mechanism. We also provide infrastructure to enable the client side validation on custom javascript events like keyup, blur and etc. All this can be enabled with a context parameter and I’ll show that in the demo. One of the coolest side to mention about is this validation mechanism also supports bean validation specification out of the box. So as you annotate your domain model with annotations like @Min @Max or @NotNull you will get the validation mechanism working on the client side instantly. The other feature that we’re bringing to the community with 4.0 is the Dialog Framework which enables to open an external xhtml page that gets generated dynamically at runtime. The same could be done via p:dialog component also but within dialog framework the pages gets created and destroyed programmatically at runtime. I’ll show a sample and ways to enable the dialog framework infrastructure with configuration. With PrimeFaces 4.0 we also provided drag drop ability between tree components which is a very cool feature in my opinion. Of course implementing this was not that easy. We also bundled many other cool features like deferred loading, sticky headers, new search expressions, the new file upload scrollable tabs and etc.</a:t>
-            </a:r>
-            <a:endParaRPr lang="en-US" dirty="0" smtClean="0"/>
-          </a:p>
-          <a:p>
+              <a:rPr lang="en-US" sz="1200" kern="1200" dirty="0" smtClean="0">
+                <a:solidFill>
+                  <a:schemeClr val="tx1"/>
+                </a:solidFill>
+                <a:latin typeface="+mn-lt"/>
+                <a:ea typeface="+mn-ea"/>
+                <a:cs typeface="+mn-cs"/>
+              </a:rPr>
+              <a:t>Html(5) friendly markup, what does it mean?</a:t>
+            </a:r>
+            <a:r>
+              <a:rPr lang="en-US" sz="1200" kern="1200" baseline="0" dirty="0" smtClean="0">
+                <a:solidFill>
+                  <a:schemeClr val="tx1"/>
+                </a:solidFill>
+                <a:latin typeface="+mn-lt"/>
+                <a:ea typeface="+mn-ea"/>
+                <a:cs typeface="+mn-cs"/>
+              </a:rPr>
+              <a:t> </a:t>
+            </a:r>
+            <a:r>
+              <a:rPr lang="en-US" sz="1200" kern="1200" dirty="0" smtClean="0">
+                <a:solidFill>
+                  <a:schemeClr val="tx1"/>
+                </a:solidFill>
+                <a:latin typeface="+mn-lt"/>
+                <a:ea typeface="+mn-ea"/>
+                <a:cs typeface="+mn-cs"/>
+              </a:rPr>
+              <a:t>It allows HTML markup directly within the Facelet component or JSF attibutes within HTML elements.</a:t>
+            </a:r>
+            <a:r>
+              <a:rPr lang="en-US" sz="1200" kern="1200" baseline="0" dirty="0" smtClean="0">
+                <a:solidFill>
+                  <a:schemeClr val="tx1"/>
+                </a:solidFill>
+                <a:latin typeface="+mn-lt"/>
+                <a:ea typeface="+mn-ea"/>
+                <a:cs typeface="+mn-cs"/>
+              </a:rPr>
+              <a:t> </a:t>
+            </a:r>
+            <a:r>
+              <a:rPr lang="en-US" sz="1200" kern="1200" dirty="0" smtClean="0">
+                <a:solidFill>
+                  <a:schemeClr val="tx1"/>
+                </a:solidFill>
+                <a:latin typeface="+mn-lt"/>
+                <a:ea typeface="+mn-ea"/>
+                <a:cs typeface="+mn-cs"/>
+              </a:rPr>
+              <a:t>It can help to i.e. create components which are missing in the HTML specification without creation of custom JSF components using JavaScript</a:t>
+            </a:r>
+            <a:r>
+              <a:rPr lang="en-US" sz="1200" kern="1200" baseline="0" dirty="0" smtClean="0">
+                <a:solidFill>
+                  <a:schemeClr val="tx1"/>
+                </a:solidFill>
+                <a:latin typeface="+mn-lt"/>
+                <a:ea typeface="+mn-ea"/>
+                <a:cs typeface="+mn-cs"/>
+              </a:rPr>
+              <a:t> frameworks</a:t>
+            </a:r>
+            <a:r>
+              <a:rPr lang="en-US" sz="1200" kern="1200" dirty="0" smtClean="0">
+                <a:solidFill>
+                  <a:schemeClr val="tx1"/>
+                </a:solidFill>
+                <a:latin typeface="+mn-lt"/>
+                <a:ea typeface="+mn-ea"/>
+                <a:cs typeface="+mn-cs"/>
+              </a:rPr>
+              <a:t>.</a:t>
+            </a:r>
+            <a:r>
+              <a:rPr lang="en-US" sz="1200" kern="1200" baseline="0" dirty="0" smtClean="0">
+                <a:solidFill>
+                  <a:schemeClr val="tx1"/>
+                </a:solidFill>
+                <a:latin typeface="+mn-lt"/>
+                <a:ea typeface="+mn-ea"/>
+                <a:cs typeface="+mn-cs"/>
+              </a:rPr>
+              <a:t> </a:t>
+            </a:r>
+            <a:r>
+              <a:rPr lang="en-US" sz="1200" kern="1200" dirty="0" smtClean="0">
+                <a:solidFill>
+                  <a:schemeClr val="tx1"/>
+                </a:solidFill>
+                <a:latin typeface="+mn-lt"/>
+                <a:ea typeface="+mn-ea"/>
+                <a:cs typeface="+mn-cs"/>
+              </a:rPr>
+              <a:t>For purpose of this feature</a:t>
+            </a:r>
+            <a:r>
+              <a:rPr lang="en-US" sz="1200" kern="1200" baseline="0" dirty="0" smtClean="0">
+                <a:solidFill>
+                  <a:schemeClr val="tx1"/>
+                </a:solidFill>
+                <a:latin typeface="+mn-lt"/>
+                <a:ea typeface="+mn-ea"/>
+                <a:cs typeface="+mn-cs"/>
+              </a:rPr>
+              <a:t> </a:t>
+            </a:r>
+            <a:r>
+              <a:rPr lang="en-US" sz="1200" kern="1200" dirty="0" smtClean="0">
+                <a:solidFill>
+                  <a:schemeClr val="tx1"/>
+                </a:solidFill>
+                <a:latin typeface="+mn-lt"/>
+                <a:ea typeface="+mn-ea"/>
+                <a:cs typeface="+mn-cs"/>
+              </a:rPr>
+              <a:t>JSF defines two new namespaces. One is handled by RenderKit and passes attributes of</a:t>
+            </a:r>
+            <a:r>
+              <a:rPr lang="en-US" sz="1200" kern="1200" baseline="0" dirty="0" smtClean="0">
+                <a:solidFill>
+                  <a:schemeClr val="tx1"/>
+                </a:solidFill>
+                <a:latin typeface="+mn-lt"/>
+                <a:ea typeface="+mn-ea"/>
+                <a:cs typeface="+mn-cs"/>
+              </a:rPr>
+              <a:t> given namespace from </a:t>
+            </a:r>
+            <a:r>
+              <a:rPr lang="en-US" sz="1200" kern="1200" dirty="0" smtClean="0">
+                <a:solidFill>
+                  <a:schemeClr val="tx1"/>
+                </a:solidFill>
+                <a:latin typeface="+mn-lt"/>
+                <a:ea typeface="+mn-ea"/>
+                <a:cs typeface="+mn-cs"/>
+              </a:rPr>
+              <a:t>JSF component to the rendered HTML page. The second one is processed by TagDecorator which can</a:t>
+            </a:r>
+            <a:r>
+              <a:rPr lang="en-US" sz="1200" kern="1200" baseline="0" dirty="0" smtClean="0">
+                <a:solidFill>
+                  <a:schemeClr val="tx1"/>
+                </a:solidFill>
+                <a:latin typeface="+mn-lt"/>
+                <a:ea typeface="+mn-ea"/>
+                <a:cs typeface="+mn-cs"/>
+              </a:rPr>
+              <a:t> turn</a:t>
+            </a:r>
+            <a:r>
+              <a:rPr lang="en-US" sz="1200" kern="1200" dirty="0" smtClean="0">
+                <a:solidFill>
+                  <a:schemeClr val="tx1"/>
+                </a:solidFill>
+                <a:latin typeface="+mn-lt"/>
+                <a:ea typeface="+mn-ea"/>
+                <a:cs typeface="+mn-cs"/>
+              </a:rPr>
+              <a:t> HTML tag into</a:t>
+            </a:r>
+            <a:r>
+              <a:rPr lang="en-US" sz="1200" kern="1200" baseline="0" dirty="0" smtClean="0">
+                <a:solidFill>
+                  <a:schemeClr val="tx1"/>
+                </a:solidFill>
+                <a:latin typeface="+mn-lt"/>
+                <a:ea typeface="+mn-ea"/>
+                <a:cs typeface="+mn-cs"/>
+              </a:rPr>
+              <a:t> JSF component </a:t>
+            </a:r>
+            <a:r>
+              <a:rPr lang="en-US" sz="1200" kern="1200" dirty="0" smtClean="0">
+                <a:solidFill>
+                  <a:schemeClr val="tx1"/>
+                </a:solidFill>
+                <a:latin typeface="+mn-lt"/>
+                <a:ea typeface="+mn-ea"/>
+                <a:cs typeface="+mn-cs"/>
+              </a:rPr>
+              <a:t>before the</a:t>
+            </a:r>
+            <a:r>
+              <a:rPr lang="en-US" sz="1200" kern="1200" baseline="0" dirty="0" smtClean="0">
+                <a:solidFill>
+                  <a:schemeClr val="tx1"/>
+                </a:solidFill>
+                <a:latin typeface="+mn-lt"/>
+                <a:ea typeface="+mn-ea"/>
+                <a:cs typeface="+mn-cs"/>
+              </a:rPr>
+              <a:t> </a:t>
+            </a:r>
+            <a:r>
+              <a:rPr lang="en-US" sz="1200" kern="1200" dirty="0" smtClean="0">
+                <a:solidFill>
+                  <a:schemeClr val="tx1"/>
+                </a:solidFill>
+                <a:latin typeface="+mn-lt"/>
+                <a:ea typeface="+mn-ea"/>
+                <a:cs typeface="+mn-cs"/>
+              </a:rPr>
+              <a:t>processing </a:t>
+            </a:r>
+            <a:r>
+              <a:rPr lang="en-US" sz="1200" kern="1200" baseline="0" dirty="0" smtClean="0">
+                <a:solidFill>
+                  <a:schemeClr val="tx1"/>
+                </a:solidFill>
+                <a:latin typeface="+mn-lt"/>
+                <a:ea typeface="+mn-ea"/>
+                <a:cs typeface="+mn-cs"/>
+              </a:rPr>
+              <a:t>with </a:t>
+            </a:r>
+            <a:r>
+              <a:rPr lang="en-US" sz="1200" kern="1200" dirty="0" smtClean="0">
+                <a:solidFill>
+                  <a:schemeClr val="tx1"/>
+                </a:solidFill>
+                <a:latin typeface="+mn-lt"/>
+                <a:ea typeface="+mn-ea"/>
+                <a:cs typeface="+mn-cs"/>
+              </a:rPr>
+              <a:t>the associated TagHandler.</a:t>
+            </a:r>
+            <a:endParaRPr lang="en-US" sz="1200" kern="1200" baseline="0" dirty="0" smtClean="0">
+              <a:solidFill>
+                <a:schemeClr val="tx1"/>
+              </a:solidFill>
+              <a:latin typeface="+mn-lt"/>
+              <a:ea typeface="+mn-ea"/>
+              <a:cs typeface="+mn-cs"/>
+            </a:endParaRPr>
+          </a:p>
+          <a:p>
+            <a:endParaRPr lang="en-US" sz="1200" kern="1200" baseline="0" dirty="0" smtClean="0">
+              <a:solidFill>
+                <a:schemeClr val="tx1"/>
+              </a:solidFill>
+              <a:latin typeface="+mn-lt"/>
+              <a:ea typeface="+mn-ea"/>
+              <a:cs typeface="+mn-cs"/>
+            </a:endParaRPr>
+          </a:p>
+          <a:p>
+            <a:r>
+              <a:rPr lang="en-US" sz="1200" kern="1200" dirty="0" smtClean="0">
+                <a:solidFill>
+                  <a:schemeClr val="tx1"/>
+                </a:solidFill>
+                <a:latin typeface="+mn-lt"/>
+                <a:ea typeface="+mn-ea"/>
+                <a:cs typeface="+mn-cs"/>
+              </a:rPr>
+              <a:t>The advantage is that you take control over the rendered pages yourself,</a:t>
+            </a:r>
+            <a:r>
+              <a:rPr lang="en-US" sz="1200" kern="1200" baseline="0" dirty="0" smtClean="0">
+                <a:solidFill>
+                  <a:schemeClr val="tx1"/>
+                </a:solidFill>
+                <a:latin typeface="+mn-lt"/>
+                <a:ea typeface="+mn-ea"/>
+                <a:cs typeface="+mn-cs"/>
+              </a:rPr>
+              <a:t> you are not fully dependent on the author of the component</a:t>
+            </a:r>
+            <a:r>
+              <a:rPr lang="en-US" sz="1200" kern="1200" dirty="0" smtClean="0">
+                <a:solidFill>
+                  <a:schemeClr val="tx1"/>
+                </a:solidFill>
+                <a:latin typeface="+mn-lt"/>
+                <a:ea typeface="+mn-ea"/>
+                <a:cs typeface="+mn-cs"/>
+              </a:rPr>
+              <a:t>.</a:t>
+            </a:r>
+            <a:r>
+              <a:rPr lang="en-US" sz="1200" kern="1200" baseline="0" dirty="0" smtClean="0">
+                <a:solidFill>
+                  <a:schemeClr val="tx1"/>
+                </a:solidFill>
+                <a:latin typeface="+mn-lt"/>
+                <a:ea typeface="+mn-ea"/>
+                <a:cs typeface="+mn-cs"/>
+              </a:rPr>
+              <a:t> </a:t>
+            </a:r>
+            <a:r>
+              <a:rPr lang="en-US" sz="1200" kern="1200" dirty="0" smtClean="0">
+                <a:solidFill>
+                  <a:schemeClr val="tx1"/>
+                </a:solidFill>
+                <a:latin typeface="+mn-lt"/>
+                <a:ea typeface="+mn-ea"/>
+                <a:cs typeface="+mn-cs"/>
+              </a:rPr>
+              <a:t>It leads to benefit in mixing JavaScript and JavaServer Faces components.</a:t>
+            </a:r>
             <a:endParaRPr lang="en-US" dirty="0"/>
           </a:p>
         </p:txBody>
@@ -1017,7 +2629,7 @@
           <a:p>
             <a:fld id="{36E82501-53DA-4152-84B0-51135B15EEA8}" type="slidenum">
               <a:rPr lang="en-US" smtClean="0"/>
-              <a:t>19</a:t>
+              <a:t>10</a:t>
             </a:fld>
             <a:endParaRPr lang="en-US"/>
           </a:p>
@@ -1026,7 +2638,1259 @@
     </p:spTree>
     <p:extLst>
       <p:ext uri="{BB962C8B-B14F-4D97-AF65-F5344CB8AC3E}">
-        <p14:creationId xmlns:p14="http://schemas.microsoft.com/office/powerpoint/2010/main" val="2873911702"/>
+        <p14:creationId xmlns:p14="http://schemas.microsoft.com/office/powerpoint/2010/main" val="2989104136"/>
+      </p:ext>
+    </p:extLst>
+  </p:cSld>
+  <p:clrMapOvr>
+    <a:masterClrMapping/>
+  </p:clrMapOvr>
+</p:notes>
+</file>
+
+<file path=ppt/notesSlides/notesSlide5.xml><?xml version="1.0" encoding="utf-8"?>
+<p:notes xmlns:a="http://schemas.openxmlformats.org/drawingml/2006/main" xmlns:r="http://schemas.openxmlformats.org/officeDocument/2006/relationships" xmlns:p="http://schemas.openxmlformats.org/presentationml/2006/main">
+  <p:cSld>
+    <p:spTree>
+      <p:nvGrpSpPr>
+        <p:cNvPr id="1" name=""/>
+        <p:cNvGrpSpPr/>
+        <p:nvPr/>
+      </p:nvGrpSpPr>
+      <p:grpSpPr>
+        <a:xfrm>
+          <a:off x="0" y="0"/>
+          <a:ext cx="0" cy="0"/>
+          <a:chOff x="0" y="0"/>
+          <a:chExt cx="0" cy="0"/>
+        </a:xfrm>
+      </p:grpSpPr>
+      <p:sp>
+        <p:nvSpPr>
+          <p:cNvPr id="2" name="Slide Image Placeholder 1"/>
+          <p:cNvSpPr>
+            <a:spLocks noGrp="1" noRot="1" noChangeAspect="1"/>
+          </p:cNvSpPr>
+          <p:nvPr>
+            <p:ph type="sldImg"/>
+          </p:nvPr>
+        </p:nvSpPr>
+        <p:spPr/>
+      </p:sp>
+      <p:sp>
+        <p:nvSpPr>
+          <p:cNvPr id="3" name="Notes Placeholder 2"/>
+          <p:cNvSpPr>
+            <a:spLocks noGrp="1"/>
+          </p:cNvSpPr>
+          <p:nvPr>
+            <p:ph type="body" idx="1"/>
+          </p:nvPr>
+        </p:nvSpPr>
+        <p:spPr/>
+        <p:txBody>
+          <a:bodyPr/>
+          <a:lstStyle/>
+          <a:p>
+            <a:r>
+              <a:rPr lang="en-US" sz="1200" kern="1200" dirty="0" smtClean="0">
+                <a:solidFill>
+                  <a:schemeClr val="tx1"/>
+                </a:solidFill>
+                <a:latin typeface="+mn-lt"/>
+                <a:ea typeface="+mn-ea"/>
+                <a:cs typeface="+mn-cs"/>
+              </a:rPr>
+              <a:t>Before showing first example I would like to point out that we are going to show the crucial part of features. There are often additional tips available within the GitHub repository so it makes sense to clone it and walk through available samples if you are interested</a:t>
+            </a:r>
+            <a:r>
+              <a:rPr lang="en-US" sz="1200" kern="1200" baseline="0" dirty="0" smtClean="0">
+                <a:solidFill>
+                  <a:schemeClr val="tx1"/>
+                </a:solidFill>
+                <a:latin typeface="+mn-lt"/>
+                <a:ea typeface="+mn-ea"/>
+                <a:cs typeface="+mn-cs"/>
+              </a:rPr>
+              <a:t> in this topic</a:t>
+            </a:r>
+            <a:r>
+              <a:rPr lang="en-US" sz="1200" kern="1200" dirty="0" smtClean="0">
+                <a:solidFill>
+                  <a:schemeClr val="tx1"/>
+                </a:solidFill>
+                <a:latin typeface="+mn-lt"/>
+                <a:ea typeface="+mn-ea"/>
+                <a:cs typeface="+mn-cs"/>
+              </a:rPr>
+              <a:t>.</a:t>
+            </a:r>
+          </a:p>
+          <a:p>
+            <a:endParaRPr lang="en-US" sz="1200" kern="1200" dirty="0" smtClean="0">
+              <a:solidFill>
+                <a:schemeClr val="tx1"/>
+              </a:solidFill>
+              <a:latin typeface="+mn-lt"/>
+              <a:ea typeface="+mn-ea"/>
+              <a:cs typeface="+mn-cs"/>
+            </a:endParaRPr>
+          </a:p>
+          <a:p>
+            <a:r>
+              <a:rPr lang="en-US" sz="1200" kern="1200" dirty="0" smtClean="0">
+                <a:solidFill>
+                  <a:schemeClr val="tx1"/>
+                </a:solidFill>
+                <a:latin typeface="+mn-lt"/>
+                <a:ea typeface="+mn-ea"/>
+                <a:cs typeface="+mn-cs"/>
+              </a:rPr>
+              <a:t>Now let's start with the passthrough elements inside the simple template. I'm using HTML tag with attributes from the JSF namespace. Such tag is translated before JSF rendering and it's processed within the usual JSF lifecycle. You can see</a:t>
+            </a:r>
+            <a:r>
+              <a:rPr lang="en-US" sz="1200" kern="1200" baseline="0" dirty="0" smtClean="0">
+                <a:solidFill>
+                  <a:schemeClr val="tx1"/>
+                </a:solidFill>
+                <a:latin typeface="+mn-lt"/>
+                <a:ea typeface="+mn-ea"/>
+                <a:cs typeface="+mn-cs"/>
+              </a:rPr>
+              <a:t> that the JSF validation over the HTML text input works like in cases of the JSF components. Let’s move to the second facelet and the</a:t>
+            </a:r>
+            <a:r>
+              <a:rPr lang="en-US" sz="1200" kern="1200" dirty="0" smtClean="0">
+                <a:solidFill>
+                  <a:schemeClr val="tx1"/>
+                </a:solidFill>
+                <a:latin typeface="+mn-lt"/>
+                <a:ea typeface="+mn-ea"/>
+                <a:cs typeface="+mn-cs"/>
+              </a:rPr>
+              <a:t> passthrough attribute. It's specified at the JSF component and renderer passes it to the created HTML page</a:t>
+            </a:r>
+            <a:r>
+              <a:rPr lang="en-US" sz="1200" kern="1200" baseline="0" dirty="0" smtClean="0">
+                <a:solidFill>
+                  <a:schemeClr val="tx1"/>
+                </a:solidFill>
+                <a:latin typeface="+mn-lt"/>
+                <a:ea typeface="+mn-ea"/>
+                <a:cs typeface="+mn-cs"/>
+              </a:rPr>
+              <a:t> as you can see in the rendered HTML source.</a:t>
+            </a:r>
+          </a:p>
+          <a:p>
+            <a:endParaRPr lang="en-US" sz="1200" kern="1200" dirty="0" smtClean="0">
+              <a:solidFill>
+                <a:schemeClr val="tx1"/>
+              </a:solidFill>
+              <a:latin typeface="+mn-lt"/>
+              <a:ea typeface="+mn-ea"/>
+              <a:cs typeface="+mn-cs"/>
+            </a:endParaRPr>
+          </a:p>
+          <a:p>
+            <a:r>
+              <a:rPr lang="en-US" sz="1200" kern="1200" dirty="0" smtClean="0">
+                <a:solidFill>
+                  <a:schemeClr val="tx1"/>
+                </a:solidFill>
+                <a:latin typeface="+mn-lt"/>
+                <a:ea typeface="+mn-ea"/>
+                <a:cs typeface="+mn-cs"/>
+              </a:rPr>
+              <a:t>This custom SELECT component is the real example of this feature</a:t>
+            </a:r>
+            <a:r>
+              <a:rPr lang="en-US" sz="1200" kern="1200" baseline="0" dirty="0" smtClean="0">
+                <a:solidFill>
+                  <a:schemeClr val="tx1"/>
+                </a:solidFill>
+                <a:latin typeface="+mn-lt"/>
+                <a:ea typeface="+mn-ea"/>
+                <a:cs typeface="+mn-cs"/>
+              </a:rPr>
+              <a:t> </a:t>
+            </a:r>
+            <a:r>
+              <a:rPr lang="en-US" sz="1200" kern="1200" dirty="0" smtClean="0">
+                <a:solidFill>
+                  <a:schemeClr val="tx1"/>
+                </a:solidFill>
+                <a:latin typeface="+mn-lt"/>
+                <a:ea typeface="+mn-ea"/>
+                <a:cs typeface="+mn-cs"/>
+              </a:rPr>
+              <a:t>in</a:t>
+            </a:r>
+            <a:r>
+              <a:rPr lang="en-US" sz="1200" kern="1200" baseline="0" dirty="0" smtClean="0">
+                <a:solidFill>
+                  <a:schemeClr val="tx1"/>
+                </a:solidFill>
+                <a:latin typeface="+mn-lt"/>
+                <a:ea typeface="+mn-ea"/>
+                <a:cs typeface="+mn-cs"/>
+              </a:rPr>
+              <a:t> action</a:t>
+            </a:r>
+            <a:r>
+              <a:rPr lang="en-US" sz="1200" kern="1200" dirty="0" smtClean="0">
+                <a:solidFill>
+                  <a:schemeClr val="tx1"/>
+                </a:solidFill>
+                <a:latin typeface="+mn-lt"/>
+                <a:ea typeface="+mn-ea"/>
+                <a:cs typeface="+mn-cs"/>
+              </a:rPr>
+              <a:t>. There is called jQuery plugin which can turn textual option items into images. This plugin</a:t>
+            </a:r>
+            <a:r>
+              <a:rPr lang="en-US" sz="1200" kern="1200" baseline="0" dirty="0" smtClean="0">
+                <a:solidFill>
+                  <a:schemeClr val="tx1"/>
+                </a:solidFill>
+                <a:latin typeface="+mn-lt"/>
+                <a:ea typeface="+mn-ea"/>
+                <a:cs typeface="+mn-cs"/>
+              </a:rPr>
+              <a:t> requires</a:t>
+            </a:r>
+            <a:r>
+              <a:rPr lang="en-US" sz="1200" kern="1200" dirty="0" smtClean="0">
+                <a:solidFill>
+                  <a:schemeClr val="tx1"/>
+                </a:solidFill>
+                <a:latin typeface="+mn-lt"/>
+                <a:ea typeface="+mn-ea"/>
+                <a:cs typeface="+mn-cs"/>
+              </a:rPr>
+              <a:t> definition of attributes which are used for binding with its code. The result is JSF component behaviour with the JS component’s L&amp;F. This is JS and JSF interoperability which would not be possible before.</a:t>
+            </a:r>
+            <a:r>
+              <a:rPr lang="en-US" sz="1200" kern="1200" baseline="0" dirty="0" smtClean="0">
+                <a:solidFill>
+                  <a:schemeClr val="tx1"/>
+                </a:solidFill>
+                <a:latin typeface="+mn-lt"/>
+                <a:ea typeface="+mn-ea"/>
+                <a:cs typeface="+mn-cs"/>
+              </a:rPr>
+              <a:t> </a:t>
+            </a:r>
+            <a:r>
+              <a:rPr lang="en-US" sz="1200" kern="1200" dirty="0" smtClean="0">
+                <a:solidFill>
+                  <a:schemeClr val="tx1"/>
+                </a:solidFill>
+                <a:latin typeface="+mn-lt"/>
+                <a:ea typeface="+mn-ea"/>
+                <a:cs typeface="+mn-cs"/>
+              </a:rPr>
+              <a:t>There is more to see is in the sample, you can compare Bean Validation validated form against the JSF validated one or take a look on custom simple Bean Validation constrain pattern.</a:t>
+            </a:r>
+          </a:p>
+          <a:p>
+            <a:endParaRPr lang="en-US" dirty="0"/>
+          </a:p>
+        </p:txBody>
+      </p:sp>
+      <p:sp>
+        <p:nvSpPr>
+          <p:cNvPr id="4" name="Slide Number Placeholder 3"/>
+          <p:cNvSpPr>
+            <a:spLocks noGrp="1"/>
+          </p:cNvSpPr>
+          <p:nvPr>
+            <p:ph type="sldNum" sz="quarter" idx="10"/>
+          </p:nvPr>
+        </p:nvSpPr>
+        <p:spPr/>
+        <p:txBody>
+          <a:bodyPr/>
+          <a:lstStyle/>
+          <a:p>
+            <a:fld id="{36E82501-53DA-4152-84B0-51135B15EEA8}" type="slidenum">
+              <a:rPr lang="en-US" smtClean="0"/>
+              <a:t>11</a:t>
+            </a:fld>
+            <a:endParaRPr lang="en-US"/>
+          </a:p>
+        </p:txBody>
+      </p:sp>
+    </p:spTree>
+    <p:extLst>
+      <p:ext uri="{BB962C8B-B14F-4D97-AF65-F5344CB8AC3E}">
+        <p14:creationId xmlns:p14="http://schemas.microsoft.com/office/powerpoint/2010/main" val="111152863"/>
+      </p:ext>
+    </p:extLst>
+  </p:cSld>
+  <p:clrMapOvr>
+    <a:masterClrMapping/>
+  </p:clrMapOvr>
+</p:notes>
+</file>
+
+<file path=ppt/notesSlides/notesSlide6.xml><?xml version="1.0" encoding="utf-8"?>
+<p:notes xmlns:a="http://schemas.openxmlformats.org/drawingml/2006/main" xmlns:r="http://schemas.openxmlformats.org/officeDocument/2006/relationships" xmlns:p="http://schemas.openxmlformats.org/presentationml/2006/main">
+  <p:cSld>
+    <p:spTree>
+      <p:nvGrpSpPr>
+        <p:cNvPr id="1" name=""/>
+        <p:cNvGrpSpPr/>
+        <p:nvPr/>
+      </p:nvGrpSpPr>
+      <p:grpSpPr>
+        <a:xfrm>
+          <a:off x="0" y="0"/>
+          <a:ext cx="0" cy="0"/>
+          <a:chOff x="0" y="0"/>
+          <a:chExt cx="0" cy="0"/>
+        </a:xfrm>
+      </p:grpSpPr>
+      <p:sp>
+        <p:nvSpPr>
+          <p:cNvPr id="2" name="Slide Image Placeholder 1"/>
+          <p:cNvSpPr>
+            <a:spLocks noGrp="1" noRot="1" noChangeAspect="1"/>
+          </p:cNvSpPr>
+          <p:nvPr>
+            <p:ph type="sldImg"/>
+          </p:nvPr>
+        </p:nvSpPr>
+        <p:spPr/>
+      </p:sp>
+      <p:sp>
+        <p:nvSpPr>
+          <p:cNvPr id="3" name="Notes Placeholder 2"/>
+          <p:cNvSpPr>
+            <a:spLocks noGrp="1"/>
+          </p:cNvSpPr>
+          <p:nvPr>
+            <p:ph type="body" idx="1"/>
+          </p:nvPr>
+        </p:nvSpPr>
+        <p:spPr/>
+        <p:txBody>
+          <a:bodyPr/>
+          <a:lstStyle/>
+          <a:p>
+            <a:r>
+              <a:rPr lang="en-US" dirty="0" smtClean="0"/>
+              <a:t>Resource Libraries Contracts</a:t>
+            </a:r>
+            <a:r>
+              <a:rPr lang="en-US" sz="1200" kern="1200" dirty="0" smtClean="0">
+                <a:solidFill>
+                  <a:schemeClr val="tx1"/>
+                </a:solidFill>
+                <a:latin typeface="+mn-lt"/>
+                <a:ea typeface="+mn-ea"/>
+                <a:cs typeface="+mn-cs"/>
+              </a:rPr>
+              <a:t> allows you to switch various L&amp;F across one web application or also it's able to define reusable L&amp;F library.</a:t>
+            </a:r>
+            <a:r>
+              <a:rPr lang="en-US" sz="1200" kern="1200" baseline="0" dirty="0" smtClean="0">
+                <a:solidFill>
+                  <a:schemeClr val="tx1"/>
+                </a:solidFill>
+                <a:latin typeface="+mn-lt"/>
+                <a:ea typeface="+mn-ea"/>
+                <a:cs typeface="+mn-cs"/>
+              </a:rPr>
+              <a:t> </a:t>
+            </a:r>
+            <a:r>
+              <a:rPr lang="en-US" sz="1200" kern="1200" dirty="0" smtClean="0">
+                <a:solidFill>
+                  <a:schemeClr val="tx1"/>
+                </a:solidFill>
+                <a:latin typeface="+mn-lt"/>
+                <a:ea typeface="+mn-ea"/>
+                <a:cs typeface="+mn-cs"/>
+              </a:rPr>
+              <a:t>Every contract can specify templates, insertion points and statuc resources like images, styles, javascript files and so one.</a:t>
+            </a:r>
+            <a:r>
+              <a:rPr lang="en-US" sz="1200" kern="1200" baseline="0" dirty="0" smtClean="0">
+                <a:solidFill>
+                  <a:schemeClr val="tx1"/>
+                </a:solidFill>
+                <a:latin typeface="+mn-lt"/>
+                <a:ea typeface="+mn-ea"/>
+                <a:cs typeface="+mn-cs"/>
+              </a:rPr>
+              <a:t> </a:t>
+            </a:r>
+            <a:r>
+              <a:rPr lang="en-US" sz="1200" kern="1200" dirty="0" smtClean="0">
+                <a:solidFill>
+                  <a:schemeClr val="tx1"/>
+                </a:solidFill>
+                <a:latin typeface="+mn-lt"/>
+                <a:ea typeface="+mn-ea"/>
+                <a:cs typeface="+mn-cs"/>
+              </a:rPr>
+              <a:t>This creates complete bundle to be placed into the web root or to be included on the application classpath.</a:t>
+            </a:r>
+            <a:r>
+              <a:rPr lang="en-US" sz="1200" kern="1200" baseline="0" dirty="0" smtClean="0">
+                <a:solidFill>
+                  <a:schemeClr val="tx1"/>
+                </a:solidFill>
+                <a:latin typeface="+mn-lt"/>
+                <a:ea typeface="+mn-ea"/>
+                <a:cs typeface="+mn-cs"/>
+              </a:rPr>
+              <a:t> </a:t>
+            </a:r>
+            <a:r>
+              <a:rPr lang="en-US" sz="1200" kern="1200" dirty="0" smtClean="0">
+                <a:solidFill>
+                  <a:schemeClr val="tx1"/>
+                </a:solidFill>
+                <a:latin typeface="+mn-lt"/>
+                <a:ea typeface="+mn-ea"/>
+                <a:cs typeface="+mn-cs"/>
+              </a:rPr>
+              <a:t>How could you choose the contract</a:t>
+            </a:r>
+            <a:r>
+              <a:rPr lang="en-US" sz="1200" kern="1200" baseline="0" dirty="0" smtClean="0">
+                <a:solidFill>
+                  <a:schemeClr val="tx1"/>
+                </a:solidFill>
+                <a:latin typeface="+mn-lt"/>
+                <a:ea typeface="+mn-ea"/>
+                <a:cs typeface="+mn-cs"/>
+              </a:rPr>
+              <a:t> then</a:t>
+            </a:r>
+            <a:r>
+              <a:rPr lang="en-US" sz="1200" kern="1200" dirty="0" smtClean="0">
+                <a:solidFill>
+                  <a:schemeClr val="tx1"/>
+                </a:solidFill>
+                <a:latin typeface="+mn-lt"/>
+                <a:ea typeface="+mn-ea"/>
+                <a:cs typeface="+mn-cs"/>
+              </a:rPr>
+              <a:t>? Right now you have</a:t>
+            </a:r>
+            <a:r>
+              <a:rPr lang="en-US" sz="1200" kern="1200" baseline="0" dirty="0" smtClean="0">
+                <a:solidFill>
+                  <a:schemeClr val="tx1"/>
+                </a:solidFill>
+                <a:latin typeface="+mn-lt"/>
+                <a:ea typeface="+mn-ea"/>
+                <a:cs typeface="+mn-cs"/>
+              </a:rPr>
+              <a:t> following  </a:t>
+            </a:r>
+            <a:r>
+              <a:rPr lang="en-US" sz="1200" kern="1200" dirty="0" smtClean="0">
+                <a:solidFill>
+                  <a:schemeClr val="tx1"/>
+                </a:solidFill>
+                <a:latin typeface="+mn-lt"/>
+                <a:ea typeface="+mn-ea"/>
+                <a:cs typeface="+mn-cs"/>
+              </a:rPr>
+              <a:t>three options:</a:t>
+            </a:r>
+          </a:p>
+          <a:p>
+            <a:r>
+              <a:rPr lang="en-US" sz="1200" kern="1200" dirty="0" smtClean="0">
+                <a:solidFill>
+                  <a:schemeClr val="tx1"/>
+                </a:solidFill>
+                <a:latin typeface="+mn-lt"/>
+                <a:ea typeface="+mn-ea"/>
+                <a:cs typeface="+mn-cs"/>
+              </a:rPr>
+              <a:t>-</a:t>
+            </a:r>
+            <a:r>
+              <a:rPr lang="en-US" sz="1200" kern="1200" baseline="0" dirty="0" smtClean="0">
+                <a:solidFill>
+                  <a:schemeClr val="tx1"/>
+                </a:solidFill>
+                <a:latin typeface="+mn-lt"/>
+                <a:ea typeface="+mn-ea"/>
+                <a:cs typeface="+mn-cs"/>
+              </a:rPr>
+              <a:t> </a:t>
+            </a:r>
+            <a:r>
+              <a:rPr lang="en-US" sz="1200" kern="1200" dirty="0" smtClean="0">
+                <a:solidFill>
+                  <a:schemeClr val="tx1"/>
+                </a:solidFill>
+                <a:latin typeface="+mn-lt"/>
+                <a:ea typeface="+mn-ea"/>
+                <a:cs typeface="+mn-cs"/>
+              </a:rPr>
+              <a:t>There exists only one option</a:t>
+            </a:r>
+            <a:r>
+              <a:rPr lang="en-US" sz="1200" kern="1200" baseline="0" dirty="0" smtClean="0">
+                <a:solidFill>
+                  <a:schemeClr val="tx1"/>
+                </a:solidFill>
+                <a:latin typeface="+mn-lt"/>
+                <a:ea typeface="+mn-ea"/>
+                <a:cs typeface="+mn-cs"/>
+              </a:rPr>
+              <a:t> -</a:t>
+            </a:r>
+            <a:r>
+              <a:rPr lang="en-US" sz="1200" kern="1200" dirty="0" smtClean="0">
+                <a:solidFill>
+                  <a:schemeClr val="tx1"/>
+                </a:solidFill>
+                <a:latin typeface="+mn-lt"/>
+                <a:ea typeface="+mn-ea"/>
+                <a:cs typeface="+mn-cs"/>
+              </a:rPr>
+              <a:t> one valid</a:t>
+            </a:r>
+            <a:r>
+              <a:rPr lang="en-US" sz="1200" kern="1200" baseline="0" dirty="0" smtClean="0">
+                <a:solidFill>
+                  <a:schemeClr val="tx1"/>
+                </a:solidFill>
+                <a:latin typeface="+mn-lt"/>
+                <a:ea typeface="+mn-ea"/>
+                <a:cs typeface="+mn-cs"/>
+              </a:rPr>
+              <a:t> template path</a:t>
+            </a:r>
+            <a:r>
+              <a:rPr lang="en-US" sz="1200" kern="1200" dirty="0" smtClean="0">
+                <a:solidFill>
+                  <a:schemeClr val="tx1"/>
+                </a:solidFill>
+                <a:latin typeface="+mn-lt"/>
+                <a:ea typeface="+mn-ea"/>
+                <a:cs typeface="+mn-cs"/>
+              </a:rPr>
+              <a:t> to be chosen.</a:t>
+            </a:r>
+          </a:p>
+          <a:p>
+            <a:r>
+              <a:rPr lang="en-US" sz="1200" kern="1200" dirty="0" smtClean="0">
+                <a:solidFill>
+                  <a:schemeClr val="tx1"/>
+                </a:solidFill>
+                <a:latin typeface="+mn-lt"/>
+                <a:ea typeface="+mn-ea"/>
+                <a:cs typeface="+mn-cs"/>
+              </a:rPr>
+              <a:t>- You can choose the contract statically or dynamically using the EL within the view element.</a:t>
+            </a:r>
+          </a:p>
+          <a:p>
+            <a:r>
+              <a:rPr lang="en-US" sz="1200" kern="1200" dirty="0" smtClean="0">
+                <a:solidFill>
+                  <a:schemeClr val="tx1"/>
+                </a:solidFill>
+                <a:latin typeface="+mn-lt"/>
+                <a:ea typeface="+mn-ea"/>
+                <a:cs typeface="+mn-cs"/>
+              </a:rPr>
+              <a:t>- And also there is a way to set mapping within faces-config file with limitation of the static RLC definition.</a:t>
+            </a:r>
+          </a:p>
+          <a:p>
+            <a:endParaRPr lang="en-US" sz="1200" kern="1200" dirty="0" smtClean="0">
+              <a:solidFill>
+                <a:schemeClr val="tx1"/>
+              </a:solidFill>
+              <a:latin typeface="+mn-lt"/>
+              <a:ea typeface="+mn-ea"/>
+              <a:cs typeface="+mn-cs"/>
+            </a:endParaRPr>
+          </a:p>
+          <a:p>
+            <a:r>
+              <a:rPr lang="en-US" sz="1200" kern="1200" dirty="0" smtClean="0">
+                <a:solidFill>
+                  <a:schemeClr val="tx1"/>
+                </a:solidFill>
+                <a:latin typeface="+mn-lt"/>
+                <a:ea typeface="+mn-ea"/>
+                <a:cs typeface="+mn-cs"/>
+              </a:rPr>
+              <a:t>We can suppose that JSF 2.3 should break not just faces-config</a:t>
+            </a:r>
+            <a:r>
+              <a:rPr lang="en-US" sz="1200" kern="1200" baseline="0" dirty="0" smtClean="0">
+                <a:solidFill>
+                  <a:schemeClr val="tx1"/>
+                </a:solidFill>
+                <a:latin typeface="+mn-lt"/>
+                <a:ea typeface="+mn-ea"/>
+                <a:cs typeface="+mn-cs"/>
+              </a:rPr>
+              <a:t> definition</a:t>
+            </a:r>
+            <a:r>
+              <a:rPr lang="en-US" sz="1200" kern="1200" dirty="0" smtClean="0">
+                <a:solidFill>
+                  <a:schemeClr val="tx1"/>
+                </a:solidFill>
+                <a:latin typeface="+mn-lt"/>
+                <a:ea typeface="+mn-ea"/>
+                <a:cs typeface="+mn-cs"/>
+              </a:rPr>
+              <a:t> limitation but also bring another way of theme selections, its parameters, inheritance which will lead to the complete multitemplating system.</a:t>
+            </a:r>
+          </a:p>
+        </p:txBody>
+      </p:sp>
+      <p:sp>
+        <p:nvSpPr>
+          <p:cNvPr id="4" name="Slide Number Placeholder 3"/>
+          <p:cNvSpPr>
+            <a:spLocks noGrp="1"/>
+          </p:cNvSpPr>
+          <p:nvPr>
+            <p:ph type="sldNum" sz="quarter" idx="10"/>
+          </p:nvPr>
+        </p:nvSpPr>
+        <p:spPr/>
+        <p:txBody>
+          <a:bodyPr/>
+          <a:lstStyle/>
+          <a:p>
+            <a:fld id="{36E82501-53DA-4152-84B0-51135B15EEA8}" type="slidenum">
+              <a:rPr lang="en-US" smtClean="0"/>
+              <a:t>13</a:t>
+            </a:fld>
+            <a:endParaRPr lang="en-US"/>
+          </a:p>
+        </p:txBody>
+      </p:sp>
+    </p:spTree>
+    <p:extLst>
+      <p:ext uri="{BB962C8B-B14F-4D97-AF65-F5344CB8AC3E}">
+        <p14:creationId xmlns:p14="http://schemas.microsoft.com/office/powerpoint/2010/main" val="3363076931"/>
+      </p:ext>
+    </p:extLst>
+  </p:cSld>
+  <p:clrMapOvr>
+    <a:masterClrMapping/>
+  </p:clrMapOvr>
+</p:notes>
+</file>
+
+<file path=ppt/notesSlides/notesSlide7.xml><?xml version="1.0" encoding="utf-8"?>
+<p:notes xmlns:a="http://schemas.openxmlformats.org/drawingml/2006/main" xmlns:r="http://schemas.openxmlformats.org/officeDocument/2006/relationships" xmlns:p="http://schemas.openxmlformats.org/presentationml/2006/main">
+  <p:cSld>
+    <p:spTree>
+      <p:nvGrpSpPr>
+        <p:cNvPr id="1" name=""/>
+        <p:cNvGrpSpPr/>
+        <p:nvPr/>
+      </p:nvGrpSpPr>
+      <p:grpSpPr>
+        <a:xfrm>
+          <a:off x="0" y="0"/>
+          <a:ext cx="0" cy="0"/>
+          <a:chOff x="0" y="0"/>
+          <a:chExt cx="0" cy="0"/>
+        </a:xfrm>
+      </p:grpSpPr>
+      <p:sp>
+        <p:nvSpPr>
+          <p:cNvPr id="2" name="Slide Image Placeholder 1"/>
+          <p:cNvSpPr>
+            <a:spLocks noGrp="1" noRot="1" noChangeAspect="1"/>
+          </p:cNvSpPr>
+          <p:nvPr>
+            <p:ph type="sldImg"/>
+          </p:nvPr>
+        </p:nvSpPr>
+        <p:spPr/>
+      </p:sp>
+      <p:sp>
+        <p:nvSpPr>
+          <p:cNvPr id="3" name="Notes Placeholder 2"/>
+          <p:cNvSpPr>
+            <a:spLocks noGrp="1"/>
+          </p:cNvSpPr>
+          <p:nvPr>
+            <p:ph type="body" idx="1"/>
+          </p:nvPr>
+        </p:nvSpPr>
+        <p:spPr/>
+        <p:txBody>
+          <a:bodyPr/>
+          <a:lstStyle/>
+          <a:p>
+            <a:r>
+              <a:rPr lang="en-US" sz="1200" kern="1200" dirty="0" smtClean="0">
+                <a:solidFill>
+                  <a:schemeClr val="tx1"/>
+                </a:solidFill>
+                <a:latin typeface="+mn-lt"/>
+                <a:ea typeface="+mn-ea"/>
+                <a:cs typeface="+mn-cs"/>
+              </a:rPr>
+              <a:t>In this sample we will focus on the simple RLC usage and how to break at least some multitemplating limitation  using the JSF's view component.</a:t>
+            </a:r>
+          </a:p>
+          <a:p>
+            <a:endParaRPr lang="en-US" sz="1200" kern="1200" dirty="0" smtClean="0">
+              <a:solidFill>
+                <a:schemeClr val="tx1"/>
+              </a:solidFill>
+              <a:latin typeface="+mn-lt"/>
+              <a:ea typeface="+mn-ea"/>
+              <a:cs typeface="+mn-cs"/>
+            </a:endParaRPr>
+          </a:p>
+          <a:p>
+            <a:r>
+              <a:rPr lang="en-US" sz="1200" kern="1200" dirty="0" smtClean="0">
+                <a:solidFill>
+                  <a:schemeClr val="tx1"/>
+                </a:solidFill>
+                <a:latin typeface="+mn-lt"/>
+                <a:ea typeface="+mn-ea"/>
+                <a:cs typeface="+mn-cs"/>
+              </a:rPr>
+              <a:t>Our simpler template client shows that usage of template called simpleTemplate. As you could see there is no such template available within the documentation</a:t>
+            </a:r>
+            <a:r>
+              <a:rPr lang="en-US" sz="1200" kern="1200" baseline="0" dirty="0" smtClean="0">
+                <a:solidFill>
+                  <a:schemeClr val="tx1"/>
+                </a:solidFill>
+                <a:latin typeface="+mn-lt"/>
+                <a:ea typeface="+mn-ea"/>
+                <a:cs typeface="+mn-cs"/>
+              </a:rPr>
+              <a:t> </a:t>
+            </a:r>
+            <a:r>
+              <a:rPr lang="en-US" sz="1200" kern="1200" dirty="0" smtClean="0">
+                <a:solidFill>
+                  <a:schemeClr val="tx1"/>
+                </a:solidFill>
+                <a:latin typeface="+mn-lt"/>
+                <a:ea typeface="+mn-ea"/>
+                <a:cs typeface="+mn-cs"/>
+              </a:rPr>
+              <a:t>root of the application. Instead of that the template is loaded from the simple RLC. This contract is used because it contains the only valid candidate for such path.</a:t>
+            </a:r>
+            <a:r>
+              <a:rPr lang="en-US" sz="1200" kern="1200" baseline="0" dirty="0" smtClean="0">
+                <a:solidFill>
+                  <a:schemeClr val="tx1"/>
+                </a:solidFill>
+                <a:latin typeface="+mn-lt"/>
+                <a:ea typeface="+mn-ea"/>
+                <a:cs typeface="+mn-cs"/>
+              </a:rPr>
+              <a:t> </a:t>
+            </a:r>
+            <a:r>
+              <a:rPr lang="en-US" sz="1200" kern="1200" dirty="0" smtClean="0">
+                <a:solidFill>
+                  <a:schemeClr val="tx1"/>
+                </a:solidFill>
+                <a:latin typeface="+mn-lt"/>
+                <a:ea typeface="+mn-ea"/>
+                <a:cs typeface="+mn-cs"/>
+              </a:rPr>
+              <a:t>That was pretty simple. Now let's show how to leverage that in your applications. Define simple bean which holds information about chosen template. That</a:t>
+            </a:r>
+            <a:r>
+              <a:rPr lang="en-US" sz="1200" kern="1200" baseline="0" dirty="0" smtClean="0">
+                <a:solidFill>
+                  <a:schemeClr val="tx1"/>
+                </a:solidFill>
+                <a:latin typeface="+mn-lt"/>
+                <a:ea typeface="+mn-ea"/>
+                <a:cs typeface="+mn-cs"/>
+              </a:rPr>
+              <a:t> </a:t>
+            </a:r>
+            <a:r>
+              <a:rPr lang="en-US" sz="1200" kern="1200" dirty="0" smtClean="0">
+                <a:solidFill>
+                  <a:schemeClr val="tx1"/>
+                </a:solidFill>
+                <a:latin typeface="+mn-lt"/>
+                <a:ea typeface="+mn-ea"/>
+                <a:cs typeface="+mn-cs"/>
+              </a:rPr>
+              <a:t>information you can use within the contracts attribute of the view element. Now, the switching</a:t>
+            </a:r>
+            <a:r>
+              <a:rPr lang="en-US" sz="1200" kern="1200" baseline="0" dirty="0" smtClean="0">
+                <a:solidFill>
+                  <a:schemeClr val="tx1"/>
+                </a:solidFill>
+                <a:latin typeface="+mn-lt"/>
+                <a:ea typeface="+mn-ea"/>
+                <a:cs typeface="+mn-cs"/>
+              </a:rPr>
+              <a:t> of</a:t>
+            </a:r>
+            <a:r>
+              <a:rPr lang="en-US" sz="1200" kern="1200" dirty="0" smtClean="0">
+                <a:solidFill>
+                  <a:schemeClr val="tx1"/>
+                </a:solidFill>
+                <a:latin typeface="+mn-lt"/>
+                <a:ea typeface="+mn-ea"/>
+                <a:cs typeface="+mn-cs"/>
+              </a:rPr>
+              <a:t> templates is based on choice of the user in the form.</a:t>
+            </a:r>
+          </a:p>
+          <a:p>
+            <a:endParaRPr lang="en-US" sz="1200" kern="1200" dirty="0" smtClean="0">
+              <a:solidFill>
+                <a:schemeClr val="tx1"/>
+              </a:solidFill>
+              <a:latin typeface="+mn-lt"/>
+              <a:ea typeface="+mn-ea"/>
+              <a:cs typeface="+mn-cs"/>
+            </a:endParaRPr>
+          </a:p>
+          <a:p>
+            <a:r>
+              <a:rPr lang="en-US" sz="1200" kern="1200" dirty="0" smtClean="0">
+                <a:solidFill>
+                  <a:schemeClr val="tx1"/>
+                </a:solidFill>
+                <a:latin typeface="+mn-lt"/>
+                <a:ea typeface="+mn-ea"/>
+                <a:cs typeface="+mn-cs"/>
+              </a:rPr>
+              <a:t>For your projects let's imagine that you will define your templates inside the external .JAR library. You will obtain deifinition i.e. of the corporate themes which are reusable by more applications and also the theme could be switched by the .JAR change on a classpath.</a:t>
+            </a:r>
+          </a:p>
+          <a:p>
+            <a:endParaRPr lang="en-US" dirty="0"/>
+          </a:p>
+        </p:txBody>
+      </p:sp>
+      <p:sp>
+        <p:nvSpPr>
+          <p:cNvPr id="4" name="Slide Number Placeholder 3"/>
+          <p:cNvSpPr>
+            <a:spLocks noGrp="1"/>
+          </p:cNvSpPr>
+          <p:nvPr>
+            <p:ph type="sldNum" sz="quarter" idx="10"/>
+          </p:nvPr>
+        </p:nvSpPr>
+        <p:spPr/>
+        <p:txBody>
+          <a:bodyPr/>
+          <a:lstStyle/>
+          <a:p>
+            <a:fld id="{36E82501-53DA-4152-84B0-51135B15EEA8}" type="slidenum">
+              <a:rPr lang="en-US" smtClean="0"/>
+              <a:t>14</a:t>
+            </a:fld>
+            <a:endParaRPr lang="en-US"/>
+          </a:p>
+        </p:txBody>
+      </p:sp>
+    </p:spTree>
+    <p:extLst>
+      <p:ext uri="{BB962C8B-B14F-4D97-AF65-F5344CB8AC3E}">
+        <p14:creationId xmlns:p14="http://schemas.microsoft.com/office/powerpoint/2010/main" val="1354545579"/>
+      </p:ext>
+    </p:extLst>
+  </p:cSld>
+  <p:clrMapOvr>
+    <a:masterClrMapping/>
+  </p:clrMapOvr>
+</p:notes>
+</file>
+
+<file path=ppt/notesSlides/notesSlide8.xml><?xml version="1.0" encoding="utf-8"?>
+<p:notes xmlns:a="http://schemas.openxmlformats.org/drawingml/2006/main" xmlns:r="http://schemas.openxmlformats.org/officeDocument/2006/relationships" xmlns:p="http://schemas.openxmlformats.org/presentationml/2006/main">
+  <p:cSld>
+    <p:spTree>
+      <p:nvGrpSpPr>
+        <p:cNvPr id="1" name=""/>
+        <p:cNvGrpSpPr/>
+        <p:nvPr/>
+      </p:nvGrpSpPr>
+      <p:grpSpPr>
+        <a:xfrm>
+          <a:off x="0" y="0"/>
+          <a:ext cx="0" cy="0"/>
+          <a:chOff x="0" y="0"/>
+          <a:chExt cx="0" cy="0"/>
+        </a:xfrm>
+      </p:grpSpPr>
+      <p:sp>
+        <p:nvSpPr>
+          <p:cNvPr id="2" name="Slide Image Placeholder 1"/>
+          <p:cNvSpPr>
+            <a:spLocks noGrp="1" noRot="1" noChangeAspect="1"/>
+          </p:cNvSpPr>
+          <p:nvPr>
+            <p:ph type="sldImg"/>
+          </p:nvPr>
+        </p:nvSpPr>
+        <p:spPr/>
+      </p:sp>
+      <p:sp>
+        <p:nvSpPr>
+          <p:cNvPr id="3" name="Notes Placeholder 2"/>
+          <p:cNvSpPr>
+            <a:spLocks noGrp="1"/>
+          </p:cNvSpPr>
+          <p:nvPr>
+            <p:ph type="body" idx="1"/>
+          </p:nvPr>
+        </p:nvSpPr>
+        <p:spPr/>
+        <p:txBody>
+          <a:bodyPr/>
+          <a:lstStyle/>
+          <a:p>
+            <a:r>
+              <a:rPr lang="en-US" sz="1200" kern="1200" dirty="0" smtClean="0">
+                <a:solidFill>
+                  <a:schemeClr val="tx1"/>
+                </a:solidFill>
+                <a:latin typeface="+mn-lt"/>
+                <a:ea typeface="+mn-ea"/>
+                <a:cs typeface="+mn-cs"/>
+              </a:rPr>
+              <a:t>As you probably knows, EL is mechanism how to communicate from application logic to presentation layer and vice versa.</a:t>
+            </a:r>
+            <a:r>
+              <a:rPr lang="en-US" sz="1200" kern="1200" baseline="0" dirty="0" smtClean="0">
+                <a:solidFill>
+                  <a:schemeClr val="tx1"/>
+                </a:solidFill>
+                <a:latin typeface="+mn-lt"/>
+                <a:ea typeface="+mn-ea"/>
+                <a:cs typeface="+mn-cs"/>
+              </a:rPr>
+              <a:t> </a:t>
+            </a:r>
+            <a:r>
+              <a:rPr lang="en-US" sz="1200" kern="1200" dirty="0" smtClean="0">
+                <a:solidFill>
+                  <a:schemeClr val="tx1"/>
+                </a:solidFill>
+                <a:latin typeface="+mn-lt"/>
+                <a:ea typeface="+mn-ea"/>
+                <a:cs typeface="+mn-cs"/>
+              </a:rPr>
+              <a:t>It sets or gets data between the layers or invokes methods to be called directly or i.e. called from listeners attached to components.</a:t>
+            </a:r>
+            <a:r>
+              <a:rPr lang="en-US" sz="1200" kern="1200" baseline="0" dirty="0" smtClean="0">
+                <a:solidFill>
+                  <a:schemeClr val="tx1"/>
+                </a:solidFill>
+                <a:latin typeface="+mn-lt"/>
+                <a:ea typeface="+mn-ea"/>
+                <a:cs typeface="+mn-cs"/>
+              </a:rPr>
+              <a:t> </a:t>
+            </a:r>
+            <a:r>
+              <a:rPr lang="en-US" sz="1200" kern="1200" dirty="0" smtClean="0">
+                <a:solidFill>
+                  <a:schemeClr val="tx1"/>
+                </a:solidFill>
+                <a:latin typeface="+mn-lt"/>
+                <a:ea typeface="+mn-ea"/>
+                <a:cs typeface="+mn-cs"/>
+              </a:rPr>
+              <a:t>Let's show the biggest features of the new specification within samples</a:t>
+            </a:r>
+            <a:r>
+              <a:rPr lang="en-US" sz="1200" kern="1200" baseline="0" dirty="0" smtClean="0">
+                <a:solidFill>
+                  <a:schemeClr val="tx1"/>
+                </a:solidFill>
+                <a:latin typeface="+mn-lt"/>
+                <a:ea typeface="+mn-ea"/>
+                <a:cs typeface="+mn-cs"/>
+              </a:rPr>
+              <a:t> </a:t>
+            </a:r>
+            <a:r>
+              <a:rPr lang="en-US" sz="1200" kern="1200" dirty="0" smtClean="0">
+                <a:solidFill>
+                  <a:schemeClr val="tx1"/>
+                </a:solidFill>
+                <a:latin typeface="+mn-lt"/>
+                <a:ea typeface="+mn-ea"/>
+                <a:cs typeface="+mn-cs"/>
+              </a:rPr>
+              <a:t>immediately.</a:t>
+            </a:r>
+          </a:p>
+          <a:p>
+            <a:endParaRPr lang="en-US" dirty="0"/>
+          </a:p>
+        </p:txBody>
+      </p:sp>
+      <p:sp>
+        <p:nvSpPr>
+          <p:cNvPr id="4" name="Slide Number Placeholder 3"/>
+          <p:cNvSpPr>
+            <a:spLocks noGrp="1"/>
+          </p:cNvSpPr>
+          <p:nvPr>
+            <p:ph type="sldNum" sz="quarter" idx="10"/>
+          </p:nvPr>
+        </p:nvSpPr>
+        <p:spPr/>
+        <p:txBody>
+          <a:bodyPr/>
+          <a:lstStyle/>
+          <a:p>
+            <a:fld id="{36E82501-53DA-4152-84B0-51135B15EEA8}" type="slidenum">
+              <a:rPr lang="en-US" smtClean="0"/>
+              <a:t>16</a:t>
+            </a:fld>
+            <a:endParaRPr lang="en-US"/>
+          </a:p>
+        </p:txBody>
+      </p:sp>
+    </p:spTree>
+    <p:extLst>
+      <p:ext uri="{BB962C8B-B14F-4D97-AF65-F5344CB8AC3E}">
+        <p14:creationId xmlns:p14="http://schemas.microsoft.com/office/powerpoint/2010/main" val="2661981757"/>
+      </p:ext>
+    </p:extLst>
+  </p:cSld>
+  <p:clrMapOvr>
+    <a:masterClrMapping/>
+  </p:clrMapOvr>
+</p:notes>
+</file>
+
+<file path=ppt/notesSlides/notesSlide9.xml><?xml version="1.0" encoding="utf-8"?>
+<p:notes xmlns:a="http://schemas.openxmlformats.org/drawingml/2006/main" xmlns:r="http://schemas.openxmlformats.org/officeDocument/2006/relationships" xmlns:p="http://schemas.openxmlformats.org/presentationml/2006/main">
+  <p:cSld>
+    <p:spTree>
+      <p:nvGrpSpPr>
+        <p:cNvPr id="1" name=""/>
+        <p:cNvGrpSpPr/>
+        <p:nvPr/>
+      </p:nvGrpSpPr>
+      <p:grpSpPr>
+        <a:xfrm>
+          <a:off x="0" y="0"/>
+          <a:ext cx="0" cy="0"/>
+          <a:chOff x="0" y="0"/>
+          <a:chExt cx="0" cy="0"/>
+        </a:xfrm>
+      </p:grpSpPr>
+      <p:sp>
+        <p:nvSpPr>
+          <p:cNvPr id="2" name="Slide Image Placeholder 1"/>
+          <p:cNvSpPr>
+            <a:spLocks noGrp="1" noRot="1" noChangeAspect="1"/>
+          </p:cNvSpPr>
+          <p:nvPr>
+            <p:ph type="sldImg"/>
+          </p:nvPr>
+        </p:nvSpPr>
+        <p:spPr/>
+      </p:sp>
+      <p:sp>
+        <p:nvSpPr>
+          <p:cNvPr id="3" name="Notes Placeholder 2"/>
+          <p:cNvSpPr>
+            <a:spLocks noGrp="1"/>
+          </p:cNvSpPr>
+          <p:nvPr>
+            <p:ph type="body" idx="1"/>
+          </p:nvPr>
+        </p:nvSpPr>
+        <p:spPr/>
+        <p:txBody>
+          <a:bodyPr/>
+          <a:lstStyle/>
+          <a:p>
+            <a:r>
+              <a:rPr lang="en-US" sz="1200" kern="1200" dirty="0" smtClean="0">
+                <a:solidFill>
+                  <a:schemeClr val="tx1"/>
+                </a:solidFill>
+                <a:latin typeface="+mn-lt"/>
+                <a:ea typeface="+mn-ea"/>
+                <a:cs typeface="+mn-cs"/>
+              </a:rPr>
+              <a:t>The first news in the API is that you are able to use standalone ELProcessor now. I have defined strings to be evaluated. Output from the standalone processor is shown in the second column. This enables better option how to test your application or you can even manage your EL parsing and evaluation environment - i.e.</a:t>
+            </a:r>
+            <a:r>
+              <a:rPr lang="en-US" sz="1200" kern="1200" baseline="0" dirty="0" smtClean="0">
+                <a:solidFill>
+                  <a:schemeClr val="tx1"/>
+                </a:solidFill>
+                <a:latin typeface="+mn-lt"/>
+                <a:ea typeface="+mn-ea"/>
+                <a:cs typeface="+mn-cs"/>
+              </a:rPr>
+              <a:t> you can register your custom ELResolver.</a:t>
+            </a:r>
+          </a:p>
+          <a:p>
+            <a:endParaRPr lang="en-US" sz="1200" kern="1200" dirty="0" smtClean="0">
+              <a:solidFill>
+                <a:schemeClr val="tx1"/>
+              </a:solidFill>
+              <a:latin typeface="+mn-lt"/>
+              <a:ea typeface="+mn-ea"/>
+              <a:cs typeface="+mn-cs"/>
+            </a:endParaRPr>
+          </a:p>
+          <a:p>
+            <a:r>
+              <a:rPr lang="en-US" sz="1200" kern="1200" dirty="0" smtClean="0">
+                <a:solidFill>
+                  <a:schemeClr val="tx1"/>
+                </a:solidFill>
+                <a:latin typeface="+mn-lt"/>
+                <a:ea typeface="+mn-ea"/>
+                <a:cs typeface="+mn-cs"/>
+              </a:rPr>
+              <a:t>Operators. Especially semicolon and assignement operators can make your development easier. You can place more statements inside one EL expression now or assign resolved value to the variable and use it further. Also you can even store reference to the lambda expression and call it like a method then. You will see that later.</a:t>
+            </a:r>
+          </a:p>
+          <a:p>
+            <a:endParaRPr lang="en-US" sz="1200" kern="1200" dirty="0" smtClean="0">
+              <a:solidFill>
+                <a:schemeClr val="tx1"/>
+              </a:solidFill>
+              <a:latin typeface="+mn-lt"/>
+              <a:ea typeface="+mn-ea"/>
+              <a:cs typeface="+mn-cs"/>
+            </a:endParaRPr>
+          </a:p>
+          <a:p>
+            <a:r>
+              <a:rPr lang="en-US" sz="1200" kern="1200" dirty="0" smtClean="0">
+                <a:solidFill>
+                  <a:schemeClr val="tx1"/>
+                </a:solidFill>
+                <a:latin typeface="+mn-lt"/>
+                <a:ea typeface="+mn-ea"/>
+                <a:cs typeface="+mn-cs"/>
+              </a:rPr>
+              <a:t>Let's skip two features you can find in the samples and switch immediately to the lambda expressions and collection operations. Both these features are fairly aligned with the Java SE 8 ones.</a:t>
+            </a:r>
+            <a:r>
+              <a:rPr lang="en-US" sz="1200" kern="1200" baseline="0" dirty="0" smtClean="0">
+                <a:solidFill>
+                  <a:schemeClr val="tx1"/>
+                </a:solidFill>
+                <a:latin typeface="+mn-lt"/>
+                <a:ea typeface="+mn-ea"/>
+                <a:cs typeface="+mn-cs"/>
+              </a:rPr>
+              <a:t> </a:t>
+            </a:r>
+            <a:r>
+              <a:rPr lang="en-US" sz="1200" kern="1200" dirty="0" smtClean="0">
+                <a:solidFill>
+                  <a:schemeClr val="tx1"/>
+                </a:solidFill>
+                <a:latin typeface="+mn-lt"/>
+                <a:ea typeface="+mn-ea"/>
+                <a:cs typeface="+mn-cs"/>
+              </a:rPr>
+              <a:t>Lambdas can be resolved immediately, referenced by EL variable or passed as a method argument. The third case is just useful in</a:t>
+            </a:r>
+            <a:r>
+              <a:rPr lang="en-US" sz="1200" kern="1200" baseline="0" dirty="0" smtClean="0">
+                <a:solidFill>
+                  <a:schemeClr val="tx1"/>
+                </a:solidFill>
+                <a:latin typeface="+mn-lt"/>
+                <a:ea typeface="+mn-ea"/>
+                <a:cs typeface="+mn-cs"/>
+              </a:rPr>
+              <a:t> collection operations to specify array reduction instructions, mapping functions etc. (Th</a:t>
+            </a:r>
+            <a:r>
+              <a:rPr lang="en-US" sz="1200" kern="1200" dirty="0" smtClean="0">
+                <a:solidFill>
+                  <a:schemeClr val="tx1"/>
+                </a:solidFill>
+                <a:latin typeface="+mn-lt"/>
+                <a:ea typeface="+mn-ea"/>
+                <a:cs typeface="+mn-cs"/>
+              </a:rPr>
+              <a:t>ere exists two kinds of operations: lazy and eager. Lazy ones iterates over collections only when necessary, the eagers iterates immediately through entire collection.) In any case you can </a:t>
+            </a:r>
+            <a:r>
+              <a:rPr lang="en-US" sz="1200" kern="1200" baseline="0" dirty="0" smtClean="0">
+                <a:solidFill>
+                  <a:schemeClr val="tx1"/>
+                </a:solidFill>
+                <a:latin typeface="+mn-lt"/>
+                <a:ea typeface="+mn-ea"/>
+                <a:cs typeface="+mn-cs"/>
+              </a:rPr>
+              <a:t>simplify your templates or controllers by usage of max, count, reduce, limit and another opperations and once you would be missing any you can define method via lambda expression. These last two features will be big helpmates of your development.</a:t>
+            </a:r>
+            <a:endParaRPr lang="en-US" sz="1200" kern="1200" dirty="0" smtClean="0">
+              <a:solidFill>
+                <a:schemeClr val="tx1"/>
+              </a:solidFill>
+              <a:latin typeface="+mn-lt"/>
+              <a:ea typeface="+mn-ea"/>
+              <a:cs typeface="+mn-cs"/>
+            </a:endParaRPr>
+          </a:p>
+        </p:txBody>
+      </p:sp>
+      <p:sp>
+        <p:nvSpPr>
+          <p:cNvPr id="4" name="Slide Number Placeholder 3"/>
+          <p:cNvSpPr>
+            <a:spLocks noGrp="1"/>
+          </p:cNvSpPr>
+          <p:nvPr>
+            <p:ph type="sldNum" sz="quarter" idx="10"/>
+          </p:nvPr>
+        </p:nvSpPr>
+        <p:spPr/>
+        <p:txBody>
+          <a:bodyPr/>
+          <a:lstStyle/>
+          <a:p>
+            <a:fld id="{36E82501-53DA-4152-84B0-51135B15EEA8}" type="slidenum">
+              <a:rPr lang="en-US" smtClean="0"/>
+              <a:t>17</a:t>
+            </a:fld>
+            <a:endParaRPr lang="en-US"/>
+          </a:p>
+        </p:txBody>
+      </p:sp>
+    </p:spTree>
+    <p:extLst>
+      <p:ext uri="{BB962C8B-B14F-4D97-AF65-F5344CB8AC3E}">
+        <p14:creationId xmlns:p14="http://schemas.microsoft.com/office/powerpoint/2010/main" val="1772055650"/>
       </p:ext>
     </p:extLst>
   </p:cSld>

</xml_diff>

<commit_message>
presentation updated on slides
</commit_message>
<xml_diff>
--- a/con3638.pptx
+++ b/con3638.pptx
@@ -236,7 +236,7 @@
           <a:p>
             <a:fld id="{E99333BE-0D34-4F62-BD6E-2C3B14663373}" type="datetimeFigureOut">
               <a:rPr lang="en-US" smtClean="0"/>
-              <a:t>9/18/13</a:t>
+              <a:t>9/23/13</a:t>
             </a:fld>
             <a:endParaRPr lang="en-US"/>
           </a:p>
@@ -402,7 +402,7 @@
           <a:p>
             <a:fld id="{4A2D1F94-724F-43BD-B41B-43157E9B4550}" type="datetimeFigureOut">
               <a:rPr lang="en-US" smtClean="0"/>
-              <a:t>9/18/13</a:t>
+              <a:t>9/23/13</a:t>
             </a:fld>
             <a:endParaRPr lang="en-US"/>
           </a:p>
@@ -800,281 +800,7 @@
           <a:bodyPr/>
           <a:lstStyle/>
           <a:p>
-            <a:r>
-              <a:rPr lang="en-US" dirty="0" smtClean="0"/>
-              <a:t>Resource Libraries Contracts</a:t>
-            </a:r>
-            <a:r>
-              <a:rPr lang="en-US" sz="1200" kern="1200" dirty="0" smtClean="0">
-                <a:solidFill>
-                  <a:schemeClr val="tx1"/>
-                </a:solidFill>
-                <a:latin typeface="+mn-lt"/>
-                <a:ea typeface="+mn-ea"/>
-                <a:cs typeface="+mn-cs"/>
-              </a:rPr>
-              <a:t> allows you to switch various L&amp;F across one web application or also it's able to define reusable L&amp;F library.</a:t>
-            </a:r>
-            <a:r>
-              <a:rPr lang="en-US" sz="1200" kern="1200" baseline="0" dirty="0" smtClean="0">
-                <a:solidFill>
-                  <a:schemeClr val="tx1"/>
-                </a:solidFill>
-                <a:latin typeface="+mn-lt"/>
-                <a:ea typeface="+mn-ea"/>
-                <a:cs typeface="+mn-cs"/>
-              </a:rPr>
-              <a:t> </a:t>
-            </a:r>
-            <a:r>
-              <a:rPr lang="en-US" sz="1200" kern="1200" dirty="0" smtClean="0">
-                <a:solidFill>
-                  <a:schemeClr val="tx1"/>
-                </a:solidFill>
-                <a:latin typeface="+mn-lt"/>
-                <a:ea typeface="+mn-ea"/>
-                <a:cs typeface="+mn-cs"/>
-              </a:rPr>
-              <a:t>Every contract can specify templates, insertion points and statuc resources like images, styles, javascript files and so one.</a:t>
-            </a:r>
-            <a:r>
-              <a:rPr lang="en-US" sz="1200" kern="1200" baseline="0" dirty="0" smtClean="0">
-                <a:solidFill>
-                  <a:schemeClr val="tx1"/>
-                </a:solidFill>
-                <a:latin typeface="+mn-lt"/>
-                <a:ea typeface="+mn-ea"/>
-                <a:cs typeface="+mn-cs"/>
-              </a:rPr>
-              <a:t> </a:t>
-            </a:r>
-            <a:r>
-              <a:rPr lang="en-US" sz="1200" kern="1200" dirty="0" smtClean="0">
-                <a:solidFill>
-                  <a:schemeClr val="tx1"/>
-                </a:solidFill>
-                <a:latin typeface="+mn-lt"/>
-                <a:ea typeface="+mn-ea"/>
-                <a:cs typeface="+mn-cs"/>
-              </a:rPr>
-              <a:t>This creates complete bundle to be placed into the web root or to be included on the application classpath.</a:t>
-            </a:r>
-            <a:r>
-              <a:rPr lang="en-US" sz="1200" kern="1200" baseline="0" dirty="0" smtClean="0">
-                <a:solidFill>
-                  <a:schemeClr val="tx1"/>
-                </a:solidFill>
-                <a:latin typeface="+mn-lt"/>
-                <a:ea typeface="+mn-ea"/>
-                <a:cs typeface="+mn-cs"/>
-              </a:rPr>
-              <a:t> </a:t>
-            </a:r>
-            <a:r>
-              <a:rPr lang="en-US" sz="1200" kern="1200" dirty="0" smtClean="0">
-                <a:solidFill>
-                  <a:schemeClr val="tx1"/>
-                </a:solidFill>
-                <a:latin typeface="+mn-lt"/>
-                <a:ea typeface="+mn-ea"/>
-                <a:cs typeface="+mn-cs"/>
-              </a:rPr>
-              <a:t>How could you choose the contract</a:t>
-            </a:r>
-            <a:r>
-              <a:rPr lang="en-US" sz="1200" kern="1200" baseline="0" dirty="0" smtClean="0">
-                <a:solidFill>
-                  <a:schemeClr val="tx1"/>
-                </a:solidFill>
-                <a:latin typeface="+mn-lt"/>
-                <a:ea typeface="+mn-ea"/>
-                <a:cs typeface="+mn-cs"/>
-              </a:rPr>
-              <a:t> then</a:t>
-            </a:r>
-            <a:r>
-              <a:rPr lang="en-US" sz="1200" kern="1200" dirty="0" smtClean="0">
-                <a:solidFill>
-                  <a:schemeClr val="tx1"/>
-                </a:solidFill>
-                <a:latin typeface="+mn-lt"/>
-                <a:ea typeface="+mn-ea"/>
-                <a:cs typeface="+mn-cs"/>
-              </a:rPr>
-              <a:t>? Right now you have</a:t>
-            </a:r>
-            <a:r>
-              <a:rPr lang="en-US" sz="1200" kern="1200" baseline="0" dirty="0" smtClean="0">
-                <a:solidFill>
-                  <a:schemeClr val="tx1"/>
-                </a:solidFill>
-                <a:latin typeface="+mn-lt"/>
-                <a:ea typeface="+mn-ea"/>
-                <a:cs typeface="+mn-cs"/>
-              </a:rPr>
-              <a:t> following  </a:t>
-            </a:r>
-            <a:r>
-              <a:rPr lang="en-US" sz="1200" kern="1200" dirty="0" smtClean="0">
-                <a:solidFill>
-                  <a:schemeClr val="tx1"/>
-                </a:solidFill>
-                <a:latin typeface="+mn-lt"/>
-                <a:ea typeface="+mn-ea"/>
-                <a:cs typeface="+mn-cs"/>
-              </a:rPr>
-              <a:t>three options:</a:t>
-            </a:r>
-          </a:p>
-          <a:p>
-            <a:r>
-              <a:rPr lang="en-US" sz="1200" kern="1200" dirty="0" smtClean="0">
-                <a:solidFill>
-                  <a:schemeClr val="tx1"/>
-                </a:solidFill>
-                <a:latin typeface="+mn-lt"/>
-                <a:ea typeface="+mn-ea"/>
-                <a:cs typeface="+mn-cs"/>
-              </a:rPr>
-              <a:t>-</a:t>
-            </a:r>
-            <a:r>
-              <a:rPr lang="en-US" sz="1200" kern="1200" baseline="0" dirty="0" smtClean="0">
-                <a:solidFill>
-                  <a:schemeClr val="tx1"/>
-                </a:solidFill>
-                <a:latin typeface="+mn-lt"/>
-                <a:ea typeface="+mn-ea"/>
-                <a:cs typeface="+mn-cs"/>
-              </a:rPr>
-              <a:t> </a:t>
-            </a:r>
-            <a:r>
-              <a:rPr lang="en-US" sz="1200" kern="1200" dirty="0" smtClean="0">
-                <a:solidFill>
-                  <a:schemeClr val="tx1"/>
-                </a:solidFill>
-                <a:latin typeface="+mn-lt"/>
-                <a:ea typeface="+mn-ea"/>
-                <a:cs typeface="+mn-cs"/>
-              </a:rPr>
-              <a:t>There exists only one option</a:t>
-            </a:r>
-            <a:r>
-              <a:rPr lang="en-US" sz="1200" kern="1200" baseline="0" dirty="0" smtClean="0">
-                <a:solidFill>
-                  <a:schemeClr val="tx1"/>
-                </a:solidFill>
-                <a:latin typeface="+mn-lt"/>
-                <a:ea typeface="+mn-ea"/>
-                <a:cs typeface="+mn-cs"/>
-              </a:rPr>
-              <a:t> -</a:t>
-            </a:r>
-            <a:r>
-              <a:rPr lang="en-US" sz="1200" kern="1200" dirty="0" smtClean="0">
-                <a:solidFill>
-                  <a:schemeClr val="tx1"/>
-                </a:solidFill>
-                <a:latin typeface="+mn-lt"/>
-                <a:ea typeface="+mn-ea"/>
-                <a:cs typeface="+mn-cs"/>
-              </a:rPr>
-              <a:t> one valid</a:t>
-            </a:r>
-            <a:r>
-              <a:rPr lang="en-US" sz="1200" kern="1200" baseline="0" dirty="0" smtClean="0">
-                <a:solidFill>
-                  <a:schemeClr val="tx1"/>
-                </a:solidFill>
-                <a:latin typeface="+mn-lt"/>
-                <a:ea typeface="+mn-ea"/>
-                <a:cs typeface="+mn-cs"/>
-              </a:rPr>
-              <a:t> template path</a:t>
-            </a:r>
-            <a:r>
-              <a:rPr lang="en-US" sz="1200" kern="1200" dirty="0" smtClean="0">
-                <a:solidFill>
-                  <a:schemeClr val="tx1"/>
-                </a:solidFill>
-                <a:latin typeface="+mn-lt"/>
-                <a:ea typeface="+mn-ea"/>
-                <a:cs typeface="+mn-cs"/>
-              </a:rPr>
-              <a:t> to be chosen.</a:t>
-            </a:r>
-          </a:p>
-          <a:p>
-            <a:r>
-              <a:rPr lang="en-US" sz="1200" kern="1200" dirty="0" smtClean="0">
-                <a:solidFill>
-                  <a:schemeClr val="tx1"/>
-                </a:solidFill>
-                <a:latin typeface="+mn-lt"/>
-                <a:ea typeface="+mn-ea"/>
-                <a:cs typeface="+mn-cs"/>
-              </a:rPr>
-              <a:t>- You can choose the contract statically or dynamically using the EL within the view element.</a:t>
-            </a:r>
-          </a:p>
-          <a:p>
-            <a:r>
-              <a:rPr lang="en-US" sz="1200" kern="1200" dirty="0" smtClean="0">
-                <a:solidFill>
-                  <a:schemeClr val="tx1"/>
-                </a:solidFill>
-                <a:latin typeface="+mn-lt"/>
-                <a:ea typeface="+mn-ea"/>
-                <a:cs typeface="+mn-cs"/>
-              </a:rPr>
-              <a:t>- And also there is a way to set mapping within faces-config file with limitation of the static RLC definition.</a:t>
-            </a:r>
-          </a:p>
-          <a:p>
-            <a:endParaRPr lang="en-US" sz="1200" kern="1200" dirty="0" smtClean="0">
-              <a:solidFill>
-                <a:schemeClr val="tx1"/>
-              </a:solidFill>
-              <a:latin typeface="+mn-lt"/>
-              <a:ea typeface="+mn-ea"/>
-              <a:cs typeface="+mn-cs"/>
-            </a:endParaRPr>
-          </a:p>
-          <a:p>
-            <a:r>
-              <a:rPr lang="en-US" sz="1200" kern="1200" dirty="0" smtClean="0">
-                <a:solidFill>
-                  <a:schemeClr val="tx1"/>
-                </a:solidFill>
-                <a:latin typeface="+mn-lt"/>
-                <a:ea typeface="+mn-ea"/>
-                <a:cs typeface="+mn-cs"/>
-              </a:rPr>
-              <a:t>We can suppose that JSF 2.3 should break not just faces-config</a:t>
-            </a:r>
-            <a:r>
-              <a:rPr lang="en-US" sz="1200" kern="1200" baseline="0" dirty="0" smtClean="0">
-                <a:solidFill>
-                  <a:schemeClr val="tx1"/>
-                </a:solidFill>
-                <a:latin typeface="+mn-lt"/>
-                <a:ea typeface="+mn-ea"/>
-                <a:cs typeface="+mn-cs"/>
-              </a:rPr>
-              <a:t> definition</a:t>
-            </a:r>
-            <a:r>
-              <a:rPr lang="en-US" sz="1200" kern="1200" dirty="0" smtClean="0">
-                <a:solidFill>
-                  <a:schemeClr val="tx1"/>
-                </a:solidFill>
-                <a:latin typeface="+mn-lt"/>
-                <a:ea typeface="+mn-ea"/>
-                <a:cs typeface="+mn-cs"/>
-              </a:rPr>
-              <a:t> limitation but also bring another way of theme selections, its parameters, inheritance which will lead to the complete multitemplating system.</a:t>
-            </a:r>
+            <a:endParaRPr lang="en-US" dirty="0"/>
           </a:p>
         </p:txBody>
       </p:sp>
@@ -1095,7 +821,7 @@
           <a:p>
             <a:fld id="{36E82501-53DA-4152-84B0-51135B15EEA8}" type="slidenum">
               <a:rPr lang="en-US" smtClean="0"/>
-              <a:t>13</a:t>
+              <a:t>11</a:t>
             </a:fld>
             <a:endParaRPr lang="en-US"/>
           </a:p>
@@ -1104,7 +830,7 @@
     </p:spTree>
     <p:extLst>
       <p:ext uri="{BB962C8B-B14F-4D97-AF65-F5344CB8AC3E}">
-        <p14:creationId xmlns:p14="http://schemas.microsoft.com/office/powerpoint/2010/main" val="3363076931"/>
+        <p14:creationId xmlns:p14="http://schemas.microsoft.com/office/powerpoint/2010/main" val="111152863"/>
       </p:ext>
     </p:extLst>
   </p:cSld>
@@ -1158,19 +884,6 @@
           <a:bodyPr/>
           <a:lstStyle/>
           <a:p>
-            <a:r>
-              <a:rPr lang="en-US" sz="1200" kern="1200" dirty="0" smtClean="0">
-                <a:solidFill>
-                  <a:schemeClr val="tx1"/>
-                </a:solidFill>
-                <a:latin typeface="+mn-lt"/>
-                <a:ea typeface="+mn-ea"/>
-                <a:cs typeface="+mn-cs"/>
-              </a:rPr>
-              <a:t>In this sample we will focus on the simple RLC usage and how to break at least some multitemplating limitation  using the JSF's view component.</a:t>
-            </a:r>
-          </a:p>
-          <a:p>
             <a:endParaRPr lang="en-US" sz="1200" kern="1200" dirty="0" smtClean="0">
               <a:solidFill>
                 <a:schemeClr val="tx1"/>
@@ -1180,133 +893,6 @@
               <a:cs typeface="+mn-cs"/>
             </a:endParaRPr>
           </a:p>
-          <a:p>
-            <a:r>
-              <a:rPr lang="en-US" sz="1200" kern="1200" dirty="0" smtClean="0">
-                <a:solidFill>
-                  <a:schemeClr val="tx1"/>
-                </a:solidFill>
-                <a:latin typeface="+mn-lt"/>
-                <a:ea typeface="+mn-ea"/>
-                <a:cs typeface="+mn-cs"/>
-              </a:rPr>
-              <a:t>Our simpler template client shows that usage of template called simpleTemplate. As you could see there is no such template available within the documentation</a:t>
-            </a:r>
-            <a:r>
-              <a:rPr lang="en-US" sz="1200" kern="1200" baseline="0" dirty="0" smtClean="0">
-                <a:solidFill>
-                  <a:schemeClr val="tx1"/>
-                </a:solidFill>
-                <a:latin typeface="+mn-lt"/>
-                <a:ea typeface="+mn-ea"/>
-                <a:cs typeface="+mn-cs"/>
-              </a:rPr>
-              <a:t> </a:t>
-            </a:r>
-            <a:r>
-              <a:rPr lang="en-US" sz="1200" kern="1200" dirty="0" smtClean="0">
-                <a:solidFill>
-                  <a:schemeClr val="tx1"/>
-                </a:solidFill>
-                <a:latin typeface="+mn-lt"/>
-                <a:ea typeface="+mn-ea"/>
-                <a:cs typeface="+mn-cs"/>
-              </a:rPr>
-              <a:t>root of the application. Instead of that the template is loaded from the simple RLC. This contract is used because it contains the only valid candidate for such path.</a:t>
-            </a:r>
-            <a:r>
-              <a:rPr lang="en-US" sz="1200" kern="1200" baseline="0" dirty="0" smtClean="0">
-                <a:solidFill>
-                  <a:schemeClr val="tx1"/>
-                </a:solidFill>
-                <a:latin typeface="+mn-lt"/>
-                <a:ea typeface="+mn-ea"/>
-                <a:cs typeface="+mn-cs"/>
-              </a:rPr>
-              <a:t> </a:t>
-            </a:r>
-            <a:r>
-              <a:rPr lang="en-US" sz="1200" kern="1200" dirty="0" smtClean="0">
-                <a:solidFill>
-                  <a:schemeClr val="tx1"/>
-                </a:solidFill>
-                <a:latin typeface="+mn-lt"/>
-                <a:ea typeface="+mn-ea"/>
-                <a:cs typeface="+mn-cs"/>
-              </a:rPr>
-              <a:t>That was pretty simple. Now let's show how to leverage that in your applications. Define simple bean which holds information about chosen template. That</a:t>
-            </a:r>
-            <a:r>
-              <a:rPr lang="en-US" sz="1200" kern="1200" baseline="0" dirty="0" smtClean="0">
-                <a:solidFill>
-                  <a:schemeClr val="tx1"/>
-                </a:solidFill>
-                <a:latin typeface="+mn-lt"/>
-                <a:ea typeface="+mn-ea"/>
-                <a:cs typeface="+mn-cs"/>
-              </a:rPr>
-              <a:t> </a:t>
-            </a:r>
-            <a:r>
-              <a:rPr lang="en-US" sz="1200" kern="1200" dirty="0" smtClean="0">
-                <a:solidFill>
-                  <a:schemeClr val="tx1"/>
-                </a:solidFill>
-                <a:latin typeface="+mn-lt"/>
-                <a:ea typeface="+mn-ea"/>
-                <a:cs typeface="+mn-cs"/>
-              </a:rPr>
-              <a:t>information you can use within the contracts attribute of the view element. Now, the switching</a:t>
-            </a:r>
-            <a:r>
-              <a:rPr lang="en-US" sz="1200" kern="1200" baseline="0" dirty="0" smtClean="0">
-                <a:solidFill>
-                  <a:schemeClr val="tx1"/>
-                </a:solidFill>
-                <a:latin typeface="+mn-lt"/>
-                <a:ea typeface="+mn-ea"/>
-                <a:cs typeface="+mn-cs"/>
-              </a:rPr>
-              <a:t> of</a:t>
-            </a:r>
-            <a:r>
-              <a:rPr lang="en-US" sz="1200" kern="1200" dirty="0" smtClean="0">
-                <a:solidFill>
-                  <a:schemeClr val="tx1"/>
-                </a:solidFill>
-                <a:latin typeface="+mn-lt"/>
-                <a:ea typeface="+mn-ea"/>
-                <a:cs typeface="+mn-cs"/>
-              </a:rPr>
-              <a:t> templates is based on choice of the user in the form.</a:t>
-            </a:r>
-          </a:p>
-          <a:p>
-            <a:endParaRPr lang="en-US" sz="1200" kern="1200" dirty="0" smtClean="0">
-              <a:solidFill>
-                <a:schemeClr val="tx1"/>
-              </a:solidFill>
-              <a:latin typeface="+mn-lt"/>
-              <a:ea typeface="+mn-ea"/>
-              <a:cs typeface="+mn-cs"/>
-            </a:endParaRPr>
-          </a:p>
-          <a:p>
-            <a:r>
-              <a:rPr lang="en-US" sz="1200" kern="1200" dirty="0" smtClean="0">
-                <a:solidFill>
-                  <a:schemeClr val="tx1"/>
-                </a:solidFill>
-                <a:latin typeface="+mn-lt"/>
-                <a:ea typeface="+mn-ea"/>
-                <a:cs typeface="+mn-cs"/>
-              </a:rPr>
-              <a:t>For your projects let's imagine that you will define your templates inside the external .JAR library. You will obtain deifinition i.e. of the corporate themes which are reusable by more applications and also the theme could be switched by the .JAR change on a classpath.</a:t>
-            </a:r>
-          </a:p>
-          <a:p>
-            <a:endParaRPr lang="en-US" dirty="0"/>
-          </a:p>
         </p:txBody>
       </p:sp>
       <p:sp>
@@ -1326,7 +912,7 @@
           <a:p>
             <a:fld id="{36E82501-53DA-4152-84B0-51135B15EEA8}" type="slidenum">
               <a:rPr lang="en-US" smtClean="0"/>
-              <a:t>14</a:t>
+              <a:t>13</a:t>
             </a:fld>
             <a:endParaRPr lang="en-US"/>
           </a:p>
@@ -1335,7 +921,7 @@
     </p:spTree>
     <p:extLst>
       <p:ext uri="{BB962C8B-B14F-4D97-AF65-F5344CB8AC3E}">
-        <p14:creationId xmlns:p14="http://schemas.microsoft.com/office/powerpoint/2010/main" val="1354545579"/>
+        <p14:creationId xmlns:p14="http://schemas.microsoft.com/office/powerpoint/2010/main" val="3363076931"/>
       </p:ext>
     </p:extLst>
   </p:cSld>
@@ -1389,85 +975,6 @@
           <a:bodyPr/>
           <a:lstStyle/>
           <a:p>
-            <a:r>
-              <a:rPr lang="en-US" sz="1200" kern="1200" dirty="0" smtClean="0">
-                <a:solidFill>
-                  <a:schemeClr val="tx1"/>
-                </a:solidFill>
-                <a:latin typeface="+mn-lt"/>
-                <a:ea typeface="+mn-ea"/>
-                <a:cs typeface="+mn-cs"/>
-              </a:rPr>
-              <a:t>As you probably knows, EL is mechanism how to communicate from application logic to presentation layer and vice versa.</a:t>
-            </a:r>
-            <a:r>
-              <a:rPr lang="en-US" sz="1200" kern="1200" baseline="0" dirty="0" smtClean="0">
-                <a:solidFill>
-                  <a:schemeClr val="tx1"/>
-                </a:solidFill>
-                <a:latin typeface="+mn-lt"/>
-                <a:ea typeface="+mn-ea"/>
-                <a:cs typeface="+mn-cs"/>
-              </a:rPr>
-              <a:t> </a:t>
-            </a:r>
-            <a:r>
-              <a:rPr lang="en-US" sz="1200" kern="1200" dirty="0" smtClean="0">
-                <a:solidFill>
-                  <a:schemeClr val="tx1"/>
-                </a:solidFill>
-                <a:latin typeface="+mn-lt"/>
-                <a:ea typeface="+mn-ea"/>
-                <a:cs typeface="+mn-cs"/>
-              </a:rPr>
-              <a:t>It sets or gets data between the layers or invokes methods to be called directly or i.e. called from listeners attached to components.</a:t>
-            </a:r>
-            <a:r>
-              <a:rPr lang="en-US" sz="1200" kern="1200" baseline="0" dirty="0" smtClean="0">
-                <a:solidFill>
-                  <a:schemeClr val="tx1"/>
-                </a:solidFill>
-                <a:latin typeface="+mn-lt"/>
-                <a:ea typeface="+mn-ea"/>
-                <a:cs typeface="+mn-cs"/>
-              </a:rPr>
-              <a:t> </a:t>
-            </a:r>
-            <a:r>
-              <a:rPr lang="en-US" sz="1200" kern="1200" dirty="0" smtClean="0">
-                <a:solidFill>
-                  <a:schemeClr val="tx1"/>
-                </a:solidFill>
-                <a:latin typeface="+mn-lt"/>
-                <a:ea typeface="+mn-ea"/>
-                <a:cs typeface="+mn-cs"/>
-              </a:rPr>
-              <a:t>Let's show the biggest features of the new specification within samples</a:t>
-            </a:r>
-            <a:r>
-              <a:rPr lang="en-US" sz="1200" kern="1200" baseline="0" dirty="0" smtClean="0">
-                <a:solidFill>
-                  <a:schemeClr val="tx1"/>
-                </a:solidFill>
-                <a:latin typeface="+mn-lt"/>
-                <a:ea typeface="+mn-ea"/>
-                <a:cs typeface="+mn-cs"/>
-              </a:rPr>
-              <a:t> </a:t>
-            </a:r>
-            <a:r>
-              <a:rPr lang="en-US" sz="1200" kern="1200" dirty="0" smtClean="0">
-                <a:solidFill>
-                  <a:schemeClr val="tx1"/>
-                </a:solidFill>
-                <a:latin typeface="+mn-lt"/>
-                <a:ea typeface="+mn-ea"/>
-                <a:cs typeface="+mn-cs"/>
-              </a:rPr>
-              <a:t>immediately.</a:t>
-            </a:r>
-          </a:p>
-          <a:p>
             <a:endParaRPr lang="en-US" dirty="0"/>
           </a:p>
         </p:txBody>
@@ -1489,7 +996,7 @@
           <a:p>
             <a:fld id="{36E82501-53DA-4152-84B0-51135B15EEA8}" type="slidenum">
               <a:rPr lang="en-US" smtClean="0"/>
-              <a:t>16</a:t>
+              <a:t>14</a:t>
             </a:fld>
             <a:endParaRPr lang="en-US"/>
           </a:p>
@@ -1498,7 +1005,7 @@
     </p:spTree>
     <p:extLst>
       <p:ext uri="{BB962C8B-B14F-4D97-AF65-F5344CB8AC3E}">
-        <p14:creationId xmlns:p14="http://schemas.microsoft.com/office/powerpoint/2010/main" val="2661981757"/>
+        <p14:creationId xmlns:p14="http://schemas.microsoft.com/office/powerpoint/2010/main" val="1354545579"/>
       </p:ext>
     </p:extLst>
   </p:cSld>
@@ -1552,137 +1059,7 @@
           <a:bodyPr/>
           <a:lstStyle/>
           <a:p>
-            <a:r>
-              <a:rPr lang="en-US" sz="1200" kern="1200" dirty="0" smtClean="0">
-                <a:solidFill>
-                  <a:schemeClr val="tx1"/>
-                </a:solidFill>
-                <a:latin typeface="+mn-lt"/>
-                <a:ea typeface="+mn-ea"/>
-                <a:cs typeface="+mn-cs"/>
-              </a:rPr>
-              <a:t>The first news in the API is that you are able to use standalone ELProcessor now. I have defined strings to be evaluated. Output from the standalone processor is shown in the second column. This enables better option how to test your application or you can even manage your EL parsing and evaluation environment - i.e.</a:t>
-            </a:r>
-            <a:r>
-              <a:rPr lang="en-US" sz="1200" kern="1200" baseline="0" dirty="0" smtClean="0">
-                <a:solidFill>
-                  <a:schemeClr val="tx1"/>
-                </a:solidFill>
-                <a:latin typeface="+mn-lt"/>
-                <a:ea typeface="+mn-ea"/>
-                <a:cs typeface="+mn-cs"/>
-              </a:rPr>
-              <a:t> you can register your custom ELResolver.</a:t>
-            </a:r>
-          </a:p>
-          <a:p>
-            <a:endParaRPr lang="en-US" sz="1200" kern="1200" dirty="0" smtClean="0">
-              <a:solidFill>
-                <a:schemeClr val="tx1"/>
-              </a:solidFill>
-              <a:latin typeface="+mn-lt"/>
-              <a:ea typeface="+mn-ea"/>
-              <a:cs typeface="+mn-cs"/>
-            </a:endParaRPr>
-          </a:p>
-          <a:p>
-            <a:r>
-              <a:rPr lang="en-US" sz="1200" kern="1200" dirty="0" smtClean="0">
-                <a:solidFill>
-                  <a:schemeClr val="tx1"/>
-                </a:solidFill>
-                <a:latin typeface="+mn-lt"/>
-                <a:ea typeface="+mn-ea"/>
-                <a:cs typeface="+mn-cs"/>
-              </a:rPr>
-              <a:t>Operators. Especially semicolon and assignement operators can make your development easier. You can place more statements inside one EL expression now or assign resolved value to the variable and use it further. Also you can even store reference to the lambda expression and call it like a method then. You will see that later.</a:t>
-            </a:r>
-          </a:p>
-          <a:p>
-            <a:endParaRPr lang="en-US" sz="1200" kern="1200" dirty="0" smtClean="0">
-              <a:solidFill>
-                <a:schemeClr val="tx1"/>
-              </a:solidFill>
-              <a:latin typeface="+mn-lt"/>
-              <a:ea typeface="+mn-ea"/>
-              <a:cs typeface="+mn-cs"/>
-            </a:endParaRPr>
-          </a:p>
-          <a:p>
-            <a:r>
-              <a:rPr lang="en-US" sz="1200" kern="1200" dirty="0" smtClean="0">
-                <a:solidFill>
-                  <a:schemeClr val="tx1"/>
-                </a:solidFill>
-                <a:latin typeface="+mn-lt"/>
-                <a:ea typeface="+mn-ea"/>
-                <a:cs typeface="+mn-cs"/>
-              </a:rPr>
-              <a:t>Let's skip two features you can find in the samples and switch immediately to the lambda expressions and collection operations. Both these features are fairly aligned with the Java SE 8 ones.</a:t>
-            </a:r>
-            <a:r>
-              <a:rPr lang="en-US" sz="1200" kern="1200" baseline="0" dirty="0" smtClean="0">
-                <a:solidFill>
-                  <a:schemeClr val="tx1"/>
-                </a:solidFill>
-                <a:latin typeface="+mn-lt"/>
-                <a:ea typeface="+mn-ea"/>
-                <a:cs typeface="+mn-cs"/>
-              </a:rPr>
-              <a:t> </a:t>
-            </a:r>
-            <a:r>
-              <a:rPr lang="en-US" sz="1200" kern="1200" dirty="0" smtClean="0">
-                <a:solidFill>
-                  <a:schemeClr val="tx1"/>
-                </a:solidFill>
-                <a:latin typeface="+mn-lt"/>
-                <a:ea typeface="+mn-ea"/>
-                <a:cs typeface="+mn-cs"/>
-              </a:rPr>
-              <a:t>Lambdas can be resolved immediately, referenced by EL variable or passed as a method argument. The third case is just useful in</a:t>
-            </a:r>
-            <a:r>
-              <a:rPr lang="en-US" sz="1200" kern="1200" baseline="0" dirty="0" smtClean="0">
-                <a:solidFill>
-                  <a:schemeClr val="tx1"/>
-                </a:solidFill>
-                <a:latin typeface="+mn-lt"/>
-                <a:ea typeface="+mn-ea"/>
-                <a:cs typeface="+mn-cs"/>
-              </a:rPr>
-              <a:t> collection operations to specify array reduction instructions, mapping functions etc. (Th</a:t>
-            </a:r>
-            <a:r>
-              <a:rPr lang="en-US" sz="1200" kern="1200" dirty="0" smtClean="0">
-                <a:solidFill>
-                  <a:schemeClr val="tx1"/>
-                </a:solidFill>
-                <a:latin typeface="+mn-lt"/>
-                <a:ea typeface="+mn-ea"/>
-                <a:cs typeface="+mn-cs"/>
-              </a:rPr>
-              <a:t>ere exists two kinds of operations: lazy and eager. Lazy ones iterates over collections only when necessary, the eagers iterates immediately through entire collection.) In any case you can </a:t>
-            </a:r>
-            <a:r>
-              <a:rPr lang="en-US" sz="1200" kern="1200" baseline="0" dirty="0" smtClean="0">
-                <a:solidFill>
-                  <a:schemeClr val="tx1"/>
-                </a:solidFill>
-                <a:latin typeface="+mn-lt"/>
-                <a:ea typeface="+mn-ea"/>
-                <a:cs typeface="+mn-cs"/>
-              </a:rPr>
-              <a:t>simplify your templates or controllers by usage of max, count, reduce, limit and another opperations and once you would be missing any you can define method via lambda expression. These last two features will be big helpmates of your development.</a:t>
-            </a:r>
-            <a:endParaRPr lang="en-US" sz="1200" kern="1200" dirty="0" smtClean="0">
-              <a:solidFill>
-                <a:schemeClr val="tx1"/>
-              </a:solidFill>
-              <a:latin typeface="+mn-lt"/>
-              <a:ea typeface="+mn-ea"/>
-              <a:cs typeface="+mn-cs"/>
-            </a:endParaRPr>
+            <a:endParaRPr lang="en-US" dirty="0"/>
           </a:p>
         </p:txBody>
       </p:sp>
@@ -1703,7 +1080,7 @@
           <a:p>
             <a:fld id="{36E82501-53DA-4152-84B0-51135B15EEA8}" type="slidenum">
               <a:rPr lang="en-US" smtClean="0"/>
-              <a:t>17</a:t>
+              <a:t>16</a:t>
             </a:fld>
             <a:endParaRPr lang="en-US"/>
           </a:p>
@@ -1712,7 +1089,7 @@
     </p:spTree>
     <p:extLst>
       <p:ext uri="{BB962C8B-B14F-4D97-AF65-F5344CB8AC3E}">
-        <p14:creationId xmlns:p14="http://schemas.microsoft.com/office/powerpoint/2010/main" val="1772055650"/>
+        <p14:creationId xmlns:p14="http://schemas.microsoft.com/office/powerpoint/2010/main" val="2661981757"/>
       </p:ext>
     </p:extLst>
   </p:cSld>
@@ -1766,24 +1143,14 @@
           <a:bodyPr/>
           <a:lstStyle/>
           <a:p>
-            <a:r>
-              <a:rPr lang="en-US" dirty="0" smtClean="0"/>
-              <a:t>PrimeFaces bundles</a:t>
-            </a:r>
-            <a:r>
-              <a:rPr lang="en-US" baseline="0" dirty="0" smtClean="0"/>
-              <a:t> over 100 JSF components that provide a rich UI experience with ajaxified architecture. It employs the JSF 2.0 standardized AJAX APIs on the server side and for the client side it uses jQuery for its javascript architecture. </a:t>
-            </a:r>
-          </a:p>
-          <a:p>
-            <a:r>
-              <a:rPr lang="en-US" baseline="0" dirty="0" smtClean="0"/>
-              <a:t>You can find nearly all the components that you might need to develop a web application, from a complex datatable to autocomplete, picklist and many others. The themes for all the components are managed in a centralized way with the help of the theme roller so structural and skinning CSS can be easily applied across the components. And With 4.0 release, codenamed sentinel, we are bringing some awesome features to the community like built-in client side validation infrastructure, which is compatible with the server side implementation, that exactly does what JSF do on the server side. The validation metadata is being held in HTML5 attributes. We are doing partial processing on the client side with javascript like JSF does on partial processing on the Ajax calls. We provide i18n for the validation messages. We provide the infrastructure to implement a custom client side validation mechanism. We also provide infrastructure to enable the client side validation on custom javascript events like keyup, blur and etc. All this can be enabled with a context parameter and I’ll show that in the demo. One of the coolest side to mention about is this validation mechanism also supports bean validation specification out of the box. So as you annotate your domain model with annotations like @Min @Max or @NotNull you will get the validation mechanism working on the client side instantly. The other feature that we’re bringing to the community with 4.0 is the Dialog Framework which enables to open an external xhtml page that gets generated dynamically at runtime. The same could be done via p:dialog component also but within dialog framework the pages gets created and destroyed programmatically at runtime. I’ll show a sample and ways to enable the dialog framework infrastructure with configuration. With PrimeFaces 4.0 we also provided drag drop ability between tree components which is a very cool feature in my opinion. Of course implementing this was not that easy. We also bundled many other cool features like deferred loading, sticky headers, new search expressions, the new file upload scrollable tabs and etc.</a:t>
-            </a:r>
-            <a:endParaRPr lang="en-US" dirty="0" smtClean="0"/>
-          </a:p>
-          <a:p>
-            <a:endParaRPr lang="en-US" dirty="0"/>
+            <a:endParaRPr lang="en-US" sz="1200" kern="1200" dirty="0" smtClean="0">
+              <a:solidFill>
+                <a:schemeClr val="tx1"/>
+              </a:solidFill>
+              <a:latin typeface="+mn-lt"/>
+              <a:ea typeface="+mn-ea"/>
+              <a:cs typeface="+mn-cs"/>
+            </a:endParaRPr>
           </a:p>
         </p:txBody>
       </p:sp>
@@ -1804,7 +1171,7 @@
           <a:p>
             <a:fld id="{36E82501-53DA-4152-84B0-51135B15EEA8}" type="slidenum">
               <a:rPr lang="en-US" smtClean="0"/>
-              <a:t>19</a:t>
+              <a:t>17</a:t>
             </a:fld>
             <a:endParaRPr lang="en-US"/>
           </a:p>
@@ -1813,7 +1180,7 @@
     </p:spTree>
     <p:extLst>
       <p:ext uri="{BB962C8B-B14F-4D97-AF65-F5344CB8AC3E}">
-        <p14:creationId xmlns:p14="http://schemas.microsoft.com/office/powerpoint/2010/main" val="2873911702"/>
+        <p14:creationId xmlns:p14="http://schemas.microsoft.com/office/powerpoint/2010/main" val="1772055650"/>
       </p:ext>
     </p:extLst>
   </p:cSld>
@@ -1867,97 +1234,6 @@
           <a:bodyPr/>
           <a:lstStyle/>
           <a:p>
-            <a:r>
-              <a:rPr lang="en-US" dirty="0" smtClean="0"/>
-              <a:t>PrimeFaces</a:t>
-            </a:r>
-            <a:r>
-              <a:rPr lang="en-US" baseline="0" dirty="0" smtClean="0"/>
-              <a:t> offers extensive theming ability with the help of ThemeRoller and </a:t>
-            </a:r>
-            <a:r>
-              <a:rPr lang="en-US" baseline="0" dirty="0" err="1" smtClean="0"/>
-              <a:t>jQuery</a:t>
-            </a:r>
-            <a:r>
-              <a:rPr lang="en-US" baseline="0" dirty="0" smtClean="0"/>
-              <a:t> UI. It provides skinning and structural architecture. Think of skinning CSS is like you have a button and a accordion and the </a:t>
-            </a:r>
-            <a:r>
-              <a:rPr lang="en-US" baseline="0" dirty="0" err="1" smtClean="0"/>
-              <a:t>stylesheet</a:t>
-            </a:r>
-            <a:r>
-              <a:rPr lang="en-US" baseline="0" dirty="0" smtClean="0"/>
-              <a:t> .</a:t>
-            </a:r>
-            <a:r>
-              <a:rPr lang="en-US" baseline="0" dirty="0" err="1" smtClean="0"/>
-              <a:t>ui</a:t>
-            </a:r>
-            <a:r>
-              <a:rPr lang="en-US" baseline="0" dirty="0" smtClean="0"/>
-              <a:t>-state-hover will apply to both the button and the header of the accordion panel since both are clickable and when mouse gets hovered on them a different </a:t>
-            </a:r>
-            <a:r>
-              <a:rPr lang="en-US" baseline="0" dirty="0" err="1" smtClean="0"/>
-              <a:t>stylesheet</a:t>
-            </a:r>
-            <a:r>
-              <a:rPr lang="en-US" baseline="0" dirty="0" smtClean="0"/>
-              <a:t> should apply. This defines the look of the component so skinning CSS is being applied there. And think of a </a:t>
-            </a:r>
-            <a:r>
-              <a:rPr lang="en-US" baseline="0" dirty="0" err="1" smtClean="0"/>
-              <a:t>stylesheet</a:t>
-            </a:r>
-            <a:r>
-              <a:rPr lang="en-US" baseline="0" dirty="0" smtClean="0"/>
-              <a:t> like .</a:t>
-            </a:r>
-            <a:r>
-              <a:rPr lang="en-US" baseline="0" dirty="0" err="1" smtClean="0"/>
-              <a:t>ui</a:t>
-            </a:r>
-            <a:r>
-              <a:rPr lang="en-US" baseline="0" dirty="0" smtClean="0"/>
-              <a:t>-sortable so this </a:t>
-            </a:r>
-            <a:r>
-              <a:rPr lang="en-US" baseline="0" dirty="0" err="1" smtClean="0"/>
-              <a:t>stylesheet</a:t>
-            </a:r>
-            <a:r>
-              <a:rPr lang="en-US" baseline="0" dirty="0" smtClean="0"/>
-              <a:t> gets applied to the </a:t>
-            </a:r>
-            <a:r>
-              <a:rPr lang="en-US" baseline="0" dirty="0" err="1" smtClean="0"/>
-              <a:t>picklist</a:t>
-            </a:r>
-            <a:r>
-              <a:rPr lang="en-US" baseline="0" dirty="0" smtClean="0"/>
-              <a:t> component for instance it enables the drag and drop structural styling for the component.</a:t>
-            </a:r>
-          </a:p>
-          <a:p>
-            <a:endParaRPr lang="en-US" baseline="0" dirty="0" smtClean="0"/>
-          </a:p>
-          <a:p>
-            <a:r>
-              <a:rPr lang="en-US" baseline="0" dirty="0" smtClean="0"/>
-              <a:t>PrimeFaces provides nearly 40 themes which are available free. We also have a commercial theme named Metro UI which offers Windows 8 style. If you need to create your own theme, you can just select a preset theme and start to modify it. It will be more easy than to start from scratch. Theme configuration is done via a context parameter in </a:t>
-            </a:r>
-            <a:r>
-              <a:rPr lang="en-US" baseline="0" dirty="0" err="1" smtClean="0"/>
-              <a:t>web.xml</a:t>
-            </a:r>
-            <a:r>
-              <a:rPr lang="en-US" baseline="0" dirty="0" smtClean="0"/>
-              <a:t>. By default aristo is the default theme embedded into primefaces and you don’t need to do any configuration.</a:t>
-            </a:r>
-          </a:p>
-          <a:p>
             <a:endParaRPr lang="en-US" dirty="0"/>
           </a:p>
         </p:txBody>
@@ -1979,7 +1255,7 @@
           <a:p>
             <a:fld id="{36E82501-53DA-4152-84B0-51135B15EEA8}" type="slidenum">
               <a:rPr lang="en-US" smtClean="0"/>
-              <a:t>22</a:t>
+              <a:t>19</a:t>
             </a:fld>
             <a:endParaRPr lang="en-US"/>
           </a:p>
@@ -1988,7 +1264,7 @@
     </p:spTree>
     <p:extLst>
       <p:ext uri="{BB962C8B-B14F-4D97-AF65-F5344CB8AC3E}">
-        <p14:creationId xmlns:p14="http://schemas.microsoft.com/office/powerpoint/2010/main" val="1298541666"/>
+        <p14:creationId xmlns:p14="http://schemas.microsoft.com/office/powerpoint/2010/main" val="2873911702"/>
       </p:ext>
     </p:extLst>
   </p:cSld>
@@ -2042,128 +1318,7 @@
           <a:bodyPr/>
           <a:lstStyle/>
           <a:p>
-            <a:r>
-              <a:rPr lang="en-US" dirty="0" err="1" smtClean="0"/>
-              <a:t>PrimePush</a:t>
-            </a:r>
-            <a:r>
-              <a:rPr lang="en-US" baseline="0" dirty="0" smtClean="0"/>
-              <a:t> is a side project that contains client and server side implementations for Asynchronous Web Applications. It uses the atmosphere framework which supports all major browsers and servers. </a:t>
-            </a:r>
-            <a:r>
-              <a:rPr lang="en-US" baseline="0" dirty="0" err="1" smtClean="0"/>
-              <a:t>PrimePush</a:t>
-            </a:r>
-            <a:r>
-              <a:rPr lang="en-US" baseline="0" dirty="0" smtClean="0"/>
-              <a:t> is being developed by PrimeFaces developers and Atmosphere lead: </a:t>
-            </a:r>
-            <a:r>
-              <a:rPr lang="fr-FR" baseline="0" dirty="0" smtClean="0"/>
-              <a:t>jean </a:t>
-            </a:r>
-            <a:r>
-              <a:rPr lang="fr-FR" baseline="0" dirty="0" err="1" smtClean="0"/>
-              <a:t>francois</a:t>
-            </a:r>
-            <a:r>
-              <a:rPr lang="fr-FR" baseline="0" dirty="0" smtClean="0"/>
-              <a:t> </a:t>
-            </a:r>
-            <a:r>
-              <a:rPr lang="fr-FR" baseline="0" dirty="0" err="1" smtClean="0"/>
-              <a:t>arcand</a:t>
-            </a:r>
-            <a:r>
-              <a:rPr lang="fr-FR" baseline="0" dirty="0" smtClean="0"/>
-              <a:t>. </a:t>
-            </a:r>
-            <a:r>
-              <a:rPr lang="fr-FR" baseline="0" dirty="0" err="1" smtClean="0"/>
-              <a:t>PrimePush</a:t>
-            </a:r>
-            <a:r>
-              <a:rPr lang="fr-FR" baseline="0" dirty="0" smtClean="0"/>
-              <a:t> </a:t>
-            </a:r>
-            <a:r>
-              <a:rPr lang="fr-FR" baseline="0" dirty="0" err="1" smtClean="0"/>
-              <a:t>transparently</a:t>
-            </a:r>
-            <a:r>
-              <a:rPr lang="fr-FR" baseline="0" dirty="0" smtClean="0"/>
-              <a:t> supports </a:t>
-            </a:r>
-            <a:r>
-              <a:rPr lang="fr-FR" baseline="0" dirty="0" err="1" smtClean="0"/>
-              <a:t>WebSockets</a:t>
-            </a:r>
-            <a:r>
-              <a:rPr lang="fr-FR" baseline="0" dirty="0" smtClean="0"/>
-              <a:t>, Long Polling, Streaming and JSONP.</a:t>
-            </a:r>
-          </a:p>
-          <a:p>
-            <a:endParaRPr lang="fr-FR" baseline="0" dirty="0" smtClean="0"/>
-          </a:p>
-          <a:p>
-            <a:r>
-              <a:rPr lang="en-US" baseline="0" dirty="0" err="1" smtClean="0"/>
-              <a:t>PrimeUI</a:t>
-            </a:r>
-            <a:r>
-              <a:rPr lang="en-US" baseline="0" dirty="0" smtClean="0"/>
-              <a:t> is the spin-off project that is derived from the PrimeFaces JSF Component suite. It provides around 35 JavaScript widgets like autocomplete, </a:t>
-            </a:r>
-            <a:r>
-              <a:rPr lang="en-US" baseline="0" dirty="0" err="1" smtClean="0"/>
-              <a:t>dataTable</a:t>
-            </a:r>
-            <a:r>
-              <a:rPr lang="en-US" baseline="0" dirty="0" smtClean="0"/>
-              <a:t>, tree and etc. So with the help </a:t>
-            </a:r>
-            <a:r>
-              <a:rPr lang="en-US" baseline="0" dirty="0" err="1" smtClean="0"/>
-              <a:t>PrimeUI</a:t>
-            </a:r>
-            <a:r>
-              <a:rPr lang="en-US" baseline="0" dirty="0" smtClean="0"/>
-              <a:t> you can easily create rich web applications powered by HTML5, CSS3 and Rest Services for instance. It’s very lightweight and easy to use.</a:t>
-            </a:r>
-          </a:p>
-          <a:p>
-            <a:endParaRPr lang="en-US" baseline="0" dirty="0" smtClean="0"/>
-          </a:p>
-          <a:p>
-            <a:r>
-              <a:rPr lang="en-US" baseline="0" dirty="0" err="1" smtClean="0"/>
-              <a:t>PrimeMobile</a:t>
-            </a:r>
-            <a:r>
-              <a:rPr lang="en-US" baseline="0" dirty="0" smtClean="0"/>
-              <a:t> provides JSF components that are optimized for mobile devices. It’s powered by </a:t>
-            </a:r>
-            <a:r>
-              <a:rPr lang="en-US" baseline="0" dirty="0" err="1" smtClean="0"/>
-              <a:t>jQuery</a:t>
-            </a:r>
-            <a:r>
-              <a:rPr lang="en-US" baseline="0" dirty="0" smtClean="0"/>
-              <a:t> mobile and supports </a:t>
-            </a:r>
-            <a:r>
-              <a:rPr lang="en-US" sz="1200" kern="1200" dirty="0" smtClean="0">
-                <a:solidFill>
-                  <a:schemeClr val="tx1"/>
-                </a:solidFill>
-                <a:latin typeface="+mn-lt"/>
-                <a:ea typeface="+mn-ea"/>
-                <a:cs typeface="+mn-cs"/>
-              </a:rPr>
-              <a:t>various platforms such as iPhone, Android, Windows Phone and others.</a:t>
-            </a:r>
-            <a:endParaRPr lang="fr-FR" baseline="0" dirty="0" smtClean="0"/>
+            <a:endParaRPr lang="en-US" dirty="0"/>
           </a:p>
         </p:txBody>
       </p:sp>
@@ -2184,7 +1339,7 @@
           <a:p>
             <a:fld id="{36E82501-53DA-4152-84B0-51135B15EEA8}" type="slidenum">
               <a:rPr lang="en-US" smtClean="0"/>
-              <a:t>25</a:t>
+              <a:t>20</a:t>
             </a:fld>
             <a:endParaRPr lang="en-US"/>
           </a:p>
@@ -2193,7 +1348,7 @@
     </p:spTree>
     <p:extLst>
       <p:ext uri="{BB962C8B-B14F-4D97-AF65-F5344CB8AC3E}">
-        <p14:creationId xmlns:p14="http://schemas.microsoft.com/office/powerpoint/2010/main" val="483938971"/>
+        <p14:creationId xmlns:p14="http://schemas.microsoft.com/office/powerpoint/2010/main" val="558257553"/>
       </p:ext>
     </p:extLst>
   </p:cSld>
@@ -2247,85 +1402,6 @@
           <a:bodyPr/>
           <a:lstStyle/>
           <a:p>
-            <a:r>
-              <a:rPr lang="en-US" sz="1200" kern="1200" dirty="0" smtClean="0">
-                <a:solidFill>
-                  <a:schemeClr val="tx1"/>
-                </a:solidFill>
-                <a:latin typeface="+mn-lt"/>
-                <a:ea typeface="+mn-ea"/>
-                <a:cs typeface="+mn-cs"/>
-              </a:rPr>
-              <a:t>Long time ago, the initial idea for this feature was to generate scaffolding of an application from database to illustrate how to use Java EE technologies together.</a:t>
-            </a:r>
-            <a:r>
-              <a:rPr lang="en-US" sz="1200" kern="1200" baseline="0" dirty="0" smtClean="0">
-                <a:solidFill>
-                  <a:schemeClr val="tx1"/>
-                </a:solidFill>
-                <a:latin typeface="+mn-lt"/>
-                <a:ea typeface="+mn-ea"/>
-                <a:cs typeface="+mn-cs"/>
-              </a:rPr>
-              <a:t> </a:t>
-            </a:r>
-            <a:r>
-              <a:rPr lang="en-US" sz="1200" kern="1200" dirty="0" smtClean="0">
-                <a:solidFill>
-                  <a:schemeClr val="tx1"/>
-                </a:solidFill>
-                <a:latin typeface="+mn-lt"/>
-                <a:ea typeface="+mn-ea"/>
-                <a:cs typeface="+mn-cs"/>
-              </a:rPr>
-              <a:t>This feature was periodically improved. Now, of course, you can generate Facelets, but also customize templates to be generated and lastly it came with generation of the CDI artifacts if</a:t>
-            </a:r>
-            <a:r>
-              <a:rPr lang="en-US" sz="1200" kern="1200" baseline="0" dirty="0" smtClean="0">
-                <a:solidFill>
-                  <a:schemeClr val="tx1"/>
-                </a:solidFill>
-                <a:latin typeface="+mn-lt"/>
-                <a:ea typeface="+mn-ea"/>
-                <a:cs typeface="+mn-cs"/>
-              </a:rPr>
-              <a:t> suitable</a:t>
-            </a:r>
-            <a:r>
-              <a:rPr lang="en-US" sz="1200" kern="1200" dirty="0" smtClean="0">
-                <a:solidFill>
-                  <a:schemeClr val="tx1"/>
-                </a:solidFill>
-                <a:latin typeface="+mn-lt"/>
-                <a:ea typeface="+mn-ea"/>
-                <a:cs typeface="+mn-cs"/>
-              </a:rPr>
-              <a:t>. Into next version of the IDE there are plans for generation</a:t>
-            </a:r>
-            <a:r>
-              <a:rPr lang="en-US" sz="1200" kern="1200" baseline="0" dirty="0" smtClean="0">
-                <a:solidFill>
-                  <a:schemeClr val="tx1"/>
-                </a:solidFill>
-                <a:latin typeface="+mn-lt"/>
-                <a:ea typeface="+mn-ea"/>
-                <a:cs typeface="+mn-cs"/>
-              </a:rPr>
-              <a:t> of </a:t>
-            </a:r>
-            <a:r>
-              <a:rPr lang="en-US" sz="1200" kern="1200" dirty="0" smtClean="0">
-                <a:solidFill>
-                  <a:schemeClr val="tx1"/>
-                </a:solidFill>
-                <a:latin typeface="+mn-lt"/>
-                <a:ea typeface="+mn-ea"/>
-                <a:cs typeface="+mn-cs"/>
-              </a:rPr>
-              <a:t>PrimeFaces templates directly.</a:t>
-            </a:r>
-          </a:p>
-          <a:p>
             <a:endParaRPr lang="en-US" dirty="0"/>
           </a:p>
         </p:txBody>
@@ -2347,7 +1423,7 @@
           <a:p>
             <a:fld id="{36E82501-53DA-4152-84B0-51135B15EEA8}" type="slidenum">
               <a:rPr lang="en-US" smtClean="0"/>
-              <a:t>28</a:t>
+              <a:t>22</a:t>
             </a:fld>
             <a:endParaRPr lang="en-US"/>
           </a:p>
@@ -2356,7 +1432,7 @@
     </p:spTree>
     <p:extLst>
       <p:ext uri="{BB962C8B-B14F-4D97-AF65-F5344CB8AC3E}">
-        <p14:creationId xmlns:p14="http://schemas.microsoft.com/office/powerpoint/2010/main" val="1456231099"/>
+        <p14:creationId xmlns:p14="http://schemas.microsoft.com/office/powerpoint/2010/main" val="1298541666"/>
       </p:ext>
     </p:extLst>
   </p:cSld>
@@ -2410,118 +1486,7 @@
           <a:bodyPr/>
           <a:lstStyle/>
           <a:p>
-            <a:r>
-              <a:rPr lang="en-US" sz="1200" kern="1200" dirty="0" smtClean="0">
-                <a:solidFill>
-                  <a:schemeClr val="tx1"/>
-                </a:solidFill>
-                <a:latin typeface="+mn-lt"/>
-                <a:ea typeface="+mn-ea"/>
-                <a:cs typeface="+mn-cs"/>
-              </a:rPr>
-              <a:t>I</a:t>
-            </a:r>
-            <a:r>
-              <a:rPr lang="en-US" sz="1200" kern="1200" baseline="0" dirty="0" smtClean="0">
-                <a:solidFill>
-                  <a:schemeClr val="tx1"/>
-                </a:solidFill>
-                <a:latin typeface="+mn-lt"/>
-                <a:ea typeface="+mn-ea"/>
-                <a:cs typeface="+mn-cs"/>
-              </a:rPr>
-              <a:t> w</a:t>
-            </a:r>
-            <a:r>
-              <a:rPr lang="en-US" sz="1200" kern="1200" dirty="0" smtClean="0">
-                <a:solidFill>
-                  <a:schemeClr val="tx1"/>
-                </a:solidFill>
-                <a:latin typeface="+mn-lt"/>
-                <a:ea typeface="+mn-ea"/>
-                <a:cs typeface="+mn-cs"/>
-              </a:rPr>
-              <a:t>ill show you that even in the current</a:t>
-            </a:r>
-            <a:r>
-              <a:rPr lang="en-US" sz="1200" kern="1200" baseline="0" dirty="0" smtClean="0">
-                <a:solidFill>
-                  <a:schemeClr val="tx1"/>
-                </a:solidFill>
-                <a:latin typeface="+mn-lt"/>
-                <a:ea typeface="+mn-ea"/>
-                <a:cs typeface="+mn-cs"/>
-              </a:rPr>
-              <a:t> version of NetBeans you </a:t>
-            </a:r>
-            <a:r>
-              <a:rPr lang="en-US" sz="1200" kern="1200" dirty="0" smtClean="0">
-                <a:solidFill>
-                  <a:schemeClr val="tx1"/>
-                </a:solidFill>
-                <a:latin typeface="+mn-lt"/>
-                <a:ea typeface="+mn-ea"/>
-                <a:cs typeface="+mn-cs"/>
-              </a:rPr>
-              <a:t>could generate PrimeFaces CRUD application using the 3rd party plugin available on</a:t>
-            </a:r>
-            <a:r>
-              <a:rPr lang="en-US" sz="1200" kern="1200" baseline="0" dirty="0" smtClean="0">
-                <a:solidFill>
-                  <a:schemeClr val="tx1"/>
-                </a:solidFill>
-                <a:latin typeface="+mn-lt"/>
-                <a:ea typeface="+mn-ea"/>
-                <a:cs typeface="+mn-cs"/>
-              </a:rPr>
-              <a:t> the GitHub from Kay Wrobel</a:t>
-            </a:r>
-            <a:r>
-              <a:rPr lang="en-US" sz="1200" kern="1200" dirty="0" smtClean="0">
-                <a:solidFill>
-                  <a:schemeClr val="tx1"/>
-                </a:solidFill>
-                <a:latin typeface="+mn-lt"/>
-                <a:ea typeface="+mn-ea"/>
-                <a:cs typeface="+mn-cs"/>
-              </a:rPr>
-              <a:t>.</a:t>
-            </a:r>
-          </a:p>
-          <a:p>
-            <a:endParaRPr lang="en-US" sz="1200" kern="1200" dirty="0" smtClean="0">
-              <a:solidFill>
-                <a:schemeClr val="tx1"/>
-              </a:solidFill>
-              <a:latin typeface="+mn-lt"/>
-              <a:ea typeface="+mn-ea"/>
-              <a:cs typeface="+mn-cs"/>
-            </a:endParaRPr>
-          </a:p>
-          <a:p>
-            <a:r>
-              <a:rPr lang="en-US" sz="1200" kern="1200" dirty="0" smtClean="0">
-                <a:solidFill>
-                  <a:schemeClr val="tx1"/>
-                </a:solidFill>
-                <a:latin typeface="+mn-lt"/>
-                <a:ea typeface="+mn-ea"/>
-                <a:cs typeface="+mn-cs"/>
-              </a:rPr>
-              <a:t>I already</a:t>
-            </a:r>
-            <a:r>
-              <a:rPr lang="en-US" sz="1200" kern="1200" baseline="0" dirty="0" smtClean="0">
-                <a:solidFill>
-                  <a:schemeClr val="tx1"/>
-                </a:solidFill>
-                <a:latin typeface="+mn-lt"/>
-                <a:ea typeface="+mn-ea"/>
-                <a:cs typeface="+mn-cs"/>
-              </a:rPr>
-              <a:t> installed that plugin. Now, I’ll create web project with setup of Java EE 7, JSF 2.2 and PrimeFaces. Into that project and I’m going to generate Entity Classes from Database. If you need only entities you are done or also you can generate controller layer of the application using Session beans for entity classes or vanilla JSFs using JSF pages wizard. We are going to create PrimeFaces application. I’ll keep defaults and generate all sources. We will deploy that project on the GlassFish 4 and we can try out our skeleton for the application. Of course now it would take time for updates in templates or application logic to customize that to your needs.</a:t>
-            </a:r>
-            <a:endParaRPr lang="en-US" dirty="0"/>
+            <a:endParaRPr lang="fr-FR" baseline="0" dirty="0" smtClean="0"/>
           </a:p>
         </p:txBody>
       </p:sp>
@@ -2542,7 +1507,7 @@
           <a:p>
             <a:fld id="{36E82501-53DA-4152-84B0-51135B15EEA8}" type="slidenum">
               <a:rPr lang="en-US" smtClean="0"/>
-              <a:t>29</a:t>
+              <a:t>25</a:t>
             </a:fld>
             <a:endParaRPr lang="en-US"/>
           </a:p>
@@ -2551,7 +1516,7 @@
     </p:spTree>
     <p:extLst>
       <p:ext uri="{BB962C8B-B14F-4D97-AF65-F5344CB8AC3E}">
-        <p14:creationId xmlns:p14="http://schemas.microsoft.com/office/powerpoint/2010/main" val="2267876327"/>
+        <p14:creationId xmlns:p14="http://schemas.microsoft.com/office/powerpoint/2010/main" val="483938971"/>
       </p:ext>
     </p:extLst>
   </p:cSld>
@@ -2605,107 +1570,6 @@
           <a:bodyPr/>
           <a:lstStyle/>
           <a:p>
-            <a:r>
-              <a:rPr lang="en-US" sz="1200" kern="1200" dirty="0" smtClean="0">
-                <a:solidFill>
-                  <a:schemeClr val="tx1"/>
-                </a:solidFill>
-                <a:latin typeface="+mn-lt"/>
-                <a:ea typeface="+mn-ea"/>
-                <a:cs typeface="+mn-cs"/>
-              </a:rPr>
-              <a:t>As it's described on the slides. We are speaking about series of screen with one start point and one or more return nodes.</a:t>
-            </a:r>
-            <a:r>
-              <a:rPr lang="en-US" sz="1200" kern="1200" baseline="0" dirty="0" smtClean="0">
-                <a:solidFill>
-                  <a:schemeClr val="tx1"/>
-                </a:solidFill>
-                <a:latin typeface="+mn-lt"/>
-                <a:ea typeface="+mn-ea"/>
-                <a:cs typeface="+mn-cs"/>
-              </a:rPr>
-              <a:t> But o</a:t>
-            </a:r>
-            <a:r>
-              <a:rPr lang="en-US" sz="1200" kern="1200" dirty="0" smtClean="0">
-                <a:solidFill>
-                  <a:schemeClr val="tx1"/>
-                </a:solidFill>
-                <a:latin typeface="+mn-lt"/>
-                <a:ea typeface="+mn-ea"/>
-                <a:cs typeface="+mn-cs"/>
-              </a:rPr>
-              <a:t>f course it can much more than just navigation through screens. You can specify to call method at specific action or when the flow starts or finishes. You can even call another flow defined in your app and set parameters to be shared.</a:t>
-            </a:r>
-          </a:p>
-          <a:p>
-            <a:endParaRPr lang="en-US" sz="1200" kern="1200" dirty="0" smtClean="0">
-              <a:solidFill>
-                <a:schemeClr val="tx1"/>
-              </a:solidFill>
-              <a:latin typeface="+mn-lt"/>
-              <a:ea typeface="+mn-ea"/>
-              <a:cs typeface="+mn-cs"/>
-            </a:endParaRPr>
-          </a:p>
-          <a:p>
-            <a:r>
-              <a:rPr lang="en-US" sz="1200" kern="1200" dirty="0" smtClean="0">
-                <a:solidFill>
-                  <a:schemeClr val="tx1"/>
-                </a:solidFill>
-                <a:latin typeface="+mn-lt"/>
-                <a:ea typeface="+mn-ea"/>
-                <a:cs typeface="+mn-cs"/>
-              </a:rPr>
-              <a:t>BTW, this is one of the places JSF 2.2 where is JSF bound with the CDI specification. The API introduces new annotation @FlowScoped which is CDI scope that defines scope within the specified flow. When you leave any flow relevant</a:t>
-            </a:r>
-            <a:r>
-              <a:rPr lang="en-US" sz="1200" kern="1200" baseline="0" dirty="0" smtClean="0">
-                <a:solidFill>
-                  <a:schemeClr val="tx1"/>
-                </a:solidFill>
-                <a:latin typeface="+mn-lt"/>
-                <a:ea typeface="+mn-ea"/>
-                <a:cs typeface="+mn-cs"/>
-              </a:rPr>
-              <a:t> </a:t>
-            </a:r>
-            <a:r>
-              <a:rPr lang="en-US" sz="1200" kern="1200" dirty="0" smtClean="0">
-                <a:solidFill>
-                  <a:schemeClr val="tx1"/>
-                </a:solidFill>
-                <a:latin typeface="+mn-lt"/>
-                <a:ea typeface="+mn-ea"/>
-                <a:cs typeface="+mn-cs"/>
-              </a:rPr>
-              <a:t>annotated beans are disintegrated.</a:t>
-            </a:r>
-          </a:p>
-          <a:p>
-            <a:endParaRPr lang="en-US" sz="1200" kern="1200" dirty="0" smtClean="0">
-              <a:solidFill>
-                <a:schemeClr val="tx1"/>
-              </a:solidFill>
-              <a:latin typeface="+mn-lt"/>
-              <a:ea typeface="+mn-ea"/>
-              <a:cs typeface="+mn-cs"/>
-            </a:endParaRPr>
-          </a:p>
-          <a:p>
-            <a:r>
-              <a:rPr lang="en-US" sz="1200" kern="1200" dirty="0" smtClean="0">
-                <a:solidFill>
-                  <a:schemeClr val="tx1"/>
-                </a:solidFill>
-                <a:latin typeface="+mn-lt"/>
-                <a:ea typeface="+mn-ea"/>
-                <a:cs typeface="+mn-cs"/>
-              </a:rPr>
-              <a:t>Setup of these flows you can do inside the JSF configuration files or you can also build the flow using FlowBuilder object within annotatted Java method.</a:t>
-            </a:r>
             <a:endParaRPr lang="en-US" dirty="0"/>
           </a:p>
         </p:txBody>
@@ -2727,7 +1591,7 @@
           <a:p>
             <a:fld id="{36E82501-53DA-4152-84B0-51135B15EEA8}" type="slidenum">
               <a:rPr lang="en-US" smtClean="0"/>
-              <a:t>31</a:t>
+              <a:t>26</a:t>
             </a:fld>
             <a:endParaRPr lang="en-US"/>
           </a:p>
@@ -2736,7 +1600,7 @@
     </p:spTree>
     <p:extLst>
       <p:ext uri="{BB962C8B-B14F-4D97-AF65-F5344CB8AC3E}">
-        <p14:creationId xmlns:p14="http://schemas.microsoft.com/office/powerpoint/2010/main" val="1097235293"/>
+        <p14:creationId xmlns:p14="http://schemas.microsoft.com/office/powerpoint/2010/main" val="2899245988"/>
       </p:ext>
     </p:extLst>
   </p:cSld>
@@ -2885,196 +1749,7 @@
           <a:bodyPr/>
           <a:lstStyle/>
           <a:p>
-            <a:r>
-              <a:rPr lang="en-US" sz="1200" kern="1200" dirty="0" smtClean="0">
-                <a:solidFill>
-                  <a:schemeClr val="tx1"/>
-                </a:solidFill>
-                <a:latin typeface="+mn-lt"/>
-                <a:ea typeface="+mn-ea"/>
-                <a:cs typeface="+mn-cs"/>
-              </a:rPr>
-              <a:t>Here we will show usage of several navigation elements, bean limited to the flow scope and also Faces Flow bundled as a library inside .JAR file.</a:t>
-            </a:r>
-          </a:p>
-          <a:p>
-            <a:endParaRPr lang="en-US" sz="1200" kern="1200" dirty="0" smtClean="0">
-              <a:solidFill>
-                <a:schemeClr val="tx1"/>
-              </a:solidFill>
-              <a:latin typeface="+mn-lt"/>
-              <a:ea typeface="+mn-ea"/>
-              <a:cs typeface="+mn-cs"/>
-            </a:endParaRPr>
-          </a:p>
-          <a:p>
-            <a:r>
-              <a:rPr lang="en-US" sz="1200" kern="1200" dirty="0" smtClean="0">
-                <a:solidFill>
-                  <a:schemeClr val="tx1"/>
-                </a:solidFill>
-                <a:latin typeface="+mn-lt"/>
-                <a:ea typeface="+mn-ea"/>
-                <a:cs typeface="+mn-cs"/>
-              </a:rPr>
-              <a:t>Let's go to the CredentialsFlow class which produces</a:t>
-            </a:r>
-            <a:r>
-              <a:rPr lang="en-US" sz="1200" kern="1200" baseline="0" dirty="0" smtClean="0">
-                <a:solidFill>
-                  <a:schemeClr val="tx1"/>
-                </a:solidFill>
-                <a:latin typeface="+mn-lt"/>
-                <a:ea typeface="+mn-ea"/>
-                <a:cs typeface="+mn-cs"/>
-              </a:rPr>
-              <a:t> f</a:t>
-            </a:r>
-            <a:r>
-              <a:rPr lang="en-US" sz="1200" kern="1200" dirty="0" smtClean="0">
-                <a:solidFill>
-                  <a:schemeClr val="tx1"/>
-                </a:solidFill>
-                <a:latin typeface="+mn-lt"/>
-                <a:ea typeface="+mn-ea"/>
-                <a:cs typeface="+mn-cs"/>
-              </a:rPr>
-              <a:t>low definition. Here is set the flow's ID, return node which ends the flow lifecycle, standard view nodes which serves as a common</a:t>
-            </a:r>
-            <a:r>
-              <a:rPr lang="en-US" sz="1200" kern="1200" baseline="0" dirty="0" smtClean="0">
-                <a:solidFill>
-                  <a:schemeClr val="tx1"/>
-                </a:solidFill>
-                <a:latin typeface="+mn-lt"/>
-                <a:ea typeface="+mn-ea"/>
-                <a:cs typeface="+mn-cs"/>
-              </a:rPr>
-              <a:t> screen</a:t>
-            </a:r>
-            <a:r>
-              <a:rPr lang="en-US" sz="1200" kern="1200" dirty="0" smtClean="0">
-                <a:solidFill>
-                  <a:schemeClr val="tx1"/>
-                </a:solidFill>
-                <a:latin typeface="+mn-lt"/>
-                <a:ea typeface="+mn-ea"/>
-                <a:cs typeface="+mn-cs"/>
-              </a:rPr>
-              <a:t>, method call called on action restore which invokes this expression, finalizer called when leaving this flow</a:t>
-            </a:r>
-            <a:r>
-              <a:rPr lang="en-US" sz="1200" kern="1200" baseline="0" dirty="0" smtClean="0">
-                <a:solidFill>
-                  <a:schemeClr val="tx1"/>
-                </a:solidFill>
-                <a:latin typeface="+mn-lt"/>
-                <a:ea typeface="+mn-ea"/>
-                <a:cs typeface="+mn-cs"/>
-              </a:rPr>
-              <a:t> and</a:t>
-            </a:r>
-            <a:r>
-              <a:rPr lang="en-US" sz="1200" kern="1200" dirty="0" smtClean="0">
-                <a:solidFill>
-                  <a:schemeClr val="tx1"/>
-                </a:solidFill>
-                <a:latin typeface="+mn-lt"/>
-                <a:ea typeface="+mn-ea"/>
-                <a:cs typeface="+mn-cs"/>
-              </a:rPr>
-              <a:t> another flow call and parameters to be shared. FYI,</a:t>
-            </a:r>
-            <a:r>
-              <a:rPr lang="en-US" sz="1200" kern="1200" baseline="0" dirty="0" smtClean="0">
-                <a:solidFill>
-                  <a:schemeClr val="tx1"/>
-                </a:solidFill>
-                <a:latin typeface="+mn-lt"/>
-                <a:ea typeface="+mn-ea"/>
-                <a:cs typeface="+mn-cs"/>
-              </a:rPr>
-              <a:t> for simplification t</a:t>
-            </a:r>
-            <a:r>
-              <a:rPr lang="en-US" sz="1200" kern="1200" dirty="0" smtClean="0">
-                <a:solidFill>
-                  <a:schemeClr val="tx1"/>
-                </a:solidFill>
-                <a:latin typeface="+mn-lt"/>
-                <a:ea typeface="+mn-ea"/>
-                <a:cs typeface="+mn-cs"/>
-              </a:rPr>
-              <a:t>here exists also rules how to setup parts of the flow implicitly by templates naming.</a:t>
-            </a:r>
-          </a:p>
-          <a:p>
-            <a:endParaRPr lang="en-US" sz="1200" kern="1200" dirty="0" smtClean="0">
-              <a:solidFill>
-                <a:schemeClr val="tx1"/>
-              </a:solidFill>
-              <a:latin typeface="+mn-lt"/>
-              <a:ea typeface="+mn-ea"/>
-              <a:cs typeface="+mn-cs"/>
-            </a:endParaRPr>
-          </a:p>
-          <a:p>
-            <a:r>
-              <a:rPr lang="en-US" sz="1200" kern="1200" dirty="0" smtClean="0">
-                <a:solidFill>
-                  <a:schemeClr val="tx1"/>
-                </a:solidFill>
-                <a:latin typeface="+mn-lt"/>
-                <a:ea typeface="+mn-ea"/>
-                <a:cs typeface="+mn-cs"/>
-              </a:rPr>
-              <a:t>Now when I start the flow first screen appears. I can choose avatar which takes me to the second flow and passes parameter - my name</a:t>
-            </a:r>
-            <a:r>
-              <a:rPr lang="en-US" sz="1200" kern="1200" baseline="0" dirty="0" smtClean="0">
-                <a:solidFill>
-                  <a:schemeClr val="tx1"/>
-                </a:solidFill>
-                <a:latin typeface="+mn-lt"/>
-                <a:ea typeface="+mn-ea"/>
-                <a:cs typeface="+mn-cs"/>
-              </a:rPr>
-              <a:t> - </a:t>
-            </a:r>
-            <a:r>
-              <a:rPr lang="en-US" sz="1200" kern="1200" dirty="0" smtClean="0">
-                <a:solidFill>
-                  <a:schemeClr val="tx1"/>
-                </a:solidFill>
-                <a:latin typeface="+mn-lt"/>
-                <a:ea typeface="+mn-ea"/>
-                <a:cs typeface="+mn-cs"/>
-              </a:rPr>
-              <a:t>there. Now I'll setup avatar and send the information back to the flow Nr.1. Here I'll finish the wizard and check the registration summary. The button could invoke save to database and navigates me back to the index page. My PersonBean which stores values of the flow was FlowScoped. You can see that all informations are gone. Fortunately my finalizer method stored data into SessionScoped StorageBean and I can invoke restore of that information using the methodCall node. As you can see power of this feature is pretty impressive and it makes good sense to incorporate that into your application.</a:t>
-            </a:r>
-          </a:p>
-          <a:p>
-            <a:endParaRPr lang="en-US" sz="1200" kern="1200" dirty="0" smtClean="0">
-              <a:solidFill>
-                <a:schemeClr val="tx1"/>
-              </a:solidFill>
-              <a:latin typeface="+mn-lt"/>
-              <a:ea typeface="+mn-ea"/>
-              <a:cs typeface="+mn-cs"/>
-            </a:endParaRPr>
-          </a:p>
-          <a:p>
-            <a:r>
-              <a:rPr lang="en-US" sz="1200" kern="1200" dirty="0" smtClean="0">
-                <a:solidFill>
-                  <a:schemeClr val="tx1"/>
-                </a:solidFill>
-                <a:latin typeface="+mn-lt"/>
-                <a:ea typeface="+mn-ea"/>
-                <a:cs typeface="+mn-cs"/>
-              </a:rPr>
-              <a:t>I forgot to mention that the second flow was bundled as a library so I'm able prepare components to be reusable from any application.</a:t>
-            </a:r>
+            <a:endParaRPr lang="en-US" dirty="0"/>
           </a:p>
         </p:txBody>
       </p:sp>
@@ -3095,7 +1770,7 @@
           <a:p>
             <a:fld id="{36E82501-53DA-4152-84B0-51135B15EEA8}" type="slidenum">
               <a:rPr lang="en-US" smtClean="0"/>
-              <a:t>32</a:t>
+              <a:t>28</a:t>
             </a:fld>
             <a:endParaRPr lang="en-US"/>
           </a:p>
@@ -3104,7 +1779,7 @@
     </p:spTree>
     <p:extLst>
       <p:ext uri="{BB962C8B-B14F-4D97-AF65-F5344CB8AC3E}">
-        <p14:creationId xmlns:p14="http://schemas.microsoft.com/office/powerpoint/2010/main" val="1251836"/>
+        <p14:creationId xmlns:p14="http://schemas.microsoft.com/office/powerpoint/2010/main" val="1456231099"/>
       </p:ext>
     </p:extLst>
   </p:cSld>
@@ -3158,86 +1833,6 @@
           <a:bodyPr/>
           <a:lstStyle/>
           <a:p>
-            <a:r>
-              <a:rPr lang="en-US" sz="1200" kern="1200" dirty="0" smtClean="0">
-                <a:solidFill>
-                  <a:schemeClr val="tx1"/>
-                </a:solidFill>
-                <a:latin typeface="+mn-lt"/>
-                <a:ea typeface="+mn-ea"/>
-                <a:cs typeface="+mn-cs"/>
-              </a:rPr>
-              <a:t>Custom components were always big feature of the JSF framework since your simple element is able to create complex source and functionality. Let's see how this can be done with the latest specification. The</a:t>
-            </a:r>
-            <a:r>
-              <a:rPr lang="en-US" sz="1200" kern="1200" baseline="0" dirty="0" smtClean="0">
-                <a:solidFill>
-                  <a:schemeClr val="tx1"/>
-                </a:solidFill>
-                <a:latin typeface="+mn-lt"/>
-                <a:ea typeface="+mn-ea"/>
-                <a:cs typeface="+mn-cs"/>
-              </a:rPr>
-              <a:t> simplified registration </a:t>
-            </a:r>
-            <a:r>
-              <a:rPr lang="en-US" sz="1200" kern="1200" dirty="0" smtClean="0">
-                <a:solidFill>
-                  <a:schemeClr val="tx1"/>
-                </a:solidFill>
-                <a:latin typeface="+mn-lt"/>
-                <a:ea typeface="+mn-ea"/>
-                <a:cs typeface="+mn-cs"/>
-              </a:rPr>
-              <a:t>is based on the improved FacesComponent interface. You are able specify tag name, namespace or the flag saying create the tag handler which will process this tag in runtime. And the flag is the only parameter which needs to be set to use that component within your facelets. Rest of arguments can be defined implicitly - it can</a:t>
-            </a:r>
-            <a:r>
-              <a:rPr lang="en-US" sz="1200" kern="1200" baseline="0" dirty="0" smtClean="0">
-                <a:solidFill>
-                  <a:schemeClr val="tx1"/>
-                </a:solidFill>
-                <a:latin typeface="+mn-lt"/>
-                <a:ea typeface="+mn-ea"/>
-                <a:cs typeface="+mn-cs"/>
-              </a:rPr>
-              <a:t> </a:t>
-            </a:r>
-            <a:r>
-              <a:rPr lang="en-US" sz="1200" kern="1200" dirty="0" smtClean="0">
-                <a:solidFill>
-                  <a:schemeClr val="tx1"/>
-                </a:solidFill>
-                <a:latin typeface="+mn-lt"/>
-                <a:ea typeface="+mn-ea"/>
-                <a:cs typeface="+mn-cs"/>
-              </a:rPr>
-              <a:t>use default namespace or component name derived from the class name then.</a:t>
-            </a:r>
-          </a:p>
-          <a:p>
-            <a:endParaRPr lang="en-US" sz="1200" kern="1200" dirty="0" smtClean="0">
-              <a:solidFill>
-                <a:schemeClr val="tx1"/>
-              </a:solidFill>
-              <a:latin typeface="+mn-lt"/>
-              <a:ea typeface="+mn-ea"/>
-              <a:cs typeface="+mn-cs"/>
-            </a:endParaRPr>
-          </a:p>
-          <a:p>
-            <a:r>
-              <a:rPr lang="en-US" sz="1200" kern="1200" dirty="0" smtClean="0">
-                <a:solidFill>
-                  <a:schemeClr val="tx1"/>
-                </a:solidFill>
-                <a:latin typeface="+mn-lt"/>
-                <a:ea typeface="+mn-ea"/>
-                <a:cs typeface="+mn-cs"/>
-              </a:rPr>
-              <a:t>This means that it removes the last additional requirement for the component registration. You don't need any tag library definition file to register your component, you will define it simply using the createTag argument in the annotation. </a:t>
-            </a:r>
-          </a:p>
-          <a:p>
             <a:endParaRPr lang="en-US" dirty="0"/>
           </a:p>
         </p:txBody>
@@ -3259,7 +1854,7 @@
           <a:p>
             <a:fld id="{36E82501-53DA-4152-84B0-51135B15EEA8}" type="slidenum">
               <a:rPr lang="en-US" smtClean="0"/>
-              <a:t>34</a:t>
+              <a:t>29</a:t>
             </a:fld>
             <a:endParaRPr lang="en-US"/>
           </a:p>
@@ -3268,7 +1863,7 @@
     </p:spTree>
     <p:extLst>
       <p:ext uri="{BB962C8B-B14F-4D97-AF65-F5344CB8AC3E}">
-        <p14:creationId xmlns:p14="http://schemas.microsoft.com/office/powerpoint/2010/main" val="2462195857"/>
+        <p14:creationId xmlns:p14="http://schemas.microsoft.com/office/powerpoint/2010/main" val="2267876327"/>
       </p:ext>
     </p:extLst>
   </p:cSld>
@@ -3322,157 +1917,7 @@
           <a:bodyPr/>
           <a:lstStyle/>
           <a:p>
-            <a:r>
-              <a:rPr lang="en-US" sz="1200" kern="1200" dirty="0" smtClean="0">
-                <a:solidFill>
-                  <a:schemeClr val="tx1"/>
-                </a:solidFill>
-                <a:latin typeface="+mn-lt"/>
-                <a:ea typeface="+mn-ea"/>
-                <a:cs typeface="+mn-cs"/>
-              </a:rPr>
-              <a:t>Let's show annotation based components within the project and inside external library .jar. Also I will show you that FacesComponents became CDI capable which proves that the JSF is moving closer to the CDI.</a:t>
-            </a:r>
-          </a:p>
-          <a:p>
-            <a:endParaRPr lang="en-US" sz="1200" kern="1200" dirty="0" smtClean="0">
-              <a:solidFill>
-                <a:schemeClr val="tx1"/>
-              </a:solidFill>
-              <a:latin typeface="+mn-lt"/>
-              <a:ea typeface="+mn-ea"/>
-              <a:cs typeface="+mn-cs"/>
-            </a:endParaRPr>
-          </a:p>
-          <a:p>
-            <a:r>
-              <a:rPr lang="en-US" sz="1200" kern="1200" dirty="0" smtClean="0">
-                <a:solidFill>
-                  <a:schemeClr val="tx1"/>
-                </a:solidFill>
-                <a:latin typeface="+mn-lt"/>
-                <a:ea typeface="+mn-ea"/>
-                <a:cs typeface="+mn-cs"/>
-              </a:rPr>
-              <a:t>We have index page which uses PrimeFaces clock component, my custom Clock component created within the web application and the same component bundled as a library. This local component is registered inside the default component namespace and uses implicit</a:t>
-            </a:r>
-            <a:r>
-              <a:rPr lang="en-US" sz="1200" kern="1200" baseline="0" dirty="0" smtClean="0">
-                <a:solidFill>
-                  <a:schemeClr val="tx1"/>
-                </a:solidFill>
-                <a:latin typeface="+mn-lt"/>
-                <a:ea typeface="+mn-ea"/>
-                <a:cs typeface="+mn-cs"/>
-              </a:rPr>
-              <a:t> naming</a:t>
-            </a:r>
-            <a:r>
-              <a:rPr lang="en-US" sz="1200" kern="1200" dirty="0" smtClean="0">
-                <a:solidFill>
-                  <a:schemeClr val="tx1"/>
-                </a:solidFill>
-                <a:latin typeface="+mn-lt"/>
-                <a:ea typeface="+mn-ea"/>
-                <a:cs typeface="+mn-cs"/>
-              </a:rPr>
-              <a:t>. It</a:t>
-            </a:r>
-            <a:r>
-              <a:rPr lang="en-US" sz="1200" kern="1200" baseline="0" dirty="0" smtClean="0">
-                <a:solidFill>
-                  <a:schemeClr val="tx1"/>
-                </a:solidFill>
-                <a:latin typeface="+mn-lt"/>
-                <a:ea typeface="+mn-ea"/>
-                <a:cs typeface="+mn-cs"/>
-              </a:rPr>
-              <a:t> means this is </a:t>
-            </a:r>
-            <a:r>
-              <a:rPr lang="en-US" sz="1200" kern="1200" dirty="0" smtClean="0">
-                <a:solidFill>
-                  <a:schemeClr val="tx1"/>
-                </a:solidFill>
-                <a:latin typeface="+mn-lt"/>
-                <a:ea typeface="+mn-ea"/>
-                <a:cs typeface="+mn-cs"/>
-              </a:rPr>
-              <a:t>the simplest possible Faces component registration. Tip for long winter evenings, try to create similar component using JSF 1.2.</a:t>
-            </a:r>
-            <a:endParaRPr lang="en-US" sz="1200" kern="1200" baseline="0" dirty="0" smtClean="0">
-              <a:solidFill>
-                <a:schemeClr val="tx1"/>
-              </a:solidFill>
-              <a:latin typeface="+mn-lt"/>
-              <a:ea typeface="+mn-ea"/>
-              <a:cs typeface="+mn-cs"/>
-            </a:endParaRPr>
-          </a:p>
-          <a:p>
-            <a:endParaRPr lang="en-US" sz="1200" kern="1200" baseline="0" dirty="0" smtClean="0">
-              <a:solidFill>
-                <a:schemeClr val="tx1"/>
-              </a:solidFill>
-              <a:latin typeface="+mn-lt"/>
-              <a:ea typeface="+mn-ea"/>
-              <a:cs typeface="+mn-cs"/>
-            </a:endParaRPr>
-          </a:p>
-          <a:p>
-            <a:r>
-              <a:rPr lang="en-US" sz="1200" kern="1200" dirty="0" smtClean="0">
-                <a:solidFill>
-                  <a:schemeClr val="tx1"/>
-                </a:solidFill>
-                <a:latin typeface="+mn-lt"/>
-                <a:ea typeface="+mn-ea"/>
-                <a:cs typeface="+mn-cs"/>
-              </a:rPr>
-              <a:t>The external component is placed inside the Java SE project. It uses explicit naming and namespace definition. The second difference is the injected utility class</a:t>
-            </a:r>
-            <a:r>
-              <a:rPr lang="en-US" sz="1200" kern="1200" baseline="0" dirty="0" smtClean="0">
-                <a:solidFill>
-                  <a:schemeClr val="tx1"/>
-                </a:solidFill>
-                <a:latin typeface="+mn-lt"/>
-                <a:ea typeface="+mn-ea"/>
-                <a:cs typeface="+mn-cs"/>
-              </a:rPr>
-              <a:t> which helps build source rendered by component.</a:t>
-            </a:r>
-            <a:endParaRPr lang="en-US" sz="1200" kern="1200" dirty="0" smtClean="0">
-              <a:solidFill>
-                <a:schemeClr val="tx1"/>
-              </a:solidFill>
-              <a:latin typeface="+mn-lt"/>
-              <a:ea typeface="+mn-ea"/>
-              <a:cs typeface="+mn-cs"/>
-            </a:endParaRPr>
-          </a:p>
-          <a:p>
-            <a:endParaRPr lang="en-US" sz="1200" kern="1200" dirty="0" smtClean="0">
-              <a:solidFill>
-                <a:schemeClr val="tx1"/>
-              </a:solidFill>
-              <a:latin typeface="+mn-lt"/>
-              <a:ea typeface="+mn-ea"/>
-              <a:cs typeface="+mn-cs"/>
-            </a:endParaRPr>
-          </a:p>
-          <a:p>
-            <a:r>
-              <a:rPr lang="en-US" sz="1200" kern="1200" dirty="0" smtClean="0">
-                <a:solidFill>
-                  <a:schemeClr val="tx1"/>
-                </a:solidFill>
-                <a:latin typeface="+mn-lt"/>
-                <a:ea typeface="+mn-ea"/>
-                <a:cs typeface="+mn-cs"/>
-              </a:rPr>
-              <a:t>Let's start the project, you will see that everything work smoothly.</a:t>
-            </a:r>
+            <a:endParaRPr lang="en-US" dirty="0"/>
           </a:p>
         </p:txBody>
       </p:sp>
@@ -3493,7 +1938,7 @@
           <a:p>
             <a:fld id="{36E82501-53DA-4152-84B0-51135B15EEA8}" type="slidenum">
               <a:rPr lang="en-US" smtClean="0"/>
-              <a:t>35</a:t>
+              <a:t>31</a:t>
             </a:fld>
             <a:endParaRPr lang="en-US"/>
           </a:p>
@@ -3502,7 +1947,7 @@
     </p:spTree>
     <p:extLst>
       <p:ext uri="{BB962C8B-B14F-4D97-AF65-F5344CB8AC3E}">
-        <p14:creationId xmlns:p14="http://schemas.microsoft.com/office/powerpoint/2010/main" val="2614701264"/>
+        <p14:creationId xmlns:p14="http://schemas.microsoft.com/office/powerpoint/2010/main" val="1097235293"/>
       </p:ext>
     </p:extLst>
   </p:cSld>
@@ -3556,104 +2001,14 @@
           <a:bodyPr/>
           <a:lstStyle/>
           <a:p>
-            <a:r>
-              <a:rPr lang="en-US" dirty="0" smtClean="0"/>
-              <a:t>JSF 2.2 now supports file</a:t>
-            </a:r>
-            <a:r>
-              <a:rPr lang="en-US" baseline="0" dirty="0" smtClean="0"/>
-              <a:t> upload out of the box with the </a:t>
-            </a:r>
-            <a:r>
-              <a:rPr lang="en-US" baseline="0" dirty="0" err="1" smtClean="0"/>
-              <a:t>fileupload</a:t>
-            </a:r>
-            <a:r>
-              <a:rPr lang="en-US" baseline="0" dirty="0" smtClean="0"/>
-              <a:t> component, </a:t>
-            </a:r>
-            <a:r>
-              <a:rPr lang="en-US" baseline="0" dirty="0" err="1" smtClean="0"/>
-              <a:t>h:inputFile</a:t>
-            </a:r>
-            <a:r>
-              <a:rPr lang="en-US" baseline="0" dirty="0" smtClean="0"/>
-              <a:t>. This component uses Servlet 3.0 and its </a:t>
-            </a:r>
-            <a:r>
-              <a:rPr lang="en-US" baseline="0" dirty="0" err="1" smtClean="0"/>
-              <a:t>javax.servlet.http.Part</a:t>
-            </a:r>
-            <a:r>
-              <a:rPr lang="en-US" baseline="0" dirty="0" smtClean="0"/>
-              <a:t> interface to do the actual upload. </a:t>
-            </a:r>
-            <a:r>
-              <a:rPr lang="en-US" baseline="0" dirty="0" err="1" smtClean="0"/>
-              <a:t>Inputfile</a:t>
-            </a:r>
-            <a:r>
-              <a:rPr lang="en-US" baseline="0" dirty="0" smtClean="0"/>
-              <a:t> component supports file upload for </a:t>
-            </a:r>
-            <a:r>
-              <a:rPr lang="en-US" baseline="0" dirty="0" err="1" smtClean="0"/>
-              <a:t>ajax</a:t>
-            </a:r>
-            <a:r>
-              <a:rPr lang="en-US" baseline="0" dirty="0" smtClean="0"/>
-              <a:t> and non </a:t>
-            </a:r>
-            <a:r>
-              <a:rPr lang="en-US" baseline="0" dirty="0" err="1" smtClean="0"/>
-              <a:t>ajax</a:t>
-            </a:r>
-            <a:r>
-              <a:rPr lang="en-US" baseline="0" dirty="0" smtClean="0"/>
-              <a:t> requests. In order to use the </a:t>
-            </a:r>
-            <a:r>
-              <a:rPr lang="en-US" baseline="0" dirty="0" err="1" smtClean="0"/>
-              <a:t>inputfile</a:t>
-            </a:r>
-            <a:r>
-              <a:rPr lang="en-US" baseline="0" dirty="0" smtClean="0"/>
-              <a:t> component you need to define the multipart form-data for your encoding and servlet 3.0 should be on board. With </a:t>
-            </a:r>
-            <a:r>
-              <a:rPr lang="en-US" baseline="0" dirty="0" err="1" smtClean="0"/>
-              <a:t>inputFile</a:t>
-            </a:r>
-            <a:r>
-              <a:rPr lang="en-US" baseline="0" dirty="0" smtClean="0"/>
-              <a:t> component it’s also possible to do validation for instance on the size by using the validator attribute. </a:t>
-            </a:r>
-          </a:p>
-          <a:p>
-            <a:endParaRPr lang="en-US" baseline="0" dirty="0" smtClean="0"/>
-          </a:p>
-          <a:p>
-            <a:r>
-              <a:rPr lang="en-US" baseline="0" dirty="0" smtClean="0"/>
-              <a:t>We have rewritten the </a:t>
-            </a:r>
-            <a:r>
-              <a:rPr lang="en-US" baseline="0" dirty="0" err="1" smtClean="0"/>
-              <a:t>fileupload</a:t>
-            </a:r>
-            <a:r>
-              <a:rPr lang="en-US" baseline="0" dirty="0" smtClean="0"/>
-              <a:t> component with PrimeFaces 4.0. It’s still using the HTML5 infrastructure and it’s backward compatible. One feature to be noticed is now PrimeFaces uses JSF2.2 architecture to do the upload and if JSF2.2 is not on board it fall backs to commons file-upload architecture. And all this is configurable with a context parameter in </a:t>
-            </a:r>
-            <a:r>
-              <a:rPr lang="en-US" baseline="0" dirty="0" err="1" smtClean="0"/>
-              <a:t>web.xml</a:t>
-            </a:r>
-            <a:r>
-              <a:rPr lang="en-US" baseline="0" dirty="0" smtClean="0"/>
-              <a:t>.</a:t>
-            </a:r>
-            <a:endParaRPr lang="en-US" dirty="0"/>
+            <a:endParaRPr lang="en-US" sz="1200" kern="1200" dirty="0" smtClean="0">
+              <a:solidFill>
+                <a:schemeClr val="tx1"/>
+              </a:solidFill>
+              <a:latin typeface="+mn-lt"/>
+              <a:ea typeface="+mn-ea"/>
+              <a:cs typeface="+mn-cs"/>
+            </a:endParaRPr>
           </a:p>
         </p:txBody>
       </p:sp>
@@ -3674,7 +2029,7 @@
           <a:p>
             <a:fld id="{36E82501-53DA-4152-84B0-51135B15EEA8}" type="slidenum">
               <a:rPr lang="en-US" smtClean="0"/>
-              <a:t>37</a:t>
+              <a:t>32</a:t>
             </a:fld>
             <a:endParaRPr lang="en-US"/>
           </a:p>
@@ -3683,7 +2038,7 @@
     </p:spTree>
     <p:extLst>
       <p:ext uri="{BB962C8B-B14F-4D97-AF65-F5344CB8AC3E}">
-        <p14:creationId xmlns:p14="http://schemas.microsoft.com/office/powerpoint/2010/main" val="3261028125"/>
+        <p14:creationId xmlns:p14="http://schemas.microsoft.com/office/powerpoint/2010/main" val="1251836"/>
       </p:ext>
     </p:extLst>
   </p:cSld>
@@ -3737,38 +2092,349 @@
           <a:bodyPr/>
           <a:lstStyle/>
           <a:p>
-            <a:r>
-              <a:rPr lang="en-US" dirty="0" smtClean="0"/>
-              <a:t>So this is the book that I’ve co-authored</a:t>
-            </a:r>
-            <a:r>
-              <a:rPr lang="en-US" baseline="0" dirty="0" smtClean="0"/>
-              <a:t> with Oleg </a:t>
-            </a:r>
-            <a:r>
-              <a:rPr lang="en-US" baseline="0" dirty="0" err="1" smtClean="0"/>
-              <a:t>Varaksin</a:t>
-            </a:r>
-            <a:r>
-              <a:rPr lang="en-US" baseline="0" dirty="0" smtClean="0"/>
-              <a:t> and it’s released from </a:t>
-            </a:r>
-            <a:r>
-              <a:rPr lang="en-US" baseline="0" dirty="0" err="1" smtClean="0"/>
-              <a:t>PacktPub</a:t>
-            </a:r>
-            <a:r>
-              <a:rPr lang="en-US" baseline="0" dirty="0" smtClean="0"/>
-              <a:t>, it contains over 90 practical recipes about PrimeFaces. At the time of writing the version of PrimeFaces was 3.5 so I think we also need to update the book with new recipes. You can find the author’s discount code on the slide, it’s %40 off if you buy it from </a:t>
-            </a:r>
-            <a:r>
-              <a:rPr lang="en-US" baseline="0" dirty="0" err="1" smtClean="0"/>
-              <a:t>packtpub’s</a:t>
-            </a:r>
-            <a:r>
-              <a:rPr lang="en-US" baseline="0" dirty="0" smtClean="0"/>
-              <a:t> site.</a:t>
-            </a:r>
+            <a:endParaRPr lang="en-US" dirty="0"/>
+          </a:p>
+        </p:txBody>
+      </p:sp>
+      <p:sp>
+        <p:nvSpPr>
+          <p:cNvPr id="4" name="Slide Number Placeholder 3"/>
+          <p:cNvSpPr>
+            <a:spLocks noGrp="1"/>
+          </p:cNvSpPr>
+          <p:nvPr>
+            <p:ph type="sldNum" sz="quarter" idx="10"/>
+          </p:nvPr>
+        </p:nvSpPr>
+        <p:spPr/>
+        <p:txBody>
+          <a:bodyPr/>
+          <a:lstStyle/>
+          <a:p>
+            <a:fld id="{36E82501-53DA-4152-84B0-51135B15EEA8}" type="slidenum">
+              <a:rPr lang="en-US" smtClean="0"/>
+              <a:t>34</a:t>
+            </a:fld>
+            <a:endParaRPr lang="en-US"/>
+          </a:p>
+        </p:txBody>
+      </p:sp>
+    </p:spTree>
+    <p:extLst>
+      <p:ext uri="{BB962C8B-B14F-4D97-AF65-F5344CB8AC3E}">
+        <p14:creationId xmlns:p14="http://schemas.microsoft.com/office/powerpoint/2010/main" val="2462195857"/>
+      </p:ext>
+    </p:extLst>
+  </p:cSld>
+  <p:clrMapOvr>
+    <a:masterClrMapping/>
+  </p:clrMapOvr>
+</p:notes>
+</file>
+
+<file path=ppt/notesSlides/notesSlide25.xml><?xml version="1.0" encoding="utf-8"?>
+<p:notes xmlns:a="http://schemas.openxmlformats.org/drawingml/2006/main" xmlns:r="http://schemas.openxmlformats.org/officeDocument/2006/relationships" xmlns:p="http://schemas.openxmlformats.org/presentationml/2006/main">
+  <p:cSld>
+    <p:spTree>
+      <p:nvGrpSpPr>
+        <p:cNvPr id="1" name=""/>
+        <p:cNvGrpSpPr/>
+        <p:nvPr/>
+      </p:nvGrpSpPr>
+      <p:grpSpPr>
+        <a:xfrm>
+          <a:off x="0" y="0"/>
+          <a:ext cx="0" cy="0"/>
+          <a:chOff x="0" y="0"/>
+          <a:chExt cx="0" cy="0"/>
+        </a:xfrm>
+      </p:grpSpPr>
+      <p:sp>
+        <p:nvSpPr>
+          <p:cNvPr id="2" name="Slide Image Placeholder 1"/>
+          <p:cNvSpPr>
+            <a:spLocks noGrp="1" noRot="1" noChangeAspect="1"/>
+          </p:cNvSpPr>
+          <p:nvPr>
+            <p:ph type="sldImg"/>
+          </p:nvPr>
+        </p:nvSpPr>
+        <p:spPr/>
+      </p:sp>
+      <p:sp>
+        <p:nvSpPr>
+          <p:cNvPr id="3" name="Notes Placeholder 2"/>
+          <p:cNvSpPr>
+            <a:spLocks noGrp="1"/>
+          </p:cNvSpPr>
+          <p:nvPr>
+            <p:ph type="body" idx="1"/>
+          </p:nvPr>
+        </p:nvSpPr>
+        <p:spPr/>
+        <p:txBody>
+          <a:bodyPr/>
+          <a:lstStyle/>
+          <a:p>
+            <a:endParaRPr lang="en-US" sz="1200" kern="1200" dirty="0" smtClean="0">
+              <a:solidFill>
+                <a:schemeClr val="tx1"/>
+              </a:solidFill>
+              <a:latin typeface="+mn-lt"/>
+              <a:ea typeface="+mn-ea"/>
+              <a:cs typeface="+mn-cs"/>
+            </a:endParaRPr>
+          </a:p>
+        </p:txBody>
+      </p:sp>
+      <p:sp>
+        <p:nvSpPr>
+          <p:cNvPr id="4" name="Slide Number Placeholder 3"/>
+          <p:cNvSpPr>
+            <a:spLocks noGrp="1"/>
+          </p:cNvSpPr>
+          <p:nvPr>
+            <p:ph type="sldNum" sz="quarter" idx="10"/>
+          </p:nvPr>
+        </p:nvSpPr>
+        <p:spPr/>
+        <p:txBody>
+          <a:bodyPr/>
+          <a:lstStyle/>
+          <a:p>
+            <a:fld id="{36E82501-53DA-4152-84B0-51135B15EEA8}" type="slidenum">
+              <a:rPr lang="en-US" smtClean="0"/>
+              <a:t>35</a:t>
+            </a:fld>
+            <a:endParaRPr lang="en-US"/>
+          </a:p>
+        </p:txBody>
+      </p:sp>
+    </p:spTree>
+    <p:extLst>
+      <p:ext uri="{BB962C8B-B14F-4D97-AF65-F5344CB8AC3E}">
+        <p14:creationId xmlns:p14="http://schemas.microsoft.com/office/powerpoint/2010/main" val="2614701264"/>
+      </p:ext>
+    </p:extLst>
+  </p:cSld>
+  <p:clrMapOvr>
+    <a:masterClrMapping/>
+  </p:clrMapOvr>
+</p:notes>
+</file>
+
+<file path=ppt/notesSlides/notesSlide26.xml><?xml version="1.0" encoding="utf-8"?>
+<p:notes xmlns:a="http://schemas.openxmlformats.org/drawingml/2006/main" xmlns:r="http://schemas.openxmlformats.org/officeDocument/2006/relationships" xmlns:p="http://schemas.openxmlformats.org/presentationml/2006/main">
+  <p:cSld>
+    <p:spTree>
+      <p:nvGrpSpPr>
+        <p:cNvPr id="1" name=""/>
+        <p:cNvGrpSpPr/>
+        <p:nvPr/>
+      </p:nvGrpSpPr>
+      <p:grpSpPr>
+        <a:xfrm>
+          <a:off x="0" y="0"/>
+          <a:ext cx="0" cy="0"/>
+          <a:chOff x="0" y="0"/>
+          <a:chExt cx="0" cy="0"/>
+        </a:xfrm>
+      </p:grpSpPr>
+      <p:sp>
+        <p:nvSpPr>
+          <p:cNvPr id="2" name="Slide Image Placeholder 1"/>
+          <p:cNvSpPr>
+            <a:spLocks noGrp="1" noRot="1" noChangeAspect="1"/>
+          </p:cNvSpPr>
+          <p:nvPr>
+            <p:ph type="sldImg"/>
+          </p:nvPr>
+        </p:nvSpPr>
+        <p:spPr/>
+      </p:sp>
+      <p:sp>
+        <p:nvSpPr>
+          <p:cNvPr id="3" name="Notes Placeholder 2"/>
+          <p:cNvSpPr>
+            <a:spLocks noGrp="1"/>
+          </p:cNvSpPr>
+          <p:nvPr>
+            <p:ph type="body" idx="1"/>
+          </p:nvPr>
+        </p:nvSpPr>
+        <p:spPr/>
+        <p:txBody>
+          <a:bodyPr/>
+          <a:lstStyle/>
+          <a:p>
+            <a:endParaRPr lang="en-US" dirty="0"/>
+          </a:p>
+        </p:txBody>
+      </p:sp>
+      <p:sp>
+        <p:nvSpPr>
+          <p:cNvPr id="4" name="Slide Number Placeholder 3"/>
+          <p:cNvSpPr>
+            <a:spLocks noGrp="1"/>
+          </p:cNvSpPr>
+          <p:nvPr>
+            <p:ph type="sldNum" sz="quarter" idx="10"/>
+          </p:nvPr>
+        </p:nvSpPr>
+        <p:spPr/>
+        <p:txBody>
+          <a:bodyPr/>
+          <a:lstStyle/>
+          <a:p>
+            <a:fld id="{36E82501-53DA-4152-84B0-51135B15EEA8}" type="slidenum">
+              <a:rPr lang="en-US" smtClean="0"/>
+              <a:t>37</a:t>
+            </a:fld>
+            <a:endParaRPr lang="en-US"/>
+          </a:p>
+        </p:txBody>
+      </p:sp>
+    </p:spTree>
+    <p:extLst>
+      <p:ext uri="{BB962C8B-B14F-4D97-AF65-F5344CB8AC3E}">
+        <p14:creationId xmlns:p14="http://schemas.microsoft.com/office/powerpoint/2010/main" val="3261028125"/>
+      </p:ext>
+    </p:extLst>
+  </p:cSld>
+  <p:clrMapOvr>
+    <a:masterClrMapping/>
+  </p:clrMapOvr>
+</p:notes>
+</file>
+
+<file path=ppt/notesSlides/notesSlide27.xml><?xml version="1.0" encoding="utf-8"?>
+<p:notes xmlns:a="http://schemas.openxmlformats.org/drawingml/2006/main" xmlns:r="http://schemas.openxmlformats.org/officeDocument/2006/relationships" xmlns:p="http://schemas.openxmlformats.org/presentationml/2006/main">
+  <p:cSld>
+    <p:spTree>
+      <p:nvGrpSpPr>
+        <p:cNvPr id="1" name=""/>
+        <p:cNvGrpSpPr/>
+        <p:nvPr/>
+      </p:nvGrpSpPr>
+      <p:grpSpPr>
+        <a:xfrm>
+          <a:off x="0" y="0"/>
+          <a:ext cx="0" cy="0"/>
+          <a:chOff x="0" y="0"/>
+          <a:chExt cx="0" cy="0"/>
+        </a:xfrm>
+      </p:grpSpPr>
+      <p:sp>
+        <p:nvSpPr>
+          <p:cNvPr id="2" name="Slide Image Placeholder 1"/>
+          <p:cNvSpPr>
+            <a:spLocks noGrp="1" noRot="1" noChangeAspect="1"/>
+          </p:cNvSpPr>
+          <p:nvPr>
+            <p:ph type="sldImg"/>
+          </p:nvPr>
+        </p:nvSpPr>
+        <p:spPr/>
+      </p:sp>
+      <p:sp>
+        <p:nvSpPr>
+          <p:cNvPr id="3" name="Notes Placeholder 2"/>
+          <p:cNvSpPr>
+            <a:spLocks noGrp="1"/>
+          </p:cNvSpPr>
+          <p:nvPr>
+            <p:ph type="body" idx="1"/>
+          </p:nvPr>
+        </p:nvSpPr>
+        <p:spPr/>
+        <p:txBody>
+          <a:bodyPr/>
+          <a:lstStyle/>
+          <a:p>
+            <a:endParaRPr lang="en-US" dirty="0"/>
+          </a:p>
+        </p:txBody>
+      </p:sp>
+      <p:sp>
+        <p:nvSpPr>
+          <p:cNvPr id="4" name="Slide Number Placeholder 3"/>
+          <p:cNvSpPr>
+            <a:spLocks noGrp="1"/>
+          </p:cNvSpPr>
+          <p:nvPr>
+            <p:ph type="sldNum" sz="quarter" idx="10"/>
+          </p:nvPr>
+        </p:nvSpPr>
+        <p:spPr/>
+        <p:txBody>
+          <a:bodyPr/>
+          <a:lstStyle/>
+          <a:p>
+            <a:fld id="{36E82501-53DA-4152-84B0-51135B15EEA8}" type="slidenum">
+              <a:rPr lang="en-US" smtClean="0"/>
+              <a:t>38</a:t>
+            </a:fld>
+            <a:endParaRPr lang="en-US"/>
+          </a:p>
+        </p:txBody>
+      </p:sp>
+    </p:spTree>
+    <p:extLst>
+      <p:ext uri="{BB962C8B-B14F-4D97-AF65-F5344CB8AC3E}">
+        <p14:creationId xmlns:p14="http://schemas.microsoft.com/office/powerpoint/2010/main" val="2160534540"/>
+      </p:ext>
+    </p:extLst>
+  </p:cSld>
+  <p:clrMapOvr>
+    <a:masterClrMapping/>
+  </p:clrMapOvr>
+</p:notes>
+</file>
+
+<file path=ppt/notesSlides/notesSlide28.xml><?xml version="1.0" encoding="utf-8"?>
+<p:notes xmlns:a="http://schemas.openxmlformats.org/drawingml/2006/main" xmlns:r="http://schemas.openxmlformats.org/officeDocument/2006/relationships" xmlns:p="http://schemas.openxmlformats.org/presentationml/2006/main">
+  <p:cSld>
+    <p:spTree>
+      <p:nvGrpSpPr>
+        <p:cNvPr id="1" name=""/>
+        <p:cNvGrpSpPr/>
+        <p:nvPr/>
+      </p:nvGrpSpPr>
+      <p:grpSpPr>
+        <a:xfrm>
+          <a:off x="0" y="0"/>
+          <a:ext cx="0" cy="0"/>
+          <a:chOff x="0" y="0"/>
+          <a:chExt cx="0" cy="0"/>
+        </a:xfrm>
+      </p:grpSpPr>
+      <p:sp>
+        <p:nvSpPr>
+          <p:cNvPr id="2" name="Slide Image Placeholder 1"/>
+          <p:cNvSpPr>
+            <a:spLocks noGrp="1" noRot="1" noChangeAspect="1"/>
+          </p:cNvSpPr>
+          <p:nvPr>
+            <p:ph type="sldImg"/>
+          </p:nvPr>
+        </p:nvSpPr>
+        <p:spPr/>
+      </p:sp>
+      <p:sp>
+        <p:nvSpPr>
+          <p:cNvPr id="3" name="Notes Placeholder 2"/>
+          <p:cNvSpPr>
+            <a:spLocks noGrp="1"/>
+          </p:cNvSpPr>
+          <p:nvPr>
+            <p:ph type="body" idx="1"/>
+          </p:nvPr>
+        </p:nvSpPr>
+        <p:spPr/>
+        <p:txBody>
+          <a:bodyPr/>
+          <a:lstStyle/>
+          <a:p>
             <a:endParaRPr lang="en-US" dirty="0"/>
           </a:p>
         </p:txBody>
@@ -3853,57 +2519,6 @@
           <a:bodyPr/>
           <a:lstStyle/>
           <a:p>
-            <a:r>
-              <a:rPr lang="en-US" dirty="0" smtClean="0"/>
-              <a:t>So JavaEE7 is released in June and it brought very</a:t>
-            </a:r>
-            <a:r>
-              <a:rPr lang="en-US" baseline="0" dirty="0" smtClean="0"/>
-              <a:t> cool stuff like JSF2.2, JAX-RS 2.0, JMS 2, Servlet 3.1 and etc. In JSF 2.2 context cool new features arrived like HTML5 Friendly Markup, </a:t>
-            </a:r>
-            <a:r>
-              <a:rPr lang="en-US" baseline="0" dirty="0" err="1" smtClean="0"/>
-              <a:t>FileUpload</a:t>
-            </a:r>
-            <a:r>
-              <a:rPr lang="en-US" baseline="0" dirty="0" smtClean="0"/>
-              <a:t> component, Faces Flows and many others. Martin and I gathered 10 tips to </a:t>
-            </a:r>
-            <a:r>
-              <a:rPr lang="en-US" baseline="0" dirty="0" smtClean="0"/>
-              <a:t>show it all to you guys in 1 hour. It’ll be a challenge for us actually but we’ll try to make it on time.</a:t>
-            </a:r>
-            <a:endParaRPr lang="en-US" baseline="0" dirty="0" smtClean="0"/>
-          </a:p>
-          <a:p>
-            <a:endParaRPr lang="en-US" baseline="0" dirty="0" smtClean="0"/>
-          </a:p>
-          <a:p>
-            <a:r>
-              <a:rPr lang="en-US" baseline="0" dirty="0" smtClean="0"/>
-              <a:t>Glassfish </a:t>
-            </a:r>
-            <a:r>
-              <a:rPr lang="en-US" baseline="0" dirty="0" smtClean="0"/>
-              <a:t>4.0 is now EE7 ready. So we’ll be using GF4 and </a:t>
-            </a:r>
-            <a:r>
-              <a:rPr lang="en-US" baseline="0" dirty="0" err="1" smtClean="0"/>
-              <a:t>NetBeans</a:t>
-            </a:r>
-            <a:r>
-              <a:rPr lang="en-US" baseline="0" dirty="0" smtClean="0"/>
-              <a:t> to demo our sample codes.</a:t>
-            </a:r>
-          </a:p>
-          <a:p>
-            <a:endParaRPr lang="en-US" baseline="0" dirty="0" smtClean="0"/>
-          </a:p>
-          <a:p>
-            <a:r>
-              <a:rPr lang="en-US" baseline="0" dirty="0" smtClean="0"/>
-              <a:t>So we have 10 tips for JSF2.2 goodness and PrimeFaces awesomeness. We’ll briefly go through the features and then dive into sample codes to show the nuts and bolts.</a:t>
-            </a:r>
             <a:endParaRPr lang="en-US" dirty="0"/>
           </a:p>
         </p:txBody>
@@ -3988,36 +2603,6 @@
           <a:bodyPr/>
           <a:lstStyle/>
           <a:p>
-            <a:r>
-              <a:rPr lang="en-US" dirty="0" smtClean="0"/>
-              <a:t>So </a:t>
-            </a:r>
-            <a:r>
-              <a:rPr lang="en-US" dirty="0" err="1" smtClean="0"/>
-              <a:t>JavaEE</a:t>
-            </a:r>
-            <a:r>
-              <a:rPr lang="en-US" dirty="0" smtClean="0"/>
-              <a:t> focused</a:t>
-            </a:r>
-            <a:r>
-              <a:rPr lang="en-US" baseline="0" dirty="0" smtClean="0"/>
-              <a:t> on the HTML5 side with enhancing developer productivity to meet the industrial standards.</a:t>
-            </a:r>
-            <a:endParaRPr lang="en-US" dirty="0" smtClean="0"/>
-          </a:p>
-          <a:p>
-            <a:endParaRPr lang="en-US" dirty="0" smtClean="0"/>
-          </a:p>
-          <a:p>
-            <a:r>
-              <a:rPr lang="en-US" dirty="0" smtClean="0"/>
-              <a:t>JSF released</a:t>
-            </a:r>
-            <a:r>
-              <a:rPr lang="en-US" baseline="0" dirty="0" smtClean="0"/>
-              <a:t> its 2.2 with features like HTML5 Friendly Markup, Resource Library Contracts, File Upload and many more.</a:t>
-            </a:r>
             <a:endParaRPr lang="en-US" dirty="0"/>
           </a:p>
         </p:txBody>
@@ -4102,642 +2687,6 @@
           <a:bodyPr/>
           <a:lstStyle/>
           <a:p>
-            <a:r>
-              <a:rPr lang="en-US" dirty="0" smtClean="0"/>
-              <a:t>PrimeFaces</a:t>
-            </a:r>
-            <a:r>
-              <a:rPr lang="en-US" baseline="0" dirty="0" smtClean="0"/>
-              <a:t> is the most popular JSF component library. It’s widely adopted and being used around the globe. It provides over 100 rich UI components based on JSF 2 API. Now JSF2.2 is being supported by PrimeFaces 4.0 </a:t>
-            </a:r>
-            <a:r>
-              <a:rPr lang="en-US" baseline="0" dirty="0" smtClean="0"/>
-              <a:t>version codenamed </a:t>
-            </a:r>
-            <a:r>
-              <a:rPr lang="en-US" baseline="0" dirty="0" smtClean="0"/>
-              <a:t>sentinel. A release candidate for sentinel is released now. PrimeFaces is very lightweight, it’s just one jar, which is around 2mbs with no required dependencies, all you need is to get it via maven dependency for instance and after defining your namespaces within your JSF page you are good to go. PrimeFaces only has optional dependencies like commons-</a:t>
-            </a:r>
-            <a:r>
-              <a:rPr lang="en-US" baseline="0" dirty="0" err="1" smtClean="0"/>
-              <a:t>fieupload</a:t>
-            </a:r>
-            <a:r>
-              <a:rPr lang="en-US" baseline="0" dirty="0" smtClean="0"/>
-              <a:t>, commons-</a:t>
-            </a:r>
-            <a:r>
-              <a:rPr lang="en-US" baseline="0" dirty="0" err="1" smtClean="0"/>
-              <a:t>io</a:t>
-            </a:r>
-            <a:r>
-              <a:rPr lang="en-US" baseline="0" dirty="0" smtClean="0"/>
-              <a:t>, </a:t>
-            </a:r>
-            <a:r>
-              <a:rPr lang="en-US" baseline="0" dirty="0" err="1" smtClean="0"/>
-              <a:t>itext</a:t>
-            </a:r>
-            <a:r>
-              <a:rPr lang="en-US" baseline="0" dirty="0" smtClean="0"/>
-              <a:t> for PDF export, poi for excel export or </a:t>
-            </a:r>
-            <a:r>
-              <a:rPr lang="en-US" baseline="0" dirty="0" err="1" smtClean="0"/>
-              <a:t>rome</a:t>
-            </a:r>
-            <a:r>
-              <a:rPr lang="en-US" baseline="0" dirty="0" smtClean="0"/>
-              <a:t> for RSS feed reader. </a:t>
-            </a:r>
-          </a:p>
-          <a:p>
-            <a:endParaRPr lang="en-US" baseline="0" dirty="0" smtClean="0"/>
-          </a:p>
-          <a:p>
-            <a:pPr marL="0" marR="0" indent="0" algn="l" defTabSz="914400" rtl="0" eaLnBrk="1" fontAlgn="auto" latinLnBrk="0" hangingPunct="1">
-              <a:lnSpc>
-                <a:spcPct val="100000"/>
-              </a:lnSpc>
-              <a:spcBef>
-                <a:spcPts val="0"/>
-              </a:spcBef>
-              <a:spcAft>
-                <a:spcPts val="0"/>
-              </a:spcAft>
-              <a:buClrTx/>
-              <a:buSzTx/>
-              <a:buFontTx/>
-              <a:buNone/>
-              <a:tabLst/>
-              <a:defRPr/>
-            </a:pPr>
-            <a:r>
-              <a:rPr lang="en-US" baseline="0" dirty="0" smtClean="0"/>
-              <a:t>PrimeFaces also have side projects like the spin-off project </a:t>
-            </a:r>
-            <a:r>
-              <a:rPr lang="en-US" baseline="0" dirty="0" err="1" smtClean="0"/>
-              <a:t>PrimeUII</a:t>
-            </a:r>
-            <a:r>
-              <a:rPr lang="en-US" baseline="0" dirty="0" smtClean="0"/>
-              <a:t>, which is a </a:t>
-            </a:r>
-            <a:r>
-              <a:rPr lang="en-US" baseline="0" dirty="0" err="1" smtClean="0"/>
-              <a:t>javascript</a:t>
-            </a:r>
-            <a:r>
-              <a:rPr lang="en-US" baseline="0" dirty="0" smtClean="0"/>
-              <a:t> widget library powered by HTML5 and CSS3. </a:t>
-            </a:r>
-            <a:r>
-              <a:rPr lang="en-US" baseline="0" dirty="0" err="1" smtClean="0"/>
-              <a:t>PrimeMobile</a:t>
-            </a:r>
-            <a:r>
-              <a:rPr lang="en-US" baseline="0" dirty="0" smtClean="0"/>
-              <a:t> provides JSF components that are optimized for mobile devices. It’s powered by </a:t>
-            </a:r>
-            <a:r>
-              <a:rPr lang="en-US" baseline="0" dirty="0" err="1" smtClean="0"/>
-              <a:t>jQuery</a:t>
-            </a:r>
-            <a:r>
-              <a:rPr lang="en-US" baseline="0" dirty="0" smtClean="0"/>
-              <a:t> mobile and supports </a:t>
-            </a:r>
-            <a:r>
-              <a:rPr lang="en-US" sz="1200" kern="1200" dirty="0" smtClean="0">
-                <a:solidFill>
-                  <a:schemeClr val="tx1"/>
-                </a:solidFill>
-                <a:latin typeface="+mn-lt"/>
-                <a:ea typeface="+mn-ea"/>
-                <a:cs typeface="+mn-cs"/>
-              </a:rPr>
-              <a:t>various platforms such as iPhone, Android, Windows Phone and others.</a:t>
-            </a:r>
-            <a:r>
-              <a:rPr lang="en-US" dirty="0" smtClean="0"/>
-              <a:t> </a:t>
-            </a:r>
-            <a:r>
-              <a:rPr lang="en-US" dirty="0" err="1" smtClean="0"/>
-              <a:t>PrimePush</a:t>
-            </a:r>
-            <a:r>
-              <a:rPr lang="en-US" baseline="0" dirty="0" smtClean="0"/>
-              <a:t> is a side project that contains client and server side implementations for Asynchronous Web Applications. It uses the atmosphere framework which supports all major browsers and servers. </a:t>
-            </a:r>
-            <a:r>
-              <a:rPr lang="en-US" baseline="0" dirty="0" err="1" smtClean="0"/>
-              <a:t>PrimePush</a:t>
-            </a:r>
-            <a:r>
-              <a:rPr lang="en-US" baseline="0" dirty="0" smtClean="0"/>
-              <a:t> is being developed by PrimeFaces developers and Atmosphere lead: </a:t>
-            </a:r>
-            <a:r>
-              <a:rPr lang="fr-FR" baseline="0" dirty="0" smtClean="0"/>
-              <a:t>jean </a:t>
-            </a:r>
-            <a:r>
-              <a:rPr lang="fr-FR" baseline="0" dirty="0" err="1" smtClean="0"/>
-              <a:t>francois</a:t>
-            </a:r>
-            <a:r>
-              <a:rPr lang="fr-FR" baseline="0" dirty="0" smtClean="0"/>
-              <a:t> </a:t>
-            </a:r>
-            <a:r>
-              <a:rPr lang="fr-FR" baseline="0" dirty="0" err="1" smtClean="0"/>
-              <a:t>arcand</a:t>
-            </a:r>
-            <a:r>
-              <a:rPr lang="fr-FR" baseline="0" dirty="0" smtClean="0"/>
-              <a:t>. </a:t>
-            </a:r>
-            <a:r>
-              <a:rPr lang="fr-FR" baseline="0" dirty="0" err="1" smtClean="0"/>
-              <a:t>PrimePush</a:t>
-            </a:r>
-            <a:r>
-              <a:rPr lang="fr-FR" baseline="0" dirty="0" smtClean="0"/>
-              <a:t> </a:t>
-            </a:r>
-            <a:r>
-              <a:rPr lang="fr-FR" baseline="0" dirty="0" err="1" smtClean="0"/>
-              <a:t>transparently</a:t>
-            </a:r>
-            <a:r>
-              <a:rPr lang="fr-FR" baseline="0" dirty="0" smtClean="0"/>
-              <a:t> supports </a:t>
-            </a:r>
-            <a:r>
-              <a:rPr lang="fr-FR" baseline="0" dirty="0" err="1" smtClean="0"/>
-              <a:t>WebSockets</a:t>
-            </a:r>
-            <a:r>
-              <a:rPr lang="fr-FR" baseline="0" dirty="0" smtClean="0"/>
-              <a:t>, Long Polling, Streaming and JSONP.</a:t>
-            </a:r>
-          </a:p>
-          <a:p>
-            <a:pPr marL="0" marR="0" indent="0" algn="l" defTabSz="914400" rtl="0" eaLnBrk="1" fontAlgn="auto" latinLnBrk="0" hangingPunct="1">
-              <a:lnSpc>
-                <a:spcPct val="100000"/>
-              </a:lnSpc>
-              <a:spcBef>
-                <a:spcPts val="0"/>
-              </a:spcBef>
-              <a:spcAft>
-                <a:spcPts val="0"/>
-              </a:spcAft>
-              <a:buClrTx/>
-              <a:buSzTx/>
-              <a:buFontTx/>
-              <a:buNone/>
-              <a:tabLst/>
-              <a:defRPr/>
-            </a:pPr>
-            <a:endParaRPr lang="fr-FR" baseline="0" dirty="0" smtClean="0"/>
-          </a:p>
-          <a:p>
-            <a:pPr marL="0" marR="0" indent="0" algn="l" defTabSz="914400" rtl="0" eaLnBrk="1" fontAlgn="auto" latinLnBrk="0" hangingPunct="1">
-              <a:lnSpc>
-                <a:spcPct val="100000"/>
-              </a:lnSpc>
-              <a:spcBef>
-                <a:spcPts val="0"/>
-              </a:spcBef>
-              <a:spcAft>
-                <a:spcPts val="0"/>
-              </a:spcAft>
-              <a:buClrTx/>
-              <a:buSzTx/>
-              <a:buFontTx/>
-              <a:buNone/>
-              <a:tabLst/>
-              <a:defRPr/>
-            </a:pPr>
-            <a:r>
-              <a:rPr lang="fr-FR" baseline="0" dirty="0" smtClean="0"/>
-              <a:t>PrimeFaces </a:t>
-            </a:r>
-            <a:r>
-              <a:rPr lang="fr-FR" baseline="0" dirty="0" err="1" smtClean="0"/>
-              <a:t>provides</a:t>
-            </a:r>
-            <a:r>
-              <a:rPr lang="fr-FR" baseline="0" dirty="0" smtClean="0"/>
-              <a:t> extensive </a:t>
-            </a:r>
-            <a:r>
-              <a:rPr lang="fr-FR" baseline="0" dirty="0" err="1" smtClean="0"/>
-              <a:t>theming</a:t>
-            </a:r>
-            <a:r>
-              <a:rPr lang="fr-FR" baseline="0" dirty="0" smtClean="0"/>
-              <a:t> </a:t>
-            </a:r>
-            <a:r>
-              <a:rPr lang="fr-FR" baseline="0" dirty="0" err="1" smtClean="0"/>
-              <a:t>capability</a:t>
-            </a:r>
-            <a:r>
-              <a:rPr lang="fr-FR" baseline="0" dirty="0" smtClean="0"/>
-              <a:t> </a:t>
-            </a:r>
-            <a:r>
-              <a:rPr lang="fr-FR" baseline="0" dirty="0" err="1" smtClean="0"/>
-              <a:t>with</a:t>
-            </a:r>
-            <a:r>
-              <a:rPr lang="fr-FR" baseline="0" dirty="0" smtClean="0"/>
-              <a:t> the help of ThemeRoller and </a:t>
-            </a:r>
-            <a:r>
-              <a:rPr lang="fr-FR" baseline="0" dirty="0" err="1" smtClean="0"/>
-              <a:t>jQuery</a:t>
-            </a:r>
-            <a:r>
-              <a:rPr lang="fr-FR" baseline="0" dirty="0" smtClean="0"/>
-              <a:t> UI. There are 35+ </a:t>
-            </a:r>
-            <a:r>
-              <a:rPr lang="fr-FR" baseline="0" dirty="0" err="1" smtClean="0"/>
-              <a:t>community</a:t>
-            </a:r>
-            <a:r>
-              <a:rPr lang="fr-FR" baseline="0" dirty="0" smtClean="0"/>
-              <a:t> </a:t>
-            </a:r>
-            <a:r>
-              <a:rPr lang="fr-FR" baseline="0" dirty="0" err="1" smtClean="0"/>
-              <a:t>themes</a:t>
-            </a:r>
-            <a:r>
-              <a:rPr lang="fr-FR" baseline="0" dirty="0" smtClean="0"/>
-              <a:t> and a commercial </a:t>
-            </a:r>
-            <a:r>
-              <a:rPr lang="fr-FR" baseline="0" dirty="0" err="1" smtClean="0"/>
-              <a:t>theme</a:t>
-            </a:r>
-            <a:r>
-              <a:rPr lang="fr-FR" baseline="0" dirty="0" smtClean="0"/>
-              <a:t> </a:t>
-            </a:r>
-            <a:r>
-              <a:rPr lang="fr-FR" baseline="0" dirty="0" err="1" smtClean="0"/>
-              <a:t>also</a:t>
-            </a:r>
-            <a:r>
-              <a:rPr lang="fr-FR" baseline="0" dirty="0" smtClean="0"/>
-              <a:t> </a:t>
-            </a:r>
-            <a:r>
-              <a:rPr lang="fr-FR" baseline="0" dirty="0" err="1" smtClean="0"/>
-              <a:t>released</a:t>
-            </a:r>
-            <a:r>
-              <a:rPr lang="fr-FR" baseline="0" dirty="0" smtClean="0"/>
-              <a:t> </a:t>
-            </a:r>
-            <a:r>
-              <a:rPr lang="fr-FR" baseline="0" dirty="0" err="1" smtClean="0"/>
-              <a:t>named</a:t>
-            </a:r>
-            <a:r>
-              <a:rPr lang="fr-FR" baseline="0" dirty="0" smtClean="0"/>
-              <a:t>: </a:t>
-            </a:r>
-            <a:r>
-              <a:rPr lang="fr-FR" baseline="0" dirty="0" err="1" smtClean="0"/>
-              <a:t>MetroUI</a:t>
-            </a:r>
-            <a:r>
-              <a:rPr lang="fr-FR" baseline="0" dirty="0" smtClean="0"/>
-              <a:t>.</a:t>
-            </a:r>
-          </a:p>
-          <a:p>
-            <a:pPr marL="0" marR="0" indent="0" algn="l" defTabSz="914400" rtl="0" eaLnBrk="1" fontAlgn="auto" latinLnBrk="0" hangingPunct="1">
-              <a:lnSpc>
-                <a:spcPct val="100000"/>
-              </a:lnSpc>
-              <a:spcBef>
-                <a:spcPts val="0"/>
-              </a:spcBef>
-              <a:spcAft>
-                <a:spcPts val="0"/>
-              </a:spcAft>
-              <a:buClrTx/>
-              <a:buSzTx/>
-              <a:buFontTx/>
-              <a:buNone/>
-              <a:tabLst/>
-              <a:defRPr/>
-            </a:pPr>
-            <a:endParaRPr lang="fr-FR" baseline="0" dirty="0" smtClean="0"/>
-          </a:p>
-          <a:p>
-            <a:pPr marL="0" marR="0" indent="0" algn="l" defTabSz="914400" rtl="0" eaLnBrk="1" fontAlgn="auto" latinLnBrk="0" hangingPunct="1">
-              <a:lnSpc>
-                <a:spcPct val="100000"/>
-              </a:lnSpc>
-              <a:spcBef>
-                <a:spcPts val="0"/>
-              </a:spcBef>
-              <a:spcAft>
-                <a:spcPts val="0"/>
-              </a:spcAft>
-              <a:buClrTx/>
-              <a:buSzTx/>
-              <a:buFontTx/>
-              <a:buNone/>
-              <a:tabLst/>
-              <a:defRPr/>
-            </a:pPr>
-            <a:r>
-              <a:rPr lang="fr-FR" baseline="0" dirty="0" smtClean="0"/>
-              <a:t>PrimeFaces </a:t>
-            </a:r>
-            <a:r>
-              <a:rPr lang="fr-FR" baseline="0" dirty="0" err="1" smtClean="0"/>
-              <a:t>is</a:t>
-            </a:r>
-            <a:r>
-              <a:rPr lang="fr-FR" baseline="0" dirty="0" smtClean="0"/>
-              <a:t> </a:t>
-            </a:r>
-            <a:r>
-              <a:rPr lang="fr-FR" baseline="0" dirty="0" err="1" smtClean="0"/>
-              <a:t>well</a:t>
-            </a:r>
-            <a:r>
-              <a:rPr lang="fr-FR" baseline="0" dirty="0" smtClean="0"/>
-              <a:t> </a:t>
-            </a:r>
-            <a:r>
-              <a:rPr lang="fr-FR" baseline="0" dirty="0" err="1" smtClean="0"/>
-              <a:t>documented</a:t>
-            </a:r>
-            <a:r>
-              <a:rPr lang="fr-FR" baseline="0" dirty="0" smtClean="0"/>
-              <a:t>, a </a:t>
-            </a:r>
-            <a:r>
-              <a:rPr lang="fr-FR" baseline="0" dirty="0" err="1" smtClean="0"/>
-              <a:t>cookbook</a:t>
-            </a:r>
-            <a:r>
-              <a:rPr lang="fr-FR" baseline="0" dirty="0" smtClean="0"/>
-              <a:t> </a:t>
-            </a:r>
-            <a:r>
-              <a:rPr lang="fr-FR" baseline="0" dirty="0" err="1" smtClean="0"/>
-              <a:t>is</a:t>
-            </a:r>
-            <a:r>
-              <a:rPr lang="fr-FR" baseline="0" dirty="0" smtClean="0"/>
-              <a:t> </a:t>
-            </a:r>
-            <a:r>
-              <a:rPr lang="fr-FR" baseline="0" dirty="0" err="1" smtClean="0"/>
-              <a:t>released</a:t>
-            </a:r>
-            <a:r>
-              <a:rPr lang="fr-FR" baseline="0" dirty="0" smtClean="0"/>
-              <a:t>, 2 </a:t>
-            </a:r>
-            <a:r>
-              <a:rPr lang="fr-FR" baseline="0" dirty="0" err="1" smtClean="0"/>
-              <a:t>also</a:t>
-            </a:r>
-            <a:r>
-              <a:rPr lang="fr-FR" baseline="0" dirty="0" smtClean="0"/>
-              <a:t> </a:t>
-            </a:r>
-            <a:r>
-              <a:rPr lang="fr-FR" baseline="0" dirty="0" err="1" smtClean="0"/>
-              <a:t>coming</a:t>
-            </a:r>
-            <a:r>
-              <a:rPr lang="fr-FR" baseline="0" dirty="0" smtClean="0"/>
-              <a:t> up, </a:t>
-            </a:r>
-            <a:r>
-              <a:rPr lang="fr-FR" baseline="0" dirty="0" err="1" smtClean="0"/>
-              <a:t>it</a:t>
-            </a:r>
-            <a:r>
-              <a:rPr lang="fr-FR" baseline="0" dirty="0" smtClean="0"/>
-              <a:t> has </a:t>
-            </a:r>
-            <a:r>
-              <a:rPr lang="fr-FR" baseline="0" dirty="0" err="1" smtClean="0"/>
-              <a:t>its</a:t>
-            </a:r>
-            <a:r>
-              <a:rPr lang="fr-FR" baseline="0" dirty="0" smtClean="0"/>
-              <a:t> </a:t>
-            </a:r>
-            <a:r>
-              <a:rPr lang="fr-FR" baseline="0" dirty="0" err="1" smtClean="0"/>
-              <a:t>own</a:t>
-            </a:r>
-            <a:r>
-              <a:rPr lang="fr-FR" baseline="0" dirty="0" smtClean="0"/>
-              <a:t> </a:t>
-            </a:r>
-            <a:r>
-              <a:rPr lang="fr-FR" baseline="0" dirty="0" err="1" smtClean="0"/>
-              <a:t>develoeprs</a:t>
-            </a:r>
-            <a:r>
-              <a:rPr lang="fr-FR" baseline="0" dirty="0" smtClean="0"/>
-              <a:t> guide and forum </a:t>
-            </a:r>
-            <a:r>
-              <a:rPr lang="fr-FR" baseline="0" dirty="0" err="1" smtClean="0"/>
-              <a:t>reached</a:t>
-            </a:r>
-            <a:r>
-              <a:rPr lang="fr-FR" baseline="0" dirty="0" smtClean="0"/>
-              <a:t> 100k </a:t>
-            </a:r>
-            <a:r>
-              <a:rPr lang="fr-FR" baseline="0" dirty="0" err="1" smtClean="0"/>
-              <a:t>posts</a:t>
-            </a:r>
-            <a:r>
-              <a:rPr lang="fr-FR" baseline="0" dirty="0" smtClean="0"/>
-              <a:t>. </a:t>
-            </a:r>
-          </a:p>
-          <a:p>
-            <a:pPr marL="0" marR="0" indent="0" algn="l" defTabSz="914400" rtl="0" eaLnBrk="1" fontAlgn="auto" latinLnBrk="0" hangingPunct="1">
-              <a:lnSpc>
-                <a:spcPct val="100000"/>
-              </a:lnSpc>
-              <a:spcBef>
-                <a:spcPts val="0"/>
-              </a:spcBef>
-              <a:spcAft>
-                <a:spcPts val="0"/>
-              </a:spcAft>
-              <a:buClrTx/>
-              <a:buSzTx/>
-              <a:buFontTx/>
-              <a:buNone/>
-              <a:tabLst/>
-              <a:defRPr/>
-            </a:pPr>
-            <a:endParaRPr lang="fr-FR" baseline="0" dirty="0" smtClean="0"/>
-          </a:p>
-          <a:p>
-            <a:pPr marL="0" marR="0" indent="0" algn="l" defTabSz="914400" rtl="0" eaLnBrk="1" fontAlgn="auto" latinLnBrk="0" hangingPunct="1">
-              <a:lnSpc>
-                <a:spcPct val="100000"/>
-              </a:lnSpc>
-              <a:spcBef>
-                <a:spcPts val="0"/>
-              </a:spcBef>
-              <a:spcAft>
-                <a:spcPts val="0"/>
-              </a:spcAft>
-              <a:buClrTx/>
-              <a:buSzTx/>
-              <a:buFontTx/>
-              <a:buNone/>
-              <a:tabLst/>
-              <a:defRPr/>
-            </a:pPr>
-            <a:r>
-              <a:rPr lang="fr-FR" baseline="0" dirty="0" smtClean="0"/>
-              <a:t>PrimeFaces </a:t>
-            </a:r>
-            <a:r>
-              <a:rPr lang="fr-FR" baseline="0" dirty="0" err="1" smtClean="0"/>
-              <a:t>is</a:t>
-            </a:r>
-            <a:r>
-              <a:rPr lang="fr-FR" baseline="0" dirty="0" smtClean="0"/>
-              <a:t> </a:t>
-            </a:r>
-            <a:r>
-              <a:rPr lang="fr-FR" baseline="0" dirty="0" err="1" smtClean="0"/>
-              <a:t>being</a:t>
-            </a:r>
-            <a:r>
-              <a:rPr lang="fr-FR" baseline="0" dirty="0" smtClean="0"/>
-              <a:t> </a:t>
-            </a:r>
-            <a:r>
-              <a:rPr lang="fr-FR" baseline="0" dirty="0" err="1" smtClean="0"/>
-              <a:t>developed</a:t>
-            </a:r>
-            <a:r>
-              <a:rPr lang="fr-FR" baseline="0" dirty="0" smtClean="0"/>
-              <a:t> by </a:t>
-            </a:r>
-            <a:r>
-              <a:rPr lang="fr-FR" baseline="0" dirty="0" err="1" smtClean="0"/>
-              <a:t>developers</a:t>
-            </a:r>
-            <a:r>
-              <a:rPr lang="fr-FR" baseline="0" dirty="0" smtClean="0"/>
-              <a:t> </a:t>
-            </a:r>
-            <a:r>
-              <a:rPr lang="fr-FR" baseline="0" dirty="0" err="1" smtClean="0"/>
-              <a:t>who</a:t>
-            </a:r>
-            <a:r>
-              <a:rPr lang="fr-FR" baseline="0" dirty="0" smtClean="0"/>
-              <a:t> </a:t>
-            </a:r>
-            <a:r>
-              <a:rPr lang="fr-FR" baseline="0" dirty="0" err="1" smtClean="0"/>
-              <a:t>also</a:t>
-            </a:r>
-            <a:r>
-              <a:rPr lang="fr-FR" baseline="0" dirty="0" smtClean="0"/>
-              <a:t> use PrimeFaces in </a:t>
-            </a:r>
-            <a:r>
-              <a:rPr lang="fr-FR" baseline="0" dirty="0" err="1" smtClean="0"/>
-              <a:t>their</a:t>
-            </a:r>
-            <a:r>
-              <a:rPr lang="fr-FR" baseline="0" dirty="0" smtClean="0"/>
-              <a:t> </a:t>
-            </a:r>
-            <a:r>
-              <a:rPr lang="fr-FR" baseline="0" dirty="0" err="1" smtClean="0"/>
-              <a:t>daily</a:t>
-            </a:r>
-            <a:r>
-              <a:rPr lang="fr-FR" baseline="0" dirty="0" smtClean="0"/>
-              <a:t> job, </a:t>
-            </a:r>
-            <a:r>
-              <a:rPr lang="fr-FR" baseline="0" dirty="0" err="1" smtClean="0"/>
-              <a:t>so</a:t>
-            </a:r>
-            <a:r>
-              <a:rPr lang="fr-FR" baseline="0" dirty="0" smtClean="0"/>
-              <a:t> best </a:t>
-            </a:r>
-            <a:r>
-              <a:rPr lang="fr-FR" baseline="0" dirty="0" err="1" smtClean="0"/>
-              <a:t>is</a:t>
-            </a:r>
-            <a:r>
-              <a:rPr lang="fr-FR" baseline="0" dirty="0" smtClean="0"/>
-              <a:t> </a:t>
-            </a:r>
-            <a:r>
-              <a:rPr lang="fr-FR" baseline="0" dirty="0" err="1" smtClean="0"/>
-              <a:t>served</a:t>
-            </a:r>
-            <a:r>
-              <a:rPr lang="fr-FR" baseline="0" dirty="0" smtClean="0"/>
-              <a:t> </a:t>
-            </a:r>
-            <a:r>
-              <a:rPr lang="fr-FR" baseline="0" dirty="0" err="1" smtClean="0"/>
-              <a:t>from</a:t>
-            </a:r>
-            <a:r>
-              <a:rPr lang="fr-FR" baseline="0" dirty="0" smtClean="0"/>
-              <a:t> the source.</a:t>
-            </a:r>
-          </a:p>
-          <a:p>
-            <a:pPr marL="0" marR="0" indent="0" algn="l" defTabSz="914400" rtl="0" eaLnBrk="1" fontAlgn="auto" latinLnBrk="0" hangingPunct="1">
-              <a:lnSpc>
-                <a:spcPct val="100000"/>
-              </a:lnSpc>
-              <a:spcBef>
-                <a:spcPts val="0"/>
-              </a:spcBef>
-              <a:spcAft>
-                <a:spcPts val="0"/>
-              </a:spcAft>
-              <a:buClrTx/>
-              <a:buSzTx/>
-              <a:buFontTx/>
-              <a:buNone/>
-              <a:tabLst/>
-              <a:defRPr/>
-            </a:pPr>
-            <a:endParaRPr lang="fr-FR" baseline="0" dirty="0" smtClean="0"/>
-          </a:p>
-          <a:p>
             <a:endParaRPr lang="en-US" dirty="0"/>
           </a:p>
         </p:txBody>
@@ -4822,30 +2771,6 @@
           <a:bodyPr/>
           <a:lstStyle/>
           <a:p>
-            <a:r>
-              <a:rPr lang="en-US" dirty="0" err="1" smtClean="0"/>
-              <a:t>NetBeans</a:t>
-            </a:r>
-            <a:r>
-              <a:rPr lang="en-US" baseline="0" dirty="0" smtClean="0"/>
-              <a:t> is the open source IDE and platform brought to us by Oracle now to develop Java based applications. With the 7.3 version new features bundled with </a:t>
-            </a:r>
-            <a:r>
-              <a:rPr lang="en-US" baseline="0" dirty="0" err="1" smtClean="0"/>
-              <a:t>Netbeans</a:t>
-            </a:r>
-            <a:r>
-              <a:rPr lang="en-US" baseline="0" dirty="0" smtClean="0"/>
-              <a:t> like HTML5 client side development, Apache Cordova framework for building native apps with HTML, JavaScript, CSS. They improved stuff on the </a:t>
-            </a:r>
-            <a:r>
-              <a:rPr lang="en-US" baseline="0" dirty="0" err="1" smtClean="0"/>
-              <a:t>FindBugs</a:t>
-            </a:r>
-            <a:r>
-              <a:rPr lang="en-US" baseline="0" dirty="0" smtClean="0"/>
-              <a:t> and VCS side and even on the PHP development.</a:t>
-            </a:r>
             <a:endParaRPr lang="en-US" dirty="0"/>
           </a:p>
         </p:txBody>
@@ -4930,38 +2855,6 @@
           <a:bodyPr/>
           <a:lstStyle/>
           <a:p>
-            <a:r>
-              <a:rPr lang="en-US" dirty="0" smtClean="0"/>
-              <a:t>So for</a:t>
-            </a:r>
-            <a:r>
-              <a:rPr lang="en-US" baseline="0" dirty="0" smtClean="0"/>
-              <a:t> the 10 samples we put all of the code into the </a:t>
-            </a:r>
-            <a:r>
-              <a:rPr lang="en-US" baseline="0" dirty="0" err="1" smtClean="0"/>
-              <a:t>github</a:t>
-            </a:r>
-            <a:r>
-              <a:rPr lang="en-US" baseline="0" dirty="0" smtClean="0"/>
-              <a:t>, you can access all from there, they are all </a:t>
-            </a:r>
-            <a:r>
-              <a:rPr lang="en-US" baseline="0" dirty="0" err="1" smtClean="0"/>
-              <a:t>mavenized</a:t>
-            </a:r>
-            <a:r>
-              <a:rPr lang="en-US" baseline="0" dirty="0" smtClean="0"/>
-              <a:t> projects created by the </a:t>
-            </a:r>
-            <a:r>
-              <a:rPr lang="en-US" baseline="0" dirty="0" err="1" smtClean="0"/>
-              <a:t>codehaus</a:t>
-            </a:r>
-            <a:r>
-              <a:rPr lang="en-US" baseline="0" dirty="0" smtClean="0"/>
-              <a:t> webapp-javaee7 archetype. They are defined as a module to a main maven project.</a:t>
-            </a:r>
             <a:endParaRPr lang="en-US" dirty="0"/>
           </a:p>
         </p:txBody>
@@ -5046,312 +2939,6 @@
           <a:bodyPr/>
           <a:lstStyle/>
           <a:p>
-            <a:r>
-              <a:rPr lang="en-US" sz="1200" kern="1200" dirty="0" smtClean="0">
-                <a:solidFill>
-                  <a:schemeClr val="tx1"/>
-                </a:solidFill>
-                <a:latin typeface="+mn-lt"/>
-                <a:ea typeface="+mn-ea"/>
-                <a:cs typeface="+mn-cs"/>
-              </a:rPr>
-              <a:t>Html(5) friendly markup, what does it mean?</a:t>
-            </a:r>
-            <a:r>
-              <a:rPr lang="en-US" sz="1200" kern="1200" baseline="0" dirty="0" smtClean="0">
-                <a:solidFill>
-                  <a:schemeClr val="tx1"/>
-                </a:solidFill>
-                <a:latin typeface="+mn-lt"/>
-                <a:ea typeface="+mn-ea"/>
-                <a:cs typeface="+mn-cs"/>
-              </a:rPr>
-              <a:t> </a:t>
-            </a:r>
-            <a:r>
-              <a:rPr lang="en-US" sz="1200" kern="1200" dirty="0" smtClean="0">
-                <a:solidFill>
-                  <a:schemeClr val="tx1"/>
-                </a:solidFill>
-                <a:latin typeface="+mn-lt"/>
-                <a:ea typeface="+mn-ea"/>
-                <a:cs typeface="+mn-cs"/>
-              </a:rPr>
-              <a:t>It allows HTML markup directly within the Facelet component or JSF attibutes within HTML elements.</a:t>
-            </a:r>
-            <a:r>
-              <a:rPr lang="en-US" sz="1200" kern="1200" baseline="0" dirty="0" smtClean="0">
-                <a:solidFill>
-                  <a:schemeClr val="tx1"/>
-                </a:solidFill>
-                <a:latin typeface="+mn-lt"/>
-                <a:ea typeface="+mn-ea"/>
-                <a:cs typeface="+mn-cs"/>
-              </a:rPr>
-              <a:t> </a:t>
-            </a:r>
-            <a:r>
-              <a:rPr lang="en-US" sz="1200" kern="1200" dirty="0" smtClean="0">
-                <a:solidFill>
-                  <a:schemeClr val="tx1"/>
-                </a:solidFill>
-                <a:latin typeface="+mn-lt"/>
-                <a:ea typeface="+mn-ea"/>
-                <a:cs typeface="+mn-cs"/>
-              </a:rPr>
-              <a:t>It can help to i.e. create components which are missing in the HTML specification without creation of custom JSF components using JavaScript</a:t>
-            </a:r>
-            <a:r>
-              <a:rPr lang="en-US" sz="1200" kern="1200" baseline="0" dirty="0" smtClean="0">
-                <a:solidFill>
-                  <a:schemeClr val="tx1"/>
-                </a:solidFill>
-                <a:latin typeface="+mn-lt"/>
-                <a:ea typeface="+mn-ea"/>
-                <a:cs typeface="+mn-cs"/>
-              </a:rPr>
-              <a:t> frameworks</a:t>
-            </a:r>
-            <a:r>
-              <a:rPr lang="en-US" sz="1200" kern="1200" dirty="0" smtClean="0">
-                <a:solidFill>
-                  <a:schemeClr val="tx1"/>
-                </a:solidFill>
-                <a:latin typeface="+mn-lt"/>
-                <a:ea typeface="+mn-ea"/>
-                <a:cs typeface="+mn-cs"/>
-              </a:rPr>
-              <a:t>.</a:t>
-            </a:r>
-            <a:r>
-              <a:rPr lang="en-US" sz="1200" kern="1200" baseline="0" dirty="0" smtClean="0">
-                <a:solidFill>
-                  <a:schemeClr val="tx1"/>
-                </a:solidFill>
-                <a:latin typeface="+mn-lt"/>
-                <a:ea typeface="+mn-ea"/>
-                <a:cs typeface="+mn-cs"/>
-              </a:rPr>
-              <a:t> </a:t>
-            </a:r>
-            <a:r>
-              <a:rPr lang="en-US" sz="1200" kern="1200" dirty="0" smtClean="0">
-                <a:solidFill>
-                  <a:schemeClr val="tx1"/>
-                </a:solidFill>
-                <a:latin typeface="+mn-lt"/>
-                <a:ea typeface="+mn-ea"/>
-                <a:cs typeface="+mn-cs"/>
-              </a:rPr>
-              <a:t>For purpose of this feature</a:t>
-            </a:r>
-            <a:r>
-              <a:rPr lang="en-US" sz="1200" kern="1200" baseline="0" dirty="0" smtClean="0">
-                <a:solidFill>
-                  <a:schemeClr val="tx1"/>
-                </a:solidFill>
-                <a:latin typeface="+mn-lt"/>
-                <a:ea typeface="+mn-ea"/>
-                <a:cs typeface="+mn-cs"/>
-              </a:rPr>
-              <a:t> </a:t>
-            </a:r>
-            <a:r>
-              <a:rPr lang="en-US" sz="1200" kern="1200" dirty="0" smtClean="0">
-                <a:solidFill>
-                  <a:schemeClr val="tx1"/>
-                </a:solidFill>
-                <a:latin typeface="+mn-lt"/>
-                <a:ea typeface="+mn-ea"/>
-                <a:cs typeface="+mn-cs"/>
-              </a:rPr>
-              <a:t>JSF defines two new namespaces. One is handled by RenderKit and passes attributes of</a:t>
-            </a:r>
-            <a:r>
-              <a:rPr lang="en-US" sz="1200" kern="1200" baseline="0" dirty="0" smtClean="0">
-                <a:solidFill>
-                  <a:schemeClr val="tx1"/>
-                </a:solidFill>
-                <a:latin typeface="+mn-lt"/>
-                <a:ea typeface="+mn-ea"/>
-                <a:cs typeface="+mn-cs"/>
-              </a:rPr>
-              <a:t> given namespace from </a:t>
-            </a:r>
-            <a:r>
-              <a:rPr lang="en-US" sz="1200" kern="1200" dirty="0" smtClean="0">
-                <a:solidFill>
-                  <a:schemeClr val="tx1"/>
-                </a:solidFill>
-                <a:latin typeface="+mn-lt"/>
-                <a:ea typeface="+mn-ea"/>
-                <a:cs typeface="+mn-cs"/>
-              </a:rPr>
-              <a:t>JSF component to the rendered HTML page. The second one is processed by TagDecorator which can</a:t>
-            </a:r>
-            <a:r>
-              <a:rPr lang="en-US" sz="1200" kern="1200" baseline="0" dirty="0" smtClean="0">
-                <a:solidFill>
-                  <a:schemeClr val="tx1"/>
-                </a:solidFill>
-                <a:latin typeface="+mn-lt"/>
-                <a:ea typeface="+mn-ea"/>
-                <a:cs typeface="+mn-cs"/>
-              </a:rPr>
-              <a:t> turn</a:t>
-            </a:r>
-            <a:r>
-              <a:rPr lang="en-US" sz="1200" kern="1200" dirty="0" smtClean="0">
-                <a:solidFill>
-                  <a:schemeClr val="tx1"/>
-                </a:solidFill>
-                <a:latin typeface="+mn-lt"/>
-                <a:ea typeface="+mn-ea"/>
-                <a:cs typeface="+mn-cs"/>
-              </a:rPr>
-              <a:t> HTML tag into</a:t>
-            </a:r>
-            <a:r>
-              <a:rPr lang="en-US" sz="1200" kern="1200" baseline="0" dirty="0" smtClean="0">
-                <a:solidFill>
-                  <a:schemeClr val="tx1"/>
-                </a:solidFill>
-                <a:latin typeface="+mn-lt"/>
-                <a:ea typeface="+mn-ea"/>
-                <a:cs typeface="+mn-cs"/>
-              </a:rPr>
-              <a:t> JSF component </a:t>
-            </a:r>
-            <a:r>
-              <a:rPr lang="en-US" sz="1200" kern="1200" dirty="0" smtClean="0">
-                <a:solidFill>
-                  <a:schemeClr val="tx1"/>
-                </a:solidFill>
-                <a:latin typeface="+mn-lt"/>
-                <a:ea typeface="+mn-ea"/>
-                <a:cs typeface="+mn-cs"/>
-              </a:rPr>
-              <a:t>before the</a:t>
-            </a:r>
-            <a:r>
-              <a:rPr lang="en-US" sz="1200" kern="1200" baseline="0" dirty="0" smtClean="0">
-                <a:solidFill>
-                  <a:schemeClr val="tx1"/>
-                </a:solidFill>
-                <a:latin typeface="+mn-lt"/>
-                <a:ea typeface="+mn-ea"/>
-                <a:cs typeface="+mn-cs"/>
-              </a:rPr>
-              <a:t> </a:t>
-            </a:r>
-            <a:r>
-              <a:rPr lang="en-US" sz="1200" kern="1200" dirty="0" smtClean="0">
-                <a:solidFill>
-                  <a:schemeClr val="tx1"/>
-                </a:solidFill>
-                <a:latin typeface="+mn-lt"/>
-                <a:ea typeface="+mn-ea"/>
-                <a:cs typeface="+mn-cs"/>
-              </a:rPr>
-              <a:t>processing </a:t>
-            </a:r>
-            <a:r>
-              <a:rPr lang="en-US" sz="1200" kern="1200" baseline="0" dirty="0" smtClean="0">
-                <a:solidFill>
-                  <a:schemeClr val="tx1"/>
-                </a:solidFill>
-                <a:latin typeface="+mn-lt"/>
-                <a:ea typeface="+mn-ea"/>
-                <a:cs typeface="+mn-cs"/>
-              </a:rPr>
-              <a:t>with </a:t>
-            </a:r>
-            <a:r>
-              <a:rPr lang="en-US" sz="1200" kern="1200" dirty="0" smtClean="0">
-                <a:solidFill>
-                  <a:schemeClr val="tx1"/>
-                </a:solidFill>
-                <a:latin typeface="+mn-lt"/>
-                <a:ea typeface="+mn-ea"/>
-                <a:cs typeface="+mn-cs"/>
-              </a:rPr>
-              <a:t>the associated TagHandler.</a:t>
-            </a:r>
-            <a:endParaRPr lang="en-US" sz="1200" kern="1200" baseline="0" dirty="0" smtClean="0">
-              <a:solidFill>
-                <a:schemeClr val="tx1"/>
-              </a:solidFill>
-              <a:latin typeface="+mn-lt"/>
-              <a:ea typeface="+mn-ea"/>
-              <a:cs typeface="+mn-cs"/>
-            </a:endParaRPr>
-          </a:p>
-          <a:p>
-            <a:endParaRPr lang="en-US" sz="1200" kern="1200" baseline="0" dirty="0" smtClean="0">
-              <a:solidFill>
-                <a:schemeClr val="tx1"/>
-              </a:solidFill>
-              <a:latin typeface="+mn-lt"/>
-              <a:ea typeface="+mn-ea"/>
-              <a:cs typeface="+mn-cs"/>
-            </a:endParaRPr>
-          </a:p>
-          <a:p>
-            <a:r>
-              <a:rPr lang="en-US" sz="1200" kern="1200" dirty="0" smtClean="0">
-                <a:solidFill>
-                  <a:schemeClr val="tx1"/>
-                </a:solidFill>
-                <a:latin typeface="+mn-lt"/>
-                <a:ea typeface="+mn-ea"/>
-                <a:cs typeface="+mn-cs"/>
-              </a:rPr>
-              <a:t>The advantage is that you take control over the rendered pages yourself,</a:t>
-            </a:r>
-            <a:r>
-              <a:rPr lang="en-US" sz="1200" kern="1200" baseline="0" dirty="0" smtClean="0">
-                <a:solidFill>
-                  <a:schemeClr val="tx1"/>
-                </a:solidFill>
-                <a:latin typeface="+mn-lt"/>
-                <a:ea typeface="+mn-ea"/>
-                <a:cs typeface="+mn-cs"/>
-              </a:rPr>
-              <a:t> you are not fully dependent on the author of the component</a:t>
-            </a:r>
-            <a:r>
-              <a:rPr lang="en-US" sz="1200" kern="1200" dirty="0" smtClean="0">
-                <a:solidFill>
-                  <a:schemeClr val="tx1"/>
-                </a:solidFill>
-                <a:latin typeface="+mn-lt"/>
-                <a:ea typeface="+mn-ea"/>
-                <a:cs typeface="+mn-cs"/>
-              </a:rPr>
-              <a:t>.</a:t>
-            </a:r>
-            <a:r>
-              <a:rPr lang="en-US" sz="1200" kern="1200" baseline="0" dirty="0" smtClean="0">
-                <a:solidFill>
-                  <a:schemeClr val="tx1"/>
-                </a:solidFill>
-                <a:latin typeface="+mn-lt"/>
-                <a:ea typeface="+mn-ea"/>
-                <a:cs typeface="+mn-cs"/>
-              </a:rPr>
-              <a:t> </a:t>
-            </a:r>
-            <a:r>
-              <a:rPr lang="en-US" sz="1200" kern="1200" dirty="0" smtClean="0">
-                <a:solidFill>
-                  <a:schemeClr val="tx1"/>
-                </a:solidFill>
-                <a:latin typeface="+mn-lt"/>
-                <a:ea typeface="+mn-ea"/>
-                <a:cs typeface="+mn-cs"/>
-              </a:rPr>
-              <a:t>It leads to benefit in mixing JavaScript and JavaServer Faces components.</a:t>
-            </a:r>
             <a:endParaRPr lang="en-US" dirty="0"/>
           </a:p>
         </p:txBody>
@@ -5373,7 +2960,7 @@
           <a:p>
             <a:fld id="{36E82501-53DA-4152-84B0-51135B15EEA8}" type="slidenum">
               <a:rPr lang="en-US" smtClean="0"/>
-              <a:t>10</a:t>
+              <a:t>9</a:t>
             </a:fld>
             <a:endParaRPr lang="en-US"/>
           </a:p>
@@ -5382,7 +2969,7 @@
     </p:spTree>
     <p:extLst>
       <p:ext uri="{BB962C8B-B14F-4D97-AF65-F5344CB8AC3E}">
-        <p14:creationId xmlns:p14="http://schemas.microsoft.com/office/powerpoint/2010/main" val="2989104136"/>
+        <p14:creationId xmlns:p14="http://schemas.microsoft.com/office/powerpoint/2010/main" val="2434575342"/>
       </p:ext>
     </p:extLst>
   </p:cSld>
@@ -5436,208 +3023,6 @@
           <a:bodyPr/>
           <a:lstStyle/>
           <a:p>
-            <a:r>
-              <a:rPr lang="en-US" sz="1200" kern="1200" dirty="0" smtClean="0">
-                <a:solidFill>
-                  <a:schemeClr val="tx1"/>
-                </a:solidFill>
-                <a:latin typeface="+mn-lt"/>
-                <a:ea typeface="+mn-ea"/>
-                <a:cs typeface="+mn-cs"/>
-              </a:rPr>
-              <a:t>Before showing first example I would like to point out that we are going to show the crucial part of features. There are often additional tips available within the GitHub repository so it makes sense to clone it and walk through available samples if you are interested</a:t>
-            </a:r>
-            <a:r>
-              <a:rPr lang="en-US" sz="1200" kern="1200" baseline="0" dirty="0" smtClean="0">
-                <a:solidFill>
-                  <a:schemeClr val="tx1"/>
-                </a:solidFill>
-                <a:latin typeface="+mn-lt"/>
-                <a:ea typeface="+mn-ea"/>
-                <a:cs typeface="+mn-cs"/>
-              </a:rPr>
-              <a:t> in this topic</a:t>
-            </a:r>
-            <a:r>
-              <a:rPr lang="en-US" sz="1200" kern="1200" dirty="0" smtClean="0">
-                <a:solidFill>
-                  <a:schemeClr val="tx1"/>
-                </a:solidFill>
-                <a:latin typeface="+mn-lt"/>
-                <a:ea typeface="+mn-ea"/>
-                <a:cs typeface="+mn-cs"/>
-              </a:rPr>
-              <a:t>.</a:t>
-            </a:r>
-          </a:p>
-          <a:p>
-            <a:endParaRPr lang="en-US" sz="1200" kern="1200" dirty="0" smtClean="0">
-              <a:solidFill>
-                <a:schemeClr val="tx1"/>
-              </a:solidFill>
-              <a:latin typeface="+mn-lt"/>
-              <a:ea typeface="+mn-ea"/>
-              <a:cs typeface="+mn-cs"/>
-            </a:endParaRPr>
-          </a:p>
-          <a:p>
-            <a:r>
-              <a:rPr lang="en-US" sz="1200" kern="1200" dirty="0" smtClean="0">
-                <a:solidFill>
-                  <a:schemeClr val="tx1"/>
-                </a:solidFill>
-                <a:latin typeface="+mn-lt"/>
-                <a:ea typeface="+mn-ea"/>
-                <a:cs typeface="+mn-cs"/>
-              </a:rPr>
-              <a:t>Now let's start with the passthrough elements inside the simple template. I'm using HTML tag with attributes from the JSF namespace. Such tag is translated before JSF rendering and it's processed within the usual JSF lifecycle. You can see</a:t>
-            </a:r>
-            <a:r>
-              <a:rPr lang="en-US" sz="1200" kern="1200" baseline="0" dirty="0" smtClean="0">
-                <a:solidFill>
-                  <a:schemeClr val="tx1"/>
-                </a:solidFill>
-                <a:latin typeface="+mn-lt"/>
-                <a:ea typeface="+mn-ea"/>
-                <a:cs typeface="+mn-cs"/>
-              </a:rPr>
-              <a:t> that the JSF validation over the HTML text input works like in cases of the JSF components. Let’s move to the second facelet and the</a:t>
-            </a:r>
-            <a:r>
-              <a:rPr lang="en-US" sz="1200" kern="1200" dirty="0" smtClean="0">
-                <a:solidFill>
-                  <a:schemeClr val="tx1"/>
-                </a:solidFill>
-                <a:latin typeface="+mn-lt"/>
-                <a:ea typeface="+mn-ea"/>
-                <a:cs typeface="+mn-cs"/>
-              </a:rPr>
-              <a:t> passthrough attribute. It's specified at the JSF component and renderer passes it to the created HTML page</a:t>
-            </a:r>
-            <a:r>
-              <a:rPr lang="en-US" sz="1200" kern="1200" baseline="0" dirty="0" smtClean="0">
-                <a:solidFill>
-                  <a:schemeClr val="tx1"/>
-                </a:solidFill>
-                <a:latin typeface="+mn-lt"/>
-                <a:ea typeface="+mn-ea"/>
-                <a:cs typeface="+mn-cs"/>
-              </a:rPr>
-              <a:t> as you can see in the rendered HTML source.</a:t>
-            </a:r>
-          </a:p>
-          <a:p>
-            <a:endParaRPr lang="en-US" sz="1200" kern="1200" dirty="0" smtClean="0">
-              <a:solidFill>
-                <a:schemeClr val="tx1"/>
-              </a:solidFill>
-              <a:latin typeface="+mn-lt"/>
-              <a:ea typeface="+mn-ea"/>
-              <a:cs typeface="+mn-cs"/>
-            </a:endParaRPr>
-          </a:p>
-          <a:p>
-            <a:r>
-              <a:rPr lang="en-US" sz="1200" kern="1200" dirty="0" smtClean="0">
-                <a:solidFill>
-                  <a:schemeClr val="tx1"/>
-                </a:solidFill>
-                <a:latin typeface="+mn-lt"/>
-                <a:ea typeface="+mn-ea"/>
-                <a:cs typeface="+mn-cs"/>
-              </a:rPr>
-              <a:t>This custom SELECT component is the real example of this feature</a:t>
-            </a:r>
-            <a:r>
-              <a:rPr lang="en-US" sz="1200" kern="1200" baseline="0" dirty="0" smtClean="0">
-                <a:solidFill>
-                  <a:schemeClr val="tx1"/>
-                </a:solidFill>
-                <a:latin typeface="+mn-lt"/>
-                <a:ea typeface="+mn-ea"/>
-                <a:cs typeface="+mn-cs"/>
-              </a:rPr>
-              <a:t> </a:t>
-            </a:r>
-            <a:r>
-              <a:rPr lang="en-US" sz="1200" kern="1200" dirty="0" smtClean="0">
-                <a:solidFill>
-                  <a:schemeClr val="tx1"/>
-                </a:solidFill>
-                <a:latin typeface="+mn-lt"/>
-                <a:ea typeface="+mn-ea"/>
-                <a:cs typeface="+mn-cs"/>
-              </a:rPr>
-              <a:t>in</a:t>
-            </a:r>
-            <a:r>
-              <a:rPr lang="en-US" sz="1200" kern="1200" baseline="0" dirty="0" smtClean="0">
-                <a:solidFill>
-                  <a:schemeClr val="tx1"/>
-                </a:solidFill>
-                <a:latin typeface="+mn-lt"/>
-                <a:ea typeface="+mn-ea"/>
-                <a:cs typeface="+mn-cs"/>
-              </a:rPr>
-              <a:t> action</a:t>
-            </a:r>
-            <a:r>
-              <a:rPr lang="en-US" sz="1200" kern="1200" dirty="0" smtClean="0">
-                <a:solidFill>
-                  <a:schemeClr val="tx1"/>
-                </a:solidFill>
-                <a:latin typeface="+mn-lt"/>
-                <a:ea typeface="+mn-ea"/>
-                <a:cs typeface="+mn-cs"/>
-              </a:rPr>
-              <a:t>. There is called jQuery plugin which can turn textual option items into images. This plugin</a:t>
-            </a:r>
-            <a:r>
-              <a:rPr lang="en-US" sz="1200" kern="1200" baseline="0" dirty="0" smtClean="0">
-                <a:solidFill>
-                  <a:schemeClr val="tx1"/>
-                </a:solidFill>
-                <a:latin typeface="+mn-lt"/>
-                <a:ea typeface="+mn-ea"/>
-                <a:cs typeface="+mn-cs"/>
-              </a:rPr>
-              <a:t> requires</a:t>
-            </a:r>
-            <a:r>
-              <a:rPr lang="en-US" sz="1200" kern="1200" dirty="0" smtClean="0">
-                <a:solidFill>
-                  <a:schemeClr val="tx1"/>
-                </a:solidFill>
-                <a:latin typeface="+mn-lt"/>
-                <a:ea typeface="+mn-ea"/>
-                <a:cs typeface="+mn-cs"/>
-              </a:rPr>
-              <a:t> definition of attributes which are used for binding with its code. The result is JSF component behaviour with the JS component’s L&amp;F. This is JS and JSF interoperability which would not be possible before.</a:t>
-            </a:r>
-            <a:r>
-              <a:rPr lang="en-US" sz="1200" kern="1200" baseline="0" dirty="0" smtClean="0">
-                <a:solidFill>
-                  <a:schemeClr val="tx1"/>
-                </a:solidFill>
-                <a:latin typeface="+mn-lt"/>
-                <a:ea typeface="+mn-ea"/>
-                <a:cs typeface="+mn-cs"/>
-              </a:rPr>
-              <a:t> </a:t>
-            </a:r>
-            <a:r>
-              <a:rPr lang="en-US" sz="1200" kern="1200" dirty="0" smtClean="0">
-                <a:solidFill>
-                  <a:schemeClr val="tx1"/>
-                </a:solidFill>
-                <a:latin typeface="+mn-lt"/>
-                <a:ea typeface="+mn-ea"/>
-                <a:cs typeface="+mn-cs"/>
-              </a:rPr>
-              <a:t>There is more to see is in the sample, you can compare Bean Validation validated form against the JSF validated one or take a look on custom simple Bean Validation constrain pattern.</a:t>
-            </a:r>
-          </a:p>
-          <a:p>
             <a:endParaRPr lang="en-US" dirty="0"/>
           </a:p>
         </p:txBody>
@@ -5659,7 +3044,7 @@
           <a:p>
             <a:fld id="{36E82501-53DA-4152-84B0-51135B15EEA8}" type="slidenum">
               <a:rPr lang="en-US" smtClean="0"/>
-              <a:t>11</a:t>
+              <a:t>10</a:t>
             </a:fld>
             <a:endParaRPr lang="en-US"/>
           </a:p>
@@ -5668,7 +3053,7 @@
     </p:spTree>
     <p:extLst>
       <p:ext uri="{BB962C8B-B14F-4D97-AF65-F5344CB8AC3E}">
-        <p14:creationId xmlns:p14="http://schemas.microsoft.com/office/powerpoint/2010/main" val="111152863"/>
+        <p14:creationId xmlns:p14="http://schemas.microsoft.com/office/powerpoint/2010/main" val="2989104136"/>
       </p:ext>
     </p:extLst>
   </p:cSld>
@@ -21681,7 +19066,7 @@
                 <a:latin typeface="Arial" pitchFamily="34" charset="0"/>
                 <a:cs typeface="Arial" pitchFamily="34" charset="0"/>
               </a:rPr>
-              <a:t>authdis40</a:t>
+              <a:t>-</a:t>
             </a:r>
             <a:endParaRPr lang="en-US" sz="2400" dirty="0">
               <a:solidFill>

</xml_diff>